<commit_message>
new announcements, working on new slide sets
</commit_message>
<xml_diff>
--- a/slides/00-DailyAnnouncements.pptx
+++ b/slides/00-DailyAnnouncements.pptx
@@ -5,7 +5,7 @@
     <p:sldMasterId id="2147484006" r:id="rId1"/>
   </p:sldMasterIdLst>
   <p:notesMasterIdLst>
-    <p:notesMasterId r:id="rId8"/>
+    <p:notesMasterId r:id="rId9"/>
   </p:notesMasterIdLst>
   <p:sldIdLst>
     <p:sldId id="256" r:id="rId2"/>
@@ -14,6 +14,7 @@
     <p:sldId id="507" r:id="rId5"/>
     <p:sldId id="508" r:id="rId6"/>
     <p:sldId id="509" r:id="rId7"/>
+    <p:sldId id="510" r:id="rId8"/>
   </p:sldIdLst>
   <p:sldSz cx="12192000" cy="6858000"/>
   <p:notesSz cx="6858000" cy="9144000"/>
@@ -202,7 +203,7 @@
           <a:p>
             <a:fld id="{C5B45307-6ED4-B142-BD64-10F739779302}" type="datetimeFigureOut">
               <a:rPr lang="en-US" smtClean="0"/>
-              <a:t>9/7/23</a:t>
+              <a:t>9/12/23</a:t>
             </a:fld>
             <a:endParaRPr lang="en-US"/>
           </a:p>
@@ -610,7 +611,7 @@
           <a:noFill/>
           <a:extLst>
             <a:ext uri="{909E8E84-426E-40dd-AFC4-6F175D3DCCD1}">
-              <a14:hiddenFill xmlns:a14="http://schemas.microsoft.com/office/drawing/2010/main" xmlns="">
+              <a14:hiddenFill xmlns="" xmlns:a14="http://schemas.microsoft.com/office/drawing/2010/main">
                 <a:solidFill>
                   <a:srgbClr val="FFFFFF"/>
                 </a:solidFill>
@@ -669,7 +670,7 @@
             </a:ln>
             <a:extLst>
               <a:ext uri="{91240B29-F687-4f45-9708-019B960494DF}">
-                <a14:hiddenLine xmlns:a14="http://schemas.microsoft.com/office/drawing/2010/main" xmlns="" w="9525">
+                <a14:hiddenLine xmlns="" xmlns:a14="http://schemas.microsoft.com/office/drawing/2010/main" w="9525">
                   <a:solidFill>
                     <a:srgbClr val="000000"/>
                   </a:solidFill>
@@ -759,7 +760,7 @@
             </a:ln>
             <a:extLst>
               <a:ext uri="{91240B29-F687-4f45-9708-019B960494DF}">
-                <a14:hiddenLine xmlns:a14="http://schemas.microsoft.com/office/drawing/2010/main" xmlns="" w="9525">
+                <a14:hiddenLine xmlns="" xmlns:a14="http://schemas.microsoft.com/office/drawing/2010/main" w="9525">
                   <a:solidFill>
                     <a:srgbClr val="000000"/>
                   </a:solidFill>
@@ -849,7 +850,7 @@
             </a:ln>
             <a:extLst>
               <a:ext uri="{91240B29-F687-4f45-9708-019B960494DF}">
-                <a14:hiddenLine xmlns:a14="http://schemas.microsoft.com/office/drawing/2010/main" xmlns="" w="9525">
+                <a14:hiddenLine xmlns="" xmlns:a14="http://schemas.microsoft.com/office/drawing/2010/main" w="9525">
                   <a:solidFill>
                     <a:srgbClr val="000000"/>
                   </a:solidFill>
@@ -883,7 +884,7 @@
             </a:ln>
             <a:extLst>
               <a:ext uri="{91240B29-F687-4f45-9708-019B960494DF}">
-                <a14:hiddenLine xmlns:a14="http://schemas.microsoft.com/office/drawing/2010/main" xmlns="" w="9525">
+                <a14:hiddenLine xmlns="" xmlns:a14="http://schemas.microsoft.com/office/drawing/2010/main" w="9525">
                   <a:solidFill>
                     <a:srgbClr val="000000"/>
                   </a:solidFill>
@@ -973,7 +974,7 @@
             </a:ln>
             <a:extLst>
               <a:ext uri="{91240B29-F687-4f45-9708-019B960494DF}">
-                <a14:hiddenLine xmlns:a14="http://schemas.microsoft.com/office/drawing/2010/main" xmlns="" w="9525">
+                <a14:hiddenLine xmlns="" xmlns:a14="http://schemas.microsoft.com/office/drawing/2010/main" w="9525">
                   <a:solidFill>
                     <a:srgbClr val="000000"/>
                   </a:solidFill>
@@ -1035,7 +1036,7 @@
             </a:ln>
             <a:extLst>
               <a:ext uri="{91240B29-F687-4f45-9708-019B960494DF}">
-                <a14:hiddenLine xmlns:a14="http://schemas.microsoft.com/office/drawing/2010/main" xmlns="" w="9525">
+                <a14:hiddenLine xmlns="" xmlns:a14="http://schemas.microsoft.com/office/drawing/2010/main" w="9525">
                   <a:solidFill>
                     <a:srgbClr val="000000"/>
                   </a:solidFill>
@@ -1097,7 +1098,7 @@
             </a:ln>
             <a:extLst>
               <a:ext uri="{91240B29-F687-4f45-9708-019B960494DF}">
-                <a14:hiddenLine xmlns:a14="http://schemas.microsoft.com/office/drawing/2010/main" xmlns="" w="9525">
+                <a14:hiddenLine xmlns="" xmlns:a14="http://schemas.microsoft.com/office/drawing/2010/main" w="9525">
                   <a:solidFill>
                     <a:srgbClr val="000000"/>
                   </a:solidFill>
@@ -1187,7 +1188,7 @@
             </a:ln>
             <a:extLst>
               <a:ext uri="{91240B29-F687-4f45-9708-019B960494DF}">
-                <a14:hiddenLine xmlns:a14="http://schemas.microsoft.com/office/drawing/2010/main" xmlns="" w="9525">
+                <a14:hiddenLine xmlns="" xmlns:a14="http://schemas.microsoft.com/office/drawing/2010/main" w="9525">
                   <a:solidFill>
                     <a:srgbClr val="000000"/>
                   </a:solidFill>
@@ -1249,7 +1250,7 @@
             </a:ln>
             <a:extLst>
               <a:ext uri="{91240B29-F687-4f45-9708-019B960494DF}">
-                <a14:hiddenLine xmlns:a14="http://schemas.microsoft.com/office/drawing/2010/main" xmlns="" w="9525">
+                <a14:hiddenLine xmlns="" xmlns:a14="http://schemas.microsoft.com/office/drawing/2010/main" w="9525">
                   <a:solidFill>
                     <a:srgbClr val="000000"/>
                   </a:solidFill>
@@ -1311,7 +1312,7 @@
             </a:ln>
             <a:extLst>
               <a:ext uri="{91240B29-F687-4f45-9708-019B960494DF}">
-                <a14:hiddenLine xmlns:a14="http://schemas.microsoft.com/office/drawing/2010/main" xmlns="" w="9525">
+                <a14:hiddenLine xmlns="" xmlns:a14="http://schemas.microsoft.com/office/drawing/2010/main" w="9525">
                   <a:solidFill>
                     <a:srgbClr val="000000"/>
                   </a:solidFill>
@@ -1401,7 +1402,7 @@
             </a:ln>
             <a:extLst>
               <a:ext uri="{91240B29-F687-4f45-9708-019B960494DF}">
-                <a14:hiddenLine xmlns:a14="http://schemas.microsoft.com/office/drawing/2010/main" xmlns="" w="9525">
+                <a14:hiddenLine xmlns="" xmlns:a14="http://schemas.microsoft.com/office/drawing/2010/main" w="9525">
                   <a:solidFill>
                     <a:srgbClr val="000000"/>
                   </a:solidFill>
@@ -1491,7 +1492,7 @@
             </a:ln>
             <a:extLst>
               <a:ext uri="{91240B29-F687-4f45-9708-019B960494DF}">
-                <a14:hiddenLine xmlns:a14="http://schemas.microsoft.com/office/drawing/2010/main" xmlns="" w="9525">
+                <a14:hiddenLine xmlns="" xmlns:a14="http://schemas.microsoft.com/office/drawing/2010/main" w="9525">
                   <a:solidFill>
                     <a:srgbClr val="000000"/>
                   </a:solidFill>
@@ -1553,7 +1554,7 @@
             </a:ln>
             <a:extLst>
               <a:ext uri="{91240B29-F687-4f45-9708-019B960494DF}">
-                <a14:hiddenLine xmlns:a14="http://schemas.microsoft.com/office/drawing/2010/main" xmlns="" w="9525">
+                <a14:hiddenLine xmlns="" xmlns:a14="http://schemas.microsoft.com/office/drawing/2010/main" w="9525">
                   <a:solidFill>
                     <a:srgbClr val="000000"/>
                   </a:solidFill>
@@ -1663,7 +1664,7 @@
             </a:ln>
             <a:extLst>
               <a:ext uri="{91240B29-F687-4f45-9708-019B960494DF}">
-                <a14:hiddenLine xmlns:a14="http://schemas.microsoft.com/office/drawing/2010/main" xmlns="" w="9525">
+                <a14:hiddenLine xmlns="" xmlns:a14="http://schemas.microsoft.com/office/drawing/2010/main" w="9525">
                   <a:solidFill>
                     <a:srgbClr val="000000"/>
                   </a:solidFill>
@@ -1725,7 +1726,7 @@
             </a:ln>
             <a:extLst>
               <a:ext uri="{91240B29-F687-4f45-9708-019B960494DF}">
-                <a14:hiddenLine xmlns:a14="http://schemas.microsoft.com/office/drawing/2010/main" xmlns="" w="9525">
+                <a14:hiddenLine xmlns="" xmlns:a14="http://schemas.microsoft.com/office/drawing/2010/main" w="9525">
                   <a:solidFill>
                     <a:srgbClr val="000000"/>
                   </a:solidFill>
@@ -1815,7 +1816,7 @@
             </a:ln>
             <a:extLst>
               <a:ext uri="{91240B29-F687-4f45-9708-019B960494DF}">
-                <a14:hiddenLine xmlns:a14="http://schemas.microsoft.com/office/drawing/2010/main" xmlns="" w="9525">
+                <a14:hiddenLine xmlns="" xmlns:a14="http://schemas.microsoft.com/office/drawing/2010/main" w="9525">
                   <a:solidFill>
                     <a:srgbClr val="000000"/>
                   </a:solidFill>
@@ -1905,7 +1906,7 @@
             </a:ln>
             <a:extLst>
               <a:ext uri="{91240B29-F687-4f45-9708-019B960494DF}">
-                <a14:hiddenLine xmlns:a14="http://schemas.microsoft.com/office/drawing/2010/main" xmlns="" w="9525">
+                <a14:hiddenLine xmlns="" xmlns:a14="http://schemas.microsoft.com/office/drawing/2010/main" w="9525">
                   <a:solidFill>
                     <a:srgbClr val="000000"/>
                   </a:solidFill>
@@ -1967,7 +1968,7 @@
             </a:ln>
             <a:extLst>
               <a:ext uri="{91240B29-F687-4f45-9708-019B960494DF}">
-                <a14:hiddenLine xmlns:a14="http://schemas.microsoft.com/office/drawing/2010/main" xmlns="" w="9525">
+                <a14:hiddenLine xmlns="" xmlns:a14="http://schemas.microsoft.com/office/drawing/2010/main" w="9525">
                   <a:solidFill>
                     <a:srgbClr val="000000"/>
                   </a:solidFill>
@@ -2057,7 +2058,7 @@
             </a:ln>
             <a:extLst>
               <a:ext uri="{91240B29-F687-4f45-9708-019B960494DF}">
-                <a14:hiddenLine xmlns:a14="http://schemas.microsoft.com/office/drawing/2010/main" xmlns="" w="9525">
+                <a14:hiddenLine xmlns="" xmlns:a14="http://schemas.microsoft.com/office/drawing/2010/main" w="9525">
                   <a:solidFill>
                     <a:srgbClr val="000000"/>
                   </a:solidFill>
@@ -2147,7 +2148,7 @@
             </a:ln>
             <a:extLst>
               <a:ext uri="{91240B29-F687-4f45-9708-019B960494DF}">
-                <a14:hiddenLine xmlns:a14="http://schemas.microsoft.com/office/drawing/2010/main" xmlns="" w="9525">
+                <a14:hiddenLine xmlns="" xmlns:a14="http://schemas.microsoft.com/office/drawing/2010/main" w="9525">
                   <a:solidFill>
                     <a:srgbClr val="000000"/>
                   </a:solidFill>
@@ -2203,7 +2204,7 @@
             </a:ln>
             <a:extLst>
               <a:ext uri="{91240B29-F687-4f45-9708-019B960494DF}">
-                <a14:hiddenLine xmlns:a14="http://schemas.microsoft.com/office/drawing/2010/main" xmlns="" w="9525">
+                <a14:hiddenLine xmlns="" xmlns:a14="http://schemas.microsoft.com/office/drawing/2010/main" w="9525">
                   <a:solidFill>
                     <a:srgbClr val="000000"/>
                   </a:solidFill>
@@ -2293,7 +2294,7 @@
             </a:ln>
             <a:extLst>
               <a:ext uri="{91240B29-F687-4f45-9708-019B960494DF}">
-                <a14:hiddenLine xmlns:a14="http://schemas.microsoft.com/office/drawing/2010/main" xmlns="" w="9525">
+                <a14:hiddenLine xmlns="" xmlns:a14="http://schemas.microsoft.com/office/drawing/2010/main" w="9525">
                   <a:solidFill>
                     <a:srgbClr val="000000"/>
                   </a:solidFill>
@@ -2349,7 +2350,7 @@
             </a:ln>
             <a:extLst>
               <a:ext uri="{91240B29-F687-4f45-9708-019B960494DF}">
-                <a14:hiddenLine xmlns:a14="http://schemas.microsoft.com/office/drawing/2010/main" xmlns="" w="9525">
+                <a14:hiddenLine xmlns="" xmlns:a14="http://schemas.microsoft.com/office/drawing/2010/main" w="9525">
                   <a:solidFill>
                     <a:srgbClr val="000000"/>
                   </a:solidFill>
@@ -2439,7 +2440,7 @@
             </a:ln>
             <a:extLst>
               <a:ext uri="{91240B29-F687-4f45-9708-019B960494DF}">
-                <a14:hiddenLine xmlns:a14="http://schemas.microsoft.com/office/drawing/2010/main" xmlns="" w="9525">
+                <a14:hiddenLine xmlns="" xmlns:a14="http://schemas.microsoft.com/office/drawing/2010/main" w="9525">
                   <a:solidFill>
                     <a:srgbClr val="000000"/>
                   </a:solidFill>
@@ -2507,7 +2508,7 @@
             </a:ln>
             <a:extLst>
               <a:ext uri="{91240B29-F687-4f45-9708-019B960494DF}">
-                <a14:hiddenLine xmlns:a14="http://schemas.microsoft.com/office/drawing/2010/main" xmlns="" w="9525">
+                <a14:hiddenLine xmlns="" xmlns:a14="http://schemas.microsoft.com/office/drawing/2010/main" w="9525">
                   <a:solidFill>
                     <a:srgbClr val="000000"/>
                   </a:solidFill>
@@ -2597,7 +2598,7 @@
             </a:ln>
             <a:extLst>
               <a:ext uri="{91240B29-F687-4f45-9708-019B960494DF}">
-                <a14:hiddenLine xmlns:a14="http://schemas.microsoft.com/office/drawing/2010/main" xmlns="" w="9525">
+                <a14:hiddenLine xmlns="" xmlns:a14="http://schemas.microsoft.com/office/drawing/2010/main" w="9525">
                   <a:solidFill>
                     <a:srgbClr val="000000"/>
                   </a:solidFill>
@@ -2665,7 +2666,7 @@
             </a:ln>
             <a:extLst>
               <a:ext uri="{91240B29-F687-4f45-9708-019B960494DF}">
-                <a14:hiddenLine xmlns:a14="http://schemas.microsoft.com/office/drawing/2010/main" xmlns="" w="9525">
+                <a14:hiddenLine xmlns="" xmlns:a14="http://schemas.microsoft.com/office/drawing/2010/main" w="9525">
                   <a:solidFill>
                     <a:srgbClr val="000000"/>
                   </a:solidFill>
@@ -2755,7 +2756,7 @@
             </a:ln>
             <a:extLst>
               <a:ext uri="{91240B29-F687-4f45-9708-019B960494DF}">
-                <a14:hiddenLine xmlns:a14="http://schemas.microsoft.com/office/drawing/2010/main" xmlns="" w="9525">
+                <a14:hiddenLine xmlns="" xmlns:a14="http://schemas.microsoft.com/office/drawing/2010/main" w="9525">
                   <a:solidFill>
                     <a:srgbClr val="000000"/>
                   </a:solidFill>
@@ -2789,7 +2790,7 @@
             </a:ln>
             <a:extLst>
               <a:ext uri="{91240B29-F687-4f45-9708-019B960494DF}">
-                <a14:hiddenLine xmlns:a14="http://schemas.microsoft.com/office/drawing/2010/main" xmlns="" w="9525">
+                <a14:hiddenLine xmlns="" xmlns:a14="http://schemas.microsoft.com/office/drawing/2010/main" w="9525">
                   <a:solidFill>
                     <a:srgbClr val="000000"/>
                   </a:solidFill>
@@ -2879,7 +2880,7 @@
             </a:ln>
             <a:extLst>
               <a:ext uri="{91240B29-F687-4f45-9708-019B960494DF}">
-                <a14:hiddenLine xmlns:a14="http://schemas.microsoft.com/office/drawing/2010/main" xmlns="" w="9525">
+                <a14:hiddenLine xmlns="" xmlns:a14="http://schemas.microsoft.com/office/drawing/2010/main" w="9525">
                   <a:solidFill>
                     <a:srgbClr val="000000"/>
                   </a:solidFill>
@@ -2941,7 +2942,7 @@
             </a:ln>
             <a:extLst>
               <a:ext uri="{91240B29-F687-4f45-9708-019B960494DF}">
-                <a14:hiddenLine xmlns:a14="http://schemas.microsoft.com/office/drawing/2010/main" xmlns="" w="9525">
+                <a14:hiddenLine xmlns="" xmlns:a14="http://schemas.microsoft.com/office/drawing/2010/main" w="9525">
                   <a:solidFill>
                     <a:srgbClr val="000000"/>
                   </a:solidFill>
@@ -3003,7 +3004,7 @@
             </a:ln>
             <a:extLst>
               <a:ext uri="{91240B29-F687-4f45-9708-019B960494DF}">
-                <a14:hiddenLine xmlns:a14="http://schemas.microsoft.com/office/drawing/2010/main" xmlns="" w="9525">
+                <a14:hiddenLine xmlns="" xmlns:a14="http://schemas.microsoft.com/office/drawing/2010/main" w="9525">
                   <a:solidFill>
                     <a:srgbClr val="000000"/>
                   </a:solidFill>
@@ -3093,7 +3094,7 @@
             </a:ln>
             <a:extLst>
               <a:ext uri="{91240B29-F687-4f45-9708-019B960494DF}">
-                <a14:hiddenLine xmlns:a14="http://schemas.microsoft.com/office/drawing/2010/main" xmlns="" w="9525">
+                <a14:hiddenLine xmlns="" xmlns:a14="http://schemas.microsoft.com/office/drawing/2010/main" w="9525">
                   <a:solidFill>
                     <a:srgbClr val="000000"/>
                   </a:solidFill>
@@ -3161,7 +3162,7 @@
             </a:ln>
             <a:extLst>
               <a:ext uri="{91240B29-F687-4f45-9708-019B960494DF}">
-                <a14:hiddenLine xmlns:a14="http://schemas.microsoft.com/office/drawing/2010/main" xmlns="" w="9525">
+                <a14:hiddenLine xmlns="" xmlns:a14="http://schemas.microsoft.com/office/drawing/2010/main" w="9525">
                   <a:solidFill>
                     <a:srgbClr val="000000"/>
                   </a:solidFill>
@@ -3223,7 +3224,7 @@
             </a:ln>
             <a:extLst>
               <a:ext uri="{91240B29-F687-4f45-9708-019B960494DF}">
-                <a14:hiddenLine xmlns:a14="http://schemas.microsoft.com/office/drawing/2010/main" xmlns="" w="9525">
+                <a14:hiddenLine xmlns="" xmlns:a14="http://schemas.microsoft.com/office/drawing/2010/main" w="9525">
                   <a:solidFill>
                     <a:srgbClr val="000000"/>
                   </a:solidFill>
@@ -3313,7 +3314,7 @@
             </a:ln>
             <a:extLst>
               <a:ext uri="{91240B29-F687-4f45-9708-019B960494DF}">
-                <a14:hiddenLine xmlns:a14="http://schemas.microsoft.com/office/drawing/2010/main" xmlns="" w="9525">
+                <a14:hiddenLine xmlns="" xmlns:a14="http://schemas.microsoft.com/office/drawing/2010/main" w="9525">
                   <a:solidFill>
                     <a:srgbClr val="000000"/>
                   </a:solidFill>
@@ -3375,7 +3376,7 @@
             </a:ln>
             <a:extLst>
               <a:ext uri="{91240B29-F687-4f45-9708-019B960494DF}">
-                <a14:hiddenLine xmlns:a14="http://schemas.microsoft.com/office/drawing/2010/main" xmlns="" w="9525">
+                <a14:hiddenLine xmlns="" xmlns:a14="http://schemas.microsoft.com/office/drawing/2010/main" w="9525">
                   <a:solidFill>
                     <a:srgbClr val="000000"/>
                   </a:solidFill>
@@ -3465,7 +3466,7 @@
             </a:ln>
             <a:extLst>
               <a:ext uri="{91240B29-F687-4f45-9708-019B960494DF}">
-                <a14:hiddenLine xmlns:a14="http://schemas.microsoft.com/office/drawing/2010/main" xmlns="" w="9525">
+                <a14:hiddenLine xmlns="" xmlns:a14="http://schemas.microsoft.com/office/drawing/2010/main" w="9525">
                   <a:solidFill>
                     <a:srgbClr val="000000"/>
                   </a:solidFill>
@@ -3527,7 +3528,7 @@
             </a:ln>
             <a:extLst>
               <a:ext uri="{91240B29-F687-4f45-9708-019B960494DF}">
-                <a14:hiddenLine xmlns:a14="http://schemas.microsoft.com/office/drawing/2010/main" xmlns="" w="9525">
+                <a14:hiddenLine xmlns="" xmlns:a14="http://schemas.microsoft.com/office/drawing/2010/main" w="9525">
                   <a:solidFill>
                     <a:srgbClr val="000000"/>
                   </a:solidFill>
@@ -3617,7 +3618,7 @@
             </a:ln>
             <a:extLst>
               <a:ext uri="{91240B29-F687-4f45-9708-019B960494DF}">
-                <a14:hiddenLine xmlns:a14="http://schemas.microsoft.com/office/drawing/2010/main" xmlns="" w="9525">
+                <a14:hiddenLine xmlns="" xmlns:a14="http://schemas.microsoft.com/office/drawing/2010/main" w="9525">
                   <a:solidFill>
                     <a:srgbClr val="000000"/>
                   </a:solidFill>
@@ -3651,7 +3652,7 @@
             </a:ln>
             <a:extLst>
               <a:ext uri="{91240B29-F687-4f45-9708-019B960494DF}">
-                <a14:hiddenLine xmlns:a14="http://schemas.microsoft.com/office/drawing/2010/main" xmlns="" w="9525">
+                <a14:hiddenLine xmlns="" xmlns:a14="http://schemas.microsoft.com/office/drawing/2010/main" w="9525">
                   <a:solidFill>
                     <a:srgbClr val="000000"/>
                   </a:solidFill>
@@ -3716,7 +3717,7 @@
             </a:ln>
             <a:extLst>
               <a:ext uri="{91240B29-F687-4f45-9708-019B960494DF}">
-                <a14:hiddenLine xmlns:a14="http://schemas.microsoft.com/office/drawing/2010/main" xmlns="" w="9525">
+                <a14:hiddenLine xmlns="" xmlns:a14="http://schemas.microsoft.com/office/drawing/2010/main" w="9525">
                   <a:solidFill>
                     <a:srgbClr val="000000"/>
                   </a:solidFill>
@@ -3806,7 +3807,7 @@
             </a:ln>
             <a:extLst>
               <a:ext uri="{91240B29-F687-4f45-9708-019B960494DF}">
-                <a14:hiddenLine xmlns:a14="http://schemas.microsoft.com/office/drawing/2010/main" xmlns="" w="9525">
+                <a14:hiddenLine xmlns="" xmlns:a14="http://schemas.microsoft.com/office/drawing/2010/main" w="9525">
                   <a:solidFill>
                     <a:srgbClr val="000000"/>
                   </a:solidFill>
@@ -3868,7 +3869,7 @@
             </a:ln>
             <a:extLst>
               <a:ext uri="{91240B29-F687-4f45-9708-019B960494DF}">
-                <a14:hiddenLine xmlns:a14="http://schemas.microsoft.com/office/drawing/2010/main" xmlns="" w="9525">
+                <a14:hiddenLine xmlns="" xmlns:a14="http://schemas.microsoft.com/office/drawing/2010/main" w="9525">
                   <a:solidFill>
                     <a:srgbClr val="000000"/>
                   </a:solidFill>
@@ -3958,7 +3959,7 @@
             </a:ln>
             <a:extLst>
               <a:ext uri="{91240B29-F687-4f45-9708-019B960494DF}">
-                <a14:hiddenLine xmlns:a14="http://schemas.microsoft.com/office/drawing/2010/main" xmlns="" w="9525">
+                <a14:hiddenLine xmlns="" xmlns:a14="http://schemas.microsoft.com/office/drawing/2010/main" w="9525">
                   <a:solidFill>
                     <a:srgbClr val="000000"/>
                   </a:solidFill>
@@ -4048,7 +4049,7 @@
             </a:ln>
             <a:extLst>
               <a:ext uri="{91240B29-F687-4f45-9708-019B960494DF}">
-                <a14:hiddenLine xmlns:a14="http://schemas.microsoft.com/office/drawing/2010/main" xmlns="" w="9525">
+                <a14:hiddenLine xmlns="" xmlns:a14="http://schemas.microsoft.com/office/drawing/2010/main" w="9525">
                   <a:solidFill>
                     <a:srgbClr val="000000"/>
                   </a:solidFill>
@@ -4113,7 +4114,7 @@
             </a:ln>
             <a:extLst>
               <a:ext uri="{91240B29-F687-4f45-9708-019B960494DF}">
-                <a14:hiddenLine xmlns:a14="http://schemas.microsoft.com/office/drawing/2010/main" xmlns="" w="9525">
+                <a14:hiddenLine xmlns="" xmlns:a14="http://schemas.microsoft.com/office/drawing/2010/main" w="9525">
                   <a:solidFill>
                     <a:srgbClr val="000000"/>
                   </a:solidFill>
@@ -4175,7 +4176,7 @@
             </a:ln>
             <a:extLst>
               <a:ext uri="{91240B29-F687-4f45-9708-019B960494DF}">
-                <a14:hiddenLine xmlns:a14="http://schemas.microsoft.com/office/drawing/2010/main" xmlns="" w="9525">
+                <a14:hiddenLine xmlns="" xmlns:a14="http://schemas.microsoft.com/office/drawing/2010/main" w="9525">
                   <a:solidFill>
                     <a:srgbClr val="000000"/>
                   </a:solidFill>
@@ -4265,7 +4266,7 @@
             </a:ln>
             <a:extLst>
               <a:ext uri="{91240B29-F687-4f45-9708-019B960494DF}">
-                <a14:hiddenLine xmlns:a14="http://schemas.microsoft.com/office/drawing/2010/main" xmlns="" w="9525">
+                <a14:hiddenLine xmlns="" xmlns:a14="http://schemas.microsoft.com/office/drawing/2010/main" w="9525">
                   <a:solidFill>
                     <a:srgbClr val="000000"/>
                   </a:solidFill>
@@ -4355,7 +4356,7 @@
             </a:ln>
             <a:extLst>
               <a:ext uri="{91240B29-F687-4f45-9708-019B960494DF}">
-                <a14:hiddenLine xmlns:a14="http://schemas.microsoft.com/office/drawing/2010/main" xmlns="" w="9525">
+                <a14:hiddenLine xmlns="" xmlns:a14="http://schemas.microsoft.com/office/drawing/2010/main" w="9525">
                   <a:solidFill>
                     <a:srgbClr val="000000"/>
                   </a:solidFill>
@@ -4417,7 +4418,7 @@
             </a:ln>
             <a:extLst>
               <a:ext uri="{91240B29-F687-4f45-9708-019B960494DF}">
-                <a14:hiddenLine xmlns:a14="http://schemas.microsoft.com/office/drawing/2010/main" xmlns="" w="9525">
+                <a14:hiddenLine xmlns="" xmlns:a14="http://schemas.microsoft.com/office/drawing/2010/main" w="9525">
                   <a:solidFill>
                     <a:srgbClr val="000000"/>
                   </a:solidFill>
@@ -4537,7 +4538,7 @@
             </a:ln>
             <a:extLst>
               <a:ext uri="{91240B29-F687-4f45-9708-019B960494DF}">
-                <a14:hiddenLine xmlns:a14="http://schemas.microsoft.com/office/drawing/2010/main" xmlns="" w="9525">
+                <a14:hiddenLine xmlns="" xmlns:a14="http://schemas.microsoft.com/office/drawing/2010/main" w="9525">
                   <a:solidFill>
                     <a:srgbClr val="000000"/>
                   </a:solidFill>
@@ -4605,7 +4606,7 @@
             </a:ln>
             <a:extLst>
               <a:ext uri="{91240B29-F687-4f45-9708-019B960494DF}">
-                <a14:hiddenLine xmlns:a14="http://schemas.microsoft.com/office/drawing/2010/main" xmlns="" w="9525">
+                <a14:hiddenLine xmlns="" xmlns:a14="http://schemas.microsoft.com/office/drawing/2010/main" w="9525">
                   <a:solidFill>
                     <a:srgbClr val="000000"/>
                   </a:solidFill>
@@ -4695,7 +4696,7 @@
             </a:ln>
             <a:extLst>
               <a:ext uri="{91240B29-F687-4f45-9708-019B960494DF}">
-                <a14:hiddenLine xmlns:a14="http://schemas.microsoft.com/office/drawing/2010/main" xmlns="" w="9525">
+                <a14:hiddenLine xmlns="" xmlns:a14="http://schemas.microsoft.com/office/drawing/2010/main" w="9525">
                   <a:solidFill>
                     <a:srgbClr val="000000"/>
                   </a:solidFill>
@@ -4835,7 +4836,7 @@
           <a:p>
             <a:fld id="{EC4347D3-4C9A-C240-8F14-750059DFEEB0}" type="datetimeFigureOut">
               <a:rPr lang="en-US" smtClean="0"/>
-              <a:t>9/7/23</a:t>
+              <a:t>9/12/23</a:t>
             </a:fld>
             <a:endParaRPr lang="en-US"/>
           </a:p>
@@ -5102,7 +5103,7 @@
           <a:p>
             <a:fld id="{EC4347D3-4C9A-C240-8F14-750059DFEEB0}" type="datetimeFigureOut">
               <a:rPr lang="en-US" smtClean="0"/>
-              <a:t>9/7/23</a:t>
+              <a:t>9/12/23</a:t>
             </a:fld>
             <a:endParaRPr lang="en-US"/>
           </a:p>
@@ -5298,7 +5299,7 @@
           <a:p>
             <a:fld id="{EC4347D3-4C9A-C240-8F14-750059DFEEB0}" type="datetimeFigureOut">
               <a:rPr lang="en-US" smtClean="0"/>
-              <a:t>9/7/23</a:t>
+              <a:t>9/12/23</a:t>
             </a:fld>
             <a:endParaRPr lang="en-US"/>
           </a:p>
@@ -5561,7 +5562,7 @@
           <a:p>
             <a:fld id="{EC4347D3-4C9A-C240-8F14-750059DFEEB0}" type="datetimeFigureOut">
               <a:rPr lang="en-US" smtClean="0"/>
-              <a:t>9/7/23</a:t>
+              <a:t>9/12/23</a:t>
             </a:fld>
             <a:endParaRPr lang="en-US"/>
           </a:p>
@@ -5995,7 +5996,7 @@
           <a:p>
             <a:fld id="{EC4347D3-4C9A-C240-8F14-750059DFEEB0}" type="datetimeFigureOut">
               <a:rPr lang="en-US" smtClean="0"/>
-              <a:t>9/7/23</a:t>
+              <a:t>9/12/23</a:t>
             </a:fld>
             <a:endParaRPr lang="en-US"/>
           </a:p>
@@ -6541,7 +6542,7 @@
           <a:p>
             <a:fld id="{EC4347D3-4C9A-C240-8F14-750059DFEEB0}" type="datetimeFigureOut">
               <a:rPr lang="en-US" smtClean="0"/>
-              <a:t>9/7/23</a:t>
+              <a:t>9/12/23</a:t>
             </a:fld>
             <a:endParaRPr lang="en-US"/>
           </a:p>
@@ -7261,7 +7262,7 @@
           <a:p>
             <a:fld id="{EC4347D3-4C9A-C240-8F14-750059DFEEB0}" type="datetimeFigureOut">
               <a:rPr lang="en-US" smtClean="0"/>
-              <a:t>9/7/23</a:t>
+              <a:t>9/12/23</a:t>
             </a:fld>
             <a:endParaRPr lang="en-US"/>
           </a:p>
@@ -7431,7 +7432,7 @@
           <a:p>
             <a:fld id="{EC4347D3-4C9A-C240-8F14-750059DFEEB0}" type="datetimeFigureOut">
               <a:rPr lang="en-US" smtClean="0"/>
-              <a:t>9/7/23</a:t>
+              <a:t>9/12/23</a:t>
             </a:fld>
             <a:endParaRPr lang="en-US"/>
           </a:p>
@@ -7611,7 +7612,7 @@
           <a:p>
             <a:fld id="{EC4347D3-4C9A-C240-8F14-750059DFEEB0}" type="datetimeFigureOut">
               <a:rPr lang="en-US" smtClean="0"/>
-              <a:t>9/7/23</a:t>
+              <a:t>9/12/23</a:t>
             </a:fld>
             <a:endParaRPr lang="en-US"/>
           </a:p>
@@ -7781,7 +7782,7 @@
           <a:p>
             <a:fld id="{EC4347D3-4C9A-C240-8F14-750059DFEEB0}" type="datetimeFigureOut">
               <a:rPr lang="en-US" smtClean="0"/>
-              <a:t>9/7/23</a:t>
+              <a:t>9/12/23</a:t>
             </a:fld>
             <a:endParaRPr lang="en-US"/>
           </a:p>
@@ -8031,7 +8032,7 @@
           <a:p>
             <a:fld id="{EC4347D3-4C9A-C240-8F14-750059DFEEB0}" type="datetimeFigureOut">
               <a:rPr lang="en-US" smtClean="0"/>
-              <a:t>9/7/23</a:t>
+              <a:t>9/12/23</a:t>
             </a:fld>
             <a:endParaRPr lang="en-US"/>
           </a:p>
@@ -8263,7 +8264,7 @@
           <a:p>
             <a:fld id="{EC4347D3-4C9A-C240-8F14-750059DFEEB0}" type="datetimeFigureOut">
               <a:rPr lang="en-US" smtClean="0"/>
-              <a:t>9/7/23</a:t>
+              <a:t>9/12/23</a:t>
             </a:fld>
             <a:endParaRPr lang="en-US"/>
           </a:p>
@@ -8649,7 +8650,7 @@
           <a:p>
             <a:fld id="{EC4347D3-4C9A-C240-8F14-750059DFEEB0}" type="datetimeFigureOut">
               <a:rPr lang="en-US" smtClean="0"/>
-              <a:t>9/7/23</a:t>
+              <a:t>9/12/23</a:t>
             </a:fld>
             <a:endParaRPr lang="en-US"/>
           </a:p>
@@ -8772,7 +8773,7 @@
           <a:p>
             <a:fld id="{EC4347D3-4C9A-C240-8F14-750059DFEEB0}" type="datetimeFigureOut">
               <a:rPr lang="en-US" smtClean="0"/>
-              <a:t>9/7/23</a:t>
+              <a:t>9/12/23</a:t>
             </a:fld>
             <a:endParaRPr lang="en-US"/>
           </a:p>
@@ -8867,7 +8868,7 @@
           <a:p>
             <a:fld id="{EC4347D3-4C9A-C240-8F14-750059DFEEB0}" type="datetimeFigureOut">
               <a:rPr lang="en-US" smtClean="0"/>
-              <a:t>9/7/23</a:t>
+              <a:t>9/12/23</a:t>
             </a:fld>
             <a:endParaRPr lang="en-US"/>
           </a:p>
@@ -9116,7 +9117,7 @@
           <a:p>
             <a:fld id="{EC4347D3-4C9A-C240-8F14-750059DFEEB0}" type="datetimeFigureOut">
               <a:rPr lang="en-US" smtClean="0"/>
-              <a:t>9/7/23</a:t>
+              <a:t>9/12/23</a:t>
             </a:fld>
             <a:endParaRPr lang="en-US"/>
           </a:p>
@@ -9401,7 +9402,7 @@
           <a:p>
             <a:fld id="{EC4347D3-4C9A-C240-8F14-750059DFEEB0}" type="datetimeFigureOut">
               <a:rPr lang="en-US" smtClean="0"/>
-              <a:t>9/7/23</a:t>
+              <a:t>9/12/23</a:t>
             </a:fld>
             <a:endParaRPr lang="en-US"/>
           </a:p>
@@ -9524,7 +9525,7 @@
           <a:noFill/>
           <a:extLst>
             <a:ext uri="{909E8E84-426E-40dd-AFC4-6F175D3DCCD1}">
-              <a14:hiddenFill xmlns:a14="http://schemas.microsoft.com/office/drawing/2010/main" xmlns="">
+              <a14:hiddenFill xmlns="" xmlns:a14="http://schemas.microsoft.com/office/drawing/2010/main">
                 <a:solidFill>
                   <a:srgbClr val="FFFFFF"/>
                 </a:solidFill>
@@ -9598,7 +9599,7 @@
               </a:ln>
               <a:extLst>
                 <a:ext uri="{91240B29-F687-4f45-9708-019B960494DF}">
-                  <a14:hiddenLine xmlns:a14="http://schemas.microsoft.com/office/drawing/2010/main" xmlns="" w="9525">
+                  <a14:hiddenLine xmlns="" xmlns:a14="http://schemas.microsoft.com/office/drawing/2010/main" w="9525">
                     <a:solidFill>
                       <a:srgbClr val="000000"/>
                     </a:solidFill>
@@ -9688,7 +9689,7 @@
               </a:ln>
               <a:extLst>
                 <a:ext uri="{91240B29-F687-4f45-9708-019B960494DF}">
-                  <a14:hiddenLine xmlns:a14="http://schemas.microsoft.com/office/drawing/2010/main" xmlns="" w="9525">
+                  <a14:hiddenLine xmlns="" xmlns:a14="http://schemas.microsoft.com/office/drawing/2010/main" w="9525">
                     <a:solidFill>
                       <a:srgbClr val="000000"/>
                     </a:solidFill>
@@ -9778,7 +9779,7 @@
               </a:ln>
               <a:extLst>
                 <a:ext uri="{91240B29-F687-4f45-9708-019B960494DF}">
-                  <a14:hiddenLine xmlns:a14="http://schemas.microsoft.com/office/drawing/2010/main" xmlns="" w="9525">
+                  <a14:hiddenLine xmlns="" xmlns:a14="http://schemas.microsoft.com/office/drawing/2010/main" w="9525">
                     <a:solidFill>
                       <a:srgbClr val="000000"/>
                     </a:solidFill>
@@ -9840,7 +9841,7 @@
               </a:ln>
               <a:extLst>
                 <a:ext uri="{91240B29-F687-4f45-9708-019B960494DF}">
-                  <a14:hiddenLine xmlns:a14="http://schemas.microsoft.com/office/drawing/2010/main" xmlns="" w="9525">
+                  <a14:hiddenLine xmlns="" xmlns:a14="http://schemas.microsoft.com/office/drawing/2010/main" w="9525">
                     <a:solidFill>
                       <a:srgbClr val="000000"/>
                     </a:solidFill>
@@ -9930,7 +9931,7 @@
               </a:ln>
               <a:extLst>
                 <a:ext uri="{91240B29-F687-4f45-9708-019B960494DF}">
-                  <a14:hiddenLine xmlns:a14="http://schemas.microsoft.com/office/drawing/2010/main" xmlns="" w="9525">
+                  <a14:hiddenLine xmlns="" xmlns:a14="http://schemas.microsoft.com/office/drawing/2010/main" w="9525">
                     <a:solidFill>
                       <a:srgbClr val="000000"/>
                     </a:solidFill>
@@ -9992,7 +9993,7 @@
               </a:ln>
               <a:extLst>
                 <a:ext uri="{91240B29-F687-4f45-9708-019B960494DF}">
-                  <a14:hiddenLine xmlns:a14="http://schemas.microsoft.com/office/drawing/2010/main" xmlns="" w="9525">
+                  <a14:hiddenLine xmlns="" xmlns:a14="http://schemas.microsoft.com/office/drawing/2010/main" w="9525">
                     <a:solidFill>
                       <a:srgbClr val="000000"/>
                     </a:solidFill>
@@ -10054,7 +10055,7 @@
               </a:ln>
               <a:extLst>
                 <a:ext uri="{91240B29-F687-4f45-9708-019B960494DF}">
-                  <a14:hiddenLine xmlns:a14="http://schemas.microsoft.com/office/drawing/2010/main" xmlns="" w="9525">
+                  <a14:hiddenLine xmlns="" xmlns:a14="http://schemas.microsoft.com/office/drawing/2010/main" w="9525">
                     <a:solidFill>
                       <a:srgbClr val="000000"/>
                     </a:solidFill>
@@ -10144,7 +10145,7 @@
               </a:ln>
               <a:extLst>
                 <a:ext uri="{91240B29-F687-4f45-9708-019B960494DF}">
-                  <a14:hiddenLine xmlns:a14="http://schemas.microsoft.com/office/drawing/2010/main" xmlns="" w="9525">
+                  <a14:hiddenLine xmlns="" xmlns:a14="http://schemas.microsoft.com/office/drawing/2010/main" w="9525">
                     <a:solidFill>
                       <a:srgbClr val="000000"/>
                     </a:solidFill>
@@ -10234,7 +10235,7 @@
               </a:ln>
               <a:extLst>
                 <a:ext uri="{91240B29-F687-4f45-9708-019B960494DF}">
-                  <a14:hiddenLine xmlns:a14="http://schemas.microsoft.com/office/drawing/2010/main" xmlns="" w="9525">
+                  <a14:hiddenLine xmlns="" xmlns:a14="http://schemas.microsoft.com/office/drawing/2010/main" w="9525">
                     <a:solidFill>
                       <a:srgbClr val="000000"/>
                     </a:solidFill>
@@ -10296,7 +10297,7 @@
               </a:ln>
               <a:extLst>
                 <a:ext uri="{91240B29-F687-4f45-9708-019B960494DF}">
-                  <a14:hiddenLine xmlns:a14="http://schemas.microsoft.com/office/drawing/2010/main" xmlns="" w="9525">
+                  <a14:hiddenLine xmlns="" xmlns:a14="http://schemas.microsoft.com/office/drawing/2010/main" w="9525">
                     <a:solidFill>
                       <a:srgbClr val="000000"/>
                     </a:solidFill>
@@ -10406,7 +10407,7 @@
               </a:ln>
               <a:extLst>
                 <a:ext uri="{91240B29-F687-4f45-9708-019B960494DF}">
-                  <a14:hiddenLine xmlns:a14="http://schemas.microsoft.com/office/drawing/2010/main" xmlns="" w="9525">
+                  <a14:hiddenLine xmlns="" xmlns:a14="http://schemas.microsoft.com/office/drawing/2010/main" w="9525">
                     <a:solidFill>
                       <a:srgbClr val="000000"/>
                     </a:solidFill>
@@ -10490,7 +10491,7 @@
               </a:ln>
               <a:extLst>
                 <a:ext uri="{91240B29-F687-4f45-9708-019B960494DF}">
-                  <a14:hiddenLine xmlns:a14="http://schemas.microsoft.com/office/drawing/2010/main" xmlns="" w="9525">
+                  <a14:hiddenLine xmlns="" xmlns:a14="http://schemas.microsoft.com/office/drawing/2010/main" w="9525">
                     <a:solidFill>
                       <a:srgbClr val="000000"/>
                     </a:solidFill>
@@ -10552,7 +10553,7 @@
               </a:ln>
               <a:extLst>
                 <a:ext uri="{91240B29-F687-4f45-9708-019B960494DF}">
-                  <a14:hiddenLine xmlns:a14="http://schemas.microsoft.com/office/drawing/2010/main" xmlns="" w="9525">
+                  <a14:hiddenLine xmlns="" xmlns:a14="http://schemas.microsoft.com/office/drawing/2010/main" w="9525">
                     <a:solidFill>
                       <a:srgbClr val="000000"/>
                     </a:solidFill>
@@ -10614,7 +10615,7 @@
               </a:ln>
               <a:extLst>
                 <a:ext uri="{91240B29-F687-4f45-9708-019B960494DF}">
-                  <a14:hiddenLine xmlns:a14="http://schemas.microsoft.com/office/drawing/2010/main" xmlns="" w="9525">
+                  <a14:hiddenLine xmlns="" xmlns:a14="http://schemas.microsoft.com/office/drawing/2010/main" w="9525">
                     <a:solidFill>
                       <a:srgbClr val="000000"/>
                     </a:solidFill>
@@ -10704,7 +10705,7 @@
               </a:ln>
               <a:extLst>
                 <a:ext uri="{91240B29-F687-4f45-9708-019B960494DF}">
-                  <a14:hiddenLine xmlns:a14="http://schemas.microsoft.com/office/drawing/2010/main" xmlns="" w="9525">
+                  <a14:hiddenLine xmlns="" xmlns:a14="http://schemas.microsoft.com/office/drawing/2010/main" w="9525">
                     <a:solidFill>
                       <a:srgbClr val="000000"/>
                     </a:solidFill>
@@ -10738,7 +10739,7 @@
               </a:ln>
               <a:extLst>
                 <a:ext uri="{91240B29-F687-4f45-9708-019B960494DF}">
-                  <a14:hiddenLine xmlns:a14="http://schemas.microsoft.com/office/drawing/2010/main" xmlns="" w="9525">
+                  <a14:hiddenLine xmlns="" xmlns:a14="http://schemas.microsoft.com/office/drawing/2010/main" w="9525">
                     <a:solidFill>
                       <a:srgbClr val="000000"/>
                     </a:solidFill>
@@ -10803,7 +10804,7 @@
               </a:ln>
               <a:extLst>
                 <a:ext uri="{91240B29-F687-4f45-9708-019B960494DF}">
-                  <a14:hiddenLine xmlns:a14="http://schemas.microsoft.com/office/drawing/2010/main" xmlns="" w="9525">
+                  <a14:hiddenLine xmlns="" xmlns:a14="http://schemas.microsoft.com/office/drawing/2010/main" w="9525">
                     <a:solidFill>
                       <a:srgbClr val="000000"/>
                     </a:solidFill>
@@ -10893,7 +10894,7 @@
               </a:ln>
               <a:extLst>
                 <a:ext uri="{91240B29-F687-4f45-9708-019B960494DF}">
-                  <a14:hiddenLine xmlns:a14="http://schemas.microsoft.com/office/drawing/2010/main" xmlns="" w="9525">
+                  <a14:hiddenLine xmlns="" xmlns:a14="http://schemas.microsoft.com/office/drawing/2010/main" w="9525">
                     <a:solidFill>
                       <a:srgbClr val="000000"/>
                     </a:solidFill>
@@ -10955,7 +10956,7 @@
               </a:ln>
               <a:extLst>
                 <a:ext uri="{91240B29-F687-4f45-9708-019B960494DF}">
-                  <a14:hiddenLine xmlns:a14="http://schemas.microsoft.com/office/drawing/2010/main" xmlns="" w="9525">
+                  <a14:hiddenLine xmlns="" xmlns:a14="http://schemas.microsoft.com/office/drawing/2010/main" w="9525">
                     <a:solidFill>
                       <a:srgbClr val="000000"/>
                     </a:solidFill>
@@ -11045,7 +11046,7 @@
               </a:ln>
               <a:extLst>
                 <a:ext uri="{91240B29-F687-4f45-9708-019B960494DF}">
-                  <a14:hiddenLine xmlns:a14="http://schemas.microsoft.com/office/drawing/2010/main" xmlns="" w="9525">
+                  <a14:hiddenLine xmlns="" xmlns:a14="http://schemas.microsoft.com/office/drawing/2010/main" w="9525">
                     <a:solidFill>
                       <a:srgbClr val="000000"/>
                     </a:solidFill>
@@ -11110,7 +11111,7 @@
               </a:ln>
               <a:extLst>
                 <a:ext uri="{91240B29-F687-4f45-9708-019B960494DF}">
-                  <a14:hiddenLine xmlns:a14="http://schemas.microsoft.com/office/drawing/2010/main" xmlns="" w="9525">
+                  <a14:hiddenLine xmlns="" xmlns:a14="http://schemas.microsoft.com/office/drawing/2010/main" w="9525">
                     <a:solidFill>
                       <a:srgbClr val="000000"/>
                     </a:solidFill>
@@ -11172,7 +11173,7 @@
               </a:ln>
               <a:extLst>
                 <a:ext uri="{91240B29-F687-4f45-9708-019B960494DF}">
-                  <a14:hiddenLine xmlns:a14="http://schemas.microsoft.com/office/drawing/2010/main" xmlns="" w="9525">
+                  <a14:hiddenLine xmlns="" xmlns:a14="http://schemas.microsoft.com/office/drawing/2010/main" w="9525">
                     <a:solidFill>
                       <a:srgbClr val="000000"/>
                     </a:solidFill>
@@ -11262,7 +11263,7 @@
               </a:ln>
               <a:extLst>
                 <a:ext uri="{91240B29-F687-4f45-9708-019B960494DF}">
-                  <a14:hiddenLine xmlns:a14="http://schemas.microsoft.com/office/drawing/2010/main" xmlns="" w="9525">
+                  <a14:hiddenLine xmlns="" xmlns:a14="http://schemas.microsoft.com/office/drawing/2010/main" w="9525">
                     <a:solidFill>
                       <a:srgbClr val="000000"/>
                     </a:solidFill>
@@ -11352,7 +11353,7 @@
               </a:ln>
               <a:extLst>
                 <a:ext uri="{91240B29-F687-4f45-9708-019B960494DF}">
-                  <a14:hiddenLine xmlns:a14="http://schemas.microsoft.com/office/drawing/2010/main" xmlns="" w="9525">
+                  <a14:hiddenLine xmlns="" xmlns:a14="http://schemas.microsoft.com/office/drawing/2010/main" w="9525">
                     <a:solidFill>
                       <a:srgbClr val="000000"/>
                     </a:solidFill>
@@ -11417,7 +11418,7 @@
               </a:ln>
               <a:extLst>
                 <a:ext uri="{91240B29-F687-4f45-9708-019B960494DF}">
-                  <a14:hiddenLine xmlns:a14="http://schemas.microsoft.com/office/drawing/2010/main" xmlns="" w="9525">
+                  <a14:hiddenLine xmlns="" xmlns:a14="http://schemas.microsoft.com/office/drawing/2010/main" w="9525">
                     <a:solidFill>
                       <a:srgbClr val="000000"/>
                     </a:solidFill>
@@ -11537,7 +11538,7 @@
               </a:ln>
               <a:extLst>
                 <a:ext uri="{91240B29-F687-4f45-9708-019B960494DF}">
-                  <a14:hiddenLine xmlns:a14="http://schemas.microsoft.com/office/drawing/2010/main" xmlns="" w="9525">
+                  <a14:hiddenLine xmlns="" xmlns:a14="http://schemas.microsoft.com/office/drawing/2010/main" w="9525">
                     <a:solidFill>
                       <a:srgbClr val="000000"/>
                     </a:solidFill>
@@ -11618,7 +11619,7 @@
               </a:ln>
               <a:extLst>
                 <a:ext uri="{91240B29-F687-4f45-9708-019B960494DF}">
-                  <a14:hiddenLine xmlns:a14="http://schemas.microsoft.com/office/drawing/2010/main" xmlns="" w="9525">
+                  <a14:hiddenLine xmlns="" xmlns:a14="http://schemas.microsoft.com/office/drawing/2010/main" w="9525">
                     <a:solidFill>
                       <a:srgbClr val="000000"/>
                     </a:solidFill>
@@ -11733,7 +11734,7 @@
               </a:ln>
               <a:extLst>
                 <a:ext uri="{91240B29-F687-4f45-9708-019B960494DF}">
-                  <a14:hiddenLine xmlns:a14="http://schemas.microsoft.com/office/drawing/2010/main" xmlns="" w="9525">
+                  <a14:hiddenLine xmlns="" xmlns:a14="http://schemas.microsoft.com/office/drawing/2010/main" w="9525">
                     <a:solidFill>
                       <a:srgbClr val="000000"/>
                     </a:solidFill>
@@ -11823,7 +11824,7 @@
               </a:ln>
               <a:extLst>
                 <a:ext uri="{91240B29-F687-4f45-9708-019B960494DF}">
-                  <a14:hiddenLine xmlns:a14="http://schemas.microsoft.com/office/drawing/2010/main" xmlns="" w="9525">
+                  <a14:hiddenLine xmlns="" xmlns:a14="http://schemas.microsoft.com/office/drawing/2010/main" w="9525">
                     <a:solidFill>
                       <a:srgbClr val="000000"/>
                     </a:solidFill>
@@ -11888,7 +11889,7 @@
               </a:ln>
               <a:extLst>
                 <a:ext uri="{91240B29-F687-4f45-9708-019B960494DF}">
-                  <a14:hiddenLine xmlns:a14="http://schemas.microsoft.com/office/drawing/2010/main" xmlns="" w="9525">
+                  <a14:hiddenLine xmlns="" xmlns:a14="http://schemas.microsoft.com/office/drawing/2010/main" w="9525">
                     <a:solidFill>
                       <a:srgbClr val="000000"/>
                     </a:solidFill>
@@ -11978,7 +11979,7 @@
               </a:ln>
               <a:extLst>
                 <a:ext uri="{91240B29-F687-4f45-9708-019B960494DF}">
-                  <a14:hiddenLine xmlns:a14="http://schemas.microsoft.com/office/drawing/2010/main" xmlns="" w="9525">
+                  <a14:hiddenLine xmlns="" xmlns:a14="http://schemas.microsoft.com/office/drawing/2010/main" w="9525">
                     <a:solidFill>
                       <a:srgbClr val="000000"/>
                     </a:solidFill>
@@ -12046,7 +12047,7 @@
               </a:ln>
               <a:extLst>
                 <a:ext uri="{91240B29-F687-4f45-9708-019B960494DF}">
-                  <a14:hiddenLine xmlns:a14="http://schemas.microsoft.com/office/drawing/2010/main" xmlns="" w="9525">
+                  <a14:hiddenLine xmlns="" xmlns:a14="http://schemas.microsoft.com/office/drawing/2010/main" w="9525">
                     <a:solidFill>
                       <a:srgbClr val="000000"/>
                     </a:solidFill>
@@ -12136,7 +12137,7 @@
               </a:ln>
               <a:extLst>
                 <a:ext uri="{91240B29-F687-4f45-9708-019B960494DF}">
-                  <a14:hiddenLine xmlns:a14="http://schemas.microsoft.com/office/drawing/2010/main" xmlns="" w="9525">
+                  <a14:hiddenLine xmlns="" xmlns:a14="http://schemas.microsoft.com/office/drawing/2010/main" w="9525">
                     <a:solidFill>
                       <a:srgbClr val="000000"/>
                     </a:solidFill>
@@ -12204,7 +12205,7 @@
               </a:ln>
               <a:extLst>
                 <a:ext uri="{91240B29-F687-4f45-9708-019B960494DF}">
-                  <a14:hiddenLine xmlns:a14="http://schemas.microsoft.com/office/drawing/2010/main" xmlns="" w="9525">
+                  <a14:hiddenLine xmlns="" xmlns:a14="http://schemas.microsoft.com/office/drawing/2010/main" w="9525">
                     <a:solidFill>
                       <a:srgbClr val="000000"/>
                     </a:solidFill>
@@ -12294,7 +12295,7 @@
               </a:ln>
               <a:extLst>
                 <a:ext uri="{91240B29-F687-4f45-9708-019B960494DF}">
-                  <a14:hiddenLine xmlns:a14="http://schemas.microsoft.com/office/drawing/2010/main" xmlns="" w="9525">
+                  <a14:hiddenLine xmlns="" xmlns:a14="http://schemas.microsoft.com/office/drawing/2010/main" w="9525">
                     <a:solidFill>
                       <a:srgbClr val="000000"/>
                     </a:solidFill>
@@ -12328,7 +12329,7 @@
               </a:ln>
               <a:extLst>
                 <a:ext uri="{91240B29-F687-4f45-9708-019B960494DF}">
-                  <a14:hiddenLine xmlns:a14="http://schemas.microsoft.com/office/drawing/2010/main" xmlns="" w="9525">
+                  <a14:hiddenLine xmlns="" xmlns:a14="http://schemas.microsoft.com/office/drawing/2010/main" w="9525">
                     <a:solidFill>
                       <a:srgbClr val="000000"/>
                     </a:solidFill>
@@ -12468,7 +12469,7 @@
           <a:p>
             <a:fld id="{EC4347D3-4C9A-C240-8F14-750059DFEEB0}" type="datetimeFigureOut">
               <a:rPr lang="en-US" smtClean="0"/>
-              <a:t>9/7/23</a:t>
+              <a:t>9/12/23</a:t>
             </a:fld>
             <a:endParaRPr lang="en-US"/>
           </a:p>
@@ -13867,6 +13868,166 @@
 </p:sld>
 </file>
 
+<file path=ppt/slides/slide7.xml><?xml version="1.0" encoding="utf-8"?>
+<p:sld xmlns:a="http://schemas.openxmlformats.org/drawingml/2006/main" xmlns:r="http://schemas.openxmlformats.org/officeDocument/2006/relationships" xmlns:p="http://schemas.openxmlformats.org/presentationml/2006/main">
+  <p:cSld>
+    <p:spTree>
+      <p:nvGrpSpPr>
+        <p:cNvPr id="1" name=""/>
+        <p:cNvGrpSpPr/>
+        <p:nvPr/>
+      </p:nvGrpSpPr>
+      <p:grpSpPr>
+        <a:xfrm>
+          <a:off x="0" y="0"/>
+          <a:ext cx="0" cy="0"/>
+          <a:chOff x="0" y="0"/>
+          <a:chExt cx="0" cy="0"/>
+        </a:xfrm>
+      </p:grpSpPr>
+      <p:sp>
+        <p:nvSpPr>
+          <p:cNvPr id="6146" name="Rectangle 2"/>
+          <p:cNvSpPr>
+            <a:spLocks noGrp="1" noChangeArrowheads="1"/>
+          </p:cNvSpPr>
+          <p:nvPr>
+            <p:ph type="title"/>
+            <p:custDataLst>
+              <p:tags r:id="rId1"/>
+            </p:custDataLst>
+          </p:nvPr>
+        </p:nvSpPr>
+        <p:spPr>
+          <a:xfrm>
+            <a:off x="1141413" y="284084"/>
+            <a:ext cx="9905998" cy="620791"/>
+          </a:xfrm>
+        </p:spPr>
+        <p:txBody>
+          <a:bodyPr/>
+          <a:lstStyle/>
+          <a:p>
+            <a:pPr algn="ctr"/>
+            <a:r>
+              <a:rPr lang="en-US" dirty="0"/>
+              <a:t>Lecture 7: TUE. Sep. 12</a:t>
+            </a:r>
+          </a:p>
+        </p:txBody>
+      </p:sp>
+      <p:sp>
+        <p:nvSpPr>
+          <p:cNvPr id="6147" name="Rectangle 3"/>
+          <p:cNvSpPr>
+            <a:spLocks noGrp="1" noChangeArrowheads="1"/>
+          </p:cNvSpPr>
+          <p:nvPr>
+            <p:ph idx="1"/>
+            <p:custDataLst>
+              <p:tags r:id="rId2"/>
+            </p:custDataLst>
+          </p:nvPr>
+        </p:nvSpPr>
+        <p:spPr>
+          <a:xfrm>
+            <a:off x="1141413" y="1123950"/>
+            <a:ext cx="9970724" cy="5149850"/>
+          </a:xfrm>
+        </p:spPr>
+        <p:txBody>
+          <a:bodyPr>
+            <a:normAutofit lnSpcReduction="10000"/>
+          </a:bodyPr>
+          <a:lstStyle/>
+          <a:p>
+            <a:r>
+              <a:rPr lang="en-US" dirty="0"/>
+              <a:t>DMT2 is </a:t>
+            </a:r>
+            <a:r>
+              <a:rPr lang="en-US" b="1" i="1" u="sng" dirty="0"/>
+              <a:t>going to be great</a:t>
+            </a:r>
+            <a:r>
+              <a:rPr lang="en-US" dirty="0"/>
+              <a:t>! Let’s learn a lot of stuff together!</a:t>
+            </a:r>
+          </a:p>
+          <a:p>
+            <a:r>
+              <a:rPr lang="en-US" dirty="0"/>
+              <a:t>First homework assignment is in! It is almost graded. Should have it back to you by Thursday.</a:t>
+            </a:r>
+          </a:p>
+          <a:p>
+            <a:r>
+              <a:rPr lang="en-US" dirty="0"/>
+              <a:t>HW 2 (set cardinality) is due next Thursday. You should be working on it right now.</a:t>
+            </a:r>
+          </a:p>
+          <a:p>
+            <a:r>
+              <a:rPr lang="en-US" dirty="0"/>
+              <a:t>Please submit extensions before the due date. You shouldn’t be requesting the extra time after the deadline has passed. This is supposed to be proactive. We *might* reject your extension request if you don’t submit it before the deadline.</a:t>
+            </a:r>
+          </a:p>
+          <a:p>
+            <a:r>
+              <a:rPr lang="en-US" dirty="0"/>
+              <a:t>Office hours going ok so far? Any issues</a:t>
+            </a:r>
+          </a:p>
+          <a:p>
+            <a:r>
+              <a:rPr lang="en-US" dirty="0"/>
+              <a:t>Today we continue with Regular languages and </a:t>
+            </a:r>
+            <a:r>
+              <a:rPr lang="en-US"/>
+              <a:t>introduce the NFA!</a:t>
+            </a:r>
+            <a:endParaRPr lang="en-US" dirty="0"/>
+          </a:p>
+        </p:txBody>
+      </p:sp>
+      <p:sp>
+        <p:nvSpPr>
+          <p:cNvPr id="4" name="Slide Number Placeholder 3"/>
+          <p:cNvSpPr>
+            <a:spLocks noGrp="1"/>
+          </p:cNvSpPr>
+          <p:nvPr>
+            <p:ph type="sldNum" sz="quarter" idx="12"/>
+          </p:nvPr>
+        </p:nvSpPr>
+        <p:spPr/>
+        <p:txBody>
+          <a:bodyPr/>
+          <a:lstStyle/>
+          <a:p>
+            <a:fld id="{F26D9103-0C5C-48AC-B68E-3ED2C1647047}" type="slidenum">
+              <a:rPr lang="en-US" smtClean="0"/>
+              <a:pPr/>
+              <a:t>7</a:t>
+            </a:fld>
+            <a:endParaRPr lang="en-US" dirty="0"/>
+          </a:p>
+        </p:txBody>
+      </p:sp>
+    </p:spTree>
+    <p:extLst>
+      <p:ext uri="{BB962C8B-B14F-4D97-AF65-F5344CB8AC3E}">
+        <p14:creationId xmlns:p14="http://schemas.microsoft.com/office/powerpoint/2010/main" val="656948532"/>
+      </p:ext>
+    </p:extLst>
+  </p:cSld>
+  <p:clrMapOvr>
+    <a:masterClrMapping/>
+  </p:clrMapOvr>
+</p:sld>
+</file>
+
 <file path=ppt/tags/tag1.xml><?xml version="1.0" encoding="utf-8"?>
 <p:tagLst xmlns:a="http://schemas.openxmlformats.org/drawingml/2006/main" xmlns:r="http://schemas.openxmlformats.org/officeDocument/2006/relationships" xmlns:p="http://schemas.openxmlformats.org/presentationml/2006/main">
   <p:tag name="_INSTRUCTOR VIEW19C14C36-AC8E-43BC-9DB6-C2AAF774C7DC|PANE__TAG" val="_"/>
@@ -13874,6 +14035,18 @@
 </file>
 
 <file path=ppt/tags/tag10.xml><?xml version="1.0" encoding="utf-8"?>
+<p:tagLst xmlns:a="http://schemas.openxmlformats.org/drawingml/2006/main" xmlns:r="http://schemas.openxmlformats.org/officeDocument/2006/relationships" xmlns:p="http://schemas.openxmlformats.org/presentationml/2006/main">
+  <p:tag name="_INSTRUCTOR VIEW19C14C36-AC8E-43BC-9DB6-C2AAF774C7DC|PANE__TAG" val="_"/>
+</p:tagLst>
+</file>
+
+<file path=ppt/tags/tag11.xml><?xml version="1.0" encoding="utf-8"?>
+<p:tagLst xmlns:a="http://schemas.openxmlformats.org/drawingml/2006/main" xmlns:r="http://schemas.openxmlformats.org/officeDocument/2006/relationships" xmlns:p="http://schemas.openxmlformats.org/presentationml/2006/main">
+  <p:tag name="_INSTRUCTOR VIEW19C14C36-AC8E-43BC-9DB6-C2AAF774C7DC|PANE__TAG" val="_"/>
+</p:tagLst>
+</file>
+
+<file path=ppt/tags/tag12.xml><?xml version="1.0" encoding="utf-8"?>
 <p:tagLst xmlns:a="http://schemas.openxmlformats.org/drawingml/2006/main" xmlns:r="http://schemas.openxmlformats.org/officeDocument/2006/relationships" xmlns:p="http://schemas.openxmlformats.org/presentationml/2006/main">
   <p:tag name="_INSTRUCTOR VIEW19C14C36-AC8E-43BC-9DB6-C2AAF774C7DC|PANE__TAG" val="_"/>
 </p:tagLst>

</xml_diff>

<commit_message>
daily announcements and some TM updates
</commit_message>
<xml_diff>
--- a/slides/00-DailyAnnouncements.pptx
+++ b/slides/00-DailyAnnouncements.pptx
@@ -5,7 +5,7 @@
     <p:sldMasterId id="2147484006" r:id="rId1"/>
   </p:sldMasterIdLst>
   <p:notesMasterIdLst>
-    <p:notesMasterId r:id="rId9"/>
+    <p:notesMasterId r:id="rId10"/>
   </p:notesMasterIdLst>
   <p:sldIdLst>
     <p:sldId id="256" r:id="rId2"/>
@@ -15,6 +15,7 @@
     <p:sldId id="508" r:id="rId6"/>
     <p:sldId id="509" r:id="rId7"/>
     <p:sldId id="510" r:id="rId8"/>
+    <p:sldId id="511" r:id="rId9"/>
   </p:sldIdLst>
   <p:sldSz cx="12192000" cy="6858000"/>
   <p:notesSz cx="6858000" cy="9144000"/>
@@ -203,7 +204,7 @@
           <a:p>
             <a:fld id="{C5B45307-6ED4-B142-BD64-10F739779302}" type="datetimeFigureOut">
               <a:rPr lang="en-US" smtClean="0"/>
-              <a:t>9/12/23</a:t>
+              <a:t>9/14/23</a:t>
             </a:fld>
             <a:endParaRPr lang="en-US"/>
           </a:p>
@@ -611,7 +612,7 @@
           <a:noFill/>
           <a:extLst>
             <a:ext uri="{909E8E84-426E-40dd-AFC4-6F175D3DCCD1}">
-              <a14:hiddenFill xmlns="" xmlns:a14="http://schemas.microsoft.com/office/drawing/2010/main">
+              <a14:hiddenFill xmlns:a14="http://schemas.microsoft.com/office/drawing/2010/main" xmlns="">
                 <a:solidFill>
                   <a:srgbClr val="FFFFFF"/>
                 </a:solidFill>
@@ -670,7 +671,7 @@
             </a:ln>
             <a:extLst>
               <a:ext uri="{91240B29-F687-4f45-9708-019B960494DF}">
-                <a14:hiddenLine xmlns="" xmlns:a14="http://schemas.microsoft.com/office/drawing/2010/main" w="9525">
+                <a14:hiddenLine xmlns:a14="http://schemas.microsoft.com/office/drawing/2010/main" xmlns="" w="9525">
                   <a:solidFill>
                     <a:srgbClr val="000000"/>
                   </a:solidFill>
@@ -760,7 +761,7 @@
             </a:ln>
             <a:extLst>
               <a:ext uri="{91240B29-F687-4f45-9708-019B960494DF}">
-                <a14:hiddenLine xmlns="" xmlns:a14="http://schemas.microsoft.com/office/drawing/2010/main" w="9525">
+                <a14:hiddenLine xmlns:a14="http://schemas.microsoft.com/office/drawing/2010/main" xmlns="" w="9525">
                   <a:solidFill>
                     <a:srgbClr val="000000"/>
                   </a:solidFill>
@@ -850,7 +851,7 @@
             </a:ln>
             <a:extLst>
               <a:ext uri="{91240B29-F687-4f45-9708-019B960494DF}">
-                <a14:hiddenLine xmlns="" xmlns:a14="http://schemas.microsoft.com/office/drawing/2010/main" w="9525">
+                <a14:hiddenLine xmlns:a14="http://schemas.microsoft.com/office/drawing/2010/main" xmlns="" w="9525">
                   <a:solidFill>
                     <a:srgbClr val="000000"/>
                   </a:solidFill>
@@ -884,7 +885,7 @@
             </a:ln>
             <a:extLst>
               <a:ext uri="{91240B29-F687-4f45-9708-019B960494DF}">
-                <a14:hiddenLine xmlns="" xmlns:a14="http://schemas.microsoft.com/office/drawing/2010/main" w="9525">
+                <a14:hiddenLine xmlns:a14="http://schemas.microsoft.com/office/drawing/2010/main" xmlns="" w="9525">
                   <a:solidFill>
                     <a:srgbClr val="000000"/>
                   </a:solidFill>
@@ -974,7 +975,7 @@
             </a:ln>
             <a:extLst>
               <a:ext uri="{91240B29-F687-4f45-9708-019B960494DF}">
-                <a14:hiddenLine xmlns="" xmlns:a14="http://schemas.microsoft.com/office/drawing/2010/main" w="9525">
+                <a14:hiddenLine xmlns:a14="http://schemas.microsoft.com/office/drawing/2010/main" xmlns="" w="9525">
                   <a:solidFill>
                     <a:srgbClr val="000000"/>
                   </a:solidFill>
@@ -1036,7 +1037,7 @@
             </a:ln>
             <a:extLst>
               <a:ext uri="{91240B29-F687-4f45-9708-019B960494DF}">
-                <a14:hiddenLine xmlns="" xmlns:a14="http://schemas.microsoft.com/office/drawing/2010/main" w="9525">
+                <a14:hiddenLine xmlns:a14="http://schemas.microsoft.com/office/drawing/2010/main" xmlns="" w="9525">
                   <a:solidFill>
                     <a:srgbClr val="000000"/>
                   </a:solidFill>
@@ -1098,7 +1099,7 @@
             </a:ln>
             <a:extLst>
               <a:ext uri="{91240B29-F687-4f45-9708-019B960494DF}">
-                <a14:hiddenLine xmlns="" xmlns:a14="http://schemas.microsoft.com/office/drawing/2010/main" w="9525">
+                <a14:hiddenLine xmlns:a14="http://schemas.microsoft.com/office/drawing/2010/main" xmlns="" w="9525">
                   <a:solidFill>
                     <a:srgbClr val="000000"/>
                   </a:solidFill>
@@ -1188,7 +1189,7 @@
             </a:ln>
             <a:extLst>
               <a:ext uri="{91240B29-F687-4f45-9708-019B960494DF}">
-                <a14:hiddenLine xmlns="" xmlns:a14="http://schemas.microsoft.com/office/drawing/2010/main" w="9525">
+                <a14:hiddenLine xmlns:a14="http://schemas.microsoft.com/office/drawing/2010/main" xmlns="" w="9525">
                   <a:solidFill>
                     <a:srgbClr val="000000"/>
                   </a:solidFill>
@@ -1250,7 +1251,7 @@
             </a:ln>
             <a:extLst>
               <a:ext uri="{91240B29-F687-4f45-9708-019B960494DF}">
-                <a14:hiddenLine xmlns="" xmlns:a14="http://schemas.microsoft.com/office/drawing/2010/main" w="9525">
+                <a14:hiddenLine xmlns:a14="http://schemas.microsoft.com/office/drawing/2010/main" xmlns="" w="9525">
                   <a:solidFill>
                     <a:srgbClr val="000000"/>
                   </a:solidFill>
@@ -1312,7 +1313,7 @@
             </a:ln>
             <a:extLst>
               <a:ext uri="{91240B29-F687-4f45-9708-019B960494DF}">
-                <a14:hiddenLine xmlns="" xmlns:a14="http://schemas.microsoft.com/office/drawing/2010/main" w="9525">
+                <a14:hiddenLine xmlns:a14="http://schemas.microsoft.com/office/drawing/2010/main" xmlns="" w="9525">
                   <a:solidFill>
                     <a:srgbClr val="000000"/>
                   </a:solidFill>
@@ -1402,7 +1403,7 @@
             </a:ln>
             <a:extLst>
               <a:ext uri="{91240B29-F687-4f45-9708-019B960494DF}">
-                <a14:hiddenLine xmlns="" xmlns:a14="http://schemas.microsoft.com/office/drawing/2010/main" w="9525">
+                <a14:hiddenLine xmlns:a14="http://schemas.microsoft.com/office/drawing/2010/main" xmlns="" w="9525">
                   <a:solidFill>
                     <a:srgbClr val="000000"/>
                   </a:solidFill>
@@ -1492,7 +1493,7 @@
             </a:ln>
             <a:extLst>
               <a:ext uri="{91240B29-F687-4f45-9708-019B960494DF}">
-                <a14:hiddenLine xmlns="" xmlns:a14="http://schemas.microsoft.com/office/drawing/2010/main" w="9525">
+                <a14:hiddenLine xmlns:a14="http://schemas.microsoft.com/office/drawing/2010/main" xmlns="" w="9525">
                   <a:solidFill>
                     <a:srgbClr val="000000"/>
                   </a:solidFill>
@@ -1554,7 +1555,7 @@
             </a:ln>
             <a:extLst>
               <a:ext uri="{91240B29-F687-4f45-9708-019B960494DF}">
-                <a14:hiddenLine xmlns="" xmlns:a14="http://schemas.microsoft.com/office/drawing/2010/main" w="9525">
+                <a14:hiddenLine xmlns:a14="http://schemas.microsoft.com/office/drawing/2010/main" xmlns="" w="9525">
                   <a:solidFill>
                     <a:srgbClr val="000000"/>
                   </a:solidFill>
@@ -1664,7 +1665,7 @@
             </a:ln>
             <a:extLst>
               <a:ext uri="{91240B29-F687-4f45-9708-019B960494DF}">
-                <a14:hiddenLine xmlns="" xmlns:a14="http://schemas.microsoft.com/office/drawing/2010/main" w="9525">
+                <a14:hiddenLine xmlns:a14="http://schemas.microsoft.com/office/drawing/2010/main" xmlns="" w="9525">
                   <a:solidFill>
                     <a:srgbClr val="000000"/>
                   </a:solidFill>
@@ -1726,7 +1727,7 @@
             </a:ln>
             <a:extLst>
               <a:ext uri="{91240B29-F687-4f45-9708-019B960494DF}">
-                <a14:hiddenLine xmlns="" xmlns:a14="http://schemas.microsoft.com/office/drawing/2010/main" w="9525">
+                <a14:hiddenLine xmlns:a14="http://schemas.microsoft.com/office/drawing/2010/main" xmlns="" w="9525">
                   <a:solidFill>
                     <a:srgbClr val="000000"/>
                   </a:solidFill>
@@ -1816,7 +1817,7 @@
             </a:ln>
             <a:extLst>
               <a:ext uri="{91240B29-F687-4f45-9708-019B960494DF}">
-                <a14:hiddenLine xmlns="" xmlns:a14="http://schemas.microsoft.com/office/drawing/2010/main" w="9525">
+                <a14:hiddenLine xmlns:a14="http://schemas.microsoft.com/office/drawing/2010/main" xmlns="" w="9525">
                   <a:solidFill>
                     <a:srgbClr val="000000"/>
                   </a:solidFill>
@@ -1906,7 +1907,7 @@
             </a:ln>
             <a:extLst>
               <a:ext uri="{91240B29-F687-4f45-9708-019B960494DF}">
-                <a14:hiddenLine xmlns="" xmlns:a14="http://schemas.microsoft.com/office/drawing/2010/main" w="9525">
+                <a14:hiddenLine xmlns:a14="http://schemas.microsoft.com/office/drawing/2010/main" xmlns="" w="9525">
                   <a:solidFill>
                     <a:srgbClr val="000000"/>
                   </a:solidFill>
@@ -1968,7 +1969,7 @@
             </a:ln>
             <a:extLst>
               <a:ext uri="{91240B29-F687-4f45-9708-019B960494DF}">
-                <a14:hiddenLine xmlns="" xmlns:a14="http://schemas.microsoft.com/office/drawing/2010/main" w="9525">
+                <a14:hiddenLine xmlns:a14="http://schemas.microsoft.com/office/drawing/2010/main" xmlns="" w="9525">
                   <a:solidFill>
                     <a:srgbClr val="000000"/>
                   </a:solidFill>
@@ -2058,7 +2059,7 @@
             </a:ln>
             <a:extLst>
               <a:ext uri="{91240B29-F687-4f45-9708-019B960494DF}">
-                <a14:hiddenLine xmlns="" xmlns:a14="http://schemas.microsoft.com/office/drawing/2010/main" w="9525">
+                <a14:hiddenLine xmlns:a14="http://schemas.microsoft.com/office/drawing/2010/main" xmlns="" w="9525">
                   <a:solidFill>
                     <a:srgbClr val="000000"/>
                   </a:solidFill>
@@ -2148,7 +2149,7 @@
             </a:ln>
             <a:extLst>
               <a:ext uri="{91240B29-F687-4f45-9708-019B960494DF}">
-                <a14:hiddenLine xmlns="" xmlns:a14="http://schemas.microsoft.com/office/drawing/2010/main" w="9525">
+                <a14:hiddenLine xmlns:a14="http://schemas.microsoft.com/office/drawing/2010/main" xmlns="" w="9525">
                   <a:solidFill>
                     <a:srgbClr val="000000"/>
                   </a:solidFill>
@@ -2204,7 +2205,7 @@
             </a:ln>
             <a:extLst>
               <a:ext uri="{91240B29-F687-4f45-9708-019B960494DF}">
-                <a14:hiddenLine xmlns="" xmlns:a14="http://schemas.microsoft.com/office/drawing/2010/main" w="9525">
+                <a14:hiddenLine xmlns:a14="http://schemas.microsoft.com/office/drawing/2010/main" xmlns="" w="9525">
                   <a:solidFill>
                     <a:srgbClr val="000000"/>
                   </a:solidFill>
@@ -2294,7 +2295,7 @@
             </a:ln>
             <a:extLst>
               <a:ext uri="{91240B29-F687-4f45-9708-019B960494DF}">
-                <a14:hiddenLine xmlns="" xmlns:a14="http://schemas.microsoft.com/office/drawing/2010/main" w="9525">
+                <a14:hiddenLine xmlns:a14="http://schemas.microsoft.com/office/drawing/2010/main" xmlns="" w="9525">
                   <a:solidFill>
                     <a:srgbClr val="000000"/>
                   </a:solidFill>
@@ -2350,7 +2351,7 @@
             </a:ln>
             <a:extLst>
               <a:ext uri="{91240B29-F687-4f45-9708-019B960494DF}">
-                <a14:hiddenLine xmlns="" xmlns:a14="http://schemas.microsoft.com/office/drawing/2010/main" w="9525">
+                <a14:hiddenLine xmlns:a14="http://schemas.microsoft.com/office/drawing/2010/main" xmlns="" w="9525">
                   <a:solidFill>
                     <a:srgbClr val="000000"/>
                   </a:solidFill>
@@ -2440,7 +2441,7 @@
             </a:ln>
             <a:extLst>
               <a:ext uri="{91240B29-F687-4f45-9708-019B960494DF}">
-                <a14:hiddenLine xmlns="" xmlns:a14="http://schemas.microsoft.com/office/drawing/2010/main" w="9525">
+                <a14:hiddenLine xmlns:a14="http://schemas.microsoft.com/office/drawing/2010/main" xmlns="" w="9525">
                   <a:solidFill>
                     <a:srgbClr val="000000"/>
                   </a:solidFill>
@@ -2508,7 +2509,7 @@
             </a:ln>
             <a:extLst>
               <a:ext uri="{91240B29-F687-4f45-9708-019B960494DF}">
-                <a14:hiddenLine xmlns="" xmlns:a14="http://schemas.microsoft.com/office/drawing/2010/main" w="9525">
+                <a14:hiddenLine xmlns:a14="http://schemas.microsoft.com/office/drawing/2010/main" xmlns="" w="9525">
                   <a:solidFill>
                     <a:srgbClr val="000000"/>
                   </a:solidFill>
@@ -2598,7 +2599,7 @@
             </a:ln>
             <a:extLst>
               <a:ext uri="{91240B29-F687-4f45-9708-019B960494DF}">
-                <a14:hiddenLine xmlns="" xmlns:a14="http://schemas.microsoft.com/office/drawing/2010/main" w="9525">
+                <a14:hiddenLine xmlns:a14="http://schemas.microsoft.com/office/drawing/2010/main" xmlns="" w="9525">
                   <a:solidFill>
                     <a:srgbClr val="000000"/>
                   </a:solidFill>
@@ -2666,7 +2667,7 @@
             </a:ln>
             <a:extLst>
               <a:ext uri="{91240B29-F687-4f45-9708-019B960494DF}">
-                <a14:hiddenLine xmlns="" xmlns:a14="http://schemas.microsoft.com/office/drawing/2010/main" w="9525">
+                <a14:hiddenLine xmlns:a14="http://schemas.microsoft.com/office/drawing/2010/main" xmlns="" w="9525">
                   <a:solidFill>
                     <a:srgbClr val="000000"/>
                   </a:solidFill>
@@ -2756,7 +2757,7 @@
             </a:ln>
             <a:extLst>
               <a:ext uri="{91240B29-F687-4f45-9708-019B960494DF}">
-                <a14:hiddenLine xmlns="" xmlns:a14="http://schemas.microsoft.com/office/drawing/2010/main" w="9525">
+                <a14:hiddenLine xmlns:a14="http://schemas.microsoft.com/office/drawing/2010/main" xmlns="" w="9525">
                   <a:solidFill>
                     <a:srgbClr val="000000"/>
                   </a:solidFill>
@@ -2790,7 +2791,7 @@
             </a:ln>
             <a:extLst>
               <a:ext uri="{91240B29-F687-4f45-9708-019B960494DF}">
-                <a14:hiddenLine xmlns="" xmlns:a14="http://schemas.microsoft.com/office/drawing/2010/main" w="9525">
+                <a14:hiddenLine xmlns:a14="http://schemas.microsoft.com/office/drawing/2010/main" xmlns="" w="9525">
                   <a:solidFill>
                     <a:srgbClr val="000000"/>
                   </a:solidFill>
@@ -2880,7 +2881,7 @@
             </a:ln>
             <a:extLst>
               <a:ext uri="{91240B29-F687-4f45-9708-019B960494DF}">
-                <a14:hiddenLine xmlns="" xmlns:a14="http://schemas.microsoft.com/office/drawing/2010/main" w="9525">
+                <a14:hiddenLine xmlns:a14="http://schemas.microsoft.com/office/drawing/2010/main" xmlns="" w="9525">
                   <a:solidFill>
                     <a:srgbClr val="000000"/>
                   </a:solidFill>
@@ -2942,7 +2943,7 @@
             </a:ln>
             <a:extLst>
               <a:ext uri="{91240B29-F687-4f45-9708-019B960494DF}">
-                <a14:hiddenLine xmlns="" xmlns:a14="http://schemas.microsoft.com/office/drawing/2010/main" w="9525">
+                <a14:hiddenLine xmlns:a14="http://schemas.microsoft.com/office/drawing/2010/main" xmlns="" w="9525">
                   <a:solidFill>
                     <a:srgbClr val="000000"/>
                   </a:solidFill>
@@ -3004,7 +3005,7 @@
             </a:ln>
             <a:extLst>
               <a:ext uri="{91240B29-F687-4f45-9708-019B960494DF}">
-                <a14:hiddenLine xmlns="" xmlns:a14="http://schemas.microsoft.com/office/drawing/2010/main" w="9525">
+                <a14:hiddenLine xmlns:a14="http://schemas.microsoft.com/office/drawing/2010/main" xmlns="" w="9525">
                   <a:solidFill>
                     <a:srgbClr val="000000"/>
                   </a:solidFill>
@@ -3094,7 +3095,7 @@
             </a:ln>
             <a:extLst>
               <a:ext uri="{91240B29-F687-4f45-9708-019B960494DF}">
-                <a14:hiddenLine xmlns="" xmlns:a14="http://schemas.microsoft.com/office/drawing/2010/main" w="9525">
+                <a14:hiddenLine xmlns:a14="http://schemas.microsoft.com/office/drawing/2010/main" xmlns="" w="9525">
                   <a:solidFill>
                     <a:srgbClr val="000000"/>
                   </a:solidFill>
@@ -3162,7 +3163,7 @@
             </a:ln>
             <a:extLst>
               <a:ext uri="{91240B29-F687-4f45-9708-019B960494DF}">
-                <a14:hiddenLine xmlns="" xmlns:a14="http://schemas.microsoft.com/office/drawing/2010/main" w="9525">
+                <a14:hiddenLine xmlns:a14="http://schemas.microsoft.com/office/drawing/2010/main" xmlns="" w="9525">
                   <a:solidFill>
                     <a:srgbClr val="000000"/>
                   </a:solidFill>
@@ -3224,7 +3225,7 @@
             </a:ln>
             <a:extLst>
               <a:ext uri="{91240B29-F687-4f45-9708-019B960494DF}">
-                <a14:hiddenLine xmlns="" xmlns:a14="http://schemas.microsoft.com/office/drawing/2010/main" w="9525">
+                <a14:hiddenLine xmlns:a14="http://schemas.microsoft.com/office/drawing/2010/main" xmlns="" w="9525">
                   <a:solidFill>
                     <a:srgbClr val="000000"/>
                   </a:solidFill>
@@ -3314,7 +3315,7 @@
             </a:ln>
             <a:extLst>
               <a:ext uri="{91240B29-F687-4f45-9708-019B960494DF}">
-                <a14:hiddenLine xmlns="" xmlns:a14="http://schemas.microsoft.com/office/drawing/2010/main" w="9525">
+                <a14:hiddenLine xmlns:a14="http://schemas.microsoft.com/office/drawing/2010/main" xmlns="" w="9525">
                   <a:solidFill>
                     <a:srgbClr val="000000"/>
                   </a:solidFill>
@@ -3376,7 +3377,7 @@
             </a:ln>
             <a:extLst>
               <a:ext uri="{91240B29-F687-4f45-9708-019B960494DF}">
-                <a14:hiddenLine xmlns="" xmlns:a14="http://schemas.microsoft.com/office/drawing/2010/main" w="9525">
+                <a14:hiddenLine xmlns:a14="http://schemas.microsoft.com/office/drawing/2010/main" xmlns="" w="9525">
                   <a:solidFill>
                     <a:srgbClr val="000000"/>
                   </a:solidFill>
@@ -3466,7 +3467,7 @@
             </a:ln>
             <a:extLst>
               <a:ext uri="{91240B29-F687-4f45-9708-019B960494DF}">
-                <a14:hiddenLine xmlns="" xmlns:a14="http://schemas.microsoft.com/office/drawing/2010/main" w="9525">
+                <a14:hiddenLine xmlns:a14="http://schemas.microsoft.com/office/drawing/2010/main" xmlns="" w="9525">
                   <a:solidFill>
                     <a:srgbClr val="000000"/>
                   </a:solidFill>
@@ -3528,7 +3529,7 @@
             </a:ln>
             <a:extLst>
               <a:ext uri="{91240B29-F687-4f45-9708-019B960494DF}">
-                <a14:hiddenLine xmlns="" xmlns:a14="http://schemas.microsoft.com/office/drawing/2010/main" w="9525">
+                <a14:hiddenLine xmlns:a14="http://schemas.microsoft.com/office/drawing/2010/main" xmlns="" w="9525">
                   <a:solidFill>
                     <a:srgbClr val="000000"/>
                   </a:solidFill>
@@ -3618,7 +3619,7 @@
             </a:ln>
             <a:extLst>
               <a:ext uri="{91240B29-F687-4f45-9708-019B960494DF}">
-                <a14:hiddenLine xmlns="" xmlns:a14="http://schemas.microsoft.com/office/drawing/2010/main" w="9525">
+                <a14:hiddenLine xmlns:a14="http://schemas.microsoft.com/office/drawing/2010/main" xmlns="" w="9525">
                   <a:solidFill>
                     <a:srgbClr val="000000"/>
                   </a:solidFill>
@@ -3652,7 +3653,7 @@
             </a:ln>
             <a:extLst>
               <a:ext uri="{91240B29-F687-4f45-9708-019B960494DF}">
-                <a14:hiddenLine xmlns="" xmlns:a14="http://schemas.microsoft.com/office/drawing/2010/main" w="9525">
+                <a14:hiddenLine xmlns:a14="http://schemas.microsoft.com/office/drawing/2010/main" xmlns="" w="9525">
                   <a:solidFill>
                     <a:srgbClr val="000000"/>
                   </a:solidFill>
@@ -3717,7 +3718,7 @@
             </a:ln>
             <a:extLst>
               <a:ext uri="{91240B29-F687-4f45-9708-019B960494DF}">
-                <a14:hiddenLine xmlns="" xmlns:a14="http://schemas.microsoft.com/office/drawing/2010/main" w="9525">
+                <a14:hiddenLine xmlns:a14="http://schemas.microsoft.com/office/drawing/2010/main" xmlns="" w="9525">
                   <a:solidFill>
                     <a:srgbClr val="000000"/>
                   </a:solidFill>
@@ -3807,7 +3808,7 @@
             </a:ln>
             <a:extLst>
               <a:ext uri="{91240B29-F687-4f45-9708-019B960494DF}">
-                <a14:hiddenLine xmlns="" xmlns:a14="http://schemas.microsoft.com/office/drawing/2010/main" w="9525">
+                <a14:hiddenLine xmlns:a14="http://schemas.microsoft.com/office/drawing/2010/main" xmlns="" w="9525">
                   <a:solidFill>
                     <a:srgbClr val="000000"/>
                   </a:solidFill>
@@ -3869,7 +3870,7 @@
             </a:ln>
             <a:extLst>
               <a:ext uri="{91240B29-F687-4f45-9708-019B960494DF}">
-                <a14:hiddenLine xmlns="" xmlns:a14="http://schemas.microsoft.com/office/drawing/2010/main" w="9525">
+                <a14:hiddenLine xmlns:a14="http://schemas.microsoft.com/office/drawing/2010/main" xmlns="" w="9525">
                   <a:solidFill>
                     <a:srgbClr val="000000"/>
                   </a:solidFill>
@@ -3959,7 +3960,7 @@
             </a:ln>
             <a:extLst>
               <a:ext uri="{91240B29-F687-4f45-9708-019B960494DF}">
-                <a14:hiddenLine xmlns="" xmlns:a14="http://schemas.microsoft.com/office/drawing/2010/main" w="9525">
+                <a14:hiddenLine xmlns:a14="http://schemas.microsoft.com/office/drawing/2010/main" xmlns="" w="9525">
                   <a:solidFill>
                     <a:srgbClr val="000000"/>
                   </a:solidFill>
@@ -4049,7 +4050,7 @@
             </a:ln>
             <a:extLst>
               <a:ext uri="{91240B29-F687-4f45-9708-019B960494DF}">
-                <a14:hiddenLine xmlns="" xmlns:a14="http://schemas.microsoft.com/office/drawing/2010/main" w="9525">
+                <a14:hiddenLine xmlns:a14="http://schemas.microsoft.com/office/drawing/2010/main" xmlns="" w="9525">
                   <a:solidFill>
                     <a:srgbClr val="000000"/>
                   </a:solidFill>
@@ -4114,7 +4115,7 @@
             </a:ln>
             <a:extLst>
               <a:ext uri="{91240B29-F687-4f45-9708-019B960494DF}">
-                <a14:hiddenLine xmlns="" xmlns:a14="http://schemas.microsoft.com/office/drawing/2010/main" w="9525">
+                <a14:hiddenLine xmlns:a14="http://schemas.microsoft.com/office/drawing/2010/main" xmlns="" w="9525">
                   <a:solidFill>
                     <a:srgbClr val="000000"/>
                   </a:solidFill>
@@ -4176,7 +4177,7 @@
             </a:ln>
             <a:extLst>
               <a:ext uri="{91240B29-F687-4f45-9708-019B960494DF}">
-                <a14:hiddenLine xmlns="" xmlns:a14="http://schemas.microsoft.com/office/drawing/2010/main" w="9525">
+                <a14:hiddenLine xmlns:a14="http://schemas.microsoft.com/office/drawing/2010/main" xmlns="" w="9525">
                   <a:solidFill>
                     <a:srgbClr val="000000"/>
                   </a:solidFill>
@@ -4266,7 +4267,7 @@
             </a:ln>
             <a:extLst>
               <a:ext uri="{91240B29-F687-4f45-9708-019B960494DF}">
-                <a14:hiddenLine xmlns="" xmlns:a14="http://schemas.microsoft.com/office/drawing/2010/main" w="9525">
+                <a14:hiddenLine xmlns:a14="http://schemas.microsoft.com/office/drawing/2010/main" xmlns="" w="9525">
                   <a:solidFill>
                     <a:srgbClr val="000000"/>
                   </a:solidFill>
@@ -4356,7 +4357,7 @@
             </a:ln>
             <a:extLst>
               <a:ext uri="{91240B29-F687-4f45-9708-019B960494DF}">
-                <a14:hiddenLine xmlns="" xmlns:a14="http://schemas.microsoft.com/office/drawing/2010/main" w="9525">
+                <a14:hiddenLine xmlns:a14="http://schemas.microsoft.com/office/drawing/2010/main" xmlns="" w="9525">
                   <a:solidFill>
                     <a:srgbClr val="000000"/>
                   </a:solidFill>
@@ -4418,7 +4419,7 @@
             </a:ln>
             <a:extLst>
               <a:ext uri="{91240B29-F687-4f45-9708-019B960494DF}">
-                <a14:hiddenLine xmlns="" xmlns:a14="http://schemas.microsoft.com/office/drawing/2010/main" w="9525">
+                <a14:hiddenLine xmlns:a14="http://schemas.microsoft.com/office/drawing/2010/main" xmlns="" w="9525">
                   <a:solidFill>
                     <a:srgbClr val="000000"/>
                   </a:solidFill>
@@ -4538,7 +4539,7 @@
             </a:ln>
             <a:extLst>
               <a:ext uri="{91240B29-F687-4f45-9708-019B960494DF}">
-                <a14:hiddenLine xmlns="" xmlns:a14="http://schemas.microsoft.com/office/drawing/2010/main" w="9525">
+                <a14:hiddenLine xmlns:a14="http://schemas.microsoft.com/office/drawing/2010/main" xmlns="" w="9525">
                   <a:solidFill>
                     <a:srgbClr val="000000"/>
                   </a:solidFill>
@@ -4606,7 +4607,7 @@
             </a:ln>
             <a:extLst>
               <a:ext uri="{91240B29-F687-4f45-9708-019B960494DF}">
-                <a14:hiddenLine xmlns="" xmlns:a14="http://schemas.microsoft.com/office/drawing/2010/main" w="9525">
+                <a14:hiddenLine xmlns:a14="http://schemas.microsoft.com/office/drawing/2010/main" xmlns="" w="9525">
                   <a:solidFill>
                     <a:srgbClr val="000000"/>
                   </a:solidFill>
@@ -4696,7 +4697,7 @@
             </a:ln>
             <a:extLst>
               <a:ext uri="{91240B29-F687-4f45-9708-019B960494DF}">
-                <a14:hiddenLine xmlns="" xmlns:a14="http://schemas.microsoft.com/office/drawing/2010/main" w="9525">
+                <a14:hiddenLine xmlns:a14="http://schemas.microsoft.com/office/drawing/2010/main" xmlns="" w="9525">
                   <a:solidFill>
                     <a:srgbClr val="000000"/>
                   </a:solidFill>
@@ -4836,7 +4837,7 @@
           <a:p>
             <a:fld id="{EC4347D3-4C9A-C240-8F14-750059DFEEB0}" type="datetimeFigureOut">
               <a:rPr lang="en-US" smtClean="0"/>
-              <a:t>9/12/23</a:t>
+              <a:t>9/14/23</a:t>
             </a:fld>
             <a:endParaRPr lang="en-US"/>
           </a:p>
@@ -5103,7 +5104,7 @@
           <a:p>
             <a:fld id="{EC4347D3-4C9A-C240-8F14-750059DFEEB0}" type="datetimeFigureOut">
               <a:rPr lang="en-US" smtClean="0"/>
-              <a:t>9/12/23</a:t>
+              <a:t>9/14/23</a:t>
             </a:fld>
             <a:endParaRPr lang="en-US"/>
           </a:p>
@@ -5299,7 +5300,7 @@
           <a:p>
             <a:fld id="{EC4347D3-4C9A-C240-8F14-750059DFEEB0}" type="datetimeFigureOut">
               <a:rPr lang="en-US" smtClean="0"/>
-              <a:t>9/12/23</a:t>
+              <a:t>9/14/23</a:t>
             </a:fld>
             <a:endParaRPr lang="en-US"/>
           </a:p>
@@ -5562,7 +5563,7 @@
           <a:p>
             <a:fld id="{EC4347D3-4C9A-C240-8F14-750059DFEEB0}" type="datetimeFigureOut">
               <a:rPr lang="en-US" smtClean="0"/>
-              <a:t>9/12/23</a:t>
+              <a:t>9/14/23</a:t>
             </a:fld>
             <a:endParaRPr lang="en-US"/>
           </a:p>
@@ -5996,7 +5997,7 @@
           <a:p>
             <a:fld id="{EC4347D3-4C9A-C240-8F14-750059DFEEB0}" type="datetimeFigureOut">
               <a:rPr lang="en-US" smtClean="0"/>
-              <a:t>9/12/23</a:t>
+              <a:t>9/14/23</a:t>
             </a:fld>
             <a:endParaRPr lang="en-US"/>
           </a:p>
@@ -6542,7 +6543,7 @@
           <a:p>
             <a:fld id="{EC4347D3-4C9A-C240-8F14-750059DFEEB0}" type="datetimeFigureOut">
               <a:rPr lang="en-US" smtClean="0"/>
-              <a:t>9/12/23</a:t>
+              <a:t>9/14/23</a:t>
             </a:fld>
             <a:endParaRPr lang="en-US"/>
           </a:p>
@@ -7262,7 +7263,7 @@
           <a:p>
             <a:fld id="{EC4347D3-4C9A-C240-8F14-750059DFEEB0}" type="datetimeFigureOut">
               <a:rPr lang="en-US" smtClean="0"/>
-              <a:t>9/12/23</a:t>
+              <a:t>9/14/23</a:t>
             </a:fld>
             <a:endParaRPr lang="en-US"/>
           </a:p>
@@ -7432,7 +7433,7 @@
           <a:p>
             <a:fld id="{EC4347D3-4C9A-C240-8F14-750059DFEEB0}" type="datetimeFigureOut">
               <a:rPr lang="en-US" smtClean="0"/>
-              <a:t>9/12/23</a:t>
+              <a:t>9/14/23</a:t>
             </a:fld>
             <a:endParaRPr lang="en-US"/>
           </a:p>
@@ -7612,7 +7613,7 @@
           <a:p>
             <a:fld id="{EC4347D3-4C9A-C240-8F14-750059DFEEB0}" type="datetimeFigureOut">
               <a:rPr lang="en-US" smtClean="0"/>
-              <a:t>9/12/23</a:t>
+              <a:t>9/14/23</a:t>
             </a:fld>
             <a:endParaRPr lang="en-US"/>
           </a:p>
@@ -7782,7 +7783,7 @@
           <a:p>
             <a:fld id="{EC4347D3-4C9A-C240-8F14-750059DFEEB0}" type="datetimeFigureOut">
               <a:rPr lang="en-US" smtClean="0"/>
-              <a:t>9/12/23</a:t>
+              <a:t>9/14/23</a:t>
             </a:fld>
             <a:endParaRPr lang="en-US"/>
           </a:p>
@@ -8032,7 +8033,7 @@
           <a:p>
             <a:fld id="{EC4347D3-4C9A-C240-8F14-750059DFEEB0}" type="datetimeFigureOut">
               <a:rPr lang="en-US" smtClean="0"/>
-              <a:t>9/12/23</a:t>
+              <a:t>9/14/23</a:t>
             </a:fld>
             <a:endParaRPr lang="en-US"/>
           </a:p>
@@ -8264,7 +8265,7 @@
           <a:p>
             <a:fld id="{EC4347D3-4C9A-C240-8F14-750059DFEEB0}" type="datetimeFigureOut">
               <a:rPr lang="en-US" smtClean="0"/>
-              <a:t>9/12/23</a:t>
+              <a:t>9/14/23</a:t>
             </a:fld>
             <a:endParaRPr lang="en-US"/>
           </a:p>
@@ -8650,7 +8651,7 @@
           <a:p>
             <a:fld id="{EC4347D3-4C9A-C240-8F14-750059DFEEB0}" type="datetimeFigureOut">
               <a:rPr lang="en-US" smtClean="0"/>
-              <a:t>9/12/23</a:t>
+              <a:t>9/14/23</a:t>
             </a:fld>
             <a:endParaRPr lang="en-US"/>
           </a:p>
@@ -8773,7 +8774,7 @@
           <a:p>
             <a:fld id="{EC4347D3-4C9A-C240-8F14-750059DFEEB0}" type="datetimeFigureOut">
               <a:rPr lang="en-US" smtClean="0"/>
-              <a:t>9/12/23</a:t>
+              <a:t>9/14/23</a:t>
             </a:fld>
             <a:endParaRPr lang="en-US"/>
           </a:p>
@@ -8868,7 +8869,7 @@
           <a:p>
             <a:fld id="{EC4347D3-4C9A-C240-8F14-750059DFEEB0}" type="datetimeFigureOut">
               <a:rPr lang="en-US" smtClean="0"/>
-              <a:t>9/12/23</a:t>
+              <a:t>9/14/23</a:t>
             </a:fld>
             <a:endParaRPr lang="en-US"/>
           </a:p>
@@ -9117,7 +9118,7 @@
           <a:p>
             <a:fld id="{EC4347D3-4C9A-C240-8F14-750059DFEEB0}" type="datetimeFigureOut">
               <a:rPr lang="en-US" smtClean="0"/>
-              <a:t>9/12/23</a:t>
+              <a:t>9/14/23</a:t>
             </a:fld>
             <a:endParaRPr lang="en-US"/>
           </a:p>
@@ -9402,7 +9403,7 @@
           <a:p>
             <a:fld id="{EC4347D3-4C9A-C240-8F14-750059DFEEB0}" type="datetimeFigureOut">
               <a:rPr lang="en-US" smtClean="0"/>
-              <a:t>9/12/23</a:t>
+              <a:t>9/14/23</a:t>
             </a:fld>
             <a:endParaRPr lang="en-US"/>
           </a:p>
@@ -9525,7 +9526,7 @@
           <a:noFill/>
           <a:extLst>
             <a:ext uri="{909E8E84-426E-40dd-AFC4-6F175D3DCCD1}">
-              <a14:hiddenFill xmlns="" xmlns:a14="http://schemas.microsoft.com/office/drawing/2010/main">
+              <a14:hiddenFill xmlns:a14="http://schemas.microsoft.com/office/drawing/2010/main" xmlns="">
                 <a:solidFill>
                   <a:srgbClr val="FFFFFF"/>
                 </a:solidFill>
@@ -9599,7 +9600,7 @@
               </a:ln>
               <a:extLst>
                 <a:ext uri="{91240B29-F687-4f45-9708-019B960494DF}">
-                  <a14:hiddenLine xmlns="" xmlns:a14="http://schemas.microsoft.com/office/drawing/2010/main" w="9525">
+                  <a14:hiddenLine xmlns:a14="http://schemas.microsoft.com/office/drawing/2010/main" xmlns="" w="9525">
                     <a:solidFill>
                       <a:srgbClr val="000000"/>
                     </a:solidFill>
@@ -9689,7 +9690,7 @@
               </a:ln>
               <a:extLst>
                 <a:ext uri="{91240B29-F687-4f45-9708-019B960494DF}">
-                  <a14:hiddenLine xmlns="" xmlns:a14="http://schemas.microsoft.com/office/drawing/2010/main" w="9525">
+                  <a14:hiddenLine xmlns:a14="http://schemas.microsoft.com/office/drawing/2010/main" xmlns="" w="9525">
                     <a:solidFill>
                       <a:srgbClr val="000000"/>
                     </a:solidFill>
@@ -9779,7 +9780,7 @@
               </a:ln>
               <a:extLst>
                 <a:ext uri="{91240B29-F687-4f45-9708-019B960494DF}">
-                  <a14:hiddenLine xmlns="" xmlns:a14="http://schemas.microsoft.com/office/drawing/2010/main" w="9525">
+                  <a14:hiddenLine xmlns:a14="http://schemas.microsoft.com/office/drawing/2010/main" xmlns="" w="9525">
                     <a:solidFill>
                       <a:srgbClr val="000000"/>
                     </a:solidFill>
@@ -9841,7 +9842,7 @@
               </a:ln>
               <a:extLst>
                 <a:ext uri="{91240B29-F687-4f45-9708-019B960494DF}">
-                  <a14:hiddenLine xmlns="" xmlns:a14="http://schemas.microsoft.com/office/drawing/2010/main" w="9525">
+                  <a14:hiddenLine xmlns:a14="http://schemas.microsoft.com/office/drawing/2010/main" xmlns="" w="9525">
                     <a:solidFill>
                       <a:srgbClr val="000000"/>
                     </a:solidFill>
@@ -9931,7 +9932,7 @@
               </a:ln>
               <a:extLst>
                 <a:ext uri="{91240B29-F687-4f45-9708-019B960494DF}">
-                  <a14:hiddenLine xmlns="" xmlns:a14="http://schemas.microsoft.com/office/drawing/2010/main" w="9525">
+                  <a14:hiddenLine xmlns:a14="http://schemas.microsoft.com/office/drawing/2010/main" xmlns="" w="9525">
                     <a:solidFill>
                       <a:srgbClr val="000000"/>
                     </a:solidFill>
@@ -9993,7 +9994,7 @@
               </a:ln>
               <a:extLst>
                 <a:ext uri="{91240B29-F687-4f45-9708-019B960494DF}">
-                  <a14:hiddenLine xmlns="" xmlns:a14="http://schemas.microsoft.com/office/drawing/2010/main" w="9525">
+                  <a14:hiddenLine xmlns:a14="http://schemas.microsoft.com/office/drawing/2010/main" xmlns="" w="9525">
                     <a:solidFill>
                       <a:srgbClr val="000000"/>
                     </a:solidFill>
@@ -10055,7 +10056,7 @@
               </a:ln>
               <a:extLst>
                 <a:ext uri="{91240B29-F687-4f45-9708-019B960494DF}">
-                  <a14:hiddenLine xmlns="" xmlns:a14="http://schemas.microsoft.com/office/drawing/2010/main" w="9525">
+                  <a14:hiddenLine xmlns:a14="http://schemas.microsoft.com/office/drawing/2010/main" xmlns="" w="9525">
                     <a:solidFill>
                       <a:srgbClr val="000000"/>
                     </a:solidFill>
@@ -10145,7 +10146,7 @@
               </a:ln>
               <a:extLst>
                 <a:ext uri="{91240B29-F687-4f45-9708-019B960494DF}">
-                  <a14:hiddenLine xmlns="" xmlns:a14="http://schemas.microsoft.com/office/drawing/2010/main" w="9525">
+                  <a14:hiddenLine xmlns:a14="http://schemas.microsoft.com/office/drawing/2010/main" xmlns="" w="9525">
                     <a:solidFill>
                       <a:srgbClr val="000000"/>
                     </a:solidFill>
@@ -10235,7 +10236,7 @@
               </a:ln>
               <a:extLst>
                 <a:ext uri="{91240B29-F687-4f45-9708-019B960494DF}">
-                  <a14:hiddenLine xmlns="" xmlns:a14="http://schemas.microsoft.com/office/drawing/2010/main" w="9525">
+                  <a14:hiddenLine xmlns:a14="http://schemas.microsoft.com/office/drawing/2010/main" xmlns="" w="9525">
                     <a:solidFill>
                       <a:srgbClr val="000000"/>
                     </a:solidFill>
@@ -10297,7 +10298,7 @@
               </a:ln>
               <a:extLst>
                 <a:ext uri="{91240B29-F687-4f45-9708-019B960494DF}">
-                  <a14:hiddenLine xmlns="" xmlns:a14="http://schemas.microsoft.com/office/drawing/2010/main" w="9525">
+                  <a14:hiddenLine xmlns:a14="http://schemas.microsoft.com/office/drawing/2010/main" xmlns="" w="9525">
                     <a:solidFill>
                       <a:srgbClr val="000000"/>
                     </a:solidFill>
@@ -10407,7 +10408,7 @@
               </a:ln>
               <a:extLst>
                 <a:ext uri="{91240B29-F687-4f45-9708-019B960494DF}">
-                  <a14:hiddenLine xmlns="" xmlns:a14="http://schemas.microsoft.com/office/drawing/2010/main" w="9525">
+                  <a14:hiddenLine xmlns:a14="http://schemas.microsoft.com/office/drawing/2010/main" xmlns="" w="9525">
                     <a:solidFill>
                       <a:srgbClr val="000000"/>
                     </a:solidFill>
@@ -10491,7 +10492,7 @@
               </a:ln>
               <a:extLst>
                 <a:ext uri="{91240B29-F687-4f45-9708-019B960494DF}">
-                  <a14:hiddenLine xmlns="" xmlns:a14="http://schemas.microsoft.com/office/drawing/2010/main" w="9525">
+                  <a14:hiddenLine xmlns:a14="http://schemas.microsoft.com/office/drawing/2010/main" xmlns="" w="9525">
                     <a:solidFill>
                       <a:srgbClr val="000000"/>
                     </a:solidFill>
@@ -10553,7 +10554,7 @@
               </a:ln>
               <a:extLst>
                 <a:ext uri="{91240B29-F687-4f45-9708-019B960494DF}">
-                  <a14:hiddenLine xmlns="" xmlns:a14="http://schemas.microsoft.com/office/drawing/2010/main" w="9525">
+                  <a14:hiddenLine xmlns:a14="http://schemas.microsoft.com/office/drawing/2010/main" xmlns="" w="9525">
                     <a:solidFill>
                       <a:srgbClr val="000000"/>
                     </a:solidFill>
@@ -10615,7 +10616,7 @@
               </a:ln>
               <a:extLst>
                 <a:ext uri="{91240B29-F687-4f45-9708-019B960494DF}">
-                  <a14:hiddenLine xmlns="" xmlns:a14="http://schemas.microsoft.com/office/drawing/2010/main" w="9525">
+                  <a14:hiddenLine xmlns:a14="http://schemas.microsoft.com/office/drawing/2010/main" xmlns="" w="9525">
                     <a:solidFill>
                       <a:srgbClr val="000000"/>
                     </a:solidFill>
@@ -10705,7 +10706,7 @@
               </a:ln>
               <a:extLst>
                 <a:ext uri="{91240B29-F687-4f45-9708-019B960494DF}">
-                  <a14:hiddenLine xmlns="" xmlns:a14="http://schemas.microsoft.com/office/drawing/2010/main" w="9525">
+                  <a14:hiddenLine xmlns:a14="http://schemas.microsoft.com/office/drawing/2010/main" xmlns="" w="9525">
                     <a:solidFill>
                       <a:srgbClr val="000000"/>
                     </a:solidFill>
@@ -10739,7 +10740,7 @@
               </a:ln>
               <a:extLst>
                 <a:ext uri="{91240B29-F687-4f45-9708-019B960494DF}">
-                  <a14:hiddenLine xmlns="" xmlns:a14="http://schemas.microsoft.com/office/drawing/2010/main" w="9525">
+                  <a14:hiddenLine xmlns:a14="http://schemas.microsoft.com/office/drawing/2010/main" xmlns="" w="9525">
                     <a:solidFill>
                       <a:srgbClr val="000000"/>
                     </a:solidFill>
@@ -10804,7 +10805,7 @@
               </a:ln>
               <a:extLst>
                 <a:ext uri="{91240B29-F687-4f45-9708-019B960494DF}">
-                  <a14:hiddenLine xmlns="" xmlns:a14="http://schemas.microsoft.com/office/drawing/2010/main" w="9525">
+                  <a14:hiddenLine xmlns:a14="http://schemas.microsoft.com/office/drawing/2010/main" xmlns="" w="9525">
                     <a:solidFill>
                       <a:srgbClr val="000000"/>
                     </a:solidFill>
@@ -10894,7 +10895,7 @@
               </a:ln>
               <a:extLst>
                 <a:ext uri="{91240B29-F687-4f45-9708-019B960494DF}">
-                  <a14:hiddenLine xmlns="" xmlns:a14="http://schemas.microsoft.com/office/drawing/2010/main" w="9525">
+                  <a14:hiddenLine xmlns:a14="http://schemas.microsoft.com/office/drawing/2010/main" xmlns="" w="9525">
                     <a:solidFill>
                       <a:srgbClr val="000000"/>
                     </a:solidFill>
@@ -10956,7 +10957,7 @@
               </a:ln>
               <a:extLst>
                 <a:ext uri="{91240B29-F687-4f45-9708-019B960494DF}">
-                  <a14:hiddenLine xmlns="" xmlns:a14="http://schemas.microsoft.com/office/drawing/2010/main" w="9525">
+                  <a14:hiddenLine xmlns:a14="http://schemas.microsoft.com/office/drawing/2010/main" xmlns="" w="9525">
                     <a:solidFill>
                       <a:srgbClr val="000000"/>
                     </a:solidFill>
@@ -11046,7 +11047,7 @@
               </a:ln>
               <a:extLst>
                 <a:ext uri="{91240B29-F687-4f45-9708-019B960494DF}">
-                  <a14:hiddenLine xmlns="" xmlns:a14="http://schemas.microsoft.com/office/drawing/2010/main" w="9525">
+                  <a14:hiddenLine xmlns:a14="http://schemas.microsoft.com/office/drawing/2010/main" xmlns="" w="9525">
                     <a:solidFill>
                       <a:srgbClr val="000000"/>
                     </a:solidFill>
@@ -11111,7 +11112,7 @@
               </a:ln>
               <a:extLst>
                 <a:ext uri="{91240B29-F687-4f45-9708-019B960494DF}">
-                  <a14:hiddenLine xmlns="" xmlns:a14="http://schemas.microsoft.com/office/drawing/2010/main" w="9525">
+                  <a14:hiddenLine xmlns:a14="http://schemas.microsoft.com/office/drawing/2010/main" xmlns="" w="9525">
                     <a:solidFill>
                       <a:srgbClr val="000000"/>
                     </a:solidFill>
@@ -11173,7 +11174,7 @@
               </a:ln>
               <a:extLst>
                 <a:ext uri="{91240B29-F687-4f45-9708-019B960494DF}">
-                  <a14:hiddenLine xmlns="" xmlns:a14="http://schemas.microsoft.com/office/drawing/2010/main" w="9525">
+                  <a14:hiddenLine xmlns:a14="http://schemas.microsoft.com/office/drawing/2010/main" xmlns="" w="9525">
                     <a:solidFill>
                       <a:srgbClr val="000000"/>
                     </a:solidFill>
@@ -11263,7 +11264,7 @@
               </a:ln>
               <a:extLst>
                 <a:ext uri="{91240B29-F687-4f45-9708-019B960494DF}">
-                  <a14:hiddenLine xmlns="" xmlns:a14="http://schemas.microsoft.com/office/drawing/2010/main" w="9525">
+                  <a14:hiddenLine xmlns:a14="http://schemas.microsoft.com/office/drawing/2010/main" xmlns="" w="9525">
                     <a:solidFill>
                       <a:srgbClr val="000000"/>
                     </a:solidFill>
@@ -11353,7 +11354,7 @@
               </a:ln>
               <a:extLst>
                 <a:ext uri="{91240B29-F687-4f45-9708-019B960494DF}">
-                  <a14:hiddenLine xmlns="" xmlns:a14="http://schemas.microsoft.com/office/drawing/2010/main" w="9525">
+                  <a14:hiddenLine xmlns:a14="http://schemas.microsoft.com/office/drawing/2010/main" xmlns="" w="9525">
                     <a:solidFill>
                       <a:srgbClr val="000000"/>
                     </a:solidFill>
@@ -11418,7 +11419,7 @@
               </a:ln>
               <a:extLst>
                 <a:ext uri="{91240B29-F687-4f45-9708-019B960494DF}">
-                  <a14:hiddenLine xmlns="" xmlns:a14="http://schemas.microsoft.com/office/drawing/2010/main" w="9525">
+                  <a14:hiddenLine xmlns:a14="http://schemas.microsoft.com/office/drawing/2010/main" xmlns="" w="9525">
                     <a:solidFill>
                       <a:srgbClr val="000000"/>
                     </a:solidFill>
@@ -11538,7 +11539,7 @@
               </a:ln>
               <a:extLst>
                 <a:ext uri="{91240B29-F687-4f45-9708-019B960494DF}">
-                  <a14:hiddenLine xmlns="" xmlns:a14="http://schemas.microsoft.com/office/drawing/2010/main" w="9525">
+                  <a14:hiddenLine xmlns:a14="http://schemas.microsoft.com/office/drawing/2010/main" xmlns="" w="9525">
                     <a:solidFill>
                       <a:srgbClr val="000000"/>
                     </a:solidFill>
@@ -11619,7 +11620,7 @@
               </a:ln>
               <a:extLst>
                 <a:ext uri="{91240B29-F687-4f45-9708-019B960494DF}">
-                  <a14:hiddenLine xmlns="" xmlns:a14="http://schemas.microsoft.com/office/drawing/2010/main" w="9525">
+                  <a14:hiddenLine xmlns:a14="http://schemas.microsoft.com/office/drawing/2010/main" xmlns="" w="9525">
                     <a:solidFill>
                       <a:srgbClr val="000000"/>
                     </a:solidFill>
@@ -11734,7 +11735,7 @@
               </a:ln>
               <a:extLst>
                 <a:ext uri="{91240B29-F687-4f45-9708-019B960494DF}">
-                  <a14:hiddenLine xmlns="" xmlns:a14="http://schemas.microsoft.com/office/drawing/2010/main" w="9525">
+                  <a14:hiddenLine xmlns:a14="http://schemas.microsoft.com/office/drawing/2010/main" xmlns="" w="9525">
                     <a:solidFill>
                       <a:srgbClr val="000000"/>
                     </a:solidFill>
@@ -11824,7 +11825,7 @@
               </a:ln>
               <a:extLst>
                 <a:ext uri="{91240B29-F687-4f45-9708-019B960494DF}">
-                  <a14:hiddenLine xmlns="" xmlns:a14="http://schemas.microsoft.com/office/drawing/2010/main" w="9525">
+                  <a14:hiddenLine xmlns:a14="http://schemas.microsoft.com/office/drawing/2010/main" xmlns="" w="9525">
                     <a:solidFill>
                       <a:srgbClr val="000000"/>
                     </a:solidFill>
@@ -11889,7 +11890,7 @@
               </a:ln>
               <a:extLst>
                 <a:ext uri="{91240B29-F687-4f45-9708-019B960494DF}">
-                  <a14:hiddenLine xmlns="" xmlns:a14="http://schemas.microsoft.com/office/drawing/2010/main" w="9525">
+                  <a14:hiddenLine xmlns:a14="http://schemas.microsoft.com/office/drawing/2010/main" xmlns="" w="9525">
                     <a:solidFill>
                       <a:srgbClr val="000000"/>
                     </a:solidFill>
@@ -11979,7 +11980,7 @@
               </a:ln>
               <a:extLst>
                 <a:ext uri="{91240B29-F687-4f45-9708-019B960494DF}">
-                  <a14:hiddenLine xmlns="" xmlns:a14="http://schemas.microsoft.com/office/drawing/2010/main" w="9525">
+                  <a14:hiddenLine xmlns:a14="http://schemas.microsoft.com/office/drawing/2010/main" xmlns="" w="9525">
                     <a:solidFill>
                       <a:srgbClr val="000000"/>
                     </a:solidFill>
@@ -12047,7 +12048,7 @@
               </a:ln>
               <a:extLst>
                 <a:ext uri="{91240B29-F687-4f45-9708-019B960494DF}">
-                  <a14:hiddenLine xmlns="" xmlns:a14="http://schemas.microsoft.com/office/drawing/2010/main" w="9525">
+                  <a14:hiddenLine xmlns:a14="http://schemas.microsoft.com/office/drawing/2010/main" xmlns="" w="9525">
                     <a:solidFill>
                       <a:srgbClr val="000000"/>
                     </a:solidFill>
@@ -12137,7 +12138,7 @@
               </a:ln>
               <a:extLst>
                 <a:ext uri="{91240B29-F687-4f45-9708-019B960494DF}">
-                  <a14:hiddenLine xmlns="" xmlns:a14="http://schemas.microsoft.com/office/drawing/2010/main" w="9525">
+                  <a14:hiddenLine xmlns:a14="http://schemas.microsoft.com/office/drawing/2010/main" xmlns="" w="9525">
                     <a:solidFill>
                       <a:srgbClr val="000000"/>
                     </a:solidFill>
@@ -12205,7 +12206,7 @@
               </a:ln>
               <a:extLst>
                 <a:ext uri="{91240B29-F687-4f45-9708-019B960494DF}">
-                  <a14:hiddenLine xmlns="" xmlns:a14="http://schemas.microsoft.com/office/drawing/2010/main" w="9525">
+                  <a14:hiddenLine xmlns:a14="http://schemas.microsoft.com/office/drawing/2010/main" xmlns="" w="9525">
                     <a:solidFill>
                       <a:srgbClr val="000000"/>
                     </a:solidFill>
@@ -12295,7 +12296,7 @@
               </a:ln>
               <a:extLst>
                 <a:ext uri="{91240B29-F687-4f45-9708-019B960494DF}">
-                  <a14:hiddenLine xmlns="" xmlns:a14="http://schemas.microsoft.com/office/drawing/2010/main" w="9525">
+                  <a14:hiddenLine xmlns:a14="http://schemas.microsoft.com/office/drawing/2010/main" xmlns="" w="9525">
                     <a:solidFill>
                       <a:srgbClr val="000000"/>
                     </a:solidFill>
@@ -12329,7 +12330,7 @@
               </a:ln>
               <a:extLst>
                 <a:ext uri="{91240B29-F687-4f45-9708-019B960494DF}">
-                  <a14:hiddenLine xmlns="" xmlns:a14="http://schemas.microsoft.com/office/drawing/2010/main" w="9525">
+                  <a14:hiddenLine xmlns:a14="http://schemas.microsoft.com/office/drawing/2010/main" xmlns="" w="9525">
                     <a:solidFill>
                       <a:srgbClr val="000000"/>
                     </a:solidFill>
@@ -12469,7 +12470,7 @@
           <a:p>
             <a:fld id="{EC4347D3-4C9A-C240-8F14-750059DFEEB0}" type="datetimeFigureOut">
               <a:rPr lang="en-US" smtClean="0"/>
-              <a:t>9/12/23</a:t>
+              <a:t>9/14/23</a:t>
             </a:fld>
             <a:endParaRPr lang="en-US"/>
           </a:p>
@@ -14028,6 +14029,183 @@
 </p:sld>
 </file>
 
+<file path=ppt/slides/slide8.xml><?xml version="1.0" encoding="utf-8"?>
+<p:sld xmlns:a="http://schemas.openxmlformats.org/drawingml/2006/main" xmlns:r="http://schemas.openxmlformats.org/officeDocument/2006/relationships" xmlns:p="http://schemas.openxmlformats.org/presentationml/2006/main">
+  <p:cSld>
+    <p:spTree>
+      <p:nvGrpSpPr>
+        <p:cNvPr id="1" name=""/>
+        <p:cNvGrpSpPr/>
+        <p:nvPr/>
+      </p:nvGrpSpPr>
+      <p:grpSpPr>
+        <a:xfrm>
+          <a:off x="0" y="0"/>
+          <a:ext cx="0" cy="0"/>
+          <a:chOff x="0" y="0"/>
+          <a:chExt cx="0" cy="0"/>
+        </a:xfrm>
+      </p:grpSpPr>
+      <p:sp>
+        <p:nvSpPr>
+          <p:cNvPr id="6146" name="Rectangle 2"/>
+          <p:cNvSpPr>
+            <a:spLocks noGrp="1" noChangeArrowheads="1"/>
+          </p:cNvSpPr>
+          <p:nvPr>
+            <p:ph type="title"/>
+            <p:custDataLst>
+              <p:tags r:id="rId1"/>
+            </p:custDataLst>
+          </p:nvPr>
+        </p:nvSpPr>
+        <p:spPr>
+          <a:xfrm>
+            <a:off x="1141413" y="284084"/>
+            <a:ext cx="9905998" cy="620791"/>
+          </a:xfrm>
+        </p:spPr>
+        <p:txBody>
+          <a:bodyPr/>
+          <a:lstStyle/>
+          <a:p>
+            <a:pPr algn="ctr"/>
+            <a:r>
+              <a:rPr lang="en-US" dirty="0"/>
+              <a:t>Lecture 8: Thu. Sep. 14</a:t>
+            </a:r>
+          </a:p>
+        </p:txBody>
+      </p:sp>
+      <p:sp>
+        <p:nvSpPr>
+          <p:cNvPr id="6147" name="Rectangle 3"/>
+          <p:cNvSpPr>
+            <a:spLocks noGrp="1" noChangeArrowheads="1"/>
+          </p:cNvSpPr>
+          <p:nvPr>
+            <p:ph idx="1"/>
+            <p:custDataLst>
+              <p:tags r:id="rId2"/>
+            </p:custDataLst>
+          </p:nvPr>
+        </p:nvSpPr>
+        <p:spPr>
+          <a:xfrm>
+            <a:off x="1141413" y="1123950"/>
+            <a:ext cx="9970724" cy="5149850"/>
+          </a:xfrm>
+        </p:spPr>
+        <p:txBody>
+          <a:bodyPr>
+            <a:normAutofit fontScale="92500"/>
+          </a:bodyPr>
+          <a:lstStyle/>
+          <a:p>
+            <a:r>
+              <a:rPr lang="en-US" dirty="0"/>
+              <a:t>DMT2 is </a:t>
+            </a:r>
+            <a:r>
+              <a:rPr lang="en-US" b="1" i="1" u="sng" dirty="0"/>
+              <a:t>going to be great</a:t>
+            </a:r>
+            <a:r>
+              <a:rPr lang="en-US" dirty="0"/>
+              <a:t>! Let’s learn a lot of stuff together!</a:t>
+            </a:r>
+          </a:p>
+          <a:p>
+            <a:r>
+              <a:rPr lang="en-US" dirty="0"/>
+              <a:t>First </a:t>
+            </a:r>
+            <a:r>
+              <a:rPr lang="en-US" dirty="0" err="1"/>
+              <a:t>hw</a:t>
+            </a:r>
+            <a:r>
+              <a:rPr lang="en-US" dirty="0"/>
+              <a:t> is graded and returned. Some important points:</a:t>
+            </a:r>
+          </a:p>
+          <a:p>
+            <a:pPr lvl="1"/>
+            <a:r>
+              <a:rPr lang="en-US" dirty="0"/>
+              <a:t>We were very lenient on grading. 10/10 does not = your answers were perfect.</a:t>
+            </a:r>
+          </a:p>
+          <a:p>
+            <a:pPr lvl="1"/>
+            <a:r>
+              <a:rPr lang="en-US" dirty="0"/>
+              <a:t>Cannot release solutions because of extensions, but TAs will liberally walk you through model solutions if you want it. You are also welcome to discuss with anyone else at this point.</a:t>
+            </a:r>
+          </a:p>
+          <a:p>
+            <a:r>
+              <a:rPr lang="en-US" dirty="0"/>
+              <a:t>HW 2 (set cardinality) is due next Thursday. You should be working on it right now.</a:t>
+            </a:r>
+          </a:p>
+          <a:p>
+            <a:r>
+              <a:rPr lang="en-US" dirty="0"/>
+              <a:t>Please submit extensions before the due date! Late extension requests might be rejected!</a:t>
+            </a:r>
+          </a:p>
+          <a:p>
+            <a:r>
+              <a:rPr lang="en-US" dirty="0"/>
+              <a:t>Office hours going ok so far? Any issues</a:t>
+            </a:r>
+          </a:p>
+          <a:p>
+            <a:r>
+              <a:rPr lang="en-US" dirty="0"/>
+              <a:t>Today we continue with Regular languages and continue with the NFA!</a:t>
+            </a:r>
+          </a:p>
+        </p:txBody>
+      </p:sp>
+      <p:sp>
+        <p:nvSpPr>
+          <p:cNvPr id="4" name="Slide Number Placeholder 3"/>
+          <p:cNvSpPr>
+            <a:spLocks noGrp="1"/>
+          </p:cNvSpPr>
+          <p:nvPr>
+            <p:ph type="sldNum" sz="quarter" idx="12"/>
+          </p:nvPr>
+        </p:nvSpPr>
+        <p:spPr/>
+        <p:txBody>
+          <a:bodyPr/>
+          <a:lstStyle/>
+          <a:p>
+            <a:fld id="{F26D9103-0C5C-48AC-B68E-3ED2C1647047}" type="slidenum">
+              <a:rPr lang="en-US" smtClean="0"/>
+              <a:pPr/>
+              <a:t>8</a:t>
+            </a:fld>
+            <a:endParaRPr lang="en-US" dirty="0"/>
+          </a:p>
+        </p:txBody>
+      </p:sp>
+    </p:spTree>
+    <p:extLst>
+      <p:ext uri="{BB962C8B-B14F-4D97-AF65-F5344CB8AC3E}">
+        <p14:creationId xmlns:p14="http://schemas.microsoft.com/office/powerpoint/2010/main" val="291119010"/>
+      </p:ext>
+    </p:extLst>
+  </p:cSld>
+  <p:clrMapOvr>
+    <a:masterClrMapping/>
+  </p:clrMapOvr>
+</p:sld>
+</file>
+
 <file path=ppt/tags/tag1.xml><?xml version="1.0" encoding="utf-8"?>
 <p:tagLst xmlns:a="http://schemas.openxmlformats.org/drawingml/2006/main" xmlns:r="http://schemas.openxmlformats.org/officeDocument/2006/relationships" xmlns:p="http://schemas.openxmlformats.org/presentationml/2006/main">
   <p:tag name="_INSTRUCTOR VIEW19C14C36-AC8E-43BC-9DB6-C2AAF774C7DC|PANE__TAG" val="_"/>
@@ -14047,6 +14225,18 @@
 </file>
 
 <file path=ppt/tags/tag12.xml><?xml version="1.0" encoding="utf-8"?>
+<p:tagLst xmlns:a="http://schemas.openxmlformats.org/drawingml/2006/main" xmlns:r="http://schemas.openxmlformats.org/officeDocument/2006/relationships" xmlns:p="http://schemas.openxmlformats.org/presentationml/2006/main">
+  <p:tag name="_INSTRUCTOR VIEW19C14C36-AC8E-43BC-9DB6-C2AAF774C7DC|PANE__TAG" val="_"/>
+</p:tagLst>
+</file>
+
+<file path=ppt/tags/tag13.xml><?xml version="1.0" encoding="utf-8"?>
+<p:tagLst xmlns:a="http://schemas.openxmlformats.org/drawingml/2006/main" xmlns:r="http://schemas.openxmlformats.org/officeDocument/2006/relationships" xmlns:p="http://schemas.openxmlformats.org/presentationml/2006/main">
+  <p:tag name="_INSTRUCTOR VIEW19C14C36-AC8E-43BC-9DB6-C2AAF774C7DC|PANE__TAG" val="_"/>
+</p:tagLst>
+</file>
+
+<file path=ppt/tags/tag14.xml><?xml version="1.0" encoding="utf-8"?>
 <p:tagLst xmlns:a="http://schemas.openxmlformats.org/drawingml/2006/main" xmlns:r="http://schemas.openxmlformats.org/officeDocument/2006/relationships" xmlns:p="http://schemas.openxmlformats.org/presentationml/2006/main">
   <p:tag name="_INSTRUCTOR VIEW19C14C36-AC8E-43BC-9DB6-C2AAF774C7DC|PANE__TAG" val="_"/>
 </p:tagLst>

</xml_diff>

<commit_message>
announce and small updates to slides
</commit_message>
<xml_diff>
--- a/slides/00-DailyAnnouncements.pptx
+++ b/slides/00-DailyAnnouncements.pptx
@@ -5,7 +5,7 @@
     <p:sldMasterId id="2147484006" r:id="rId1"/>
   </p:sldMasterIdLst>
   <p:notesMasterIdLst>
-    <p:notesMasterId r:id="rId13"/>
+    <p:notesMasterId r:id="rId14"/>
   </p:notesMasterIdLst>
   <p:sldIdLst>
     <p:sldId id="256" r:id="rId2"/>
@@ -19,6 +19,7 @@
     <p:sldId id="512" r:id="rId10"/>
     <p:sldId id="513" r:id="rId11"/>
     <p:sldId id="514" r:id="rId12"/>
+    <p:sldId id="515" r:id="rId13"/>
   </p:sldIdLst>
   <p:sldSz cx="12192000" cy="6858000"/>
   <p:notesSz cx="6858000" cy="9144000"/>
@@ -207,7 +208,7 @@
           <a:p>
             <a:fld id="{C5B45307-6ED4-B142-BD64-10F739779302}" type="datetimeFigureOut">
               <a:rPr lang="en-US" smtClean="0"/>
-              <a:t>9/28/23</a:t>
+              <a:t>10/5/23</a:t>
             </a:fld>
             <a:endParaRPr lang="en-US"/>
           </a:p>
@@ -615,7 +616,7 @@
           <a:noFill/>
           <a:extLst>
             <a:ext uri="{909E8E84-426E-40dd-AFC4-6F175D3DCCD1}">
-              <a14:hiddenFill xmlns="" xmlns:a14="http://schemas.microsoft.com/office/drawing/2010/main">
+              <a14:hiddenFill xmlns:a14="http://schemas.microsoft.com/office/drawing/2010/main" xmlns="">
                 <a:solidFill>
                   <a:srgbClr val="FFFFFF"/>
                 </a:solidFill>
@@ -674,7 +675,7 @@
             </a:ln>
             <a:extLst>
               <a:ext uri="{91240B29-F687-4f45-9708-019B960494DF}">
-                <a14:hiddenLine xmlns="" xmlns:a14="http://schemas.microsoft.com/office/drawing/2010/main" w="9525">
+                <a14:hiddenLine xmlns:a14="http://schemas.microsoft.com/office/drawing/2010/main" xmlns="" w="9525">
                   <a:solidFill>
                     <a:srgbClr val="000000"/>
                   </a:solidFill>
@@ -764,7 +765,7 @@
             </a:ln>
             <a:extLst>
               <a:ext uri="{91240B29-F687-4f45-9708-019B960494DF}">
-                <a14:hiddenLine xmlns="" xmlns:a14="http://schemas.microsoft.com/office/drawing/2010/main" w="9525">
+                <a14:hiddenLine xmlns:a14="http://schemas.microsoft.com/office/drawing/2010/main" xmlns="" w="9525">
                   <a:solidFill>
                     <a:srgbClr val="000000"/>
                   </a:solidFill>
@@ -854,7 +855,7 @@
             </a:ln>
             <a:extLst>
               <a:ext uri="{91240B29-F687-4f45-9708-019B960494DF}">
-                <a14:hiddenLine xmlns="" xmlns:a14="http://schemas.microsoft.com/office/drawing/2010/main" w="9525">
+                <a14:hiddenLine xmlns:a14="http://schemas.microsoft.com/office/drawing/2010/main" xmlns="" w="9525">
                   <a:solidFill>
                     <a:srgbClr val="000000"/>
                   </a:solidFill>
@@ -888,7 +889,7 @@
             </a:ln>
             <a:extLst>
               <a:ext uri="{91240B29-F687-4f45-9708-019B960494DF}">
-                <a14:hiddenLine xmlns="" xmlns:a14="http://schemas.microsoft.com/office/drawing/2010/main" w="9525">
+                <a14:hiddenLine xmlns:a14="http://schemas.microsoft.com/office/drawing/2010/main" xmlns="" w="9525">
                   <a:solidFill>
                     <a:srgbClr val="000000"/>
                   </a:solidFill>
@@ -978,7 +979,7 @@
             </a:ln>
             <a:extLst>
               <a:ext uri="{91240B29-F687-4f45-9708-019B960494DF}">
-                <a14:hiddenLine xmlns="" xmlns:a14="http://schemas.microsoft.com/office/drawing/2010/main" w="9525">
+                <a14:hiddenLine xmlns:a14="http://schemas.microsoft.com/office/drawing/2010/main" xmlns="" w="9525">
                   <a:solidFill>
                     <a:srgbClr val="000000"/>
                   </a:solidFill>
@@ -1040,7 +1041,7 @@
             </a:ln>
             <a:extLst>
               <a:ext uri="{91240B29-F687-4f45-9708-019B960494DF}">
-                <a14:hiddenLine xmlns="" xmlns:a14="http://schemas.microsoft.com/office/drawing/2010/main" w="9525">
+                <a14:hiddenLine xmlns:a14="http://schemas.microsoft.com/office/drawing/2010/main" xmlns="" w="9525">
                   <a:solidFill>
                     <a:srgbClr val="000000"/>
                   </a:solidFill>
@@ -1102,7 +1103,7 @@
             </a:ln>
             <a:extLst>
               <a:ext uri="{91240B29-F687-4f45-9708-019B960494DF}">
-                <a14:hiddenLine xmlns="" xmlns:a14="http://schemas.microsoft.com/office/drawing/2010/main" w="9525">
+                <a14:hiddenLine xmlns:a14="http://schemas.microsoft.com/office/drawing/2010/main" xmlns="" w="9525">
                   <a:solidFill>
                     <a:srgbClr val="000000"/>
                   </a:solidFill>
@@ -1192,7 +1193,7 @@
             </a:ln>
             <a:extLst>
               <a:ext uri="{91240B29-F687-4f45-9708-019B960494DF}">
-                <a14:hiddenLine xmlns="" xmlns:a14="http://schemas.microsoft.com/office/drawing/2010/main" w="9525">
+                <a14:hiddenLine xmlns:a14="http://schemas.microsoft.com/office/drawing/2010/main" xmlns="" w="9525">
                   <a:solidFill>
                     <a:srgbClr val="000000"/>
                   </a:solidFill>
@@ -1254,7 +1255,7 @@
             </a:ln>
             <a:extLst>
               <a:ext uri="{91240B29-F687-4f45-9708-019B960494DF}">
-                <a14:hiddenLine xmlns="" xmlns:a14="http://schemas.microsoft.com/office/drawing/2010/main" w="9525">
+                <a14:hiddenLine xmlns:a14="http://schemas.microsoft.com/office/drawing/2010/main" xmlns="" w="9525">
                   <a:solidFill>
                     <a:srgbClr val="000000"/>
                   </a:solidFill>
@@ -1316,7 +1317,7 @@
             </a:ln>
             <a:extLst>
               <a:ext uri="{91240B29-F687-4f45-9708-019B960494DF}">
-                <a14:hiddenLine xmlns="" xmlns:a14="http://schemas.microsoft.com/office/drawing/2010/main" w="9525">
+                <a14:hiddenLine xmlns:a14="http://schemas.microsoft.com/office/drawing/2010/main" xmlns="" w="9525">
                   <a:solidFill>
                     <a:srgbClr val="000000"/>
                   </a:solidFill>
@@ -1406,7 +1407,7 @@
             </a:ln>
             <a:extLst>
               <a:ext uri="{91240B29-F687-4f45-9708-019B960494DF}">
-                <a14:hiddenLine xmlns="" xmlns:a14="http://schemas.microsoft.com/office/drawing/2010/main" w="9525">
+                <a14:hiddenLine xmlns:a14="http://schemas.microsoft.com/office/drawing/2010/main" xmlns="" w="9525">
                   <a:solidFill>
                     <a:srgbClr val="000000"/>
                   </a:solidFill>
@@ -1496,7 +1497,7 @@
             </a:ln>
             <a:extLst>
               <a:ext uri="{91240B29-F687-4f45-9708-019B960494DF}">
-                <a14:hiddenLine xmlns="" xmlns:a14="http://schemas.microsoft.com/office/drawing/2010/main" w="9525">
+                <a14:hiddenLine xmlns:a14="http://schemas.microsoft.com/office/drawing/2010/main" xmlns="" w="9525">
                   <a:solidFill>
                     <a:srgbClr val="000000"/>
                   </a:solidFill>
@@ -1558,7 +1559,7 @@
             </a:ln>
             <a:extLst>
               <a:ext uri="{91240B29-F687-4f45-9708-019B960494DF}">
-                <a14:hiddenLine xmlns="" xmlns:a14="http://schemas.microsoft.com/office/drawing/2010/main" w="9525">
+                <a14:hiddenLine xmlns:a14="http://schemas.microsoft.com/office/drawing/2010/main" xmlns="" w="9525">
                   <a:solidFill>
                     <a:srgbClr val="000000"/>
                   </a:solidFill>
@@ -1668,7 +1669,7 @@
             </a:ln>
             <a:extLst>
               <a:ext uri="{91240B29-F687-4f45-9708-019B960494DF}">
-                <a14:hiddenLine xmlns="" xmlns:a14="http://schemas.microsoft.com/office/drawing/2010/main" w="9525">
+                <a14:hiddenLine xmlns:a14="http://schemas.microsoft.com/office/drawing/2010/main" xmlns="" w="9525">
                   <a:solidFill>
                     <a:srgbClr val="000000"/>
                   </a:solidFill>
@@ -1730,7 +1731,7 @@
             </a:ln>
             <a:extLst>
               <a:ext uri="{91240B29-F687-4f45-9708-019B960494DF}">
-                <a14:hiddenLine xmlns="" xmlns:a14="http://schemas.microsoft.com/office/drawing/2010/main" w="9525">
+                <a14:hiddenLine xmlns:a14="http://schemas.microsoft.com/office/drawing/2010/main" xmlns="" w="9525">
                   <a:solidFill>
                     <a:srgbClr val="000000"/>
                   </a:solidFill>
@@ -1820,7 +1821,7 @@
             </a:ln>
             <a:extLst>
               <a:ext uri="{91240B29-F687-4f45-9708-019B960494DF}">
-                <a14:hiddenLine xmlns="" xmlns:a14="http://schemas.microsoft.com/office/drawing/2010/main" w="9525">
+                <a14:hiddenLine xmlns:a14="http://schemas.microsoft.com/office/drawing/2010/main" xmlns="" w="9525">
                   <a:solidFill>
                     <a:srgbClr val="000000"/>
                   </a:solidFill>
@@ -1910,7 +1911,7 @@
             </a:ln>
             <a:extLst>
               <a:ext uri="{91240B29-F687-4f45-9708-019B960494DF}">
-                <a14:hiddenLine xmlns="" xmlns:a14="http://schemas.microsoft.com/office/drawing/2010/main" w="9525">
+                <a14:hiddenLine xmlns:a14="http://schemas.microsoft.com/office/drawing/2010/main" xmlns="" w="9525">
                   <a:solidFill>
                     <a:srgbClr val="000000"/>
                   </a:solidFill>
@@ -1972,7 +1973,7 @@
             </a:ln>
             <a:extLst>
               <a:ext uri="{91240B29-F687-4f45-9708-019B960494DF}">
-                <a14:hiddenLine xmlns="" xmlns:a14="http://schemas.microsoft.com/office/drawing/2010/main" w="9525">
+                <a14:hiddenLine xmlns:a14="http://schemas.microsoft.com/office/drawing/2010/main" xmlns="" w="9525">
                   <a:solidFill>
                     <a:srgbClr val="000000"/>
                   </a:solidFill>
@@ -2062,7 +2063,7 @@
             </a:ln>
             <a:extLst>
               <a:ext uri="{91240B29-F687-4f45-9708-019B960494DF}">
-                <a14:hiddenLine xmlns="" xmlns:a14="http://schemas.microsoft.com/office/drawing/2010/main" w="9525">
+                <a14:hiddenLine xmlns:a14="http://schemas.microsoft.com/office/drawing/2010/main" xmlns="" w="9525">
                   <a:solidFill>
                     <a:srgbClr val="000000"/>
                   </a:solidFill>
@@ -2152,7 +2153,7 @@
             </a:ln>
             <a:extLst>
               <a:ext uri="{91240B29-F687-4f45-9708-019B960494DF}">
-                <a14:hiddenLine xmlns="" xmlns:a14="http://schemas.microsoft.com/office/drawing/2010/main" w="9525">
+                <a14:hiddenLine xmlns:a14="http://schemas.microsoft.com/office/drawing/2010/main" xmlns="" w="9525">
                   <a:solidFill>
                     <a:srgbClr val="000000"/>
                   </a:solidFill>
@@ -2208,7 +2209,7 @@
             </a:ln>
             <a:extLst>
               <a:ext uri="{91240B29-F687-4f45-9708-019B960494DF}">
-                <a14:hiddenLine xmlns="" xmlns:a14="http://schemas.microsoft.com/office/drawing/2010/main" w="9525">
+                <a14:hiddenLine xmlns:a14="http://schemas.microsoft.com/office/drawing/2010/main" xmlns="" w="9525">
                   <a:solidFill>
                     <a:srgbClr val="000000"/>
                   </a:solidFill>
@@ -2298,7 +2299,7 @@
             </a:ln>
             <a:extLst>
               <a:ext uri="{91240B29-F687-4f45-9708-019B960494DF}">
-                <a14:hiddenLine xmlns="" xmlns:a14="http://schemas.microsoft.com/office/drawing/2010/main" w="9525">
+                <a14:hiddenLine xmlns:a14="http://schemas.microsoft.com/office/drawing/2010/main" xmlns="" w="9525">
                   <a:solidFill>
                     <a:srgbClr val="000000"/>
                   </a:solidFill>
@@ -2354,7 +2355,7 @@
             </a:ln>
             <a:extLst>
               <a:ext uri="{91240B29-F687-4f45-9708-019B960494DF}">
-                <a14:hiddenLine xmlns="" xmlns:a14="http://schemas.microsoft.com/office/drawing/2010/main" w="9525">
+                <a14:hiddenLine xmlns:a14="http://schemas.microsoft.com/office/drawing/2010/main" xmlns="" w="9525">
                   <a:solidFill>
                     <a:srgbClr val="000000"/>
                   </a:solidFill>
@@ -2444,7 +2445,7 @@
             </a:ln>
             <a:extLst>
               <a:ext uri="{91240B29-F687-4f45-9708-019B960494DF}">
-                <a14:hiddenLine xmlns="" xmlns:a14="http://schemas.microsoft.com/office/drawing/2010/main" w="9525">
+                <a14:hiddenLine xmlns:a14="http://schemas.microsoft.com/office/drawing/2010/main" xmlns="" w="9525">
                   <a:solidFill>
                     <a:srgbClr val="000000"/>
                   </a:solidFill>
@@ -2512,7 +2513,7 @@
             </a:ln>
             <a:extLst>
               <a:ext uri="{91240B29-F687-4f45-9708-019B960494DF}">
-                <a14:hiddenLine xmlns="" xmlns:a14="http://schemas.microsoft.com/office/drawing/2010/main" w="9525">
+                <a14:hiddenLine xmlns:a14="http://schemas.microsoft.com/office/drawing/2010/main" xmlns="" w="9525">
                   <a:solidFill>
                     <a:srgbClr val="000000"/>
                   </a:solidFill>
@@ -2602,7 +2603,7 @@
             </a:ln>
             <a:extLst>
               <a:ext uri="{91240B29-F687-4f45-9708-019B960494DF}">
-                <a14:hiddenLine xmlns="" xmlns:a14="http://schemas.microsoft.com/office/drawing/2010/main" w="9525">
+                <a14:hiddenLine xmlns:a14="http://schemas.microsoft.com/office/drawing/2010/main" xmlns="" w="9525">
                   <a:solidFill>
                     <a:srgbClr val="000000"/>
                   </a:solidFill>
@@ -2670,7 +2671,7 @@
             </a:ln>
             <a:extLst>
               <a:ext uri="{91240B29-F687-4f45-9708-019B960494DF}">
-                <a14:hiddenLine xmlns="" xmlns:a14="http://schemas.microsoft.com/office/drawing/2010/main" w="9525">
+                <a14:hiddenLine xmlns:a14="http://schemas.microsoft.com/office/drawing/2010/main" xmlns="" w="9525">
                   <a:solidFill>
                     <a:srgbClr val="000000"/>
                   </a:solidFill>
@@ -2760,7 +2761,7 @@
             </a:ln>
             <a:extLst>
               <a:ext uri="{91240B29-F687-4f45-9708-019B960494DF}">
-                <a14:hiddenLine xmlns="" xmlns:a14="http://schemas.microsoft.com/office/drawing/2010/main" w="9525">
+                <a14:hiddenLine xmlns:a14="http://schemas.microsoft.com/office/drawing/2010/main" xmlns="" w="9525">
                   <a:solidFill>
                     <a:srgbClr val="000000"/>
                   </a:solidFill>
@@ -2794,7 +2795,7 @@
             </a:ln>
             <a:extLst>
               <a:ext uri="{91240B29-F687-4f45-9708-019B960494DF}">
-                <a14:hiddenLine xmlns="" xmlns:a14="http://schemas.microsoft.com/office/drawing/2010/main" w="9525">
+                <a14:hiddenLine xmlns:a14="http://schemas.microsoft.com/office/drawing/2010/main" xmlns="" w="9525">
                   <a:solidFill>
                     <a:srgbClr val="000000"/>
                   </a:solidFill>
@@ -2884,7 +2885,7 @@
             </a:ln>
             <a:extLst>
               <a:ext uri="{91240B29-F687-4f45-9708-019B960494DF}">
-                <a14:hiddenLine xmlns="" xmlns:a14="http://schemas.microsoft.com/office/drawing/2010/main" w="9525">
+                <a14:hiddenLine xmlns:a14="http://schemas.microsoft.com/office/drawing/2010/main" xmlns="" w="9525">
                   <a:solidFill>
                     <a:srgbClr val="000000"/>
                   </a:solidFill>
@@ -2946,7 +2947,7 @@
             </a:ln>
             <a:extLst>
               <a:ext uri="{91240B29-F687-4f45-9708-019B960494DF}">
-                <a14:hiddenLine xmlns="" xmlns:a14="http://schemas.microsoft.com/office/drawing/2010/main" w="9525">
+                <a14:hiddenLine xmlns:a14="http://schemas.microsoft.com/office/drawing/2010/main" xmlns="" w="9525">
                   <a:solidFill>
                     <a:srgbClr val="000000"/>
                   </a:solidFill>
@@ -3008,7 +3009,7 @@
             </a:ln>
             <a:extLst>
               <a:ext uri="{91240B29-F687-4f45-9708-019B960494DF}">
-                <a14:hiddenLine xmlns="" xmlns:a14="http://schemas.microsoft.com/office/drawing/2010/main" w="9525">
+                <a14:hiddenLine xmlns:a14="http://schemas.microsoft.com/office/drawing/2010/main" xmlns="" w="9525">
                   <a:solidFill>
                     <a:srgbClr val="000000"/>
                   </a:solidFill>
@@ -3098,7 +3099,7 @@
             </a:ln>
             <a:extLst>
               <a:ext uri="{91240B29-F687-4f45-9708-019B960494DF}">
-                <a14:hiddenLine xmlns="" xmlns:a14="http://schemas.microsoft.com/office/drawing/2010/main" w="9525">
+                <a14:hiddenLine xmlns:a14="http://schemas.microsoft.com/office/drawing/2010/main" xmlns="" w="9525">
                   <a:solidFill>
                     <a:srgbClr val="000000"/>
                   </a:solidFill>
@@ -3166,7 +3167,7 @@
             </a:ln>
             <a:extLst>
               <a:ext uri="{91240B29-F687-4f45-9708-019B960494DF}">
-                <a14:hiddenLine xmlns="" xmlns:a14="http://schemas.microsoft.com/office/drawing/2010/main" w="9525">
+                <a14:hiddenLine xmlns:a14="http://schemas.microsoft.com/office/drawing/2010/main" xmlns="" w="9525">
                   <a:solidFill>
                     <a:srgbClr val="000000"/>
                   </a:solidFill>
@@ -3228,7 +3229,7 @@
             </a:ln>
             <a:extLst>
               <a:ext uri="{91240B29-F687-4f45-9708-019B960494DF}">
-                <a14:hiddenLine xmlns="" xmlns:a14="http://schemas.microsoft.com/office/drawing/2010/main" w="9525">
+                <a14:hiddenLine xmlns:a14="http://schemas.microsoft.com/office/drawing/2010/main" xmlns="" w="9525">
                   <a:solidFill>
                     <a:srgbClr val="000000"/>
                   </a:solidFill>
@@ -3318,7 +3319,7 @@
             </a:ln>
             <a:extLst>
               <a:ext uri="{91240B29-F687-4f45-9708-019B960494DF}">
-                <a14:hiddenLine xmlns="" xmlns:a14="http://schemas.microsoft.com/office/drawing/2010/main" w="9525">
+                <a14:hiddenLine xmlns:a14="http://schemas.microsoft.com/office/drawing/2010/main" xmlns="" w="9525">
                   <a:solidFill>
                     <a:srgbClr val="000000"/>
                   </a:solidFill>
@@ -3380,7 +3381,7 @@
             </a:ln>
             <a:extLst>
               <a:ext uri="{91240B29-F687-4f45-9708-019B960494DF}">
-                <a14:hiddenLine xmlns="" xmlns:a14="http://schemas.microsoft.com/office/drawing/2010/main" w="9525">
+                <a14:hiddenLine xmlns:a14="http://schemas.microsoft.com/office/drawing/2010/main" xmlns="" w="9525">
                   <a:solidFill>
                     <a:srgbClr val="000000"/>
                   </a:solidFill>
@@ -3470,7 +3471,7 @@
             </a:ln>
             <a:extLst>
               <a:ext uri="{91240B29-F687-4f45-9708-019B960494DF}">
-                <a14:hiddenLine xmlns="" xmlns:a14="http://schemas.microsoft.com/office/drawing/2010/main" w="9525">
+                <a14:hiddenLine xmlns:a14="http://schemas.microsoft.com/office/drawing/2010/main" xmlns="" w="9525">
                   <a:solidFill>
                     <a:srgbClr val="000000"/>
                   </a:solidFill>
@@ -3532,7 +3533,7 @@
             </a:ln>
             <a:extLst>
               <a:ext uri="{91240B29-F687-4f45-9708-019B960494DF}">
-                <a14:hiddenLine xmlns="" xmlns:a14="http://schemas.microsoft.com/office/drawing/2010/main" w="9525">
+                <a14:hiddenLine xmlns:a14="http://schemas.microsoft.com/office/drawing/2010/main" xmlns="" w="9525">
                   <a:solidFill>
                     <a:srgbClr val="000000"/>
                   </a:solidFill>
@@ -3622,7 +3623,7 @@
             </a:ln>
             <a:extLst>
               <a:ext uri="{91240B29-F687-4f45-9708-019B960494DF}">
-                <a14:hiddenLine xmlns="" xmlns:a14="http://schemas.microsoft.com/office/drawing/2010/main" w="9525">
+                <a14:hiddenLine xmlns:a14="http://schemas.microsoft.com/office/drawing/2010/main" xmlns="" w="9525">
                   <a:solidFill>
                     <a:srgbClr val="000000"/>
                   </a:solidFill>
@@ -3656,7 +3657,7 @@
             </a:ln>
             <a:extLst>
               <a:ext uri="{91240B29-F687-4f45-9708-019B960494DF}">
-                <a14:hiddenLine xmlns="" xmlns:a14="http://schemas.microsoft.com/office/drawing/2010/main" w="9525">
+                <a14:hiddenLine xmlns:a14="http://schemas.microsoft.com/office/drawing/2010/main" xmlns="" w="9525">
                   <a:solidFill>
                     <a:srgbClr val="000000"/>
                   </a:solidFill>
@@ -3721,7 +3722,7 @@
             </a:ln>
             <a:extLst>
               <a:ext uri="{91240B29-F687-4f45-9708-019B960494DF}">
-                <a14:hiddenLine xmlns="" xmlns:a14="http://schemas.microsoft.com/office/drawing/2010/main" w="9525">
+                <a14:hiddenLine xmlns:a14="http://schemas.microsoft.com/office/drawing/2010/main" xmlns="" w="9525">
                   <a:solidFill>
                     <a:srgbClr val="000000"/>
                   </a:solidFill>
@@ -3811,7 +3812,7 @@
             </a:ln>
             <a:extLst>
               <a:ext uri="{91240B29-F687-4f45-9708-019B960494DF}">
-                <a14:hiddenLine xmlns="" xmlns:a14="http://schemas.microsoft.com/office/drawing/2010/main" w="9525">
+                <a14:hiddenLine xmlns:a14="http://schemas.microsoft.com/office/drawing/2010/main" xmlns="" w="9525">
                   <a:solidFill>
                     <a:srgbClr val="000000"/>
                   </a:solidFill>
@@ -3873,7 +3874,7 @@
             </a:ln>
             <a:extLst>
               <a:ext uri="{91240B29-F687-4f45-9708-019B960494DF}">
-                <a14:hiddenLine xmlns="" xmlns:a14="http://schemas.microsoft.com/office/drawing/2010/main" w="9525">
+                <a14:hiddenLine xmlns:a14="http://schemas.microsoft.com/office/drawing/2010/main" xmlns="" w="9525">
                   <a:solidFill>
                     <a:srgbClr val="000000"/>
                   </a:solidFill>
@@ -3963,7 +3964,7 @@
             </a:ln>
             <a:extLst>
               <a:ext uri="{91240B29-F687-4f45-9708-019B960494DF}">
-                <a14:hiddenLine xmlns="" xmlns:a14="http://schemas.microsoft.com/office/drawing/2010/main" w="9525">
+                <a14:hiddenLine xmlns:a14="http://schemas.microsoft.com/office/drawing/2010/main" xmlns="" w="9525">
                   <a:solidFill>
                     <a:srgbClr val="000000"/>
                   </a:solidFill>
@@ -4053,7 +4054,7 @@
             </a:ln>
             <a:extLst>
               <a:ext uri="{91240B29-F687-4f45-9708-019B960494DF}">
-                <a14:hiddenLine xmlns="" xmlns:a14="http://schemas.microsoft.com/office/drawing/2010/main" w="9525">
+                <a14:hiddenLine xmlns:a14="http://schemas.microsoft.com/office/drawing/2010/main" xmlns="" w="9525">
                   <a:solidFill>
                     <a:srgbClr val="000000"/>
                   </a:solidFill>
@@ -4118,7 +4119,7 @@
             </a:ln>
             <a:extLst>
               <a:ext uri="{91240B29-F687-4f45-9708-019B960494DF}">
-                <a14:hiddenLine xmlns="" xmlns:a14="http://schemas.microsoft.com/office/drawing/2010/main" w="9525">
+                <a14:hiddenLine xmlns:a14="http://schemas.microsoft.com/office/drawing/2010/main" xmlns="" w="9525">
                   <a:solidFill>
                     <a:srgbClr val="000000"/>
                   </a:solidFill>
@@ -4180,7 +4181,7 @@
             </a:ln>
             <a:extLst>
               <a:ext uri="{91240B29-F687-4f45-9708-019B960494DF}">
-                <a14:hiddenLine xmlns="" xmlns:a14="http://schemas.microsoft.com/office/drawing/2010/main" w="9525">
+                <a14:hiddenLine xmlns:a14="http://schemas.microsoft.com/office/drawing/2010/main" xmlns="" w="9525">
                   <a:solidFill>
                     <a:srgbClr val="000000"/>
                   </a:solidFill>
@@ -4270,7 +4271,7 @@
             </a:ln>
             <a:extLst>
               <a:ext uri="{91240B29-F687-4f45-9708-019B960494DF}">
-                <a14:hiddenLine xmlns="" xmlns:a14="http://schemas.microsoft.com/office/drawing/2010/main" w="9525">
+                <a14:hiddenLine xmlns:a14="http://schemas.microsoft.com/office/drawing/2010/main" xmlns="" w="9525">
                   <a:solidFill>
                     <a:srgbClr val="000000"/>
                   </a:solidFill>
@@ -4360,7 +4361,7 @@
             </a:ln>
             <a:extLst>
               <a:ext uri="{91240B29-F687-4f45-9708-019B960494DF}">
-                <a14:hiddenLine xmlns="" xmlns:a14="http://schemas.microsoft.com/office/drawing/2010/main" w="9525">
+                <a14:hiddenLine xmlns:a14="http://schemas.microsoft.com/office/drawing/2010/main" xmlns="" w="9525">
                   <a:solidFill>
                     <a:srgbClr val="000000"/>
                   </a:solidFill>
@@ -4422,7 +4423,7 @@
             </a:ln>
             <a:extLst>
               <a:ext uri="{91240B29-F687-4f45-9708-019B960494DF}">
-                <a14:hiddenLine xmlns="" xmlns:a14="http://schemas.microsoft.com/office/drawing/2010/main" w="9525">
+                <a14:hiddenLine xmlns:a14="http://schemas.microsoft.com/office/drawing/2010/main" xmlns="" w="9525">
                   <a:solidFill>
                     <a:srgbClr val="000000"/>
                   </a:solidFill>
@@ -4542,7 +4543,7 @@
             </a:ln>
             <a:extLst>
               <a:ext uri="{91240B29-F687-4f45-9708-019B960494DF}">
-                <a14:hiddenLine xmlns="" xmlns:a14="http://schemas.microsoft.com/office/drawing/2010/main" w="9525">
+                <a14:hiddenLine xmlns:a14="http://schemas.microsoft.com/office/drawing/2010/main" xmlns="" w="9525">
                   <a:solidFill>
                     <a:srgbClr val="000000"/>
                   </a:solidFill>
@@ -4610,7 +4611,7 @@
             </a:ln>
             <a:extLst>
               <a:ext uri="{91240B29-F687-4f45-9708-019B960494DF}">
-                <a14:hiddenLine xmlns="" xmlns:a14="http://schemas.microsoft.com/office/drawing/2010/main" w="9525">
+                <a14:hiddenLine xmlns:a14="http://schemas.microsoft.com/office/drawing/2010/main" xmlns="" w="9525">
                   <a:solidFill>
                     <a:srgbClr val="000000"/>
                   </a:solidFill>
@@ -4700,7 +4701,7 @@
             </a:ln>
             <a:extLst>
               <a:ext uri="{91240B29-F687-4f45-9708-019B960494DF}">
-                <a14:hiddenLine xmlns="" xmlns:a14="http://schemas.microsoft.com/office/drawing/2010/main" w="9525">
+                <a14:hiddenLine xmlns:a14="http://schemas.microsoft.com/office/drawing/2010/main" xmlns="" w="9525">
                   <a:solidFill>
                     <a:srgbClr val="000000"/>
                   </a:solidFill>
@@ -4840,7 +4841,7 @@
           <a:p>
             <a:fld id="{EC4347D3-4C9A-C240-8F14-750059DFEEB0}" type="datetimeFigureOut">
               <a:rPr lang="en-US" smtClean="0"/>
-              <a:t>9/28/23</a:t>
+              <a:t>10/5/23</a:t>
             </a:fld>
             <a:endParaRPr lang="en-US"/>
           </a:p>
@@ -5107,7 +5108,7 @@
           <a:p>
             <a:fld id="{EC4347D3-4C9A-C240-8F14-750059DFEEB0}" type="datetimeFigureOut">
               <a:rPr lang="en-US" smtClean="0"/>
-              <a:t>9/28/23</a:t>
+              <a:t>10/5/23</a:t>
             </a:fld>
             <a:endParaRPr lang="en-US"/>
           </a:p>
@@ -5303,7 +5304,7 @@
           <a:p>
             <a:fld id="{EC4347D3-4C9A-C240-8F14-750059DFEEB0}" type="datetimeFigureOut">
               <a:rPr lang="en-US" smtClean="0"/>
-              <a:t>9/28/23</a:t>
+              <a:t>10/5/23</a:t>
             </a:fld>
             <a:endParaRPr lang="en-US"/>
           </a:p>
@@ -5566,7 +5567,7 @@
           <a:p>
             <a:fld id="{EC4347D3-4C9A-C240-8F14-750059DFEEB0}" type="datetimeFigureOut">
               <a:rPr lang="en-US" smtClean="0"/>
-              <a:t>9/28/23</a:t>
+              <a:t>10/5/23</a:t>
             </a:fld>
             <a:endParaRPr lang="en-US"/>
           </a:p>
@@ -6000,7 +6001,7 @@
           <a:p>
             <a:fld id="{EC4347D3-4C9A-C240-8F14-750059DFEEB0}" type="datetimeFigureOut">
               <a:rPr lang="en-US" smtClean="0"/>
-              <a:t>9/28/23</a:t>
+              <a:t>10/5/23</a:t>
             </a:fld>
             <a:endParaRPr lang="en-US"/>
           </a:p>
@@ -6546,7 +6547,7 @@
           <a:p>
             <a:fld id="{EC4347D3-4C9A-C240-8F14-750059DFEEB0}" type="datetimeFigureOut">
               <a:rPr lang="en-US" smtClean="0"/>
-              <a:t>9/28/23</a:t>
+              <a:t>10/5/23</a:t>
             </a:fld>
             <a:endParaRPr lang="en-US"/>
           </a:p>
@@ -7266,7 +7267,7 @@
           <a:p>
             <a:fld id="{EC4347D3-4C9A-C240-8F14-750059DFEEB0}" type="datetimeFigureOut">
               <a:rPr lang="en-US" smtClean="0"/>
-              <a:t>9/28/23</a:t>
+              <a:t>10/5/23</a:t>
             </a:fld>
             <a:endParaRPr lang="en-US"/>
           </a:p>
@@ -7436,7 +7437,7 @@
           <a:p>
             <a:fld id="{EC4347D3-4C9A-C240-8F14-750059DFEEB0}" type="datetimeFigureOut">
               <a:rPr lang="en-US" smtClean="0"/>
-              <a:t>9/28/23</a:t>
+              <a:t>10/5/23</a:t>
             </a:fld>
             <a:endParaRPr lang="en-US"/>
           </a:p>
@@ -7616,7 +7617,7 @@
           <a:p>
             <a:fld id="{EC4347D3-4C9A-C240-8F14-750059DFEEB0}" type="datetimeFigureOut">
               <a:rPr lang="en-US" smtClean="0"/>
-              <a:t>9/28/23</a:t>
+              <a:t>10/5/23</a:t>
             </a:fld>
             <a:endParaRPr lang="en-US"/>
           </a:p>
@@ -7786,7 +7787,7 @@
           <a:p>
             <a:fld id="{EC4347D3-4C9A-C240-8F14-750059DFEEB0}" type="datetimeFigureOut">
               <a:rPr lang="en-US" smtClean="0"/>
-              <a:t>9/28/23</a:t>
+              <a:t>10/5/23</a:t>
             </a:fld>
             <a:endParaRPr lang="en-US"/>
           </a:p>
@@ -8036,7 +8037,7 @@
           <a:p>
             <a:fld id="{EC4347D3-4C9A-C240-8F14-750059DFEEB0}" type="datetimeFigureOut">
               <a:rPr lang="en-US" smtClean="0"/>
-              <a:t>9/28/23</a:t>
+              <a:t>10/5/23</a:t>
             </a:fld>
             <a:endParaRPr lang="en-US"/>
           </a:p>
@@ -8268,7 +8269,7 @@
           <a:p>
             <a:fld id="{EC4347D3-4C9A-C240-8F14-750059DFEEB0}" type="datetimeFigureOut">
               <a:rPr lang="en-US" smtClean="0"/>
-              <a:t>9/28/23</a:t>
+              <a:t>10/5/23</a:t>
             </a:fld>
             <a:endParaRPr lang="en-US"/>
           </a:p>
@@ -8654,7 +8655,7 @@
           <a:p>
             <a:fld id="{EC4347D3-4C9A-C240-8F14-750059DFEEB0}" type="datetimeFigureOut">
               <a:rPr lang="en-US" smtClean="0"/>
-              <a:t>9/28/23</a:t>
+              <a:t>10/5/23</a:t>
             </a:fld>
             <a:endParaRPr lang="en-US"/>
           </a:p>
@@ -8777,7 +8778,7 @@
           <a:p>
             <a:fld id="{EC4347D3-4C9A-C240-8F14-750059DFEEB0}" type="datetimeFigureOut">
               <a:rPr lang="en-US" smtClean="0"/>
-              <a:t>9/28/23</a:t>
+              <a:t>10/5/23</a:t>
             </a:fld>
             <a:endParaRPr lang="en-US"/>
           </a:p>
@@ -8872,7 +8873,7 @@
           <a:p>
             <a:fld id="{EC4347D3-4C9A-C240-8F14-750059DFEEB0}" type="datetimeFigureOut">
               <a:rPr lang="en-US" smtClean="0"/>
-              <a:t>9/28/23</a:t>
+              <a:t>10/5/23</a:t>
             </a:fld>
             <a:endParaRPr lang="en-US"/>
           </a:p>
@@ -9121,7 +9122,7 @@
           <a:p>
             <a:fld id="{EC4347D3-4C9A-C240-8F14-750059DFEEB0}" type="datetimeFigureOut">
               <a:rPr lang="en-US" smtClean="0"/>
-              <a:t>9/28/23</a:t>
+              <a:t>10/5/23</a:t>
             </a:fld>
             <a:endParaRPr lang="en-US"/>
           </a:p>
@@ -9406,7 +9407,7 @@
           <a:p>
             <a:fld id="{EC4347D3-4C9A-C240-8F14-750059DFEEB0}" type="datetimeFigureOut">
               <a:rPr lang="en-US" smtClean="0"/>
-              <a:t>9/28/23</a:t>
+              <a:t>10/5/23</a:t>
             </a:fld>
             <a:endParaRPr lang="en-US"/>
           </a:p>
@@ -9529,7 +9530,7 @@
           <a:noFill/>
           <a:extLst>
             <a:ext uri="{909E8E84-426E-40dd-AFC4-6F175D3DCCD1}">
-              <a14:hiddenFill xmlns="" xmlns:a14="http://schemas.microsoft.com/office/drawing/2010/main">
+              <a14:hiddenFill xmlns:a14="http://schemas.microsoft.com/office/drawing/2010/main" xmlns="">
                 <a:solidFill>
                   <a:srgbClr val="FFFFFF"/>
                 </a:solidFill>
@@ -9603,7 +9604,7 @@
               </a:ln>
               <a:extLst>
                 <a:ext uri="{91240B29-F687-4f45-9708-019B960494DF}">
-                  <a14:hiddenLine xmlns="" xmlns:a14="http://schemas.microsoft.com/office/drawing/2010/main" w="9525">
+                  <a14:hiddenLine xmlns:a14="http://schemas.microsoft.com/office/drawing/2010/main" xmlns="" w="9525">
                     <a:solidFill>
                       <a:srgbClr val="000000"/>
                     </a:solidFill>
@@ -9693,7 +9694,7 @@
               </a:ln>
               <a:extLst>
                 <a:ext uri="{91240B29-F687-4f45-9708-019B960494DF}">
-                  <a14:hiddenLine xmlns="" xmlns:a14="http://schemas.microsoft.com/office/drawing/2010/main" w="9525">
+                  <a14:hiddenLine xmlns:a14="http://schemas.microsoft.com/office/drawing/2010/main" xmlns="" w="9525">
                     <a:solidFill>
                       <a:srgbClr val="000000"/>
                     </a:solidFill>
@@ -9783,7 +9784,7 @@
               </a:ln>
               <a:extLst>
                 <a:ext uri="{91240B29-F687-4f45-9708-019B960494DF}">
-                  <a14:hiddenLine xmlns="" xmlns:a14="http://schemas.microsoft.com/office/drawing/2010/main" w="9525">
+                  <a14:hiddenLine xmlns:a14="http://schemas.microsoft.com/office/drawing/2010/main" xmlns="" w="9525">
                     <a:solidFill>
                       <a:srgbClr val="000000"/>
                     </a:solidFill>
@@ -9845,7 +9846,7 @@
               </a:ln>
               <a:extLst>
                 <a:ext uri="{91240B29-F687-4f45-9708-019B960494DF}">
-                  <a14:hiddenLine xmlns="" xmlns:a14="http://schemas.microsoft.com/office/drawing/2010/main" w="9525">
+                  <a14:hiddenLine xmlns:a14="http://schemas.microsoft.com/office/drawing/2010/main" xmlns="" w="9525">
                     <a:solidFill>
                       <a:srgbClr val="000000"/>
                     </a:solidFill>
@@ -9935,7 +9936,7 @@
               </a:ln>
               <a:extLst>
                 <a:ext uri="{91240B29-F687-4f45-9708-019B960494DF}">
-                  <a14:hiddenLine xmlns="" xmlns:a14="http://schemas.microsoft.com/office/drawing/2010/main" w="9525">
+                  <a14:hiddenLine xmlns:a14="http://schemas.microsoft.com/office/drawing/2010/main" xmlns="" w="9525">
                     <a:solidFill>
                       <a:srgbClr val="000000"/>
                     </a:solidFill>
@@ -9997,7 +9998,7 @@
               </a:ln>
               <a:extLst>
                 <a:ext uri="{91240B29-F687-4f45-9708-019B960494DF}">
-                  <a14:hiddenLine xmlns="" xmlns:a14="http://schemas.microsoft.com/office/drawing/2010/main" w="9525">
+                  <a14:hiddenLine xmlns:a14="http://schemas.microsoft.com/office/drawing/2010/main" xmlns="" w="9525">
                     <a:solidFill>
                       <a:srgbClr val="000000"/>
                     </a:solidFill>
@@ -10059,7 +10060,7 @@
               </a:ln>
               <a:extLst>
                 <a:ext uri="{91240B29-F687-4f45-9708-019B960494DF}">
-                  <a14:hiddenLine xmlns="" xmlns:a14="http://schemas.microsoft.com/office/drawing/2010/main" w="9525">
+                  <a14:hiddenLine xmlns:a14="http://schemas.microsoft.com/office/drawing/2010/main" xmlns="" w="9525">
                     <a:solidFill>
                       <a:srgbClr val="000000"/>
                     </a:solidFill>
@@ -10149,7 +10150,7 @@
               </a:ln>
               <a:extLst>
                 <a:ext uri="{91240B29-F687-4f45-9708-019B960494DF}">
-                  <a14:hiddenLine xmlns="" xmlns:a14="http://schemas.microsoft.com/office/drawing/2010/main" w="9525">
+                  <a14:hiddenLine xmlns:a14="http://schemas.microsoft.com/office/drawing/2010/main" xmlns="" w="9525">
                     <a:solidFill>
                       <a:srgbClr val="000000"/>
                     </a:solidFill>
@@ -10239,7 +10240,7 @@
               </a:ln>
               <a:extLst>
                 <a:ext uri="{91240B29-F687-4f45-9708-019B960494DF}">
-                  <a14:hiddenLine xmlns="" xmlns:a14="http://schemas.microsoft.com/office/drawing/2010/main" w="9525">
+                  <a14:hiddenLine xmlns:a14="http://schemas.microsoft.com/office/drawing/2010/main" xmlns="" w="9525">
                     <a:solidFill>
                       <a:srgbClr val="000000"/>
                     </a:solidFill>
@@ -10301,7 +10302,7 @@
               </a:ln>
               <a:extLst>
                 <a:ext uri="{91240B29-F687-4f45-9708-019B960494DF}">
-                  <a14:hiddenLine xmlns="" xmlns:a14="http://schemas.microsoft.com/office/drawing/2010/main" w="9525">
+                  <a14:hiddenLine xmlns:a14="http://schemas.microsoft.com/office/drawing/2010/main" xmlns="" w="9525">
                     <a:solidFill>
                       <a:srgbClr val="000000"/>
                     </a:solidFill>
@@ -10411,7 +10412,7 @@
               </a:ln>
               <a:extLst>
                 <a:ext uri="{91240B29-F687-4f45-9708-019B960494DF}">
-                  <a14:hiddenLine xmlns="" xmlns:a14="http://schemas.microsoft.com/office/drawing/2010/main" w="9525">
+                  <a14:hiddenLine xmlns:a14="http://schemas.microsoft.com/office/drawing/2010/main" xmlns="" w="9525">
                     <a:solidFill>
                       <a:srgbClr val="000000"/>
                     </a:solidFill>
@@ -10495,7 +10496,7 @@
               </a:ln>
               <a:extLst>
                 <a:ext uri="{91240B29-F687-4f45-9708-019B960494DF}">
-                  <a14:hiddenLine xmlns="" xmlns:a14="http://schemas.microsoft.com/office/drawing/2010/main" w="9525">
+                  <a14:hiddenLine xmlns:a14="http://schemas.microsoft.com/office/drawing/2010/main" xmlns="" w="9525">
                     <a:solidFill>
                       <a:srgbClr val="000000"/>
                     </a:solidFill>
@@ -10557,7 +10558,7 @@
               </a:ln>
               <a:extLst>
                 <a:ext uri="{91240B29-F687-4f45-9708-019B960494DF}">
-                  <a14:hiddenLine xmlns="" xmlns:a14="http://schemas.microsoft.com/office/drawing/2010/main" w="9525">
+                  <a14:hiddenLine xmlns:a14="http://schemas.microsoft.com/office/drawing/2010/main" xmlns="" w="9525">
                     <a:solidFill>
                       <a:srgbClr val="000000"/>
                     </a:solidFill>
@@ -10619,7 +10620,7 @@
               </a:ln>
               <a:extLst>
                 <a:ext uri="{91240B29-F687-4f45-9708-019B960494DF}">
-                  <a14:hiddenLine xmlns="" xmlns:a14="http://schemas.microsoft.com/office/drawing/2010/main" w="9525">
+                  <a14:hiddenLine xmlns:a14="http://schemas.microsoft.com/office/drawing/2010/main" xmlns="" w="9525">
                     <a:solidFill>
                       <a:srgbClr val="000000"/>
                     </a:solidFill>
@@ -10709,7 +10710,7 @@
               </a:ln>
               <a:extLst>
                 <a:ext uri="{91240B29-F687-4f45-9708-019B960494DF}">
-                  <a14:hiddenLine xmlns="" xmlns:a14="http://schemas.microsoft.com/office/drawing/2010/main" w="9525">
+                  <a14:hiddenLine xmlns:a14="http://schemas.microsoft.com/office/drawing/2010/main" xmlns="" w="9525">
                     <a:solidFill>
                       <a:srgbClr val="000000"/>
                     </a:solidFill>
@@ -10743,7 +10744,7 @@
               </a:ln>
               <a:extLst>
                 <a:ext uri="{91240B29-F687-4f45-9708-019B960494DF}">
-                  <a14:hiddenLine xmlns="" xmlns:a14="http://schemas.microsoft.com/office/drawing/2010/main" w="9525">
+                  <a14:hiddenLine xmlns:a14="http://schemas.microsoft.com/office/drawing/2010/main" xmlns="" w="9525">
                     <a:solidFill>
                       <a:srgbClr val="000000"/>
                     </a:solidFill>
@@ -10808,7 +10809,7 @@
               </a:ln>
               <a:extLst>
                 <a:ext uri="{91240B29-F687-4f45-9708-019B960494DF}">
-                  <a14:hiddenLine xmlns="" xmlns:a14="http://schemas.microsoft.com/office/drawing/2010/main" w="9525">
+                  <a14:hiddenLine xmlns:a14="http://schemas.microsoft.com/office/drawing/2010/main" xmlns="" w="9525">
                     <a:solidFill>
                       <a:srgbClr val="000000"/>
                     </a:solidFill>
@@ -10898,7 +10899,7 @@
               </a:ln>
               <a:extLst>
                 <a:ext uri="{91240B29-F687-4f45-9708-019B960494DF}">
-                  <a14:hiddenLine xmlns="" xmlns:a14="http://schemas.microsoft.com/office/drawing/2010/main" w="9525">
+                  <a14:hiddenLine xmlns:a14="http://schemas.microsoft.com/office/drawing/2010/main" xmlns="" w="9525">
                     <a:solidFill>
                       <a:srgbClr val="000000"/>
                     </a:solidFill>
@@ -10960,7 +10961,7 @@
               </a:ln>
               <a:extLst>
                 <a:ext uri="{91240B29-F687-4f45-9708-019B960494DF}">
-                  <a14:hiddenLine xmlns="" xmlns:a14="http://schemas.microsoft.com/office/drawing/2010/main" w="9525">
+                  <a14:hiddenLine xmlns:a14="http://schemas.microsoft.com/office/drawing/2010/main" xmlns="" w="9525">
                     <a:solidFill>
                       <a:srgbClr val="000000"/>
                     </a:solidFill>
@@ -11050,7 +11051,7 @@
               </a:ln>
               <a:extLst>
                 <a:ext uri="{91240B29-F687-4f45-9708-019B960494DF}">
-                  <a14:hiddenLine xmlns="" xmlns:a14="http://schemas.microsoft.com/office/drawing/2010/main" w="9525">
+                  <a14:hiddenLine xmlns:a14="http://schemas.microsoft.com/office/drawing/2010/main" xmlns="" w="9525">
                     <a:solidFill>
                       <a:srgbClr val="000000"/>
                     </a:solidFill>
@@ -11115,7 +11116,7 @@
               </a:ln>
               <a:extLst>
                 <a:ext uri="{91240B29-F687-4f45-9708-019B960494DF}">
-                  <a14:hiddenLine xmlns="" xmlns:a14="http://schemas.microsoft.com/office/drawing/2010/main" w="9525">
+                  <a14:hiddenLine xmlns:a14="http://schemas.microsoft.com/office/drawing/2010/main" xmlns="" w="9525">
                     <a:solidFill>
                       <a:srgbClr val="000000"/>
                     </a:solidFill>
@@ -11177,7 +11178,7 @@
               </a:ln>
               <a:extLst>
                 <a:ext uri="{91240B29-F687-4f45-9708-019B960494DF}">
-                  <a14:hiddenLine xmlns="" xmlns:a14="http://schemas.microsoft.com/office/drawing/2010/main" w="9525">
+                  <a14:hiddenLine xmlns:a14="http://schemas.microsoft.com/office/drawing/2010/main" xmlns="" w="9525">
                     <a:solidFill>
                       <a:srgbClr val="000000"/>
                     </a:solidFill>
@@ -11267,7 +11268,7 @@
               </a:ln>
               <a:extLst>
                 <a:ext uri="{91240B29-F687-4f45-9708-019B960494DF}">
-                  <a14:hiddenLine xmlns="" xmlns:a14="http://schemas.microsoft.com/office/drawing/2010/main" w="9525">
+                  <a14:hiddenLine xmlns:a14="http://schemas.microsoft.com/office/drawing/2010/main" xmlns="" w="9525">
                     <a:solidFill>
                       <a:srgbClr val="000000"/>
                     </a:solidFill>
@@ -11357,7 +11358,7 @@
               </a:ln>
               <a:extLst>
                 <a:ext uri="{91240B29-F687-4f45-9708-019B960494DF}">
-                  <a14:hiddenLine xmlns="" xmlns:a14="http://schemas.microsoft.com/office/drawing/2010/main" w="9525">
+                  <a14:hiddenLine xmlns:a14="http://schemas.microsoft.com/office/drawing/2010/main" xmlns="" w="9525">
                     <a:solidFill>
                       <a:srgbClr val="000000"/>
                     </a:solidFill>
@@ -11422,7 +11423,7 @@
               </a:ln>
               <a:extLst>
                 <a:ext uri="{91240B29-F687-4f45-9708-019B960494DF}">
-                  <a14:hiddenLine xmlns="" xmlns:a14="http://schemas.microsoft.com/office/drawing/2010/main" w="9525">
+                  <a14:hiddenLine xmlns:a14="http://schemas.microsoft.com/office/drawing/2010/main" xmlns="" w="9525">
                     <a:solidFill>
                       <a:srgbClr val="000000"/>
                     </a:solidFill>
@@ -11542,7 +11543,7 @@
               </a:ln>
               <a:extLst>
                 <a:ext uri="{91240B29-F687-4f45-9708-019B960494DF}">
-                  <a14:hiddenLine xmlns="" xmlns:a14="http://schemas.microsoft.com/office/drawing/2010/main" w="9525">
+                  <a14:hiddenLine xmlns:a14="http://schemas.microsoft.com/office/drawing/2010/main" xmlns="" w="9525">
                     <a:solidFill>
                       <a:srgbClr val="000000"/>
                     </a:solidFill>
@@ -11623,7 +11624,7 @@
               </a:ln>
               <a:extLst>
                 <a:ext uri="{91240B29-F687-4f45-9708-019B960494DF}">
-                  <a14:hiddenLine xmlns="" xmlns:a14="http://schemas.microsoft.com/office/drawing/2010/main" w="9525">
+                  <a14:hiddenLine xmlns:a14="http://schemas.microsoft.com/office/drawing/2010/main" xmlns="" w="9525">
                     <a:solidFill>
                       <a:srgbClr val="000000"/>
                     </a:solidFill>
@@ -11738,7 +11739,7 @@
               </a:ln>
               <a:extLst>
                 <a:ext uri="{91240B29-F687-4f45-9708-019B960494DF}">
-                  <a14:hiddenLine xmlns="" xmlns:a14="http://schemas.microsoft.com/office/drawing/2010/main" w="9525">
+                  <a14:hiddenLine xmlns:a14="http://schemas.microsoft.com/office/drawing/2010/main" xmlns="" w="9525">
                     <a:solidFill>
                       <a:srgbClr val="000000"/>
                     </a:solidFill>
@@ -11828,7 +11829,7 @@
               </a:ln>
               <a:extLst>
                 <a:ext uri="{91240B29-F687-4f45-9708-019B960494DF}">
-                  <a14:hiddenLine xmlns="" xmlns:a14="http://schemas.microsoft.com/office/drawing/2010/main" w="9525">
+                  <a14:hiddenLine xmlns:a14="http://schemas.microsoft.com/office/drawing/2010/main" xmlns="" w="9525">
                     <a:solidFill>
                       <a:srgbClr val="000000"/>
                     </a:solidFill>
@@ -11893,7 +11894,7 @@
               </a:ln>
               <a:extLst>
                 <a:ext uri="{91240B29-F687-4f45-9708-019B960494DF}">
-                  <a14:hiddenLine xmlns="" xmlns:a14="http://schemas.microsoft.com/office/drawing/2010/main" w="9525">
+                  <a14:hiddenLine xmlns:a14="http://schemas.microsoft.com/office/drawing/2010/main" xmlns="" w="9525">
                     <a:solidFill>
                       <a:srgbClr val="000000"/>
                     </a:solidFill>
@@ -11983,7 +11984,7 @@
               </a:ln>
               <a:extLst>
                 <a:ext uri="{91240B29-F687-4f45-9708-019B960494DF}">
-                  <a14:hiddenLine xmlns="" xmlns:a14="http://schemas.microsoft.com/office/drawing/2010/main" w="9525">
+                  <a14:hiddenLine xmlns:a14="http://schemas.microsoft.com/office/drawing/2010/main" xmlns="" w="9525">
                     <a:solidFill>
                       <a:srgbClr val="000000"/>
                     </a:solidFill>
@@ -12051,7 +12052,7 @@
               </a:ln>
               <a:extLst>
                 <a:ext uri="{91240B29-F687-4f45-9708-019B960494DF}">
-                  <a14:hiddenLine xmlns="" xmlns:a14="http://schemas.microsoft.com/office/drawing/2010/main" w="9525">
+                  <a14:hiddenLine xmlns:a14="http://schemas.microsoft.com/office/drawing/2010/main" xmlns="" w="9525">
                     <a:solidFill>
                       <a:srgbClr val="000000"/>
                     </a:solidFill>
@@ -12141,7 +12142,7 @@
               </a:ln>
               <a:extLst>
                 <a:ext uri="{91240B29-F687-4f45-9708-019B960494DF}">
-                  <a14:hiddenLine xmlns="" xmlns:a14="http://schemas.microsoft.com/office/drawing/2010/main" w="9525">
+                  <a14:hiddenLine xmlns:a14="http://schemas.microsoft.com/office/drawing/2010/main" xmlns="" w="9525">
                     <a:solidFill>
                       <a:srgbClr val="000000"/>
                     </a:solidFill>
@@ -12209,7 +12210,7 @@
               </a:ln>
               <a:extLst>
                 <a:ext uri="{91240B29-F687-4f45-9708-019B960494DF}">
-                  <a14:hiddenLine xmlns="" xmlns:a14="http://schemas.microsoft.com/office/drawing/2010/main" w="9525">
+                  <a14:hiddenLine xmlns:a14="http://schemas.microsoft.com/office/drawing/2010/main" xmlns="" w="9525">
                     <a:solidFill>
                       <a:srgbClr val="000000"/>
                     </a:solidFill>
@@ -12299,7 +12300,7 @@
               </a:ln>
               <a:extLst>
                 <a:ext uri="{91240B29-F687-4f45-9708-019B960494DF}">
-                  <a14:hiddenLine xmlns="" xmlns:a14="http://schemas.microsoft.com/office/drawing/2010/main" w="9525">
+                  <a14:hiddenLine xmlns:a14="http://schemas.microsoft.com/office/drawing/2010/main" xmlns="" w="9525">
                     <a:solidFill>
                       <a:srgbClr val="000000"/>
                     </a:solidFill>
@@ -12333,7 +12334,7 @@
               </a:ln>
               <a:extLst>
                 <a:ext uri="{91240B29-F687-4f45-9708-019B960494DF}">
-                  <a14:hiddenLine xmlns="" xmlns:a14="http://schemas.microsoft.com/office/drawing/2010/main" w="9525">
+                  <a14:hiddenLine xmlns:a14="http://schemas.microsoft.com/office/drawing/2010/main" xmlns="" w="9525">
                     <a:solidFill>
                       <a:srgbClr val="000000"/>
                     </a:solidFill>
@@ -12473,7 +12474,7 @@
           <a:p>
             <a:fld id="{EC4347D3-4C9A-C240-8F14-750059DFEEB0}" type="datetimeFigureOut">
               <a:rPr lang="en-US" smtClean="0"/>
-              <a:t>9/28/23</a:t>
+              <a:t>10/5/23</a:t>
             </a:fld>
             <a:endParaRPr lang="en-US"/>
           </a:p>
@@ -13310,6 +13311,182 @@
 </p:sld>
 </file>
 
+<file path=ppt/slides/slide12.xml><?xml version="1.0" encoding="utf-8"?>
+<p:sld xmlns:a="http://schemas.openxmlformats.org/drawingml/2006/main" xmlns:r="http://schemas.openxmlformats.org/officeDocument/2006/relationships" xmlns:p="http://schemas.openxmlformats.org/presentationml/2006/main">
+  <p:cSld>
+    <p:spTree>
+      <p:nvGrpSpPr>
+        <p:cNvPr id="1" name=""/>
+        <p:cNvGrpSpPr/>
+        <p:nvPr/>
+      </p:nvGrpSpPr>
+      <p:grpSpPr>
+        <a:xfrm>
+          <a:off x="0" y="0"/>
+          <a:ext cx="0" cy="0"/>
+          <a:chOff x="0" y="0"/>
+          <a:chExt cx="0" cy="0"/>
+        </a:xfrm>
+      </p:grpSpPr>
+      <p:sp>
+        <p:nvSpPr>
+          <p:cNvPr id="6146" name="Rectangle 2"/>
+          <p:cNvSpPr>
+            <a:spLocks noGrp="1" noChangeArrowheads="1"/>
+          </p:cNvSpPr>
+          <p:nvPr>
+            <p:ph type="title"/>
+            <p:custDataLst>
+              <p:tags r:id="rId1"/>
+            </p:custDataLst>
+          </p:nvPr>
+        </p:nvSpPr>
+        <p:spPr>
+          <a:xfrm>
+            <a:off x="1141413" y="284084"/>
+            <a:ext cx="9905998" cy="620791"/>
+          </a:xfrm>
+        </p:spPr>
+        <p:txBody>
+          <a:bodyPr/>
+          <a:lstStyle/>
+          <a:p>
+            <a:pPr algn="ctr"/>
+            <a:r>
+              <a:rPr lang="en-US" dirty="0"/>
+              <a:t>Lecture 12: </a:t>
+            </a:r>
+            <a:r>
+              <a:rPr lang="en-US" dirty="0" err="1"/>
+              <a:t>THu</a:t>
+            </a:r>
+            <a:r>
+              <a:rPr lang="en-US" dirty="0"/>
+              <a:t>. Oct. 5</a:t>
+            </a:r>
+          </a:p>
+        </p:txBody>
+      </p:sp>
+      <p:sp>
+        <p:nvSpPr>
+          <p:cNvPr id="6147" name="Rectangle 3"/>
+          <p:cNvSpPr>
+            <a:spLocks noGrp="1" noChangeArrowheads="1"/>
+          </p:cNvSpPr>
+          <p:nvPr>
+            <p:ph idx="1"/>
+            <p:custDataLst>
+              <p:tags r:id="rId2"/>
+            </p:custDataLst>
+          </p:nvPr>
+        </p:nvSpPr>
+        <p:spPr>
+          <a:xfrm>
+            <a:off x="1141413" y="1123950"/>
+            <a:ext cx="9970724" cy="5149850"/>
+          </a:xfrm>
+        </p:spPr>
+        <p:txBody>
+          <a:bodyPr>
+            <a:normAutofit/>
+          </a:bodyPr>
+          <a:lstStyle/>
+          <a:p>
+            <a:r>
+              <a:rPr lang="en-US" dirty="0"/>
+              <a:t>DMT2 is </a:t>
+            </a:r>
+            <a:r>
+              <a:rPr lang="en-US" b="1" i="1" u="sng" dirty="0"/>
+              <a:t>going to be great</a:t>
+            </a:r>
+            <a:r>
+              <a:rPr lang="en-US" dirty="0"/>
+              <a:t>! Let’s learn a lot of stuff together!</a:t>
+            </a:r>
+          </a:p>
+          <a:p>
+            <a:r>
+              <a:rPr lang="en-US" dirty="0"/>
+              <a:t>Cardinality grading done. Regrades open until next Wednesday at 11:59.</a:t>
+            </a:r>
+          </a:p>
+          <a:p>
+            <a:r>
+              <a:rPr lang="en-US" dirty="0"/>
+              <a:t>If you turned in the first </a:t>
+            </a:r>
+            <a:r>
+              <a:rPr lang="en-US" dirty="0" err="1"/>
+              <a:t>hw</a:t>
+            </a:r>
+            <a:r>
+              <a:rPr lang="en-US" dirty="0"/>
+              <a:t> late, we will get to it soon.</a:t>
+            </a:r>
+          </a:p>
+          <a:p>
+            <a:r>
+              <a:rPr lang="en-US" dirty="0"/>
+              <a:t>Regular languages written homework is due tonight! Don’t forget!!</a:t>
+            </a:r>
+          </a:p>
+          <a:p>
+            <a:r>
+              <a:rPr lang="en-US" dirty="0"/>
+              <a:t>Office hours going ok so far? Any issues</a:t>
+            </a:r>
+          </a:p>
+          <a:p>
+            <a:r>
+              <a:rPr lang="en-US" dirty="0"/>
+              <a:t>Today we continue </a:t>
+            </a:r>
+            <a:r>
+              <a:rPr lang="en-US"/>
+              <a:t>with module 3</a:t>
+            </a:r>
+            <a:endParaRPr lang="en-US" dirty="0"/>
+          </a:p>
+        </p:txBody>
+      </p:sp>
+      <p:sp>
+        <p:nvSpPr>
+          <p:cNvPr id="4" name="Slide Number Placeholder 3"/>
+          <p:cNvSpPr>
+            <a:spLocks noGrp="1"/>
+          </p:cNvSpPr>
+          <p:nvPr>
+            <p:ph type="sldNum" sz="quarter" idx="12"/>
+          </p:nvPr>
+        </p:nvSpPr>
+        <p:spPr/>
+        <p:txBody>
+          <a:bodyPr/>
+          <a:lstStyle/>
+          <a:p>
+            <a:fld id="{F26D9103-0C5C-48AC-B68E-3ED2C1647047}" type="slidenum">
+              <a:rPr lang="en-US" smtClean="0"/>
+              <a:pPr/>
+              <a:t>12</a:t>
+            </a:fld>
+            <a:endParaRPr lang="en-US" dirty="0"/>
+          </a:p>
+        </p:txBody>
+      </p:sp>
+    </p:spTree>
+    <p:extLst>
+      <p:ext uri="{BB962C8B-B14F-4D97-AF65-F5344CB8AC3E}">
+        <p14:creationId xmlns:p14="http://schemas.microsoft.com/office/powerpoint/2010/main" val="432411375"/>
+      </p:ext>
+    </p:extLst>
+  </p:cSld>
+  <p:clrMapOvr>
+    <a:masterClrMapping/>
+  </p:clrMapOvr>
+</p:sld>
+</file>
+
 <file path=ppt/slides/slide2.xml><?xml version="1.0" encoding="utf-8"?>
 <p:sld xmlns:a="http://schemas.openxmlformats.org/drawingml/2006/main" xmlns:r="http://schemas.openxmlformats.org/officeDocument/2006/relationships" xmlns:p="http://schemas.openxmlformats.org/presentationml/2006/main">
   <p:cSld>
@@ -14780,6 +14957,18 @@
 </file>
 
 <file path=ppt/tags/tag20.xml><?xml version="1.0" encoding="utf-8"?>
+<p:tagLst xmlns:a="http://schemas.openxmlformats.org/drawingml/2006/main" xmlns:r="http://schemas.openxmlformats.org/officeDocument/2006/relationships" xmlns:p="http://schemas.openxmlformats.org/presentationml/2006/main">
+  <p:tag name="_INSTRUCTOR VIEW19C14C36-AC8E-43BC-9DB6-C2AAF774C7DC|PANE__TAG" val="_"/>
+</p:tagLst>
+</file>
+
+<file path=ppt/tags/tag21.xml><?xml version="1.0" encoding="utf-8"?>
+<p:tagLst xmlns:a="http://schemas.openxmlformats.org/drawingml/2006/main" xmlns:r="http://schemas.openxmlformats.org/officeDocument/2006/relationships" xmlns:p="http://schemas.openxmlformats.org/presentationml/2006/main">
+  <p:tag name="_INSTRUCTOR VIEW19C14C36-AC8E-43BC-9DB6-C2AAF774C7DC|PANE__TAG" val="_"/>
+</p:tagLst>
+</file>
+
+<file path=ppt/tags/tag22.xml><?xml version="1.0" encoding="utf-8"?>
 <p:tagLst xmlns:a="http://schemas.openxmlformats.org/drawingml/2006/main" xmlns:r="http://schemas.openxmlformats.org/officeDocument/2006/relationships" xmlns:p="http://schemas.openxmlformats.org/presentationml/2006/main">
   <p:tag name="_INSTRUCTOR VIEW19C14C36-AC8E-43BC-9DB6-C2AAF774C7DC|PANE__TAG" val="_"/>
 </p:tagLst>

</xml_diff>

<commit_message>
announcements, small TM slide updates
</commit_message>
<xml_diff>
--- a/slides/00-DailyAnnouncements.pptx
+++ b/slides/00-DailyAnnouncements.pptx
@@ -5,7 +5,7 @@
     <p:sldMasterId id="2147484006" r:id="rId1"/>
   </p:sldMasterIdLst>
   <p:notesMasterIdLst>
-    <p:notesMasterId r:id="rId16"/>
+    <p:notesMasterId r:id="rId17"/>
   </p:notesMasterIdLst>
   <p:sldIdLst>
     <p:sldId id="256" r:id="rId2"/>
@@ -22,6 +22,7 @@
     <p:sldId id="515" r:id="rId13"/>
     <p:sldId id="516" r:id="rId14"/>
     <p:sldId id="517" r:id="rId15"/>
+    <p:sldId id="518" r:id="rId16"/>
   </p:sldIdLst>
   <p:sldSz cx="12192000" cy="6858000"/>
   <p:notesSz cx="6858000" cy="9144000"/>
@@ -210,7 +211,7 @@
           <a:p>
             <a:fld id="{C5B45307-6ED4-B142-BD64-10F739779302}" type="datetimeFigureOut">
               <a:rPr lang="en-US" smtClean="0"/>
-              <a:t>10/17/23</a:t>
+              <a:t>10/19/23</a:t>
             </a:fld>
             <a:endParaRPr lang="en-US"/>
           </a:p>
@@ -618,7 +619,7 @@
           <a:noFill/>
           <a:extLst>
             <a:ext uri="{909E8E84-426E-40dd-AFC4-6F175D3DCCD1}">
-              <a14:hiddenFill xmlns:a14="http://schemas.microsoft.com/office/drawing/2010/main" xmlns="">
+              <a14:hiddenFill xmlns="" xmlns:a14="http://schemas.microsoft.com/office/drawing/2010/main">
                 <a:solidFill>
                   <a:srgbClr val="FFFFFF"/>
                 </a:solidFill>
@@ -677,7 +678,7 @@
             </a:ln>
             <a:extLst>
               <a:ext uri="{91240B29-F687-4f45-9708-019B960494DF}">
-                <a14:hiddenLine xmlns:a14="http://schemas.microsoft.com/office/drawing/2010/main" xmlns="" w="9525">
+                <a14:hiddenLine xmlns="" xmlns:a14="http://schemas.microsoft.com/office/drawing/2010/main" w="9525">
                   <a:solidFill>
                     <a:srgbClr val="000000"/>
                   </a:solidFill>
@@ -767,7 +768,7 @@
             </a:ln>
             <a:extLst>
               <a:ext uri="{91240B29-F687-4f45-9708-019B960494DF}">
-                <a14:hiddenLine xmlns:a14="http://schemas.microsoft.com/office/drawing/2010/main" xmlns="" w="9525">
+                <a14:hiddenLine xmlns="" xmlns:a14="http://schemas.microsoft.com/office/drawing/2010/main" w="9525">
                   <a:solidFill>
                     <a:srgbClr val="000000"/>
                   </a:solidFill>
@@ -857,7 +858,7 @@
             </a:ln>
             <a:extLst>
               <a:ext uri="{91240B29-F687-4f45-9708-019B960494DF}">
-                <a14:hiddenLine xmlns:a14="http://schemas.microsoft.com/office/drawing/2010/main" xmlns="" w="9525">
+                <a14:hiddenLine xmlns="" xmlns:a14="http://schemas.microsoft.com/office/drawing/2010/main" w="9525">
                   <a:solidFill>
                     <a:srgbClr val="000000"/>
                   </a:solidFill>
@@ -891,7 +892,7 @@
             </a:ln>
             <a:extLst>
               <a:ext uri="{91240B29-F687-4f45-9708-019B960494DF}">
-                <a14:hiddenLine xmlns:a14="http://schemas.microsoft.com/office/drawing/2010/main" xmlns="" w="9525">
+                <a14:hiddenLine xmlns="" xmlns:a14="http://schemas.microsoft.com/office/drawing/2010/main" w="9525">
                   <a:solidFill>
                     <a:srgbClr val="000000"/>
                   </a:solidFill>
@@ -981,7 +982,7 @@
             </a:ln>
             <a:extLst>
               <a:ext uri="{91240B29-F687-4f45-9708-019B960494DF}">
-                <a14:hiddenLine xmlns:a14="http://schemas.microsoft.com/office/drawing/2010/main" xmlns="" w="9525">
+                <a14:hiddenLine xmlns="" xmlns:a14="http://schemas.microsoft.com/office/drawing/2010/main" w="9525">
                   <a:solidFill>
                     <a:srgbClr val="000000"/>
                   </a:solidFill>
@@ -1043,7 +1044,7 @@
             </a:ln>
             <a:extLst>
               <a:ext uri="{91240B29-F687-4f45-9708-019B960494DF}">
-                <a14:hiddenLine xmlns:a14="http://schemas.microsoft.com/office/drawing/2010/main" xmlns="" w="9525">
+                <a14:hiddenLine xmlns="" xmlns:a14="http://schemas.microsoft.com/office/drawing/2010/main" w="9525">
                   <a:solidFill>
                     <a:srgbClr val="000000"/>
                   </a:solidFill>
@@ -1105,7 +1106,7 @@
             </a:ln>
             <a:extLst>
               <a:ext uri="{91240B29-F687-4f45-9708-019B960494DF}">
-                <a14:hiddenLine xmlns:a14="http://schemas.microsoft.com/office/drawing/2010/main" xmlns="" w="9525">
+                <a14:hiddenLine xmlns="" xmlns:a14="http://schemas.microsoft.com/office/drawing/2010/main" w="9525">
                   <a:solidFill>
                     <a:srgbClr val="000000"/>
                   </a:solidFill>
@@ -1195,7 +1196,7 @@
             </a:ln>
             <a:extLst>
               <a:ext uri="{91240B29-F687-4f45-9708-019B960494DF}">
-                <a14:hiddenLine xmlns:a14="http://schemas.microsoft.com/office/drawing/2010/main" xmlns="" w="9525">
+                <a14:hiddenLine xmlns="" xmlns:a14="http://schemas.microsoft.com/office/drawing/2010/main" w="9525">
                   <a:solidFill>
                     <a:srgbClr val="000000"/>
                   </a:solidFill>
@@ -1257,7 +1258,7 @@
             </a:ln>
             <a:extLst>
               <a:ext uri="{91240B29-F687-4f45-9708-019B960494DF}">
-                <a14:hiddenLine xmlns:a14="http://schemas.microsoft.com/office/drawing/2010/main" xmlns="" w="9525">
+                <a14:hiddenLine xmlns="" xmlns:a14="http://schemas.microsoft.com/office/drawing/2010/main" w="9525">
                   <a:solidFill>
                     <a:srgbClr val="000000"/>
                   </a:solidFill>
@@ -1319,7 +1320,7 @@
             </a:ln>
             <a:extLst>
               <a:ext uri="{91240B29-F687-4f45-9708-019B960494DF}">
-                <a14:hiddenLine xmlns:a14="http://schemas.microsoft.com/office/drawing/2010/main" xmlns="" w="9525">
+                <a14:hiddenLine xmlns="" xmlns:a14="http://schemas.microsoft.com/office/drawing/2010/main" w="9525">
                   <a:solidFill>
                     <a:srgbClr val="000000"/>
                   </a:solidFill>
@@ -1409,7 +1410,7 @@
             </a:ln>
             <a:extLst>
               <a:ext uri="{91240B29-F687-4f45-9708-019B960494DF}">
-                <a14:hiddenLine xmlns:a14="http://schemas.microsoft.com/office/drawing/2010/main" xmlns="" w="9525">
+                <a14:hiddenLine xmlns="" xmlns:a14="http://schemas.microsoft.com/office/drawing/2010/main" w="9525">
                   <a:solidFill>
                     <a:srgbClr val="000000"/>
                   </a:solidFill>
@@ -1499,7 +1500,7 @@
             </a:ln>
             <a:extLst>
               <a:ext uri="{91240B29-F687-4f45-9708-019B960494DF}">
-                <a14:hiddenLine xmlns:a14="http://schemas.microsoft.com/office/drawing/2010/main" xmlns="" w="9525">
+                <a14:hiddenLine xmlns="" xmlns:a14="http://schemas.microsoft.com/office/drawing/2010/main" w="9525">
                   <a:solidFill>
                     <a:srgbClr val="000000"/>
                   </a:solidFill>
@@ -1561,7 +1562,7 @@
             </a:ln>
             <a:extLst>
               <a:ext uri="{91240B29-F687-4f45-9708-019B960494DF}">
-                <a14:hiddenLine xmlns:a14="http://schemas.microsoft.com/office/drawing/2010/main" xmlns="" w="9525">
+                <a14:hiddenLine xmlns="" xmlns:a14="http://schemas.microsoft.com/office/drawing/2010/main" w="9525">
                   <a:solidFill>
                     <a:srgbClr val="000000"/>
                   </a:solidFill>
@@ -1671,7 +1672,7 @@
             </a:ln>
             <a:extLst>
               <a:ext uri="{91240B29-F687-4f45-9708-019B960494DF}">
-                <a14:hiddenLine xmlns:a14="http://schemas.microsoft.com/office/drawing/2010/main" xmlns="" w="9525">
+                <a14:hiddenLine xmlns="" xmlns:a14="http://schemas.microsoft.com/office/drawing/2010/main" w="9525">
                   <a:solidFill>
                     <a:srgbClr val="000000"/>
                   </a:solidFill>
@@ -1733,7 +1734,7 @@
             </a:ln>
             <a:extLst>
               <a:ext uri="{91240B29-F687-4f45-9708-019B960494DF}">
-                <a14:hiddenLine xmlns:a14="http://schemas.microsoft.com/office/drawing/2010/main" xmlns="" w="9525">
+                <a14:hiddenLine xmlns="" xmlns:a14="http://schemas.microsoft.com/office/drawing/2010/main" w="9525">
                   <a:solidFill>
                     <a:srgbClr val="000000"/>
                   </a:solidFill>
@@ -1823,7 +1824,7 @@
             </a:ln>
             <a:extLst>
               <a:ext uri="{91240B29-F687-4f45-9708-019B960494DF}">
-                <a14:hiddenLine xmlns:a14="http://schemas.microsoft.com/office/drawing/2010/main" xmlns="" w="9525">
+                <a14:hiddenLine xmlns="" xmlns:a14="http://schemas.microsoft.com/office/drawing/2010/main" w="9525">
                   <a:solidFill>
                     <a:srgbClr val="000000"/>
                   </a:solidFill>
@@ -1913,7 +1914,7 @@
             </a:ln>
             <a:extLst>
               <a:ext uri="{91240B29-F687-4f45-9708-019B960494DF}">
-                <a14:hiddenLine xmlns:a14="http://schemas.microsoft.com/office/drawing/2010/main" xmlns="" w="9525">
+                <a14:hiddenLine xmlns="" xmlns:a14="http://schemas.microsoft.com/office/drawing/2010/main" w="9525">
                   <a:solidFill>
                     <a:srgbClr val="000000"/>
                   </a:solidFill>
@@ -1975,7 +1976,7 @@
             </a:ln>
             <a:extLst>
               <a:ext uri="{91240B29-F687-4f45-9708-019B960494DF}">
-                <a14:hiddenLine xmlns:a14="http://schemas.microsoft.com/office/drawing/2010/main" xmlns="" w="9525">
+                <a14:hiddenLine xmlns="" xmlns:a14="http://schemas.microsoft.com/office/drawing/2010/main" w="9525">
                   <a:solidFill>
                     <a:srgbClr val="000000"/>
                   </a:solidFill>
@@ -2065,7 +2066,7 @@
             </a:ln>
             <a:extLst>
               <a:ext uri="{91240B29-F687-4f45-9708-019B960494DF}">
-                <a14:hiddenLine xmlns:a14="http://schemas.microsoft.com/office/drawing/2010/main" xmlns="" w="9525">
+                <a14:hiddenLine xmlns="" xmlns:a14="http://schemas.microsoft.com/office/drawing/2010/main" w="9525">
                   <a:solidFill>
                     <a:srgbClr val="000000"/>
                   </a:solidFill>
@@ -2155,7 +2156,7 @@
             </a:ln>
             <a:extLst>
               <a:ext uri="{91240B29-F687-4f45-9708-019B960494DF}">
-                <a14:hiddenLine xmlns:a14="http://schemas.microsoft.com/office/drawing/2010/main" xmlns="" w="9525">
+                <a14:hiddenLine xmlns="" xmlns:a14="http://schemas.microsoft.com/office/drawing/2010/main" w="9525">
                   <a:solidFill>
                     <a:srgbClr val="000000"/>
                   </a:solidFill>
@@ -2211,7 +2212,7 @@
             </a:ln>
             <a:extLst>
               <a:ext uri="{91240B29-F687-4f45-9708-019B960494DF}">
-                <a14:hiddenLine xmlns:a14="http://schemas.microsoft.com/office/drawing/2010/main" xmlns="" w="9525">
+                <a14:hiddenLine xmlns="" xmlns:a14="http://schemas.microsoft.com/office/drawing/2010/main" w="9525">
                   <a:solidFill>
                     <a:srgbClr val="000000"/>
                   </a:solidFill>
@@ -2301,7 +2302,7 @@
             </a:ln>
             <a:extLst>
               <a:ext uri="{91240B29-F687-4f45-9708-019B960494DF}">
-                <a14:hiddenLine xmlns:a14="http://schemas.microsoft.com/office/drawing/2010/main" xmlns="" w="9525">
+                <a14:hiddenLine xmlns="" xmlns:a14="http://schemas.microsoft.com/office/drawing/2010/main" w="9525">
                   <a:solidFill>
                     <a:srgbClr val="000000"/>
                   </a:solidFill>
@@ -2357,7 +2358,7 @@
             </a:ln>
             <a:extLst>
               <a:ext uri="{91240B29-F687-4f45-9708-019B960494DF}">
-                <a14:hiddenLine xmlns:a14="http://schemas.microsoft.com/office/drawing/2010/main" xmlns="" w="9525">
+                <a14:hiddenLine xmlns="" xmlns:a14="http://schemas.microsoft.com/office/drawing/2010/main" w="9525">
                   <a:solidFill>
                     <a:srgbClr val="000000"/>
                   </a:solidFill>
@@ -2447,7 +2448,7 @@
             </a:ln>
             <a:extLst>
               <a:ext uri="{91240B29-F687-4f45-9708-019B960494DF}">
-                <a14:hiddenLine xmlns:a14="http://schemas.microsoft.com/office/drawing/2010/main" xmlns="" w="9525">
+                <a14:hiddenLine xmlns="" xmlns:a14="http://schemas.microsoft.com/office/drawing/2010/main" w="9525">
                   <a:solidFill>
                     <a:srgbClr val="000000"/>
                   </a:solidFill>
@@ -2515,7 +2516,7 @@
             </a:ln>
             <a:extLst>
               <a:ext uri="{91240B29-F687-4f45-9708-019B960494DF}">
-                <a14:hiddenLine xmlns:a14="http://schemas.microsoft.com/office/drawing/2010/main" xmlns="" w="9525">
+                <a14:hiddenLine xmlns="" xmlns:a14="http://schemas.microsoft.com/office/drawing/2010/main" w="9525">
                   <a:solidFill>
                     <a:srgbClr val="000000"/>
                   </a:solidFill>
@@ -2605,7 +2606,7 @@
             </a:ln>
             <a:extLst>
               <a:ext uri="{91240B29-F687-4f45-9708-019B960494DF}">
-                <a14:hiddenLine xmlns:a14="http://schemas.microsoft.com/office/drawing/2010/main" xmlns="" w="9525">
+                <a14:hiddenLine xmlns="" xmlns:a14="http://schemas.microsoft.com/office/drawing/2010/main" w="9525">
                   <a:solidFill>
                     <a:srgbClr val="000000"/>
                   </a:solidFill>
@@ -2673,7 +2674,7 @@
             </a:ln>
             <a:extLst>
               <a:ext uri="{91240B29-F687-4f45-9708-019B960494DF}">
-                <a14:hiddenLine xmlns:a14="http://schemas.microsoft.com/office/drawing/2010/main" xmlns="" w="9525">
+                <a14:hiddenLine xmlns="" xmlns:a14="http://schemas.microsoft.com/office/drawing/2010/main" w="9525">
                   <a:solidFill>
                     <a:srgbClr val="000000"/>
                   </a:solidFill>
@@ -2763,7 +2764,7 @@
             </a:ln>
             <a:extLst>
               <a:ext uri="{91240B29-F687-4f45-9708-019B960494DF}">
-                <a14:hiddenLine xmlns:a14="http://schemas.microsoft.com/office/drawing/2010/main" xmlns="" w="9525">
+                <a14:hiddenLine xmlns="" xmlns:a14="http://schemas.microsoft.com/office/drawing/2010/main" w="9525">
                   <a:solidFill>
                     <a:srgbClr val="000000"/>
                   </a:solidFill>
@@ -2797,7 +2798,7 @@
             </a:ln>
             <a:extLst>
               <a:ext uri="{91240B29-F687-4f45-9708-019B960494DF}">
-                <a14:hiddenLine xmlns:a14="http://schemas.microsoft.com/office/drawing/2010/main" xmlns="" w="9525">
+                <a14:hiddenLine xmlns="" xmlns:a14="http://schemas.microsoft.com/office/drawing/2010/main" w="9525">
                   <a:solidFill>
                     <a:srgbClr val="000000"/>
                   </a:solidFill>
@@ -2887,7 +2888,7 @@
             </a:ln>
             <a:extLst>
               <a:ext uri="{91240B29-F687-4f45-9708-019B960494DF}">
-                <a14:hiddenLine xmlns:a14="http://schemas.microsoft.com/office/drawing/2010/main" xmlns="" w="9525">
+                <a14:hiddenLine xmlns="" xmlns:a14="http://schemas.microsoft.com/office/drawing/2010/main" w="9525">
                   <a:solidFill>
                     <a:srgbClr val="000000"/>
                   </a:solidFill>
@@ -2949,7 +2950,7 @@
             </a:ln>
             <a:extLst>
               <a:ext uri="{91240B29-F687-4f45-9708-019B960494DF}">
-                <a14:hiddenLine xmlns:a14="http://schemas.microsoft.com/office/drawing/2010/main" xmlns="" w="9525">
+                <a14:hiddenLine xmlns="" xmlns:a14="http://schemas.microsoft.com/office/drawing/2010/main" w="9525">
                   <a:solidFill>
                     <a:srgbClr val="000000"/>
                   </a:solidFill>
@@ -3011,7 +3012,7 @@
             </a:ln>
             <a:extLst>
               <a:ext uri="{91240B29-F687-4f45-9708-019B960494DF}">
-                <a14:hiddenLine xmlns:a14="http://schemas.microsoft.com/office/drawing/2010/main" xmlns="" w="9525">
+                <a14:hiddenLine xmlns="" xmlns:a14="http://schemas.microsoft.com/office/drawing/2010/main" w="9525">
                   <a:solidFill>
                     <a:srgbClr val="000000"/>
                   </a:solidFill>
@@ -3101,7 +3102,7 @@
             </a:ln>
             <a:extLst>
               <a:ext uri="{91240B29-F687-4f45-9708-019B960494DF}">
-                <a14:hiddenLine xmlns:a14="http://schemas.microsoft.com/office/drawing/2010/main" xmlns="" w="9525">
+                <a14:hiddenLine xmlns="" xmlns:a14="http://schemas.microsoft.com/office/drawing/2010/main" w="9525">
                   <a:solidFill>
                     <a:srgbClr val="000000"/>
                   </a:solidFill>
@@ -3169,7 +3170,7 @@
             </a:ln>
             <a:extLst>
               <a:ext uri="{91240B29-F687-4f45-9708-019B960494DF}">
-                <a14:hiddenLine xmlns:a14="http://schemas.microsoft.com/office/drawing/2010/main" xmlns="" w="9525">
+                <a14:hiddenLine xmlns="" xmlns:a14="http://schemas.microsoft.com/office/drawing/2010/main" w="9525">
                   <a:solidFill>
                     <a:srgbClr val="000000"/>
                   </a:solidFill>
@@ -3231,7 +3232,7 @@
             </a:ln>
             <a:extLst>
               <a:ext uri="{91240B29-F687-4f45-9708-019B960494DF}">
-                <a14:hiddenLine xmlns:a14="http://schemas.microsoft.com/office/drawing/2010/main" xmlns="" w="9525">
+                <a14:hiddenLine xmlns="" xmlns:a14="http://schemas.microsoft.com/office/drawing/2010/main" w="9525">
                   <a:solidFill>
                     <a:srgbClr val="000000"/>
                   </a:solidFill>
@@ -3321,7 +3322,7 @@
             </a:ln>
             <a:extLst>
               <a:ext uri="{91240B29-F687-4f45-9708-019B960494DF}">
-                <a14:hiddenLine xmlns:a14="http://schemas.microsoft.com/office/drawing/2010/main" xmlns="" w="9525">
+                <a14:hiddenLine xmlns="" xmlns:a14="http://schemas.microsoft.com/office/drawing/2010/main" w="9525">
                   <a:solidFill>
                     <a:srgbClr val="000000"/>
                   </a:solidFill>
@@ -3383,7 +3384,7 @@
             </a:ln>
             <a:extLst>
               <a:ext uri="{91240B29-F687-4f45-9708-019B960494DF}">
-                <a14:hiddenLine xmlns:a14="http://schemas.microsoft.com/office/drawing/2010/main" xmlns="" w="9525">
+                <a14:hiddenLine xmlns="" xmlns:a14="http://schemas.microsoft.com/office/drawing/2010/main" w="9525">
                   <a:solidFill>
                     <a:srgbClr val="000000"/>
                   </a:solidFill>
@@ -3473,7 +3474,7 @@
             </a:ln>
             <a:extLst>
               <a:ext uri="{91240B29-F687-4f45-9708-019B960494DF}">
-                <a14:hiddenLine xmlns:a14="http://schemas.microsoft.com/office/drawing/2010/main" xmlns="" w="9525">
+                <a14:hiddenLine xmlns="" xmlns:a14="http://schemas.microsoft.com/office/drawing/2010/main" w="9525">
                   <a:solidFill>
                     <a:srgbClr val="000000"/>
                   </a:solidFill>
@@ -3535,7 +3536,7 @@
             </a:ln>
             <a:extLst>
               <a:ext uri="{91240B29-F687-4f45-9708-019B960494DF}">
-                <a14:hiddenLine xmlns:a14="http://schemas.microsoft.com/office/drawing/2010/main" xmlns="" w="9525">
+                <a14:hiddenLine xmlns="" xmlns:a14="http://schemas.microsoft.com/office/drawing/2010/main" w="9525">
                   <a:solidFill>
                     <a:srgbClr val="000000"/>
                   </a:solidFill>
@@ -3625,7 +3626,7 @@
             </a:ln>
             <a:extLst>
               <a:ext uri="{91240B29-F687-4f45-9708-019B960494DF}">
-                <a14:hiddenLine xmlns:a14="http://schemas.microsoft.com/office/drawing/2010/main" xmlns="" w="9525">
+                <a14:hiddenLine xmlns="" xmlns:a14="http://schemas.microsoft.com/office/drawing/2010/main" w="9525">
                   <a:solidFill>
                     <a:srgbClr val="000000"/>
                   </a:solidFill>
@@ -3659,7 +3660,7 @@
             </a:ln>
             <a:extLst>
               <a:ext uri="{91240B29-F687-4f45-9708-019B960494DF}">
-                <a14:hiddenLine xmlns:a14="http://schemas.microsoft.com/office/drawing/2010/main" xmlns="" w="9525">
+                <a14:hiddenLine xmlns="" xmlns:a14="http://schemas.microsoft.com/office/drawing/2010/main" w="9525">
                   <a:solidFill>
                     <a:srgbClr val="000000"/>
                   </a:solidFill>
@@ -3724,7 +3725,7 @@
             </a:ln>
             <a:extLst>
               <a:ext uri="{91240B29-F687-4f45-9708-019B960494DF}">
-                <a14:hiddenLine xmlns:a14="http://schemas.microsoft.com/office/drawing/2010/main" xmlns="" w="9525">
+                <a14:hiddenLine xmlns="" xmlns:a14="http://schemas.microsoft.com/office/drawing/2010/main" w="9525">
                   <a:solidFill>
                     <a:srgbClr val="000000"/>
                   </a:solidFill>
@@ -3814,7 +3815,7 @@
             </a:ln>
             <a:extLst>
               <a:ext uri="{91240B29-F687-4f45-9708-019B960494DF}">
-                <a14:hiddenLine xmlns:a14="http://schemas.microsoft.com/office/drawing/2010/main" xmlns="" w="9525">
+                <a14:hiddenLine xmlns="" xmlns:a14="http://schemas.microsoft.com/office/drawing/2010/main" w="9525">
                   <a:solidFill>
                     <a:srgbClr val="000000"/>
                   </a:solidFill>
@@ -3876,7 +3877,7 @@
             </a:ln>
             <a:extLst>
               <a:ext uri="{91240B29-F687-4f45-9708-019B960494DF}">
-                <a14:hiddenLine xmlns:a14="http://schemas.microsoft.com/office/drawing/2010/main" xmlns="" w="9525">
+                <a14:hiddenLine xmlns="" xmlns:a14="http://schemas.microsoft.com/office/drawing/2010/main" w="9525">
                   <a:solidFill>
                     <a:srgbClr val="000000"/>
                   </a:solidFill>
@@ -3966,7 +3967,7 @@
             </a:ln>
             <a:extLst>
               <a:ext uri="{91240B29-F687-4f45-9708-019B960494DF}">
-                <a14:hiddenLine xmlns:a14="http://schemas.microsoft.com/office/drawing/2010/main" xmlns="" w="9525">
+                <a14:hiddenLine xmlns="" xmlns:a14="http://schemas.microsoft.com/office/drawing/2010/main" w="9525">
                   <a:solidFill>
                     <a:srgbClr val="000000"/>
                   </a:solidFill>
@@ -4056,7 +4057,7 @@
             </a:ln>
             <a:extLst>
               <a:ext uri="{91240B29-F687-4f45-9708-019B960494DF}">
-                <a14:hiddenLine xmlns:a14="http://schemas.microsoft.com/office/drawing/2010/main" xmlns="" w="9525">
+                <a14:hiddenLine xmlns="" xmlns:a14="http://schemas.microsoft.com/office/drawing/2010/main" w="9525">
                   <a:solidFill>
                     <a:srgbClr val="000000"/>
                   </a:solidFill>
@@ -4121,7 +4122,7 @@
             </a:ln>
             <a:extLst>
               <a:ext uri="{91240B29-F687-4f45-9708-019B960494DF}">
-                <a14:hiddenLine xmlns:a14="http://schemas.microsoft.com/office/drawing/2010/main" xmlns="" w="9525">
+                <a14:hiddenLine xmlns="" xmlns:a14="http://schemas.microsoft.com/office/drawing/2010/main" w="9525">
                   <a:solidFill>
                     <a:srgbClr val="000000"/>
                   </a:solidFill>
@@ -4183,7 +4184,7 @@
             </a:ln>
             <a:extLst>
               <a:ext uri="{91240B29-F687-4f45-9708-019B960494DF}">
-                <a14:hiddenLine xmlns:a14="http://schemas.microsoft.com/office/drawing/2010/main" xmlns="" w="9525">
+                <a14:hiddenLine xmlns="" xmlns:a14="http://schemas.microsoft.com/office/drawing/2010/main" w="9525">
                   <a:solidFill>
                     <a:srgbClr val="000000"/>
                   </a:solidFill>
@@ -4273,7 +4274,7 @@
             </a:ln>
             <a:extLst>
               <a:ext uri="{91240B29-F687-4f45-9708-019B960494DF}">
-                <a14:hiddenLine xmlns:a14="http://schemas.microsoft.com/office/drawing/2010/main" xmlns="" w="9525">
+                <a14:hiddenLine xmlns="" xmlns:a14="http://schemas.microsoft.com/office/drawing/2010/main" w="9525">
                   <a:solidFill>
                     <a:srgbClr val="000000"/>
                   </a:solidFill>
@@ -4363,7 +4364,7 @@
             </a:ln>
             <a:extLst>
               <a:ext uri="{91240B29-F687-4f45-9708-019B960494DF}">
-                <a14:hiddenLine xmlns:a14="http://schemas.microsoft.com/office/drawing/2010/main" xmlns="" w="9525">
+                <a14:hiddenLine xmlns="" xmlns:a14="http://schemas.microsoft.com/office/drawing/2010/main" w="9525">
                   <a:solidFill>
                     <a:srgbClr val="000000"/>
                   </a:solidFill>
@@ -4425,7 +4426,7 @@
             </a:ln>
             <a:extLst>
               <a:ext uri="{91240B29-F687-4f45-9708-019B960494DF}">
-                <a14:hiddenLine xmlns:a14="http://schemas.microsoft.com/office/drawing/2010/main" xmlns="" w="9525">
+                <a14:hiddenLine xmlns="" xmlns:a14="http://schemas.microsoft.com/office/drawing/2010/main" w="9525">
                   <a:solidFill>
                     <a:srgbClr val="000000"/>
                   </a:solidFill>
@@ -4545,7 +4546,7 @@
             </a:ln>
             <a:extLst>
               <a:ext uri="{91240B29-F687-4f45-9708-019B960494DF}">
-                <a14:hiddenLine xmlns:a14="http://schemas.microsoft.com/office/drawing/2010/main" xmlns="" w="9525">
+                <a14:hiddenLine xmlns="" xmlns:a14="http://schemas.microsoft.com/office/drawing/2010/main" w="9525">
                   <a:solidFill>
                     <a:srgbClr val="000000"/>
                   </a:solidFill>
@@ -4613,7 +4614,7 @@
             </a:ln>
             <a:extLst>
               <a:ext uri="{91240B29-F687-4f45-9708-019B960494DF}">
-                <a14:hiddenLine xmlns:a14="http://schemas.microsoft.com/office/drawing/2010/main" xmlns="" w="9525">
+                <a14:hiddenLine xmlns="" xmlns:a14="http://schemas.microsoft.com/office/drawing/2010/main" w="9525">
                   <a:solidFill>
                     <a:srgbClr val="000000"/>
                   </a:solidFill>
@@ -4703,7 +4704,7 @@
             </a:ln>
             <a:extLst>
               <a:ext uri="{91240B29-F687-4f45-9708-019B960494DF}">
-                <a14:hiddenLine xmlns:a14="http://schemas.microsoft.com/office/drawing/2010/main" xmlns="" w="9525">
+                <a14:hiddenLine xmlns="" xmlns:a14="http://schemas.microsoft.com/office/drawing/2010/main" w="9525">
                   <a:solidFill>
                     <a:srgbClr val="000000"/>
                   </a:solidFill>
@@ -4843,7 +4844,7 @@
           <a:p>
             <a:fld id="{EC4347D3-4C9A-C240-8F14-750059DFEEB0}" type="datetimeFigureOut">
               <a:rPr lang="en-US" smtClean="0"/>
-              <a:t>10/17/23</a:t>
+              <a:t>10/19/23</a:t>
             </a:fld>
             <a:endParaRPr lang="en-US"/>
           </a:p>
@@ -5110,7 +5111,7 @@
           <a:p>
             <a:fld id="{EC4347D3-4C9A-C240-8F14-750059DFEEB0}" type="datetimeFigureOut">
               <a:rPr lang="en-US" smtClean="0"/>
-              <a:t>10/17/23</a:t>
+              <a:t>10/19/23</a:t>
             </a:fld>
             <a:endParaRPr lang="en-US"/>
           </a:p>
@@ -5306,7 +5307,7 @@
           <a:p>
             <a:fld id="{EC4347D3-4C9A-C240-8F14-750059DFEEB0}" type="datetimeFigureOut">
               <a:rPr lang="en-US" smtClean="0"/>
-              <a:t>10/17/23</a:t>
+              <a:t>10/19/23</a:t>
             </a:fld>
             <a:endParaRPr lang="en-US"/>
           </a:p>
@@ -5569,7 +5570,7 @@
           <a:p>
             <a:fld id="{EC4347D3-4C9A-C240-8F14-750059DFEEB0}" type="datetimeFigureOut">
               <a:rPr lang="en-US" smtClean="0"/>
-              <a:t>10/17/23</a:t>
+              <a:t>10/19/23</a:t>
             </a:fld>
             <a:endParaRPr lang="en-US"/>
           </a:p>
@@ -6003,7 +6004,7 @@
           <a:p>
             <a:fld id="{EC4347D3-4C9A-C240-8F14-750059DFEEB0}" type="datetimeFigureOut">
               <a:rPr lang="en-US" smtClean="0"/>
-              <a:t>10/17/23</a:t>
+              <a:t>10/19/23</a:t>
             </a:fld>
             <a:endParaRPr lang="en-US"/>
           </a:p>
@@ -6549,7 +6550,7 @@
           <a:p>
             <a:fld id="{EC4347D3-4C9A-C240-8F14-750059DFEEB0}" type="datetimeFigureOut">
               <a:rPr lang="en-US" smtClean="0"/>
-              <a:t>10/17/23</a:t>
+              <a:t>10/19/23</a:t>
             </a:fld>
             <a:endParaRPr lang="en-US"/>
           </a:p>
@@ -7269,7 +7270,7 @@
           <a:p>
             <a:fld id="{EC4347D3-4C9A-C240-8F14-750059DFEEB0}" type="datetimeFigureOut">
               <a:rPr lang="en-US" smtClean="0"/>
-              <a:t>10/17/23</a:t>
+              <a:t>10/19/23</a:t>
             </a:fld>
             <a:endParaRPr lang="en-US"/>
           </a:p>
@@ -7439,7 +7440,7 @@
           <a:p>
             <a:fld id="{EC4347D3-4C9A-C240-8F14-750059DFEEB0}" type="datetimeFigureOut">
               <a:rPr lang="en-US" smtClean="0"/>
-              <a:t>10/17/23</a:t>
+              <a:t>10/19/23</a:t>
             </a:fld>
             <a:endParaRPr lang="en-US"/>
           </a:p>
@@ -7619,7 +7620,7 @@
           <a:p>
             <a:fld id="{EC4347D3-4C9A-C240-8F14-750059DFEEB0}" type="datetimeFigureOut">
               <a:rPr lang="en-US" smtClean="0"/>
-              <a:t>10/17/23</a:t>
+              <a:t>10/19/23</a:t>
             </a:fld>
             <a:endParaRPr lang="en-US"/>
           </a:p>
@@ -7789,7 +7790,7 @@
           <a:p>
             <a:fld id="{EC4347D3-4C9A-C240-8F14-750059DFEEB0}" type="datetimeFigureOut">
               <a:rPr lang="en-US" smtClean="0"/>
-              <a:t>10/17/23</a:t>
+              <a:t>10/19/23</a:t>
             </a:fld>
             <a:endParaRPr lang="en-US"/>
           </a:p>
@@ -8039,7 +8040,7 @@
           <a:p>
             <a:fld id="{EC4347D3-4C9A-C240-8F14-750059DFEEB0}" type="datetimeFigureOut">
               <a:rPr lang="en-US" smtClean="0"/>
-              <a:t>10/17/23</a:t>
+              <a:t>10/19/23</a:t>
             </a:fld>
             <a:endParaRPr lang="en-US"/>
           </a:p>
@@ -8271,7 +8272,7 @@
           <a:p>
             <a:fld id="{EC4347D3-4C9A-C240-8F14-750059DFEEB0}" type="datetimeFigureOut">
               <a:rPr lang="en-US" smtClean="0"/>
-              <a:t>10/17/23</a:t>
+              <a:t>10/19/23</a:t>
             </a:fld>
             <a:endParaRPr lang="en-US"/>
           </a:p>
@@ -8657,7 +8658,7 @@
           <a:p>
             <a:fld id="{EC4347D3-4C9A-C240-8F14-750059DFEEB0}" type="datetimeFigureOut">
               <a:rPr lang="en-US" smtClean="0"/>
-              <a:t>10/17/23</a:t>
+              <a:t>10/19/23</a:t>
             </a:fld>
             <a:endParaRPr lang="en-US"/>
           </a:p>
@@ -8780,7 +8781,7 @@
           <a:p>
             <a:fld id="{EC4347D3-4C9A-C240-8F14-750059DFEEB0}" type="datetimeFigureOut">
               <a:rPr lang="en-US" smtClean="0"/>
-              <a:t>10/17/23</a:t>
+              <a:t>10/19/23</a:t>
             </a:fld>
             <a:endParaRPr lang="en-US"/>
           </a:p>
@@ -8875,7 +8876,7 @@
           <a:p>
             <a:fld id="{EC4347D3-4C9A-C240-8F14-750059DFEEB0}" type="datetimeFigureOut">
               <a:rPr lang="en-US" smtClean="0"/>
-              <a:t>10/17/23</a:t>
+              <a:t>10/19/23</a:t>
             </a:fld>
             <a:endParaRPr lang="en-US"/>
           </a:p>
@@ -9124,7 +9125,7 @@
           <a:p>
             <a:fld id="{EC4347D3-4C9A-C240-8F14-750059DFEEB0}" type="datetimeFigureOut">
               <a:rPr lang="en-US" smtClean="0"/>
-              <a:t>10/17/23</a:t>
+              <a:t>10/19/23</a:t>
             </a:fld>
             <a:endParaRPr lang="en-US"/>
           </a:p>
@@ -9409,7 +9410,7 @@
           <a:p>
             <a:fld id="{EC4347D3-4C9A-C240-8F14-750059DFEEB0}" type="datetimeFigureOut">
               <a:rPr lang="en-US" smtClean="0"/>
-              <a:t>10/17/23</a:t>
+              <a:t>10/19/23</a:t>
             </a:fld>
             <a:endParaRPr lang="en-US"/>
           </a:p>
@@ -9532,7 +9533,7 @@
           <a:noFill/>
           <a:extLst>
             <a:ext uri="{909E8E84-426E-40dd-AFC4-6F175D3DCCD1}">
-              <a14:hiddenFill xmlns:a14="http://schemas.microsoft.com/office/drawing/2010/main" xmlns="">
+              <a14:hiddenFill xmlns="" xmlns:a14="http://schemas.microsoft.com/office/drawing/2010/main">
                 <a:solidFill>
                   <a:srgbClr val="FFFFFF"/>
                 </a:solidFill>
@@ -9606,7 +9607,7 @@
               </a:ln>
               <a:extLst>
                 <a:ext uri="{91240B29-F687-4f45-9708-019B960494DF}">
-                  <a14:hiddenLine xmlns:a14="http://schemas.microsoft.com/office/drawing/2010/main" xmlns="" w="9525">
+                  <a14:hiddenLine xmlns="" xmlns:a14="http://schemas.microsoft.com/office/drawing/2010/main" w="9525">
                     <a:solidFill>
                       <a:srgbClr val="000000"/>
                     </a:solidFill>
@@ -9696,7 +9697,7 @@
               </a:ln>
               <a:extLst>
                 <a:ext uri="{91240B29-F687-4f45-9708-019B960494DF}">
-                  <a14:hiddenLine xmlns:a14="http://schemas.microsoft.com/office/drawing/2010/main" xmlns="" w="9525">
+                  <a14:hiddenLine xmlns="" xmlns:a14="http://schemas.microsoft.com/office/drawing/2010/main" w="9525">
                     <a:solidFill>
                       <a:srgbClr val="000000"/>
                     </a:solidFill>
@@ -9786,7 +9787,7 @@
               </a:ln>
               <a:extLst>
                 <a:ext uri="{91240B29-F687-4f45-9708-019B960494DF}">
-                  <a14:hiddenLine xmlns:a14="http://schemas.microsoft.com/office/drawing/2010/main" xmlns="" w="9525">
+                  <a14:hiddenLine xmlns="" xmlns:a14="http://schemas.microsoft.com/office/drawing/2010/main" w="9525">
                     <a:solidFill>
                       <a:srgbClr val="000000"/>
                     </a:solidFill>
@@ -9848,7 +9849,7 @@
               </a:ln>
               <a:extLst>
                 <a:ext uri="{91240B29-F687-4f45-9708-019B960494DF}">
-                  <a14:hiddenLine xmlns:a14="http://schemas.microsoft.com/office/drawing/2010/main" xmlns="" w="9525">
+                  <a14:hiddenLine xmlns="" xmlns:a14="http://schemas.microsoft.com/office/drawing/2010/main" w="9525">
                     <a:solidFill>
                       <a:srgbClr val="000000"/>
                     </a:solidFill>
@@ -9938,7 +9939,7 @@
               </a:ln>
               <a:extLst>
                 <a:ext uri="{91240B29-F687-4f45-9708-019B960494DF}">
-                  <a14:hiddenLine xmlns:a14="http://schemas.microsoft.com/office/drawing/2010/main" xmlns="" w="9525">
+                  <a14:hiddenLine xmlns="" xmlns:a14="http://schemas.microsoft.com/office/drawing/2010/main" w="9525">
                     <a:solidFill>
                       <a:srgbClr val="000000"/>
                     </a:solidFill>
@@ -10000,7 +10001,7 @@
               </a:ln>
               <a:extLst>
                 <a:ext uri="{91240B29-F687-4f45-9708-019B960494DF}">
-                  <a14:hiddenLine xmlns:a14="http://schemas.microsoft.com/office/drawing/2010/main" xmlns="" w="9525">
+                  <a14:hiddenLine xmlns="" xmlns:a14="http://schemas.microsoft.com/office/drawing/2010/main" w="9525">
                     <a:solidFill>
                       <a:srgbClr val="000000"/>
                     </a:solidFill>
@@ -10062,7 +10063,7 @@
               </a:ln>
               <a:extLst>
                 <a:ext uri="{91240B29-F687-4f45-9708-019B960494DF}">
-                  <a14:hiddenLine xmlns:a14="http://schemas.microsoft.com/office/drawing/2010/main" xmlns="" w="9525">
+                  <a14:hiddenLine xmlns="" xmlns:a14="http://schemas.microsoft.com/office/drawing/2010/main" w="9525">
                     <a:solidFill>
                       <a:srgbClr val="000000"/>
                     </a:solidFill>
@@ -10152,7 +10153,7 @@
               </a:ln>
               <a:extLst>
                 <a:ext uri="{91240B29-F687-4f45-9708-019B960494DF}">
-                  <a14:hiddenLine xmlns:a14="http://schemas.microsoft.com/office/drawing/2010/main" xmlns="" w="9525">
+                  <a14:hiddenLine xmlns="" xmlns:a14="http://schemas.microsoft.com/office/drawing/2010/main" w="9525">
                     <a:solidFill>
                       <a:srgbClr val="000000"/>
                     </a:solidFill>
@@ -10242,7 +10243,7 @@
               </a:ln>
               <a:extLst>
                 <a:ext uri="{91240B29-F687-4f45-9708-019B960494DF}">
-                  <a14:hiddenLine xmlns:a14="http://schemas.microsoft.com/office/drawing/2010/main" xmlns="" w="9525">
+                  <a14:hiddenLine xmlns="" xmlns:a14="http://schemas.microsoft.com/office/drawing/2010/main" w="9525">
                     <a:solidFill>
                       <a:srgbClr val="000000"/>
                     </a:solidFill>
@@ -10304,7 +10305,7 @@
               </a:ln>
               <a:extLst>
                 <a:ext uri="{91240B29-F687-4f45-9708-019B960494DF}">
-                  <a14:hiddenLine xmlns:a14="http://schemas.microsoft.com/office/drawing/2010/main" xmlns="" w="9525">
+                  <a14:hiddenLine xmlns="" xmlns:a14="http://schemas.microsoft.com/office/drawing/2010/main" w="9525">
                     <a:solidFill>
                       <a:srgbClr val="000000"/>
                     </a:solidFill>
@@ -10414,7 +10415,7 @@
               </a:ln>
               <a:extLst>
                 <a:ext uri="{91240B29-F687-4f45-9708-019B960494DF}">
-                  <a14:hiddenLine xmlns:a14="http://schemas.microsoft.com/office/drawing/2010/main" xmlns="" w="9525">
+                  <a14:hiddenLine xmlns="" xmlns:a14="http://schemas.microsoft.com/office/drawing/2010/main" w="9525">
                     <a:solidFill>
                       <a:srgbClr val="000000"/>
                     </a:solidFill>
@@ -10498,7 +10499,7 @@
               </a:ln>
               <a:extLst>
                 <a:ext uri="{91240B29-F687-4f45-9708-019B960494DF}">
-                  <a14:hiddenLine xmlns:a14="http://schemas.microsoft.com/office/drawing/2010/main" xmlns="" w="9525">
+                  <a14:hiddenLine xmlns="" xmlns:a14="http://schemas.microsoft.com/office/drawing/2010/main" w="9525">
                     <a:solidFill>
                       <a:srgbClr val="000000"/>
                     </a:solidFill>
@@ -10560,7 +10561,7 @@
               </a:ln>
               <a:extLst>
                 <a:ext uri="{91240B29-F687-4f45-9708-019B960494DF}">
-                  <a14:hiddenLine xmlns:a14="http://schemas.microsoft.com/office/drawing/2010/main" xmlns="" w="9525">
+                  <a14:hiddenLine xmlns="" xmlns:a14="http://schemas.microsoft.com/office/drawing/2010/main" w="9525">
                     <a:solidFill>
                       <a:srgbClr val="000000"/>
                     </a:solidFill>
@@ -10622,7 +10623,7 @@
               </a:ln>
               <a:extLst>
                 <a:ext uri="{91240B29-F687-4f45-9708-019B960494DF}">
-                  <a14:hiddenLine xmlns:a14="http://schemas.microsoft.com/office/drawing/2010/main" xmlns="" w="9525">
+                  <a14:hiddenLine xmlns="" xmlns:a14="http://schemas.microsoft.com/office/drawing/2010/main" w="9525">
                     <a:solidFill>
                       <a:srgbClr val="000000"/>
                     </a:solidFill>
@@ -10712,7 +10713,7 @@
               </a:ln>
               <a:extLst>
                 <a:ext uri="{91240B29-F687-4f45-9708-019B960494DF}">
-                  <a14:hiddenLine xmlns:a14="http://schemas.microsoft.com/office/drawing/2010/main" xmlns="" w="9525">
+                  <a14:hiddenLine xmlns="" xmlns:a14="http://schemas.microsoft.com/office/drawing/2010/main" w="9525">
                     <a:solidFill>
                       <a:srgbClr val="000000"/>
                     </a:solidFill>
@@ -10746,7 +10747,7 @@
               </a:ln>
               <a:extLst>
                 <a:ext uri="{91240B29-F687-4f45-9708-019B960494DF}">
-                  <a14:hiddenLine xmlns:a14="http://schemas.microsoft.com/office/drawing/2010/main" xmlns="" w="9525">
+                  <a14:hiddenLine xmlns="" xmlns:a14="http://schemas.microsoft.com/office/drawing/2010/main" w="9525">
                     <a:solidFill>
                       <a:srgbClr val="000000"/>
                     </a:solidFill>
@@ -10811,7 +10812,7 @@
               </a:ln>
               <a:extLst>
                 <a:ext uri="{91240B29-F687-4f45-9708-019B960494DF}">
-                  <a14:hiddenLine xmlns:a14="http://schemas.microsoft.com/office/drawing/2010/main" xmlns="" w="9525">
+                  <a14:hiddenLine xmlns="" xmlns:a14="http://schemas.microsoft.com/office/drawing/2010/main" w="9525">
                     <a:solidFill>
                       <a:srgbClr val="000000"/>
                     </a:solidFill>
@@ -10901,7 +10902,7 @@
               </a:ln>
               <a:extLst>
                 <a:ext uri="{91240B29-F687-4f45-9708-019B960494DF}">
-                  <a14:hiddenLine xmlns:a14="http://schemas.microsoft.com/office/drawing/2010/main" xmlns="" w="9525">
+                  <a14:hiddenLine xmlns="" xmlns:a14="http://schemas.microsoft.com/office/drawing/2010/main" w="9525">
                     <a:solidFill>
                       <a:srgbClr val="000000"/>
                     </a:solidFill>
@@ -10963,7 +10964,7 @@
               </a:ln>
               <a:extLst>
                 <a:ext uri="{91240B29-F687-4f45-9708-019B960494DF}">
-                  <a14:hiddenLine xmlns:a14="http://schemas.microsoft.com/office/drawing/2010/main" xmlns="" w="9525">
+                  <a14:hiddenLine xmlns="" xmlns:a14="http://schemas.microsoft.com/office/drawing/2010/main" w="9525">
                     <a:solidFill>
                       <a:srgbClr val="000000"/>
                     </a:solidFill>
@@ -11053,7 +11054,7 @@
               </a:ln>
               <a:extLst>
                 <a:ext uri="{91240B29-F687-4f45-9708-019B960494DF}">
-                  <a14:hiddenLine xmlns:a14="http://schemas.microsoft.com/office/drawing/2010/main" xmlns="" w="9525">
+                  <a14:hiddenLine xmlns="" xmlns:a14="http://schemas.microsoft.com/office/drawing/2010/main" w="9525">
                     <a:solidFill>
                       <a:srgbClr val="000000"/>
                     </a:solidFill>
@@ -11118,7 +11119,7 @@
               </a:ln>
               <a:extLst>
                 <a:ext uri="{91240B29-F687-4f45-9708-019B960494DF}">
-                  <a14:hiddenLine xmlns:a14="http://schemas.microsoft.com/office/drawing/2010/main" xmlns="" w="9525">
+                  <a14:hiddenLine xmlns="" xmlns:a14="http://schemas.microsoft.com/office/drawing/2010/main" w="9525">
                     <a:solidFill>
                       <a:srgbClr val="000000"/>
                     </a:solidFill>
@@ -11180,7 +11181,7 @@
               </a:ln>
               <a:extLst>
                 <a:ext uri="{91240B29-F687-4f45-9708-019B960494DF}">
-                  <a14:hiddenLine xmlns:a14="http://schemas.microsoft.com/office/drawing/2010/main" xmlns="" w="9525">
+                  <a14:hiddenLine xmlns="" xmlns:a14="http://schemas.microsoft.com/office/drawing/2010/main" w="9525">
                     <a:solidFill>
                       <a:srgbClr val="000000"/>
                     </a:solidFill>
@@ -11270,7 +11271,7 @@
               </a:ln>
               <a:extLst>
                 <a:ext uri="{91240B29-F687-4f45-9708-019B960494DF}">
-                  <a14:hiddenLine xmlns:a14="http://schemas.microsoft.com/office/drawing/2010/main" xmlns="" w="9525">
+                  <a14:hiddenLine xmlns="" xmlns:a14="http://schemas.microsoft.com/office/drawing/2010/main" w="9525">
                     <a:solidFill>
                       <a:srgbClr val="000000"/>
                     </a:solidFill>
@@ -11360,7 +11361,7 @@
               </a:ln>
               <a:extLst>
                 <a:ext uri="{91240B29-F687-4f45-9708-019B960494DF}">
-                  <a14:hiddenLine xmlns:a14="http://schemas.microsoft.com/office/drawing/2010/main" xmlns="" w="9525">
+                  <a14:hiddenLine xmlns="" xmlns:a14="http://schemas.microsoft.com/office/drawing/2010/main" w="9525">
                     <a:solidFill>
                       <a:srgbClr val="000000"/>
                     </a:solidFill>
@@ -11425,7 +11426,7 @@
               </a:ln>
               <a:extLst>
                 <a:ext uri="{91240B29-F687-4f45-9708-019B960494DF}">
-                  <a14:hiddenLine xmlns:a14="http://schemas.microsoft.com/office/drawing/2010/main" xmlns="" w="9525">
+                  <a14:hiddenLine xmlns="" xmlns:a14="http://schemas.microsoft.com/office/drawing/2010/main" w="9525">
                     <a:solidFill>
                       <a:srgbClr val="000000"/>
                     </a:solidFill>
@@ -11545,7 +11546,7 @@
               </a:ln>
               <a:extLst>
                 <a:ext uri="{91240B29-F687-4f45-9708-019B960494DF}">
-                  <a14:hiddenLine xmlns:a14="http://schemas.microsoft.com/office/drawing/2010/main" xmlns="" w="9525">
+                  <a14:hiddenLine xmlns="" xmlns:a14="http://schemas.microsoft.com/office/drawing/2010/main" w="9525">
                     <a:solidFill>
                       <a:srgbClr val="000000"/>
                     </a:solidFill>
@@ -11626,7 +11627,7 @@
               </a:ln>
               <a:extLst>
                 <a:ext uri="{91240B29-F687-4f45-9708-019B960494DF}">
-                  <a14:hiddenLine xmlns:a14="http://schemas.microsoft.com/office/drawing/2010/main" xmlns="" w="9525">
+                  <a14:hiddenLine xmlns="" xmlns:a14="http://schemas.microsoft.com/office/drawing/2010/main" w="9525">
                     <a:solidFill>
                       <a:srgbClr val="000000"/>
                     </a:solidFill>
@@ -11741,7 +11742,7 @@
               </a:ln>
               <a:extLst>
                 <a:ext uri="{91240B29-F687-4f45-9708-019B960494DF}">
-                  <a14:hiddenLine xmlns:a14="http://schemas.microsoft.com/office/drawing/2010/main" xmlns="" w="9525">
+                  <a14:hiddenLine xmlns="" xmlns:a14="http://schemas.microsoft.com/office/drawing/2010/main" w="9525">
                     <a:solidFill>
                       <a:srgbClr val="000000"/>
                     </a:solidFill>
@@ -11831,7 +11832,7 @@
               </a:ln>
               <a:extLst>
                 <a:ext uri="{91240B29-F687-4f45-9708-019B960494DF}">
-                  <a14:hiddenLine xmlns:a14="http://schemas.microsoft.com/office/drawing/2010/main" xmlns="" w="9525">
+                  <a14:hiddenLine xmlns="" xmlns:a14="http://schemas.microsoft.com/office/drawing/2010/main" w="9525">
                     <a:solidFill>
                       <a:srgbClr val="000000"/>
                     </a:solidFill>
@@ -11896,7 +11897,7 @@
               </a:ln>
               <a:extLst>
                 <a:ext uri="{91240B29-F687-4f45-9708-019B960494DF}">
-                  <a14:hiddenLine xmlns:a14="http://schemas.microsoft.com/office/drawing/2010/main" xmlns="" w="9525">
+                  <a14:hiddenLine xmlns="" xmlns:a14="http://schemas.microsoft.com/office/drawing/2010/main" w="9525">
                     <a:solidFill>
                       <a:srgbClr val="000000"/>
                     </a:solidFill>
@@ -11986,7 +11987,7 @@
               </a:ln>
               <a:extLst>
                 <a:ext uri="{91240B29-F687-4f45-9708-019B960494DF}">
-                  <a14:hiddenLine xmlns:a14="http://schemas.microsoft.com/office/drawing/2010/main" xmlns="" w="9525">
+                  <a14:hiddenLine xmlns="" xmlns:a14="http://schemas.microsoft.com/office/drawing/2010/main" w="9525">
                     <a:solidFill>
                       <a:srgbClr val="000000"/>
                     </a:solidFill>
@@ -12054,7 +12055,7 @@
               </a:ln>
               <a:extLst>
                 <a:ext uri="{91240B29-F687-4f45-9708-019B960494DF}">
-                  <a14:hiddenLine xmlns:a14="http://schemas.microsoft.com/office/drawing/2010/main" xmlns="" w="9525">
+                  <a14:hiddenLine xmlns="" xmlns:a14="http://schemas.microsoft.com/office/drawing/2010/main" w="9525">
                     <a:solidFill>
                       <a:srgbClr val="000000"/>
                     </a:solidFill>
@@ -12144,7 +12145,7 @@
               </a:ln>
               <a:extLst>
                 <a:ext uri="{91240B29-F687-4f45-9708-019B960494DF}">
-                  <a14:hiddenLine xmlns:a14="http://schemas.microsoft.com/office/drawing/2010/main" xmlns="" w="9525">
+                  <a14:hiddenLine xmlns="" xmlns:a14="http://schemas.microsoft.com/office/drawing/2010/main" w="9525">
                     <a:solidFill>
                       <a:srgbClr val="000000"/>
                     </a:solidFill>
@@ -12212,7 +12213,7 @@
               </a:ln>
               <a:extLst>
                 <a:ext uri="{91240B29-F687-4f45-9708-019B960494DF}">
-                  <a14:hiddenLine xmlns:a14="http://schemas.microsoft.com/office/drawing/2010/main" xmlns="" w="9525">
+                  <a14:hiddenLine xmlns="" xmlns:a14="http://schemas.microsoft.com/office/drawing/2010/main" w="9525">
                     <a:solidFill>
                       <a:srgbClr val="000000"/>
                     </a:solidFill>
@@ -12302,7 +12303,7 @@
               </a:ln>
               <a:extLst>
                 <a:ext uri="{91240B29-F687-4f45-9708-019B960494DF}">
-                  <a14:hiddenLine xmlns:a14="http://schemas.microsoft.com/office/drawing/2010/main" xmlns="" w="9525">
+                  <a14:hiddenLine xmlns="" xmlns:a14="http://schemas.microsoft.com/office/drawing/2010/main" w="9525">
                     <a:solidFill>
                       <a:srgbClr val="000000"/>
                     </a:solidFill>
@@ -12336,7 +12337,7 @@
               </a:ln>
               <a:extLst>
                 <a:ext uri="{91240B29-F687-4f45-9708-019B960494DF}">
-                  <a14:hiddenLine xmlns:a14="http://schemas.microsoft.com/office/drawing/2010/main" xmlns="" w="9525">
+                  <a14:hiddenLine xmlns="" xmlns:a14="http://schemas.microsoft.com/office/drawing/2010/main" w="9525">
                     <a:solidFill>
                       <a:srgbClr val="000000"/>
                     </a:solidFill>
@@ -12476,7 +12477,7 @@
           <a:p>
             <a:fld id="{EC4347D3-4C9A-C240-8F14-750059DFEEB0}" type="datetimeFigureOut">
               <a:rPr lang="en-US" smtClean="0"/>
-              <a:t>10/17/23</a:t>
+              <a:t>10/19/23</a:t>
             </a:fld>
             <a:endParaRPr lang="en-US"/>
           </a:p>
@@ -13818,6 +13819,195 @@
 </p:sld>
 </file>
 
+<file path=ppt/slides/slide15.xml><?xml version="1.0" encoding="utf-8"?>
+<p:sld xmlns:a="http://schemas.openxmlformats.org/drawingml/2006/main" xmlns:r="http://schemas.openxmlformats.org/officeDocument/2006/relationships" xmlns:p="http://schemas.openxmlformats.org/presentationml/2006/main">
+  <p:cSld>
+    <p:spTree>
+      <p:nvGrpSpPr>
+        <p:cNvPr id="1" name=""/>
+        <p:cNvGrpSpPr/>
+        <p:nvPr/>
+      </p:nvGrpSpPr>
+      <p:grpSpPr>
+        <a:xfrm>
+          <a:off x="0" y="0"/>
+          <a:ext cx="0" cy="0"/>
+          <a:chOff x="0" y="0"/>
+          <a:chExt cx="0" cy="0"/>
+        </a:xfrm>
+      </p:grpSpPr>
+      <p:sp>
+        <p:nvSpPr>
+          <p:cNvPr id="6146" name="Rectangle 2"/>
+          <p:cNvSpPr>
+            <a:spLocks noGrp="1" noChangeArrowheads="1"/>
+          </p:cNvSpPr>
+          <p:nvPr>
+            <p:ph type="title"/>
+            <p:custDataLst>
+              <p:tags r:id="rId1"/>
+            </p:custDataLst>
+          </p:nvPr>
+        </p:nvSpPr>
+        <p:spPr>
+          <a:xfrm>
+            <a:off x="1141413" y="284084"/>
+            <a:ext cx="9905998" cy="620791"/>
+          </a:xfrm>
+        </p:spPr>
+        <p:txBody>
+          <a:bodyPr/>
+          <a:lstStyle/>
+          <a:p>
+            <a:pPr algn="ctr"/>
+            <a:r>
+              <a:rPr lang="en-US" dirty="0"/>
+              <a:t>Lecture 15: TUE Oct. 19</a:t>
+            </a:r>
+          </a:p>
+        </p:txBody>
+      </p:sp>
+      <p:sp>
+        <p:nvSpPr>
+          <p:cNvPr id="6147" name="Rectangle 3"/>
+          <p:cNvSpPr>
+            <a:spLocks noGrp="1" noChangeArrowheads="1"/>
+          </p:cNvSpPr>
+          <p:nvPr>
+            <p:ph idx="1"/>
+            <p:custDataLst>
+              <p:tags r:id="rId2"/>
+            </p:custDataLst>
+          </p:nvPr>
+        </p:nvSpPr>
+        <p:spPr>
+          <a:xfrm>
+            <a:off x="1141413" y="1123950"/>
+            <a:ext cx="9970724" cy="5149850"/>
+          </a:xfrm>
+        </p:spPr>
+        <p:txBody>
+          <a:bodyPr>
+            <a:normAutofit/>
+          </a:bodyPr>
+          <a:lstStyle/>
+          <a:p>
+            <a:r>
+              <a:rPr lang="en-US" dirty="0"/>
+              <a:t>DMT2 is </a:t>
+            </a:r>
+            <a:r>
+              <a:rPr lang="en-US" b="1" i="1" u="sng" dirty="0"/>
+              <a:t>going to be great</a:t>
+            </a:r>
+            <a:r>
+              <a:rPr lang="en-US" dirty="0"/>
+              <a:t>! Let’s learn a lot of stuff together!</a:t>
+            </a:r>
+          </a:p>
+          <a:p>
+            <a:r>
+              <a:rPr lang="en-US" dirty="0"/>
+              <a:t>Programming assignment is due on Thursday.</a:t>
+            </a:r>
+          </a:p>
+          <a:p>
+            <a:pPr lvl="1"/>
+            <a:r>
+              <a:rPr lang="en-US" dirty="0"/>
+              <a:t>Don’t forget that this one is an individual assignment!!!!</a:t>
+            </a:r>
+          </a:p>
+          <a:p>
+            <a:pPr lvl="1"/>
+            <a:r>
+              <a:rPr lang="en-US" dirty="0"/>
+              <a:t>Don’t hesitate to come to office hours if you need help on this one.</a:t>
+            </a:r>
+          </a:p>
+          <a:p>
+            <a:r>
+              <a:rPr lang="en-US" dirty="0"/>
+              <a:t>Quiz went well last Thursday!</a:t>
+            </a:r>
+          </a:p>
+          <a:p>
+            <a:pPr lvl="1"/>
+            <a:r>
+              <a:rPr lang="en-US" dirty="0"/>
+              <a:t>We did not finish grading last night but we made great progress.</a:t>
+            </a:r>
+          </a:p>
+          <a:p>
+            <a:pPr lvl="1"/>
+            <a:r>
+              <a:rPr lang="en-US" dirty="0"/>
+              <a:t>We will finish by the end of the weekend, but I’m hoping for earlier.</a:t>
+            </a:r>
+          </a:p>
+          <a:p>
+            <a:r>
+              <a:rPr lang="en-US" dirty="0"/>
+              <a:t>Don’t forget you have a written homework due next Thursday as well.</a:t>
+            </a:r>
+          </a:p>
+          <a:p>
+            <a:pPr lvl="1"/>
+            <a:r>
+              <a:rPr lang="en-US" dirty="0"/>
+              <a:t>For module 3. You can go back to group work for that one.</a:t>
+            </a:r>
+          </a:p>
+          <a:p>
+            <a:r>
+              <a:rPr lang="en-US" dirty="0"/>
+              <a:t>Today we </a:t>
+            </a:r>
+            <a:r>
+              <a:rPr lang="en-US"/>
+              <a:t>begin module 4. </a:t>
+            </a:r>
+            <a:endParaRPr lang="en-US" dirty="0"/>
+          </a:p>
+        </p:txBody>
+      </p:sp>
+      <p:sp>
+        <p:nvSpPr>
+          <p:cNvPr id="4" name="Slide Number Placeholder 3"/>
+          <p:cNvSpPr>
+            <a:spLocks noGrp="1"/>
+          </p:cNvSpPr>
+          <p:nvPr>
+            <p:ph type="sldNum" sz="quarter" idx="12"/>
+          </p:nvPr>
+        </p:nvSpPr>
+        <p:spPr/>
+        <p:txBody>
+          <a:bodyPr/>
+          <a:lstStyle/>
+          <a:p>
+            <a:fld id="{F26D9103-0C5C-48AC-B68E-3ED2C1647047}" type="slidenum">
+              <a:rPr lang="en-US" smtClean="0"/>
+              <a:pPr/>
+              <a:t>15</a:t>
+            </a:fld>
+            <a:endParaRPr lang="en-US" dirty="0"/>
+          </a:p>
+        </p:txBody>
+      </p:sp>
+    </p:spTree>
+    <p:extLst>
+      <p:ext uri="{BB962C8B-B14F-4D97-AF65-F5344CB8AC3E}">
+        <p14:creationId xmlns:p14="http://schemas.microsoft.com/office/powerpoint/2010/main" val="512631693"/>
+      </p:ext>
+    </p:extLst>
+  </p:cSld>
+  <p:clrMapOvr>
+    <a:masterClrMapping/>
+  </p:clrMapOvr>
+</p:sld>
+</file>
+
 <file path=ppt/slides/slide2.xml><?xml version="1.0" encoding="utf-8"?>
 <p:sld xmlns:a="http://schemas.openxmlformats.org/drawingml/2006/main" xmlns:r="http://schemas.openxmlformats.org/officeDocument/2006/relationships" xmlns:p="http://schemas.openxmlformats.org/presentationml/2006/main">
   <p:cSld>
@@ -15324,6 +15514,18 @@
 </file>
 
 <file path=ppt/tags/tag26.xml><?xml version="1.0" encoding="utf-8"?>
+<p:tagLst xmlns:a="http://schemas.openxmlformats.org/drawingml/2006/main" xmlns:r="http://schemas.openxmlformats.org/officeDocument/2006/relationships" xmlns:p="http://schemas.openxmlformats.org/presentationml/2006/main">
+  <p:tag name="_INSTRUCTOR VIEW19C14C36-AC8E-43BC-9DB6-C2AAF774C7DC|PANE__TAG" val="_"/>
+</p:tagLst>
+</file>
+
+<file path=ppt/tags/tag27.xml><?xml version="1.0" encoding="utf-8"?>
+<p:tagLst xmlns:a="http://schemas.openxmlformats.org/drawingml/2006/main" xmlns:r="http://schemas.openxmlformats.org/officeDocument/2006/relationships" xmlns:p="http://schemas.openxmlformats.org/presentationml/2006/main">
+  <p:tag name="_INSTRUCTOR VIEW19C14C36-AC8E-43BC-9DB6-C2AAF774C7DC|PANE__TAG" val="_"/>
+</p:tagLst>
+</file>
+
+<file path=ppt/tags/tag28.xml><?xml version="1.0" encoding="utf-8"?>
 <p:tagLst xmlns:a="http://schemas.openxmlformats.org/drawingml/2006/main" xmlns:r="http://schemas.openxmlformats.org/officeDocument/2006/relationships" xmlns:p="http://schemas.openxmlformats.org/presentationml/2006/main">
   <p:tag name="_INSTRUCTOR VIEW19C14C36-AC8E-43BC-9DB6-C2AAF774C7DC|PANE__TAG" val="_"/>
 </p:tagLst>

</xml_diff>

<commit_message>
adding quiz from day 1. Announcements
</commit_message>
<xml_diff>
--- a/slides/00-DailyAnnouncements.pptx
+++ b/slides/00-DailyAnnouncements.pptx
@@ -5,7 +5,7 @@
     <p:sldMasterId id="2147484006" r:id="rId1"/>
   </p:sldMasterIdLst>
   <p:notesMasterIdLst>
-    <p:notesMasterId r:id="rId17"/>
+    <p:notesMasterId r:id="rId18"/>
   </p:notesMasterIdLst>
   <p:sldIdLst>
     <p:sldId id="256" r:id="rId2"/>
@@ -23,6 +23,7 @@
     <p:sldId id="516" r:id="rId14"/>
     <p:sldId id="517" r:id="rId15"/>
     <p:sldId id="518" r:id="rId16"/>
+    <p:sldId id="519" r:id="rId17"/>
   </p:sldIdLst>
   <p:sldSz cx="12192000" cy="6858000"/>
   <p:notesSz cx="6858000" cy="9144000"/>
@@ -211,7 +212,7 @@
           <a:p>
             <a:fld id="{C5B45307-6ED4-B142-BD64-10F739779302}" type="datetimeFigureOut">
               <a:rPr lang="en-US" smtClean="0"/>
-              <a:t>10/19/23</a:t>
+              <a:t>10/24/23</a:t>
             </a:fld>
             <a:endParaRPr lang="en-US"/>
           </a:p>
@@ -619,7 +620,7 @@
           <a:noFill/>
           <a:extLst>
             <a:ext uri="{909E8E84-426E-40dd-AFC4-6F175D3DCCD1}">
-              <a14:hiddenFill xmlns="" xmlns:a14="http://schemas.microsoft.com/office/drawing/2010/main">
+              <a14:hiddenFill xmlns:a14="http://schemas.microsoft.com/office/drawing/2010/main" xmlns="">
                 <a:solidFill>
                   <a:srgbClr val="FFFFFF"/>
                 </a:solidFill>
@@ -678,7 +679,7 @@
             </a:ln>
             <a:extLst>
               <a:ext uri="{91240B29-F687-4f45-9708-019B960494DF}">
-                <a14:hiddenLine xmlns="" xmlns:a14="http://schemas.microsoft.com/office/drawing/2010/main" w="9525">
+                <a14:hiddenLine xmlns:a14="http://schemas.microsoft.com/office/drawing/2010/main" xmlns="" w="9525">
                   <a:solidFill>
                     <a:srgbClr val="000000"/>
                   </a:solidFill>
@@ -768,7 +769,7 @@
             </a:ln>
             <a:extLst>
               <a:ext uri="{91240B29-F687-4f45-9708-019B960494DF}">
-                <a14:hiddenLine xmlns="" xmlns:a14="http://schemas.microsoft.com/office/drawing/2010/main" w="9525">
+                <a14:hiddenLine xmlns:a14="http://schemas.microsoft.com/office/drawing/2010/main" xmlns="" w="9525">
                   <a:solidFill>
                     <a:srgbClr val="000000"/>
                   </a:solidFill>
@@ -858,7 +859,7 @@
             </a:ln>
             <a:extLst>
               <a:ext uri="{91240B29-F687-4f45-9708-019B960494DF}">
-                <a14:hiddenLine xmlns="" xmlns:a14="http://schemas.microsoft.com/office/drawing/2010/main" w="9525">
+                <a14:hiddenLine xmlns:a14="http://schemas.microsoft.com/office/drawing/2010/main" xmlns="" w="9525">
                   <a:solidFill>
                     <a:srgbClr val="000000"/>
                   </a:solidFill>
@@ -892,7 +893,7 @@
             </a:ln>
             <a:extLst>
               <a:ext uri="{91240B29-F687-4f45-9708-019B960494DF}">
-                <a14:hiddenLine xmlns="" xmlns:a14="http://schemas.microsoft.com/office/drawing/2010/main" w="9525">
+                <a14:hiddenLine xmlns:a14="http://schemas.microsoft.com/office/drawing/2010/main" xmlns="" w="9525">
                   <a:solidFill>
                     <a:srgbClr val="000000"/>
                   </a:solidFill>
@@ -982,7 +983,7 @@
             </a:ln>
             <a:extLst>
               <a:ext uri="{91240B29-F687-4f45-9708-019B960494DF}">
-                <a14:hiddenLine xmlns="" xmlns:a14="http://schemas.microsoft.com/office/drawing/2010/main" w="9525">
+                <a14:hiddenLine xmlns:a14="http://schemas.microsoft.com/office/drawing/2010/main" xmlns="" w="9525">
                   <a:solidFill>
                     <a:srgbClr val="000000"/>
                   </a:solidFill>
@@ -1044,7 +1045,7 @@
             </a:ln>
             <a:extLst>
               <a:ext uri="{91240B29-F687-4f45-9708-019B960494DF}">
-                <a14:hiddenLine xmlns="" xmlns:a14="http://schemas.microsoft.com/office/drawing/2010/main" w="9525">
+                <a14:hiddenLine xmlns:a14="http://schemas.microsoft.com/office/drawing/2010/main" xmlns="" w="9525">
                   <a:solidFill>
                     <a:srgbClr val="000000"/>
                   </a:solidFill>
@@ -1106,7 +1107,7 @@
             </a:ln>
             <a:extLst>
               <a:ext uri="{91240B29-F687-4f45-9708-019B960494DF}">
-                <a14:hiddenLine xmlns="" xmlns:a14="http://schemas.microsoft.com/office/drawing/2010/main" w="9525">
+                <a14:hiddenLine xmlns:a14="http://schemas.microsoft.com/office/drawing/2010/main" xmlns="" w="9525">
                   <a:solidFill>
                     <a:srgbClr val="000000"/>
                   </a:solidFill>
@@ -1196,7 +1197,7 @@
             </a:ln>
             <a:extLst>
               <a:ext uri="{91240B29-F687-4f45-9708-019B960494DF}">
-                <a14:hiddenLine xmlns="" xmlns:a14="http://schemas.microsoft.com/office/drawing/2010/main" w="9525">
+                <a14:hiddenLine xmlns:a14="http://schemas.microsoft.com/office/drawing/2010/main" xmlns="" w="9525">
                   <a:solidFill>
                     <a:srgbClr val="000000"/>
                   </a:solidFill>
@@ -1258,7 +1259,7 @@
             </a:ln>
             <a:extLst>
               <a:ext uri="{91240B29-F687-4f45-9708-019B960494DF}">
-                <a14:hiddenLine xmlns="" xmlns:a14="http://schemas.microsoft.com/office/drawing/2010/main" w="9525">
+                <a14:hiddenLine xmlns:a14="http://schemas.microsoft.com/office/drawing/2010/main" xmlns="" w="9525">
                   <a:solidFill>
                     <a:srgbClr val="000000"/>
                   </a:solidFill>
@@ -1320,7 +1321,7 @@
             </a:ln>
             <a:extLst>
               <a:ext uri="{91240B29-F687-4f45-9708-019B960494DF}">
-                <a14:hiddenLine xmlns="" xmlns:a14="http://schemas.microsoft.com/office/drawing/2010/main" w="9525">
+                <a14:hiddenLine xmlns:a14="http://schemas.microsoft.com/office/drawing/2010/main" xmlns="" w="9525">
                   <a:solidFill>
                     <a:srgbClr val="000000"/>
                   </a:solidFill>
@@ -1410,7 +1411,7 @@
             </a:ln>
             <a:extLst>
               <a:ext uri="{91240B29-F687-4f45-9708-019B960494DF}">
-                <a14:hiddenLine xmlns="" xmlns:a14="http://schemas.microsoft.com/office/drawing/2010/main" w="9525">
+                <a14:hiddenLine xmlns:a14="http://schemas.microsoft.com/office/drawing/2010/main" xmlns="" w="9525">
                   <a:solidFill>
                     <a:srgbClr val="000000"/>
                   </a:solidFill>
@@ -1500,7 +1501,7 @@
             </a:ln>
             <a:extLst>
               <a:ext uri="{91240B29-F687-4f45-9708-019B960494DF}">
-                <a14:hiddenLine xmlns="" xmlns:a14="http://schemas.microsoft.com/office/drawing/2010/main" w="9525">
+                <a14:hiddenLine xmlns:a14="http://schemas.microsoft.com/office/drawing/2010/main" xmlns="" w="9525">
                   <a:solidFill>
                     <a:srgbClr val="000000"/>
                   </a:solidFill>
@@ -1562,7 +1563,7 @@
             </a:ln>
             <a:extLst>
               <a:ext uri="{91240B29-F687-4f45-9708-019B960494DF}">
-                <a14:hiddenLine xmlns="" xmlns:a14="http://schemas.microsoft.com/office/drawing/2010/main" w="9525">
+                <a14:hiddenLine xmlns:a14="http://schemas.microsoft.com/office/drawing/2010/main" xmlns="" w="9525">
                   <a:solidFill>
                     <a:srgbClr val="000000"/>
                   </a:solidFill>
@@ -1672,7 +1673,7 @@
             </a:ln>
             <a:extLst>
               <a:ext uri="{91240B29-F687-4f45-9708-019B960494DF}">
-                <a14:hiddenLine xmlns="" xmlns:a14="http://schemas.microsoft.com/office/drawing/2010/main" w="9525">
+                <a14:hiddenLine xmlns:a14="http://schemas.microsoft.com/office/drawing/2010/main" xmlns="" w="9525">
                   <a:solidFill>
                     <a:srgbClr val="000000"/>
                   </a:solidFill>
@@ -1734,7 +1735,7 @@
             </a:ln>
             <a:extLst>
               <a:ext uri="{91240B29-F687-4f45-9708-019B960494DF}">
-                <a14:hiddenLine xmlns="" xmlns:a14="http://schemas.microsoft.com/office/drawing/2010/main" w="9525">
+                <a14:hiddenLine xmlns:a14="http://schemas.microsoft.com/office/drawing/2010/main" xmlns="" w="9525">
                   <a:solidFill>
                     <a:srgbClr val="000000"/>
                   </a:solidFill>
@@ -1824,7 +1825,7 @@
             </a:ln>
             <a:extLst>
               <a:ext uri="{91240B29-F687-4f45-9708-019B960494DF}">
-                <a14:hiddenLine xmlns="" xmlns:a14="http://schemas.microsoft.com/office/drawing/2010/main" w="9525">
+                <a14:hiddenLine xmlns:a14="http://schemas.microsoft.com/office/drawing/2010/main" xmlns="" w="9525">
                   <a:solidFill>
                     <a:srgbClr val="000000"/>
                   </a:solidFill>
@@ -1914,7 +1915,7 @@
             </a:ln>
             <a:extLst>
               <a:ext uri="{91240B29-F687-4f45-9708-019B960494DF}">
-                <a14:hiddenLine xmlns="" xmlns:a14="http://schemas.microsoft.com/office/drawing/2010/main" w="9525">
+                <a14:hiddenLine xmlns:a14="http://schemas.microsoft.com/office/drawing/2010/main" xmlns="" w="9525">
                   <a:solidFill>
                     <a:srgbClr val="000000"/>
                   </a:solidFill>
@@ -1976,7 +1977,7 @@
             </a:ln>
             <a:extLst>
               <a:ext uri="{91240B29-F687-4f45-9708-019B960494DF}">
-                <a14:hiddenLine xmlns="" xmlns:a14="http://schemas.microsoft.com/office/drawing/2010/main" w="9525">
+                <a14:hiddenLine xmlns:a14="http://schemas.microsoft.com/office/drawing/2010/main" xmlns="" w="9525">
                   <a:solidFill>
                     <a:srgbClr val="000000"/>
                   </a:solidFill>
@@ -2066,7 +2067,7 @@
             </a:ln>
             <a:extLst>
               <a:ext uri="{91240B29-F687-4f45-9708-019B960494DF}">
-                <a14:hiddenLine xmlns="" xmlns:a14="http://schemas.microsoft.com/office/drawing/2010/main" w="9525">
+                <a14:hiddenLine xmlns:a14="http://schemas.microsoft.com/office/drawing/2010/main" xmlns="" w="9525">
                   <a:solidFill>
                     <a:srgbClr val="000000"/>
                   </a:solidFill>
@@ -2156,7 +2157,7 @@
             </a:ln>
             <a:extLst>
               <a:ext uri="{91240B29-F687-4f45-9708-019B960494DF}">
-                <a14:hiddenLine xmlns="" xmlns:a14="http://schemas.microsoft.com/office/drawing/2010/main" w="9525">
+                <a14:hiddenLine xmlns:a14="http://schemas.microsoft.com/office/drawing/2010/main" xmlns="" w="9525">
                   <a:solidFill>
                     <a:srgbClr val="000000"/>
                   </a:solidFill>
@@ -2212,7 +2213,7 @@
             </a:ln>
             <a:extLst>
               <a:ext uri="{91240B29-F687-4f45-9708-019B960494DF}">
-                <a14:hiddenLine xmlns="" xmlns:a14="http://schemas.microsoft.com/office/drawing/2010/main" w="9525">
+                <a14:hiddenLine xmlns:a14="http://schemas.microsoft.com/office/drawing/2010/main" xmlns="" w="9525">
                   <a:solidFill>
                     <a:srgbClr val="000000"/>
                   </a:solidFill>
@@ -2302,7 +2303,7 @@
             </a:ln>
             <a:extLst>
               <a:ext uri="{91240B29-F687-4f45-9708-019B960494DF}">
-                <a14:hiddenLine xmlns="" xmlns:a14="http://schemas.microsoft.com/office/drawing/2010/main" w="9525">
+                <a14:hiddenLine xmlns:a14="http://schemas.microsoft.com/office/drawing/2010/main" xmlns="" w="9525">
                   <a:solidFill>
                     <a:srgbClr val="000000"/>
                   </a:solidFill>
@@ -2358,7 +2359,7 @@
             </a:ln>
             <a:extLst>
               <a:ext uri="{91240B29-F687-4f45-9708-019B960494DF}">
-                <a14:hiddenLine xmlns="" xmlns:a14="http://schemas.microsoft.com/office/drawing/2010/main" w="9525">
+                <a14:hiddenLine xmlns:a14="http://schemas.microsoft.com/office/drawing/2010/main" xmlns="" w="9525">
                   <a:solidFill>
                     <a:srgbClr val="000000"/>
                   </a:solidFill>
@@ -2448,7 +2449,7 @@
             </a:ln>
             <a:extLst>
               <a:ext uri="{91240B29-F687-4f45-9708-019B960494DF}">
-                <a14:hiddenLine xmlns="" xmlns:a14="http://schemas.microsoft.com/office/drawing/2010/main" w="9525">
+                <a14:hiddenLine xmlns:a14="http://schemas.microsoft.com/office/drawing/2010/main" xmlns="" w="9525">
                   <a:solidFill>
                     <a:srgbClr val="000000"/>
                   </a:solidFill>
@@ -2516,7 +2517,7 @@
             </a:ln>
             <a:extLst>
               <a:ext uri="{91240B29-F687-4f45-9708-019B960494DF}">
-                <a14:hiddenLine xmlns="" xmlns:a14="http://schemas.microsoft.com/office/drawing/2010/main" w="9525">
+                <a14:hiddenLine xmlns:a14="http://schemas.microsoft.com/office/drawing/2010/main" xmlns="" w="9525">
                   <a:solidFill>
                     <a:srgbClr val="000000"/>
                   </a:solidFill>
@@ -2606,7 +2607,7 @@
             </a:ln>
             <a:extLst>
               <a:ext uri="{91240B29-F687-4f45-9708-019B960494DF}">
-                <a14:hiddenLine xmlns="" xmlns:a14="http://schemas.microsoft.com/office/drawing/2010/main" w="9525">
+                <a14:hiddenLine xmlns:a14="http://schemas.microsoft.com/office/drawing/2010/main" xmlns="" w="9525">
                   <a:solidFill>
                     <a:srgbClr val="000000"/>
                   </a:solidFill>
@@ -2674,7 +2675,7 @@
             </a:ln>
             <a:extLst>
               <a:ext uri="{91240B29-F687-4f45-9708-019B960494DF}">
-                <a14:hiddenLine xmlns="" xmlns:a14="http://schemas.microsoft.com/office/drawing/2010/main" w="9525">
+                <a14:hiddenLine xmlns:a14="http://schemas.microsoft.com/office/drawing/2010/main" xmlns="" w="9525">
                   <a:solidFill>
                     <a:srgbClr val="000000"/>
                   </a:solidFill>
@@ -2764,7 +2765,7 @@
             </a:ln>
             <a:extLst>
               <a:ext uri="{91240B29-F687-4f45-9708-019B960494DF}">
-                <a14:hiddenLine xmlns="" xmlns:a14="http://schemas.microsoft.com/office/drawing/2010/main" w="9525">
+                <a14:hiddenLine xmlns:a14="http://schemas.microsoft.com/office/drawing/2010/main" xmlns="" w="9525">
                   <a:solidFill>
                     <a:srgbClr val="000000"/>
                   </a:solidFill>
@@ -2798,7 +2799,7 @@
             </a:ln>
             <a:extLst>
               <a:ext uri="{91240B29-F687-4f45-9708-019B960494DF}">
-                <a14:hiddenLine xmlns="" xmlns:a14="http://schemas.microsoft.com/office/drawing/2010/main" w="9525">
+                <a14:hiddenLine xmlns:a14="http://schemas.microsoft.com/office/drawing/2010/main" xmlns="" w="9525">
                   <a:solidFill>
                     <a:srgbClr val="000000"/>
                   </a:solidFill>
@@ -2888,7 +2889,7 @@
             </a:ln>
             <a:extLst>
               <a:ext uri="{91240B29-F687-4f45-9708-019B960494DF}">
-                <a14:hiddenLine xmlns="" xmlns:a14="http://schemas.microsoft.com/office/drawing/2010/main" w="9525">
+                <a14:hiddenLine xmlns:a14="http://schemas.microsoft.com/office/drawing/2010/main" xmlns="" w="9525">
                   <a:solidFill>
                     <a:srgbClr val="000000"/>
                   </a:solidFill>
@@ -2950,7 +2951,7 @@
             </a:ln>
             <a:extLst>
               <a:ext uri="{91240B29-F687-4f45-9708-019B960494DF}">
-                <a14:hiddenLine xmlns="" xmlns:a14="http://schemas.microsoft.com/office/drawing/2010/main" w="9525">
+                <a14:hiddenLine xmlns:a14="http://schemas.microsoft.com/office/drawing/2010/main" xmlns="" w="9525">
                   <a:solidFill>
                     <a:srgbClr val="000000"/>
                   </a:solidFill>
@@ -3012,7 +3013,7 @@
             </a:ln>
             <a:extLst>
               <a:ext uri="{91240B29-F687-4f45-9708-019B960494DF}">
-                <a14:hiddenLine xmlns="" xmlns:a14="http://schemas.microsoft.com/office/drawing/2010/main" w="9525">
+                <a14:hiddenLine xmlns:a14="http://schemas.microsoft.com/office/drawing/2010/main" xmlns="" w="9525">
                   <a:solidFill>
                     <a:srgbClr val="000000"/>
                   </a:solidFill>
@@ -3102,7 +3103,7 @@
             </a:ln>
             <a:extLst>
               <a:ext uri="{91240B29-F687-4f45-9708-019B960494DF}">
-                <a14:hiddenLine xmlns="" xmlns:a14="http://schemas.microsoft.com/office/drawing/2010/main" w="9525">
+                <a14:hiddenLine xmlns:a14="http://schemas.microsoft.com/office/drawing/2010/main" xmlns="" w="9525">
                   <a:solidFill>
                     <a:srgbClr val="000000"/>
                   </a:solidFill>
@@ -3170,7 +3171,7 @@
             </a:ln>
             <a:extLst>
               <a:ext uri="{91240B29-F687-4f45-9708-019B960494DF}">
-                <a14:hiddenLine xmlns="" xmlns:a14="http://schemas.microsoft.com/office/drawing/2010/main" w="9525">
+                <a14:hiddenLine xmlns:a14="http://schemas.microsoft.com/office/drawing/2010/main" xmlns="" w="9525">
                   <a:solidFill>
                     <a:srgbClr val="000000"/>
                   </a:solidFill>
@@ -3232,7 +3233,7 @@
             </a:ln>
             <a:extLst>
               <a:ext uri="{91240B29-F687-4f45-9708-019B960494DF}">
-                <a14:hiddenLine xmlns="" xmlns:a14="http://schemas.microsoft.com/office/drawing/2010/main" w="9525">
+                <a14:hiddenLine xmlns:a14="http://schemas.microsoft.com/office/drawing/2010/main" xmlns="" w="9525">
                   <a:solidFill>
                     <a:srgbClr val="000000"/>
                   </a:solidFill>
@@ -3322,7 +3323,7 @@
             </a:ln>
             <a:extLst>
               <a:ext uri="{91240B29-F687-4f45-9708-019B960494DF}">
-                <a14:hiddenLine xmlns="" xmlns:a14="http://schemas.microsoft.com/office/drawing/2010/main" w="9525">
+                <a14:hiddenLine xmlns:a14="http://schemas.microsoft.com/office/drawing/2010/main" xmlns="" w="9525">
                   <a:solidFill>
                     <a:srgbClr val="000000"/>
                   </a:solidFill>
@@ -3384,7 +3385,7 @@
             </a:ln>
             <a:extLst>
               <a:ext uri="{91240B29-F687-4f45-9708-019B960494DF}">
-                <a14:hiddenLine xmlns="" xmlns:a14="http://schemas.microsoft.com/office/drawing/2010/main" w="9525">
+                <a14:hiddenLine xmlns:a14="http://schemas.microsoft.com/office/drawing/2010/main" xmlns="" w="9525">
                   <a:solidFill>
                     <a:srgbClr val="000000"/>
                   </a:solidFill>
@@ -3474,7 +3475,7 @@
             </a:ln>
             <a:extLst>
               <a:ext uri="{91240B29-F687-4f45-9708-019B960494DF}">
-                <a14:hiddenLine xmlns="" xmlns:a14="http://schemas.microsoft.com/office/drawing/2010/main" w="9525">
+                <a14:hiddenLine xmlns:a14="http://schemas.microsoft.com/office/drawing/2010/main" xmlns="" w="9525">
                   <a:solidFill>
                     <a:srgbClr val="000000"/>
                   </a:solidFill>
@@ -3536,7 +3537,7 @@
             </a:ln>
             <a:extLst>
               <a:ext uri="{91240B29-F687-4f45-9708-019B960494DF}">
-                <a14:hiddenLine xmlns="" xmlns:a14="http://schemas.microsoft.com/office/drawing/2010/main" w="9525">
+                <a14:hiddenLine xmlns:a14="http://schemas.microsoft.com/office/drawing/2010/main" xmlns="" w="9525">
                   <a:solidFill>
                     <a:srgbClr val="000000"/>
                   </a:solidFill>
@@ -3626,7 +3627,7 @@
             </a:ln>
             <a:extLst>
               <a:ext uri="{91240B29-F687-4f45-9708-019B960494DF}">
-                <a14:hiddenLine xmlns="" xmlns:a14="http://schemas.microsoft.com/office/drawing/2010/main" w="9525">
+                <a14:hiddenLine xmlns:a14="http://schemas.microsoft.com/office/drawing/2010/main" xmlns="" w="9525">
                   <a:solidFill>
                     <a:srgbClr val="000000"/>
                   </a:solidFill>
@@ -3660,7 +3661,7 @@
             </a:ln>
             <a:extLst>
               <a:ext uri="{91240B29-F687-4f45-9708-019B960494DF}">
-                <a14:hiddenLine xmlns="" xmlns:a14="http://schemas.microsoft.com/office/drawing/2010/main" w="9525">
+                <a14:hiddenLine xmlns:a14="http://schemas.microsoft.com/office/drawing/2010/main" xmlns="" w="9525">
                   <a:solidFill>
                     <a:srgbClr val="000000"/>
                   </a:solidFill>
@@ -3725,7 +3726,7 @@
             </a:ln>
             <a:extLst>
               <a:ext uri="{91240B29-F687-4f45-9708-019B960494DF}">
-                <a14:hiddenLine xmlns="" xmlns:a14="http://schemas.microsoft.com/office/drawing/2010/main" w="9525">
+                <a14:hiddenLine xmlns:a14="http://schemas.microsoft.com/office/drawing/2010/main" xmlns="" w="9525">
                   <a:solidFill>
                     <a:srgbClr val="000000"/>
                   </a:solidFill>
@@ -3815,7 +3816,7 @@
             </a:ln>
             <a:extLst>
               <a:ext uri="{91240B29-F687-4f45-9708-019B960494DF}">
-                <a14:hiddenLine xmlns="" xmlns:a14="http://schemas.microsoft.com/office/drawing/2010/main" w="9525">
+                <a14:hiddenLine xmlns:a14="http://schemas.microsoft.com/office/drawing/2010/main" xmlns="" w="9525">
                   <a:solidFill>
                     <a:srgbClr val="000000"/>
                   </a:solidFill>
@@ -3877,7 +3878,7 @@
             </a:ln>
             <a:extLst>
               <a:ext uri="{91240B29-F687-4f45-9708-019B960494DF}">
-                <a14:hiddenLine xmlns="" xmlns:a14="http://schemas.microsoft.com/office/drawing/2010/main" w="9525">
+                <a14:hiddenLine xmlns:a14="http://schemas.microsoft.com/office/drawing/2010/main" xmlns="" w="9525">
                   <a:solidFill>
                     <a:srgbClr val="000000"/>
                   </a:solidFill>
@@ -3967,7 +3968,7 @@
             </a:ln>
             <a:extLst>
               <a:ext uri="{91240B29-F687-4f45-9708-019B960494DF}">
-                <a14:hiddenLine xmlns="" xmlns:a14="http://schemas.microsoft.com/office/drawing/2010/main" w="9525">
+                <a14:hiddenLine xmlns:a14="http://schemas.microsoft.com/office/drawing/2010/main" xmlns="" w="9525">
                   <a:solidFill>
                     <a:srgbClr val="000000"/>
                   </a:solidFill>
@@ -4057,7 +4058,7 @@
             </a:ln>
             <a:extLst>
               <a:ext uri="{91240B29-F687-4f45-9708-019B960494DF}">
-                <a14:hiddenLine xmlns="" xmlns:a14="http://schemas.microsoft.com/office/drawing/2010/main" w="9525">
+                <a14:hiddenLine xmlns:a14="http://schemas.microsoft.com/office/drawing/2010/main" xmlns="" w="9525">
                   <a:solidFill>
                     <a:srgbClr val="000000"/>
                   </a:solidFill>
@@ -4122,7 +4123,7 @@
             </a:ln>
             <a:extLst>
               <a:ext uri="{91240B29-F687-4f45-9708-019B960494DF}">
-                <a14:hiddenLine xmlns="" xmlns:a14="http://schemas.microsoft.com/office/drawing/2010/main" w="9525">
+                <a14:hiddenLine xmlns:a14="http://schemas.microsoft.com/office/drawing/2010/main" xmlns="" w="9525">
                   <a:solidFill>
                     <a:srgbClr val="000000"/>
                   </a:solidFill>
@@ -4184,7 +4185,7 @@
             </a:ln>
             <a:extLst>
               <a:ext uri="{91240B29-F687-4f45-9708-019B960494DF}">
-                <a14:hiddenLine xmlns="" xmlns:a14="http://schemas.microsoft.com/office/drawing/2010/main" w="9525">
+                <a14:hiddenLine xmlns:a14="http://schemas.microsoft.com/office/drawing/2010/main" xmlns="" w="9525">
                   <a:solidFill>
                     <a:srgbClr val="000000"/>
                   </a:solidFill>
@@ -4274,7 +4275,7 @@
             </a:ln>
             <a:extLst>
               <a:ext uri="{91240B29-F687-4f45-9708-019B960494DF}">
-                <a14:hiddenLine xmlns="" xmlns:a14="http://schemas.microsoft.com/office/drawing/2010/main" w="9525">
+                <a14:hiddenLine xmlns:a14="http://schemas.microsoft.com/office/drawing/2010/main" xmlns="" w="9525">
                   <a:solidFill>
                     <a:srgbClr val="000000"/>
                   </a:solidFill>
@@ -4364,7 +4365,7 @@
             </a:ln>
             <a:extLst>
               <a:ext uri="{91240B29-F687-4f45-9708-019B960494DF}">
-                <a14:hiddenLine xmlns="" xmlns:a14="http://schemas.microsoft.com/office/drawing/2010/main" w="9525">
+                <a14:hiddenLine xmlns:a14="http://schemas.microsoft.com/office/drawing/2010/main" xmlns="" w="9525">
                   <a:solidFill>
                     <a:srgbClr val="000000"/>
                   </a:solidFill>
@@ -4426,7 +4427,7 @@
             </a:ln>
             <a:extLst>
               <a:ext uri="{91240B29-F687-4f45-9708-019B960494DF}">
-                <a14:hiddenLine xmlns="" xmlns:a14="http://schemas.microsoft.com/office/drawing/2010/main" w="9525">
+                <a14:hiddenLine xmlns:a14="http://schemas.microsoft.com/office/drawing/2010/main" xmlns="" w="9525">
                   <a:solidFill>
                     <a:srgbClr val="000000"/>
                   </a:solidFill>
@@ -4546,7 +4547,7 @@
             </a:ln>
             <a:extLst>
               <a:ext uri="{91240B29-F687-4f45-9708-019B960494DF}">
-                <a14:hiddenLine xmlns="" xmlns:a14="http://schemas.microsoft.com/office/drawing/2010/main" w="9525">
+                <a14:hiddenLine xmlns:a14="http://schemas.microsoft.com/office/drawing/2010/main" xmlns="" w="9525">
                   <a:solidFill>
                     <a:srgbClr val="000000"/>
                   </a:solidFill>
@@ -4614,7 +4615,7 @@
             </a:ln>
             <a:extLst>
               <a:ext uri="{91240B29-F687-4f45-9708-019B960494DF}">
-                <a14:hiddenLine xmlns="" xmlns:a14="http://schemas.microsoft.com/office/drawing/2010/main" w="9525">
+                <a14:hiddenLine xmlns:a14="http://schemas.microsoft.com/office/drawing/2010/main" xmlns="" w="9525">
                   <a:solidFill>
                     <a:srgbClr val="000000"/>
                   </a:solidFill>
@@ -4704,7 +4705,7 @@
             </a:ln>
             <a:extLst>
               <a:ext uri="{91240B29-F687-4f45-9708-019B960494DF}">
-                <a14:hiddenLine xmlns="" xmlns:a14="http://schemas.microsoft.com/office/drawing/2010/main" w="9525">
+                <a14:hiddenLine xmlns:a14="http://schemas.microsoft.com/office/drawing/2010/main" xmlns="" w="9525">
                   <a:solidFill>
                     <a:srgbClr val="000000"/>
                   </a:solidFill>
@@ -4844,7 +4845,7 @@
           <a:p>
             <a:fld id="{EC4347D3-4C9A-C240-8F14-750059DFEEB0}" type="datetimeFigureOut">
               <a:rPr lang="en-US" smtClean="0"/>
-              <a:t>10/19/23</a:t>
+              <a:t>10/24/23</a:t>
             </a:fld>
             <a:endParaRPr lang="en-US"/>
           </a:p>
@@ -5111,7 +5112,7 @@
           <a:p>
             <a:fld id="{EC4347D3-4C9A-C240-8F14-750059DFEEB0}" type="datetimeFigureOut">
               <a:rPr lang="en-US" smtClean="0"/>
-              <a:t>10/19/23</a:t>
+              <a:t>10/24/23</a:t>
             </a:fld>
             <a:endParaRPr lang="en-US"/>
           </a:p>
@@ -5307,7 +5308,7 @@
           <a:p>
             <a:fld id="{EC4347D3-4C9A-C240-8F14-750059DFEEB0}" type="datetimeFigureOut">
               <a:rPr lang="en-US" smtClean="0"/>
-              <a:t>10/19/23</a:t>
+              <a:t>10/24/23</a:t>
             </a:fld>
             <a:endParaRPr lang="en-US"/>
           </a:p>
@@ -5570,7 +5571,7 @@
           <a:p>
             <a:fld id="{EC4347D3-4C9A-C240-8F14-750059DFEEB0}" type="datetimeFigureOut">
               <a:rPr lang="en-US" smtClean="0"/>
-              <a:t>10/19/23</a:t>
+              <a:t>10/24/23</a:t>
             </a:fld>
             <a:endParaRPr lang="en-US"/>
           </a:p>
@@ -6004,7 +6005,7 @@
           <a:p>
             <a:fld id="{EC4347D3-4C9A-C240-8F14-750059DFEEB0}" type="datetimeFigureOut">
               <a:rPr lang="en-US" smtClean="0"/>
-              <a:t>10/19/23</a:t>
+              <a:t>10/24/23</a:t>
             </a:fld>
             <a:endParaRPr lang="en-US"/>
           </a:p>
@@ -6550,7 +6551,7 @@
           <a:p>
             <a:fld id="{EC4347D3-4C9A-C240-8F14-750059DFEEB0}" type="datetimeFigureOut">
               <a:rPr lang="en-US" smtClean="0"/>
-              <a:t>10/19/23</a:t>
+              <a:t>10/24/23</a:t>
             </a:fld>
             <a:endParaRPr lang="en-US"/>
           </a:p>
@@ -7270,7 +7271,7 @@
           <a:p>
             <a:fld id="{EC4347D3-4C9A-C240-8F14-750059DFEEB0}" type="datetimeFigureOut">
               <a:rPr lang="en-US" smtClean="0"/>
-              <a:t>10/19/23</a:t>
+              <a:t>10/24/23</a:t>
             </a:fld>
             <a:endParaRPr lang="en-US"/>
           </a:p>
@@ -7440,7 +7441,7 @@
           <a:p>
             <a:fld id="{EC4347D3-4C9A-C240-8F14-750059DFEEB0}" type="datetimeFigureOut">
               <a:rPr lang="en-US" smtClean="0"/>
-              <a:t>10/19/23</a:t>
+              <a:t>10/24/23</a:t>
             </a:fld>
             <a:endParaRPr lang="en-US"/>
           </a:p>
@@ -7620,7 +7621,7 @@
           <a:p>
             <a:fld id="{EC4347D3-4C9A-C240-8F14-750059DFEEB0}" type="datetimeFigureOut">
               <a:rPr lang="en-US" smtClean="0"/>
-              <a:t>10/19/23</a:t>
+              <a:t>10/24/23</a:t>
             </a:fld>
             <a:endParaRPr lang="en-US"/>
           </a:p>
@@ -7790,7 +7791,7 @@
           <a:p>
             <a:fld id="{EC4347D3-4C9A-C240-8F14-750059DFEEB0}" type="datetimeFigureOut">
               <a:rPr lang="en-US" smtClean="0"/>
-              <a:t>10/19/23</a:t>
+              <a:t>10/24/23</a:t>
             </a:fld>
             <a:endParaRPr lang="en-US"/>
           </a:p>
@@ -8040,7 +8041,7 @@
           <a:p>
             <a:fld id="{EC4347D3-4C9A-C240-8F14-750059DFEEB0}" type="datetimeFigureOut">
               <a:rPr lang="en-US" smtClean="0"/>
-              <a:t>10/19/23</a:t>
+              <a:t>10/24/23</a:t>
             </a:fld>
             <a:endParaRPr lang="en-US"/>
           </a:p>
@@ -8272,7 +8273,7 @@
           <a:p>
             <a:fld id="{EC4347D3-4C9A-C240-8F14-750059DFEEB0}" type="datetimeFigureOut">
               <a:rPr lang="en-US" smtClean="0"/>
-              <a:t>10/19/23</a:t>
+              <a:t>10/24/23</a:t>
             </a:fld>
             <a:endParaRPr lang="en-US"/>
           </a:p>
@@ -8658,7 +8659,7 @@
           <a:p>
             <a:fld id="{EC4347D3-4C9A-C240-8F14-750059DFEEB0}" type="datetimeFigureOut">
               <a:rPr lang="en-US" smtClean="0"/>
-              <a:t>10/19/23</a:t>
+              <a:t>10/24/23</a:t>
             </a:fld>
             <a:endParaRPr lang="en-US"/>
           </a:p>
@@ -8781,7 +8782,7 @@
           <a:p>
             <a:fld id="{EC4347D3-4C9A-C240-8F14-750059DFEEB0}" type="datetimeFigureOut">
               <a:rPr lang="en-US" smtClean="0"/>
-              <a:t>10/19/23</a:t>
+              <a:t>10/24/23</a:t>
             </a:fld>
             <a:endParaRPr lang="en-US"/>
           </a:p>
@@ -8876,7 +8877,7 @@
           <a:p>
             <a:fld id="{EC4347D3-4C9A-C240-8F14-750059DFEEB0}" type="datetimeFigureOut">
               <a:rPr lang="en-US" smtClean="0"/>
-              <a:t>10/19/23</a:t>
+              <a:t>10/24/23</a:t>
             </a:fld>
             <a:endParaRPr lang="en-US"/>
           </a:p>
@@ -9125,7 +9126,7 @@
           <a:p>
             <a:fld id="{EC4347D3-4C9A-C240-8F14-750059DFEEB0}" type="datetimeFigureOut">
               <a:rPr lang="en-US" smtClean="0"/>
-              <a:t>10/19/23</a:t>
+              <a:t>10/24/23</a:t>
             </a:fld>
             <a:endParaRPr lang="en-US"/>
           </a:p>
@@ -9410,7 +9411,7 @@
           <a:p>
             <a:fld id="{EC4347D3-4C9A-C240-8F14-750059DFEEB0}" type="datetimeFigureOut">
               <a:rPr lang="en-US" smtClean="0"/>
-              <a:t>10/19/23</a:t>
+              <a:t>10/24/23</a:t>
             </a:fld>
             <a:endParaRPr lang="en-US"/>
           </a:p>
@@ -9533,7 +9534,7 @@
           <a:noFill/>
           <a:extLst>
             <a:ext uri="{909E8E84-426E-40dd-AFC4-6F175D3DCCD1}">
-              <a14:hiddenFill xmlns="" xmlns:a14="http://schemas.microsoft.com/office/drawing/2010/main">
+              <a14:hiddenFill xmlns:a14="http://schemas.microsoft.com/office/drawing/2010/main" xmlns="">
                 <a:solidFill>
                   <a:srgbClr val="FFFFFF"/>
                 </a:solidFill>
@@ -9607,7 +9608,7 @@
               </a:ln>
               <a:extLst>
                 <a:ext uri="{91240B29-F687-4f45-9708-019B960494DF}">
-                  <a14:hiddenLine xmlns="" xmlns:a14="http://schemas.microsoft.com/office/drawing/2010/main" w="9525">
+                  <a14:hiddenLine xmlns:a14="http://schemas.microsoft.com/office/drawing/2010/main" xmlns="" w="9525">
                     <a:solidFill>
                       <a:srgbClr val="000000"/>
                     </a:solidFill>
@@ -9697,7 +9698,7 @@
               </a:ln>
               <a:extLst>
                 <a:ext uri="{91240B29-F687-4f45-9708-019B960494DF}">
-                  <a14:hiddenLine xmlns="" xmlns:a14="http://schemas.microsoft.com/office/drawing/2010/main" w="9525">
+                  <a14:hiddenLine xmlns:a14="http://schemas.microsoft.com/office/drawing/2010/main" xmlns="" w="9525">
                     <a:solidFill>
                       <a:srgbClr val="000000"/>
                     </a:solidFill>
@@ -9787,7 +9788,7 @@
               </a:ln>
               <a:extLst>
                 <a:ext uri="{91240B29-F687-4f45-9708-019B960494DF}">
-                  <a14:hiddenLine xmlns="" xmlns:a14="http://schemas.microsoft.com/office/drawing/2010/main" w="9525">
+                  <a14:hiddenLine xmlns:a14="http://schemas.microsoft.com/office/drawing/2010/main" xmlns="" w="9525">
                     <a:solidFill>
                       <a:srgbClr val="000000"/>
                     </a:solidFill>
@@ -9849,7 +9850,7 @@
               </a:ln>
               <a:extLst>
                 <a:ext uri="{91240B29-F687-4f45-9708-019B960494DF}">
-                  <a14:hiddenLine xmlns="" xmlns:a14="http://schemas.microsoft.com/office/drawing/2010/main" w="9525">
+                  <a14:hiddenLine xmlns:a14="http://schemas.microsoft.com/office/drawing/2010/main" xmlns="" w="9525">
                     <a:solidFill>
                       <a:srgbClr val="000000"/>
                     </a:solidFill>
@@ -9939,7 +9940,7 @@
               </a:ln>
               <a:extLst>
                 <a:ext uri="{91240B29-F687-4f45-9708-019B960494DF}">
-                  <a14:hiddenLine xmlns="" xmlns:a14="http://schemas.microsoft.com/office/drawing/2010/main" w="9525">
+                  <a14:hiddenLine xmlns:a14="http://schemas.microsoft.com/office/drawing/2010/main" xmlns="" w="9525">
                     <a:solidFill>
                       <a:srgbClr val="000000"/>
                     </a:solidFill>
@@ -10001,7 +10002,7 @@
               </a:ln>
               <a:extLst>
                 <a:ext uri="{91240B29-F687-4f45-9708-019B960494DF}">
-                  <a14:hiddenLine xmlns="" xmlns:a14="http://schemas.microsoft.com/office/drawing/2010/main" w="9525">
+                  <a14:hiddenLine xmlns:a14="http://schemas.microsoft.com/office/drawing/2010/main" xmlns="" w="9525">
                     <a:solidFill>
                       <a:srgbClr val="000000"/>
                     </a:solidFill>
@@ -10063,7 +10064,7 @@
               </a:ln>
               <a:extLst>
                 <a:ext uri="{91240B29-F687-4f45-9708-019B960494DF}">
-                  <a14:hiddenLine xmlns="" xmlns:a14="http://schemas.microsoft.com/office/drawing/2010/main" w="9525">
+                  <a14:hiddenLine xmlns:a14="http://schemas.microsoft.com/office/drawing/2010/main" xmlns="" w="9525">
                     <a:solidFill>
                       <a:srgbClr val="000000"/>
                     </a:solidFill>
@@ -10153,7 +10154,7 @@
               </a:ln>
               <a:extLst>
                 <a:ext uri="{91240B29-F687-4f45-9708-019B960494DF}">
-                  <a14:hiddenLine xmlns="" xmlns:a14="http://schemas.microsoft.com/office/drawing/2010/main" w="9525">
+                  <a14:hiddenLine xmlns:a14="http://schemas.microsoft.com/office/drawing/2010/main" xmlns="" w="9525">
                     <a:solidFill>
                       <a:srgbClr val="000000"/>
                     </a:solidFill>
@@ -10243,7 +10244,7 @@
               </a:ln>
               <a:extLst>
                 <a:ext uri="{91240B29-F687-4f45-9708-019B960494DF}">
-                  <a14:hiddenLine xmlns="" xmlns:a14="http://schemas.microsoft.com/office/drawing/2010/main" w="9525">
+                  <a14:hiddenLine xmlns:a14="http://schemas.microsoft.com/office/drawing/2010/main" xmlns="" w="9525">
                     <a:solidFill>
                       <a:srgbClr val="000000"/>
                     </a:solidFill>
@@ -10305,7 +10306,7 @@
               </a:ln>
               <a:extLst>
                 <a:ext uri="{91240B29-F687-4f45-9708-019B960494DF}">
-                  <a14:hiddenLine xmlns="" xmlns:a14="http://schemas.microsoft.com/office/drawing/2010/main" w="9525">
+                  <a14:hiddenLine xmlns:a14="http://schemas.microsoft.com/office/drawing/2010/main" xmlns="" w="9525">
                     <a:solidFill>
                       <a:srgbClr val="000000"/>
                     </a:solidFill>
@@ -10415,7 +10416,7 @@
               </a:ln>
               <a:extLst>
                 <a:ext uri="{91240B29-F687-4f45-9708-019B960494DF}">
-                  <a14:hiddenLine xmlns="" xmlns:a14="http://schemas.microsoft.com/office/drawing/2010/main" w="9525">
+                  <a14:hiddenLine xmlns:a14="http://schemas.microsoft.com/office/drawing/2010/main" xmlns="" w="9525">
                     <a:solidFill>
                       <a:srgbClr val="000000"/>
                     </a:solidFill>
@@ -10499,7 +10500,7 @@
               </a:ln>
               <a:extLst>
                 <a:ext uri="{91240B29-F687-4f45-9708-019B960494DF}">
-                  <a14:hiddenLine xmlns="" xmlns:a14="http://schemas.microsoft.com/office/drawing/2010/main" w="9525">
+                  <a14:hiddenLine xmlns:a14="http://schemas.microsoft.com/office/drawing/2010/main" xmlns="" w="9525">
                     <a:solidFill>
                       <a:srgbClr val="000000"/>
                     </a:solidFill>
@@ -10561,7 +10562,7 @@
               </a:ln>
               <a:extLst>
                 <a:ext uri="{91240B29-F687-4f45-9708-019B960494DF}">
-                  <a14:hiddenLine xmlns="" xmlns:a14="http://schemas.microsoft.com/office/drawing/2010/main" w="9525">
+                  <a14:hiddenLine xmlns:a14="http://schemas.microsoft.com/office/drawing/2010/main" xmlns="" w="9525">
                     <a:solidFill>
                       <a:srgbClr val="000000"/>
                     </a:solidFill>
@@ -10623,7 +10624,7 @@
               </a:ln>
               <a:extLst>
                 <a:ext uri="{91240B29-F687-4f45-9708-019B960494DF}">
-                  <a14:hiddenLine xmlns="" xmlns:a14="http://schemas.microsoft.com/office/drawing/2010/main" w="9525">
+                  <a14:hiddenLine xmlns:a14="http://schemas.microsoft.com/office/drawing/2010/main" xmlns="" w="9525">
                     <a:solidFill>
                       <a:srgbClr val="000000"/>
                     </a:solidFill>
@@ -10713,7 +10714,7 @@
               </a:ln>
               <a:extLst>
                 <a:ext uri="{91240B29-F687-4f45-9708-019B960494DF}">
-                  <a14:hiddenLine xmlns="" xmlns:a14="http://schemas.microsoft.com/office/drawing/2010/main" w="9525">
+                  <a14:hiddenLine xmlns:a14="http://schemas.microsoft.com/office/drawing/2010/main" xmlns="" w="9525">
                     <a:solidFill>
                       <a:srgbClr val="000000"/>
                     </a:solidFill>
@@ -10747,7 +10748,7 @@
               </a:ln>
               <a:extLst>
                 <a:ext uri="{91240B29-F687-4f45-9708-019B960494DF}">
-                  <a14:hiddenLine xmlns="" xmlns:a14="http://schemas.microsoft.com/office/drawing/2010/main" w="9525">
+                  <a14:hiddenLine xmlns:a14="http://schemas.microsoft.com/office/drawing/2010/main" xmlns="" w="9525">
                     <a:solidFill>
                       <a:srgbClr val="000000"/>
                     </a:solidFill>
@@ -10812,7 +10813,7 @@
               </a:ln>
               <a:extLst>
                 <a:ext uri="{91240B29-F687-4f45-9708-019B960494DF}">
-                  <a14:hiddenLine xmlns="" xmlns:a14="http://schemas.microsoft.com/office/drawing/2010/main" w="9525">
+                  <a14:hiddenLine xmlns:a14="http://schemas.microsoft.com/office/drawing/2010/main" xmlns="" w="9525">
                     <a:solidFill>
                       <a:srgbClr val="000000"/>
                     </a:solidFill>
@@ -10902,7 +10903,7 @@
               </a:ln>
               <a:extLst>
                 <a:ext uri="{91240B29-F687-4f45-9708-019B960494DF}">
-                  <a14:hiddenLine xmlns="" xmlns:a14="http://schemas.microsoft.com/office/drawing/2010/main" w="9525">
+                  <a14:hiddenLine xmlns:a14="http://schemas.microsoft.com/office/drawing/2010/main" xmlns="" w="9525">
                     <a:solidFill>
                       <a:srgbClr val="000000"/>
                     </a:solidFill>
@@ -10964,7 +10965,7 @@
               </a:ln>
               <a:extLst>
                 <a:ext uri="{91240B29-F687-4f45-9708-019B960494DF}">
-                  <a14:hiddenLine xmlns="" xmlns:a14="http://schemas.microsoft.com/office/drawing/2010/main" w="9525">
+                  <a14:hiddenLine xmlns:a14="http://schemas.microsoft.com/office/drawing/2010/main" xmlns="" w="9525">
                     <a:solidFill>
                       <a:srgbClr val="000000"/>
                     </a:solidFill>
@@ -11054,7 +11055,7 @@
               </a:ln>
               <a:extLst>
                 <a:ext uri="{91240B29-F687-4f45-9708-019B960494DF}">
-                  <a14:hiddenLine xmlns="" xmlns:a14="http://schemas.microsoft.com/office/drawing/2010/main" w="9525">
+                  <a14:hiddenLine xmlns:a14="http://schemas.microsoft.com/office/drawing/2010/main" xmlns="" w="9525">
                     <a:solidFill>
                       <a:srgbClr val="000000"/>
                     </a:solidFill>
@@ -11119,7 +11120,7 @@
               </a:ln>
               <a:extLst>
                 <a:ext uri="{91240B29-F687-4f45-9708-019B960494DF}">
-                  <a14:hiddenLine xmlns="" xmlns:a14="http://schemas.microsoft.com/office/drawing/2010/main" w="9525">
+                  <a14:hiddenLine xmlns:a14="http://schemas.microsoft.com/office/drawing/2010/main" xmlns="" w="9525">
                     <a:solidFill>
                       <a:srgbClr val="000000"/>
                     </a:solidFill>
@@ -11181,7 +11182,7 @@
               </a:ln>
               <a:extLst>
                 <a:ext uri="{91240B29-F687-4f45-9708-019B960494DF}">
-                  <a14:hiddenLine xmlns="" xmlns:a14="http://schemas.microsoft.com/office/drawing/2010/main" w="9525">
+                  <a14:hiddenLine xmlns:a14="http://schemas.microsoft.com/office/drawing/2010/main" xmlns="" w="9525">
                     <a:solidFill>
                       <a:srgbClr val="000000"/>
                     </a:solidFill>
@@ -11271,7 +11272,7 @@
               </a:ln>
               <a:extLst>
                 <a:ext uri="{91240B29-F687-4f45-9708-019B960494DF}">
-                  <a14:hiddenLine xmlns="" xmlns:a14="http://schemas.microsoft.com/office/drawing/2010/main" w="9525">
+                  <a14:hiddenLine xmlns:a14="http://schemas.microsoft.com/office/drawing/2010/main" xmlns="" w="9525">
                     <a:solidFill>
                       <a:srgbClr val="000000"/>
                     </a:solidFill>
@@ -11361,7 +11362,7 @@
               </a:ln>
               <a:extLst>
                 <a:ext uri="{91240B29-F687-4f45-9708-019B960494DF}">
-                  <a14:hiddenLine xmlns="" xmlns:a14="http://schemas.microsoft.com/office/drawing/2010/main" w="9525">
+                  <a14:hiddenLine xmlns:a14="http://schemas.microsoft.com/office/drawing/2010/main" xmlns="" w="9525">
                     <a:solidFill>
                       <a:srgbClr val="000000"/>
                     </a:solidFill>
@@ -11426,7 +11427,7 @@
               </a:ln>
               <a:extLst>
                 <a:ext uri="{91240B29-F687-4f45-9708-019B960494DF}">
-                  <a14:hiddenLine xmlns="" xmlns:a14="http://schemas.microsoft.com/office/drawing/2010/main" w="9525">
+                  <a14:hiddenLine xmlns:a14="http://schemas.microsoft.com/office/drawing/2010/main" xmlns="" w="9525">
                     <a:solidFill>
                       <a:srgbClr val="000000"/>
                     </a:solidFill>
@@ -11546,7 +11547,7 @@
               </a:ln>
               <a:extLst>
                 <a:ext uri="{91240B29-F687-4f45-9708-019B960494DF}">
-                  <a14:hiddenLine xmlns="" xmlns:a14="http://schemas.microsoft.com/office/drawing/2010/main" w="9525">
+                  <a14:hiddenLine xmlns:a14="http://schemas.microsoft.com/office/drawing/2010/main" xmlns="" w="9525">
                     <a:solidFill>
                       <a:srgbClr val="000000"/>
                     </a:solidFill>
@@ -11627,7 +11628,7 @@
               </a:ln>
               <a:extLst>
                 <a:ext uri="{91240B29-F687-4f45-9708-019B960494DF}">
-                  <a14:hiddenLine xmlns="" xmlns:a14="http://schemas.microsoft.com/office/drawing/2010/main" w="9525">
+                  <a14:hiddenLine xmlns:a14="http://schemas.microsoft.com/office/drawing/2010/main" xmlns="" w="9525">
                     <a:solidFill>
                       <a:srgbClr val="000000"/>
                     </a:solidFill>
@@ -11742,7 +11743,7 @@
               </a:ln>
               <a:extLst>
                 <a:ext uri="{91240B29-F687-4f45-9708-019B960494DF}">
-                  <a14:hiddenLine xmlns="" xmlns:a14="http://schemas.microsoft.com/office/drawing/2010/main" w="9525">
+                  <a14:hiddenLine xmlns:a14="http://schemas.microsoft.com/office/drawing/2010/main" xmlns="" w="9525">
                     <a:solidFill>
                       <a:srgbClr val="000000"/>
                     </a:solidFill>
@@ -11832,7 +11833,7 @@
               </a:ln>
               <a:extLst>
                 <a:ext uri="{91240B29-F687-4f45-9708-019B960494DF}">
-                  <a14:hiddenLine xmlns="" xmlns:a14="http://schemas.microsoft.com/office/drawing/2010/main" w="9525">
+                  <a14:hiddenLine xmlns:a14="http://schemas.microsoft.com/office/drawing/2010/main" xmlns="" w="9525">
                     <a:solidFill>
                       <a:srgbClr val="000000"/>
                     </a:solidFill>
@@ -11897,7 +11898,7 @@
               </a:ln>
               <a:extLst>
                 <a:ext uri="{91240B29-F687-4f45-9708-019B960494DF}">
-                  <a14:hiddenLine xmlns="" xmlns:a14="http://schemas.microsoft.com/office/drawing/2010/main" w="9525">
+                  <a14:hiddenLine xmlns:a14="http://schemas.microsoft.com/office/drawing/2010/main" xmlns="" w="9525">
                     <a:solidFill>
                       <a:srgbClr val="000000"/>
                     </a:solidFill>
@@ -11987,7 +11988,7 @@
               </a:ln>
               <a:extLst>
                 <a:ext uri="{91240B29-F687-4f45-9708-019B960494DF}">
-                  <a14:hiddenLine xmlns="" xmlns:a14="http://schemas.microsoft.com/office/drawing/2010/main" w="9525">
+                  <a14:hiddenLine xmlns:a14="http://schemas.microsoft.com/office/drawing/2010/main" xmlns="" w="9525">
                     <a:solidFill>
                       <a:srgbClr val="000000"/>
                     </a:solidFill>
@@ -12055,7 +12056,7 @@
               </a:ln>
               <a:extLst>
                 <a:ext uri="{91240B29-F687-4f45-9708-019B960494DF}">
-                  <a14:hiddenLine xmlns="" xmlns:a14="http://schemas.microsoft.com/office/drawing/2010/main" w="9525">
+                  <a14:hiddenLine xmlns:a14="http://schemas.microsoft.com/office/drawing/2010/main" xmlns="" w="9525">
                     <a:solidFill>
                       <a:srgbClr val="000000"/>
                     </a:solidFill>
@@ -12145,7 +12146,7 @@
               </a:ln>
               <a:extLst>
                 <a:ext uri="{91240B29-F687-4f45-9708-019B960494DF}">
-                  <a14:hiddenLine xmlns="" xmlns:a14="http://schemas.microsoft.com/office/drawing/2010/main" w="9525">
+                  <a14:hiddenLine xmlns:a14="http://schemas.microsoft.com/office/drawing/2010/main" xmlns="" w="9525">
                     <a:solidFill>
                       <a:srgbClr val="000000"/>
                     </a:solidFill>
@@ -12213,7 +12214,7 @@
               </a:ln>
               <a:extLst>
                 <a:ext uri="{91240B29-F687-4f45-9708-019B960494DF}">
-                  <a14:hiddenLine xmlns="" xmlns:a14="http://schemas.microsoft.com/office/drawing/2010/main" w="9525">
+                  <a14:hiddenLine xmlns:a14="http://schemas.microsoft.com/office/drawing/2010/main" xmlns="" w="9525">
                     <a:solidFill>
                       <a:srgbClr val="000000"/>
                     </a:solidFill>
@@ -12303,7 +12304,7 @@
               </a:ln>
               <a:extLst>
                 <a:ext uri="{91240B29-F687-4f45-9708-019B960494DF}">
-                  <a14:hiddenLine xmlns="" xmlns:a14="http://schemas.microsoft.com/office/drawing/2010/main" w="9525">
+                  <a14:hiddenLine xmlns:a14="http://schemas.microsoft.com/office/drawing/2010/main" xmlns="" w="9525">
                     <a:solidFill>
                       <a:srgbClr val="000000"/>
                     </a:solidFill>
@@ -12337,7 +12338,7 @@
               </a:ln>
               <a:extLst>
                 <a:ext uri="{91240B29-F687-4f45-9708-019B960494DF}">
-                  <a14:hiddenLine xmlns="" xmlns:a14="http://schemas.microsoft.com/office/drawing/2010/main" w="9525">
+                  <a14:hiddenLine xmlns:a14="http://schemas.microsoft.com/office/drawing/2010/main" xmlns="" w="9525">
                     <a:solidFill>
                       <a:srgbClr val="000000"/>
                     </a:solidFill>
@@ -12477,7 +12478,7 @@
           <a:p>
             <a:fld id="{EC4347D3-4C9A-C240-8F14-750059DFEEB0}" type="datetimeFigureOut">
               <a:rPr lang="en-US" smtClean="0"/>
-              <a:t>10/19/23</a:t>
+              <a:t>10/24/23</a:t>
             </a:fld>
             <a:endParaRPr lang="en-US"/>
           </a:p>
@@ -14008,6 +14009,183 @@
 </p:sld>
 </file>
 
+<file path=ppt/slides/slide16.xml><?xml version="1.0" encoding="utf-8"?>
+<p:sld xmlns:a="http://schemas.openxmlformats.org/drawingml/2006/main" xmlns:r="http://schemas.openxmlformats.org/officeDocument/2006/relationships" xmlns:p="http://schemas.openxmlformats.org/presentationml/2006/main">
+  <p:cSld>
+    <p:spTree>
+      <p:nvGrpSpPr>
+        <p:cNvPr id="1" name=""/>
+        <p:cNvGrpSpPr/>
+        <p:nvPr/>
+      </p:nvGrpSpPr>
+      <p:grpSpPr>
+        <a:xfrm>
+          <a:off x="0" y="0"/>
+          <a:ext cx="0" cy="0"/>
+          <a:chOff x="0" y="0"/>
+          <a:chExt cx="0" cy="0"/>
+        </a:xfrm>
+      </p:grpSpPr>
+      <p:sp>
+        <p:nvSpPr>
+          <p:cNvPr id="6146" name="Rectangle 2"/>
+          <p:cNvSpPr>
+            <a:spLocks noGrp="1" noChangeArrowheads="1"/>
+          </p:cNvSpPr>
+          <p:nvPr>
+            <p:ph type="title"/>
+            <p:custDataLst>
+              <p:tags r:id="rId1"/>
+            </p:custDataLst>
+          </p:nvPr>
+        </p:nvSpPr>
+        <p:spPr>
+          <a:xfrm>
+            <a:off x="1141413" y="284084"/>
+            <a:ext cx="9905998" cy="620791"/>
+          </a:xfrm>
+        </p:spPr>
+        <p:txBody>
+          <a:bodyPr/>
+          <a:lstStyle/>
+          <a:p>
+            <a:pPr algn="ctr"/>
+            <a:r>
+              <a:rPr lang="en-US" dirty="0"/>
+              <a:t>Lecture 16: TUE Oct. 24</a:t>
+            </a:r>
+          </a:p>
+        </p:txBody>
+      </p:sp>
+      <p:sp>
+        <p:nvSpPr>
+          <p:cNvPr id="6147" name="Rectangle 3"/>
+          <p:cNvSpPr>
+            <a:spLocks noGrp="1" noChangeArrowheads="1"/>
+          </p:cNvSpPr>
+          <p:nvPr>
+            <p:ph idx="1"/>
+            <p:custDataLst>
+              <p:tags r:id="rId2"/>
+            </p:custDataLst>
+          </p:nvPr>
+        </p:nvSpPr>
+        <p:spPr>
+          <a:xfrm>
+            <a:off x="1141413" y="1123950"/>
+            <a:ext cx="9970724" cy="5149850"/>
+          </a:xfrm>
+        </p:spPr>
+        <p:txBody>
+          <a:bodyPr>
+            <a:normAutofit/>
+          </a:bodyPr>
+          <a:lstStyle/>
+          <a:p>
+            <a:r>
+              <a:rPr lang="en-US" dirty="0"/>
+              <a:t>DMT2 is </a:t>
+            </a:r>
+            <a:r>
+              <a:rPr lang="en-US" b="1" i="1" u="sng" dirty="0"/>
+              <a:t>going to be great</a:t>
+            </a:r>
+            <a:r>
+              <a:rPr lang="en-US" dirty="0"/>
+              <a:t>! Let’s learn a lot of stuff together!</a:t>
+            </a:r>
+          </a:p>
+          <a:p>
+            <a:r>
+              <a:rPr lang="en-US" dirty="0"/>
+              <a:t>Programming assignment is done (officially).</a:t>
+            </a:r>
+          </a:p>
+          <a:p>
+            <a:pPr lvl="1"/>
+            <a:r>
+              <a:rPr lang="en-US" dirty="0"/>
+              <a:t>Was extended for everyone due to an increase in extension requests.</a:t>
+            </a:r>
+          </a:p>
+          <a:p>
+            <a:pPr lvl="1"/>
+            <a:r>
+              <a:rPr lang="en-US" dirty="0"/>
+              <a:t>How is it going / did it go?</a:t>
+            </a:r>
+          </a:p>
+          <a:p>
+            <a:r>
+              <a:rPr lang="en-US" dirty="0"/>
+              <a:t>Quiz grades have been released!</a:t>
+            </a:r>
+          </a:p>
+          <a:p>
+            <a:pPr lvl="1"/>
+            <a:r>
+              <a:rPr lang="en-US" dirty="0"/>
+              <a:t>See email for quiz averages, etc.</a:t>
+            </a:r>
+          </a:p>
+          <a:p>
+            <a:pPr lvl="1"/>
+            <a:r>
+              <a:rPr lang="en-US" dirty="0"/>
+              <a:t>We will go over it today.</a:t>
+            </a:r>
+          </a:p>
+          <a:p>
+            <a:r>
+              <a:rPr lang="en-US" dirty="0"/>
+              <a:t>Mod. 3 homework is due this Thursday. Don’t put it off!</a:t>
+            </a:r>
+          </a:p>
+          <a:p>
+            <a:r>
+              <a:rPr lang="en-US" dirty="0"/>
+              <a:t>Today we begin module 4. </a:t>
+            </a:r>
+          </a:p>
+        </p:txBody>
+      </p:sp>
+      <p:sp>
+        <p:nvSpPr>
+          <p:cNvPr id="4" name="Slide Number Placeholder 3"/>
+          <p:cNvSpPr>
+            <a:spLocks noGrp="1"/>
+          </p:cNvSpPr>
+          <p:nvPr>
+            <p:ph type="sldNum" sz="quarter" idx="12"/>
+          </p:nvPr>
+        </p:nvSpPr>
+        <p:spPr/>
+        <p:txBody>
+          <a:bodyPr/>
+          <a:lstStyle/>
+          <a:p>
+            <a:fld id="{F26D9103-0C5C-48AC-B68E-3ED2C1647047}" type="slidenum">
+              <a:rPr lang="en-US" smtClean="0"/>
+              <a:pPr/>
+              <a:t>16</a:t>
+            </a:fld>
+            <a:endParaRPr lang="en-US" dirty="0"/>
+          </a:p>
+        </p:txBody>
+      </p:sp>
+    </p:spTree>
+    <p:extLst>
+      <p:ext uri="{BB962C8B-B14F-4D97-AF65-F5344CB8AC3E}">
+        <p14:creationId xmlns:p14="http://schemas.microsoft.com/office/powerpoint/2010/main" val="2475828258"/>
+      </p:ext>
+    </p:extLst>
+  </p:cSld>
+  <p:clrMapOvr>
+    <a:masterClrMapping/>
+  </p:clrMapOvr>
+</p:sld>
+</file>
+
 <file path=ppt/slides/slide2.xml><?xml version="1.0" encoding="utf-8"?>
 <p:sld xmlns:a="http://schemas.openxmlformats.org/drawingml/2006/main" xmlns:r="http://schemas.openxmlformats.org/officeDocument/2006/relationships" xmlns:p="http://schemas.openxmlformats.org/presentationml/2006/main">
   <p:cSld>
@@ -15531,7 +15709,19 @@
 </p:tagLst>
 </file>
 
+<file path=ppt/tags/tag29.xml><?xml version="1.0" encoding="utf-8"?>
+<p:tagLst xmlns:a="http://schemas.openxmlformats.org/drawingml/2006/main" xmlns:r="http://schemas.openxmlformats.org/officeDocument/2006/relationships" xmlns:p="http://schemas.openxmlformats.org/presentationml/2006/main">
+  <p:tag name="_INSTRUCTOR VIEW19C14C36-AC8E-43BC-9DB6-C2AAF774C7DC|PANE__TAG" val="_"/>
+</p:tagLst>
+</file>
+
 <file path=ppt/tags/tag3.xml><?xml version="1.0" encoding="utf-8"?>
+<p:tagLst xmlns:a="http://schemas.openxmlformats.org/drawingml/2006/main" xmlns:r="http://schemas.openxmlformats.org/officeDocument/2006/relationships" xmlns:p="http://schemas.openxmlformats.org/presentationml/2006/main">
+  <p:tag name="_INSTRUCTOR VIEW19C14C36-AC8E-43BC-9DB6-C2AAF774C7DC|PANE__TAG" val="_"/>
+</p:tagLst>
+</file>
+
+<file path=ppt/tags/tag30.xml><?xml version="1.0" encoding="utf-8"?>
 <p:tagLst xmlns:a="http://schemas.openxmlformats.org/drawingml/2006/main" xmlns:r="http://schemas.openxmlformats.org/officeDocument/2006/relationships" xmlns:p="http://schemas.openxmlformats.org/presentationml/2006/main">
   <p:tag name="_INSTRUCTOR VIEW19C14C36-AC8E-43BC-9DB6-C2AAF774C7DC|PANE__TAG" val="_"/>
 </p:tagLst>

</xml_diff>

<commit_message>
daily announcements. Posting some of the OH
</commit_message>
<xml_diff>
--- a/slides/00-DailyAnnouncements.pptx
+++ b/slides/00-DailyAnnouncements.pptx
@@ -5,32 +5,11 @@
     <p:sldMasterId id="2147484006" r:id="rId1"/>
   </p:sldMasterIdLst>
   <p:notesMasterIdLst>
-    <p:notesMasterId r:id="rId25"/>
+    <p:notesMasterId r:id="rId4"/>
   </p:notesMasterIdLst>
   <p:sldIdLst>
     <p:sldId id="256" r:id="rId2"/>
     <p:sldId id="505" r:id="rId3"/>
-    <p:sldId id="506" r:id="rId4"/>
-    <p:sldId id="507" r:id="rId5"/>
-    <p:sldId id="508" r:id="rId6"/>
-    <p:sldId id="509" r:id="rId7"/>
-    <p:sldId id="510" r:id="rId8"/>
-    <p:sldId id="511" r:id="rId9"/>
-    <p:sldId id="512" r:id="rId10"/>
-    <p:sldId id="513" r:id="rId11"/>
-    <p:sldId id="514" r:id="rId12"/>
-    <p:sldId id="515" r:id="rId13"/>
-    <p:sldId id="516" r:id="rId14"/>
-    <p:sldId id="517" r:id="rId15"/>
-    <p:sldId id="518" r:id="rId16"/>
-    <p:sldId id="519" r:id="rId17"/>
-    <p:sldId id="520" r:id="rId18"/>
-    <p:sldId id="521" r:id="rId19"/>
-    <p:sldId id="522" r:id="rId20"/>
-    <p:sldId id="523" r:id="rId21"/>
-    <p:sldId id="524" r:id="rId22"/>
-    <p:sldId id="525" r:id="rId23"/>
-    <p:sldId id="526" r:id="rId24"/>
   </p:sldIdLst>
   <p:sldSz cx="12192000" cy="6858000"/>
   <p:notesSz cx="6858000" cy="9144000"/>
@@ -219,7 +198,7 @@
           <a:p>
             <a:fld id="{C5B45307-6ED4-B142-BD64-10F739779302}" type="datetimeFigureOut">
               <a:rPr lang="en-US" smtClean="0"/>
-              <a:t>11/30/23</a:t>
+              <a:t>1/23/24</a:t>
             </a:fld>
             <a:endParaRPr lang="en-US"/>
           </a:p>
@@ -4852,7 +4831,7 @@
           <a:p>
             <a:fld id="{EC4347D3-4C9A-C240-8F14-750059DFEEB0}" type="datetimeFigureOut">
               <a:rPr lang="en-US" smtClean="0"/>
-              <a:t>11/30/23</a:t>
+              <a:t>1/23/24</a:t>
             </a:fld>
             <a:endParaRPr lang="en-US"/>
           </a:p>
@@ -5119,7 +5098,7 @@
           <a:p>
             <a:fld id="{EC4347D3-4C9A-C240-8F14-750059DFEEB0}" type="datetimeFigureOut">
               <a:rPr lang="en-US" smtClean="0"/>
-              <a:t>11/30/23</a:t>
+              <a:t>1/23/24</a:t>
             </a:fld>
             <a:endParaRPr lang="en-US"/>
           </a:p>
@@ -5315,7 +5294,7 @@
           <a:p>
             <a:fld id="{EC4347D3-4C9A-C240-8F14-750059DFEEB0}" type="datetimeFigureOut">
               <a:rPr lang="en-US" smtClean="0"/>
-              <a:t>11/30/23</a:t>
+              <a:t>1/23/24</a:t>
             </a:fld>
             <a:endParaRPr lang="en-US"/>
           </a:p>
@@ -5578,7 +5557,7 @@
           <a:p>
             <a:fld id="{EC4347D3-4C9A-C240-8F14-750059DFEEB0}" type="datetimeFigureOut">
               <a:rPr lang="en-US" smtClean="0"/>
-              <a:t>11/30/23</a:t>
+              <a:t>1/23/24</a:t>
             </a:fld>
             <a:endParaRPr lang="en-US"/>
           </a:p>
@@ -6012,7 +5991,7 @@
           <a:p>
             <a:fld id="{EC4347D3-4C9A-C240-8F14-750059DFEEB0}" type="datetimeFigureOut">
               <a:rPr lang="en-US" smtClean="0"/>
-              <a:t>11/30/23</a:t>
+              <a:t>1/23/24</a:t>
             </a:fld>
             <a:endParaRPr lang="en-US"/>
           </a:p>
@@ -6558,7 +6537,7 @@
           <a:p>
             <a:fld id="{EC4347D3-4C9A-C240-8F14-750059DFEEB0}" type="datetimeFigureOut">
               <a:rPr lang="en-US" smtClean="0"/>
-              <a:t>11/30/23</a:t>
+              <a:t>1/23/24</a:t>
             </a:fld>
             <a:endParaRPr lang="en-US"/>
           </a:p>
@@ -7278,7 +7257,7 @@
           <a:p>
             <a:fld id="{EC4347D3-4C9A-C240-8F14-750059DFEEB0}" type="datetimeFigureOut">
               <a:rPr lang="en-US" smtClean="0"/>
-              <a:t>11/30/23</a:t>
+              <a:t>1/23/24</a:t>
             </a:fld>
             <a:endParaRPr lang="en-US"/>
           </a:p>
@@ -7448,7 +7427,7 @@
           <a:p>
             <a:fld id="{EC4347D3-4C9A-C240-8F14-750059DFEEB0}" type="datetimeFigureOut">
               <a:rPr lang="en-US" smtClean="0"/>
-              <a:t>11/30/23</a:t>
+              <a:t>1/23/24</a:t>
             </a:fld>
             <a:endParaRPr lang="en-US"/>
           </a:p>
@@ -7628,7 +7607,7 @@
           <a:p>
             <a:fld id="{EC4347D3-4C9A-C240-8F14-750059DFEEB0}" type="datetimeFigureOut">
               <a:rPr lang="en-US" smtClean="0"/>
-              <a:t>11/30/23</a:t>
+              <a:t>1/23/24</a:t>
             </a:fld>
             <a:endParaRPr lang="en-US"/>
           </a:p>
@@ -7798,7 +7777,7 @@
           <a:p>
             <a:fld id="{EC4347D3-4C9A-C240-8F14-750059DFEEB0}" type="datetimeFigureOut">
               <a:rPr lang="en-US" smtClean="0"/>
-              <a:t>11/30/23</a:t>
+              <a:t>1/23/24</a:t>
             </a:fld>
             <a:endParaRPr lang="en-US"/>
           </a:p>
@@ -8048,7 +8027,7 @@
           <a:p>
             <a:fld id="{EC4347D3-4C9A-C240-8F14-750059DFEEB0}" type="datetimeFigureOut">
               <a:rPr lang="en-US" smtClean="0"/>
-              <a:t>11/30/23</a:t>
+              <a:t>1/23/24</a:t>
             </a:fld>
             <a:endParaRPr lang="en-US"/>
           </a:p>
@@ -8280,7 +8259,7 @@
           <a:p>
             <a:fld id="{EC4347D3-4C9A-C240-8F14-750059DFEEB0}" type="datetimeFigureOut">
               <a:rPr lang="en-US" smtClean="0"/>
-              <a:t>11/30/23</a:t>
+              <a:t>1/23/24</a:t>
             </a:fld>
             <a:endParaRPr lang="en-US"/>
           </a:p>
@@ -8666,7 +8645,7 @@
           <a:p>
             <a:fld id="{EC4347D3-4C9A-C240-8F14-750059DFEEB0}" type="datetimeFigureOut">
               <a:rPr lang="en-US" smtClean="0"/>
-              <a:t>11/30/23</a:t>
+              <a:t>1/23/24</a:t>
             </a:fld>
             <a:endParaRPr lang="en-US"/>
           </a:p>
@@ -8789,7 +8768,7 @@
           <a:p>
             <a:fld id="{EC4347D3-4C9A-C240-8F14-750059DFEEB0}" type="datetimeFigureOut">
               <a:rPr lang="en-US" smtClean="0"/>
-              <a:t>11/30/23</a:t>
+              <a:t>1/23/24</a:t>
             </a:fld>
             <a:endParaRPr lang="en-US"/>
           </a:p>
@@ -8884,7 +8863,7 @@
           <a:p>
             <a:fld id="{EC4347D3-4C9A-C240-8F14-750059DFEEB0}" type="datetimeFigureOut">
               <a:rPr lang="en-US" smtClean="0"/>
-              <a:t>11/30/23</a:t>
+              <a:t>1/23/24</a:t>
             </a:fld>
             <a:endParaRPr lang="en-US"/>
           </a:p>
@@ -9133,7 +9112,7 @@
           <a:p>
             <a:fld id="{EC4347D3-4C9A-C240-8F14-750059DFEEB0}" type="datetimeFigureOut">
               <a:rPr lang="en-US" smtClean="0"/>
-              <a:t>11/30/23</a:t>
+              <a:t>1/23/24</a:t>
             </a:fld>
             <a:endParaRPr lang="en-US"/>
           </a:p>
@@ -9418,7 +9397,7 @@
           <a:p>
             <a:fld id="{EC4347D3-4C9A-C240-8F14-750059DFEEB0}" type="datetimeFigureOut">
               <a:rPr lang="en-US" smtClean="0"/>
-              <a:t>11/30/23</a:t>
+              <a:t>1/23/24</a:t>
             </a:fld>
             <a:endParaRPr lang="en-US"/>
           </a:p>
@@ -12485,7 +12464,7 @@
           <a:p>
             <a:fld id="{EC4347D3-4C9A-C240-8F14-750059DFEEB0}" type="datetimeFigureOut">
               <a:rPr lang="en-US" smtClean="0"/>
-              <a:t>11/30/23</a:t>
+              <a:t>1/23/24</a:t>
             </a:fld>
             <a:endParaRPr lang="en-US"/>
           </a:p>
@@ -13002,1698 +12981,6 @@
 </p:sld>
 </file>
 
-<file path=ppt/slides/slide10.xml><?xml version="1.0" encoding="utf-8"?>
-<p:sld xmlns:a="http://schemas.openxmlformats.org/drawingml/2006/main" xmlns:r="http://schemas.openxmlformats.org/officeDocument/2006/relationships" xmlns:p="http://schemas.openxmlformats.org/presentationml/2006/main">
-  <p:cSld>
-    <p:spTree>
-      <p:nvGrpSpPr>
-        <p:cNvPr id="1" name=""/>
-        <p:cNvGrpSpPr/>
-        <p:nvPr/>
-      </p:nvGrpSpPr>
-      <p:grpSpPr>
-        <a:xfrm>
-          <a:off x="0" y="0"/>
-          <a:ext cx="0" cy="0"/>
-          <a:chOff x="0" y="0"/>
-          <a:chExt cx="0" cy="0"/>
-        </a:xfrm>
-      </p:grpSpPr>
-      <p:sp>
-        <p:nvSpPr>
-          <p:cNvPr id="6146" name="Rectangle 2"/>
-          <p:cNvSpPr>
-            <a:spLocks noGrp="1" noChangeArrowheads="1"/>
-          </p:cNvSpPr>
-          <p:nvPr>
-            <p:ph type="title"/>
-            <p:custDataLst>
-              <p:tags r:id="rId1"/>
-            </p:custDataLst>
-          </p:nvPr>
-        </p:nvSpPr>
-        <p:spPr>
-          <a:xfrm>
-            <a:off x="1141413" y="284084"/>
-            <a:ext cx="9905998" cy="620791"/>
-          </a:xfrm>
-        </p:spPr>
-        <p:txBody>
-          <a:bodyPr/>
-          <a:lstStyle/>
-          <a:p>
-            <a:pPr algn="ctr"/>
-            <a:r>
-              <a:rPr lang="en-US" dirty="0"/>
-              <a:t>Lecture 10: </a:t>
-            </a:r>
-            <a:r>
-              <a:rPr lang="en-US" dirty="0" err="1"/>
-              <a:t>THu</a:t>
-            </a:r>
-            <a:r>
-              <a:rPr lang="en-US" dirty="0"/>
-              <a:t>. Sep. 21</a:t>
-            </a:r>
-          </a:p>
-        </p:txBody>
-      </p:sp>
-      <p:sp>
-        <p:nvSpPr>
-          <p:cNvPr id="6147" name="Rectangle 3"/>
-          <p:cNvSpPr>
-            <a:spLocks noGrp="1" noChangeArrowheads="1"/>
-          </p:cNvSpPr>
-          <p:nvPr>
-            <p:ph idx="1"/>
-            <p:custDataLst>
-              <p:tags r:id="rId2"/>
-            </p:custDataLst>
-          </p:nvPr>
-        </p:nvSpPr>
-        <p:spPr>
-          <a:xfrm>
-            <a:off x="1141413" y="1123950"/>
-            <a:ext cx="9970724" cy="5149850"/>
-          </a:xfrm>
-        </p:spPr>
-        <p:txBody>
-          <a:bodyPr>
-            <a:normAutofit/>
-          </a:bodyPr>
-          <a:lstStyle/>
-          <a:p>
-            <a:r>
-              <a:rPr lang="en-US" dirty="0"/>
-              <a:t>DMT2 is </a:t>
-            </a:r>
-            <a:r>
-              <a:rPr lang="en-US" b="1" i="1" u="sng" dirty="0"/>
-              <a:t>going to be great</a:t>
-            </a:r>
-            <a:r>
-              <a:rPr lang="en-US" dirty="0"/>
-              <a:t>! Let’s learn a lot of stuff together!</a:t>
-            </a:r>
-          </a:p>
-          <a:p>
-            <a:r>
-              <a:rPr lang="en-US" dirty="0"/>
-              <a:t>HW 2 (set cardinality) is due tonight. Good luck!</a:t>
-            </a:r>
-          </a:p>
-          <a:p>
-            <a:r>
-              <a:rPr lang="en-US" dirty="0"/>
-              <a:t>Today we are going to finish module 2, we will start module 3 next week.</a:t>
-            </a:r>
-          </a:p>
-          <a:p>
-            <a:r>
-              <a:rPr lang="en-US" dirty="0"/>
-              <a:t>Office hours going ok so far? Any issues</a:t>
-            </a:r>
-          </a:p>
-          <a:p>
-            <a:r>
-              <a:rPr lang="en-US" dirty="0"/>
-              <a:t>Today we continue with (and finish) Regular languages! </a:t>
-            </a:r>
-          </a:p>
-        </p:txBody>
-      </p:sp>
-      <p:sp>
-        <p:nvSpPr>
-          <p:cNvPr id="4" name="Slide Number Placeholder 3"/>
-          <p:cNvSpPr>
-            <a:spLocks noGrp="1"/>
-          </p:cNvSpPr>
-          <p:nvPr>
-            <p:ph type="sldNum" sz="quarter" idx="12"/>
-          </p:nvPr>
-        </p:nvSpPr>
-        <p:spPr/>
-        <p:txBody>
-          <a:bodyPr/>
-          <a:lstStyle/>
-          <a:p>
-            <a:fld id="{F26D9103-0C5C-48AC-B68E-3ED2C1647047}" type="slidenum">
-              <a:rPr lang="en-US" smtClean="0"/>
-              <a:pPr/>
-              <a:t>10</a:t>
-            </a:fld>
-            <a:endParaRPr lang="en-US" dirty="0"/>
-          </a:p>
-        </p:txBody>
-      </p:sp>
-    </p:spTree>
-    <p:extLst>
-      <p:ext uri="{BB962C8B-B14F-4D97-AF65-F5344CB8AC3E}">
-        <p14:creationId xmlns:p14="http://schemas.microsoft.com/office/powerpoint/2010/main" val="2415733408"/>
-      </p:ext>
-    </p:extLst>
-  </p:cSld>
-  <p:clrMapOvr>
-    <a:masterClrMapping/>
-  </p:clrMapOvr>
-</p:sld>
-</file>
-
-<file path=ppt/slides/slide11.xml><?xml version="1.0" encoding="utf-8"?>
-<p:sld xmlns:a="http://schemas.openxmlformats.org/drawingml/2006/main" xmlns:r="http://schemas.openxmlformats.org/officeDocument/2006/relationships" xmlns:p="http://schemas.openxmlformats.org/presentationml/2006/main">
-  <p:cSld>
-    <p:spTree>
-      <p:nvGrpSpPr>
-        <p:cNvPr id="1" name=""/>
-        <p:cNvGrpSpPr/>
-        <p:nvPr/>
-      </p:nvGrpSpPr>
-      <p:grpSpPr>
-        <a:xfrm>
-          <a:off x="0" y="0"/>
-          <a:ext cx="0" cy="0"/>
-          <a:chOff x="0" y="0"/>
-          <a:chExt cx="0" cy="0"/>
-        </a:xfrm>
-      </p:grpSpPr>
-      <p:sp>
-        <p:nvSpPr>
-          <p:cNvPr id="6146" name="Rectangle 2"/>
-          <p:cNvSpPr>
-            <a:spLocks noGrp="1" noChangeArrowheads="1"/>
-          </p:cNvSpPr>
-          <p:nvPr>
-            <p:ph type="title"/>
-            <p:custDataLst>
-              <p:tags r:id="rId1"/>
-            </p:custDataLst>
-          </p:nvPr>
-        </p:nvSpPr>
-        <p:spPr>
-          <a:xfrm>
-            <a:off x="1141413" y="284084"/>
-            <a:ext cx="9905998" cy="620791"/>
-          </a:xfrm>
-        </p:spPr>
-        <p:txBody>
-          <a:bodyPr/>
-          <a:lstStyle/>
-          <a:p>
-            <a:pPr algn="ctr"/>
-            <a:r>
-              <a:rPr lang="en-US" dirty="0"/>
-              <a:t>Lecture 11: </a:t>
-            </a:r>
-            <a:r>
-              <a:rPr lang="en-US" dirty="0" err="1"/>
-              <a:t>THu</a:t>
-            </a:r>
-            <a:r>
-              <a:rPr lang="en-US" dirty="0"/>
-              <a:t>. Sep. 28</a:t>
-            </a:r>
-          </a:p>
-        </p:txBody>
-      </p:sp>
-      <p:sp>
-        <p:nvSpPr>
-          <p:cNvPr id="6147" name="Rectangle 3"/>
-          <p:cNvSpPr>
-            <a:spLocks noGrp="1" noChangeArrowheads="1"/>
-          </p:cNvSpPr>
-          <p:nvPr>
-            <p:ph idx="1"/>
-            <p:custDataLst>
-              <p:tags r:id="rId2"/>
-            </p:custDataLst>
-          </p:nvPr>
-        </p:nvSpPr>
-        <p:spPr>
-          <a:xfrm>
-            <a:off x="1141413" y="1123950"/>
-            <a:ext cx="9970724" cy="5149850"/>
-          </a:xfrm>
-        </p:spPr>
-        <p:txBody>
-          <a:bodyPr>
-            <a:normAutofit/>
-          </a:bodyPr>
-          <a:lstStyle/>
-          <a:p>
-            <a:r>
-              <a:rPr lang="en-US" dirty="0"/>
-              <a:t>DMT2 is </a:t>
-            </a:r>
-            <a:r>
-              <a:rPr lang="en-US" b="1" i="1" u="sng" dirty="0"/>
-              <a:t>going to be great</a:t>
-            </a:r>
-            <a:r>
-              <a:rPr lang="en-US" dirty="0"/>
-              <a:t>! Let’s learn a lot of stuff together!</a:t>
-            </a:r>
-          </a:p>
-          <a:p>
-            <a:r>
-              <a:rPr lang="en-US" dirty="0"/>
-              <a:t>Cardinality grading is almost done…I’ll let you know when grades are released.</a:t>
-            </a:r>
-          </a:p>
-          <a:p>
-            <a:r>
-              <a:rPr lang="en-US" dirty="0"/>
-              <a:t>Reg. languages written homework is due next Thursday</a:t>
-            </a:r>
-          </a:p>
-          <a:p>
-            <a:r>
-              <a:rPr lang="en-US" dirty="0"/>
-              <a:t>First quiz is week after that. I’m working on a study guide for you.</a:t>
-            </a:r>
-          </a:p>
-          <a:p>
-            <a:r>
-              <a:rPr lang="en-US" dirty="0"/>
-              <a:t>Office hours going ok so far? Any issues</a:t>
-            </a:r>
-          </a:p>
-          <a:p>
-            <a:r>
-              <a:rPr lang="en-US" dirty="0"/>
-              <a:t>Today we begin module 3. Context-Free Grammars</a:t>
-            </a:r>
-          </a:p>
-        </p:txBody>
-      </p:sp>
-      <p:sp>
-        <p:nvSpPr>
-          <p:cNvPr id="4" name="Slide Number Placeholder 3"/>
-          <p:cNvSpPr>
-            <a:spLocks noGrp="1"/>
-          </p:cNvSpPr>
-          <p:nvPr>
-            <p:ph type="sldNum" sz="quarter" idx="12"/>
-          </p:nvPr>
-        </p:nvSpPr>
-        <p:spPr/>
-        <p:txBody>
-          <a:bodyPr/>
-          <a:lstStyle/>
-          <a:p>
-            <a:fld id="{F26D9103-0C5C-48AC-B68E-3ED2C1647047}" type="slidenum">
-              <a:rPr lang="en-US" smtClean="0"/>
-              <a:pPr/>
-              <a:t>11</a:t>
-            </a:fld>
-            <a:endParaRPr lang="en-US" dirty="0"/>
-          </a:p>
-        </p:txBody>
-      </p:sp>
-    </p:spTree>
-    <p:extLst>
-      <p:ext uri="{BB962C8B-B14F-4D97-AF65-F5344CB8AC3E}">
-        <p14:creationId xmlns:p14="http://schemas.microsoft.com/office/powerpoint/2010/main" val="3007233910"/>
-      </p:ext>
-    </p:extLst>
-  </p:cSld>
-  <p:clrMapOvr>
-    <a:masterClrMapping/>
-  </p:clrMapOvr>
-</p:sld>
-</file>
-
-<file path=ppt/slides/slide12.xml><?xml version="1.0" encoding="utf-8"?>
-<p:sld xmlns:a="http://schemas.openxmlformats.org/drawingml/2006/main" xmlns:r="http://schemas.openxmlformats.org/officeDocument/2006/relationships" xmlns:p="http://schemas.openxmlformats.org/presentationml/2006/main">
-  <p:cSld>
-    <p:spTree>
-      <p:nvGrpSpPr>
-        <p:cNvPr id="1" name=""/>
-        <p:cNvGrpSpPr/>
-        <p:nvPr/>
-      </p:nvGrpSpPr>
-      <p:grpSpPr>
-        <a:xfrm>
-          <a:off x="0" y="0"/>
-          <a:ext cx="0" cy="0"/>
-          <a:chOff x="0" y="0"/>
-          <a:chExt cx="0" cy="0"/>
-        </a:xfrm>
-      </p:grpSpPr>
-      <p:sp>
-        <p:nvSpPr>
-          <p:cNvPr id="6146" name="Rectangle 2"/>
-          <p:cNvSpPr>
-            <a:spLocks noGrp="1" noChangeArrowheads="1"/>
-          </p:cNvSpPr>
-          <p:nvPr>
-            <p:ph type="title"/>
-            <p:custDataLst>
-              <p:tags r:id="rId1"/>
-            </p:custDataLst>
-          </p:nvPr>
-        </p:nvSpPr>
-        <p:spPr>
-          <a:xfrm>
-            <a:off x="1141413" y="284084"/>
-            <a:ext cx="9905998" cy="620791"/>
-          </a:xfrm>
-        </p:spPr>
-        <p:txBody>
-          <a:bodyPr/>
-          <a:lstStyle/>
-          <a:p>
-            <a:pPr algn="ctr"/>
-            <a:r>
-              <a:rPr lang="en-US" dirty="0"/>
-              <a:t>Lecture 12: </a:t>
-            </a:r>
-            <a:r>
-              <a:rPr lang="en-US" dirty="0" err="1"/>
-              <a:t>THu</a:t>
-            </a:r>
-            <a:r>
-              <a:rPr lang="en-US" dirty="0"/>
-              <a:t>. Oct. 5</a:t>
-            </a:r>
-          </a:p>
-        </p:txBody>
-      </p:sp>
-      <p:sp>
-        <p:nvSpPr>
-          <p:cNvPr id="6147" name="Rectangle 3"/>
-          <p:cNvSpPr>
-            <a:spLocks noGrp="1" noChangeArrowheads="1"/>
-          </p:cNvSpPr>
-          <p:nvPr>
-            <p:ph idx="1"/>
-            <p:custDataLst>
-              <p:tags r:id="rId2"/>
-            </p:custDataLst>
-          </p:nvPr>
-        </p:nvSpPr>
-        <p:spPr>
-          <a:xfrm>
-            <a:off x="1141413" y="1123950"/>
-            <a:ext cx="9970724" cy="5149850"/>
-          </a:xfrm>
-        </p:spPr>
-        <p:txBody>
-          <a:bodyPr>
-            <a:normAutofit/>
-          </a:bodyPr>
-          <a:lstStyle/>
-          <a:p>
-            <a:r>
-              <a:rPr lang="en-US" dirty="0"/>
-              <a:t>DMT2 is </a:t>
-            </a:r>
-            <a:r>
-              <a:rPr lang="en-US" b="1" i="1" u="sng" dirty="0"/>
-              <a:t>going to be great</a:t>
-            </a:r>
-            <a:r>
-              <a:rPr lang="en-US" dirty="0"/>
-              <a:t>! Let’s learn a lot of stuff together!</a:t>
-            </a:r>
-          </a:p>
-          <a:p>
-            <a:r>
-              <a:rPr lang="en-US" dirty="0"/>
-              <a:t>Cardinality grading done. Regrades open until next Wednesday at 11:59.</a:t>
-            </a:r>
-          </a:p>
-          <a:p>
-            <a:r>
-              <a:rPr lang="en-US" dirty="0"/>
-              <a:t>If you turned in the first </a:t>
-            </a:r>
-            <a:r>
-              <a:rPr lang="en-US" dirty="0" err="1"/>
-              <a:t>hw</a:t>
-            </a:r>
-            <a:r>
-              <a:rPr lang="en-US" dirty="0"/>
-              <a:t> late, we will get to it soon.</a:t>
-            </a:r>
-          </a:p>
-          <a:p>
-            <a:r>
-              <a:rPr lang="en-US" dirty="0"/>
-              <a:t>Regular languages written homework is due tonight! Don’t forget!!</a:t>
-            </a:r>
-          </a:p>
-          <a:p>
-            <a:r>
-              <a:rPr lang="en-US" dirty="0"/>
-              <a:t>Office hours going ok so far? Any issues</a:t>
-            </a:r>
-          </a:p>
-          <a:p>
-            <a:r>
-              <a:rPr lang="en-US" dirty="0"/>
-              <a:t>Today we continue </a:t>
-            </a:r>
-            <a:r>
-              <a:rPr lang="en-US"/>
-              <a:t>with module 3</a:t>
-            </a:r>
-            <a:endParaRPr lang="en-US" dirty="0"/>
-          </a:p>
-        </p:txBody>
-      </p:sp>
-      <p:sp>
-        <p:nvSpPr>
-          <p:cNvPr id="4" name="Slide Number Placeholder 3"/>
-          <p:cNvSpPr>
-            <a:spLocks noGrp="1"/>
-          </p:cNvSpPr>
-          <p:nvPr>
-            <p:ph type="sldNum" sz="quarter" idx="12"/>
-          </p:nvPr>
-        </p:nvSpPr>
-        <p:spPr/>
-        <p:txBody>
-          <a:bodyPr/>
-          <a:lstStyle/>
-          <a:p>
-            <a:fld id="{F26D9103-0C5C-48AC-B68E-3ED2C1647047}" type="slidenum">
-              <a:rPr lang="en-US" smtClean="0"/>
-              <a:pPr/>
-              <a:t>12</a:t>
-            </a:fld>
-            <a:endParaRPr lang="en-US" dirty="0"/>
-          </a:p>
-        </p:txBody>
-      </p:sp>
-    </p:spTree>
-    <p:extLst>
-      <p:ext uri="{BB962C8B-B14F-4D97-AF65-F5344CB8AC3E}">
-        <p14:creationId xmlns:p14="http://schemas.microsoft.com/office/powerpoint/2010/main" val="432411375"/>
-      </p:ext>
-    </p:extLst>
-  </p:cSld>
-  <p:clrMapOvr>
-    <a:masterClrMapping/>
-  </p:clrMapOvr>
-</p:sld>
-</file>
-
-<file path=ppt/slides/slide13.xml><?xml version="1.0" encoding="utf-8"?>
-<p:sld xmlns:a="http://schemas.openxmlformats.org/drawingml/2006/main" xmlns:r="http://schemas.openxmlformats.org/officeDocument/2006/relationships" xmlns:p="http://schemas.openxmlformats.org/presentationml/2006/main">
-  <p:cSld>
-    <p:spTree>
-      <p:nvGrpSpPr>
-        <p:cNvPr id="1" name=""/>
-        <p:cNvGrpSpPr/>
-        <p:nvPr/>
-      </p:nvGrpSpPr>
-      <p:grpSpPr>
-        <a:xfrm>
-          <a:off x="0" y="0"/>
-          <a:ext cx="0" cy="0"/>
-          <a:chOff x="0" y="0"/>
-          <a:chExt cx="0" cy="0"/>
-        </a:xfrm>
-      </p:grpSpPr>
-      <p:sp>
-        <p:nvSpPr>
-          <p:cNvPr id="6146" name="Rectangle 2"/>
-          <p:cNvSpPr>
-            <a:spLocks noGrp="1" noChangeArrowheads="1"/>
-          </p:cNvSpPr>
-          <p:nvPr>
-            <p:ph type="title"/>
-            <p:custDataLst>
-              <p:tags r:id="rId1"/>
-            </p:custDataLst>
-          </p:nvPr>
-        </p:nvSpPr>
-        <p:spPr>
-          <a:xfrm>
-            <a:off x="1141413" y="284084"/>
-            <a:ext cx="9905998" cy="620791"/>
-          </a:xfrm>
-        </p:spPr>
-        <p:txBody>
-          <a:bodyPr/>
-          <a:lstStyle/>
-          <a:p>
-            <a:pPr algn="ctr"/>
-            <a:r>
-              <a:rPr lang="en-US" dirty="0"/>
-              <a:t>Lecture 13: TUE Oct. 10</a:t>
-            </a:r>
-          </a:p>
-        </p:txBody>
-      </p:sp>
-      <p:sp>
-        <p:nvSpPr>
-          <p:cNvPr id="6147" name="Rectangle 3"/>
-          <p:cNvSpPr>
-            <a:spLocks noGrp="1" noChangeArrowheads="1"/>
-          </p:cNvSpPr>
-          <p:nvPr>
-            <p:ph idx="1"/>
-            <p:custDataLst>
-              <p:tags r:id="rId2"/>
-            </p:custDataLst>
-          </p:nvPr>
-        </p:nvSpPr>
-        <p:spPr>
-          <a:xfrm>
-            <a:off x="1141413" y="1123950"/>
-            <a:ext cx="9970724" cy="5149850"/>
-          </a:xfrm>
-        </p:spPr>
-        <p:txBody>
-          <a:bodyPr>
-            <a:normAutofit/>
-          </a:bodyPr>
-          <a:lstStyle/>
-          <a:p>
-            <a:r>
-              <a:rPr lang="en-US" dirty="0"/>
-              <a:t>DMT2 is </a:t>
-            </a:r>
-            <a:r>
-              <a:rPr lang="en-US" b="1" i="1" u="sng" dirty="0"/>
-              <a:t>going to be great</a:t>
-            </a:r>
-            <a:r>
-              <a:rPr lang="en-US" dirty="0"/>
-              <a:t>! Let’s learn a lot of stuff together!</a:t>
-            </a:r>
-          </a:p>
-          <a:p>
-            <a:r>
-              <a:rPr lang="en-US" dirty="0"/>
-              <a:t>All </a:t>
-            </a:r>
-            <a:r>
-              <a:rPr lang="en-US" dirty="0" err="1"/>
-              <a:t>homeworks</a:t>
-            </a:r>
-            <a:r>
-              <a:rPr lang="en-US" dirty="0"/>
-              <a:t> have been graded. Come to OH if you want any information about the model solutions for the homework problems.</a:t>
-            </a:r>
-          </a:p>
-          <a:p>
-            <a:r>
-              <a:rPr lang="en-US" dirty="0"/>
-              <a:t>If you turned in </a:t>
-            </a:r>
-            <a:r>
-              <a:rPr lang="en-US" dirty="0" err="1"/>
-              <a:t>hw</a:t>
-            </a:r>
-            <a:r>
-              <a:rPr lang="en-US" dirty="0"/>
-              <a:t> late, it is likely graded (short of a couple that just came in)</a:t>
-            </a:r>
-          </a:p>
-          <a:p>
-            <a:r>
-              <a:rPr lang="en-US" dirty="0"/>
-              <a:t>The quiz is on Thursday! Any questions about how that will go?</a:t>
-            </a:r>
-          </a:p>
-          <a:p>
-            <a:r>
-              <a:rPr lang="en-US" dirty="0"/>
-              <a:t>Today we continue with, and maybe finish, module 3</a:t>
-            </a:r>
-          </a:p>
-        </p:txBody>
-      </p:sp>
-      <p:sp>
-        <p:nvSpPr>
-          <p:cNvPr id="4" name="Slide Number Placeholder 3"/>
-          <p:cNvSpPr>
-            <a:spLocks noGrp="1"/>
-          </p:cNvSpPr>
-          <p:nvPr>
-            <p:ph type="sldNum" sz="quarter" idx="12"/>
-          </p:nvPr>
-        </p:nvSpPr>
-        <p:spPr/>
-        <p:txBody>
-          <a:bodyPr/>
-          <a:lstStyle/>
-          <a:p>
-            <a:fld id="{F26D9103-0C5C-48AC-B68E-3ED2C1647047}" type="slidenum">
-              <a:rPr lang="en-US" smtClean="0"/>
-              <a:pPr/>
-              <a:t>13</a:t>
-            </a:fld>
-            <a:endParaRPr lang="en-US" dirty="0"/>
-          </a:p>
-        </p:txBody>
-      </p:sp>
-    </p:spTree>
-    <p:extLst>
-      <p:ext uri="{BB962C8B-B14F-4D97-AF65-F5344CB8AC3E}">
-        <p14:creationId xmlns:p14="http://schemas.microsoft.com/office/powerpoint/2010/main" val="3831403437"/>
-      </p:ext>
-    </p:extLst>
-  </p:cSld>
-  <p:clrMapOvr>
-    <a:masterClrMapping/>
-  </p:clrMapOvr>
-</p:sld>
-</file>
-
-<file path=ppt/slides/slide14.xml><?xml version="1.0" encoding="utf-8"?>
-<p:sld xmlns:a="http://schemas.openxmlformats.org/drawingml/2006/main" xmlns:r="http://schemas.openxmlformats.org/officeDocument/2006/relationships" xmlns:p="http://schemas.openxmlformats.org/presentationml/2006/main">
-  <p:cSld>
-    <p:spTree>
-      <p:nvGrpSpPr>
-        <p:cNvPr id="1" name=""/>
-        <p:cNvGrpSpPr/>
-        <p:nvPr/>
-      </p:nvGrpSpPr>
-      <p:grpSpPr>
-        <a:xfrm>
-          <a:off x="0" y="0"/>
-          <a:ext cx="0" cy="0"/>
-          <a:chOff x="0" y="0"/>
-          <a:chExt cx="0" cy="0"/>
-        </a:xfrm>
-      </p:grpSpPr>
-      <p:sp>
-        <p:nvSpPr>
-          <p:cNvPr id="6146" name="Rectangle 2"/>
-          <p:cNvSpPr>
-            <a:spLocks noGrp="1" noChangeArrowheads="1"/>
-          </p:cNvSpPr>
-          <p:nvPr>
-            <p:ph type="title"/>
-            <p:custDataLst>
-              <p:tags r:id="rId1"/>
-            </p:custDataLst>
-          </p:nvPr>
-        </p:nvSpPr>
-        <p:spPr>
-          <a:xfrm>
-            <a:off x="1141413" y="284084"/>
-            <a:ext cx="9905998" cy="620791"/>
-          </a:xfrm>
-        </p:spPr>
-        <p:txBody>
-          <a:bodyPr/>
-          <a:lstStyle/>
-          <a:p>
-            <a:pPr algn="ctr"/>
-            <a:r>
-              <a:rPr lang="en-US" dirty="0"/>
-              <a:t>Lecture 14: TUE Oct. 17</a:t>
-            </a:r>
-          </a:p>
-        </p:txBody>
-      </p:sp>
-      <p:sp>
-        <p:nvSpPr>
-          <p:cNvPr id="6147" name="Rectangle 3"/>
-          <p:cNvSpPr>
-            <a:spLocks noGrp="1" noChangeArrowheads="1"/>
-          </p:cNvSpPr>
-          <p:nvPr>
-            <p:ph idx="1"/>
-            <p:custDataLst>
-              <p:tags r:id="rId2"/>
-            </p:custDataLst>
-          </p:nvPr>
-        </p:nvSpPr>
-        <p:spPr>
-          <a:xfrm>
-            <a:off x="1141413" y="1123950"/>
-            <a:ext cx="9970724" cy="5149850"/>
-          </a:xfrm>
-        </p:spPr>
-        <p:txBody>
-          <a:bodyPr>
-            <a:normAutofit/>
-          </a:bodyPr>
-          <a:lstStyle/>
-          <a:p>
-            <a:r>
-              <a:rPr lang="en-US" dirty="0"/>
-              <a:t>DMT2 is </a:t>
-            </a:r>
-            <a:r>
-              <a:rPr lang="en-US" b="1" i="1" u="sng" dirty="0"/>
-              <a:t>going to be great</a:t>
-            </a:r>
-            <a:r>
-              <a:rPr lang="en-US" dirty="0"/>
-              <a:t>! Let’s learn a lot of stuff together!</a:t>
-            </a:r>
-          </a:p>
-          <a:p>
-            <a:r>
-              <a:rPr lang="en-US" dirty="0"/>
-              <a:t>Programming assignment is due on Thursday.</a:t>
-            </a:r>
-          </a:p>
-          <a:p>
-            <a:pPr lvl="1"/>
-            <a:r>
-              <a:rPr lang="en-US" dirty="0"/>
-              <a:t>Don’t forget that this one is an individual assignment!!!!</a:t>
-            </a:r>
-          </a:p>
-          <a:p>
-            <a:pPr lvl="1"/>
-            <a:r>
-              <a:rPr lang="en-US" dirty="0"/>
-              <a:t>Don’t hesitate to come to office hours if you need help on this one.</a:t>
-            </a:r>
-          </a:p>
-          <a:p>
-            <a:r>
-              <a:rPr lang="en-US" dirty="0"/>
-              <a:t>The quiz went well on Thursday. How did we feel about it?</a:t>
-            </a:r>
-          </a:p>
-          <a:p>
-            <a:pPr lvl="1"/>
-            <a:r>
-              <a:rPr lang="en-US" dirty="0"/>
-              <a:t>Should be graded by tomorrow night</a:t>
-            </a:r>
-          </a:p>
-          <a:p>
-            <a:r>
-              <a:rPr lang="en-US" dirty="0"/>
-              <a:t>Today we finish module 3 and maybe start module 4…if I’m feeling up for it. </a:t>
-            </a:r>
-          </a:p>
-        </p:txBody>
-      </p:sp>
-      <p:sp>
-        <p:nvSpPr>
-          <p:cNvPr id="4" name="Slide Number Placeholder 3"/>
-          <p:cNvSpPr>
-            <a:spLocks noGrp="1"/>
-          </p:cNvSpPr>
-          <p:nvPr>
-            <p:ph type="sldNum" sz="quarter" idx="12"/>
-          </p:nvPr>
-        </p:nvSpPr>
-        <p:spPr/>
-        <p:txBody>
-          <a:bodyPr/>
-          <a:lstStyle/>
-          <a:p>
-            <a:fld id="{F26D9103-0C5C-48AC-B68E-3ED2C1647047}" type="slidenum">
-              <a:rPr lang="en-US" smtClean="0"/>
-              <a:pPr/>
-              <a:t>14</a:t>
-            </a:fld>
-            <a:endParaRPr lang="en-US" dirty="0"/>
-          </a:p>
-        </p:txBody>
-      </p:sp>
-    </p:spTree>
-    <p:extLst>
-      <p:ext uri="{BB962C8B-B14F-4D97-AF65-F5344CB8AC3E}">
-        <p14:creationId xmlns:p14="http://schemas.microsoft.com/office/powerpoint/2010/main" val="489854985"/>
-      </p:ext>
-    </p:extLst>
-  </p:cSld>
-  <p:clrMapOvr>
-    <a:masterClrMapping/>
-  </p:clrMapOvr>
-</p:sld>
-</file>
-
-<file path=ppt/slides/slide15.xml><?xml version="1.0" encoding="utf-8"?>
-<p:sld xmlns:a="http://schemas.openxmlformats.org/drawingml/2006/main" xmlns:r="http://schemas.openxmlformats.org/officeDocument/2006/relationships" xmlns:p="http://schemas.openxmlformats.org/presentationml/2006/main">
-  <p:cSld>
-    <p:spTree>
-      <p:nvGrpSpPr>
-        <p:cNvPr id="1" name=""/>
-        <p:cNvGrpSpPr/>
-        <p:nvPr/>
-      </p:nvGrpSpPr>
-      <p:grpSpPr>
-        <a:xfrm>
-          <a:off x="0" y="0"/>
-          <a:ext cx="0" cy="0"/>
-          <a:chOff x="0" y="0"/>
-          <a:chExt cx="0" cy="0"/>
-        </a:xfrm>
-      </p:grpSpPr>
-      <p:sp>
-        <p:nvSpPr>
-          <p:cNvPr id="6146" name="Rectangle 2"/>
-          <p:cNvSpPr>
-            <a:spLocks noGrp="1" noChangeArrowheads="1"/>
-          </p:cNvSpPr>
-          <p:nvPr>
-            <p:ph type="title"/>
-            <p:custDataLst>
-              <p:tags r:id="rId1"/>
-            </p:custDataLst>
-          </p:nvPr>
-        </p:nvSpPr>
-        <p:spPr>
-          <a:xfrm>
-            <a:off x="1141413" y="284084"/>
-            <a:ext cx="9905998" cy="620791"/>
-          </a:xfrm>
-        </p:spPr>
-        <p:txBody>
-          <a:bodyPr/>
-          <a:lstStyle/>
-          <a:p>
-            <a:pPr algn="ctr"/>
-            <a:r>
-              <a:rPr lang="en-US" dirty="0"/>
-              <a:t>Lecture 15: TUE Oct. 19</a:t>
-            </a:r>
-          </a:p>
-        </p:txBody>
-      </p:sp>
-      <p:sp>
-        <p:nvSpPr>
-          <p:cNvPr id="6147" name="Rectangle 3"/>
-          <p:cNvSpPr>
-            <a:spLocks noGrp="1" noChangeArrowheads="1"/>
-          </p:cNvSpPr>
-          <p:nvPr>
-            <p:ph idx="1"/>
-            <p:custDataLst>
-              <p:tags r:id="rId2"/>
-            </p:custDataLst>
-          </p:nvPr>
-        </p:nvSpPr>
-        <p:spPr>
-          <a:xfrm>
-            <a:off x="1141413" y="1123950"/>
-            <a:ext cx="9970724" cy="5149850"/>
-          </a:xfrm>
-        </p:spPr>
-        <p:txBody>
-          <a:bodyPr>
-            <a:normAutofit/>
-          </a:bodyPr>
-          <a:lstStyle/>
-          <a:p>
-            <a:r>
-              <a:rPr lang="en-US" dirty="0"/>
-              <a:t>DMT2 is </a:t>
-            </a:r>
-            <a:r>
-              <a:rPr lang="en-US" b="1" i="1" u="sng" dirty="0"/>
-              <a:t>going to be great</a:t>
-            </a:r>
-            <a:r>
-              <a:rPr lang="en-US" dirty="0"/>
-              <a:t>! Let’s learn a lot of stuff together!</a:t>
-            </a:r>
-          </a:p>
-          <a:p>
-            <a:r>
-              <a:rPr lang="en-US" dirty="0"/>
-              <a:t>Programming assignment is due on Thursday.</a:t>
-            </a:r>
-          </a:p>
-          <a:p>
-            <a:pPr lvl="1"/>
-            <a:r>
-              <a:rPr lang="en-US" dirty="0"/>
-              <a:t>Don’t forget that this one is an individual assignment!!!!</a:t>
-            </a:r>
-          </a:p>
-          <a:p>
-            <a:pPr lvl="1"/>
-            <a:r>
-              <a:rPr lang="en-US" dirty="0"/>
-              <a:t>Don’t hesitate to come to office hours if you need help on this one.</a:t>
-            </a:r>
-          </a:p>
-          <a:p>
-            <a:r>
-              <a:rPr lang="en-US" dirty="0"/>
-              <a:t>Quiz went well last Thursday!</a:t>
-            </a:r>
-          </a:p>
-          <a:p>
-            <a:pPr lvl="1"/>
-            <a:r>
-              <a:rPr lang="en-US" dirty="0"/>
-              <a:t>We did not finish grading last night but we made great progress.</a:t>
-            </a:r>
-          </a:p>
-          <a:p>
-            <a:pPr lvl="1"/>
-            <a:r>
-              <a:rPr lang="en-US" dirty="0"/>
-              <a:t>We will finish by the end of the weekend, but I’m hoping for earlier.</a:t>
-            </a:r>
-          </a:p>
-          <a:p>
-            <a:r>
-              <a:rPr lang="en-US" dirty="0"/>
-              <a:t>Don’t forget you have a written homework due next Thursday as well.</a:t>
-            </a:r>
-          </a:p>
-          <a:p>
-            <a:pPr lvl="1"/>
-            <a:r>
-              <a:rPr lang="en-US" dirty="0"/>
-              <a:t>For module 3. You can go back to group work for that one.</a:t>
-            </a:r>
-          </a:p>
-          <a:p>
-            <a:r>
-              <a:rPr lang="en-US" dirty="0"/>
-              <a:t>Today we begin module 4. </a:t>
-            </a:r>
-          </a:p>
-        </p:txBody>
-      </p:sp>
-      <p:sp>
-        <p:nvSpPr>
-          <p:cNvPr id="4" name="Slide Number Placeholder 3"/>
-          <p:cNvSpPr>
-            <a:spLocks noGrp="1"/>
-          </p:cNvSpPr>
-          <p:nvPr>
-            <p:ph type="sldNum" sz="quarter" idx="12"/>
-          </p:nvPr>
-        </p:nvSpPr>
-        <p:spPr/>
-        <p:txBody>
-          <a:bodyPr/>
-          <a:lstStyle/>
-          <a:p>
-            <a:fld id="{F26D9103-0C5C-48AC-B68E-3ED2C1647047}" type="slidenum">
-              <a:rPr lang="en-US" smtClean="0"/>
-              <a:pPr/>
-              <a:t>15</a:t>
-            </a:fld>
-            <a:endParaRPr lang="en-US" dirty="0"/>
-          </a:p>
-        </p:txBody>
-      </p:sp>
-    </p:spTree>
-    <p:extLst>
-      <p:ext uri="{BB962C8B-B14F-4D97-AF65-F5344CB8AC3E}">
-        <p14:creationId xmlns:p14="http://schemas.microsoft.com/office/powerpoint/2010/main" val="512631693"/>
-      </p:ext>
-    </p:extLst>
-  </p:cSld>
-  <p:clrMapOvr>
-    <a:masterClrMapping/>
-  </p:clrMapOvr>
-</p:sld>
-</file>
-
-<file path=ppt/slides/slide16.xml><?xml version="1.0" encoding="utf-8"?>
-<p:sld xmlns:a="http://schemas.openxmlformats.org/drawingml/2006/main" xmlns:r="http://schemas.openxmlformats.org/officeDocument/2006/relationships" xmlns:p="http://schemas.openxmlformats.org/presentationml/2006/main">
-  <p:cSld>
-    <p:spTree>
-      <p:nvGrpSpPr>
-        <p:cNvPr id="1" name=""/>
-        <p:cNvGrpSpPr/>
-        <p:nvPr/>
-      </p:nvGrpSpPr>
-      <p:grpSpPr>
-        <a:xfrm>
-          <a:off x="0" y="0"/>
-          <a:ext cx="0" cy="0"/>
-          <a:chOff x="0" y="0"/>
-          <a:chExt cx="0" cy="0"/>
-        </a:xfrm>
-      </p:grpSpPr>
-      <p:sp>
-        <p:nvSpPr>
-          <p:cNvPr id="6146" name="Rectangle 2"/>
-          <p:cNvSpPr>
-            <a:spLocks noGrp="1" noChangeArrowheads="1"/>
-          </p:cNvSpPr>
-          <p:nvPr>
-            <p:ph type="title"/>
-            <p:custDataLst>
-              <p:tags r:id="rId1"/>
-            </p:custDataLst>
-          </p:nvPr>
-        </p:nvSpPr>
-        <p:spPr>
-          <a:xfrm>
-            <a:off x="1141413" y="284084"/>
-            <a:ext cx="9905998" cy="620791"/>
-          </a:xfrm>
-        </p:spPr>
-        <p:txBody>
-          <a:bodyPr/>
-          <a:lstStyle/>
-          <a:p>
-            <a:pPr algn="ctr"/>
-            <a:r>
-              <a:rPr lang="en-US" dirty="0"/>
-              <a:t>Lecture 16: TUE Oct. 24</a:t>
-            </a:r>
-          </a:p>
-        </p:txBody>
-      </p:sp>
-      <p:sp>
-        <p:nvSpPr>
-          <p:cNvPr id="6147" name="Rectangle 3"/>
-          <p:cNvSpPr>
-            <a:spLocks noGrp="1" noChangeArrowheads="1"/>
-          </p:cNvSpPr>
-          <p:nvPr>
-            <p:ph idx="1"/>
-            <p:custDataLst>
-              <p:tags r:id="rId2"/>
-            </p:custDataLst>
-          </p:nvPr>
-        </p:nvSpPr>
-        <p:spPr>
-          <a:xfrm>
-            <a:off x="1141413" y="1123950"/>
-            <a:ext cx="9970724" cy="5149850"/>
-          </a:xfrm>
-        </p:spPr>
-        <p:txBody>
-          <a:bodyPr>
-            <a:normAutofit/>
-          </a:bodyPr>
-          <a:lstStyle/>
-          <a:p>
-            <a:r>
-              <a:rPr lang="en-US" dirty="0"/>
-              <a:t>DMT2 is </a:t>
-            </a:r>
-            <a:r>
-              <a:rPr lang="en-US" b="1" i="1" u="sng" dirty="0"/>
-              <a:t>going to be great</a:t>
-            </a:r>
-            <a:r>
-              <a:rPr lang="en-US" dirty="0"/>
-              <a:t>! Let’s learn a lot of stuff together!</a:t>
-            </a:r>
-          </a:p>
-          <a:p>
-            <a:r>
-              <a:rPr lang="en-US" dirty="0"/>
-              <a:t>Programming assignment is done (officially).</a:t>
-            </a:r>
-          </a:p>
-          <a:p>
-            <a:pPr lvl="1"/>
-            <a:r>
-              <a:rPr lang="en-US" dirty="0"/>
-              <a:t>Was extended for everyone due to an increase in extension requests.</a:t>
-            </a:r>
-          </a:p>
-          <a:p>
-            <a:pPr lvl="1"/>
-            <a:r>
-              <a:rPr lang="en-US" dirty="0"/>
-              <a:t>How is it going / did it go?</a:t>
-            </a:r>
-          </a:p>
-          <a:p>
-            <a:r>
-              <a:rPr lang="en-US" dirty="0"/>
-              <a:t>Quiz grades have been released!</a:t>
-            </a:r>
-          </a:p>
-          <a:p>
-            <a:pPr lvl="1"/>
-            <a:r>
-              <a:rPr lang="en-US" dirty="0"/>
-              <a:t>See email for quiz averages, etc.</a:t>
-            </a:r>
-          </a:p>
-          <a:p>
-            <a:pPr lvl="1"/>
-            <a:r>
-              <a:rPr lang="en-US" dirty="0"/>
-              <a:t>We will go over it today.</a:t>
-            </a:r>
-          </a:p>
-          <a:p>
-            <a:r>
-              <a:rPr lang="en-US" dirty="0"/>
-              <a:t>Mod. 3 homework is due this Thursday. Don’t put it off!</a:t>
-            </a:r>
-          </a:p>
-          <a:p>
-            <a:r>
-              <a:rPr lang="en-US" dirty="0"/>
-              <a:t>Today we begin module 4. </a:t>
-            </a:r>
-          </a:p>
-        </p:txBody>
-      </p:sp>
-      <p:sp>
-        <p:nvSpPr>
-          <p:cNvPr id="4" name="Slide Number Placeholder 3"/>
-          <p:cNvSpPr>
-            <a:spLocks noGrp="1"/>
-          </p:cNvSpPr>
-          <p:nvPr>
-            <p:ph type="sldNum" sz="quarter" idx="12"/>
-          </p:nvPr>
-        </p:nvSpPr>
-        <p:spPr/>
-        <p:txBody>
-          <a:bodyPr/>
-          <a:lstStyle/>
-          <a:p>
-            <a:fld id="{F26D9103-0C5C-48AC-B68E-3ED2C1647047}" type="slidenum">
-              <a:rPr lang="en-US" smtClean="0"/>
-              <a:pPr/>
-              <a:t>16</a:t>
-            </a:fld>
-            <a:endParaRPr lang="en-US" dirty="0"/>
-          </a:p>
-        </p:txBody>
-      </p:sp>
-    </p:spTree>
-    <p:extLst>
-      <p:ext uri="{BB962C8B-B14F-4D97-AF65-F5344CB8AC3E}">
-        <p14:creationId xmlns:p14="http://schemas.microsoft.com/office/powerpoint/2010/main" val="2475828258"/>
-      </p:ext>
-    </p:extLst>
-  </p:cSld>
-  <p:clrMapOvr>
-    <a:masterClrMapping/>
-  </p:clrMapOvr>
-</p:sld>
-</file>
-
-<file path=ppt/slides/slide17.xml><?xml version="1.0" encoding="utf-8"?>
-<p:sld xmlns:a="http://schemas.openxmlformats.org/drawingml/2006/main" xmlns:r="http://schemas.openxmlformats.org/officeDocument/2006/relationships" xmlns:p="http://schemas.openxmlformats.org/presentationml/2006/main">
-  <p:cSld>
-    <p:spTree>
-      <p:nvGrpSpPr>
-        <p:cNvPr id="1" name=""/>
-        <p:cNvGrpSpPr/>
-        <p:nvPr/>
-      </p:nvGrpSpPr>
-      <p:grpSpPr>
-        <a:xfrm>
-          <a:off x="0" y="0"/>
-          <a:ext cx="0" cy="0"/>
-          <a:chOff x="0" y="0"/>
-          <a:chExt cx="0" cy="0"/>
-        </a:xfrm>
-      </p:grpSpPr>
-      <p:sp>
-        <p:nvSpPr>
-          <p:cNvPr id="6146" name="Rectangle 2"/>
-          <p:cNvSpPr>
-            <a:spLocks noGrp="1" noChangeArrowheads="1"/>
-          </p:cNvSpPr>
-          <p:nvPr>
-            <p:ph type="title"/>
-            <p:custDataLst>
-              <p:tags r:id="rId1"/>
-            </p:custDataLst>
-          </p:nvPr>
-        </p:nvSpPr>
-        <p:spPr>
-          <a:xfrm>
-            <a:off x="1141413" y="284084"/>
-            <a:ext cx="9905998" cy="620791"/>
-          </a:xfrm>
-        </p:spPr>
-        <p:txBody>
-          <a:bodyPr/>
-          <a:lstStyle/>
-          <a:p>
-            <a:pPr algn="ctr"/>
-            <a:r>
-              <a:rPr lang="en-US" dirty="0"/>
-              <a:t>Lecture 17: Thu Oct. 26</a:t>
-            </a:r>
-          </a:p>
-        </p:txBody>
-      </p:sp>
-      <p:sp>
-        <p:nvSpPr>
-          <p:cNvPr id="6147" name="Rectangle 3"/>
-          <p:cNvSpPr>
-            <a:spLocks noGrp="1" noChangeArrowheads="1"/>
-          </p:cNvSpPr>
-          <p:nvPr>
-            <p:ph idx="1"/>
-            <p:custDataLst>
-              <p:tags r:id="rId2"/>
-            </p:custDataLst>
-          </p:nvPr>
-        </p:nvSpPr>
-        <p:spPr>
-          <a:xfrm>
-            <a:off x="1141413" y="1123950"/>
-            <a:ext cx="9970724" cy="5149850"/>
-          </a:xfrm>
-        </p:spPr>
-        <p:txBody>
-          <a:bodyPr>
-            <a:normAutofit/>
-          </a:bodyPr>
-          <a:lstStyle/>
-          <a:p>
-            <a:r>
-              <a:rPr lang="en-US" dirty="0"/>
-              <a:t>DMT2 is </a:t>
-            </a:r>
-            <a:r>
-              <a:rPr lang="en-US" b="1" i="1" u="sng" dirty="0"/>
-              <a:t>going to be great</a:t>
-            </a:r>
-            <a:r>
-              <a:rPr lang="en-US" dirty="0"/>
-              <a:t>! Let’s learn a lot of stuff together!</a:t>
-            </a:r>
-          </a:p>
-          <a:p>
-            <a:r>
-              <a:rPr lang="en-US" dirty="0"/>
-              <a:t>Quiz grades have been released!</a:t>
-            </a:r>
-          </a:p>
-          <a:p>
-            <a:pPr lvl="1"/>
-            <a:r>
-              <a:rPr lang="en-US" dirty="0"/>
-              <a:t>See email for quiz averages, etc.</a:t>
-            </a:r>
-          </a:p>
-          <a:p>
-            <a:pPr lvl="1"/>
-            <a:r>
-              <a:rPr lang="en-US" dirty="0"/>
-              <a:t>Regrades available until next Tuesday.</a:t>
-            </a:r>
-          </a:p>
-          <a:p>
-            <a:r>
-              <a:rPr lang="en-US" dirty="0"/>
-              <a:t>Mod. 3 homework is due this tonight. Don’t put it off!</a:t>
-            </a:r>
-          </a:p>
-          <a:p>
-            <a:r>
-              <a:rPr lang="en-US" dirty="0"/>
-              <a:t>I officially moved the next Quiz to the previous Tuesday (11/14). Hooray!</a:t>
-            </a:r>
-          </a:p>
-          <a:p>
-            <a:r>
-              <a:rPr lang="en-US" dirty="0"/>
-              <a:t>Still unsure about the extra mod. 5 attempt. I know you want it but it increases our grading load so much. I’m trying to brainstorm something here.</a:t>
-            </a:r>
-          </a:p>
-          <a:p>
-            <a:r>
-              <a:rPr lang="en-US" dirty="0"/>
-              <a:t>Today we continue with module 4. </a:t>
-            </a:r>
-          </a:p>
-        </p:txBody>
-      </p:sp>
-      <p:sp>
-        <p:nvSpPr>
-          <p:cNvPr id="4" name="Slide Number Placeholder 3"/>
-          <p:cNvSpPr>
-            <a:spLocks noGrp="1"/>
-          </p:cNvSpPr>
-          <p:nvPr>
-            <p:ph type="sldNum" sz="quarter" idx="12"/>
-          </p:nvPr>
-        </p:nvSpPr>
-        <p:spPr/>
-        <p:txBody>
-          <a:bodyPr/>
-          <a:lstStyle/>
-          <a:p>
-            <a:fld id="{F26D9103-0C5C-48AC-B68E-3ED2C1647047}" type="slidenum">
-              <a:rPr lang="en-US" smtClean="0"/>
-              <a:pPr/>
-              <a:t>17</a:t>
-            </a:fld>
-            <a:endParaRPr lang="en-US" dirty="0"/>
-          </a:p>
-        </p:txBody>
-      </p:sp>
-    </p:spTree>
-    <p:extLst>
-      <p:ext uri="{BB962C8B-B14F-4D97-AF65-F5344CB8AC3E}">
-        <p14:creationId xmlns:p14="http://schemas.microsoft.com/office/powerpoint/2010/main" val="4216076878"/>
-      </p:ext>
-    </p:extLst>
-  </p:cSld>
-  <p:clrMapOvr>
-    <a:masterClrMapping/>
-  </p:clrMapOvr>
-</p:sld>
-</file>
-
-<file path=ppt/slides/slide18.xml><?xml version="1.0" encoding="utf-8"?>
-<p:sld xmlns:a="http://schemas.openxmlformats.org/drawingml/2006/main" xmlns:r="http://schemas.openxmlformats.org/officeDocument/2006/relationships" xmlns:p="http://schemas.openxmlformats.org/presentationml/2006/main">
-  <p:cSld>
-    <p:spTree>
-      <p:nvGrpSpPr>
-        <p:cNvPr id="1" name=""/>
-        <p:cNvGrpSpPr/>
-        <p:nvPr/>
-      </p:nvGrpSpPr>
-      <p:grpSpPr>
-        <a:xfrm>
-          <a:off x="0" y="0"/>
-          <a:ext cx="0" cy="0"/>
-          <a:chOff x="0" y="0"/>
-          <a:chExt cx="0" cy="0"/>
-        </a:xfrm>
-      </p:grpSpPr>
-      <p:sp>
-        <p:nvSpPr>
-          <p:cNvPr id="6146" name="Rectangle 2"/>
-          <p:cNvSpPr>
-            <a:spLocks noGrp="1" noChangeArrowheads="1"/>
-          </p:cNvSpPr>
-          <p:nvPr>
-            <p:ph type="title"/>
-            <p:custDataLst>
-              <p:tags r:id="rId1"/>
-            </p:custDataLst>
-          </p:nvPr>
-        </p:nvSpPr>
-        <p:spPr>
-          <a:xfrm>
-            <a:off x="1141413" y="284084"/>
-            <a:ext cx="9905998" cy="620791"/>
-          </a:xfrm>
-        </p:spPr>
-        <p:txBody>
-          <a:bodyPr/>
-          <a:lstStyle/>
-          <a:p>
-            <a:pPr algn="ctr"/>
-            <a:r>
-              <a:rPr lang="en-US" dirty="0"/>
-              <a:t>Lecture 18: TUE Oct. 31</a:t>
-            </a:r>
-          </a:p>
-        </p:txBody>
-      </p:sp>
-      <p:sp>
-        <p:nvSpPr>
-          <p:cNvPr id="6147" name="Rectangle 3"/>
-          <p:cNvSpPr>
-            <a:spLocks noGrp="1" noChangeArrowheads="1"/>
-          </p:cNvSpPr>
-          <p:nvPr>
-            <p:ph idx="1"/>
-            <p:custDataLst>
-              <p:tags r:id="rId2"/>
-            </p:custDataLst>
-          </p:nvPr>
-        </p:nvSpPr>
-        <p:spPr>
-          <a:xfrm>
-            <a:off x="1141413" y="1123950"/>
-            <a:ext cx="9970724" cy="5149850"/>
-          </a:xfrm>
-        </p:spPr>
-        <p:txBody>
-          <a:bodyPr>
-            <a:normAutofit/>
-          </a:bodyPr>
-          <a:lstStyle/>
-          <a:p>
-            <a:r>
-              <a:rPr lang="en-US" dirty="0"/>
-              <a:t>DMT2 is </a:t>
-            </a:r>
-            <a:r>
-              <a:rPr lang="en-US" b="1" i="1" u="sng" dirty="0"/>
-              <a:t>going to be great</a:t>
-            </a:r>
-            <a:r>
-              <a:rPr lang="en-US" dirty="0"/>
-              <a:t>! Let’s learn a lot of stuff together!</a:t>
-            </a:r>
-          </a:p>
-          <a:p>
-            <a:r>
-              <a:rPr lang="en-US" dirty="0"/>
-              <a:t>Quiz grades have been released!</a:t>
-            </a:r>
-          </a:p>
-          <a:p>
-            <a:pPr lvl="1"/>
-            <a:r>
-              <a:rPr lang="en-US" dirty="0"/>
-              <a:t>Regrades close tonight at midnight.</a:t>
-            </a:r>
-          </a:p>
-          <a:p>
-            <a:r>
-              <a:rPr lang="en-US" dirty="0"/>
-              <a:t>Mod. 3 homework is done. How did it go?</a:t>
-            </a:r>
-          </a:p>
-          <a:p>
-            <a:r>
-              <a:rPr lang="en-US" dirty="0"/>
-              <a:t>I officially moved the next Quiz to the previous Tuesday (11/14). Hooray!</a:t>
-            </a:r>
-          </a:p>
-          <a:p>
-            <a:r>
-              <a:rPr lang="en-US" dirty="0"/>
-              <a:t>I think we are not going to have the space for a first mod 5 attempt. Still could change but unlikely.</a:t>
-            </a:r>
-          </a:p>
-          <a:p>
-            <a:r>
-              <a:rPr lang="en-US" dirty="0"/>
-              <a:t>Today we continue with </a:t>
-            </a:r>
-            <a:r>
-              <a:rPr lang="en-US"/>
-              <a:t>module 4!</a:t>
-            </a:r>
-            <a:endParaRPr lang="en-US" dirty="0"/>
-          </a:p>
-        </p:txBody>
-      </p:sp>
-      <p:sp>
-        <p:nvSpPr>
-          <p:cNvPr id="4" name="Slide Number Placeholder 3"/>
-          <p:cNvSpPr>
-            <a:spLocks noGrp="1"/>
-          </p:cNvSpPr>
-          <p:nvPr>
-            <p:ph type="sldNum" sz="quarter" idx="12"/>
-          </p:nvPr>
-        </p:nvSpPr>
-        <p:spPr/>
-        <p:txBody>
-          <a:bodyPr/>
-          <a:lstStyle/>
-          <a:p>
-            <a:fld id="{F26D9103-0C5C-48AC-B68E-3ED2C1647047}" type="slidenum">
-              <a:rPr lang="en-US" smtClean="0"/>
-              <a:pPr/>
-              <a:t>18</a:t>
-            </a:fld>
-            <a:endParaRPr lang="en-US" dirty="0"/>
-          </a:p>
-        </p:txBody>
-      </p:sp>
-    </p:spTree>
-    <p:extLst>
-      <p:ext uri="{BB962C8B-B14F-4D97-AF65-F5344CB8AC3E}">
-        <p14:creationId xmlns:p14="http://schemas.microsoft.com/office/powerpoint/2010/main" val="2431910127"/>
-      </p:ext>
-    </p:extLst>
-  </p:cSld>
-  <p:clrMapOvr>
-    <a:masterClrMapping/>
-  </p:clrMapOvr>
-</p:sld>
-</file>
-
-<file path=ppt/slides/slide19.xml><?xml version="1.0" encoding="utf-8"?>
-<p:sld xmlns:a="http://schemas.openxmlformats.org/drawingml/2006/main" xmlns:r="http://schemas.openxmlformats.org/officeDocument/2006/relationships" xmlns:p="http://schemas.openxmlformats.org/presentationml/2006/main">
-  <p:cSld>
-    <p:spTree>
-      <p:nvGrpSpPr>
-        <p:cNvPr id="1" name=""/>
-        <p:cNvGrpSpPr/>
-        <p:nvPr/>
-      </p:nvGrpSpPr>
-      <p:grpSpPr>
-        <a:xfrm>
-          <a:off x="0" y="0"/>
-          <a:ext cx="0" cy="0"/>
-          <a:chOff x="0" y="0"/>
-          <a:chExt cx="0" cy="0"/>
-        </a:xfrm>
-      </p:grpSpPr>
-      <p:sp>
-        <p:nvSpPr>
-          <p:cNvPr id="6146" name="Rectangle 2"/>
-          <p:cNvSpPr>
-            <a:spLocks noGrp="1" noChangeArrowheads="1"/>
-          </p:cNvSpPr>
-          <p:nvPr>
-            <p:ph type="title"/>
-            <p:custDataLst>
-              <p:tags r:id="rId1"/>
-            </p:custDataLst>
-          </p:nvPr>
-        </p:nvSpPr>
-        <p:spPr>
-          <a:xfrm>
-            <a:off x="1141413" y="284084"/>
-            <a:ext cx="9905998" cy="620791"/>
-          </a:xfrm>
-        </p:spPr>
-        <p:txBody>
-          <a:bodyPr/>
-          <a:lstStyle/>
-          <a:p>
-            <a:pPr algn="ctr"/>
-            <a:r>
-              <a:rPr lang="en-US" dirty="0"/>
-              <a:t>Lecture 19: </a:t>
-            </a:r>
-            <a:r>
-              <a:rPr lang="en-US" dirty="0" err="1"/>
-              <a:t>THu</a:t>
-            </a:r>
-            <a:r>
-              <a:rPr lang="en-US" dirty="0"/>
-              <a:t> Nov. 3</a:t>
-            </a:r>
-          </a:p>
-        </p:txBody>
-      </p:sp>
-      <p:sp>
-        <p:nvSpPr>
-          <p:cNvPr id="6147" name="Rectangle 3"/>
-          <p:cNvSpPr>
-            <a:spLocks noGrp="1" noChangeArrowheads="1"/>
-          </p:cNvSpPr>
-          <p:nvPr>
-            <p:ph idx="1"/>
-            <p:custDataLst>
-              <p:tags r:id="rId2"/>
-            </p:custDataLst>
-          </p:nvPr>
-        </p:nvSpPr>
-        <p:spPr>
-          <a:xfrm>
-            <a:off x="1141413" y="1123950"/>
-            <a:ext cx="9970724" cy="5149850"/>
-          </a:xfrm>
-        </p:spPr>
-        <p:txBody>
-          <a:bodyPr>
-            <a:normAutofit/>
-          </a:bodyPr>
-          <a:lstStyle/>
-          <a:p>
-            <a:r>
-              <a:rPr lang="en-US" dirty="0"/>
-              <a:t>DMT2 is </a:t>
-            </a:r>
-            <a:r>
-              <a:rPr lang="en-US" b="1" i="1" u="sng" dirty="0"/>
-              <a:t>going to be great</a:t>
-            </a:r>
-            <a:r>
-              <a:rPr lang="en-US" dirty="0"/>
-              <a:t>! Let’s learn a lot of stuff together!</a:t>
-            </a:r>
-          </a:p>
-          <a:p>
-            <a:r>
-              <a:rPr lang="en-US" dirty="0"/>
-              <a:t>Quiz grades have been released!</a:t>
-            </a:r>
-          </a:p>
-          <a:p>
-            <a:pPr lvl="1"/>
-            <a:r>
-              <a:rPr lang="en-US" dirty="0"/>
-              <a:t>Regrades have closed.</a:t>
-            </a:r>
-          </a:p>
-          <a:p>
-            <a:r>
-              <a:rPr lang="en-US" dirty="0"/>
-              <a:t>Mod. 3 homework is done. How did it go?</a:t>
-            </a:r>
-          </a:p>
-          <a:p>
-            <a:r>
-              <a:rPr lang="en-US" dirty="0"/>
-              <a:t>I officially moved the next Quiz to the previous Tuesday (11/14). Hooray!</a:t>
-            </a:r>
-          </a:p>
-          <a:p>
-            <a:r>
-              <a:rPr lang="en-US" dirty="0"/>
-              <a:t>I think we are not going to have the space for a first mod 5 attempt. Still could change but unlikely.</a:t>
-            </a:r>
-          </a:p>
-          <a:p>
-            <a:r>
-              <a:rPr lang="en-US" dirty="0"/>
-              <a:t>Today we finish with module 4, and MAYBE start module 5</a:t>
-            </a:r>
-          </a:p>
-        </p:txBody>
-      </p:sp>
-      <p:sp>
-        <p:nvSpPr>
-          <p:cNvPr id="4" name="Slide Number Placeholder 3"/>
-          <p:cNvSpPr>
-            <a:spLocks noGrp="1"/>
-          </p:cNvSpPr>
-          <p:nvPr>
-            <p:ph type="sldNum" sz="quarter" idx="12"/>
-          </p:nvPr>
-        </p:nvSpPr>
-        <p:spPr/>
-        <p:txBody>
-          <a:bodyPr/>
-          <a:lstStyle/>
-          <a:p>
-            <a:fld id="{F26D9103-0C5C-48AC-B68E-3ED2C1647047}" type="slidenum">
-              <a:rPr lang="en-US" smtClean="0"/>
-              <a:pPr/>
-              <a:t>19</a:t>
-            </a:fld>
-            <a:endParaRPr lang="en-US" dirty="0"/>
-          </a:p>
-        </p:txBody>
-      </p:sp>
-    </p:spTree>
-    <p:extLst>
-      <p:ext uri="{BB962C8B-B14F-4D97-AF65-F5344CB8AC3E}">
-        <p14:creationId xmlns:p14="http://schemas.microsoft.com/office/powerpoint/2010/main" val="3667461767"/>
-      </p:ext>
-    </p:extLst>
-  </p:cSld>
-  <p:clrMapOvr>
-    <a:masterClrMapping/>
-  </p:clrMapOvr>
-</p:sld>
-</file>
-
 <file path=ppt/slides/slide2.xml><?xml version="1.0" encoding="utf-8"?>
 <p:sld xmlns:a="http://schemas.openxmlformats.org/drawingml/2006/main" xmlns:r="http://schemas.openxmlformats.org/officeDocument/2006/relationships" xmlns:p="http://schemas.openxmlformats.org/presentationml/2006/main">
   <p:cSld>
@@ -14737,7 +13024,7 @@
             <a:pPr algn="ctr"/>
             <a:r>
               <a:rPr lang="en-US" dirty="0"/>
-              <a:t>Lecture 2: Thu. Aug. 24</a:t>
+              <a:t>Lecture 2: Tue. Jan. 23</a:t>
             </a:r>
           </a:p>
         </p:txBody>
@@ -14782,38 +13069,62 @@
           </a:p>
           <a:p>
             <a:r>
+              <a:rPr lang="en-US" dirty="0" err="1"/>
+              <a:t>Floryan’s</a:t>
+            </a:r>
+            <a:r>
+              <a:rPr lang="en-US" dirty="0"/>
+              <a:t> OH have been posted and start today. TA OH will be posted by tomorrow and will start on Thursday!</a:t>
+            </a:r>
+          </a:p>
+          <a:p>
+            <a:r>
               <a:rPr lang="en-US" b="1" i="1" u="sng" dirty="0"/>
               <a:t>Homework deadlines </a:t>
             </a:r>
             <a:r>
               <a:rPr lang="en-US" dirty="0"/>
-              <a:t>are now set. Let’s glance at the schedule together</a:t>
+              <a:t>are set on the website. Let’s glance together.</a:t>
             </a:r>
           </a:p>
           <a:p>
             <a:r>
               <a:rPr lang="en-US" dirty="0"/>
-              <a:t>Homework deadlines forced me to </a:t>
+              <a:t>Module 1 has two </a:t>
             </a:r>
             <a:r>
-              <a:rPr lang="en-US" b="1" i="1" u="sng" dirty="0"/>
-              <a:t>move the second quiz day</a:t>
+              <a:rPr lang="en-US" dirty="0" err="1"/>
+              <a:t>homeworks</a:t>
             </a:r>
             <a:r>
               <a:rPr lang="en-US" dirty="0"/>
-              <a:t>, it is now on Nov. 21 (Tuesday before Thanksgiving break…I’m sorry!!)</a:t>
+              <a:t>. The first has been released on the website.</a:t>
             </a:r>
           </a:p>
           <a:p>
             <a:r>
               <a:rPr lang="en-US" dirty="0"/>
-              <a:t>Don’t start the programming assignment yet (who would actually do this though…). I’m probably going to give you starter code that I haven’t produced quite yet. Coming soon.</a:t>
+              <a:t>The other </a:t>
             </a:r>
-          </a:p>
-          <a:p>
+            <a:r>
+              <a:rPr lang="en-US" dirty="0" err="1"/>
+              <a:t>homeworks</a:t>
+            </a:r>
             <a:r>
               <a:rPr lang="en-US" dirty="0"/>
-              <a:t>Today we will keep looking at the overview of the class and start defining what a computational model really is!</a:t>
+              <a:t> will be written and rolled out very soon.</a:t>
+            </a:r>
+          </a:p>
+          <a:p>
+            <a:r>
+              <a:rPr lang="en-US" dirty="0"/>
+              <a:t>I will try to get recording audio fixed. Not sure why it wasn’t picking it up.</a:t>
+            </a:r>
+          </a:p>
+          <a:p>
+            <a:r>
+              <a:rPr lang="en-US" dirty="0"/>
+              <a:t>Today we will continue with module 1, keep discussing what a computer is and start in on the background math / review!</a:t>
             </a:r>
           </a:p>
           <a:p>
@@ -14858,2211 +13169,13 @@
 </p:sld>
 </file>
 
-<file path=ppt/slides/slide20.xml><?xml version="1.0" encoding="utf-8"?>
-<p:sld xmlns:a="http://schemas.openxmlformats.org/drawingml/2006/main" xmlns:r="http://schemas.openxmlformats.org/officeDocument/2006/relationships" xmlns:p="http://schemas.openxmlformats.org/presentationml/2006/main">
-  <p:cSld>
-    <p:spTree>
-      <p:nvGrpSpPr>
-        <p:cNvPr id="1" name=""/>
-        <p:cNvGrpSpPr/>
-        <p:nvPr/>
-      </p:nvGrpSpPr>
-      <p:grpSpPr>
-        <a:xfrm>
-          <a:off x="0" y="0"/>
-          <a:ext cx="0" cy="0"/>
-          <a:chOff x="0" y="0"/>
-          <a:chExt cx="0" cy="0"/>
-        </a:xfrm>
-      </p:grpSpPr>
-      <p:sp>
-        <p:nvSpPr>
-          <p:cNvPr id="6146" name="Rectangle 2"/>
-          <p:cNvSpPr>
-            <a:spLocks noGrp="1" noChangeArrowheads="1"/>
-          </p:cNvSpPr>
-          <p:nvPr>
-            <p:ph type="title"/>
-            <p:custDataLst>
-              <p:tags r:id="rId1"/>
-            </p:custDataLst>
-          </p:nvPr>
-        </p:nvSpPr>
-        <p:spPr>
-          <a:xfrm>
-            <a:off x="1141413" y="284084"/>
-            <a:ext cx="9905998" cy="620791"/>
-          </a:xfrm>
-        </p:spPr>
-        <p:txBody>
-          <a:bodyPr/>
-          <a:lstStyle/>
-          <a:p>
-            <a:pPr algn="ctr"/>
-            <a:r>
-              <a:rPr lang="en-US" dirty="0"/>
-              <a:t>Lecture 20: </a:t>
-            </a:r>
-            <a:r>
-              <a:rPr lang="en-US" dirty="0" err="1"/>
-              <a:t>THu</a:t>
-            </a:r>
-            <a:r>
-              <a:rPr lang="en-US" dirty="0"/>
-              <a:t> Nov. 9</a:t>
-            </a:r>
-          </a:p>
-        </p:txBody>
-      </p:sp>
-      <p:sp>
-        <p:nvSpPr>
-          <p:cNvPr id="6147" name="Rectangle 3"/>
-          <p:cNvSpPr>
-            <a:spLocks noGrp="1" noChangeArrowheads="1"/>
-          </p:cNvSpPr>
-          <p:nvPr>
-            <p:ph idx="1"/>
-            <p:custDataLst>
-              <p:tags r:id="rId2"/>
-            </p:custDataLst>
-          </p:nvPr>
-        </p:nvSpPr>
-        <p:spPr>
-          <a:xfrm>
-            <a:off x="1141413" y="1123950"/>
-            <a:ext cx="9970724" cy="5149850"/>
-          </a:xfrm>
-        </p:spPr>
-        <p:txBody>
-          <a:bodyPr>
-            <a:normAutofit/>
-          </a:bodyPr>
-          <a:lstStyle/>
-          <a:p>
-            <a:r>
-              <a:rPr lang="en-US" dirty="0"/>
-              <a:t>DMT2 is </a:t>
-            </a:r>
-            <a:r>
-              <a:rPr lang="en-US" b="1" i="1" u="sng" dirty="0"/>
-              <a:t>going to be great</a:t>
-            </a:r>
-            <a:r>
-              <a:rPr lang="en-US" dirty="0"/>
-              <a:t>! Let’s learn a lot of stuff together!</a:t>
-            </a:r>
-          </a:p>
-          <a:p>
-            <a:r>
-              <a:rPr lang="en-US" dirty="0"/>
-              <a:t>Next round of quizzes is NEXT Tuesday in class!</a:t>
-            </a:r>
-          </a:p>
-          <a:p>
-            <a:pPr lvl="1"/>
-            <a:r>
-              <a:rPr lang="en-US" dirty="0"/>
-              <a:t>Same format, but on modules 3 and 4.</a:t>
-            </a:r>
-          </a:p>
-          <a:p>
-            <a:pPr lvl="1"/>
-            <a:r>
-              <a:rPr lang="en-US" dirty="0"/>
-              <a:t>A brief study guide was added to the quiz review page on website</a:t>
-            </a:r>
-          </a:p>
-          <a:p>
-            <a:pPr lvl="1"/>
-            <a:r>
-              <a:rPr lang="en-US" dirty="0" err="1"/>
-              <a:t>Homeworks</a:t>
-            </a:r>
-            <a:r>
-              <a:rPr lang="en-US" dirty="0"/>
-              <a:t> 3 and 4 will be graded by Sunday so you can study them.</a:t>
-            </a:r>
-          </a:p>
-          <a:p>
-            <a:r>
-              <a:rPr lang="en-US" dirty="0"/>
-              <a:t>Module 4 homework is due tonight!</a:t>
-            </a:r>
-          </a:p>
-          <a:p>
-            <a:pPr lvl="1"/>
-            <a:r>
-              <a:rPr lang="en-US" dirty="0"/>
-              <a:t>You are only guaranteed to get feedback before the quiz if you submit on time.</a:t>
-            </a:r>
-          </a:p>
-          <a:p>
-            <a:pPr lvl="1"/>
-            <a:r>
-              <a:rPr lang="en-US" dirty="0"/>
-              <a:t>Use the extension at your own risk.</a:t>
-            </a:r>
-          </a:p>
-          <a:p>
-            <a:r>
-              <a:rPr lang="en-US" dirty="0"/>
-              <a:t>A module 5 homework will be posted soon (sorry about that).</a:t>
-            </a:r>
-          </a:p>
-          <a:p>
-            <a:r>
-              <a:rPr lang="en-US" dirty="0"/>
-              <a:t>Today we begin module 5!!</a:t>
-            </a:r>
-          </a:p>
-        </p:txBody>
-      </p:sp>
-      <p:sp>
-        <p:nvSpPr>
-          <p:cNvPr id="4" name="Slide Number Placeholder 3"/>
-          <p:cNvSpPr>
-            <a:spLocks noGrp="1"/>
-          </p:cNvSpPr>
-          <p:nvPr>
-            <p:ph type="sldNum" sz="quarter" idx="12"/>
-          </p:nvPr>
-        </p:nvSpPr>
-        <p:spPr/>
-        <p:txBody>
-          <a:bodyPr/>
-          <a:lstStyle/>
-          <a:p>
-            <a:fld id="{F26D9103-0C5C-48AC-B68E-3ED2C1647047}" type="slidenum">
-              <a:rPr lang="en-US" smtClean="0"/>
-              <a:pPr/>
-              <a:t>20</a:t>
-            </a:fld>
-            <a:endParaRPr lang="en-US" dirty="0"/>
-          </a:p>
-        </p:txBody>
-      </p:sp>
-    </p:spTree>
-    <p:extLst>
-      <p:ext uri="{BB962C8B-B14F-4D97-AF65-F5344CB8AC3E}">
-        <p14:creationId xmlns:p14="http://schemas.microsoft.com/office/powerpoint/2010/main" val="4075065621"/>
-      </p:ext>
-    </p:extLst>
-  </p:cSld>
-  <p:clrMapOvr>
-    <a:masterClrMapping/>
-  </p:clrMapOvr>
-</p:sld>
-</file>
-
-<file path=ppt/slides/slide21.xml><?xml version="1.0" encoding="utf-8"?>
-<p:sld xmlns:a="http://schemas.openxmlformats.org/drawingml/2006/main" xmlns:r="http://schemas.openxmlformats.org/officeDocument/2006/relationships" xmlns:p="http://schemas.openxmlformats.org/presentationml/2006/main">
-  <p:cSld>
-    <p:spTree>
-      <p:nvGrpSpPr>
-        <p:cNvPr id="1" name=""/>
-        <p:cNvGrpSpPr/>
-        <p:nvPr/>
-      </p:nvGrpSpPr>
-      <p:grpSpPr>
-        <a:xfrm>
-          <a:off x="0" y="0"/>
-          <a:ext cx="0" cy="0"/>
-          <a:chOff x="0" y="0"/>
-          <a:chExt cx="0" cy="0"/>
-        </a:xfrm>
-      </p:grpSpPr>
-      <p:sp>
-        <p:nvSpPr>
-          <p:cNvPr id="6146" name="Rectangle 2"/>
-          <p:cNvSpPr>
-            <a:spLocks noGrp="1" noChangeArrowheads="1"/>
-          </p:cNvSpPr>
-          <p:nvPr>
-            <p:ph type="title"/>
-            <p:custDataLst>
-              <p:tags r:id="rId1"/>
-            </p:custDataLst>
-          </p:nvPr>
-        </p:nvSpPr>
-        <p:spPr>
-          <a:xfrm>
-            <a:off x="1141413" y="284084"/>
-            <a:ext cx="9905998" cy="620791"/>
-          </a:xfrm>
-        </p:spPr>
-        <p:txBody>
-          <a:bodyPr/>
-          <a:lstStyle/>
-          <a:p>
-            <a:pPr algn="ctr"/>
-            <a:r>
-              <a:rPr lang="en-US" dirty="0"/>
-              <a:t>Lecture 21: </a:t>
-            </a:r>
-            <a:r>
-              <a:rPr lang="en-US" dirty="0" err="1"/>
-              <a:t>THu</a:t>
-            </a:r>
-            <a:r>
-              <a:rPr lang="en-US" dirty="0"/>
-              <a:t> Nov. 16</a:t>
-            </a:r>
-          </a:p>
-        </p:txBody>
-      </p:sp>
-      <p:sp>
-        <p:nvSpPr>
-          <p:cNvPr id="6147" name="Rectangle 3"/>
-          <p:cNvSpPr>
-            <a:spLocks noGrp="1" noChangeArrowheads="1"/>
-          </p:cNvSpPr>
-          <p:nvPr>
-            <p:ph idx="1"/>
-            <p:custDataLst>
-              <p:tags r:id="rId2"/>
-            </p:custDataLst>
-          </p:nvPr>
-        </p:nvSpPr>
-        <p:spPr>
-          <a:xfrm>
-            <a:off x="1141413" y="1123950"/>
-            <a:ext cx="9970724" cy="5149850"/>
-          </a:xfrm>
-        </p:spPr>
-        <p:txBody>
-          <a:bodyPr>
-            <a:normAutofit/>
-          </a:bodyPr>
-          <a:lstStyle/>
-          <a:p>
-            <a:r>
-              <a:rPr lang="en-US" dirty="0"/>
-              <a:t>DMT2 is </a:t>
-            </a:r>
-            <a:r>
-              <a:rPr lang="en-US" b="1" i="1" u="sng" dirty="0"/>
-              <a:t>going to be great</a:t>
-            </a:r>
-            <a:r>
-              <a:rPr lang="en-US" dirty="0"/>
-              <a:t>! Let’s learn a lot of stuff together!</a:t>
-            </a:r>
-          </a:p>
-          <a:p>
-            <a:r>
-              <a:rPr lang="en-US" dirty="0"/>
-              <a:t>Quizzes went well I think…how did you feel about it.</a:t>
-            </a:r>
-          </a:p>
-          <a:p>
-            <a:pPr lvl="1"/>
-            <a:r>
-              <a:rPr lang="en-US" dirty="0"/>
-              <a:t>Not going to go over today…still a couple people that need to take it.</a:t>
-            </a:r>
-          </a:p>
-          <a:p>
-            <a:pPr lvl="1"/>
-            <a:r>
-              <a:rPr lang="en-US" dirty="0"/>
-              <a:t>Should be graded by Friday evening.</a:t>
-            </a:r>
-          </a:p>
-          <a:p>
-            <a:r>
-              <a:rPr lang="en-US" dirty="0"/>
-              <a:t>Next Tuesday…</a:t>
-            </a:r>
-          </a:p>
-          <a:p>
-            <a:pPr lvl="1"/>
-            <a:r>
-              <a:rPr lang="en-US" dirty="0"/>
-              <a:t>If we get through enough today, then we can cancel class on Tuesday</a:t>
-            </a:r>
-          </a:p>
-          <a:p>
-            <a:pPr lvl="1"/>
-            <a:r>
-              <a:rPr lang="en-US" dirty="0"/>
-              <a:t>On Tuesday, I will record a short lecture going over the exam for you.</a:t>
-            </a:r>
-          </a:p>
-          <a:p>
-            <a:r>
-              <a:rPr lang="en-US" dirty="0"/>
-              <a:t>A module 5 homework will be posted soon (sorry about that). I’m almost done with it!!</a:t>
-            </a:r>
-          </a:p>
-          <a:p>
-            <a:r>
-              <a:rPr lang="en-US" dirty="0"/>
-              <a:t>Today we continue module 5!!</a:t>
-            </a:r>
-          </a:p>
-        </p:txBody>
-      </p:sp>
-      <p:sp>
-        <p:nvSpPr>
-          <p:cNvPr id="4" name="Slide Number Placeholder 3"/>
-          <p:cNvSpPr>
-            <a:spLocks noGrp="1"/>
-          </p:cNvSpPr>
-          <p:nvPr>
-            <p:ph type="sldNum" sz="quarter" idx="12"/>
-          </p:nvPr>
-        </p:nvSpPr>
-        <p:spPr/>
-        <p:txBody>
-          <a:bodyPr/>
-          <a:lstStyle/>
-          <a:p>
-            <a:fld id="{F26D9103-0C5C-48AC-B68E-3ED2C1647047}" type="slidenum">
-              <a:rPr lang="en-US" smtClean="0"/>
-              <a:pPr/>
-              <a:t>21</a:t>
-            </a:fld>
-            <a:endParaRPr lang="en-US" dirty="0"/>
-          </a:p>
-        </p:txBody>
-      </p:sp>
-    </p:spTree>
-    <p:extLst>
-      <p:ext uri="{BB962C8B-B14F-4D97-AF65-F5344CB8AC3E}">
-        <p14:creationId xmlns:p14="http://schemas.microsoft.com/office/powerpoint/2010/main" val="2685779828"/>
-      </p:ext>
-    </p:extLst>
-  </p:cSld>
-  <p:clrMapOvr>
-    <a:masterClrMapping/>
-  </p:clrMapOvr>
-</p:sld>
-</file>
-
-<file path=ppt/slides/slide22.xml><?xml version="1.0" encoding="utf-8"?>
-<p:sld xmlns:a="http://schemas.openxmlformats.org/drawingml/2006/main" xmlns:r="http://schemas.openxmlformats.org/officeDocument/2006/relationships" xmlns:p="http://schemas.openxmlformats.org/presentationml/2006/main">
-  <p:cSld>
-    <p:spTree>
-      <p:nvGrpSpPr>
-        <p:cNvPr id="1" name=""/>
-        <p:cNvGrpSpPr/>
-        <p:nvPr/>
-      </p:nvGrpSpPr>
-      <p:grpSpPr>
-        <a:xfrm>
-          <a:off x="0" y="0"/>
-          <a:ext cx="0" cy="0"/>
-          <a:chOff x="0" y="0"/>
-          <a:chExt cx="0" cy="0"/>
-        </a:xfrm>
-      </p:grpSpPr>
-      <p:sp>
-        <p:nvSpPr>
-          <p:cNvPr id="6146" name="Rectangle 2"/>
-          <p:cNvSpPr>
-            <a:spLocks noGrp="1" noChangeArrowheads="1"/>
-          </p:cNvSpPr>
-          <p:nvPr>
-            <p:ph type="title"/>
-            <p:custDataLst>
-              <p:tags r:id="rId1"/>
-            </p:custDataLst>
-          </p:nvPr>
-        </p:nvSpPr>
-        <p:spPr>
-          <a:xfrm>
-            <a:off x="1141413" y="284084"/>
-            <a:ext cx="9905998" cy="620791"/>
-          </a:xfrm>
-        </p:spPr>
-        <p:txBody>
-          <a:bodyPr/>
-          <a:lstStyle/>
-          <a:p>
-            <a:pPr algn="ctr"/>
-            <a:r>
-              <a:rPr lang="en-US" dirty="0"/>
-              <a:t>Lecture 22: Tue Nov. 28</a:t>
-            </a:r>
-          </a:p>
-        </p:txBody>
-      </p:sp>
-      <p:sp>
-        <p:nvSpPr>
-          <p:cNvPr id="6147" name="Rectangle 3"/>
-          <p:cNvSpPr>
-            <a:spLocks noGrp="1" noChangeArrowheads="1"/>
-          </p:cNvSpPr>
-          <p:nvPr>
-            <p:ph idx="1"/>
-            <p:custDataLst>
-              <p:tags r:id="rId2"/>
-            </p:custDataLst>
-          </p:nvPr>
-        </p:nvSpPr>
-        <p:spPr>
-          <a:xfrm>
-            <a:off x="1141413" y="1123950"/>
-            <a:ext cx="9970724" cy="5149850"/>
-          </a:xfrm>
-        </p:spPr>
-        <p:txBody>
-          <a:bodyPr>
-            <a:normAutofit/>
-          </a:bodyPr>
-          <a:lstStyle/>
-          <a:p>
-            <a:r>
-              <a:rPr lang="en-US" dirty="0"/>
-              <a:t>DMT2 is </a:t>
-            </a:r>
-            <a:r>
-              <a:rPr lang="en-US" b="1" i="1" u="sng" dirty="0"/>
-              <a:t>going to be great</a:t>
-            </a:r>
-            <a:r>
-              <a:rPr lang="en-US" dirty="0"/>
-              <a:t>! Let’s learn a lot of stuff together!</a:t>
-            </a:r>
-          </a:p>
-          <a:p>
-            <a:r>
-              <a:rPr lang="en-US" dirty="0"/>
-              <a:t>Hope you all had a restful break and are recharged! Let’s finish strong!</a:t>
-            </a:r>
-          </a:p>
-          <a:p>
-            <a:r>
-              <a:rPr lang="en-US" dirty="0"/>
-              <a:t>Quiz regrade period ends today. Make sure to submit those if you need to.</a:t>
-            </a:r>
-          </a:p>
-          <a:p>
-            <a:r>
-              <a:rPr lang="en-US" dirty="0"/>
-              <a:t>Homework 5 due date was pushed back to Sunday evening</a:t>
-            </a:r>
-          </a:p>
-          <a:p>
-            <a:pPr lvl="1"/>
-            <a:r>
-              <a:rPr lang="en-US" dirty="0"/>
-              <a:t>You need today’s lecture to do problems 3 and 4. Thursday lecture will help also.</a:t>
-            </a:r>
-          </a:p>
-          <a:p>
-            <a:pPr lvl="1"/>
-            <a:r>
-              <a:rPr lang="en-US" dirty="0"/>
-              <a:t>Extension only pushes due date to Thursday evening.</a:t>
-            </a:r>
-          </a:p>
-          <a:p>
-            <a:r>
-              <a:rPr lang="en-US" dirty="0"/>
-              <a:t>Final exam is Friday, Dec. 8 2-5pm in our classroom. Don’t forget!</a:t>
-            </a:r>
-          </a:p>
-          <a:p>
-            <a:r>
-              <a:rPr lang="en-US" dirty="0"/>
-              <a:t>Today we continue module and see some reductions!</a:t>
-            </a:r>
-          </a:p>
-        </p:txBody>
-      </p:sp>
-      <p:sp>
-        <p:nvSpPr>
-          <p:cNvPr id="4" name="Slide Number Placeholder 3"/>
-          <p:cNvSpPr>
-            <a:spLocks noGrp="1"/>
-          </p:cNvSpPr>
-          <p:nvPr>
-            <p:ph type="sldNum" sz="quarter" idx="12"/>
-          </p:nvPr>
-        </p:nvSpPr>
-        <p:spPr/>
-        <p:txBody>
-          <a:bodyPr/>
-          <a:lstStyle/>
-          <a:p>
-            <a:fld id="{F26D9103-0C5C-48AC-B68E-3ED2C1647047}" type="slidenum">
-              <a:rPr lang="en-US" smtClean="0"/>
-              <a:pPr/>
-              <a:t>22</a:t>
-            </a:fld>
-            <a:endParaRPr lang="en-US" dirty="0"/>
-          </a:p>
-        </p:txBody>
-      </p:sp>
-    </p:spTree>
-    <p:extLst>
-      <p:ext uri="{BB962C8B-B14F-4D97-AF65-F5344CB8AC3E}">
-        <p14:creationId xmlns:p14="http://schemas.microsoft.com/office/powerpoint/2010/main" val="3250289146"/>
-      </p:ext>
-    </p:extLst>
-  </p:cSld>
-  <p:clrMapOvr>
-    <a:masterClrMapping/>
-  </p:clrMapOvr>
-</p:sld>
-</file>
-
-<file path=ppt/slides/slide23.xml><?xml version="1.0" encoding="utf-8"?>
-<p:sld xmlns:a="http://schemas.openxmlformats.org/drawingml/2006/main" xmlns:r="http://schemas.openxmlformats.org/officeDocument/2006/relationships" xmlns:p="http://schemas.openxmlformats.org/presentationml/2006/main">
-  <p:cSld>
-    <p:spTree>
-      <p:nvGrpSpPr>
-        <p:cNvPr id="1" name=""/>
-        <p:cNvGrpSpPr/>
-        <p:nvPr/>
-      </p:nvGrpSpPr>
-      <p:grpSpPr>
-        <a:xfrm>
-          <a:off x="0" y="0"/>
-          <a:ext cx="0" cy="0"/>
-          <a:chOff x="0" y="0"/>
-          <a:chExt cx="0" cy="0"/>
-        </a:xfrm>
-      </p:grpSpPr>
-      <p:sp>
-        <p:nvSpPr>
-          <p:cNvPr id="6146" name="Rectangle 2"/>
-          <p:cNvSpPr>
-            <a:spLocks noGrp="1" noChangeArrowheads="1"/>
-          </p:cNvSpPr>
-          <p:nvPr>
-            <p:ph type="title"/>
-            <p:custDataLst>
-              <p:tags r:id="rId1"/>
-            </p:custDataLst>
-          </p:nvPr>
-        </p:nvSpPr>
-        <p:spPr>
-          <a:xfrm>
-            <a:off x="1141413" y="284084"/>
-            <a:ext cx="9905998" cy="620791"/>
-          </a:xfrm>
-        </p:spPr>
-        <p:txBody>
-          <a:bodyPr/>
-          <a:lstStyle/>
-          <a:p>
-            <a:pPr algn="ctr"/>
-            <a:r>
-              <a:rPr lang="en-US" dirty="0"/>
-              <a:t>Lecture 23: Thu Nov. 30</a:t>
-            </a:r>
-          </a:p>
-        </p:txBody>
-      </p:sp>
-      <p:sp>
-        <p:nvSpPr>
-          <p:cNvPr id="6147" name="Rectangle 3"/>
-          <p:cNvSpPr>
-            <a:spLocks noGrp="1" noChangeArrowheads="1"/>
-          </p:cNvSpPr>
-          <p:nvPr>
-            <p:ph idx="1"/>
-            <p:custDataLst>
-              <p:tags r:id="rId2"/>
-            </p:custDataLst>
-          </p:nvPr>
-        </p:nvSpPr>
-        <p:spPr>
-          <a:xfrm>
-            <a:off x="1141413" y="1123950"/>
-            <a:ext cx="9970724" cy="5149850"/>
-          </a:xfrm>
-        </p:spPr>
-        <p:txBody>
-          <a:bodyPr>
-            <a:normAutofit/>
-          </a:bodyPr>
-          <a:lstStyle/>
-          <a:p>
-            <a:r>
-              <a:rPr lang="en-US" dirty="0"/>
-              <a:t>DMT2 is </a:t>
-            </a:r>
-            <a:r>
-              <a:rPr lang="en-US" b="1" i="1" u="sng" dirty="0"/>
-              <a:t>going to be great</a:t>
-            </a:r>
-            <a:r>
-              <a:rPr lang="en-US" dirty="0"/>
-              <a:t>! Let’s learn a lot of stuff together!</a:t>
-            </a:r>
-          </a:p>
-          <a:p>
-            <a:r>
-              <a:rPr lang="en-US" dirty="0"/>
-              <a:t>Quiz regrade period is over.</a:t>
-            </a:r>
-          </a:p>
-          <a:p>
-            <a:r>
-              <a:rPr lang="en-US" dirty="0"/>
-              <a:t>Homework 5 due date was pushed back to Sunday evening</a:t>
-            </a:r>
-          </a:p>
-          <a:p>
-            <a:pPr lvl="1"/>
-            <a:r>
-              <a:rPr lang="en-US" dirty="0"/>
-              <a:t>You should be able to finish it as of Tuesday, but we will see more reduction examples today.</a:t>
-            </a:r>
-          </a:p>
-          <a:p>
-            <a:pPr lvl="1"/>
-            <a:r>
-              <a:rPr lang="en-US" dirty="0"/>
-              <a:t>Extension only pushes due date to Thursday evening.</a:t>
-            </a:r>
-          </a:p>
-          <a:p>
-            <a:r>
-              <a:rPr lang="en-US" dirty="0"/>
-              <a:t>Final exam is Friday, Dec. 8 2-5pm in our classroom. Don’t forget!</a:t>
-            </a:r>
-          </a:p>
-          <a:p>
-            <a:r>
-              <a:rPr lang="en-US" dirty="0"/>
-              <a:t>Today we continue module 5 and see more reductions!</a:t>
-            </a:r>
-          </a:p>
-        </p:txBody>
-      </p:sp>
-      <p:sp>
-        <p:nvSpPr>
-          <p:cNvPr id="4" name="Slide Number Placeholder 3"/>
-          <p:cNvSpPr>
-            <a:spLocks noGrp="1"/>
-          </p:cNvSpPr>
-          <p:nvPr>
-            <p:ph type="sldNum" sz="quarter" idx="12"/>
-          </p:nvPr>
-        </p:nvSpPr>
-        <p:spPr/>
-        <p:txBody>
-          <a:bodyPr/>
-          <a:lstStyle/>
-          <a:p>
-            <a:fld id="{F26D9103-0C5C-48AC-B68E-3ED2C1647047}" type="slidenum">
-              <a:rPr lang="en-US" smtClean="0"/>
-              <a:pPr/>
-              <a:t>23</a:t>
-            </a:fld>
-            <a:endParaRPr lang="en-US" dirty="0"/>
-          </a:p>
-        </p:txBody>
-      </p:sp>
-    </p:spTree>
-    <p:extLst>
-      <p:ext uri="{BB962C8B-B14F-4D97-AF65-F5344CB8AC3E}">
-        <p14:creationId xmlns:p14="http://schemas.microsoft.com/office/powerpoint/2010/main" val="2048189376"/>
-      </p:ext>
-    </p:extLst>
-  </p:cSld>
-  <p:clrMapOvr>
-    <a:masterClrMapping/>
-  </p:clrMapOvr>
-</p:sld>
-</file>
-
-<file path=ppt/slides/slide3.xml><?xml version="1.0" encoding="utf-8"?>
-<p:sld xmlns:a="http://schemas.openxmlformats.org/drawingml/2006/main" xmlns:r="http://schemas.openxmlformats.org/officeDocument/2006/relationships" xmlns:p="http://schemas.openxmlformats.org/presentationml/2006/main">
-  <p:cSld>
-    <p:spTree>
-      <p:nvGrpSpPr>
-        <p:cNvPr id="1" name=""/>
-        <p:cNvGrpSpPr/>
-        <p:nvPr/>
-      </p:nvGrpSpPr>
-      <p:grpSpPr>
-        <a:xfrm>
-          <a:off x="0" y="0"/>
-          <a:ext cx="0" cy="0"/>
-          <a:chOff x="0" y="0"/>
-          <a:chExt cx="0" cy="0"/>
-        </a:xfrm>
-      </p:grpSpPr>
-      <p:sp>
-        <p:nvSpPr>
-          <p:cNvPr id="6146" name="Rectangle 2"/>
-          <p:cNvSpPr>
-            <a:spLocks noGrp="1" noChangeArrowheads="1"/>
-          </p:cNvSpPr>
-          <p:nvPr>
-            <p:ph type="title"/>
-            <p:custDataLst>
-              <p:tags r:id="rId1"/>
-            </p:custDataLst>
-          </p:nvPr>
-        </p:nvSpPr>
-        <p:spPr>
-          <a:xfrm>
-            <a:off x="1141413" y="284084"/>
-            <a:ext cx="9905998" cy="620791"/>
-          </a:xfrm>
-        </p:spPr>
-        <p:txBody>
-          <a:bodyPr/>
-          <a:lstStyle/>
-          <a:p>
-            <a:pPr algn="ctr"/>
-            <a:r>
-              <a:rPr lang="en-US" dirty="0"/>
-              <a:t>Lecture 3: TUE. Aug. 29</a:t>
-            </a:r>
-          </a:p>
-        </p:txBody>
-      </p:sp>
-      <p:sp>
-        <p:nvSpPr>
-          <p:cNvPr id="6147" name="Rectangle 3"/>
-          <p:cNvSpPr>
-            <a:spLocks noGrp="1" noChangeArrowheads="1"/>
-          </p:cNvSpPr>
-          <p:nvPr>
-            <p:ph idx="1"/>
-            <p:custDataLst>
-              <p:tags r:id="rId2"/>
-            </p:custDataLst>
-          </p:nvPr>
-        </p:nvSpPr>
-        <p:spPr>
-          <a:xfrm>
-            <a:off x="1141413" y="1123950"/>
-            <a:ext cx="9970724" cy="5149850"/>
-          </a:xfrm>
-        </p:spPr>
-        <p:txBody>
-          <a:bodyPr>
-            <a:normAutofit/>
-          </a:bodyPr>
-          <a:lstStyle/>
-          <a:p>
-            <a:r>
-              <a:rPr lang="en-US" dirty="0"/>
-              <a:t>DMT2 is </a:t>
-            </a:r>
-            <a:r>
-              <a:rPr lang="en-US" b="1" i="1" u="sng" dirty="0"/>
-              <a:t>going to be great</a:t>
-            </a:r>
-            <a:r>
-              <a:rPr lang="en-US" dirty="0"/>
-              <a:t>! Let’s learn a lot of stuff together!</a:t>
-            </a:r>
-          </a:p>
-          <a:p>
-            <a:r>
-              <a:rPr lang="en-US" b="1" i="1" u="sng" dirty="0"/>
-              <a:t>Homework deadlines </a:t>
-            </a:r>
-            <a:r>
-              <a:rPr lang="en-US" dirty="0"/>
-              <a:t>are now set. Let’s glance at the schedule together</a:t>
-            </a:r>
-          </a:p>
-          <a:p>
-            <a:r>
-              <a:rPr lang="en-US" dirty="0"/>
-              <a:t>I solved the programming assignment (I did it)! Definitely don’t start yet. I’m going to change a good number of things about it and give you starter code.</a:t>
-            </a:r>
-          </a:p>
-          <a:p>
-            <a:r>
-              <a:rPr lang="en-US" dirty="0"/>
-              <a:t>You should be able to start the </a:t>
-            </a:r>
-            <a:r>
-              <a:rPr lang="en-US" b="1" i="1" u="sng" dirty="0"/>
-              <a:t>first homework</a:t>
-            </a:r>
-            <a:r>
-              <a:rPr lang="en-US" dirty="0"/>
-              <a:t> after today. </a:t>
-            </a:r>
-            <a:r>
-              <a:rPr lang="en-US" dirty="0" err="1"/>
-              <a:t>Gradescope</a:t>
-            </a:r>
-            <a:r>
-              <a:rPr lang="en-US" dirty="0"/>
-              <a:t> submissions are open. </a:t>
-            </a:r>
-            <a:r>
-              <a:rPr lang="en-US" b="1" i="1" u="sng" dirty="0"/>
-              <a:t>Due date is next Thursday</a:t>
-            </a:r>
-            <a:r>
-              <a:rPr lang="en-US" dirty="0"/>
-              <a:t>!!</a:t>
-            </a:r>
-          </a:p>
-          <a:p>
-            <a:r>
-              <a:rPr lang="en-US" dirty="0"/>
-              <a:t>Office hours info will be posted by tomorrow! Sorry for the delay on this.</a:t>
-            </a:r>
-          </a:p>
-          <a:p>
-            <a:r>
-              <a:rPr lang="en-US" dirty="0"/>
-              <a:t>Today we will quickly review proof techniques and maybe start reviewing cardinality.</a:t>
-            </a:r>
-          </a:p>
-        </p:txBody>
-      </p:sp>
-      <p:sp>
-        <p:nvSpPr>
-          <p:cNvPr id="4" name="Slide Number Placeholder 3"/>
-          <p:cNvSpPr>
-            <a:spLocks noGrp="1"/>
-          </p:cNvSpPr>
-          <p:nvPr>
-            <p:ph type="sldNum" sz="quarter" idx="12"/>
-          </p:nvPr>
-        </p:nvSpPr>
-        <p:spPr/>
-        <p:txBody>
-          <a:bodyPr/>
-          <a:lstStyle/>
-          <a:p>
-            <a:fld id="{F26D9103-0C5C-48AC-B68E-3ED2C1647047}" type="slidenum">
-              <a:rPr lang="en-US" smtClean="0"/>
-              <a:pPr/>
-              <a:t>3</a:t>
-            </a:fld>
-            <a:endParaRPr lang="en-US" dirty="0"/>
-          </a:p>
-        </p:txBody>
-      </p:sp>
-    </p:spTree>
-    <p:extLst>
-      <p:ext uri="{BB962C8B-B14F-4D97-AF65-F5344CB8AC3E}">
-        <p14:creationId xmlns:p14="http://schemas.microsoft.com/office/powerpoint/2010/main" val="3010318466"/>
-      </p:ext>
-    </p:extLst>
-  </p:cSld>
-  <p:clrMapOvr>
-    <a:masterClrMapping/>
-  </p:clrMapOvr>
-</p:sld>
-</file>
-
-<file path=ppt/slides/slide4.xml><?xml version="1.0" encoding="utf-8"?>
-<p:sld xmlns:a="http://schemas.openxmlformats.org/drawingml/2006/main" xmlns:r="http://schemas.openxmlformats.org/officeDocument/2006/relationships" xmlns:p="http://schemas.openxmlformats.org/presentationml/2006/main">
-  <p:cSld>
-    <p:spTree>
-      <p:nvGrpSpPr>
-        <p:cNvPr id="1" name=""/>
-        <p:cNvGrpSpPr/>
-        <p:nvPr/>
-      </p:nvGrpSpPr>
-      <p:grpSpPr>
-        <a:xfrm>
-          <a:off x="0" y="0"/>
-          <a:ext cx="0" cy="0"/>
-          <a:chOff x="0" y="0"/>
-          <a:chExt cx="0" cy="0"/>
-        </a:xfrm>
-      </p:grpSpPr>
-      <p:sp>
-        <p:nvSpPr>
-          <p:cNvPr id="6146" name="Rectangle 2"/>
-          <p:cNvSpPr>
-            <a:spLocks noGrp="1" noChangeArrowheads="1"/>
-          </p:cNvSpPr>
-          <p:nvPr>
-            <p:ph type="title"/>
-            <p:custDataLst>
-              <p:tags r:id="rId1"/>
-            </p:custDataLst>
-          </p:nvPr>
-        </p:nvSpPr>
-        <p:spPr>
-          <a:xfrm>
-            <a:off x="1141413" y="284084"/>
-            <a:ext cx="9905998" cy="620791"/>
-          </a:xfrm>
-        </p:spPr>
-        <p:txBody>
-          <a:bodyPr/>
-          <a:lstStyle/>
-          <a:p>
-            <a:pPr algn="ctr"/>
-            <a:r>
-              <a:rPr lang="en-US" dirty="0"/>
-              <a:t>Lecture 4: Thu. Aug. 31</a:t>
-            </a:r>
-          </a:p>
-        </p:txBody>
-      </p:sp>
-      <p:sp>
-        <p:nvSpPr>
-          <p:cNvPr id="6147" name="Rectangle 3"/>
-          <p:cNvSpPr>
-            <a:spLocks noGrp="1" noChangeArrowheads="1"/>
-          </p:cNvSpPr>
-          <p:nvPr>
-            <p:ph idx="1"/>
-            <p:custDataLst>
-              <p:tags r:id="rId2"/>
-            </p:custDataLst>
-          </p:nvPr>
-        </p:nvSpPr>
-        <p:spPr>
-          <a:xfrm>
-            <a:off x="1141413" y="1123950"/>
-            <a:ext cx="9970724" cy="5149850"/>
-          </a:xfrm>
-        </p:spPr>
-        <p:txBody>
-          <a:bodyPr>
-            <a:normAutofit/>
-          </a:bodyPr>
-          <a:lstStyle/>
-          <a:p>
-            <a:r>
-              <a:rPr lang="en-US" dirty="0"/>
-              <a:t>DMT2 is </a:t>
-            </a:r>
-            <a:r>
-              <a:rPr lang="en-US" b="1" i="1" u="sng" dirty="0"/>
-              <a:t>going to be great</a:t>
-            </a:r>
-            <a:r>
-              <a:rPr lang="en-US" dirty="0"/>
-              <a:t>! Let’s learn a lot of stuff together!</a:t>
-            </a:r>
-          </a:p>
-          <a:p>
-            <a:r>
-              <a:rPr lang="en-US" dirty="0"/>
-              <a:t>Programming challenge has been updated and posted (if you want to take a glance at what to expect).</a:t>
-            </a:r>
-          </a:p>
-          <a:p>
-            <a:r>
-              <a:rPr lang="en-US" dirty="0"/>
-              <a:t>You should be able to start the </a:t>
-            </a:r>
-            <a:r>
-              <a:rPr lang="en-US" b="1" i="1" u="sng" dirty="0"/>
-              <a:t>first homework</a:t>
-            </a:r>
-            <a:r>
-              <a:rPr lang="en-US" dirty="0"/>
-              <a:t> now. </a:t>
-            </a:r>
-            <a:r>
-              <a:rPr lang="en-US" dirty="0" err="1"/>
-              <a:t>Gradescope</a:t>
-            </a:r>
-            <a:r>
-              <a:rPr lang="en-US" dirty="0"/>
-              <a:t> submissions are open. </a:t>
-            </a:r>
-            <a:r>
-              <a:rPr lang="en-US" b="1" i="1" u="sng" dirty="0"/>
-              <a:t>Due date is next Thursday</a:t>
-            </a:r>
-            <a:r>
-              <a:rPr lang="en-US" dirty="0"/>
-              <a:t>!!</a:t>
-            </a:r>
-          </a:p>
-          <a:p>
-            <a:r>
-              <a:rPr lang="en-US" dirty="0"/>
-              <a:t>Homework 2 (set cardinality) is due two weeks after that.</a:t>
-            </a:r>
-          </a:p>
-          <a:p>
-            <a:r>
-              <a:rPr lang="en-US" dirty="0"/>
-              <a:t>Office hours info has been posted and begins Friday!!</a:t>
-            </a:r>
-          </a:p>
-          <a:p>
-            <a:r>
-              <a:rPr lang="en-US" dirty="0"/>
-              <a:t>Today we will finish set cardinality, be done with “review” and start module 2 (the regular languages).</a:t>
-            </a:r>
-          </a:p>
-        </p:txBody>
-      </p:sp>
-      <p:sp>
-        <p:nvSpPr>
-          <p:cNvPr id="4" name="Slide Number Placeholder 3"/>
-          <p:cNvSpPr>
-            <a:spLocks noGrp="1"/>
-          </p:cNvSpPr>
-          <p:nvPr>
-            <p:ph type="sldNum" sz="quarter" idx="12"/>
-          </p:nvPr>
-        </p:nvSpPr>
-        <p:spPr/>
-        <p:txBody>
-          <a:bodyPr/>
-          <a:lstStyle/>
-          <a:p>
-            <a:fld id="{F26D9103-0C5C-48AC-B68E-3ED2C1647047}" type="slidenum">
-              <a:rPr lang="en-US" smtClean="0"/>
-              <a:pPr/>
-              <a:t>4</a:t>
-            </a:fld>
-            <a:endParaRPr lang="en-US" dirty="0"/>
-          </a:p>
-        </p:txBody>
-      </p:sp>
-    </p:spTree>
-    <p:extLst>
-      <p:ext uri="{BB962C8B-B14F-4D97-AF65-F5344CB8AC3E}">
-        <p14:creationId xmlns:p14="http://schemas.microsoft.com/office/powerpoint/2010/main" val="3796903016"/>
-      </p:ext>
-    </p:extLst>
-  </p:cSld>
-  <p:clrMapOvr>
-    <a:masterClrMapping/>
-  </p:clrMapOvr>
-</p:sld>
-</file>
-
-<file path=ppt/slides/slide5.xml><?xml version="1.0" encoding="utf-8"?>
-<p:sld xmlns:a="http://schemas.openxmlformats.org/drawingml/2006/main" xmlns:r="http://schemas.openxmlformats.org/officeDocument/2006/relationships" xmlns:p="http://schemas.openxmlformats.org/presentationml/2006/main">
-  <p:cSld>
-    <p:spTree>
-      <p:nvGrpSpPr>
-        <p:cNvPr id="1" name=""/>
-        <p:cNvGrpSpPr/>
-        <p:nvPr/>
-      </p:nvGrpSpPr>
-      <p:grpSpPr>
-        <a:xfrm>
-          <a:off x="0" y="0"/>
-          <a:ext cx="0" cy="0"/>
-          <a:chOff x="0" y="0"/>
-          <a:chExt cx="0" cy="0"/>
-        </a:xfrm>
-      </p:grpSpPr>
-      <p:sp>
-        <p:nvSpPr>
-          <p:cNvPr id="6146" name="Rectangle 2"/>
-          <p:cNvSpPr>
-            <a:spLocks noGrp="1" noChangeArrowheads="1"/>
-          </p:cNvSpPr>
-          <p:nvPr>
-            <p:ph type="title"/>
-            <p:custDataLst>
-              <p:tags r:id="rId1"/>
-            </p:custDataLst>
-          </p:nvPr>
-        </p:nvSpPr>
-        <p:spPr>
-          <a:xfrm>
-            <a:off x="1141413" y="284084"/>
-            <a:ext cx="9905998" cy="620791"/>
-          </a:xfrm>
-        </p:spPr>
-        <p:txBody>
-          <a:bodyPr/>
-          <a:lstStyle/>
-          <a:p>
-            <a:pPr algn="ctr"/>
-            <a:r>
-              <a:rPr lang="en-US" dirty="0"/>
-              <a:t>Lecture 5: TUE. Sep. 5</a:t>
-            </a:r>
-          </a:p>
-        </p:txBody>
-      </p:sp>
-      <p:sp>
-        <p:nvSpPr>
-          <p:cNvPr id="6147" name="Rectangle 3"/>
-          <p:cNvSpPr>
-            <a:spLocks noGrp="1" noChangeArrowheads="1"/>
-          </p:cNvSpPr>
-          <p:nvPr>
-            <p:ph idx="1"/>
-            <p:custDataLst>
-              <p:tags r:id="rId2"/>
-            </p:custDataLst>
-          </p:nvPr>
-        </p:nvSpPr>
-        <p:spPr>
-          <a:xfrm>
-            <a:off x="1141413" y="1123950"/>
-            <a:ext cx="9970724" cy="5149850"/>
-          </a:xfrm>
-        </p:spPr>
-        <p:txBody>
-          <a:bodyPr>
-            <a:normAutofit/>
-          </a:bodyPr>
-          <a:lstStyle/>
-          <a:p>
-            <a:r>
-              <a:rPr lang="en-US" dirty="0"/>
-              <a:t>DMT2 is </a:t>
-            </a:r>
-            <a:r>
-              <a:rPr lang="en-US" b="1" i="1" u="sng" dirty="0"/>
-              <a:t>going to be great</a:t>
-            </a:r>
-            <a:r>
-              <a:rPr lang="en-US" dirty="0"/>
-              <a:t>! Let’s learn a lot of stuff together!</a:t>
-            </a:r>
-          </a:p>
-          <a:p>
-            <a:r>
-              <a:rPr lang="en-US" dirty="0"/>
-              <a:t>You should be able to finish the </a:t>
-            </a:r>
-            <a:r>
-              <a:rPr lang="en-US" b="1" i="1" u="sng" dirty="0"/>
-              <a:t>first homework</a:t>
-            </a:r>
-            <a:r>
-              <a:rPr lang="en-US" dirty="0"/>
-              <a:t> now. </a:t>
-            </a:r>
-            <a:r>
-              <a:rPr lang="en-US" dirty="0" err="1"/>
-              <a:t>Gradescope</a:t>
-            </a:r>
-            <a:r>
-              <a:rPr lang="en-US" dirty="0"/>
-              <a:t> submissions are open. </a:t>
-            </a:r>
-            <a:r>
-              <a:rPr lang="en-US" b="1" i="1" u="sng" dirty="0"/>
-              <a:t>Due date is this Thursday</a:t>
-            </a:r>
-            <a:r>
-              <a:rPr lang="en-US" dirty="0"/>
-              <a:t>!!</a:t>
-            </a:r>
-          </a:p>
-          <a:p>
-            <a:r>
-              <a:rPr lang="en-US" dirty="0"/>
-              <a:t>Extension form is available on </a:t>
-            </a:r>
-            <a:r>
-              <a:rPr lang="en-US" dirty="0" err="1"/>
-              <a:t>homeworks</a:t>
-            </a:r>
-            <a:r>
-              <a:rPr lang="en-US" dirty="0"/>
-              <a:t> page if you need it.</a:t>
-            </a:r>
-          </a:p>
-          <a:p>
-            <a:r>
-              <a:rPr lang="en-US" dirty="0"/>
-              <a:t>Check Piazza for a couple key clarifications on the homework problems!!</a:t>
-            </a:r>
-          </a:p>
-          <a:p>
-            <a:r>
-              <a:rPr lang="en-US" dirty="0"/>
-              <a:t>HW 2 (set cardinality) is due two Thursdays from now (FYI). </a:t>
-            </a:r>
-          </a:p>
-          <a:p>
-            <a:r>
-              <a:rPr lang="en-US" dirty="0"/>
-              <a:t>Office hours info has been posted and has begun. Any issues so far?</a:t>
-            </a:r>
-          </a:p>
-          <a:p>
-            <a:r>
-              <a:rPr lang="en-US" dirty="0"/>
-              <a:t>Today we start DMT2 properly with module 2: Regular languages!!</a:t>
-            </a:r>
-          </a:p>
-        </p:txBody>
-      </p:sp>
-      <p:sp>
-        <p:nvSpPr>
-          <p:cNvPr id="4" name="Slide Number Placeholder 3"/>
-          <p:cNvSpPr>
-            <a:spLocks noGrp="1"/>
-          </p:cNvSpPr>
-          <p:nvPr>
-            <p:ph type="sldNum" sz="quarter" idx="12"/>
-          </p:nvPr>
-        </p:nvSpPr>
-        <p:spPr/>
-        <p:txBody>
-          <a:bodyPr/>
-          <a:lstStyle/>
-          <a:p>
-            <a:fld id="{F26D9103-0C5C-48AC-B68E-3ED2C1647047}" type="slidenum">
-              <a:rPr lang="en-US" smtClean="0"/>
-              <a:pPr/>
-              <a:t>5</a:t>
-            </a:fld>
-            <a:endParaRPr lang="en-US" dirty="0"/>
-          </a:p>
-        </p:txBody>
-      </p:sp>
-    </p:spTree>
-    <p:extLst>
-      <p:ext uri="{BB962C8B-B14F-4D97-AF65-F5344CB8AC3E}">
-        <p14:creationId xmlns:p14="http://schemas.microsoft.com/office/powerpoint/2010/main" val="2216701020"/>
-      </p:ext>
-    </p:extLst>
-  </p:cSld>
-  <p:clrMapOvr>
-    <a:masterClrMapping/>
-  </p:clrMapOvr>
-</p:sld>
-</file>
-
-<file path=ppt/slides/slide6.xml><?xml version="1.0" encoding="utf-8"?>
-<p:sld xmlns:a="http://schemas.openxmlformats.org/drawingml/2006/main" xmlns:r="http://schemas.openxmlformats.org/officeDocument/2006/relationships" xmlns:p="http://schemas.openxmlformats.org/presentationml/2006/main">
-  <p:cSld>
-    <p:spTree>
-      <p:nvGrpSpPr>
-        <p:cNvPr id="1" name=""/>
-        <p:cNvGrpSpPr/>
-        <p:nvPr/>
-      </p:nvGrpSpPr>
-      <p:grpSpPr>
-        <a:xfrm>
-          <a:off x="0" y="0"/>
-          <a:ext cx="0" cy="0"/>
-          <a:chOff x="0" y="0"/>
-          <a:chExt cx="0" cy="0"/>
-        </a:xfrm>
-      </p:grpSpPr>
-      <p:sp>
-        <p:nvSpPr>
-          <p:cNvPr id="6146" name="Rectangle 2"/>
-          <p:cNvSpPr>
-            <a:spLocks noGrp="1" noChangeArrowheads="1"/>
-          </p:cNvSpPr>
-          <p:nvPr>
-            <p:ph type="title"/>
-            <p:custDataLst>
-              <p:tags r:id="rId1"/>
-            </p:custDataLst>
-          </p:nvPr>
-        </p:nvSpPr>
-        <p:spPr>
-          <a:xfrm>
-            <a:off x="1141413" y="284084"/>
-            <a:ext cx="9905998" cy="620791"/>
-          </a:xfrm>
-        </p:spPr>
-        <p:txBody>
-          <a:bodyPr/>
-          <a:lstStyle/>
-          <a:p>
-            <a:pPr algn="ctr"/>
-            <a:r>
-              <a:rPr lang="en-US" dirty="0"/>
-              <a:t>Lecture 6: Thu. Sep. 7</a:t>
-            </a:r>
-          </a:p>
-        </p:txBody>
-      </p:sp>
-      <p:sp>
-        <p:nvSpPr>
-          <p:cNvPr id="6147" name="Rectangle 3"/>
-          <p:cNvSpPr>
-            <a:spLocks noGrp="1" noChangeArrowheads="1"/>
-          </p:cNvSpPr>
-          <p:nvPr>
-            <p:ph idx="1"/>
-            <p:custDataLst>
-              <p:tags r:id="rId2"/>
-            </p:custDataLst>
-          </p:nvPr>
-        </p:nvSpPr>
-        <p:spPr>
-          <a:xfrm>
-            <a:off x="1141413" y="1123950"/>
-            <a:ext cx="9970724" cy="5149850"/>
-          </a:xfrm>
-        </p:spPr>
-        <p:txBody>
-          <a:bodyPr>
-            <a:normAutofit/>
-          </a:bodyPr>
-          <a:lstStyle/>
-          <a:p>
-            <a:r>
-              <a:rPr lang="en-US" dirty="0"/>
-              <a:t>DMT2 is </a:t>
-            </a:r>
-            <a:r>
-              <a:rPr lang="en-US" b="1" i="1" u="sng" dirty="0"/>
-              <a:t>going to be great</a:t>
-            </a:r>
-            <a:r>
-              <a:rPr lang="en-US" dirty="0"/>
-              <a:t>! Let’s learn a lot of stuff together!</a:t>
-            </a:r>
-          </a:p>
-          <a:p>
-            <a:r>
-              <a:rPr lang="en-US" dirty="0"/>
-              <a:t>First homework assignment is </a:t>
-            </a:r>
-            <a:r>
-              <a:rPr lang="en-US" b="1" i="1" u="sng" dirty="0"/>
-              <a:t>Due tonight</a:t>
-            </a:r>
-            <a:r>
-              <a:rPr lang="en-US" dirty="0"/>
-              <a:t>!!</a:t>
-            </a:r>
-          </a:p>
-          <a:p>
-            <a:r>
-              <a:rPr lang="en-US" dirty="0"/>
-              <a:t>HW 2 (set cardinality) is due two Thursdays from today (FYI). </a:t>
-            </a:r>
-          </a:p>
-          <a:p>
-            <a:r>
-              <a:rPr lang="en-US" dirty="0"/>
-              <a:t>If you submit the homework, we will try to get you some feedback within 1 week.</a:t>
-            </a:r>
-          </a:p>
-          <a:p>
-            <a:r>
-              <a:rPr lang="en-US" dirty="0"/>
-              <a:t>Office hours info has been posted and has begun. Any issues so far?</a:t>
-            </a:r>
-          </a:p>
-          <a:p>
-            <a:r>
-              <a:rPr lang="en-US" dirty="0"/>
-              <a:t>Today we continue with Regular languages!!</a:t>
-            </a:r>
-          </a:p>
-        </p:txBody>
-      </p:sp>
-      <p:sp>
-        <p:nvSpPr>
-          <p:cNvPr id="4" name="Slide Number Placeholder 3"/>
-          <p:cNvSpPr>
-            <a:spLocks noGrp="1"/>
-          </p:cNvSpPr>
-          <p:nvPr>
-            <p:ph type="sldNum" sz="quarter" idx="12"/>
-          </p:nvPr>
-        </p:nvSpPr>
-        <p:spPr/>
-        <p:txBody>
-          <a:bodyPr/>
-          <a:lstStyle/>
-          <a:p>
-            <a:fld id="{F26D9103-0C5C-48AC-B68E-3ED2C1647047}" type="slidenum">
-              <a:rPr lang="en-US" smtClean="0"/>
-              <a:pPr/>
-              <a:t>6</a:t>
-            </a:fld>
-            <a:endParaRPr lang="en-US" dirty="0"/>
-          </a:p>
-        </p:txBody>
-      </p:sp>
-    </p:spTree>
-    <p:extLst>
-      <p:ext uri="{BB962C8B-B14F-4D97-AF65-F5344CB8AC3E}">
-        <p14:creationId xmlns:p14="http://schemas.microsoft.com/office/powerpoint/2010/main" val="2203427674"/>
-      </p:ext>
-    </p:extLst>
-  </p:cSld>
-  <p:clrMapOvr>
-    <a:masterClrMapping/>
-  </p:clrMapOvr>
-</p:sld>
-</file>
-
-<file path=ppt/slides/slide7.xml><?xml version="1.0" encoding="utf-8"?>
-<p:sld xmlns:a="http://schemas.openxmlformats.org/drawingml/2006/main" xmlns:r="http://schemas.openxmlformats.org/officeDocument/2006/relationships" xmlns:p="http://schemas.openxmlformats.org/presentationml/2006/main">
-  <p:cSld>
-    <p:spTree>
-      <p:nvGrpSpPr>
-        <p:cNvPr id="1" name=""/>
-        <p:cNvGrpSpPr/>
-        <p:nvPr/>
-      </p:nvGrpSpPr>
-      <p:grpSpPr>
-        <a:xfrm>
-          <a:off x="0" y="0"/>
-          <a:ext cx="0" cy="0"/>
-          <a:chOff x="0" y="0"/>
-          <a:chExt cx="0" cy="0"/>
-        </a:xfrm>
-      </p:grpSpPr>
-      <p:sp>
-        <p:nvSpPr>
-          <p:cNvPr id="6146" name="Rectangle 2"/>
-          <p:cNvSpPr>
-            <a:spLocks noGrp="1" noChangeArrowheads="1"/>
-          </p:cNvSpPr>
-          <p:nvPr>
-            <p:ph type="title"/>
-            <p:custDataLst>
-              <p:tags r:id="rId1"/>
-            </p:custDataLst>
-          </p:nvPr>
-        </p:nvSpPr>
-        <p:spPr>
-          <a:xfrm>
-            <a:off x="1141413" y="284084"/>
-            <a:ext cx="9905998" cy="620791"/>
-          </a:xfrm>
-        </p:spPr>
-        <p:txBody>
-          <a:bodyPr/>
-          <a:lstStyle/>
-          <a:p>
-            <a:pPr algn="ctr"/>
-            <a:r>
-              <a:rPr lang="en-US" dirty="0"/>
-              <a:t>Lecture 7: TUE. Sep. 12</a:t>
-            </a:r>
-          </a:p>
-        </p:txBody>
-      </p:sp>
-      <p:sp>
-        <p:nvSpPr>
-          <p:cNvPr id="6147" name="Rectangle 3"/>
-          <p:cNvSpPr>
-            <a:spLocks noGrp="1" noChangeArrowheads="1"/>
-          </p:cNvSpPr>
-          <p:nvPr>
-            <p:ph idx="1"/>
-            <p:custDataLst>
-              <p:tags r:id="rId2"/>
-            </p:custDataLst>
-          </p:nvPr>
-        </p:nvSpPr>
-        <p:spPr>
-          <a:xfrm>
-            <a:off x="1141413" y="1123950"/>
-            <a:ext cx="9970724" cy="5149850"/>
-          </a:xfrm>
-        </p:spPr>
-        <p:txBody>
-          <a:bodyPr>
-            <a:normAutofit lnSpcReduction="10000"/>
-          </a:bodyPr>
-          <a:lstStyle/>
-          <a:p>
-            <a:r>
-              <a:rPr lang="en-US" dirty="0"/>
-              <a:t>DMT2 is </a:t>
-            </a:r>
-            <a:r>
-              <a:rPr lang="en-US" b="1" i="1" u="sng" dirty="0"/>
-              <a:t>going to be great</a:t>
-            </a:r>
-            <a:r>
-              <a:rPr lang="en-US" dirty="0"/>
-              <a:t>! Let’s learn a lot of stuff together!</a:t>
-            </a:r>
-          </a:p>
-          <a:p>
-            <a:r>
-              <a:rPr lang="en-US" dirty="0"/>
-              <a:t>First homework assignment is in! It is almost graded. Should have it back to you by Thursday.</a:t>
-            </a:r>
-          </a:p>
-          <a:p>
-            <a:r>
-              <a:rPr lang="en-US" dirty="0"/>
-              <a:t>HW 2 (set cardinality) is due next Thursday. You should be working on it right now.</a:t>
-            </a:r>
-          </a:p>
-          <a:p>
-            <a:r>
-              <a:rPr lang="en-US" dirty="0"/>
-              <a:t>Please submit extensions before the due date. You shouldn’t be requesting the extra time after the deadline has passed. This is supposed to be proactive. We *might* reject your extension request if you don’t submit it before the deadline.</a:t>
-            </a:r>
-          </a:p>
-          <a:p>
-            <a:r>
-              <a:rPr lang="en-US" dirty="0"/>
-              <a:t>Office hours going ok so far? Any issues</a:t>
-            </a:r>
-          </a:p>
-          <a:p>
-            <a:r>
-              <a:rPr lang="en-US" dirty="0"/>
-              <a:t>Today we continue with Regular languages and </a:t>
-            </a:r>
-            <a:r>
-              <a:rPr lang="en-US"/>
-              <a:t>introduce the NFA!</a:t>
-            </a:r>
-            <a:endParaRPr lang="en-US" dirty="0"/>
-          </a:p>
-        </p:txBody>
-      </p:sp>
-      <p:sp>
-        <p:nvSpPr>
-          <p:cNvPr id="4" name="Slide Number Placeholder 3"/>
-          <p:cNvSpPr>
-            <a:spLocks noGrp="1"/>
-          </p:cNvSpPr>
-          <p:nvPr>
-            <p:ph type="sldNum" sz="quarter" idx="12"/>
-          </p:nvPr>
-        </p:nvSpPr>
-        <p:spPr/>
-        <p:txBody>
-          <a:bodyPr/>
-          <a:lstStyle/>
-          <a:p>
-            <a:fld id="{F26D9103-0C5C-48AC-B68E-3ED2C1647047}" type="slidenum">
-              <a:rPr lang="en-US" smtClean="0"/>
-              <a:pPr/>
-              <a:t>7</a:t>
-            </a:fld>
-            <a:endParaRPr lang="en-US" dirty="0"/>
-          </a:p>
-        </p:txBody>
-      </p:sp>
-    </p:spTree>
-    <p:extLst>
-      <p:ext uri="{BB962C8B-B14F-4D97-AF65-F5344CB8AC3E}">
-        <p14:creationId xmlns:p14="http://schemas.microsoft.com/office/powerpoint/2010/main" val="656948532"/>
-      </p:ext>
-    </p:extLst>
-  </p:cSld>
-  <p:clrMapOvr>
-    <a:masterClrMapping/>
-  </p:clrMapOvr>
-</p:sld>
-</file>
-
-<file path=ppt/slides/slide8.xml><?xml version="1.0" encoding="utf-8"?>
-<p:sld xmlns:a="http://schemas.openxmlformats.org/drawingml/2006/main" xmlns:r="http://schemas.openxmlformats.org/officeDocument/2006/relationships" xmlns:p="http://schemas.openxmlformats.org/presentationml/2006/main">
-  <p:cSld>
-    <p:spTree>
-      <p:nvGrpSpPr>
-        <p:cNvPr id="1" name=""/>
-        <p:cNvGrpSpPr/>
-        <p:nvPr/>
-      </p:nvGrpSpPr>
-      <p:grpSpPr>
-        <a:xfrm>
-          <a:off x="0" y="0"/>
-          <a:ext cx="0" cy="0"/>
-          <a:chOff x="0" y="0"/>
-          <a:chExt cx="0" cy="0"/>
-        </a:xfrm>
-      </p:grpSpPr>
-      <p:sp>
-        <p:nvSpPr>
-          <p:cNvPr id="6146" name="Rectangle 2"/>
-          <p:cNvSpPr>
-            <a:spLocks noGrp="1" noChangeArrowheads="1"/>
-          </p:cNvSpPr>
-          <p:nvPr>
-            <p:ph type="title"/>
-            <p:custDataLst>
-              <p:tags r:id="rId1"/>
-            </p:custDataLst>
-          </p:nvPr>
-        </p:nvSpPr>
-        <p:spPr>
-          <a:xfrm>
-            <a:off x="1141413" y="284084"/>
-            <a:ext cx="9905998" cy="620791"/>
-          </a:xfrm>
-        </p:spPr>
-        <p:txBody>
-          <a:bodyPr/>
-          <a:lstStyle/>
-          <a:p>
-            <a:pPr algn="ctr"/>
-            <a:r>
-              <a:rPr lang="en-US" dirty="0"/>
-              <a:t>Lecture 8: Thu. Sep. 14</a:t>
-            </a:r>
-          </a:p>
-        </p:txBody>
-      </p:sp>
-      <p:sp>
-        <p:nvSpPr>
-          <p:cNvPr id="6147" name="Rectangle 3"/>
-          <p:cNvSpPr>
-            <a:spLocks noGrp="1" noChangeArrowheads="1"/>
-          </p:cNvSpPr>
-          <p:nvPr>
-            <p:ph idx="1"/>
-            <p:custDataLst>
-              <p:tags r:id="rId2"/>
-            </p:custDataLst>
-          </p:nvPr>
-        </p:nvSpPr>
-        <p:spPr>
-          <a:xfrm>
-            <a:off x="1141413" y="1123950"/>
-            <a:ext cx="9970724" cy="5149850"/>
-          </a:xfrm>
-        </p:spPr>
-        <p:txBody>
-          <a:bodyPr>
-            <a:normAutofit fontScale="92500"/>
-          </a:bodyPr>
-          <a:lstStyle/>
-          <a:p>
-            <a:r>
-              <a:rPr lang="en-US" dirty="0"/>
-              <a:t>DMT2 is </a:t>
-            </a:r>
-            <a:r>
-              <a:rPr lang="en-US" b="1" i="1" u="sng" dirty="0"/>
-              <a:t>going to be great</a:t>
-            </a:r>
-            <a:r>
-              <a:rPr lang="en-US" dirty="0"/>
-              <a:t>! Let’s learn a lot of stuff together!</a:t>
-            </a:r>
-          </a:p>
-          <a:p>
-            <a:r>
-              <a:rPr lang="en-US" dirty="0"/>
-              <a:t>First </a:t>
-            </a:r>
-            <a:r>
-              <a:rPr lang="en-US" dirty="0" err="1"/>
-              <a:t>hw</a:t>
-            </a:r>
-            <a:r>
-              <a:rPr lang="en-US" dirty="0"/>
-              <a:t> is graded and returned. Some important points:</a:t>
-            </a:r>
-          </a:p>
-          <a:p>
-            <a:pPr lvl="1"/>
-            <a:r>
-              <a:rPr lang="en-US" dirty="0"/>
-              <a:t>We were very lenient on grading. 10/10 does not = your answers were perfect.</a:t>
-            </a:r>
-          </a:p>
-          <a:p>
-            <a:pPr lvl="1"/>
-            <a:r>
-              <a:rPr lang="en-US" dirty="0"/>
-              <a:t>Cannot release solutions because of extensions, but TAs will liberally walk you through model solutions if you want it. You are also welcome to discuss with anyone else at this point.</a:t>
-            </a:r>
-          </a:p>
-          <a:p>
-            <a:r>
-              <a:rPr lang="en-US" dirty="0"/>
-              <a:t>HW 2 (set cardinality) is due next Thursday. You should be working on it right now.</a:t>
-            </a:r>
-          </a:p>
-          <a:p>
-            <a:r>
-              <a:rPr lang="en-US" dirty="0"/>
-              <a:t>Please submit extensions before the due date! Late extension requests might be rejected!</a:t>
-            </a:r>
-          </a:p>
-          <a:p>
-            <a:r>
-              <a:rPr lang="en-US" dirty="0"/>
-              <a:t>Office hours going ok so far? Any issues</a:t>
-            </a:r>
-          </a:p>
-          <a:p>
-            <a:r>
-              <a:rPr lang="en-US" dirty="0"/>
-              <a:t>Today we continue with Regular languages and continue with the NFA!</a:t>
-            </a:r>
-          </a:p>
-        </p:txBody>
-      </p:sp>
-      <p:sp>
-        <p:nvSpPr>
-          <p:cNvPr id="4" name="Slide Number Placeholder 3"/>
-          <p:cNvSpPr>
-            <a:spLocks noGrp="1"/>
-          </p:cNvSpPr>
-          <p:nvPr>
-            <p:ph type="sldNum" sz="quarter" idx="12"/>
-          </p:nvPr>
-        </p:nvSpPr>
-        <p:spPr/>
-        <p:txBody>
-          <a:bodyPr/>
-          <a:lstStyle/>
-          <a:p>
-            <a:fld id="{F26D9103-0C5C-48AC-B68E-3ED2C1647047}" type="slidenum">
-              <a:rPr lang="en-US" smtClean="0"/>
-              <a:pPr/>
-              <a:t>8</a:t>
-            </a:fld>
-            <a:endParaRPr lang="en-US" dirty="0"/>
-          </a:p>
-        </p:txBody>
-      </p:sp>
-    </p:spTree>
-    <p:extLst>
-      <p:ext uri="{BB962C8B-B14F-4D97-AF65-F5344CB8AC3E}">
-        <p14:creationId xmlns:p14="http://schemas.microsoft.com/office/powerpoint/2010/main" val="291119010"/>
-      </p:ext>
-    </p:extLst>
-  </p:cSld>
-  <p:clrMapOvr>
-    <a:masterClrMapping/>
-  </p:clrMapOvr>
-</p:sld>
-</file>
-
-<file path=ppt/slides/slide9.xml><?xml version="1.0" encoding="utf-8"?>
-<p:sld xmlns:a="http://schemas.openxmlformats.org/drawingml/2006/main" xmlns:r="http://schemas.openxmlformats.org/officeDocument/2006/relationships" xmlns:p="http://schemas.openxmlformats.org/presentationml/2006/main">
-  <p:cSld>
-    <p:spTree>
-      <p:nvGrpSpPr>
-        <p:cNvPr id="1" name=""/>
-        <p:cNvGrpSpPr/>
-        <p:nvPr/>
-      </p:nvGrpSpPr>
-      <p:grpSpPr>
-        <a:xfrm>
-          <a:off x="0" y="0"/>
-          <a:ext cx="0" cy="0"/>
-          <a:chOff x="0" y="0"/>
-          <a:chExt cx="0" cy="0"/>
-        </a:xfrm>
-      </p:grpSpPr>
-      <p:sp>
-        <p:nvSpPr>
-          <p:cNvPr id="6146" name="Rectangle 2"/>
-          <p:cNvSpPr>
-            <a:spLocks noGrp="1" noChangeArrowheads="1"/>
-          </p:cNvSpPr>
-          <p:nvPr>
-            <p:ph type="title"/>
-            <p:custDataLst>
-              <p:tags r:id="rId1"/>
-            </p:custDataLst>
-          </p:nvPr>
-        </p:nvSpPr>
-        <p:spPr>
-          <a:xfrm>
-            <a:off x="1141413" y="284084"/>
-            <a:ext cx="9905998" cy="620791"/>
-          </a:xfrm>
-        </p:spPr>
-        <p:txBody>
-          <a:bodyPr/>
-          <a:lstStyle/>
-          <a:p>
-            <a:pPr algn="ctr"/>
-            <a:r>
-              <a:rPr lang="en-US" dirty="0"/>
-              <a:t>Lecture 9: Tue. Sep. 19</a:t>
-            </a:r>
-          </a:p>
-        </p:txBody>
-      </p:sp>
-      <p:sp>
-        <p:nvSpPr>
-          <p:cNvPr id="6147" name="Rectangle 3"/>
-          <p:cNvSpPr>
-            <a:spLocks noGrp="1" noChangeArrowheads="1"/>
-          </p:cNvSpPr>
-          <p:nvPr>
-            <p:ph idx="1"/>
-            <p:custDataLst>
-              <p:tags r:id="rId2"/>
-            </p:custDataLst>
-          </p:nvPr>
-        </p:nvSpPr>
-        <p:spPr>
-          <a:xfrm>
-            <a:off x="1141413" y="1123950"/>
-            <a:ext cx="9970724" cy="5149850"/>
-          </a:xfrm>
-        </p:spPr>
-        <p:txBody>
-          <a:bodyPr>
-            <a:normAutofit/>
-          </a:bodyPr>
-          <a:lstStyle/>
-          <a:p>
-            <a:r>
-              <a:rPr lang="en-US" dirty="0"/>
-              <a:t>DMT2 is </a:t>
-            </a:r>
-            <a:r>
-              <a:rPr lang="en-US" b="1" i="1" u="sng" dirty="0"/>
-              <a:t>going to be great</a:t>
-            </a:r>
-            <a:r>
-              <a:rPr lang="en-US" dirty="0"/>
-              <a:t>! Let’s learn a lot of stuff together!</a:t>
-            </a:r>
-          </a:p>
-          <a:p>
-            <a:r>
-              <a:rPr lang="en-US" dirty="0"/>
-              <a:t>First </a:t>
-            </a:r>
-            <a:r>
-              <a:rPr lang="en-US" dirty="0" err="1"/>
-              <a:t>hw</a:t>
-            </a:r>
-            <a:r>
-              <a:rPr lang="en-US" dirty="0"/>
-              <a:t> is graded and returned. Some important points:</a:t>
-            </a:r>
-          </a:p>
-          <a:p>
-            <a:pPr lvl="1"/>
-            <a:r>
-              <a:rPr lang="en-US" dirty="0"/>
-              <a:t>Regrades available for a bit if you need them (check </a:t>
-            </a:r>
-            <a:r>
-              <a:rPr lang="en-US" dirty="0" err="1"/>
-              <a:t>Gradescope</a:t>
-            </a:r>
-            <a:r>
-              <a:rPr lang="en-US" dirty="0"/>
-              <a:t> for dates)</a:t>
-            </a:r>
-          </a:p>
-          <a:p>
-            <a:r>
-              <a:rPr lang="en-US" dirty="0"/>
-              <a:t>HW 2 (set cardinality) is due this Thursday!!</a:t>
-            </a:r>
-          </a:p>
-          <a:p>
-            <a:r>
-              <a:rPr lang="en-US" dirty="0"/>
-              <a:t>Please submit extensions before the due date! Late extension requests might be rejected!</a:t>
-            </a:r>
-          </a:p>
-          <a:p>
-            <a:r>
-              <a:rPr lang="en-US" dirty="0"/>
-              <a:t>Office hours going ok so far? Any issues</a:t>
-            </a:r>
-          </a:p>
-          <a:p>
-            <a:r>
-              <a:rPr lang="en-US" dirty="0"/>
-              <a:t>Today we continue with Regular languages! Will likely finish module 2 this week…</a:t>
-            </a:r>
-          </a:p>
-        </p:txBody>
-      </p:sp>
-      <p:sp>
-        <p:nvSpPr>
-          <p:cNvPr id="4" name="Slide Number Placeholder 3"/>
-          <p:cNvSpPr>
-            <a:spLocks noGrp="1"/>
-          </p:cNvSpPr>
-          <p:nvPr>
-            <p:ph type="sldNum" sz="quarter" idx="12"/>
-          </p:nvPr>
-        </p:nvSpPr>
-        <p:spPr/>
-        <p:txBody>
-          <a:bodyPr/>
-          <a:lstStyle/>
-          <a:p>
-            <a:fld id="{F26D9103-0C5C-48AC-B68E-3ED2C1647047}" type="slidenum">
-              <a:rPr lang="en-US" smtClean="0"/>
-              <a:pPr/>
-              <a:t>9</a:t>
-            </a:fld>
-            <a:endParaRPr lang="en-US" dirty="0"/>
-          </a:p>
-        </p:txBody>
-      </p:sp>
-    </p:spTree>
-    <p:extLst>
-      <p:ext uri="{BB962C8B-B14F-4D97-AF65-F5344CB8AC3E}">
-        <p14:creationId xmlns:p14="http://schemas.microsoft.com/office/powerpoint/2010/main" val="2233302514"/>
-      </p:ext>
-    </p:extLst>
-  </p:cSld>
-  <p:clrMapOvr>
-    <a:masterClrMapping/>
-  </p:clrMapOvr>
-</p:sld>
-</file>
-
 <file path=ppt/tags/tag1.xml><?xml version="1.0" encoding="utf-8"?>
 <p:tagLst xmlns:a="http://schemas.openxmlformats.org/drawingml/2006/main" xmlns:r="http://schemas.openxmlformats.org/officeDocument/2006/relationships" xmlns:p="http://schemas.openxmlformats.org/presentationml/2006/main">
   <p:tag name="_INSTRUCTOR VIEW19C14C36-AC8E-43BC-9DB6-C2AAF774C7DC|PANE__TAG" val="_"/>
 </p:tagLst>
 </file>
 
-<file path=ppt/tags/tag10.xml><?xml version="1.0" encoding="utf-8"?>
-<p:tagLst xmlns:a="http://schemas.openxmlformats.org/drawingml/2006/main" xmlns:r="http://schemas.openxmlformats.org/officeDocument/2006/relationships" xmlns:p="http://schemas.openxmlformats.org/presentationml/2006/main">
-  <p:tag name="_INSTRUCTOR VIEW19C14C36-AC8E-43BC-9DB6-C2AAF774C7DC|PANE__TAG" val="_"/>
-</p:tagLst>
-</file>
-
-<file path=ppt/tags/tag11.xml><?xml version="1.0" encoding="utf-8"?>
-<p:tagLst xmlns:a="http://schemas.openxmlformats.org/drawingml/2006/main" xmlns:r="http://schemas.openxmlformats.org/officeDocument/2006/relationships" xmlns:p="http://schemas.openxmlformats.org/presentationml/2006/main">
-  <p:tag name="_INSTRUCTOR VIEW19C14C36-AC8E-43BC-9DB6-C2AAF774C7DC|PANE__TAG" val="_"/>
-</p:tagLst>
-</file>
-
-<file path=ppt/tags/tag12.xml><?xml version="1.0" encoding="utf-8"?>
-<p:tagLst xmlns:a="http://schemas.openxmlformats.org/drawingml/2006/main" xmlns:r="http://schemas.openxmlformats.org/officeDocument/2006/relationships" xmlns:p="http://schemas.openxmlformats.org/presentationml/2006/main">
-  <p:tag name="_INSTRUCTOR VIEW19C14C36-AC8E-43BC-9DB6-C2AAF774C7DC|PANE__TAG" val="_"/>
-</p:tagLst>
-</file>
-
-<file path=ppt/tags/tag13.xml><?xml version="1.0" encoding="utf-8"?>
-<p:tagLst xmlns:a="http://schemas.openxmlformats.org/drawingml/2006/main" xmlns:r="http://schemas.openxmlformats.org/officeDocument/2006/relationships" xmlns:p="http://schemas.openxmlformats.org/presentationml/2006/main">
-  <p:tag name="_INSTRUCTOR VIEW19C14C36-AC8E-43BC-9DB6-C2AAF774C7DC|PANE__TAG" val="_"/>
-</p:tagLst>
-</file>
-
-<file path=ppt/tags/tag14.xml><?xml version="1.0" encoding="utf-8"?>
-<p:tagLst xmlns:a="http://schemas.openxmlformats.org/drawingml/2006/main" xmlns:r="http://schemas.openxmlformats.org/officeDocument/2006/relationships" xmlns:p="http://schemas.openxmlformats.org/presentationml/2006/main">
-  <p:tag name="_INSTRUCTOR VIEW19C14C36-AC8E-43BC-9DB6-C2AAF774C7DC|PANE__TAG" val="_"/>
-</p:tagLst>
-</file>
-
-<file path=ppt/tags/tag15.xml><?xml version="1.0" encoding="utf-8"?>
-<p:tagLst xmlns:a="http://schemas.openxmlformats.org/drawingml/2006/main" xmlns:r="http://schemas.openxmlformats.org/officeDocument/2006/relationships" xmlns:p="http://schemas.openxmlformats.org/presentationml/2006/main">
-  <p:tag name="_INSTRUCTOR VIEW19C14C36-AC8E-43BC-9DB6-C2AAF774C7DC|PANE__TAG" val="_"/>
-</p:tagLst>
-</file>
-
-<file path=ppt/tags/tag16.xml><?xml version="1.0" encoding="utf-8"?>
-<p:tagLst xmlns:a="http://schemas.openxmlformats.org/drawingml/2006/main" xmlns:r="http://schemas.openxmlformats.org/officeDocument/2006/relationships" xmlns:p="http://schemas.openxmlformats.org/presentationml/2006/main">
-  <p:tag name="_INSTRUCTOR VIEW19C14C36-AC8E-43BC-9DB6-C2AAF774C7DC|PANE__TAG" val="_"/>
-</p:tagLst>
-</file>
-
-<file path=ppt/tags/tag17.xml><?xml version="1.0" encoding="utf-8"?>
-<p:tagLst xmlns:a="http://schemas.openxmlformats.org/drawingml/2006/main" xmlns:r="http://schemas.openxmlformats.org/officeDocument/2006/relationships" xmlns:p="http://schemas.openxmlformats.org/presentationml/2006/main">
-  <p:tag name="_INSTRUCTOR VIEW19C14C36-AC8E-43BC-9DB6-C2AAF774C7DC|PANE__TAG" val="_"/>
-</p:tagLst>
-</file>
-
-<file path=ppt/tags/tag18.xml><?xml version="1.0" encoding="utf-8"?>
-<p:tagLst xmlns:a="http://schemas.openxmlformats.org/drawingml/2006/main" xmlns:r="http://schemas.openxmlformats.org/officeDocument/2006/relationships" xmlns:p="http://schemas.openxmlformats.org/presentationml/2006/main">
-  <p:tag name="_INSTRUCTOR VIEW19C14C36-AC8E-43BC-9DB6-C2AAF774C7DC|PANE__TAG" val="_"/>
-</p:tagLst>
-</file>
-
-<file path=ppt/tags/tag19.xml><?xml version="1.0" encoding="utf-8"?>
-<p:tagLst xmlns:a="http://schemas.openxmlformats.org/drawingml/2006/main" xmlns:r="http://schemas.openxmlformats.org/officeDocument/2006/relationships" xmlns:p="http://schemas.openxmlformats.org/presentationml/2006/main">
-  <p:tag name="_INSTRUCTOR VIEW19C14C36-AC8E-43BC-9DB6-C2AAF774C7DC|PANE__TAG" val="_"/>
-</p:tagLst>
-</file>
-
 <file path=ppt/tags/tag2.xml><?xml version="1.0" encoding="utf-8"?>
-<p:tagLst xmlns:a="http://schemas.openxmlformats.org/drawingml/2006/main" xmlns:r="http://schemas.openxmlformats.org/officeDocument/2006/relationships" xmlns:p="http://schemas.openxmlformats.org/presentationml/2006/main">
-  <p:tag name="_INSTRUCTOR VIEW19C14C36-AC8E-43BC-9DB6-C2AAF774C7DC|PANE__TAG" val="_"/>
-</p:tagLst>
-</file>
-
-<file path=ppt/tags/tag20.xml><?xml version="1.0" encoding="utf-8"?>
-<p:tagLst xmlns:a="http://schemas.openxmlformats.org/drawingml/2006/main" xmlns:r="http://schemas.openxmlformats.org/officeDocument/2006/relationships" xmlns:p="http://schemas.openxmlformats.org/presentationml/2006/main">
-  <p:tag name="_INSTRUCTOR VIEW19C14C36-AC8E-43BC-9DB6-C2AAF774C7DC|PANE__TAG" val="_"/>
-</p:tagLst>
-</file>
-
-<file path=ppt/tags/tag21.xml><?xml version="1.0" encoding="utf-8"?>
-<p:tagLst xmlns:a="http://schemas.openxmlformats.org/drawingml/2006/main" xmlns:r="http://schemas.openxmlformats.org/officeDocument/2006/relationships" xmlns:p="http://schemas.openxmlformats.org/presentationml/2006/main">
-  <p:tag name="_INSTRUCTOR VIEW19C14C36-AC8E-43BC-9DB6-C2AAF774C7DC|PANE__TAG" val="_"/>
-</p:tagLst>
-</file>
-
-<file path=ppt/tags/tag22.xml><?xml version="1.0" encoding="utf-8"?>
-<p:tagLst xmlns:a="http://schemas.openxmlformats.org/drawingml/2006/main" xmlns:r="http://schemas.openxmlformats.org/officeDocument/2006/relationships" xmlns:p="http://schemas.openxmlformats.org/presentationml/2006/main">
-  <p:tag name="_INSTRUCTOR VIEW19C14C36-AC8E-43BC-9DB6-C2AAF774C7DC|PANE__TAG" val="_"/>
-</p:tagLst>
-</file>
-
-<file path=ppt/tags/tag23.xml><?xml version="1.0" encoding="utf-8"?>
-<p:tagLst xmlns:a="http://schemas.openxmlformats.org/drawingml/2006/main" xmlns:r="http://schemas.openxmlformats.org/officeDocument/2006/relationships" xmlns:p="http://schemas.openxmlformats.org/presentationml/2006/main">
-  <p:tag name="_INSTRUCTOR VIEW19C14C36-AC8E-43BC-9DB6-C2AAF774C7DC|PANE__TAG" val="_"/>
-</p:tagLst>
-</file>
-
-<file path=ppt/tags/tag24.xml><?xml version="1.0" encoding="utf-8"?>
-<p:tagLst xmlns:a="http://schemas.openxmlformats.org/drawingml/2006/main" xmlns:r="http://schemas.openxmlformats.org/officeDocument/2006/relationships" xmlns:p="http://schemas.openxmlformats.org/presentationml/2006/main">
-  <p:tag name="_INSTRUCTOR VIEW19C14C36-AC8E-43BC-9DB6-C2AAF774C7DC|PANE__TAG" val="_"/>
-</p:tagLst>
-</file>
-
-<file path=ppt/tags/tag25.xml><?xml version="1.0" encoding="utf-8"?>
-<p:tagLst xmlns:a="http://schemas.openxmlformats.org/drawingml/2006/main" xmlns:r="http://schemas.openxmlformats.org/officeDocument/2006/relationships" xmlns:p="http://schemas.openxmlformats.org/presentationml/2006/main">
-  <p:tag name="_INSTRUCTOR VIEW19C14C36-AC8E-43BC-9DB6-C2AAF774C7DC|PANE__TAG" val="_"/>
-</p:tagLst>
-</file>
-
-<file path=ppt/tags/tag26.xml><?xml version="1.0" encoding="utf-8"?>
-<p:tagLst xmlns:a="http://schemas.openxmlformats.org/drawingml/2006/main" xmlns:r="http://schemas.openxmlformats.org/officeDocument/2006/relationships" xmlns:p="http://schemas.openxmlformats.org/presentationml/2006/main">
-  <p:tag name="_INSTRUCTOR VIEW19C14C36-AC8E-43BC-9DB6-C2AAF774C7DC|PANE__TAG" val="_"/>
-</p:tagLst>
-</file>
-
-<file path=ppt/tags/tag27.xml><?xml version="1.0" encoding="utf-8"?>
-<p:tagLst xmlns:a="http://schemas.openxmlformats.org/drawingml/2006/main" xmlns:r="http://schemas.openxmlformats.org/officeDocument/2006/relationships" xmlns:p="http://schemas.openxmlformats.org/presentationml/2006/main">
-  <p:tag name="_INSTRUCTOR VIEW19C14C36-AC8E-43BC-9DB6-C2AAF774C7DC|PANE__TAG" val="_"/>
-</p:tagLst>
-</file>
-
-<file path=ppt/tags/tag28.xml><?xml version="1.0" encoding="utf-8"?>
-<p:tagLst xmlns:a="http://schemas.openxmlformats.org/drawingml/2006/main" xmlns:r="http://schemas.openxmlformats.org/officeDocument/2006/relationships" xmlns:p="http://schemas.openxmlformats.org/presentationml/2006/main">
-  <p:tag name="_INSTRUCTOR VIEW19C14C36-AC8E-43BC-9DB6-C2AAF774C7DC|PANE__TAG" val="_"/>
-</p:tagLst>
-</file>
-
-<file path=ppt/tags/tag29.xml><?xml version="1.0" encoding="utf-8"?>
-<p:tagLst xmlns:a="http://schemas.openxmlformats.org/drawingml/2006/main" xmlns:r="http://schemas.openxmlformats.org/officeDocument/2006/relationships" xmlns:p="http://schemas.openxmlformats.org/presentationml/2006/main">
-  <p:tag name="_INSTRUCTOR VIEW19C14C36-AC8E-43BC-9DB6-C2AAF774C7DC|PANE__TAG" val="_"/>
-</p:tagLst>
-</file>
-
-<file path=ppt/tags/tag3.xml><?xml version="1.0" encoding="utf-8"?>
-<p:tagLst xmlns:a="http://schemas.openxmlformats.org/drawingml/2006/main" xmlns:r="http://schemas.openxmlformats.org/officeDocument/2006/relationships" xmlns:p="http://schemas.openxmlformats.org/presentationml/2006/main">
-  <p:tag name="_INSTRUCTOR VIEW19C14C36-AC8E-43BC-9DB6-C2AAF774C7DC|PANE__TAG" val="_"/>
-</p:tagLst>
-</file>
-
-<file path=ppt/tags/tag30.xml><?xml version="1.0" encoding="utf-8"?>
-<p:tagLst xmlns:a="http://schemas.openxmlformats.org/drawingml/2006/main" xmlns:r="http://schemas.openxmlformats.org/officeDocument/2006/relationships" xmlns:p="http://schemas.openxmlformats.org/presentationml/2006/main">
-  <p:tag name="_INSTRUCTOR VIEW19C14C36-AC8E-43BC-9DB6-C2AAF774C7DC|PANE__TAG" val="_"/>
-</p:tagLst>
-</file>
-
-<file path=ppt/tags/tag31.xml><?xml version="1.0" encoding="utf-8"?>
-<p:tagLst xmlns:a="http://schemas.openxmlformats.org/drawingml/2006/main" xmlns:r="http://schemas.openxmlformats.org/officeDocument/2006/relationships" xmlns:p="http://schemas.openxmlformats.org/presentationml/2006/main">
-  <p:tag name="_INSTRUCTOR VIEW19C14C36-AC8E-43BC-9DB6-C2AAF774C7DC|PANE__TAG" val="_"/>
-</p:tagLst>
-</file>
-
-<file path=ppt/tags/tag32.xml><?xml version="1.0" encoding="utf-8"?>
-<p:tagLst xmlns:a="http://schemas.openxmlformats.org/drawingml/2006/main" xmlns:r="http://schemas.openxmlformats.org/officeDocument/2006/relationships" xmlns:p="http://schemas.openxmlformats.org/presentationml/2006/main">
-  <p:tag name="_INSTRUCTOR VIEW19C14C36-AC8E-43BC-9DB6-C2AAF774C7DC|PANE__TAG" val="_"/>
-</p:tagLst>
-</file>
-
-<file path=ppt/tags/tag33.xml><?xml version="1.0" encoding="utf-8"?>
-<p:tagLst xmlns:a="http://schemas.openxmlformats.org/drawingml/2006/main" xmlns:r="http://schemas.openxmlformats.org/officeDocument/2006/relationships" xmlns:p="http://schemas.openxmlformats.org/presentationml/2006/main">
-  <p:tag name="_INSTRUCTOR VIEW19C14C36-AC8E-43BC-9DB6-C2AAF774C7DC|PANE__TAG" val="_"/>
-</p:tagLst>
-</file>
-
-<file path=ppt/tags/tag34.xml><?xml version="1.0" encoding="utf-8"?>
-<p:tagLst xmlns:a="http://schemas.openxmlformats.org/drawingml/2006/main" xmlns:r="http://schemas.openxmlformats.org/officeDocument/2006/relationships" xmlns:p="http://schemas.openxmlformats.org/presentationml/2006/main">
-  <p:tag name="_INSTRUCTOR VIEW19C14C36-AC8E-43BC-9DB6-C2AAF774C7DC|PANE__TAG" val="_"/>
-</p:tagLst>
-</file>
-
-<file path=ppt/tags/tag35.xml><?xml version="1.0" encoding="utf-8"?>
-<p:tagLst xmlns:a="http://schemas.openxmlformats.org/drawingml/2006/main" xmlns:r="http://schemas.openxmlformats.org/officeDocument/2006/relationships" xmlns:p="http://schemas.openxmlformats.org/presentationml/2006/main">
-  <p:tag name="_INSTRUCTOR VIEW19C14C36-AC8E-43BC-9DB6-C2AAF774C7DC|PANE__TAG" val="_"/>
-</p:tagLst>
-</file>
-
-<file path=ppt/tags/tag36.xml><?xml version="1.0" encoding="utf-8"?>
-<p:tagLst xmlns:a="http://schemas.openxmlformats.org/drawingml/2006/main" xmlns:r="http://schemas.openxmlformats.org/officeDocument/2006/relationships" xmlns:p="http://schemas.openxmlformats.org/presentationml/2006/main">
-  <p:tag name="_INSTRUCTOR VIEW19C14C36-AC8E-43BC-9DB6-C2AAF774C7DC|PANE__TAG" val="_"/>
-</p:tagLst>
-</file>
-
-<file path=ppt/tags/tag37.xml><?xml version="1.0" encoding="utf-8"?>
-<p:tagLst xmlns:a="http://schemas.openxmlformats.org/drawingml/2006/main" xmlns:r="http://schemas.openxmlformats.org/officeDocument/2006/relationships" xmlns:p="http://schemas.openxmlformats.org/presentationml/2006/main">
-  <p:tag name="_INSTRUCTOR VIEW19C14C36-AC8E-43BC-9DB6-C2AAF774C7DC|PANE__TAG" val="_"/>
-</p:tagLst>
-</file>
-
-<file path=ppt/tags/tag38.xml><?xml version="1.0" encoding="utf-8"?>
-<p:tagLst xmlns:a="http://schemas.openxmlformats.org/drawingml/2006/main" xmlns:r="http://schemas.openxmlformats.org/officeDocument/2006/relationships" xmlns:p="http://schemas.openxmlformats.org/presentationml/2006/main">
-  <p:tag name="_INSTRUCTOR VIEW19C14C36-AC8E-43BC-9DB6-C2AAF774C7DC|PANE__TAG" val="_"/>
-</p:tagLst>
-</file>
-
-<file path=ppt/tags/tag39.xml><?xml version="1.0" encoding="utf-8"?>
-<p:tagLst xmlns:a="http://schemas.openxmlformats.org/drawingml/2006/main" xmlns:r="http://schemas.openxmlformats.org/officeDocument/2006/relationships" xmlns:p="http://schemas.openxmlformats.org/presentationml/2006/main">
-  <p:tag name="_INSTRUCTOR VIEW19C14C36-AC8E-43BC-9DB6-C2AAF774C7DC|PANE__TAG" val="_"/>
-</p:tagLst>
-</file>
-
-<file path=ppt/tags/tag4.xml><?xml version="1.0" encoding="utf-8"?>
-<p:tagLst xmlns:a="http://schemas.openxmlformats.org/drawingml/2006/main" xmlns:r="http://schemas.openxmlformats.org/officeDocument/2006/relationships" xmlns:p="http://schemas.openxmlformats.org/presentationml/2006/main">
-  <p:tag name="_INSTRUCTOR VIEW19C14C36-AC8E-43BC-9DB6-C2AAF774C7DC|PANE__TAG" val="_"/>
-</p:tagLst>
-</file>
-
-<file path=ppt/tags/tag40.xml><?xml version="1.0" encoding="utf-8"?>
-<p:tagLst xmlns:a="http://schemas.openxmlformats.org/drawingml/2006/main" xmlns:r="http://schemas.openxmlformats.org/officeDocument/2006/relationships" xmlns:p="http://schemas.openxmlformats.org/presentationml/2006/main">
-  <p:tag name="_INSTRUCTOR VIEW19C14C36-AC8E-43BC-9DB6-C2AAF774C7DC|PANE__TAG" val="_"/>
-</p:tagLst>
-</file>
-
-<file path=ppt/tags/tag41.xml><?xml version="1.0" encoding="utf-8"?>
-<p:tagLst xmlns:a="http://schemas.openxmlformats.org/drawingml/2006/main" xmlns:r="http://schemas.openxmlformats.org/officeDocument/2006/relationships" xmlns:p="http://schemas.openxmlformats.org/presentationml/2006/main">
-  <p:tag name="_INSTRUCTOR VIEW19C14C36-AC8E-43BC-9DB6-C2AAF774C7DC|PANE__TAG" val="_"/>
-</p:tagLst>
-</file>
-
-<file path=ppt/tags/tag42.xml><?xml version="1.0" encoding="utf-8"?>
-<p:tagLst xmlns:a="http://schemas.openxmlformats.org/drawingml/2006/main" xmlns:r="http://schemas.openxmlformats.org/officeDocument/2006/relationships" xmlns:p="http://schemas.openxmlformats.org/presentationml/2006/main">
-  <p:tag name="_INSTRUCTOR VIEW19C14C36-AC8E-43BC-9DB6-C2AAF774C7DC|PANE__TAG" val="_"/>
-</p:tagLst>
-</file>
-
-<file path=ppt/tags/tag43.xml><?xml version="1.0" encoding="utf-8"?>
-<p:tagLst xmlns:a="http://schemas.openxmlformats.org/drawingml/2006/main" xmlns:r="http://schemas.openxmlformats.org/officeDocument/2006/relationships" xmlns:p="http://schemas.openxmlformats.org/presentationml/2006/main">
-  <p:tag name="_INSTRUCTOR VIEW19C14C36-AC8E-43BC-9DB6-C2AAF774C7DC|PANE__TAG" val="_"/>
-</p:tagLst>
-</file>
-
-<file path=ppt/tags/tag44.xml><?xml version="1.0" encoding="utf-8"?>
-<p:tagLst xmlns:a="http://schemas.openxmlformats.org/drawingml/2006/main" xmlns:r="http://schemas.openxmlformats.org/officeDocument/2006/relationships" xmlns:p="http://schemas.openxmlformats.org/presentationml/2006/main">
-  <p:tag name="_INSTRUCTOR VIEW19C14C36-AC8E-43BC-9DB6-C2AAF774C7DC|PANE__TAG" val="_"/>
-</p:tagLst>
-</file>
-
-<file path=ppt/tags/tag5.xml><?xml version="1.0" encoding="utf-8"?>
-<p:tagLst xmlns:a="http://schemas.openxmlformats.org/drawingml/2006/main" xmlns:r="http://schemas.openxmlformats.org/officeDocument/2006/relationships" xmlns:p="http://schemas.openxmlformats.org/presentationml/2006/main">
-  <p:tag name="_INSTRUCTOR VIEW19C14C36-AC8E-43BC-9DB6-C2AAF774C7DC|PANE__TAG" val="_"/>
-</p:tagLst>
-</file>
-
-<file path=ppt/tags/tag6.xml><?xml version="1.0" encoding="utf-8"?>
-<p:tagLst xmlns:a="http://schemas.openxmlformats.org/drawingml/2006/main" xmlns:r="http://schemas.openxmlformats.org/officeDocument/2006/relationships" xmlns:p="http://schemas.openxmlformats.org/presentationml/2006/main">
-  <p:tag name="_INSTRUCTOR VIEW19C14C36-AC8E-43BC-9DB6-C2AAF774C7DC|PANE__TAG" val="_"/>
-</p:tagLst>
-</file>
-
-<file path=ppt/tags/tag7.xml><?xml version="1.0" encoding="utf-8"?>
-<p:tagLst xmlns:a="http://schemas.openxmlformats.org/drawingml/2006/main" xmlns:r="http://schemas.openxmlformats.org/officeDocument/2006/relationships" xmlns:p="http://schemas.openxmlformats.org/presentationml/2006/main">
-  <p:tag name="_INSTRUCTOR VIEW19C14C36-AC8E-43BC-9DB6-C2AAF774C7DC|PANE__TAG" val="_"/>
-</p:tagLst>
-</file>
-
-<file path=ppt/tags/tag8.xml><?xml version="1.0" encoding="utf-8"?>
-<p:tagLst xmlns:a="http://schemas.openxmlformats.org/drawingml/2006/main" xmlns:r="http://schemas.openxmlformats.org/officeDocument/2006/relationships" xmlns:p="http://schemas.openxmlformats.org/presentationml/2006/main">
-  <p:tag name="_INSTRUCTOR VIEW19C14C36-AC8E-43BC-9DB6-C2AAF774C7DC|PANE__TAG" val="_"/>
-</p:tagLst>
-</file>
-
-<file path=ppt/tags/tag9.xml><?xml version="1.0" encoding="utf-8"?>
 <p:tagLst xmlns:a="http://schemas.openxmlformats.org/drawingml/2006/main" xmlns:r="http://schemas.openxmlformats.org/officeDocument/2006/relationships" xmlns:p="http://schemas.openxmlformats.org/presentationml/2006/main">
   <p:tag name="_INSTRUCTOR VIEW19C14C36-AC8E-43BC-9DB6-C2AAF774C7DC|PANE__TAG" val="_"/>
 </p:tagLst>

</xml_diff>

<commit_message>
lecture polish / announcements
</commit_message>
<xml_diff>
--- a/slides/00-DailyAnnouncements.pptx
+++ b/slides/00-DailyAnnouncements.pptx
@@ -5,11 +5,12 @@
     <p:sldMasterId id="2147484006" r:id="rId1"/>
   </p:sldMasterIdLst>
   <p:notesMasterIdLst>
-    <p:notesMasterId r:id="rId4"/>
+    <p:notesMasterId r:id="rId5"/>
   </p:notesMasterIdLst>
   <p:sldIdLst>
     <p:sldId id="256" r:id="rId2"/>
     <p:sldId id="505" r:id="rId3"/>
+    <p:sldId id="506" r:id="rId4"/>
   </p:sldIdLst>
   <p:sldSz cx="12192000" cy="6858000"/>
   <p:notesSz cx="6858000" cy="9144000"/>
@@ -198,7 +199,7 @@
           <a:p>
             <a:fld id="{C5B45307-6ED4-B142-BD64-10F739779302}" type="datetimeFigureOut">
               <a:rPr lang="en-US" smtClean="0"/>
-              <a:t>1/23/24</a:t>
+              <a:t>1/25/24</a:t>
             </a:fld>
             <a:endParaRPr lang="en-US"/>
           </a:p>
@@ -606,7 +607,7 @@
           <a:noFill/>
           <a:extLst>
             <a:ext uri="{909E8E84-426E-40dd-AFC4-6F175D3DCCD1}">
-              <a14:hiddenFill xmlns:a14="http://schemas.microsoft.com/office/drawing/2010/main" xmlns="">
+              <a14:hiddenFill xmlns="" xmlns:a14="http://schemas.microsoft.com/office/drawing/2010/main">
                 <a:solidFill>
                   <a:srgbClr val="FFFFFF"/>
                 </a:solidFill>
@@ -665,7 +666,7 @@
             </a:ln>
             <a:extLst>
               <a:ext uri="{91240B29-F687-4f45-9708-019B960494DF}">
-                <a14:hiddenLine xmlns:a14="http://schemas.microsoft.com/office/drawing/2010/main" xmlns="" w="9525">
+                <a14:hiddenLine xmlns="" xmlns:a14="http://schemas.microsoft.com/office/drawing/2010/main" w="9525">
                   <a:solidFill>
                     <a:srgbClr val="000000"/>
                   </a:solidFill>
@@ -755,7 +756,7 @@
             </a:ln>
             <a:extLst>
               <a:ext uri="{91240B29-F687-4f45-9708-019B960494DF}">
-                <a14:hiddenLine xmlns:a14="http://schemas.microsoft.com/office/drawing/2010/main" xmlns="" w="9525">
+                <a14:hiddenLine xmlns="" xmlns:a14="http://schemas.microsoft.com/office/drawing/2010/main" w="9525">
                   <a:solidFill>
                     <a:srgbClr val="000000"/>
                   </a:solidFill>
@@ -845,7 +846,7 @@
             </a:ln>
             <a:extLst>
               <a:ext uri="{91240B29-F687-4f45-9708-019B960494DF}">
-                <a14:hiddenLine xmlns:a14="http://schemas.microsoft.com/office/drawing/2010/main" xmlns="" w="9525">
+                <a14:hiddenLine xmlns="" xmlns:a14="http://schemas.microsoft.com/office/drawing/2010/main" w="9525">
                   <a:solidFill>
                     <a:srgbClr val="000000"/>
                   </a:solidFill>
@@ -879,7 +880,7 @@
             </a:ln>
             <a:extLst>
               <a:ext uri="{91240B29-F687-4f45-9708-019B960494DF}">
-                <a14:hiddenLine xmlns:a14="http://schemas.microsoft.com/office/drawing/2010/main" xmlns="" w="9525">
+                <a14:hiddenLine xmlns="" xmlns:a14="http://schemas.microsoft.com/office/drawing/2010/main" w="9525">
                   <a:solidFill>
                     <a:srgbClr val="000000"/>
                   </a:solidFill>
@@ -969,7 +970,7 @@
             </a:ln>
             <a:extLst>
               <a:ext uri="{91240B29-F687-4f45-9708-019B960494DF}">
-                <a14:hiddenLine xmlns:a14="http://schemas.microsoft.com/office/drawing/2010/main" xmlns="" w="9525">
+                <a14:hiddenLine xmlns="" xmlns:a14="http://schemas.microsoft.com/office/drawing/2010/main" w="9525">
                   <a:solidFill>
                     <a:srgbClr val="000000"/>
                   </a:solidFill>
@@ -1031,7 +1032,7 @@
             </a:ln>
             <a:extLst>
               <a:ext uri="{91240B29-F687-4f45-9708-019B960494DF}">
-                <a14:hiddenLine xmlns:a14="http://schemas.microsoft.com/office/drawing/2010/main" xmlns="" w="9525">
+                <a14:hiddenLine xmlns="" xmlns:a14="http://schemas.microsoft.com/office/drawing/2010/main" w="9525">
                   <a:solidFill>
                     <a:srgbClr val="000000"/>
                   </a:solidFill>
@@ -1093,7 +1094,7 @@
             </a:ln>
             <a:extLst>
               <a:ext uri="{91240B29-F687-4f45-9708-019B960494DF}">
-                <a14:hiddenLine xmlns:a14="http://schemas.microsoft.com/office/drawing/2010/main" xmlns="" w="9525">
+                <a14:hiddenLine xmlns="" xmlns:a14="http://schemas.microsoft.com/office/drawing/2010/main" w="9525">
                   <a:solidFill>
                     <a:srgbClr val="000000"/>
                   </a:solidFill>
@@ -1183,7 +1184,7 @@
             </a:ln>
             <a:extLst>
               <a:ext uri="{91240B29-F687-4f45-9708-019B960494DF}">
-                <a14:hiddenLine xmlns:a14="http://schemas.microsoft.com/office/drawing/2010/main" xmlns="" w="9525">
+                <a14:hiddenLine xmlns="" xmlns:a14="http://schemas.microsoft.com/office/drawing/2010/main" w="9525">
                   <a:solidFill>
                     <a:srgbClr val="000000"/>
                   </a:solidFill>
@@ -1245,7 +1246,7 @@
             </a:ln>
             <a:extLst>
               <a:ext uri="{91240B29-F687-4f45-9708-019B960494DF}">
-                <a14:hiddenLine xmlns:a14="http://schemas.microsoft.com/office/drawing/2010/main" xmlns="" w="9525">
+                <a14:hiddenLine xmlns="" xmlns:a14="http://schemas.microsoft.com/office/drawing/2010/main" w="9525">
                   <a:solidFill>
                     <a:srgbClr val="000000"/>
                   </a:solidFill>
@@ -1307,7 +1308,7 @@
             </a:ln>
             <a:extLst>
               <a:ext uri="{91240B29-F687-4f45-9708-019B960494DF}">
-                <a14:hiddenLine xmlns:a14="http://schemas.microsoft.com/office/drawing/2010/main" xmlns="" w="9525">
+                <a14:hiddenLine xmlns="" xmlns:a14="http://schemas.microsoft.com/office/drawing/2010/main" w="9525">
                   <a:solidFill>
                     <a:srgbClr val="000000"/>
                   </a:solidFill>
@@ -1397,7 +1398,7 @@
             </a:ln>
             <a:extLst>
               <a:ext uri="{91240B29-F687-4f45-9708-019B960494DF}">
-                <a14:hiddenLine xmlns:a14="http://schemas.microsoft.com/office/drawing/2010/main" xmlns="" w="9525">
+                <a14:hiddenLine xmlns="" xmlns:a14="http://schemas.microsoft.com/office/drawing/2010/main" w="9525">
                   <a:solidFill>
                     <a:srgbClr val="000000"/>
                   </a:solidFill>
@@ -1487,7 +1488,7 @@
             </a:ln>
             <a:extLst>
               <a:ext uri="{91240B29-F687-4f45-9708-019B960494DF}">
-                <a14:hiddenLine xmlns:a14="http://schemas.microsoft.com/office/drawing/2010/main" xmlns="" w="9525">
+                <a14:hiddenLine xmlns="" xmlns:a14="http://schemas.microsoft.com/office/drawing/2010/main" w="9525">
                   <a:solidFill>
                     <a:srgbClr val="000000"/>
                   </a:solidFill>
@@ -1549,7 +1550,7 @@
             </a:ln>
             <a:extLst>
               <a:ext uri="{91240B29-F687-4f45-9708-019B960494DF}">
-                <a14:hiddenLine xmlns:a14="http://schemas.microsoft.com/office/drawing/2010/main" xmlns="" w="9525">
+                <a14:hiddenLine xmlns="" xmlns:a14="http://schemas.microsoft.com/office/drawing/2010/main" w="9525">
                   <a:solidFill>
                     <a:srgbClr val="000000"/>
                   </a:solidFill>
@@ -1659,7 +1660,7 @@
             </a:ln>
             <a:extLst>
               <a:ext uri="{91240B29-F687-4f45-9708-019B960494DF}">
-                <a14:hiddenLine xmlns:a14="http://schemas.microsoft.com/office/drawing/2010/main" xmlns="" w="9525">
+                <a14:hiddenLine xmlns="" xmlns:a14="http://schemas.microsoft.com/office/drawing/2010/main" w="9525">
                   <a:solidFill>
                     <a:srgbClr val="000000"/>
                   </a:solidFill>
@@ -1721,7 +1722,7 @@
             </a:ln>
             <a:extLst>
               <a:ext uri="{91240B29-F687-4f45-9708-019B960494DF}">
-                <a14:hiddenLine xmlns:a14="http://schemas.microsoft.com/office/drawing/2010/main" xmlns="" w="9525">
+                <a14:hiddenLine xmlns="" xmlns:a14="http://schemas.microsoft.com/office/drawing/2010/main" w="9525">
                   <a:solidFill>
                     <a:srgbClr val="000000"/>
                   </a:solidFill>
@@ -1811,7 +1812,7 @@
             </a:ln>
             <a:extLst>
               <a:ext uri="{91240B29-F687-4f45-9708-019B960494DF}">
-                <a14:hiddenLine xmlns:a14="http://schemas.microsoft.com/office/drawing/2010/main" xmlns="" w="9525">
+                <a14:hiddenLine xmlns="" xmlns:a14="http://schemas.microsoft.com/office/drawing/2010/main" w="9525">
                   <a:solidFill>
                     <a:srgbClr val="000000"/>
                   </a:solidFill>
@@ -1901,7 +1902,7 @@
             </a:ln>
             <a:extLst>
               <a:ext uri="{91240B29-F687-4f45-9708-019B960494DF}">
-                <a14:hiddenLine xmlns:a14="http://schemas.microsoft.com/office/drawing/2010/main" xmlns="" w="9525">
+                <a14:hiddenLine xmlns="" xmlns:a14="http://schemas.microsoft.com/office/drawing/2010/main" w="9525">
                   <a:solidFill>
                     <a:srgbClr val="000000"/>
                   </a:solidFill>
@@ -1963,7 +1964,7 @@
             </a:ln>
             <a:extLst>
               <a:ext uri="{91240B29-F687-4f45-9708-019B960494DF}">
-                <a14:hiddenLine xmlns:a14="http://schemas.microsoft.com/office/drawing/2010/main" xmlns="" w="9525">
+                <a14:hiddenLine xmlns="" xmlns:a14="http://schemas.microsoft.com/office/drawing/2010/main" w="9525">
                   <a:solidFill>
                     <a:srgbClr val="000000"/>
                   </a:solidFill>
@@ -2053,7 +2054,7 @@
             </a:ln>
             <a:extLst>
               <a:ext uri="{91240B29-F687-4f45-9708-019B960494DF}">
-                <a14:hiddenLine xmlns:a14="http://schemas.microsoft.com/office/drawing/2010/main" xmlns="" w="9525">
+                <a14:hiddenLine xmlns="" xmlns:a14="http://schemas.microsoft.com/office/drawing/2010/main" w="9525">
                   <a:solidFill>
                     <a:srgbClr val="000000"/>
                   </a:solidFill>
@@ -2143,7 +2144,7 @@
             </a:ln>
             <a:extLst>
               <a:ext uri="{91240B29-F687-4f45-9708-019B960494DF}">
-                <a14:hiddenLine xmlns:a14="http://schemas.microsoft.com/office/drawing/2010/main" xmlns="" w="9525">
+                <a14:hiddenLine xmlns="" xmlns:a14="http://schemas.microsoft.com/office/drawing/2010/main" w="9525">
                   <a:solidFill>
                     <a:srgbClr val="000000"/>
                   </a:solidFill>
@@ -2199,7 +2200,7 @@
             </a:ln>
             <a:extLst>
               <a:ext uri="{91240B29-F687-4f45-9708-019B960494DF}">
-                <a14:hiddenLine xmlns:a14="http://schemas.microsoft.com/office/drawing/2010/main" xmlns="" w="9525">
+                <a14:hiddenLine xmlns="" xmlns:a14="http://schemas.microsoft.com/office/drawing/2010/main" w="9525">
                   <a:solidFill>
                     <a:srgbClr val="000000"/>
                   </a:solidFill>
@@ -2289,7 +2290,7 @@
             </a:ln>
             <a:extLst>
               <a:ext uri="{91240B29-F687-4f45-9708-019B960494DF}">
-                <a14:hiddenLine xmlns:a14="http://schemas.microsoft.com/office/drawing/2010/main" xmlns="" w="9525">
+                <a14:hiddenLine xmlns="" xmlns:a14="http://schemas.microsoft.com/office/drawing/2010/main" w="9525">
                   <a:solidFill>
                     <a:srgbClr val="000000"/>
                   </a:solidFill>
@@ -2345,7 +2346,7 @@
             </a:ln>
             <a:extLst>
               <a:ext uri="{91240B29-F687-4f45-9708-019B960494DF}">
-                <a14:hiddenLine xmlns:a14="http://schemas.microsoft.com/office/drawing/2010/main" xmlns="" w="9525">
+                <a14:hiddenLine xmlns="" xmlns:a14="http://schemas.microsoft.com/office/drawing/2010/main" w="9525">
                   <a:solidFill>
                     <a:srgbClr val="000000"/>
                   </a:solidFill>
@@ -2435,7 +2436,7 @@
             </a:ln>
             <a:extLst>
               <a:ext uri="{91240B29-F687-4f45-9708-019B960494DF}">
-                <a14:hiddenLine xmlns:a14="http://schemas.microsoft.com/office/drawing/2010/main" xmlns="" w="9525">
+                <a14:hiddenLine xmlns="" xmlns:a14="http://schemas.microsoft.com/office/drawing/2010/main" w="9525">
                   <a:solidFill>
                     <a:srgbClr val="000000"/>
                   </a:solidFill>
@@ -2503,7 +2504,7 @@
             </a:ln>
             <a:extLst>
               <a:ext uri="{91240B29-F687-4f45-9708-019B960494DF}">
-                <a14:hiddenLine xmlns:a14="http://schemas.microsoft.com/office/drawing/2010/main" xmlns="" w="9525">
+                <a14:hiddenLine xmlns="" xmlns:a14="http://schemas.microsoft.com/office/drawing/2010/main" w="9525">
                   <a:solidFill>
                     <a:srgbClr val="000000"/>
                   </a:solidFill>
@@ -2593,7 +2594,7 @@
             </a:ln>
             <a:extLst>
               <a:ext uri="{91240B29-F687-4f45-9708-019B960494DF}">
-                <a14:hiddenLine xmlns:a14="http://schemas.microsoft.com/office/drawing/2010/main" xmlns="" w="9525">
+                <a14:hiddenLine xmlns="" xmlns:a14="http://schemas.microsoft.com/office/drawing/2010/main" w="9525">
                   <a:solidFill>
                     <a:srgbClr val="000000"/>
                   </a:solidFill>
@@ -2661,7 +2662,7 @@
             </a:ln>
             <a:extLst>
               <a:ext uri="{91240B29-F687-4f45-9708-019B960494DF}">
-                <a14:hiddenLine xmlns:a14="http://schemas.microsoft.com/office/drawing/2010/main" xmlns="" w="9525">
+                <a14:hiddenLine xmlns="" xmlns:a14="http://schemas.microsoft.com/office/drawing/2010/main" w="9525">
                   <a:solidFill>
                     <a:srgbClr val="000000"/>
                   </a:solidFill>
@@ -2751,7 +2752,7 @@
             </a:ln>
             <a:extLst>
               <a:ext uri="{91240B29-F687-4f45-9708-019B960494DF}">
-                <a14:hiddenLine xmlns:a14="http://schemas.microsoft.com/office/drawing/2010/main" xmlns="" w="9525">
+                <a14:hiddenLine xmlns="" xmlns:a14="http://schemas.microsoft.com/office/drawing/2010/main" w="9525">
                   <a:solidFill>
                     <a:srgbClr val="000000"/>
                   </a:solidFill>
@@ -2785,7 +2786,7 @@
             </a:ln>
             <a:extLst>
               <a:ext uri="{91240B29-F687-4f45-9708-019B960494DF}">
-                <a14:hiddenLine xmlns:a14="http://schemas.microsoft.com/office/drawing/2010/main" xmlns="" w="9525">
+                <a14:hiddenLine xmlns="" xmlns:a14="http://schemas.microsoft.com/office/drawing/2010/main" w="9525">
                   <a:solidFill>
                     <a:srgbClr val="000000"/>
                   </a:solidFill>
@@ -2875,7 +2876,7 @@
             </a:ln>
             <a:extLst>
               <a:ext uri="{91240B29-F687-4f45-9708-019B960494DF}">
-                <a14:hiddenLine xmlns:a14="http://schemas.microsoft.com/office/drawing/2010/main" xmlns="" w="9525">
+                <a14:hiddenLine xmlns="" xmlns:a14="http://schemas.microsoft.com/office/drawing/2010/main" w="9525">
                   <a:solidFill>
                     <a:srgbClr val="000000"/>
                   </a:solidFill>
@@ -2937,7 +2938,7 @@
             </a:ln>
             <a:extLst>
               <a:ext uri="{91240B29-F687-4f45-9708-019B960494DF}">
-                <a14:hiddenLine xmlns:a14="http://schemas.microsoft.com/office/drawing/2010/main" xmlns="" w="9525">
+                <a14:hiddenLine xmlns="" xmlns:a14="http://schemas.microsoft.com/office/drawing/2010/main" w="9525">
                   <a:solidFill>
                     <a:srgbClr val="000000"/>
                   </a:solidFill>
@@ -2999,7 +3000,7 @@
             </a:ln>
             <a:extLst>
               <a:ext uri="{91240B29-F687-4f45-9708-019B960494DF}">
-                <a14:hiddenLine xmlns:a14="http://schemas.microsoft.com/office/drawing/2010/main" xmlns="" w="9525">
+                <a14:hiddenLine xmlns="" xmlns:a14="http://schemas.microsoft.com/office/drawing/2010/main" w="9525">
                   <a:solidFill>
                     <a:srgbClr val="000000"/>
                   </a:solidFill>
@@ -3089,7 +3090,7 @@
             </a:ln>
             <a:extLst>
               <a:ext uri="{91240B29-F687-4f45-9708-019B960494DF}">
-                <a14:hiddenLine xmlns:a14="http://schemas.microsoft.com/office/drawing/2010/main" xmlns="" w="9525">
+                <a14:hiddenLine xmlns="" xmlns:a14="http://schemas.microsoft.com/office/drawing/2010/main" w="9525">
                   <a:solidFill>
                     <a:srgbClr val="000000"/>
                   </a:solidFill>
@@ -3157,7 +3158,7 @@
             </a:ln>
             <a:extLst>
               <a:ext uri="{91240B29-F687-4f45-9708-019B960494DF}">
-                <a14:hiddenLine xmlns:a14="http://schemas.microsoft.com/office/drawing/2010/main" xmlns="" w="9525">
+                <a14:hiddenLine xmlns="" xmlns:a14="http://schemas.microsoft.com/office/drawing/2010/main" w="9525">
                   <a:solidFill>
                     <a:srgbClr val="000000"/>
                   </a:solidFill>
@@ -3219,7 +3220,7 @@
             </a:ln>
             <a:extLst>
               <a:ext uri="{91240B29-F687-4f45-9708-019B960494DF}">
-                <a14:hiddenLine xmlns:a14="http://schemas.microsoft.com/office/drawing/2010/main" xmlns="" w="9525">
+                <a14:hiddenLine xmlns="" xmlns:a14="http://schemas.microsoft.com/office/drawing/2010/main" w="9525">
                   <a:solidFill>
                     <a:srgbClr val="000000"/>
                   </a:solidFill>
@@ -3309,7 +3310,7 @@
             </a:ln>
             <a:extLst>
               <a:ext uri="{91240B29-F687-4f45-9708-019B960494DF}">
-                <a14:hiddenLine xmlns:a14="http://schemas.microsoft.com/office/drawing/2010/main" xmlns="" w="9525">
+                <a14:hiddenLine xmlns="" xmlns:a14="http://schemas.microsoft.com/office/drawing/2010/main" w="9525">
                   <a:solidFill>
                     <a:srgbClr val="000000"/>
                   </a:solidFill>
@@ -3371,7 +3372,7 @@
             </a:ln>
             <a:extLst>
               <a:ext uri="{91240B29-F687-4f45-9708-019B960494DF}">
-                <a14:hiddenLine xmlns:a14="http://schemas.microsoft.com/office/drawing/2010/main" xmlns="" w="9525">
+                <a14:hiddenLine xmlns="" xmlns:a14="http://schemas.microsoft.com/office/drawing/2010/main" w="9525">
                   <a:solidFill>
                     <a:srgbClr val="000000"/>
                   </a:solidFill>
@@ -3461,7 +3462,7 @@
             </a:ln>
             <a:extLst>
               <a:ext uri="{91240B29-F687-4f45-9708-019B960494DF}">
-                <a14:hiddenLine xmlns:a14="http://schemas.microsoft.com/office/drawing/2010/main" xmlns="" w="9525">
+                <a14:hiddenLine xmlns="" xmlns:a14="http://schemas.microsoft.com/office/drawing/2010/main" w="9525">
                   <a:solidFill>
                     <a:srgbClr val="000000"/>
                   </a:solidFill>
@@ -3523,7 +3524,7 @@
             </a:ln>
             <a:extLst>
               <a:ext uri="{91240B29-F687-4f45-9708-019B960494DF}">
-                <a14:hiddenLine xmlns:a14="http://schemas.microsoft.com/office/drawing/2010/main" xmlns="" w="9525">
+                <a14:hiddenLine xmlns="" xmlns:a14="http://schemas.microsoft.com/office/drawing/2010/main" w="9525">
                   <a:solidFill>
                     <a:srgbClr val="000000"/>
                   </a:solidFill>
@@ -3613,7 +3614,7 @@
             </a:ln>
             <a:extLst>
               <a:ext uri="{91240B29-F687-4f45-9708-019B960494DF}">
-                <a14:hiddenLine xmlns:a14="http://schemas.microsoft.com/office/drawing/2010/main" xmlns="" w="9525">
+                <a14:hiddenLine xmlns="" xmlns:a14="http://schemas.microsoft.com/office/drawing/2010/main" w="9525">
                   <a:solidFill>
                     <a:srgbClr val="000000"/>
                   </a:solidFill>
@@ -3647,7 +3648,7 @@
             </a:ln>
             <a:extLst>
               <a:ext uri="{91240B29-F687-4f45-9708-019B960494DF}">
-                <a14:hiddenLine xmlns:a14="http://schemas.microsoft.com/office/drawing/2010/main" xmlns="" w="9525">
+                <a14:hiddenLine xmlns="" xmlns:a14="http://schemas.microsoft.com/office/drawing/2010/main" w="9525">
                   <a:solidFill>
                     <a:srgbClr val="000000"/>
                   </a:solidFill>
@@ -3712,7 +3713,7 @@
             </a:ln>
             <a:extLst>
               <a:ext uri="{91240B29-F687-4f45-9708-019B960494DF}">
-                <a14:hiddenLine xmlns:a14="http://schemas.microsoft.com/office/drawing/2010/main" xmlns="" w="9525">
+                <a14:hiddenLine xmlns="" xmlns:a14="http://schemas.microsoft.com/office/drawing/2010/main" w="9525">
                   <a:solidFill>
                     <a:srgbClr val="000000"/>
                   </a:solidFill>
@@ -3802,7 +3803,7 @@
             </a:ln>
             <a:extLst>
               <a:ext uri="{91240B29-F687-4f45-9708-019B960494DF}">
-                <a14:hiddenLine xmlns:a14="http://schemas.microsoft.com/office/drawing/2010/main" xmlns="" w="9525">
+                <a14:hiddenLine xmlns="" xmlns:a14="http://schemas.microsoft.com/office/drawing/2010/main" w="9525">
                   <a:solidFill>
                     <a:srgbClr val="000000"/>
                   </a:solidFill>
@@ -3864,7 +3865,7 @@
             </a:ln>
             <a:extLst>
               <a:ext uri="{91240B29-F687-4f45-9708-019B960494DF}">
-                <a14:hiddenLine xmlns:a14="http://schemas.microsoft.com/office/drawing/2010/main" xmlns="" w="9525">
+                <a14:hiddenLine xmlns="" xmlns:a14="http://schemas.microsoft.com/office/drawing/2010/main" w="9525">
                   <a:solidFill>
                     <a:srgbClr val="000000"/>
                   </a:solidFill>
@@ -3954,7 +3955,7 @@
             </a:ln>
             <a:extLst>
               <a:ext uri="{91240B29-F687-4f45-9708-019B960494DF}">
-                <a14:hiddenLine xmlns:a14="http://schemas.microsoft.com/office/drawing/2010/main" xmlns="" w="9525">
+                <a14:hiddenLine xmlns="" xmlns:a14="http://schemas.microsoft.com/office/drawing/2010/main" w="9525">
                   <a:solidFill>
                     <a:srgbClr val="000000"/>
                   </a:solidFill>
@@ -4044,7 +4045,7 @@
             </a:ln>
             <a:extLst>
               <a:ext uri="{91240B29-F687-4f45-9708-019B960494DF}">
-                <a14:hiddenLine xmlns:a14="http://schemas.microsoft.com/office/drawing/2010/main" xmlns="" w="9525">
+                <a14:hiddenLine xmlns="" xmlns:a14="http://schemas.microsoft.com/office/drawing/2010/main" w="9525">
                   <a:solidFill>
                     <a:srgbClr val="000000"/>
                   </a:solidFill>
@@ -4109,7 +4110,7 @@
             </a:ln>
             <a:extLst>
               <a:ext uri="{91240B29-F687-4f45-9708-019B960494DF}">
-                <a14:hiddenLine xmlns:a14="http://schemas.microsoft.com/office/drawing/2010/main" xmlns="" w="9525">
+                <a14:hiddenLine xmlns="" xmlns:a14="http://schemas.microsoft.com/office/drawing/2010/main" w="9525">
                   <a:solidFill>
                     <a:srgbClr val="000000"/>
                   </a:solidFill>
@@ -4171,7 +4172,7 @@
             </a:ln>
             <a:extLst>
               <a:ext uri="{91240B29-F687-4f45-9708-019B960494DF}">
-                <a14:hiddenLine xmlns:a14="http://schemas.microsoft.com/office/drawing/2010/main" xmlns="" w="9525">
+                <a14:hiddenLine xmlns="" xmlns:a14="http://schemas.microsoft.com/office/drawing/2010/main" w="9525">
                   <a:solidFill>
                     <a:srgbClr val="000000"/>
                   </a:solidFill>
@@ -4261,7 +4262,7 @@
             </a:ln>
             <a:extLst>
               <a:ext uri="{91240B29-F687-4f45-9708-019B960494DF}">
-                <a14:hiddenLine xmlns:a14="http://schemas.microsoft.com/office/drawing/2010/main" xmlns="" w="9525">
+                <a14:hiddenLine xmlns="" xmlns:a14="http://schemas.microsoft.com/office/drawing/2010/main" w="9525">
                   <a:solidFill>
                     <a:srgbClr val="000000"/>
                   </a:solidFill>
@@ -4351,7 +4352,7 @@
             </a:ln>
             <a:extLst>
               <a:ext uri="{91240B29-F687-4f45-9708-019B960494DF}">
-                <a14:hiddenLine xmlns:a14="http://schemas.microsoft.com/office/drawing/2010/main" xmlns="" w="9525">
+                <a14:hiddenLine xmlns="" xmlns:a14="http://schemas.microsoft.com/office/drawing/2010/main" w="9525">
                   <a:solidFill>
                     <a:srgbClr val="000000"/>
                   </a:solidFill>
@@ -4413,7 +4414,7 @@
             </a:ln>
             <a:extLst>
               <a:ext uri="{91240B29-F687-4f45-9708-019B960494DF}">
-                <a14:hiddenLine xmlns:a14="http://schemas.microsoft.com/office/drawing/2010/main" xmlns="" w="9525">
+                <a14:hiddenLine xmlns="" xmlns:a14="http://schemas.microsoft.com/office/drawing/2010/main" w="9525">
                   <a:solidFill>
                     <a:srgbClr val="000000"/>
                   </a:solidFill>
@@ -4533,7 +4534,7 @@
             </a:ln>
             <a:extLst>
               <a:ext uri="{91240B29-F687-4f45-9708-019B960494DF}">
-                <a14:hiddenLine xmlns:a14="http://schemas.microsoft.com/office/drawing/2010/main" xmlns="" w="9525">
+                <a14:hiddenLine xmlns="" xmlns:a14="http://schemas.microsoft.com/office/drawing/2010/main" w="9525">
                   <a:solidFill>
                     <a:srgbClr val="000000"/>
                   </a:solidFill>
@@ -4601,7 +4602,7 @@
             </a:ln>
             <a:extLst>
               <a:ext uri="{91240B29-F687-4f45-9708-019B960494DF}">
-                <a14:hiddenLine xmlns:a14="http://schemas.microsoft.com/office/drawing/2010/main" xmlns="" w="9525">
+                <a14:hiddenLine xmlns="" xmlns:a14="http://schemas.microsoft.com/office/drawing/2010/main" w="9525">
                   <a:solidFill>
                     <a:srgbClr val="000000"/>
                   </a:solidFill>
@@ -4691,7 +4692,7 @@
             </a:ln>
             <a:extLst>
               <a:ext uri="{91240B29-F687-4f45-9708-019B960494DF}">
-                <a14:hiddenLine xmlns:a14="http://schemas.microsoft.com/office/drawing/2010/main" xmlns="" w="9525">
+                <a14:hiddenLine xmlns="" xmlns:a14="http://schemas.microsoft.com/office/drawing/2010/main" w="9525">
                   <a:solidFill>
                     <a:srgbClr val="000000"/>
                   </a:solidFill>
@@ -4831,7 +4832,7 @@
           <a:p>
             <a:fld id="{EC4347D3-4C9A-C240-8F14-750059DFEEB0}" type="datetimeFigureOut">
               <a:rPr lang="en-US" smtClean="0"/>
-              <a:t>1/23/24</a:t>
+              <a:t>1/25/24</a:t>
             </a:fld>
             <a:endParaRPr lang="en-US"/>
           </a:p>
@@ -5098,7 +5099,7 @@
           <a:p>
             <a:fld id="{EC4347D3-4C9A-C240-8F14-750059DFEEB0}" type="datetimeFigureOut">
               <a:rPr lang="en-US" smtClean="0"/>
-              <a:t>1/23/24</a:t>
+              <a:t>1/25/24</a:t>
             </a:fld>
             <a:endParaRPr lang="en-US"/>
           </a:p>
@@ -5294,7 +5295,7 @@
           <a:p>
             <a:fld id="{EC4347D3-4C9A-C240-8F14-750059DFEEB0}" type="datetimeFigureOut">
               <a:rPr lang="en-US" smtClean="0"/>
-              <a:t>1/23/24</a:t>
+              <a:t>1/25/24</a:t>
             </a:fld>
             <a:endParaRPr lang="en-US"/>
           </a:p>
@@ -5557,7 +5558,7 @@
           <a:p>
             <a:fld id="{EC4347D3-4C9A-C240-8F14-750059DFEEB0}" type="datetimeFigureOut">
               <a:rPr lang="en-US" smtClean="0"/>
-              <a:t>1/23/24</a:t>
+              <a:t>1/25/24</a:t>
             </a:fld>
             <a:endParaRPr lang="en-US"/>
           </a:p>
@@ -5991,7 +5992,7 @@
           <a:p>
             <a:fld id="{EC4347D3-4C9A-C240-8F14-750059DFEEB0}" type="datetimeFigureOut">
               <a:rPr lang="en-US" smtClean="0"/>
-              <a:t>1/23/24</a:t>
+              <a:t>1/25/24</a:t>
             </a:fld>
             <a:endParaRPr lang="en-US"/>
           </a:p>
@@ -6537,7 +6538,7 @@
           <a:p>
             <a:fld id="{EC4347D3-4C9A-C240-8F14-750059DFEEB0}" type="datetimeFigureOut">
               <a:rPr lang="en-US" smtClean="0"/>
-              <a:t>1/23/24</a:t>
+              <a:t>1/25/24</a:t>
             </a:fld>
             <a:endParaRPr lang="en-US"/>
           </a:p>
@@ -7257,7 +7258,7 @@
           <a:p>
             <a:fld id="{EC4347D3-4C9A-C240-8F14-750059DFEEB0}" type="datetimeFigureOut">
               <a:rPr lang="en-US" smtClean="0"/>
-              <a:t>1/23/24</a:t>
+              <a:t>1/25/24</a:t>
             </a:fld>
             <a:endParaRPr lang="en-US"/>
           </a:p>
@@ -7427,7 +7428,7 @@
           <a:p>
             <a:fld id="{EC4347D3-4C9A-C240-8F14-750059DFEEB0}" type="datetimeFigureOut">
               <a:rPr lang="en-US" smtClean="0"/>
-              <a:t>1/23/24</a:t>
+              <a:t>1/25/24</a:t>
             </a:fld>
             <a:endParaRPr lang="en-US"/>
           </a:p>
@@ -7607,7 +7608,7 @@
           <a:p>
             <a:fld id="{EC4347D3-4C9A-C240-8F14-750059DFEEB0}" type="datetimeFigureOut">
               <a:rPr lang="en-US" smtClean="0"/>
-              <a:t>1/23/24</a:t>
+              <a:t>1/25/24</a:t>
             </a:fld>
             <a:endParaRPr lang="en-US"/>
           </a:p>
@@ -7777,7 +7778,7 @@
           <a:p>
             <a:fld id="{EC4347D3-4C9A-C240-8F14-750059DFEEB0}" type="datetimeFigureOut">
               <a:rPr lang="en-US" smtClean="0"/>
-              <a:t>1/23/24</a:t>
+              <a:t>1/25/24</a:t>
             </a:fld>
             <a:endParaRPr lang="en-US"/>
           </a:p>
@@ -8027,7 +8028,7 @@
           <a:p>
             <a:fld id="{EC4347D3-4C9A-C240-8F14-750059DFEEB0}" type="datetimeFigureOut">
               <a:rPr lang="en-US" smtClean="0"/>
-              <a:t>1/23/24</a:t>
+              <a:t>1/25/24</a:t>
             </a:fld>
             <a:endParaRPr lang="en-US"/>
           </a:p>
@@ -8259,7 +8260,7 @@
           <a:p>
             <a:fld id="{EC4347D3-4C9A-C240-8F14-750059DFEEB0}" type="datetimeFigureOut">
               <a:rPr lang="en-US" smtClean="0"/>
-              <a:t>1/23/24</a:t>
+              <a:t>1/25/24</a:t>
             </a:fld>
             <a:endParaRPr lang="en-US"/>
           </a:p>
@@ -8645,7 +8646,7 @@
           <a:p>
             <a:fld id="{EC4347D3-4C9A-C240-8F14-750059DFEEB0}" type="datetimeFigureOut">
               <a:rPr lang="en-US" smtClean="0"/>
-              <a:t>1/23/24</a:t>
+              <a:t>1/25/24</a:t>
             </a:fld>
             <a:endParaRPr lang="en-US"/>
           </a:p>
@@ -8768,7 +8769,7 @@
           <a:p>
             <a:fld id="{EC4347D3-4C9A-C240-8F14-750059DFEEB0}" type="datetimeFigureOut">
               <a:rPr lang="en-US" smtClean="0"/>
-              <a:t>1/23/24</a:t>
+              <a:t>1/25/24</a:t>
             </a:fld>
             <a:endParaRPr lang="en-US"/>
           </a:p>
@@ -8863,7 +8864,7 @@
           <a:p>
             <a:fld id="{EC4347D3-4C9A-C240-8F14-750059DFEEB0}" type="datetimeFigureOut">
               <a:rPr lang="en-US" smtClean="0"/>
-              <a:t>1/23/24</a:t>
+              <a:t>1/25/24</a:t>
             </a:fld>
             <a:endParaRPr lang="en-US"/>
           </a:p>
@@ -9112,7 +9113,7 @@
           <a:p>
             <a:fld id="{EC4347D3-4C9A-C240-8F14-750059DFEEB0}" type="datetimeFigureOut">
               <a:rPr lang="en-US" smtClean="0"/>
-              <a:t>1/23/24</a:t>
+              <a:t>1/25/24</a:t>
             </a:fld>
             <a:endParaRPr lang="en-US"/>
           </a:p>
@@ -9397,7 +9398,7 @@
           <a:p>
             <a:fld id="{EC4347D3-4C9A-C240-8F14-750059DFEEB0}" type="datetimeFigureOut">
               <a:rPr lang="en-US" smtClean="0"/>
-              <a:t>1/23/24</a:t>
+              <a:t>1/25/24</a:t>
             </a:fld>
             <a:endParaRPr lang="en-US"/>
           </a:p>
@@ -9520,7 +9521,7 @@
           <a:noFill/>
           <a:extLst>
             <a:ext uri="{909E8E84-426E-40dd-AFC4-6F175D3DCCD1}">
-              <a14:hiddenFill xmlns:a14="http://schemas.microsoft.com/office/drawing/2010/main" xmlns="">
+              <a14:hiddenFill xmlns="" xmlns:a14="http://schemas.microsoft.com/office/drawing/2010/main">
                 <a:solidFill>
                   <a:srgbClr val="FFFFFF"/>
                 </a:solidFill>
@@ -9594,7 +9595,7 @@
               </a:ln>
               <a:extLst>
                 <a:ext uri="{91240B29-F687-4f45-9708-019B960494DF}">
-                  <a14:hiddenLine xmlns:a14="http://schemas.microsoft.com/office/drawing/2010/main" xmlns="" w="9525">
+                  <a14:hiddenLine xmlns="" xmlns:a14="http://schemas.microsoft.com/office/drawing/2010/main" w="9525">
                     <a:solidFill>
                       <a:srgbClr val="000000"/>
                     </a:solidFill>
@@ -9684,7 +9685,7 @@
               </a:ln>
               <a:extLst>
                 <a:ext uri="{91240B29-F687-4f45-9708-019B960494DF}">
-                  <a14:hiddenLine xmlns:a14="http://schemas.microsoft.com/office/drawing/2010/main" xmlns="" w="9525">
+                  <a14:hiddenLine xmlns="" xmlns:a14="http://schemas.microsoft.com/office/drawing/2010/main" w="9525">
                     <a:solidFill>
                       <a:srgbClr val="000000"/>
                     </a:solidFill>
@@ -9774,7 +9775,7 @@
               </a:ln>
               <a:extLst>
                 <a:ext uri="{91240B29-F687-4f45-9708-019B960494DF}">
-                  <a14:hiddenLine xmlns:a14="http://schemas.microsoft.com/office/drawing/2010/main" xmlns="" w="9525">
+                  <a14:hiddenLine xmlns="" xmlns:a14="http://schemas.microsoft.com/office/drawing/2010/main" w="9525">
                     <a:solidFill>
                       <a:srgbClr val="000000"/>
                     </a:solidFill>
@@ -9836,7 +9837,7 @@
               </a:ln>
               <a:extLst>
                 <a:ext uri="{91240B29-F687-4f45-9708-019B960494DF}">
-                  <a14:hiddenLine xmlns:a14="http://schemas.microsoft.com/office/drawing/2010/main" xmlns="" w="9525">
+                  <a14:hiddenLine xmlns="" xmlns:a14="http://schemas.microsoft.com/office/drawing/2010/main" w="9525">
                     <a:solidFill>
                       <a:srgbClr val="000000"/>
                     </a:solidFill>
@@ -9926,7 +9927,7 @@
               </a:ln>
               <a:extLst>
                 <a:ext uri="{91240B29-F687-4f45-9708-019B960494DF}">
-                  <a14:hiddenLine xmlns:a14="http://schemas.microsoft.com/office/drawing/2010/main" xmlns="" w="9525">
+                  <a14:hiddenLine xmlns="" xmlns:a14="http://schemas.microsoft.com/office/drawing/2010/main" w="9525">
                     <a:solidFill>
                       <a:srgbClr val="000000"/>
                     </a:solidFill>
@@ -9988,7 +9989,7 @@
               </a:ln>
               <a:extLst>
                 <a:ext uri="{91240B29-F687-4f45-9708-019B960494DF}">
-                  <a14:hiddenLine xmlns:a14="http://schemas.microsoft.com/office/drawing/2010/main" xmlns="" w="9525">
+                  <a14:hiddenLine xmlns="" xmlns:a14="http://schemas.microsoft.com/office/drawing/2010/main" w="9525">
                     <a:solidFill>
                       <a:srgbClr val="000000"/>
                     </a:solidFill>
@@ -10050,7 +10051,7 @@
               </a:ln>
               <a:extLst>
                 <a:ext uri="{91240B29-F687-4f45-9708-019B960494DF}">
-                  <a14:hiddenLine xmlns:a14="http://schemas.microsoft.com/office/drawing/2010/main" xmlns="" w="9525">
+                  <a14:hiddenLine xmlns="" xmlns:a14="http://schemas.microsoft.com/office/drawing/2010/main" w="9525">
                     <a:solidFill>
                       <a:srgbClr val="000000"/>
                     </a:solidFill>
@@ -10140,7 +10141,7 @@
               </a:ln>
               <a:extLst>
                 <a:ext uri="{91240B29-F687-4f45-9708-019B960494DF}">
-                  <a14:hiddenLine xmlns:a14="http://schemas.microsoft.com/office/drawing/2010/main" xmlns="" w="9525">
+                  <a14:hiddenLine xmlns="" xmlns:a14="http://schemas.microsoft.com/office/drawing/2010/main" w="9525">
                     <a:solidFill>
                       <a:srgbClr val="000000"/>
                     </a:solidFill>
@@ -10230,7 +10231,7 @@
               </a:ln>
               <a:extLst>
                 <a:ext uri="{91240B29-F687-4f45-9708-019B960494DF}">
-                  <a14:hiddenLine xmlns:a14="http://schemas.microsoft.com/office/drawing/2010/main" xmlns="" w="9525">
+                  <a14:hiddenLine xmlns="" xmlns:a14="http://schemas.microsoft.com/office/drawing/2010/main" w="9525">
                     <a:solidFill>
                       <a:srgbClr val="000000"/>
                     </a:solidFill>
@@ -10292,7 +10293,7 @@
               </a:ln>
               <a:extLst>
                 <a:ext uri="{91240B29-F687-4f45-9708-019B960494DF}">
-                  <a14:hiddenLine xmlns:a14="http://schemas.microsoft.com/office/drawing/2010/main" xmlns="" w="9525">
+                  <a14:hiddenLine xmlns="" xmlns:a14="http://schemas.microsoft.com/office/drawing/2010/main" w="9525">
                     <a:solidFill>
                       <a:srgbClr val="000000"/>
                     </a:solidFill>
@@ -10402,7 +10403,7 @@
               </a:ln>
               <a:extLst>
                 <a:ext uri="{91240B29-F687-4f45-9708-019B960494DF}">
-                  <a14:hiddenLine xmlns:a14="http://schemas.microsoft.com/office/drawing/2010/main" xmlns="" w="9525">
+                  <a14:hiddenLine xmlns="" xmlns:a14="http://schemas.microsoft.com/office/drawing/2010/main" w="9525">
                     <a:solidFill>
                       <a:srgbClr val="000000"/>
                     </a:solidFill>
@@ -10486,7 +10487,7 @@
               </a:ln>
               <a:extLst>
                 <a:ext uri="{91240B29-F687-4f45-9708-019B960494DF}">
-                  <a14:hiddenLine xmlns:a14="http://schemas.microsoft.com/office/drawing/2010/main" xmlns="" w="9525">
+                  <a14:hiddenLine xmlns="" xmlns:a14="http://schemas.microsoft.com/office/drawing/2010/main" w="9525">
                     <a:solidFill>
                       <a:srgbClr val="000000"/>
                     </a:solidFill>
@@ -10548,7 +10549,7 @@
               </a:ln>
               <a:extLst>
                 <a:ext uri="{91240B29-F687-4f45-9708-019B960494DF}">
-                  <a14:hiddenLine xmlns:a14="http://schemas.microsoft.com/office/drawing/2010/main" xmlns="" w="9525">
+                  <a14:hiddenLine xmlns="" xmlns:a14="http://schemas.microsoft.com/office/drawing/2010/main" w="9525">
                     <a:solidFill>
                       <a:srgbClr val="000000"/>
                     </a:solidFill>
@@ -10610,7 +10611,7 @@
               </a:ln>
               <a:extLst>
                 <a:ext uri="{91240B29-F687-4f45-9708-019B960494DF}">
-                  <a14:hiddenLine xmlns:a14="http://schemas.microsoft.com/office/drawing/2010/main" xmlns="" w="9525">
+                  <a14:hiddenLine xmlns="" xmlns:a14="http://schemas.microsoft.com/office/drawing/2010/main" w="9525">
                     <a:solidFill>
                       <a:srgbClr val="000000"/>
                     </a:solidFill>
@@ -10700,7 +10701,7 @@
               </a:ln>
               <a:extLst>
                 <a:ext uri="{91240B29-F687-4f45-9708-019B960494DF}">
-                  <a14:hiddenLine xmlns:a14="http://schemas.microsoft.com/office/drawing/2010/main" xmlns="" w="9525">
+                  <a14:hiddenLine xmlns="" xmlns:a14="http://schemas.microsoft.com/office/drawing/2010/main" w="9525">
                     <a:solidFill>
                       <a:srgbClr val="000000"/>
                     </a:solidFill>
@@ -10734,7 +10735,7 @@
               </a:ln>
               <a:extLst>
                 <a:ext uri="{91240B29-F687-4f45-9708-019B960494DF}">
-                  <a14:hiddenLine xmlns:a14="http://schemas.microsoft.com/office/drawing/2010/main" xmlns="" w="9525">
+                  <a14:hiddenLine xmlns="" xmlns:a14="http://schemas.microsoft.com/office/drawing/2010/main" w="9525">
                     <a:solidFill>
                       <a:srgbClr val="000000"/>
                     </a:solidFill>
@@ -10799,7 +10800,7 @@
               </a:ln>
               <a:extLst>
                 <a:ext uri="{91240B29-F687-4f45-9708-019B960494DF}">
-                  <a14:hiddenLine xmlns:a14="http://schemas.microsoft.com/office/drawing/2010/main" xmlns="" w="9525">
+                  <a14:hiddenLine xmlns="" xmlns:a14="http://schemas.microsoft.com/office/drawing/2010/main" w="9525">
                     <a:solidFill>
                       <a:srgbClr val="000000"/>
                     </a:solidFill>
@@ -10889,7 +10890,7 @@
               </a:ln>
               <a:extLst>
                 <a:ext uri="{91240B29-F687-4f45-9708-019B960494DF}">
-                  <a14:hiddenLine xmlns:a14="http://schemas.microsoft.com/office/drawing/2010/main" xmlns="" w="9525">
+                  <a14:hiddenLine xmlns="" xmlns:a14="http://schemas.microsoft.com/office/drawing/2010/main" w="9525">
                     <a:solidFill>
                       <a:srgbClr val="000000"/>
                     </a:solidFill>
@@ -10951,7 +10952,7 @@
               </a:ln>
               <a:extLst>
                 <a:ext uri="{91240B29-F687-4f45-9708-019B960494DF}">
-                  <a14:hiddenLine xmlns:a14="http://schemas.microsoft.com/office/drawing/2010/main" xmlns="" w="9525">
+                  <a14:hiddenLine xmlns="" xmlns:a14="http://schemas.microsoft.com/office/drawing/2010/main" w="9525">
                     <a:solidFill>
                       <a:srgbClr val="000000"/>
                     </a:solidFill>
@@ -11041,7 +11042,7 @@
               </a:ln>
               <a:extLst>
                 <a:ext uri="{91240B29-F687-4f45-9708-019B960494DF}">
-                  <a14:hiddenLine xmlns:a14="http://schemas.microsoft.com/office/drawing/2010/main" xmlns="" w="9525">
+                  <a14:hiddenLine xmlns="" xmlns:a14="http://schemas.microsoft.com/office/drawing/2010/main" w="9525">
                     <a:solidFill>
                       <a:srgbClr val="000000"/>
                     </a:solidFill>
@@ -11106,7 +11107,7 @@
               </a:ln>
               <a:extLst>
                 <a:ext uri="{91240B29-F687-4f45-9708-019B960494DF}">
-                  <a14:hiddenLine xmlns:a14="http://schemas.microsoft.com/office/drawing/2010/main" xmlns="" w="9525">
+                  <a14:hiddenLine xmlns="" xmlns:a14="http://schemas.microsoft.com/office/drawing/2010/main" w="9525">
                     <a:solidFill>
                       <a:srgbClr val="000000"/>
                     </a:solidFill>
@@ -11168,7 +11169,7 @@
               </a:ln>
               <a:extLst>
                 <a:ext uri="{91240B29-F687-4f45-9708-019B960494DF}">
-                  <a14:hiddenLine xmlns:a14="http://schemas.microsoft.com/office/drawing/2010/main" xmlns="" w="9525">
+                  <a14:hiddenLine xmlns="" xmlns:a14="http://schemas.microsoft.com/office/drawing/2010/main" w="9525">
                     <a:solidFill>
                       <a:srgbClr val="000000"/>
                     </a:solidFill>
@@ -11258,7 +11259,7 @@
               </a:ln>
               <a:extLst>
                 <a:ext uri="{91240B29-F687-4f45-9708-019B960494DF}">
-                  <a14:hiddenLine xmlns:a14="http://schemas.microsoft.com/office/drawing/2010/main" xmlns="" w="9525">
+                  <a14:hiddenLine xmlns="" xmlns:a14="http://schemas.microsoft.com/office/drawing/2010/main" w="9525">
                     <a:solidFill>
                       <a:srgbClr val="000000"/>
                     </a:solidFill>
@@ -11348,7 +11349,7 @@
               </a:ln>
               <a:extLst>
                 <a:ext uri="{91240B29-F687-4f45-9708-019B960494DF}">
-                  <a14:hiddenLine xmlns:a14="http://schemas.microsoft.com/office/drawing/2010/main" xmlns="" w="9525">
+                  <a14:hiddenLine xmlns="" xmlns:a14="http://schemas.microsoft.com/office/drawing/2010/main" w="9525">
                     <a:solidFill>
                       <a:srgbClr val="000000"/>
                     </a:solidFill>
@@ -11413,7 +11414,7 @@
               </a:ln>
               <a:extLst>
                 <a:ext uri="{91240B29-F687-4f45-9708-019B960494DF}">
-                  <a14:hiddenLine xmlns:a14="http://schemas.microsoft.com/office/drawing/2010/main" xmlns="" w="9525">
+                  <a14:hiddenLine xmlns="" xmlns:a14="http://schemas.microsoft.com/office/drawing/2010/main" w="9525">
                     <a:solidFill>
                       <a:srgbClr val="000000"/>
                     </a:solidFill>
@@ -11533,7 +11534,7 @@
               </a:ln>
               <a:extLst>
                 <a:ext uri="{91240B29-F687-4f45-9708-019B960494DF}">
-                  <a14:hiddenLine xmlns:a14="http://schemas.microsoft.com/office/drawing/2010/main" xmlns="" w="9525">
+                  <a14:hiddenLine xmlns="" xmlns:a14="http://schemas.microsoft.com/office/drawing/2010/main" w="9525">
                     <a:solidFill>
                       <a:srgbClr val="000000"/>
                     </a:solidFill>
@@ -11614,7 +11615,7 @@
               </a:ln>
               <a:extLst>
                 <a:ext uri="{91240B29-F687-4f45-9708-019B960494DF}">
-                  <a14:hiddenLine xmlns:a14="http://schemas.microsoft.com/office/drawing/2010/main" xmlns="" w="9525">
+                  <a14:hiddenLine xmlns="" xmlns:a14="http://schemas.microsoft.com/office/drawing/2010/main" w="9525">
                     <a:solidFill>
                       <a:srgbClr val="000000"/>
                     </a:solidFill>
@@ -11729,7 +11730,7 @@
               </a:ln>
               <a:extLst>
                 <a:ext uri="{91240B29-F687-4f45-9708-019B960494DF}">
-                  <a14:hiddenLine xmlns:a14="http://schemas.microsoft.com/office/drawing/2010/main" xmlns="" w="9525">
+                  <a14:hiddenLine xmlns="" xmlns:a14="http://schemas.microsoft.com/office/drawing/2010/main" w="9525">
                     <a:solidFill>
                       <a:srgbClr val="000000"/>
                     </a:solidFill>
@@ -11819,7 +11820,7 @@
               </a:ln>
               <a:extLst>
                 <a:ext uri="{91240B29-F687-4f45-9708-019B960494DF}">
-                  <a14:hiddenLine xmlns:a14="http://schemas.microsoft.com/office/drawing/2010/main" xmlns="" w="9525">
+                  <a14:hiddenLine xmlns="" xmlns:a14="http://schemas.microsoft.com/office/drawing/2010/main" w="9525">
                     <a:solidFill>
                       <a:srgbClr val="000000"/>
                     </a:solidFill>
@@ -11884,7 +11885,7 @@
               </a:ln>
               <a:extLst>
                 <a:ext uri="{91240B29-F687-4f45-9708-019B960494DF}">
-                  <a14:hiddenLine xmlns:a14="http://schemas.microsoft.com/office/drawing/2010/main" xmlns="" w="9525">
+                  <a14:hiddenLine xmlns="" xmlns:a14="http://schemas.microsoft.com/office/drawing/2010/main" w="9525">
                     <a:solidFill>
                       <a:srgbClr val="000000"/>
                     </a:solidFill>
@@ -11974,7 +11975,7 @@
               </a:ln>
               <a:extLst>
                 <a:ext uri="{91240B29-F687-4f45-9708-019B960494DF}">
-                  <a14:hiddenLine xmlns:a14="http://schemas.microsoft.com/office/drawing/2010/main" xmlns="" w="9525">
+                  <a14:hiddenLine xmlns="" xmlns:a14="http://schemas.microsoft.com/office/drawing/2010/main" w="9525">
                     <a:solidFill>
                       <a:srgbClr val="000000"/>
                     </a:solidFill>
@@ -12042,7 +12043,7 @@
               </a:ln>
               <a:extLst>
                 <a:ext uri="{91240B29-F687-4f45-9708-019B960494DF}">
-                  <a14:hiddenLine xmlns:a14="http://schemas.microsoft.com/office/drawing/2010/main" xmlns="" w="9525">
+                  <a14:hiddenLine xmlns="" xmlns:a14="http://schemas.microsoft.com/office/drawing/2010/main" w="9525">
                     <a:solidFill>
                       <a:srgbClr val="000000"/>
                     </a:solidFill>
@@ -12132,7 +12133,7 @@
               </a:ln>
               <a:extLst>
                 <a:ext uri="{91240B29-F687-4f45-9708-019B960494DF}">
-                  <a14:hiddenLine xmlns:a14="http://schemas.microsoft.com/office/drawing/2010/main" xmlns="" w="9525">
+                  <a14:hiddenLine xmlns="" xmlns:a14="http://schemas.microsoft.com/office/drawing/2010/main" w="9525">
                     <a:solidFill>
                       <a:srgbClr val="000000"/>
                     </a:solidFill>
@@ -12200,7 +12201,7 @@
               </a:ln>
               <a:extLst>
                 <a:ext uri="{91240B29-F687-4f45-9708-019B960494DF}">
-                  <a14:hiddenLine xmlns:a14="http://schemas.microsoft.com/office/drawing/2010/main" xmlns="" w="9525">
+                  <a14:hiddenLine xmlns="" xmlns:a14="http://schemas.microsoft.com/office/drawing/2010/main" w="9525">
                     <a:solidFill>
                       <a:srgbClr val="000000"/>
                     </a:solidFill>
@@ -12290,7 +12291,7 @@
               </a:ln>
               <a:extLst>
                 <a:ext uri="{91240B29-F687-4f45-9708-019B960494DF}">
-                  <a14:hiddenLine xmlns:a14="http://schemas.microsoft.com/office/drawing/2010/main" xmlns="" w="9525">
+                  <a14:hiddenLine xmlns="" xmlns:a14="http://schemas.microsoft.com/office/drawing/2010/main" w="9525">
                     <a:solidFill>
                       <a:srgbClr val="000000"/>
                     </a:solidFill>
@@ -12324,7 +12325,7 @@
               </a:ln>
               <a:extLst>
                 <a:ext uri="{91240B29-F687-4f45-9708-019B960494DF}">
-                  <a14:hiddenLine xmlns:a14="http://schemas.microsoft.com/office/drawing/2010/main" xmlns="" w="9525">
+                  <a14:hiddenLine xmlns="" xmlns:a14="http://schemas.microsoft.com/office/drawing/2010/main" w="9525">
                     <a:solidFill>
                       <a:srgbClr val="000000"/>
                     </a:solidFill>
@@ -12464,7 +12465,7 @@
           <a:p>
             <a:fld id="{EC4347D3-4C9A-C240-8F14-750059DFEEB0}" type="datetimeFigureOut">
               <a:rPr lang="en-US" smtClean="0"/>
-              <a:t>1/23/24</a:t>
+              <a:t>1/25/24</a:t>
             </a:fld>
             <a:endParaRPr lang="en-US"/>
           </a:p>
@@ -13169,6 +13170,182 @@
 </p:sld>
 </file>
 
+<file path=ppt/slides/slide3.xml><?xml version="1.0" encoding="utf-8"?>
+<p:sld xmlns:a="http://schemas.openxmlformats.org/drawingml/2006/main" xmlns:r="http://schemas.openxmlformats.org/officeDocument/2006/relationships" xmlns:p="http://schemas.openxmlformats.org/presentationml/2006/main">
+  <p:cSld>
+    <p:spTree>
+      <p:nvGrpSpPr>
+        <p:cNvPr id="1" name=""/>
+        <p:cNvGrpSpPr/>
+        <p:nvPr/>
+      </p:nvGrpSpPr>
+      <p:grpSpPr>
+        <a:xfrm>
+          <a:off x="0" y="0"/>
+          <a:ext cx="0" cy="0"/>
+          <a:chOff x="0" y="0"/>
+          <a:chExt cx="0" cy="0"/>
+        </a:xfrm>
+      </p:grpSpPr>
+      <p:sp>
+        <p:nvSpPr>
+          <p:cNvPr id="6146" name="Rectangle 2"/>
+          <p:cNvSpPr>
+            <a:spLocks noGrp="1" noChangeArrowheads="1"/>
+          </p:cNvSpPr>
+          <p:nvPr>
+            <p:ph type="title"/>
+            <p:custDataLst>
+              <p:tags r:id="rId1"/>
+            </p:custDataLst>
+          </p:nvPr>
+        </p:nvSpPr>
+        <p:spPr>
+          <a:xfrm>
+            <a:off x="1141413" y="284084"/>
+            <a:ext cx="9905998" cy="620791"/>
+          </a:xfrm>
+        </p:spPr>
+        <p:txBody>
+          <a:bodyPr/>
+          <a:lstStyle/>
+          <a:p>
+            <a:pPr algn="ctr"/>
+            <a:r>
+              <a:rPr lang="en-US" dirty="0"/>
+              <a:t>Lecture 2: Tue. Jan. 23</a:t>
+            </a:r>
+          </a:p>
+        </p:txBody>
+      </p:sp>
+      <p:sp>
+        <p:nvSpPr>
+          <p:cNvPr id="6147" name="Rectangle 3"/>
+          <p:cNvSpPr>
+            <a:spLocks noGrp="1" noChangeArrowheads="1"/>
+          </p:cNvSpPr>
+          <p:nvPr>
+            <p:ph idx="1"/>
+            <p:custDataLst>
+              <p:tags r:id="rId2"/>
+            </p:custDataLst>
+          </p:nvPr>
+        </p:nvSpPr>
+        <p:spPr>
+          <a:xfrm>
+            <a:off x="1141413" y="1123950"/>
+            <a:ext cx="9970724" cy="5149850"/>
+          </a:xfrm>
+        </p:spPr>
+        <p:txBody>
+          <a:bodyPr>
+            <a:normAutofit lnSpcReduction="10000"/>
+          </a:bodyPr>
+          <a:lstStyle/>
+          <a:p>
+            <a:r>
+              <a:rPr lang="en-US" dirty="0"/>
+              <a:t>DMT2 is </a:t>
+            </a:r>
+            <a:r>
+              <a:rPr lang="en-US" b="1" i="1" u="sng" dirty="0"/>
+              <a:t>going to be great</a:t>
+            </a:r>
+            <a:r>
+              <a:rPr lang="en-US" dirty="0"/>
+              <a:t>! Let’s learn a lot of stuff together!</a:t>
+            </a:r>
+          </a:p>
+          <a:p>
+            <a:r>
+              <a:rPr lang="en-US" dirty="0"/>
+              <a:t>All OH have been posted and start today. TA OH are held in Thornton Stacks (this is a change from the previously listed Rice 442)!</a:t>
+            </a:r>
+          </a:p>
+          <a:p>
+            <a:r>
+              <a:rPr lang="en-US" b="1" i="1" u="sng" dirty="0"/>
+              <a:t>Homework deadlines </a:t>
+            </a:r>
+            <a:r>
+              <a:rPr lang="en-US" dirty="0"/>
+              <a:t>are set on the website. The first module 1 homework (Introduction) is due next Thursday.</a:t>
+            </a:r>
+          </a:p>
+          <a:p>
+            <a:r>
+              <a:rPr lang="en-US" dirty="0"/>
+              <a:t>The first quiz is two weeks from today!</a:t>
+            </a:r>
+          </a:p>
+          <a:p>
+            <a:r>
+              <a:rPr lang="en-US" dirty="0"/>
+              <a:t>The other </a:t>
+            </a:r>
+            <a:r>
+              <a:rPr lang="en-US" dirty="0" err="1"/>
+              <a:t>homeworks</a:t>
+            </a:r>
+            <a:r>
+              <a:rPr lang="en-US" dirty="0"/>
+              <a:t> will be written and rolled out very soon.</a:t>
+            </a:r>
+          </a:p>
+          <a:p>
+            <a:r>
+              <a:rPr lang="en-US" dirty="0"/>
+              <a:t>Recording audio seems to have been corrected.</a:t>
+            </a:r>
+          </a:p>
+          <a:p>
+            <a:r>
+              <a:rPr lang="en-US" dirty="0"/>
+              <a:t>Today we will continue with module 1, a little bit more review + discussing cardinality of infinite sets!</a:t>
+            </a:r>
+          </a:p>
+          <a:p>
+            <a:endParaRPr lang="en-US" dirty="0"/>
+          </a:p>
+        </p:txBody>
+      </p:sp>
+      <p:sp>
+        <p:nvSpPr>
+          <p:cNvPr id="4" name="Slide Number Placeholder 3"/>
+          <p:cNvSpPr>
+            <a:spLocks noGrp="1"/>
+          </p:cNvSpPr>
+          <p:nvPr>
+            <p:ph type="sldNum" sz="quarter" idx="12"/>
+          </p:nvPr>
+        </p:nvSpPr>
+        <p:spPr/>
+        <p:txBody>
+          <a:bodyPr/>
+          <a:lstStyle/>
+          <a:p>
+            <a:fld id="{F26D9103-0C5C-48AC-B68E-3ED2C1647047}" type="slidenum">
+              <a:rPr lang="en-US" smtClean="0"/>
+              <a:pPr/>
+              <a:t>3</a:t>
+            </a:fld>
+            <a:endParaRPr lang="en-US" dirty="0"/>
+          </a:p>
+        </p:txBody>
+      </p:sp>
+    </p:spTree>
+    <p:extLst>
+      <p:ext uri="{BB962C8B-B14F-4D97-AF65-F5344CB8AC3E}">
+        <p14:creationId xmlns:p14="http://schemas.microsoft.com/office/powerpoint/2010/main" val="45378344"/>
+      </p:ext>
+    </p:extLst>
+  </p:cSld>
+  <p:clrMapOvr>
+    <a:masterClrMapping/>
+  </p:clrMapOvr>
+</p:sld>
+</file>
+
 <file path=ppt/tags/tag1.xml><?xml version="1.0" encoding="utf-8"?>
 <p:tagLst xmlns:a="http://schemas.openxmlformats.org/drawingml/2006/main" xmlns:r="http://schemas.openxmlformats.org/officeDocument/2006/relationships" xmlns:p="http://schemas.openxmlformats.org/presentationml/2006/main">
   <p:tag name="_INSTRUCTOR VIEW19C14C36-AC8E-43BC-9DB6-C2AAF774C7DC|PANE__TAG" val="_"/>
@@ -13176,6 +13353,18 @@
 </file>
 
 <file path=ppt/tags/tag2.xml><?xml version="1.0" encoding="utf-8"?>
+<p:tagLst xmlns:a="http://schemas.openxmlformats.org/drawingml/2006/main" xmlns:r="http://schemas.openxmlformats.org/officeDocument/2006/relationships" xmlns:p="http://schemas.openxmlformats.org/presentationml/2006/main">
+  <p:tag name="_INSTRUCTOR VIEW19C14C36-AC8E-43BC-9DB6-C2AAF774C7DC|PANE__TAG" val="_"/>
+</p:tagLst>
+</file>
+
+<file path=ppt/tags/tag3.xml><?xml version="1.0" encoding="utf-8"?>
+<p:tagLst xmlns:a="http://schemas.openxmlformats.org/drawingml/2006/main" xmlns:r="http://schemas.openxmlformats.org/officeDocument/2006/relationships" xmlns:p="http://schemas.openxmlformats.org/presentationml/2006/main">
+  <p:tag name="_INSTRUCTOR VIEW19C14C36-AC8E-43BC-9DB6-C2AAF774C7DC|PANE__TAG" val="_"/>
+</p:tagLst>
+</file>
+
+<file path=ppt/tags/tag4.xml><?xml version="1.0" encoding="utf-8"?>
 <p:tagLst xmlns:a="http://schemas.openxmlformats.org/drawingml/2006/main" xmlns:r="http://schemas.openxmlformats.org/officeDocument/2006/relationships" xmlns:p="http://schemas.openxmlformats.org/presentationml/2006/main">
   <p:tag name="_INSTRUCTOR VIEW19C14C36-AC8E-43BC-9DB6-C2AAF774C7DC|PANE__TAG" val="_"/>
 </p:tagLst>

</xml_diff>

<commit_message>
announcements, small fixes to TM slides
</commit_message>
<xml_diff>
--- a/slides/00-DailyAnnouncements.pptx
+++ b/slides/00-DailyAnnouncements.pptx
@@ -5,7 +5,7 @@
     <p:sldMasterId id="2147484006" r:id="rId1"/>
   </p:sldMasterIdLst>
   <p:notesMasterIdLst>
-    <p:notesMasterId r:id="rId16"/>
+    <p:notesMasterId r:id="rId17"/>
   </p:notesMasterIdLst>
   <p:sldIdLst>
     <p:sldId id="256" r:id="rId2"/>
@@ -22,6 +22,7 @@
     <p:sldId id="515" r:id="rId13"/>
     <p:sldId id="516" r:id="rId14"/>
     <p:sldId id="517" r:id="rId15"/>
+    <p:sldId id="518" r:id="rId16"/>
   </p:sldIdLst>
   <p:sldSz cx="12192000" cy="6858000"/>
   <p:notesSz cx="6858000" cy="9144000"/>
@@ -210,7 +211,7 @@
           <a:p>
             <a:fld id="{C5B45307-6ED4-B142-BD64-10F739779302}" type="datetimeFigureOut">
               <a:rPr lang="en-US" smtClean="0"/>
-              <a:t>3/19/24</a:t>
+              <a:t>3/21/24</a:t>
             </a:fld>
             <a:endParaRPr lang="en-US"/>
           </a:p>
@@ -618,7 +619,7 @@
           <a:noFill/>
           <a:extLst>
             <a:ext uri="{909E8E84-426E-40dd-AFC4-6F175D3DCCD1}">
-              <a14:hiddenFill xmlns="" xmlns:a14="http://schemas.microsoft.com/office/drawing/2010/main">
+              <a14:hiddenFill xmlns:a14="http://schemas.microsoft.com/office/drawing/2010/main" xmlns="">
                 <a:solidFill>
                   <a:srgbClr val="FFFFFF"/>
                 </a:solidFill>
@@ -677,7 +678,7 @@
             </a:ln>
             <a:extLst>
               <a:ext uri="{91240B29-F687-4f45-9708-019B960494DF}">
-                <a14:hiddenLine xmlns="" xmlns:a14="http://schemas.microsoft.com/office/drawing/2010/main" w="9525">
+                <a14:hiddenLine xmlns:a14="http://schemas.microsoft.com/office/drawing/2010/main" xmlns="" w="9525">
                   <a:solidFill>
                     <a:srgbClr val="000000"/>
                   </a:solidFill>
@@ -767,7 +768,7 @@
             </a:ln>
             <a:extLst>
               <a:ext uri="{91240B29-F687-4f45-9708-019B960494DF}">
-                <a14:hiddenLine xmlns="" xmlns:a14="http://schemas.microsoft.com/office/drawing/2010/main" w="9525">
+                <a14:hiddenLine xmlns:a14="http://schemas.microsoft.com/office/drawing/2010/main" xmlns="" w="9525">
                   <a:solidFill>
                     <a:srgbClr val="000000"/>
                   </a:solidFill>
@@ -857,7 +858,7 @@
             </a:ln>
             <a:extLst>
               <a:ext uri="{91240B29-F687-4f45-9708-019B960494DF}">
-                <a14:hiddenLine xmlns="" xmlns:a14="http://schemas.microsoft.com/office/drawing/2010/main" w="9525">
+                <a14:hiddenLine xmlns:a14="http://schemas.microsoft.com/office/drawing/2010/main" xmlns="" w="9525">
                   <a:solidFill>
                     <a:srgbClr val="000000"/>
                   </a:solidFill>
@@ -891,7 +892,7 @@
             </a:ln>
             <a:extLst>
               <a:ext uri="{91240B29-F687-4f45-9708-019B960494DF}">
-                <a14:hiddenLine xmlns="" xmlns:a14="http://schemas.microsoft.com/office/drawing/2010/main" w="9525">
+                <a14:hiddenLine xmlns:a14="http://schemas.microsoft.com/office/drawing/2010/main" xmlns="" w="9525">
                   <a:solidFill>
                     <a:srgbClr val="000000"/>
                   </a:solidFill>
@@ -981,7 +982,7 @@
             </a:ln>
             <a:extLst>
               <a:ext uri="{91240B29-F687-4f45-9708-019B960494DF}">
-                <a14:hiddenLine xmlns="" xmlns:a14="http://schemas.microsoft.com/office/drawing/2010/main" w="9525">
+                <a14:hiddenLine xmlns:a14="http://schemas.microsoft.com/office/drawing/2010/main" xmlns="" w="9525">
                   <a:solidFill>
                     <a:srgbClr val="000000"/>
                   </a:solidFill>
@@ -1043,7 +1044,7 @@
             </a:ln>
             <a:extLst>
               <a:ext uri="{91240B29-F687-4f45-9708-019B960494DF}">
-                <a14:hiddenLine xmlns="" xmlns:a14="http://schemas.microsoft.com/office/drawing/2010/main" w="9525">
+                <a14:hiddenLine xmlns:a14="http://schemas.microsoft.com/office/drawing/2010/main" xmlns="" w="9525">
                   <a:solidFill>
                     <a:srgbClr val="000000"/>
                   </a:solidFill>
@@ -1105,7 +1106,7 @@
             </a:ln>
             <a:extLst>
               <a:ext uri="{91240B29-F687-4f45-9708-019B960494DF}">
-                <a14:hiddenLine xmlns="" xmlns:a14="http://schemas.microsoft.com/office/drawing/2010/main" w="9525">
+                <a14:hiddenLine xmlns:a14="http://schemas.microsoft.com/office/drawing/2010/main" xmlns="" w="9525">
                   <a:solidFill>
                     <a:srgbClr val="000000"/>
                   </a:solidFill>
@@ -1195,7 +1196,7 @@
             </a:ln>
             <a:extLst>
               <a:ext uri="{91240B29-F687-4f45-9708-019B960494DF}">
-                <a14:hiddenLine xmlns="" xmlns:a14="http://schemas.microsoft.com/office/drawing/2010/main" w="9525">
+                <a14:hiddenLine xmlns:a14="http://schemas.microsoft.com/office/drawing/2010/main" xmlns="" w="9525">
                   <a:solidFill>
                     <a:srgbClr val="000000"/>
                   </a:solidFill>
@@ -1257,7 +1258,7 @@
             </a:ln>
             <a:extLst>
               <a:ext uri="{91240B29-F687-4f45-9708-019B960494DF}">
-                <a14:hiddenLine xmlns="" xmlns:a14="http://schemas.microsoft.com/office/drawing/2010/main" w="9525">
+                <a14:hiddenLine xmlns:a14="http://schemas.microsoft.com/office/drawing/2010/main" xmlns="" w="9525">
                   <a:solidFill>
                     <a:srgbClr val="000000"/>
                   </a:solidFill>
@@ -1319,7 +1320,7 @@
             </a:ln>
             <a:extLst>
               <a:ext uri="{91240B29-F687-4f45-9708-019B960494DF}">
-                <a14:hiddenLine xmlns="" xmlns:a14="http://schemas.microsoft.com/office/drawing/2010/main" w="9525">
+                <a14:hiddenLine xmlns:a14="http://schemas.microsoft.com/office/drawing/2010/main" xmlns="" w="9525">
                   <a:solidFill>
                     <a:srgbClr val="000000"/>
                   </a:solidFill>
@@ -1409,7 +1410,7 @@
             </a:ln>
             <a:extLst>
               <a:ext uri="{91240B29-F687-4f45-9708-019B960494DF}">
-                <a14:hiddenLine xmlns="" xmlns:a14="http://schemas.microsoft.com/office/drawing/2010/main" w="9525">
+                <a14:hiddenLine xmlns:a14="http://schemas.microsoft.com/office/drawing/2010/main" xmlns="" w="9525">
                   <a:solidFill>
                     <a:srgbClr val="000000"/>
                   </a:solidFill>
@@ -1499,7 +1500,7 @@
             </a:ln>
             <a:extLst>
               <a:ext uri="{91240B29-F687-4f45-9708-019B960494DF}">
-                <a14:hiddenLine xmlns="" xmlns:a14="http://schemas.microsoft.com/office/drawing/2010/main" w="9525">
+                <a14:hiddenLine xmlns:a14="http://schemas.microsoft.com/office/drawing/2010/main" xmlns="" w="9525">
                   <a:solidFill>
                     <a:srgbClr val="000000"/>
                   </a:solidFill>
@@ -1561,7 +1562,7 @@
             </a:ln>
             <a:extLst>
               <a:ext uri="{91240B29-F687-4f45-9708-019B960494DF}">
-                <a14:hiddenLine xmlns="" xmlns:a14="http://schemas.microsoft.com/office/drawing/2010/main" w="9525">
+                <a14:hiddenLine xmlns:a14="http://schemas.microsoft.com/office/drawing/2010/main" xmlns="" w="9525">
                   <a:solidFill>
                     <a:srgbClr val="000000"/>
                   </a:solidFill>
@@ -1671,7 +1672,7 @@
             </a:ln>
             <a:extLst>
               <a:ext uri="{91240B29-F687-4f45-9708-019B960494DF}">
-                <a14:hiddenLine xmlns="" xmlns:a14="http://schemas.microsoft.com/office/drawing/2010/main" w="9525">
+                <a14:hiddenLine xmlns:a14="http://schemas.microsoft.com/office/drawing/2010/main" xmlns="" w="9525">
                   <a:solidFill>
                     <a:srgbClr val="000000"/>
                   </a:solidFill>
@@ -1733,7 +1734,7 @@
             </a:ln>
             <a:extLst>
               <a:ext uri="{91240B29-F687-4f45-9708-019B960494DF}">
-                <a14:hiddenLine xmlns="" xmlns:a14="http://schemas.microsoft.com/office/drawing/2010/main" w="9525">
+                <a14:hiddenLine xmlns:a14="http://schemas.microsoft.com/office/drawing/2010/main" xmlns="" w="9525">
                   <a:solidFill>
                     <a:srgbClr val="000000"/>
                   </a:solidFill>
@@ -1823,7 +1824,7 @@
             </a:ln>
             <a:extLst>
               <a:ext uri="{91240B29-F687-4f45-9708-019B960494DF}">
-                <a14:hiddenLine xmlns="" xmlns:a14="http://schemas.microsoft.com/office/drawing/2010/main" w="9525">
+                <a14:hiddenLine xmlns:a14="http://schemas.microsoft.com/office/drawing/2010/main" xmlns="" w="9525">
                   <a:solidFill>
                     <a:srgbClr val="000000"/>
                   </a:solidFill>
@@ -1913,7 +1914,7 @@
             </a:ln>
             <a:extLst>
               <a:ext uri="{91240B29-F687-4f45-9708-019B960494DF}">
-                <a14:hiddenLine xmlns="" xmlns:a14="http://schemas.microsoft.com/office/drawing/2010/main" w="9525">
+                <a14:hiddenLine xmlns:a14="http://schemas.microsoft.com/office/drawing/2010/main" xmlns="" w="9525">
                   <a:solidFill>
                     <a:srgbClr val="000000"/>
                   </a:solidFill>
@@ -1975,7 +1976,7 @@
             </a:ln>
             <a:extLst>
               <a:ext uri="{91240B29-F687-4f45-9708-019B960494DF}">
-                <a14:hiddenLine xmlns="" xmlns:a14="http://schemas.microsoft.com/office/drawing/2010/main" w="9525">
+                <a14:hiddenLine xmlns:a14="http://schemas.microsoft.com/office/drawing/2010/main" xmlns="" w="9525">
                   <a:solidFill>
                     <a:srgbClr val="000000"/>
                   </a:solidFill>
@@ -2065,7 +2066,7 @@
             </a:ln>
             <a:extLst>
               <a:ext uri="{91240B29-F687-4f45-9708-019B960494DF}">
-                <a14:hiddenLine xmlns="" xmlns:a14="http://schemas.microsoft.com/office/drawing/2010/main" w="9525">
+                <a14:hiddenLine xmlns:a14="http://schemas.microsoft.com/office/drawing/2010/main" xmlns="" w="9525">
                   <a:solidFill>
                     <a:srgbClr val="000000"/>
                   </a:solidFill>
@@ -2155,7 +2156,7 @@
             </a:ln>
             <a:extLst>
               <a:ext uri="{91240B29-F687-4f45-9708-019B960494DF}">
-                <a14:hiddenLine xmlns="" xmlns:a14="http://schemas.microsoft.com/office/drawing/2010/main" w="9525">
+                <a14:hiddenLine xmlns:a14="http://schemas.microsoft.com/office/drawing/2010/main" xmlns="" w="9525">
                   <a:solidFill>
                     <a:srgbClr val="000000"/>
                   </a:solidFill>
@@ -2211,7 +2212,7 @@
             </a:ln>
             <a:extLst>
               <a:ext uri="{91240B29-F687-4f45-9708-019B960494DF}">
-                <a14:hiddenLine xmlns="" xmlns:a14="http://schemas.microsoft.com/office/drawing/2010/main" w="9525">
+                <a14:hiddenLine xmlns:a14="http://schemas.microsoft.com/office/drawing/2010/main" xmlns="" w="9525">
                   <a:solidFill>
                     <a:srgbClr val="000000"/>
                   </a:solidFill>
@@ -2301,7 +2302,7 @@
             </a:ln>
             <a:extLst>
               <a:ext uri="{91240B29-F687-4f45-9708-019B960494DF}">
-                <a14:hiddenLine xmlns="" xmlns:a14="http://schemas.microsoft.com/office/drawing/2010/main" w="9525">
+                <a14:hiddenLine xmlns:a14="http://schemas.microsoft.com/office/drawing/2010/main" xmlns="" w="9525">
                   <a:solidFill>
                     <a:srgbClr val="000000"/>
                   </a:solidFill>
@@ -2357,7 +2358,7 @@
             </a:ln>
             <a:extLst>
               <a:ext uri="{91240B29-F687-4f45-9708-019B960494DF}">
-                <a14:hiddenLine xmlns="" xmlns:a14="http://schemas.microsoft.com/office/drawing/2010/main" w="9525">
+                <a14:hiddenLine xmlns:a14="http://schemas.microsoft.com/office/drawing/2010/main" xmlns="" w="9525">
                   <a:solidFill>
                     <a:srgbClr val="000000"/>
                   </a:solidFill>
@@ -2447,7 +2448,7 @@
             </a:ln>
             <a:extLst>
               <a:ext uri="{91240B29-F687-4f45-9708-019B960494DF}">
-                <a14:hiddenLine xmlns="" xmlns:a14="http://schemas.microsoft.com/office/drawing/2010/main" w="9525">
+                <a14:hiddenLine xmlns:a14="http://schemas.microsoft.com/office/drawing/2010/main" xmlns="" w="9525">
                   <a:solidFill>
                     <a:srgbClr val="000000"/>
                   </a:solidFill>
@@ -2515,7 +2516,7 @@
             </a:ln>
             <a:extLst>
               <a:ext uri="{91240B29-F687-4f45-9708-019B960494DF}">
-                <a14:hiddenLine xmlns="" xmlns:a14="http://schemas.microsoft.com/office/drawing/2010/main" w="9525">
+                <a14:hiddenLine xmlns:a14="http://schemas.microsoft.com/office/drawing/2010/main" xmlns="" w="9525">
                   <a:solidFill>
                     <a:srgbClr val="000000"/>
                   </a:solidFill>
@@ -2605,7 +2606,7 @@
             </a:ln>
             <a:extLst>
               <a:ext uri="{91240B29-F687-4f45-9708-019B960494DF}">
-                <a14:hiddenLine xmlns="" xmlns:a14="http://schemas.microsoft.com/office/drawing/2010/main" w="9525">
+                <a14:hiddenLine xmlns:a14="http://schemas.microsoft.com/office/drawing/2010/main" xmlns="" w="9525">
                   <a:solidFill>
                     <a:srgbClr val="000000"/>
                   </a:solidFill>
@@ -2673,7 +2674,7 @@
             </a:ln>
             <a:extLst>
               <a:ext uri="{91240B29-F687-4f45-9708-019B960494DF}">
-                <a14:hiddenLine xmlns="" xmlns:a14="http://schemas.microsoft.com/office/drawing/2010/main" w="9525">
+                <a14:hiddenLine xmlns:a14="http://schemas.microsoft.com/office/drawing/2010/main" xmlns="" w="9525">
                   <a:solidFill>
                     <a:srgbClr val="000000"/>
                   </a:solidFill>
@@ -2763,7 +2764,7 @@
             </a:ln>
             <a:extLst>
               <a:ext uri="{91240B29-F687-4f45-9708-019B960494DF}">
-                <a14:hiddenLine xmlns="" xmlns:a14="http://schemas.microsoft.com/office/drawing/2010/main" w="9525">
+                <a14:hiddenLine xmlns:a14="http://schemas.microsoft.com/office/drawing/2010/main" xmlns="" w="9525">
                   <a:solidFill>
                     <a:srgbClr val="000000"/>
                   </a:solidFill>
@@ -2797,7 +2798,7 @@
             </a:ln>
             <a:extLst>
               <a:ext uri="{91240B29-F687-4f45-9708-019B960494DF}">
-                <a14:hiddenLine xmlns="" xmlns:a14="http://schemas.microsoft.com/office/drawing/2010/main" w="9525">
+                <a14:hiddenLine xmlns:a14="http://schemas.microsoft.com/office/drawing/2010/main" xmlns="" w="9525">
                   <a:solidFill>
                     <a:srgbClr val="000000"/>
                   </a:solidFill>
@@ -2887,7 +2888,7 @@
             </a:ln>
             <a:extLst>
               <a:ext uri="{91240B29-F687-4f45-9708-019B960494DF}">
-                <a14:hiddenLine xmlns="" xmlns:a14="http://schemas.microsoft.com/office/drawing/2010/main" w="9525">
+                <a14:hiddenLine xmlns:a14="http://schemas.microsoft.com/office/drawing/2010/main" xmlns="" w="9525">
                   <a:solidFill>
                     <a:srgbClr val="000000"/>
                   </a:solidFill>
@@ -2949,7 +2950,7 @@
             </a:ln>
             <a:extLst>
               <a:ext uri="{91240B29-F687-4f45-9708-019B960494DF}">
-                <a14:hiddenLine xmlns="" xmlns:a14="http://schemas.microsoft.com/office/drawing/2010/main" w="9525">
+                <a14:hiddenLine xmlns:a14="http://schemas.microsoft.com/office/drawing/2010/main" xmlns="" w="9525">
                   <a:solidFill>
                     <a:srgbClr val="000000"/>
                   </a:solidFill>
@@ -3011,7 +3012,7 @@
             </a:ln>
             <a:extLst>
               <a:ext uri="{91240B29-F687-4f45-9708-019B960494DF}">
-                <a14:hiddenLine xmlns="" xmlns:a14="http://schemas.microsoft.com/office/drawing/2010/main" w="9525">
+                <a14:hiddenLine xmlns:a14="http://schemas.microsoft.com/office/drawing/2010/main" xmlns="" w="9525">
                   <a:solidFill>
                     <a:srgbClr val="000000"/>
                   </a:solidFill>
@@ -3101,7 +3102,7 @@
             </a:ln>
             <a:extLst>
               <a:ext uri="{91240B29-F687-4f45-9708-019B960494DF}">
-                <a14:hiddenLine xmlns="" xmlns:a14="http://schemas.microsoft.com/office/drawing/2010/main" w="9525">
+                <a14:hiddenLine xmlns:a14="http://schemas.microsoft.com/office/drawing/2010/main" xmlns="" w="9525">
                   <a:solidFill>
                     <a:srgbClr val="000000"/>
                   </a:solidFill>
@@ -3169,7 +3170,7 @@
             </a:ln>
             <a:extLst>
               <a:ext uri="{91240B29-F687-4f45-9708-019B960494DF}">
-                <a14:hiddenLine xmlns="" xmlns:a14="http://schemas.microsoft.com/office/drawing/2010/main" w="9525">
+                <a14:hiddenLine xmlns:a14="http://schemas.microsoft.com/office/drawing/2010/main" xmlns="" w="9525">
                   <a:solidFill>
                     <a:srgbClr val="000000"/>
                   </a:solidFill>
@@ -3231,7 +3232,7 @@
             </a:ln>
             <a:extLst>
               <a:ext uri="{91240B29-F687-4f45-9708-019B960494DF}">
-                <a14:hiddenLine xmlns="" xmlns:a14="http://schemas.microsoft.com/office/drawing/2010/main" w="9525">
+                <a14:hiddenLine xmlns:a14="http://schemas.microsoft.com/office/drawing/2010/main" xmlns="" w="9525">
                   <a:solidFill>
                     <a:srgbClr val="000000"/>
                   </a:solidFill>
@@ -3321,7 +3322,7 @@
             </a:ln>
             <a:extLst>
               <a:ext uri="{91240B29-F687-4f45-9708-019B960494DF}">
-                <a14:hiddenLine xmlns="" xmlns:a14="http://schemas.microsoft.com/office/drawing/2010/main" w="9525">
+                <a14:hiddenLine xmlns:a14="http://schemas.microsoft.com/office/drawing/2010/main" xmlns="" w="9525">
                   <a:solidFill>
                     <a:srgbClr val="000000"/>
                   </a:solidFill>
@@ -3383,7 +3384,7 @@
             </a:ln>
             <a:extLst>
               <a:ext uri="{91240B29-F687-4f45-9708-019B960494DF}">
-                <a14:hiddenLine xmlns="" xmlns:a14="http://schemas.microsoft.com/office/drawing/2010/main" w="9525">
+                <a14:hiddenLine xmlns:a14="http://schemas.microsoft.com/office/drawing/2010/main" xmlns="" w="9525">
                   <a:solidFill>
                     <a:srgbClr val="000000"/>
                   </a:solidFill>
@@ -3473,7 +3474,7 @@
             </a:ln>
             <a:extLst>
               <a:ext uri="{91240B29-F687-4f45-9708-019B960494DF}">
-                <a14:hiddenLine xmlns="" xmlns:a14="http://schemas.microsoft.com/office/drawing/2010/main" w="9525">
+                <a14:hiddenLine xmlns:a14="http://schemas.microsoft.com/office/drawing/2010/main" xmlns="" w="9525">
                   <a:solidFill>
                     <a:srgbClr val="000000"/>
                   </a:solidFill>
@@ -3535,7 +3536,7 @@
             </a:ln>
             <a:extLst>
               <a:ext uri="{91240B29-F687-4f45-9708-019B960494DF}">
-                <a14:hiddenLine xmlns="" xmlns:a14="http://schemas.microsoft.com/office/drawing/2010/main" w="9525">
+                <a14:hiddenLine xmlns:a14="http://schemas.microsoft.com/office/drawing/2010/main" xmlns="" w="9525">
                   <a:solidFill>
                     <a:srgbClr val="000000"/>
                   </a:solidFill>
@@ -3625,7 +3626,7 @@
             </a:ln>
             <a:extLst>
               <a:ext uri="{91240B29-F687-4f45-9708-019B960494DF}">
-                <a14:hiddenLine xmlns="" xmlns:a14="http://schemas.microsoft.com/office/drawing/2010/main" w="9525">
+                <a14:hiddenLine xmlns:a14="http://schemas.microsoft.com/office/drawing/2010/main" xmlns="" w="9525">
                   <a:solidFill>
                     <a:srgbClr val="000000"/>
                   </a:solidFill>
@@ -3659,7 +3660,7 @@
             </a:ln>
             <a:extLst>
               <a:ext uri="{91240B29-F687-4f45-9708-019B960494DF}">
-                <a14:hiddenLine xmlns="" xmlns:a14="http://schemas.microsoft.com/office/drawing/2010/main" w="9525">
+                <a14:hiddenLine xmlns:a14="http://schemas.microsoft.com/office/drawing/2010/main" xmlns="" w="9525">
                   <a:solidFill>
                     <a:srgbClr val="000000"/>
                   </a:solidFill>
@@ -3724,7 +3725,7 @@
             </a:ln>
             <a:extLst>
               <a:ext uri="{91240B29-F687-4f45-9708-019B960494DF}">
-                <a14:hiddenLine xmlns="" xmlns:a14="http://schemas.microsoft.com/office/drawing/2010/main" w="9525">
+                <a14:hiddenLine xmlns:a14="http://schemas.microsoft.com/office/drawing/2010/main" xmlns="" w="9525">
                   <a:solidFill>
                     <a:srgbClr val="000000"/>
                   </a:solidFill>
@@ -3814,7 +3815,7 @@
             </a:ln>
             <a:extLst>
               <a:ext uri="{91240B29-F687-4f45-9708-019B960494DF}">
-                <a14:hiddenLine xmlns="" xmlns:a14="http://schemas.microsoft.com/office/drawing/2010/main" w="9525">
+                <a14:hiddenLine xmlns:a14="http://schemas.microsoft.com/office/drawing/2010/main" xmlns="" w="9525">
                   <a:solidFill>
                     <a:srgbClr val="000000"/>
                   </a:solidFill>
@@ -3876,7 +3877,7 @@
             </a:ln>
             <a:extLst>
               <a:ext uri="{91240B29-F687-4f45-9708-019B960494DF}">
-                <a14:hiddenLine xmlns="" xmlns:a14="http://schemas.microsoft.com/office/drawing/2010/main" w="9525">
+                <a14:hiddenLine xmlns:a14="http://schemas.microsoft.com/office/drawing/2010/main" xmlns="" w="9525">
                   <a:solidFill>
                     <a:srgbClr val="000000"/>
                   </a:solidFill>
@@ -3966,7 +3967,7 @@
             </a:ln>
             <a:extLst>
               <a:ext uri="{91240B29-F687-4f45-9708-019B960494DF}">
-                <a14:hiddenLine xmlns="" xmlns:a14="http://schemas.microsoft.com/office/drawing/2010/main" w="9525">
+                <a14:hiddenLine xmlns:a14="http://schemas.microsoft.com/office/drawing/2010/main" xmlns="" w="9525">
                   <a:solidFill>
                     <a:srgbClr val="000000"/>
                   </a:solidFill>
@@ -4056,7 +4057,7 @@
             </a:ln>
             <a:extLst>
               <a:ext uri="{91240B29-F687-4f45-9708-019B960494DF}">
-                <a14:hiddenLine xmlns="" xmlns:a14="http://schemas.microsoft.com/office/drawing/2010/main" w="9525">
+                <a14:hiddenLine xmlns:a14="http://schemas.microsoft.com/office/drawing/2010/main" xmlns="" w="9525">
                   <a:solidFill>
                     <a:srgbClr val="000000"/>
                   </a:solidFill>
@@ -4121,7 +4122,7 @@
             </a:ln>
             <a:extLst>
               <a:ext uri="{91240B29-F687-4f45-9708-019B960494DF}">
-                <a14:hiddenLine xmlns="" xmlns:a14="http://schemas.microsoft.com/office/drawing/2010/main" w="9525">
+                <a14:hiddenLine xmlns:a14="http://schemas.microsoft.com/office/drawing/2010/main" xmlns="" w="9525">
                   <a:solidFill>
                     <a:srgbClr val="000000"/>
                   </a:solidFill>
@@ -4183,7 +4184,7 @@
             </a:ln>
             <a:extLst>
               <a:ext uri="{91240B29-F687-4f45-9708-019B960494DF}">
-                <a14:hiddenLine xmlns="" xmlns:a14="http://schemas.microsoft.com/office/drawing/2010/main" w="9525">
+                <a14:hiddenLine xmlns:a14="http://schemas.microsoft.com/office/drawing/2010/main" xmlns="" w="9525">
                   <a:solidFill>
                     <a:srgbClr val="000000"/>
                   </a:solidFill>
@@ -4273,7 +4274,7 @@
             </a:ln>
             <a:extLst>
               <a:ext uri="{91240B29-F687-4f45-9708-019B960494DF}">
-                <a14:hiddenLine xmlns="" xmlns:a14="http://schemas.microsoft.com/office/drawing/2010/main" w="9525">
+                <a14:hiddenLine xmlns:a14="http://schemas.microsoft.com/office/drawing/2010/main" xmlns="" w="9525">
                   <a:solidFill>
                     <a:srgbClr val="000000"/>
                   </a:solidFill>
@@ -4363,7 +4364,7 @@
             </a:ln>
             <a:extLst>
               <a:ext uri="{91240B29-F687-4f45-9708-019B960494DF}">
-                <a14:hiddenLine xmlns="" xmlns:a14="http://schemas.microsoft.com/office/drawing/2010/main" w="9525">
+                <a14:hiddenLine xmlns:a14="http://schemas.microsoft.com/office/drawing/2010/main" xmlns="" w="9525">
                   <a:solidFill>
                     <a:srgbClr val="000000"/>
                   </a:solidFill>
@@ -4425,7 +4426,7 @@
             </a:ln>
             <a:extLst>
               <a:ext uri="{91240B29-F687-4f45-9708-019B960494DF}">
-                <a14:hiddenLine xmlns="" xmlns:a14="http://schemas.microsoft.com/office/drawing/2010/main" w="9525">
+                <a14:hiddenLine xmlns:a14="http://schemas.microsoft.com/office/drawing/2010/main" xmlns="" w="9525">
                   <a:solidFill>
                     <a:srgbClr val="000000"/>
                   </a:solidFill>
@@ -4545,7 +4546,7 @@
             </a:ln>
             <a:extLst>
               <a:ext uri="{91240B29-F687-4f45-9708-019B960494DF}">
-                <a14:hiddenLine xmlns="" xmlns:a14="http://schemas.microsoft.com/office/drawing/2010/main" w="9525">
+                <a14:hiddenLine xmlns:a14="http://schemas.microsoft.com/office/drawing/2010/main" xmlns="" w="9525">
                   <a:solidFill>
                     <a:srgbClr val="000000"/>
                   </a:solidFill>
@@ -4613,7 +4614,7 @@
             </a:ln>
             <a:extLst>
               <a:ext uri="{91240B29-F687-4f45-9708-019B960494DF}">
-                <a14:hiddenLine xmlns="" xmlns:a14="http://schemas.microsoft.com/office/drawing/2010/main" w="9525">
+                <a14:hiddenLine xmlns:a14="http://schemas.microsoft.com/office/drawing/2010/main" xmlns="" w="9525">
                   <a:solidFill>
                     <a:srgbClr val="000000"/>
                   </a:solidFill>
@@ -4703,7 +4704,7 @@
             </a:ln>
             <a:extLst>
               <a:ext uri="{91240B29-F687-4f45-9708-019B960494DF}">
-                <a14:hiddenLine xmlns="" xmlns:a14="http://schemas.microsoft.com/office/drawing/2010/main" w="9525">
+                <a14:hiddenLine xmlns:a14="http://schemas.microsoft.com/office/drawing/2010/main" xmlns="" w="9525">
                   <a:solidFill>
                     <a:srgbClr val="000000"/>
                   </a:solidFill>
@@ -4843,7 +4844,7 @@
           <a:p>
             <a:fld id="{EC4347D3-4C9A-C240-8F14-750059DFEEB0}" type="datetimeFigureOut">
               <a:rPr lang="en-US" smtClean="0"/>
-              <a:t>3/19/24</a:t>
+              <a:t>3/21/24</a:t>
             </a:fld>
             <a:endParaRPr lang="en-US"/>
           </a:p>
@@ -5110,7 +5111,7 @@
           <a:p>
             <a:fld id="{EC4347D3-4C9A-C240-8F14-750059DFEEB0}" type="datetimeFigureOut">
               <a:rPr lang="en-US" smtClean="0"/>
-              <a:t>3/19/24</a:t>
+              <a:t>3/21/24</a:t>
             </a:fld>
             <a:endParaRPr lang="en-US"/>
           </a:p>
@@ -5306,7 +5307,7 @@
           <a:p>
             <a:fld id="{EC4347D3-4C9A-C240-8F14-750059DFEEB0}" type="datetimeFigureOut">
               <a:rPr lang="en-US" smtClean="0"/>
-              <a:t>3/19/24</a:t>
+              <a:t>3/21/24</a:t>
             </a:fld>
             <a:endParaRPr lang="en-US"/>
           </a:p>
@@ -5569,7 +5570,7 @@
           <a:p>
             <a:fld id="{EC4347D3-4C9A-C240-8F14-750059DFEEB0}" type="datetimeFigureOut">
               <a:rPr lang="en-US" smtClean="0"/>
-              <a:t>3/19/24</a:t>
+              <a:t>3/21/24</a:t>
             </a:fld>
             <a:endParaRPr lang="en-US"/>
           </a:p>
@@ -6003,7 +6004,7 @@
           <a:p>
             <a:fld id="{EC4347D3-4C9A-C240-8F14-750059DFEEB0}" type="datetimeFigureOut">
               <a:rPr lang="en-US" smtClean="0"/>
-              <a:t>3/19/24</a:t>
+              <a:t>3/21/24</a:t>
             </a:fld>
             <a:endParaRPr lang="en-US"/>
           </a:p>
@@ -6549,7 +6550,7 @@
           <a:p>
             <a:fld id="{EC4347D3-4C9A-C240-8F14-750059DFEEB0}" type="datetimeFigureOut">
               <a:rPr lang="en-US" smtClean="0"/>
-              <a:t>3/19/24</a:t>
+              <a:t>3/21/24</a:t>
             </a:fld>
             <a:endParaRPr lang="en-US"/>
           </a:p>
@@ -7269,7 +7270,7 @@
           <a:p>
             <a:fld id="{EC4347D3-4C9A-C240-8F14-750059DFEEB0}" type="datetimeFigureOut">
               <a:rPr lang="en-US" smtClean="0"/>
-              <a:t>3/19/24</a:t>
+              <a:t>3/21/24</a:t>
             </a:fld>
             <a:endParaRPr lang="en-US"/>
           </a:p>
@@ -7439,7 +7440,7 @@
           <a:p>
             <a:fld id="{EC4347D3-4C9A-C240-8F14-750059DFEEB0}" type="datetimeFigureOut">
               <a:rPr lang="en-US" smtClean="0"/>
-              <a:t>3/19/24</a:t>
+              <a:t>3/21/24</a:t>
             </a:fld>
             <a:endParaRPr lang="en-US"/>
           </a:p>
@@ -7619,7 +7620,7 @@
           <a:p>
             <a:fld id="{EC4347D3-4C9A-C240-8F14-750059DFEEB0}" type="datetimeFigureOut">
               <a:rPr lang="en-US" smtClean="0"/>
-              <a:t>3/19/24</a:t>
+              <a:t>3/21/24</a:t>
             </a:fld>
             <a:endParaRPr lang="en-US"/>
           </a:p>
@@ -7789,7 +7790,7 @@
           <a:p>
             <a:fld id="{EC4347D3-4C9A-C240-8F14-750059DFEEB0}" type="datetimeFigureOut">
               <a:rPr lang="en-US" smtClean="0"/>
-              <a:t>3/19/24</a:t>
+              <a:t>3/21/24</a:t>
             </a:fld>
             <a:endParaRPr lang="en-US"/>
           </a:p>
@@ -8039,7 +8040,7 @@
           <a:p>
             <a:fld id="{EC4347D3-4C9A-C240-8F14-750059DFEEB0}" type="datetimeFigureOut">
               <a:rPr lang="en-US" smtClean="0"/>
-              <a:t>3/19/24</a:t>
+              <a:t>3/21/24</a:t>
             </a:fld>
             <a:endParaRPr lang="en-US"/>
           </a:p>
@@ -8271,7 +8272,7 @@
           <a:p>
             <a:fld id="{EC4347D3-4C9A-C240-8F14-750059DFEEB0}" type="datetimeFigureOut">
               <a:rPr lang="en-US" smtClean="0"/>
-              <a:t>3/19/24</a:t>
+              <a:t>3/21/24</a:t>
             </a:fld>
             <a:endParaRPr lang="en-US"/>
           </a:p>
@@ -8657,7 +8658,7 @@
           <a:p>
             <a:fld id="{EC4347D3-4C9A-C240-8F14-750059DFEEB0}" type="datetimeFigureOut">
               <a:rPr lang="en-US" smtClean="0"/>
-              <a:t>3/19/24</a:t>
+              <a:t>3/21/24</a:t>
             </a:fld>
             <a:endParaRPr lang="en-US"/>
           </a:p>
@@ -8780,7 +8781,7 @@
           <a:p>
             <a:fld id="{EC4347D3-4C9A-C240-8F14-750059DFEEB0}" type="datetimeFigureOut">
               <a:rPr lang="en-US" smtClean="0"/>
-              <a:t>3/19/24</a:t>
+              <a:t>3/21/24</a:t>
             </a:fld>
             <a:endParaRPr lang="en-US"/>
           </a:p>
@@ -8875,7 +8876,7 @@
           <a:p>
             <a:fld id="{EC4347D3-4C9A-C240-8F14-750059DFEEB0}" type="datetimeFigureOut">
               <a:rPr lang="en-US" smtClean="0"/>
-              <a:t>3/19/24</a:t>
+              <a:t>3/21/24</a:t>
             </a:fld>
             <a:endParaRPr lang="en-US"/>
           </a:p>
@@ -9124,7 +9125,7 @@
           <a:p>
             <a:fld id="{EC4347D3-4C9A-C240-8F14-750059DFEEB0}" type="datetimeFigureOut">
               <a:rPr lang="en-US" smtClean="0"/>
-              <a:t>3/19/24</a:t>
+              <a:t>3/21/24</a:t>
             </a:fld>
             <a:endParaRPr lang="en-US"/>
           </a:p>
@@ -9409,7 +9410,7 @@
           <a:p>
             <a:fld id="{EC4347D3-4C9A-C240-8F14-750059DFEEB0}" type="datetimeFigureOut">
               <a:rPr lang="en-US" smtClean="0"/>
-              <a:t>3/19/24</a:t>
+              <a:t>3/21/24</a:t>
             </a:fld>
             <a:endParaRPr lang="en-US"/>
           </a:p>
@@ -9532,7 +9533,7 @@
           <a:noFill/>
           <a:extLst>
             <a:ext uri="{909E8E84-426E-40dd-AFC4-6F175D3DCCD1}">
-              <a14:hiddenFill xmlns="" xmlns:a14="http://schemas.microsoft.com/office/drawing/2010/main">
+              <a14:hiddenFill xmlns:a14="http://schemas.microsoft.com/office/drawing/2010/main" xmlns="">
                 <a:solidFill>
                   <a:srgbClr val="FFFFFF"/>
                 </a:solidFill>
@@ -9606,7 +9607,7 @@
               </a:ln>
               <a:extLst>
                 <a:ext uri="{91240B29-F687-4f45-9708-019B960494DF}">
-                  <a14:hiddenLine xmlns="" xmlns:a14="http://schemas.microsoft.com/office/drawing/2010/main" w="9525">
+                  <a14:hiddenLine xmlns:a14="http://schemas.microsoft.com/office/drawing/2010/main" xmlns="" w="9525">
                     <a:solidFill>
                       <a:srgbClr val="000000"/>
                     </a:solidFill>
@@ -9696,7 +9697,7 @@
               </a:ln>
               <a:extLst>
                 <a:ext uri="{91240B29-F687-4f45-9708-019B960494DF}">
-                  <a14:hiddenLine xmlns="" xmlns:a14="http://schemas.microsoft.com/office/drawing/2010/main" w="9525">
+                  <a14:hiddenLine xmlns:a14="http://schemas.microsoft.com/office/drawing/2010/main" xmlns="" w="9525">
                     <a:solidFill>
                       <a:srgbClr val="000000"/>
                     </a:solidFill>
@@ -9786,7 +9787,7 @@
               </a:ln>
               <a:extLst>
                 <a:ext uri="{91240B29-F687-4f45-9708-019B960494DF}">
-                  <a14:hiddenLine xmlns="" xmlns:a14="http://schemas.microsoft.com/office/drawing/2010/main" w="9525">
+                  <a14:hiddenLine xmlns:a14="http://schemas.microsoft.com/office/drawing/2010/main" xmlns="" w="9525">
                     <a:solidFill>
                       <a:srgbClr val="000000"/>
                     </a:solidFill>
@@ -9848,7 +9849,7 @@
               </a:ln>
               <a:extLst>
                 <a:ext uri="{91240B29-F687-4f45-9708-019B960494DF}">
-                  <a14:hiddenLine xmlns="" xmlns:a14="http://schemas.microsoft.com/office/drawing/2010/main" w="9525">
+                  <a14:hiddenLine xmlns:a14="http://schemas.microsoft.com/office/drawing/2010/main" xmlns="" w="9525">
                     <a:solidFill>
                       <a:srgbClr val="000000"/>
                     </a:solidFill>
@@ -9938,7 +9939,7 @@
               </a:ln>
               <a:extLst>
                 <a:ext uri="{91240B29-F687-4f45-9708-019B960494DF}">
-                  <a14:hiddenLine xmlns="" xmlns:a14="http://schemas.microsoft.com/office/drawing/2010/main" w="9525">
+                  <a14:hiddenLine xmlns:a14="http://schemas.microsoft.com/office/drawing/2010/main" xmlns="" w="9525">
                     <a:solidFill>
                       <a:srgbClr val="000000"/>
                     </a:solidFill>
@@ -10000,7 +10001,7 @@
               </a:ln>
               <a:extLst>
                 <a:ext uri="{91240B29-F687-4f45-9708-019B960494DF}">
-                  <a14:hiddenLine xmlns="" xmlns:a14="http://schemas.microsoft.com/office/drawing/2010/main" w="9525">
+                  <a14:hiddenLine xmlns:a14="http://schemas.microsoft.com/office/drawing/2010/main" xmlns="" w="9525">
                     <a:solidFill>
                       <a:srgbClr val="000000"/>
                     </a:solidFill>
@@ -10062,7 +10063,7 @@
               </a:ln>
               <a:extLst>
                 <a:ext uri="{91240B29-F687-4f45-9708-019B960494DF}">
-                  <a14:hiddenLine xmlns="" xmlns:a14="http://schemas.microsoft.com/office/drawing/2010/main" w="9525">
+                  <a14:hiddenLine xmlns:a14="http://schemas.microsoft.com/office/drawing/2010/main" xmlns="" w="9525">
                     <a:solidFill>
                       <a:srgbClr val="000000"/>
                     </a:solidFill>
@@ -10152,7 +10153,7 @@
               </a:ln>
               <a:extLst>
                 <a:ext uri="{91240B29-F687-4f45-9708-019B960494DF}">
-                  <a14:hiddenLine xmlns="" xmlns:a14="http://schemas.microsoft.com/office/drawing/2010/main" w="9525">
+                  <a14:hiddenLine xmlns:a14="http://schemas.microsoft.com/office/drawing/2010/main" xmlns="" w="9525">
                     <a:solidFill>
                       <a:srgbClr val="000000"/>
                     </a:solidFill>
@@ -10242,7 +10243,7 @@
               </a:ln>
               <a:extLst>
                 <a:ext uri="{91240B29-F687-4f45-9708-019B960494DF}">
-                  <a14:hiddenLine xmlns="" xmlns:a14="http://schemas.microsoft.com/office/drawing/2010/main" w="9525">
+                  <a14:hiddenLine xmlns:a14="http://schemas.microsoft.com/office/drawing/2010/main" xmlns="" w="9525">
                     <a:solidFill>
                       <a:srgbClr val="000000"/>
                     </a:solidFill>
@@ -10304,7 +10305,7 @@
               </a:ln>
               <a:extLst>
                 <a:ext uri="{91240B29-F687-4f45-9708-019B960494DF}">
-                  <a14:hiddenLine xmlns="" xmlns:a14="http://schemas.microsoft.com/office/drawing/2010/main" w="9525">
+                  <a14:hiddenLine xmlns:a14="http://schemas.microsoft.com/office/drawing/2010/main" xmlns="" w="9525">
                     <a:solidFill>
                       <a:srgbClr val="000000"/>
                     </a:solidFill>
@@ -10414,7 +10415,7 @@
               </a:ln>
               <a:extLst>
                 <a:ext uri="{91240B29-F687-4f45-9708-019B960494DF}">
-                  <a14:hiddenLine xmlns="" xmlns:a14="http://schemas.microsoft.com/office/drawing/2010/main" w="9525">
+                  <a14:hiddenLine xmlns:a14="http://schemas.microsoft.com/office/drawing/2010/main" xmlns="" w="9525">
                     <a:solidFill>
                       <a:srgbClr val="000000"/>
                     </a:solidFill>
@@ -10498,7 +10499,7 @@
               </a:ln>
               <a:extLst>
                 <a:ext uri="{91240B29-F687-4f45-9708-019B960494DF}">
-                  <a14:hiddenLine xmlns="" xmlns:a14="http://schemas.microsoft.com/office/drawing/2010/main" w="9525">
+                  <a14:hiddenLine xmlns:a14="http://schemas.microsoft.com/office/drawing/2010/main" xmlns="" w="9525">
                     <a:solidFill>
                       <a:srgbClr val="000000"/>
                     </a:solidFill>
@@ -10560,7 +10561,7 @@
               </a:ln>
               <a:extLst>
                 <a:ext uri="{91240B29-F687-4f45-9708-019B960494DF}">
-                  <a14:hiddenLine xmlns="" xmlns:a14="http://schemas.microsoft.com/office/drawing/2010/main" w="9525">
+                  <a14:hiddenLine xmlns:a14="http://schemas.microsoft.com/office/drawing/2010/main" xmlns="" w="9525">
                     <a:solidFill>
                       <a:srgbClr val="000000"/>
                     </a:solidFill>
@@ -10622,7 +10623,7 @@
               </a:ln>
               <a:extLst>
                 <a:ext uri="{91240B29-F687-4f45-9708-019B960494DF}">
-                  <a14:hiddenLine xmlns="" xmlns:a14="http://schemas.microsoft.com/office/drawing/2010/main" w="9525">
+                  <a14:hiddenLine xmlns:a14="http://schemas.microsoft.com/office/drawing/2010/main" xmlns="" w="9525">
                     <a:solidFill>
                       <a:srgbClr val="000000"/>
                     </a:solidFill>
@@ -10712,7 +10713,7 @@
               </a:ln>
               <a:extLst>
                 <a:ext uri="{91240B29-F687-4f45-9708-019B960494DF}">
-                  <a14:hiddenLine xmlns="" xmlns:a14="http://schemas.microsoft.com/office/drawing/2010/main" w="9525">
+                  <a14:hiddenLine xmlns:a14="http://schemas.microsoft.com/office/drawing/2010/main" xmlns="" w="9525">
                     <a:solidFill>
                       <a:srgbClr val="000000"/>
                     </a:solidFill>
@@ -10746,7 +10747,7 @@
               </a:ln>
               <a:extLst>
                 <a:ext uri="{91240B29-F687-4f45-9708-019B960494DF}">
-                  <a14:hiddenLine xmlns="" xmlns:a14="http://schemas.microsoft.com/office/drawing/2010/main" w="9525">
+                  <a14:hiddenLine xmlns:a14="http://schemas.microsoft.com/office/drawing/2010/main" xmlns="" w="9525">
                     <a:solidFill>
                       <a:srgbClr val="000000"/>
                     </a:solidFill>
@@ -10811,7 +10812,7 @@
               </a:ln>
               <a:extLst>
                 <a:ext uri="{91240B29-F687-4f45-9708-019B960494DF}">
-                  <a14:hiddenLine xmlns="" xmlns:a14="http://schemas.microsoft.com/office/drawing/2010/main" w="9525">
+                  <a14:hiddenLine xmlns:a14="http://schemas.microsoft.com/office/drawing/2010/main" xmlns="" w="9525">
                     <a:solidFill>
                       <a:srgbClr val="000000"/>
                     </a:solidFill>
@@ -10901,7 +10902,7 @@
               </a:ln>
               <a:extLst>
                 <a:ext uri="{91240B29-F687-4f45-9708-019B960494DF}">
-                  <a14:hiddenLine xmlns="" xmlns:a14="http://schemas.microsoft.com/office/drawing/2010/main" w="9525">
+                  <a14:hiddenLine xmlns:a14="http://schemas.microsoft.com/office/drawing/2010/main" xmlns="" w="9525">
                     <a:solidFill>
                       <a:srgbClr val="000000"/>
                     </a:solidFill>
@@ -10963,7 +10964,7 @@
               </a:ln>
               <a:extLst>
                 <a:ext uri="{91240B29-F687-4f45-9708-019B960494DF}">
-                  <a14:hiddenLine xmlns="" xmlns:a14="http://schemas.microsoft.com/office/drawing/2010/main" w="9525">
+                  <a14:hiddenLine xmlns:a14="http://schemas.microsoft.com/office/drawing/2010/main" xmlns="" w="9525">
                     <a:solidFill>
                       <a:srgbClr val="000000"/>
                     </a:solidFill>
@@ -11053,7 +11054,7 @@
               </a:ln>
               <a:extLst>
                 <a:ext uri="{91240B29-F687-4f45-9708-019B960494DF}">
-                  <a14:hiddenLine xmlns="" xmlns:a14="http://schemas.microsoft.com/office/drawing/2010/main" w="9525">
+                  <a14:hiddenLine xmlns:a14="http://schemas.microsoft.com/office/drawing/2010/main" xmlns="" w="9525">
                     <a:solidFill>
                       <a:srgbClr val="000000"/>
                     </a:solidFill>
@@ -11118,7 +11119,7 @@
               </a:ln>
               <a:extLst>
                 <a:ext uri="{91240B29-F687-4f45-9708-019B960494DF}">
-                  <a14:hiddenLine xmlns="" xmlns:a14="http://schemas.microsoft.com/office/drawing/2010/main" w="9525">
+                  <a14:hiddenLine xmlns:a14="http://schemas.microsoft.com/office/drawing/2010/main" xmlns="" w="9525">
                     <a:solidFill>
                       <a:srgbClr val="000000"/>
                     </a:solidFill>
@@ -11180,7 +11181,7 @@
               </a:ln>
               <a:extLst>
                 <a:ext uri="{91240B29-F687-4f45-9708-019B960494DF}">
-                  <a14:hiddenLine xmlns="" xmlns:a14="http://schemas.microsoft.com/office/drawing/2010/main" w="9525">
+                  <a14:hiddenLine xmlns:a14="http://schemas.microsoft.com/office/drawing/2010/main" xmlns="" w="9525">
                     <a:solidFill>
                       <a:srgbClr val="000000"/>
                     </a:solidFill>
@@ -11270,7 +11271,7 @@
               </a:ln>
               <a:extLst>
                 <a:ext uri="{91240B29-F687-4f45-9708-019B960494DF}">
-                  <a14:hiddenLine xmlns="" xmlns:a14="http://schemas.microsoft.com/office/drawing/2010/main" w="9525">
+                  <a14:hiddenLine xmlns:a14="http://schemas.microsoft.com/office/drawing/2010/main" xmlns="" w="9525">
                     <a:solidFill>
                       <a:srgbClr val="000000"/>
                     </a:solidFill>
@@ -11360,7 +11361,7 @@
               </a:ln>
               <a:extLst>
                 <a:ext uri="{91240B29-F687-4f45-9708-019B960494DF}">
-                  <a14:hiddenLine xmlns="" xmlns:a14="http://schemas.microsoft.com/office/drawing/2010/main" w="9525">
+                  <a14:hiddenLine xmlns:a14="http://schemas.microsoft.com/office/drawing/2010/main" xmlns="" w="9525">
                     <a:solidFill>
                       <a:srgbClr val="000000"/>
                     </a:solidFill>
@@ -11425,7 +11426,7 @@
               </a:ln>
               <a:extLst>
                 <a:ext uri="{91240B29-F687-4f45-9708-019B960494DF}">
-                  <a14:hiddenLine xmlns="" xmlns:a14="http://schemas.microsoft.com/office/drawing/2010/main" w="9525">
+                  <a14:hiddenLine xmlns:a14="http://schemas.microsoft.com/office/drawing/2010/main" xmlns="" w="9525">
                     <a:solidFill>
                       <a:srgbClr val="000000"/>
                     </a:solidFill>
@@ -11545,7 +11546,7 @@
               </a:ln>
               <a:extLst>
                 <a:ext uri="{91240B29-F687-4f45-9708-019B960494DF}">
-                  <a14:hiddenLine xmlns="" xmlns:a14="http://schemas.microsoft.com/office/drawing/2010/main" w="9525">
+                  <a14:hiddenLine xmlns:a14="http://schemas.microsoft.com/office/drawing/2010/main" xmlns="" w="9525">
                     <a:solidFill>
                       <a:srgbClr val="000000"/>
                     </a:solidFill>
@@ -11626,7 +11627,7 @@
               </a:ln>
               <a:extLst>
                 <a:ext uri="{91240B29-F687-4f45-9708-019B960494DF}">
-                  <a14:hiddenLine xmlns="" xmlns:a14="http://schemas.microsoft.com/office/drawing/2010/main" w="9525">
+                  <a14:hiddenLine xmlns:a14="http://schemas.microsoft.com/office/drawing/2010/main" xmlns="" w="9525">
                     <a:solidFill>
                       <a:srgbClr val="000000"/>
                     </a:solidFill>
@@ -11741,7 +11742,7 @@
               </a:ln>
               <a:extLst>
                 <a:ext uri="{91240B29-F687-4f45-9708-019B960494DF}">
-                  <a14:hiddenLine xmlns="" xmlns:a14="http://schemas.microsoft.com/office/drawing/2010/main" w="9525">
+                  <a14:hiddenLine xmlns:a14="http://schemas.microsoft.com/office/drawing/2010/main" xmlns="" w="9525">
                     <a:solidFill>
                       <a:srgbClr val="000000"/>
                     </a:solidFill>
@@ -11831,7 +11832,7 @@
               </a:ln>
               <a:extLst>
                 <a:ext uri="{91240B29-F687-4f45-9708-019B960494DF}">
-                  <a14:hiddenLine xmlns="" xmlns:a14="http://schemas.microsoft.com/office/drawing/2010/main" w="9525">
+                  <a14:hiddenLine xmlns:a14="http://schemas.microsoft.com/office/drawing/2010/main" xmlns="" w="9525">
                     <a:solidFill>
                       <a:srgbClr val="000000"/>
                     </a:solidFill>
@@ -11896,7 +11897,7 @@
               </a:ln>
               <a:extLst>
                 <a:ext uri="{91240B29-F687-4f45-9708-019B960494DF}">
-                  <a14:hiddenLine xmlns="" xmlns:a14="http://schemas.microsoft.com/office/drawing/2010/main" w="9525">
+                  <a14:hiddenLine xmlns:a14="http://schemas.microsoft.com/office/drawing/2010/main" xmlns="" w="9525">
                     <a:solidFill>
                       <a:srgbClr val="000000"/>
                     </a:solidFill>
@@ -11986,7 +11987,7 @@
               </a:ln>
               <a:extLst>
                 <a:ext uri="{91240B29-F687-4f45-9708-019B960494DF}">
-                  <a14:hiddenLine xmlns="" xmlns:a14="http://schemas.microsoft.com/office/drawing/2010/main" w="9525">
+                  <a14:hiddenLine xmlns:a14="http://schemas.microsoft.com/office/drawing/2010/main" xmlns="" w="9525">
                     <a:solidFill>
                       <a:srgbClr val="000000"/>
                     </a:solidFill>
@@ -12054,7 +12055,7 @@
               </a:ln>
               <a:extLst>
                 <a:ext uri="{91240B29-F687-4f45-9708-019B960494DF}">
-                  <a14:hiddenLine xmlns="" xmlns:a14="http://schemas.microsoft.com/office/drawing/2010/main" w="9525">
+                  <a14:hiddenLine xmlns:a14="http://schemas.microsoft.com/office/drawing/2010/main" xmlns="" w="9525">
                     <a:solidFill>
                       <a:srgbClr val="000000"/>
                     </a:solidFill>
@@ -12144,7 +12145,7 @@
               </a:ln>
               <a:extLst>
                 <a:ext uri="{91240B29-F687-4f45-9708-019B960494DF}">
-                  <a14:hiddenLine xmlns="" xmlns:a14="http://schemas.microsoft.com/office/drawing/2010/main" w="9525">
+                  <a14:hiddenLine xmlns:a14="http://schemas.microsoft.com/office/drawing/2010/main" xmlns="" w="9525">
                     <a:solidFill>
                       <a:srgbClr val="000000"/>
                     </a:solidFill>
@@ -12212,7 +12213,7 @@
               </a:ln>
               <a:extLst>
                 <a:ext uri="{91240B29-F687-4f45-9708-019B960494DF}">
-                  <a14:hiddenLine xmlns="" xmlns:a14="http://schemas.microsoft.com/office/drawing/2010/main" w="9525">
+                  <a14:hiddenLine xmlns:a14="http://schemas.microsoft.com/office/drawing/2010/main" xmlns="" w="9525">
                     <a:solidFill>
                       <a:srgbClr val="000000"/>
                     </a:solidFill>
@@ -12302,7 +12303,7 @@
               </a:ln>
               <a:extLst>
                 <a:ext uri="{91240B29-F687-4f45-9708-019B960494DF}">
-                  <a14:hiddenLine xmlns="" xmlns:a14="http://schemas.microsoft.com/office/drawing/2010/main" w="9525">
+                  <a14:hiddenLine xmlns:a14="http://schemas.microsoft.com/office/drawing/2010/main" xmlns="" w="9525">
                     <a:solidFill>
                       <a:srgbClr val="000000"/>
                     </a:solidFill>
@@ -12336,7 +12337,7 @@
               </a:ln>
               <a:extLst>
                 <a:ext uri="{91240B29-F687-4f45-9708-019B960494DF}">
-                  <a14:hiddenLine xmlns="" xmlns:a14="http://schemas.microsoft.com/office/drawing/2010/main" w="9525">
+                  <a14:hiddenLine xmlns:a14="http://schemas.microsoft.com/office/drawing/2010/main" xmlns="" w="9525">
                     <a:solidFill>
                       <a:srgbClr val="000000"/>
                     </a:solidFill>
@@ -12476,7 +12477,7 @@
           <a:p>
             <a:fld id="{EC4347D3-4C9A-C240-8F14-750059DFEEB0}" type="datetimeFigureOut">
               <a:rPr lang="en-US" smtClean="0"/>
-              <a:t>3/19/24</a:t>
+              <a:t>3/21/24</a:t>
             </a:fld>
             <a:endParaRPr lang="en-US"/>
           </a:p>
@@ -13913,6 +13914,191 @@
 </p:sld>
 </file>
 
+<file path=ppt/slides/slide15.xml><?xml version="1.0" encoding="utf-8"?>
+<p:sld xmlns:a="http://schemas.openxmlformats.org/drawingml/2006/main" xmlns:r="http://schemas.openxmlformats.org/officeDocument/2006/relationships" xmlns:p="http://schemas.openxmlformats.org/presentationml/2006/main">
+  <p:cSld>
+    <p:spTree>
+      <p:nvGrpSpPr>
+        <p:cNvPr id="1" name=""/>
+        <p:cNvGrpSpPr/>
+        <p:nvPr/>
+      </p:nvGrpSpPr>
+      <p:grpSpPr>
+        <a:xfrm>
+          <a:off x="0" y="0"/>
+          <a:ext cx="0" cy="0"/>
+          <a:chOff x="0" y="0"/>
+          <a:chExt cx="0" cy="0"/>
+        </a:xfrm>
+      </p:grpSpPr>
+      <p:sp>
+        <p:nvSpPr>
+          <p:cNvPr id="6146" name="Rectangle 2"/>
+          <p:cNvSpPr>
+            <a:spLocks noGrp="1" noChangeArrowheads="1"/>
+          </p:cNvSpPr>
+          <p:nvPr>
+            <p:ph type="title"/>
+            <p:custDataLst>
+              <p:tags r:id="rId1"/>
+            </p:custDataLst>
+          </p:nvPr>
+        </p:nvSpPr>
+        <p:spPr>
+          <a:xfrm>
+            <a:off x="1141413" y="284084"/>
+            <a:ext cx="9905998" cy="620791"/>
+          </a:xfrm>
+        </p:spPr>
+        <p:txBody>
+          <a:bodyPr/>
+          <a:lstStyle/>
+          <a:p>
+            <a:pPr algn="ctr"/>
+            <a:r>
+              <a:rPr lang="en-US" dirty="0"/>
+              <a:t>Lecture 15: Thu. Mar. 21</a:t>
+            </a:r>
+          </a:p>
+        </p:txBody>
+      </p:sp>
+      <p:sp>
+        <p:nvSpPr>
+          <p:cNvPr id="6147" name="Rectangle 3"/>
+          <p:cNvSpPr>
+            <a:spLocks noGrp="1" noChangeArrowheads="1"/>
+          </p:cNvSpPr>
+          <p:nvPr>
+            <p:ph idx="1"/>
+            <p:custDataLst>
+              <p:tags r:id="rId2"/>
+            </p:custDataLst>
+          </p:nvPr>
+        </p:nvSpPr>
+        <p:spPr>
+          <a:xfrm>
+            <a:off x="1141413" y="1123949"/>
+            <a:ext cx="9970724" cy="5421705"/>
+          </a:xfrm>
+        </p:spPr>
+        <p:txBody>
+          <a:bodyPr>
+            <a:normAutofit/>
+          </a:bodyPr>
+          <a:lstStyle/>
+          <a:p>
+            <a:r>
+              <a:rPr lang="en-US" dirty="0"/>
+              <a:t>DMT2 is </a:t>
+            </a:r>
+            <a:r>
+              <a:rPr lang="en-US" b="1" i="1" u="sng" dirty="0"/>
+              <a:t>going to be great</a:t>
+            </a:r>
+            <a:r>
+              <a:rPr lang="en-US" dirty="0"/>
+              <a:t>! Let’s learn a lot of stuff together!</a:t>
+            </a:r>
+          </a:p>
+          <a:p>
+            <a:r>
+              <a:rPr lang="en-US" dirty="0"/>
+              <a:t>Welcome to Spring!</a:t>
+            </a:r>
+          </a:p>
+          <a:p>
+            <a:r>
+              <a:rPr lang="en-US" dirty="0"/>
+              <a:t>Module 2 quiz is graded!! </a:t>
+            </a:r>
+          </a:p>
+          <a:p>
+            <a:pPr lvl="1"/>
+            <a:r>
+              <a:rPr lang="en-US" dirty="0"/>
+              <a:t>Regrades are open through 11:59pm tonight</a:t>
+            </a:r>
+          </a:p>
+          <a:p>
+            <a:r>
+              <a:rPr lang="en-US" dirty="0"/>
+              <a:t>We are halfway done grading written homework 2.</a:t>
+            </a:r>
+          </a:p>
+          <a:p>
+            <a:pPr lvl="1"/>
+            <a:r>
+              <a:rPr lang="en-US" dirty="0"/>
+              <a:t>Should be returned early next week.</a:t>
+            </a:r>
+          </a:p>
+          <a:p>
+            <a:r>
+              <a:rPr lang="en-US" dirty="0"/>
+              <a:t>Your module 3 written assignment is due Tonight! Good luck!</a:t>
+            </a:r>
+          </a:p>
+          <a:p>
+            <a:r>
+              <a:rPr lang="en-US" dirty="0"/>
+              <a:t>Don’t forget: Quiz 3 is NEXT Thursday!</a:t>
+            </a:r>
+          </a:p>
+          <a:p>
+            <a:r>
+              <a:rPr lang="en-US" dirty="0"/>
+              <a:t>Today we will continue module 4!</a:t>
+            </a:r>
+          </a:p>
+          <a:p>
+            <a:pPr lvl="1"/>
+            <a:r>
+              <a:rPr lang="en-US" dirty="0"/>
+              <a:t>We are a tiny bit behind but not enough to be concerned (yet)</a:t>
+            </a:r>
+          </a:p>
+          <a:p>
+            <a:endParaRPr lang="en-US" dirty="0"/>
+          </a:p>
+        </p:txBody>
+      </p:sp>
+      <p:sp>
+        <p:nvSpPr>
+          <p:cNvPr id="4" name="Slide Number Placeholder 3"/>
+          <p:cNvSpPr>
+            <a:spLocks noGrp="1"/>
+          </p:cNvSpPr>
+          <p:nvPr>
+            <p:ph type="sldNum" sz="quarter" idx="12"/>
+          </p:nvPr>
+        </p:nvSpPr>
+        <p:spPr/>
+        <p:txBody>
+          <a:bodyPr/>
+          <a:lstStyle/>
+          <a:p>
+            <a:fld id="{F26D9103-0C5C-48AC-B68E-3ED2C1647047}" type="slidenum">
+              <a:rPr lang="en-US" smtClean="0"/>
+              <a:pPr/>
+              <a:t>15</a:t>
+            </a:fld>
+            <a:endParaRPr lang="en-US" dirty="0"/>
+          </a:p>
+        </p:txBody>
+      </p:sp>
+    </p:spTree>
+    <p:extLst>
+      <p:ext uri="{BB962C8B-B14F-4D97-AF65-F5344CB8AC3E}">
+        <p14:creationId xmlns:p14="http://schemas.microsoft.com/office/powerpoint/2010/main" val="2459537120"/>
+      </p:ext>
+    </p:extLst>
+  </p:cSld>
+  <p:clrMapOvr>
+    <a:masterClrMapping/>
+  </p:clrMapOvr>
+</p:sld>
+</file>
+
 <file path=ppt/slides/slide2.xml><?xml version="1.0" encoding="utf-8"?>
 <p:sld xmlns:a="http://schemas.openxmlformats.org/drawingml/2006/main" xmlns:r="http://schemas.openxmlformats.org/officeDocument/2006/relationships" xmlns:p="http://schemas.openxmlformats.org/presentationml/2006/main">
   <p:cSld>
@@ -15416,6 +15602,18 @@
 </file>
 
 <file path=ppt/tags/tag26.xml><?xml version="1.0" encoding="utf-8"?>
+<p:tagLst xmlns:a="http://schemas.openxmlformats.org/drawingml/2006/main" xmlns:r="http://schemas.openxmlformats.org/officeDocument/2006/relationships" xmlns:p="http://schemas.openxmlformats.org/presentationml/2006/main">
+  <p:tag name="_INSTRUCTOR VIEW19C14C36-AC8E-43BC-9DB6-C2AAF774C7DC|PANE__TAG" val="_"/>
+</p:tagLst>
+</file>
+
+<file path=ppt/tags/tag27.xml><?xml version="1.0" encoding="utf-8"?>
+<p:tagLst xmlns:a="http://schemas.openxmlformats.org/drawingml/2006/main" xmlns:r="http://schemas.openxmlformats.org/officeDocument/2006/relationships" xmlns:p="http://schemas.openxmlformats.org/presentationml/2006/main">
+  <p:tag name="_INSTRUCTOR VIEW19C14C36-AC8E-43BC-9DB6-C2AAF774C7DC|PANE__TAG" val="_"/>
+</p:tagLst>
+</file>
+
+<file path=ppt/tags/tag28.xml><?xml version="1.0" encoding="utf-8"?>
 <p:tagLst xmlns:a="http://schemas.openxmlformats.org/drawingml/2006/main" xmlns:r="http://schemas.openxmlformats.org/officeDocument/2006/relationships" xmlns:p="http://schemas.openxmlformats.org/presentationml/2006/main">
   <p:tag name="_INSTRUCTOR VIEW19C14C36-AC8E-43BC-9DB6-C2AAF774C7DC|PANE__TAG" val="_"/>
 </p:tagLst>

</xml_diff>

<commit_message>
small fix in slides, announcements
</commit_message>
<xml_diff>
--- a/slides/00-DailyAnnouncements.pptx
+++ b/slides/00-DailyAnnouncements.pptx
@@ -5,7 +5,7 @@
     <p:sldMasterId id="2147484006" r:id="rId1"/>
   </p:sldMasterIdLst>
   <p:notesMasterIdLst>
-    <p:notesMasterId r:id="rId19"/>
+    <p:notesMasterId r:id="rId20"/>
   </p:notesMasterIdLst>
   <p:sldIdLst>
     <p:sldId id="256" r:id="rId2"/>
@@ -25,6 +25,7 @@
     <p:sldId id="519" r:id="rId16"/>
     <p:sldId id="520" r:id="rId17"/>
     <p:sldId id="521" r:id="rId18"/>
+    <p:sldId id="522" r:id="rId19"/>
   </p:sldIdLst>
   <p:sldSz cx="12192000" cy="6858000"/>
   <p:notesSz cx="6858000" cy="9144000"/>
@@ -213,7 +214,7 @@
           <a:p>
             <a:fld id="{C5B45307-6ED4-B142-BD64-10F739779302}" type="datetimeFigureOut">
               <a:rPr lang="en-US" smtClean="0"/>
-              <a:t>11/7/24</a:t>
+              <a:t>11/12/24</a:t>
             </a:fld>
             <a:endParaRPr lang="en-US"/>
           </a:p>
@@ -621,7 +622,7 @@
           <a:noFill/>
           <a:extLst>
             <a:ext uri="{909E8E84-426E-40dd-AFC4-6F175D3DCCD1}">
-              <a14:hiddenFill xmlns:a14="http://schemas.microsoft.com/office/drawing/2010/main" xmlns="">
+              <a14:hiddenFill xmlns="" xmlns:a14="http://schemas.microsoft.com/office/drawing/2010/main">
                 <a:solidFill>
                   <a:srgbClr val="FFFFFF"/>
                 </a:solidFill>
@@ -680,7 +681,7 @@
             </a:ln>
             <a:extLst>
               <a:ext uri="{91240B29-F687-4f45-9708-019B960494DF}">
-                <a14:hiddenLine xmlns:a14="http://schemas.microsoft.com/office/drawing/2010/main" xmlns="" w="9525">
+                <a14:hiddenLine xmlns="" xmlns:a14="http://schemas.microsoft.com/office/drawing/2010/main" w="9525">
                   <a:solidFill>
                     <a:srgbClr val="000000"/>
                   </a:solidFill>
@@ -770,7 +771,7 @@
             </a:ln>
             <a:extLst>
               <a:ext uri="{91240B29-F687-4f45-9708-019B960494DF}">
-                <a14:hiddenLine xmlns:a14="http://schemas.microsoft.com/office/drawing/2010/main" xmlns="" w="9525">
+                <a14:hiddenLine xmlns="" xmlns:a14="http://schemas.microsoft.com/office/drawing/2010/main" w="9525">
                   <a:solidFill>
                     <a:srgbClr val="000000"/>
                   </a:solidFill>
@@ -860,7 +861,7 @@
             </a:ln>
             <a:extLst>
               <a:ext uri="{91240B29-F687-4f45-9708-019B960494DF}">
-                <a14:hiddenLine xmlns:a14="http://schemas.microsoft.com/office/drawing/2010/main" xmlns="" w="9525">
+                <a14:hiddenLine xmlns="" xmlns:a14="http://schemas.microsoft.com/office/drawing/2010/main" w="9525">
                   <a:solidFill>
                     <a:srgbClr val="000000"/>
                   </a:solidFill>
@@ -894,7 +895,7 @@
             </a:ln>
             <a:extLst>
               <a:ext uri="{91240B29-F687-4f45-9708-019B960494DF}">
-                <a14:hiddenLine xmlns:a14="http://schemas.microsoft.com/office/drawing/2010/main" xmlns="" w="9525">
+                <a14:hiddenLine xmlns="" xmlns:a14="http://schemas.microsoft.com/office/drawing/2010/main" w="9525">
                   <a:solidFill>
                     <a:srgbClr val="000000"/>
                   </a:solidFill>
@@ -984,7 +985,7 @@
             </a:ln>
             <a:extLst>
               <a:ext uri="{91240B29-F687-4f45-9708-019B960494DF}">
-                <a14:hiddenLine xmlns:a14="http://schemas.microsoft.com/office/drawing/2010/main" xmlns="" w="9525">
+                <a14:hiddenLine xmlns="" xmlns:a14="http://schemas.microsoft.com/office/drawing/2010/main" w="9525">
                   <a:solidFill>
                     <a:srgbClr val="000000"/>
                   </a:solidFill>
@@ -1046,7 +1047,7 @@
             </a:ln>
             <a:extLst>
               <a:ext uri="{91240B29-F687-4f45-9708-019B960494DF}">
-                <a14:hiddenLine xmlns:a14="http://schemas.microsoft.com/office/drawing/2010/main" xmlns="" w="9525">
+                <a14:hiddenLine xmlns="" xmlns:a14="http://schemas.microsoft.com/office/drawing/2010/main" w="9525">
                   <a:solidFill>
                     <a:srgbClr val="000000"/>
                   </a:solidFill>
@@ -1108,7 +1109,7 @@
             </a:ln>
             <a:extLst>
               <a:ext uri="{91240B29-F687-4f45-9708-019B960494DF}">
-                <a14:hiddenLine xmlns:a14="http://schemas.microsoft.com/office/drawing/2010/main" xmlns="" w="9525">
+                <a14:hiddenLine xmlns="" xmlns:a14="http://schemas.microsoft.com/office/drawing/2010/main" w="9525">
                   <a:solidFill>
                     <a:srgbClr val="000000"/>
                   </a:solidFill>
@@ -1198,7 +1199,7 @@
             </a:ln>
             <a:extLst>
               <a:ext uri="{91240B29-F687-4f45-9708-019B960494DF}">
-                <a14:hiddenLine xmlns:a14="http://schemas.microsoft.com/office/drawing/2010/main" xmlns="" w="9525">
+                <a14:hiddenLine xmlns="" xmlns:a14="http://schemas.microsoft.com/office/drawing/2010/main" w="9525">
                   <a:solidFill>
                     <a:srgbClr val="000000"/>
                   </a:solidFill>
@@ -1260,7 +1261,7 @@
             </a:ln>
             <a:extLst>
               <a:ext uri="{91240B29-F687-4f45-9708-019B960494DF}">
-                <a14:hiddenLine xmlns:a14="http://schemas.microsoft.com/office/drawing/2010/main" xmlns="" w="9525">
+                <a14:hiddenLine xmlns="" xmlns:a14="http://schemas.microsoft.com/office/drawing/2010/main" w="9525">
                   <a:solidFill>
                     <a:srgbClr val="000000"/>
                   </a:solidFill>
@@ -1322,7 +1323,7 @@
             </a:ln>
             <a:extLst>
               <a:ext uri="{91240B29-F687-4f45-9708-019B960494DF}">
-                <a14:hiddenLine xmlns:a14="http://schemas.microsoft.com/office/drawing/2010/main" xmlns="" w="9525">
+                <a14:hiddenLine xmlns="" xmlns:a14="http://schemas.microsoft.com/office/drawing/2010/main" w="9525">
                   <a:solidFill>
                     <a:srgbClr val="000000"/>
                   </a:solidFill>
@@ -1412,7 +1413,7 @@
             </a:ln>
             <a:extLst>
               <a:ext uri="{91240B29-F687-4f45-9708-019B960494DF}">
-                <a14:hiddenLine xmlns:a14="http://schemas.microsoft.com/office/drawing/2010/main" xmlns="" w="9525">
+                <a14:hiddenLine xmlns="" xmlns:a14="http://schemas.microsoft.com/office/drawing/2010/main" w="9525">
                   <a:solidFill>
                     <a:srgbClr val="000000"/>
                   </a:solidFill>
@@ -1502,7 +1503,7 @@
             </a:ln>
             <a:extLst>
               <a:ext uri="{91240B29-F687-4f45-9708-019B960494DF}">
-                <a14:hiddenLine xmlns:a14="http://schemas.microsoft.com/office/drawing/2010/main" xmlns="" w="9525">
+                <a14:hiddenLine xmlns="" xmlns:a14="http://schemas.microsoft.com/office/drawing/2010/main" w="9525">
                   <a:solidFill>
                     <a:srgbClr val="000000"/>
                   </a:solidFill>
@@ -1564,7 +1565,7 @@
             </a:ln>
             <a:extLst>
               <a:ext uri="{91240B29-F687-4f45-9708-019B960494DF}">
-                <a14:hiddenLine xmlns:a14="http://schemas.microsoft.com/office/drawing/2010/main" xmlns="" w="9525">
+                <a14:hiddenLine xmlns="" xmlns:a14="http://schemas.microsoft.com/office/drawing/2010/main" w="9525">
                   <a:solidFill>
                     <a:srgbClr val="000000"/>
                   </a:solidFill>
@@ -1674,7 +1675,7 @@
             </a:ln>
             <a:extLst>
               <a:ext uri="{91240B29-F687-4f45-9708-019B960494DF}">
-                <a14:hiddenLine xmlns:a14="http://schemas.microsoft.com/office/drawing/2010/main" xmlns="" w="9525">
+                <a14:hiddenLine xmlns="" xmlns:a14="http://schemas.microsoft.com/office/drawing/2010/main" w="9525">
                   <a:solidFill>
                     <a:srgbClr val="000000"/>
                   </a:solidFill>
@@ -1736,7 +1737,7 @@
             </a:ln>
             <a:extLst>
               <a:ext uri="{91240B29-F687-4f45-9708-019B960494DF}">
-                <a14:hiddenLine xmlns:a14="http://schemas.microsoft.com/office/drawing/2010/main" xmlns="" w="9525">
+                <a14:hiddenLine xmlns="" xmlns:a14="http://schemas.microsoft.com/office/drawing/2010/main" w="9525">
                   <a:solidFill>
                     <a:srgbClr val="000000"/>
                   </a:solidFill>
@@ -1826,7 +1827,7 @@
             </a:ln>
             <a:extLst>
               <a:ext uri="{91240B29-F687-4f45-9708-019B960494DF}">
-                <a14:hiddenLine xmlns:a14="http://schemas.microsoft.com/office/drawing/2010/main" xmlns="" w="9525">
+                <a14:hiddenLine xmlns="" xmlns:a14="http://schemas.microsoft.com/office/drawing/2010/main" w="9525">
                   <a:solidFill>
                     <a:srgbClr val="000000"/>
                   </a:solidFill>
@@ -1916,7 +1917,7 @@
             </a:ln>
             <a:extLst>
               <a:ext uri="{91240B29-F687-4f45-9708-019B960494DF}">
-                <a14:hiddenLine xmlns:a14="http://schemas.microsoft.com/office/drawing/2010/main" xmlns="" w="9525">
+                <a14:hiddenLine xmlns="" xmlns:a14="http://schemas.microsoft.com/office/drawing/2010/main" w="9525">
                   <a:solidFill>
                     <a:srgbClr val="000000"/>
                   </a:solidFill>
@@ -1978,7 +1979,7 @@
             </a:ln>
             <a:extLst>
               <a:ext uri="{91240B29-F687-4f45-9708-019B960494DF}">
-                <a14:hiddenLine xmlns:a14="http://schemas.microsoft.com/office/drawing/2010/main" xmlns="" w="9525">
+                <a14:hiddenLine xmlns="" xmlns:a14="http://schemas.microsoft.com/office/drawing/2010/main" w="9525">
                   <a:solidFill>
                     <a:srgbClr val="000000"/>
                   </a:solidFill>
@@ -2068,7 +2069,7 @@
             </a:ln>
             <a:extLst>
               <a:ext uri="{91240B29-F687-4f45-9708-019B960494DF}">
-                <a14:hiddenLine xmlns:a14="http://schemas.microsoft.com/office/drawing/2010/main" xmlns="" w="9525">
+                <a14:hiddenLine xmlns="" xmlns:a14="http://schemas.microsoft.com/office/drawing/2010/main" w="9525">
                   <a:solidFill>
                     <a:srgbClr val="000000"/>
                   </a:solidFill>
@@ -2158,7 +2159,7 @@
             </a:ln>
             <a:extLst>
               <a:ext uri="{91240B29-F687-4f45-9708-019B960494DF}">
-                <a14:hiddenLine xmlns:a14="http://schemas.microsoft.com/office/drawing/2010/main" xmlns="" w="9525">
+                <a14:hiddenLine xmlns="" xmlns:a14="http://schemas.microsoft.com/office/drawing/2010/main" w="9525">
                   <a:solidFill>
                     <a:srgbClr val="000000"/>
                   </a:solidFill>
@@ -2214,7 +2215,7 @@
             </a:ln>
             <a:extLst>
               <a:ext uri="{91240B29-F687-4f45-9708-019B960494DF}">
-                <a14:hiddenLine xmlns:a14="http://schemas.microsoft.com/office/drawing/2010/main" xmlns="" w="9525">
+                <a14:hiddenLine xmlns="" xmlns:a14="http://schemas.microsoft.com/office/drawing/2010/main" w="9525">
                   <a:solidFill>
                     <a:srgbClr val="000000"/>
                   </a:solidFill>
@@ -2304,7 +2305,7 @@
             </a:ln>
             <a:extLst>
               <a:ext uri="{91240B29-F687-4f45-9708-019B960494DF}">
-                <a14:hiddenLine xmlns:a14="http://schemas.microsoft.com/office/drawing/2010/main" xmlns="" w="9525">
+                <a14:hiddenLine xmlns="" xmlns:a14="http://schemas.microsoft.com/office/drawing/2010/main" w="9525">
                   <a:solidFill>
                     <a:srgbClr val="000000"/>
                   </a:solidFill>
@@ -2360,7 +2361,7 @@
             </a:ln>
             <a:extLst>
               <a:ext uri="{91240B29-F687-4f45-9708-019B960494DF}">
-                <a14:hiddenLine xmlns:a14="http://schemas.microsoft.com/office/drawing/2010/main" xmlns="" w="9525">
+                <a14:hiddenLine xmlns="" xmlns:a14="http://schemas.microsoft.com/office/drawing/2010/main" w="9525">
                   <a:solidFill>
                     <a:srgbClr val="000000"/>
                   </a:solidFill>
@@ -2450,7 +2451,7 @@
             </a:ln>
             <a:extLst>
               <a:ext uri="{91240B29-F687-4f45-9708-019B960494DF}">
-                <a14:hiddenLine xmlns:a14="http://schemas.microsoft.com/office/drawing/2010/main" xmlns="" w="9525">
+                <a14:hiddenLine xmlns="" xmlns:a14="http://schemas.microsoft.com/office/drawing/2010/main" w="9525">
                   <a:solidFill>
                     <a:srgbClr val="000000"/>
                   </a:solidFill>
@@ -2518,7 +2519,7 @@
             </a:ln>
             <a:extLst>
               <a:ext uri="{91240B29-F687-4f45-9708-019B960494DF}">
-                <a14:hiddenLine xmlns:a14="http://schemas.microsoft.com/office/drawing/2010/main" xmlns="" w="9525">
+                <a14:hiddenLine xmlns="" xmlns:a14="http://schemas.microsoft.com/office/drawing/2010/main" w="9525">
                   <a:solidFill>
                     <a:srgbClr val="000000"/>
                   </a:solidFill>
@@ -2608,7 +2609,7 @@
             </a:ln>
             <a:extLst>
               <a:ext uri="{91240B29-F687-4f45-9708-019B960494DF}">
-                <a14:hiddenLine xmlns:a14="http://schemas.microsoft.com/office/drawing/2010/main" xmlns="" w="9525">
+                <a14:hiddenLine xmlns="" xmlns:a14="http://schemas.microsoft.com/office/drawing/2010/main" w="9525">
                   <a:solidFill>
                     <a:srgbClr val="000000"/>
                   </a:solidFill>
@@ -2676,7 +2677,7 @@
             </a:ln>
             <a:extLst>
               <a:ext uri="{91240B29-F687-4f45-9708-019B960494DF}">
-                <a14:hiddenLine xmlns:a14="http://schemas.microsoft.com/office/drawing/2010/main" xmlns="" w="9525">
+                <a14:hiddenLine xmlns="" xmlns:a14="http://schemas.microsoft.com/office/drawing/2010/main" w="9525">
                   <a:solidFill>
                     <a:srgbClr val="000000"/>
                   </a:solidFill>
@@ -2766,7 +2767,7 @@
             </a:ln>
             <a:extLst>
               <a:ext uri="{91240B29-F687-4f45-9708-019B960494DF}">
-                <a14:hiddenLine xmlns:a14="http://schemas.microsoft.com/office/drawing/2010/main" xmlns="" w="9525">
+                <a14:hiddenLine xmlns="" xmlns:a14="http://schemas.microsoft.com/office/drawing/2010/main" w="9525">
                   <a:solidFill>
                     <a:srgbClr val="000000"/>
                   </a:solidFill>
@@ -2800,7 +2801,7 @@
             </a:ln>
             <a:extLst>
               <a:ext uri="{91240B29-F687-4f45-9708-019B960494DF}">
-                <a14:hiddenLine xmlns:a14="http://schemas.microsoft.com/office/drawing/2010/main" xmlns="" w="9525">
+                <a14:hiddenLine xmlns="" xmlns:a14="http://schemas.microsoft.com/office/drawing/2010/main" w="9525">
                   <a:solidFill>
                     <a:srgbClr val="000000"/>
                   </a:solidFill>
@@ -2890,7 +2891,7 @@
             </a:ln>
             <a:extLst>
               <a:ext uri="{91240B29-F687-4f45-9708-019B960494DF}">
-                <a14:hiddenLine xmlns:a14="http://schemas.microsoft.com/office/drawing/2010/main" xmlns="" w="9525">
+                <a14:hiddenLine xmlns="" xmlns:a14="http://schemas.microsoft.com/office/drawing/2010/main" w="9525">
                   <a:solidFill>
                     <a:srgbClr val="000000"/>
                   </a:solidFill>
@@ -2952,7 +2953,7 @@
             </a:ln>
             <a:extLst>
               <a:ext uri="{91240B29-F687-4f45-9708-019B960494DF}">
-                <a14:hiddenLine xmlns:a14="http://schemas.microsoft.com/office/drawing/2010/main" xmlns="" w="9525">
+                <a14:hiddenLine xmlns="" xmlns:a14="http://schemas.microsoft.com/office/drawing/2010/main" w="9525">
                   <a:solidFill>
                     <a:srgbClr val="000000"/>
                   </a:solidFill>
@@ -3014,7 +3015,7 @@
             </a:ln>
             <a:extLst>
               <a:ext uri="{91240B29-F687-4f45-9708-019B960494DF}">
-                <a14:hiddenLine xmlns:a14="http://schemas.microsoft.com/office/drawing/2010/main" xmlns="" w="9525">
+                <a14:hiddenLine xmlns="" xmlns:a14="http://schemas.microsoft.com/office/drawing/2010/main" w="9525">
                   <a:solidFill>
                     <a:srgbClr val="000000"/>
                   </a:solidFill>
@@ -3104,7 +3105,7 @@
             </a:ln>
             <a:extLst>
               <a:ext uri="{91240B29-F687-4f45-9708-019B960494DF}">
-                <a14:hiddenLine xmlns:a14="http://schemas.microsoft.com/office/drawing/2010/main" xmlns="" w="9525">
+                <a14:hiddenLine xmlns="" xmlns:a14="http://schemas.microsoft.com/office/drawing/2010/main" w="9525">
                   <a:solidFill>
                     <a:srgbClr val="000000"/>
                   </a:solidFill>
@@ -3172,7 +3173,7 @@
             </a:ln>
             <a:extLst>
               <a:ext uri="{91240B29-F687-4f45-9708-019B960494DF}">
-                <a14:hiddenLine xmlns:a14="http://schemas.microsoft.com/office/drawing/2010/main" xmlns="" w="9525">
+                <a14:hiddenLine xmlns="" xmlns:a14="http://schemas.microsoft.com/office/drawing/2010/main" w="9525">
                   <a:solidFill>
                     <a:srgbClr val="000000"/>
                   </a:solidFill>
@@ -3234,7 +3235,7 @@
             </a:ln>
             <a:extLst>
               <a:ext uri="{91240B29-F687-4f45-9708-019B960494DF}">
-                <a14:hiddenLine xmlns:a14="http://schemas.microsoft.com/office/drawing/2010/main" xmlns="" w="9525">
+                <a14:hiddenLine xmlns="" xmlns:a14="http://schemas.microsoft.com/office/drawing/2010/main" w="9525">
                   <a:solidFill>
                     <a:srgbClr val="000000"/>
                   </a:solidFill>
@@ -3324,7 +3325,7 @@
             </a:ln>
             <a:extLst>
               <a:ext uri="{91240B29-F687-4f45-9708-019B960494DF}">
-                <a14:hiddenLine xmlns:a14="http://schemas.microsoft.com/office/drawing/2010/main" xmlns="" w="9525">
+                <a14:hiddenLine xmlns="" xmlns:a14="http://schemas.microsoft.com/office/drawing/2010/main" w="9525">
                   <a:solidFill>
                     <a:srgbClr val="000000"/>
                   </a:solidFill>
@@ -3386,7 +3387,7 @@
             </a:ln>
             <a:extLst>
               <a:ext uri="{91240B29-F687-4f45-9708-019B960494DF}">
-                <a14:hiddenLine xmlns:a14="http://schemas.microsoft.com/office/drawing/2010/main" xmlns="" w="9525">
+                <a14:hiddenLine xmlns="" xmlns:a14="http://schemas.microsoft.com/office/drawing/2010/main" w="9525">
                   <a:solidFill>
                     <a:srgbClr val="000000"/>
                   </a:solidFill>
@@ -3476,7 +3477,7 @@
             </a:ln>
             <a:extLst>
               <a:ext uri="{91240B29-F687-4f45-9708-019B960494DF}">
-                <a14:hiddenLine xmlns:a14="http://schemas.microsoft.com/office/drawing/2010/main" xmlns="" w="9525">
+                <a14:hiddenLine xmlns="" xmlns:a14="http://schemas.microsoft.com/office/drawing/2010/main" w="9525">
                   <a:solidFill>
                     <a:srgbClr val="000000"/>
                   </a:solidFill>
@@ -3538,7 +3539,7 @@
             </a:ln>
             <a:extLst>
               <a:ext uri="{91240B29-F687-4f45-9708-019B960494DF}">
-                <a14:hiddenLine xmlns:a14="http://schemas.microsoft.com/office/drawing/2010/main" xmlns="" w="9525">
+                <a14:hiddenLine xmlns="" xmlns:a14="http://schemas.microsoft.com/office/drawing/2010/main" w="9525">
                   <a:solidFill>
                     <a:srgbClr val="000000"/>
                   </a:solidFill>
@@ -3628,7 +3629,7 @@
             </a:ln>
             <a:extLst>
               <a:ext uri="{91240B29-F687-4f45-9708-019B960494DF}">
-                <a14:hiddenLine xmlns:a14="http://schemas.microsoft.com/office/drawing/2010/main" xmlns="" w="9525">
+                <a14:hiddenLine xmlns="" xmlns:a14="http://schemas.microsoft.com/office/drawing/2010/main" w="9525">
                   <a:solidFill>
                     <a:srgbClr val="000000"/>
                   </a:solidFill>
@@ -3662,7 +3663,7 @@
             </a:ln>
             <a:extLst>
               <a:ext uri="{91240B29-F687-4f45-9708-019B960494DF}">
-                <a14:hiddenLine xmlns:a14="http://schemas.microsoft.com/office/drawing/2010/main" xmlns="" w="9525">
+                <a14:hiddenLine xmlns="" xmlns:a14="http://schemas.microsoft.com/office/drawing/2010/main" w="9525">
                   <a:solidFill>
                     <a:srgbClr val="000000"/>
                   </a:solidFill>
@@ -3727,7 +3728,7 @@
             </a:ln>
             <a:extLst>
               <a:ext uri="{91240B29-F687-4f45-9708-019B960494DF}">
-                <a14:hiddenLine xmlns:a14="http://schemas.microsoft.com/office/drawing/2010/main" xmlns="" w="9525">
+                <a14:hiddenLine xmlns="" xmlns:a14="http://schemas.microsoft.com/office/drawing/2010/main" w="9525">
                   <a:solidFill>
                     <a:srgbClr val="000000"/>
                   </a:solidFill>
@@ -3817,7 +3818,7 @@
             </a:ln>
             <a:extLst>
               <a:ext uri="{91240B29-F687-4f45-9708-019B960494DF}">
-                <a14:hiddenLine xmlns:a14="http://schemas.microsoft.com/office/drawing/2010/main" xmlns="" w="9525">
+                <a14:hiddenLine xmlns="" xmlns:a14="http://schemas.microsoft.com/office/drawing/2010/main" w="9525">
                   <a:solidFill>
                     <a:srgbClr val="000000"/>
                   </a:solidFill>
@@ -3879,7 +3880,7 @@
             </a:ln>
             <a:extLst>
               <a:ext uri="{91240B29-F687-4f45-9708-019B960494DF}">
-                <a14:hiddenLine xmlns:a14="http://schemas.microsoft.com/office/drawing/2010/main" xmlns="" w="9525">
+                <a14:hiddenLine xmlns="" xmlns:a14="http://schemas.microsoft.com/office/drawing/2010/main" w="9525">
                   <a:solidFill>
                     <a:srgbClr val="000000"/>
                   </a:solidFill>
@@ -3969,7 +3970,7 @@
             </a:ln>
             <a:extLst>
               <a:ext uri="{91240B29-F687-4f45-9708-019B960494DF}">
-                <a14:hiddenLine xmlns:a14="http://schemas.microsoft.com/office/drawing/2010/main" xmlns="" w="9525">
+                <a14:hiddenLine xmlns="" xmlns:a14="http://schemas.microsoft.com/office/drawing/2010/main" w="9525">
                   <a:solidFill>
                     <a:srgbClr val="000000"/>
                   </a:solidFill>
@@ -4059,7 +4060,7 @@
             </a:ln>
             <a:extLst>
               <a:ext uri="{91240B29-F687-4f45-9708-019B960494DF}">
-                <a14:hiddenLine xmlns:a14="http://schemas.microsoft.com/office/drawing/2010/main" xmlns="" w="9525">
+                <a14:hiddenLine xmlns="" xmlns:a14="http://schemas.microsoft.com/office/drawing/2010/main" w="9525">
                   <a:solidFill>
                     <a:srgbClr val="000000"/>
                   </a:solidFill>
@@ -4124,7 +4125,7 @@
             </a:ln>
             <a:extLst>
               <a:ext uri="{91240B29-F687-4f45-9708-019B960494DF}">
-                <a14:hiddenLine xmlns:a14="http://schemas.microsoft.com/office/drawing/2010/main" xmlns="" w="9525">
+                <a14:hiddenLine xmlns="" xmlns:a14="http://schemas.microsoft.com/office/drawing/2010/main" w="9525">
                   <a:solidFill>
                     <a:srgbClr val="000000"/>
                   </a:solidFill>
@@ -4186,7 +4187,7 @@
             </a:ln>
             <a:extLst>
               <a:ext uri="{91240B29-F687-4f45-9708-019B960494DF}">
-                <a14:hiddenLine xmlns:a14="http://schemas.microsoft.com/office/drawing/2010/main" xmlns="" w="9525">
+                <a14:hiddenLine xmlns="" xmlns:a14="http://schemas.microsoft.com/office/drawing/2010/main" w="9525">
                   <a:solidFill>
                     <a:srgbClr val="000000"/>
                   </a:solidFill>
@@ -4276,7 +4277,7 @@
             </a:ln>
             <a:extLst>
               <a:ext uri="{91240B29-F687-4f45-9708-019B960494DF}">
-                <a14:hiddenLine xmlns:a14="http://schemas.microsoft.com/office/drawing/2010/main" xmlns="" w="9525">
+                <a14:hiddenLine xmlns="" xmlns:a14="http://schemas.microsoft.com/office/drawing/2010/main" w="9525">
                   <a:solidFill>
                     <a:srgbClr val="000000"/>
                   </a:solidFill>
@@ -4366,7 +4367,7 @@
             </a:ln>
             <a:extLst>
               <a:ext uri="{91240B29-F687-4f45-9708-019B960494DF}">
-                <a14:hiddenLine xmlns:a14="http://schemas.microsoft.com/office/drawing/2010/main" xmlns="" w="9525">
+                <a14:hiddenLine xmlns="" xmlns:a14="http://schemas.microsoft.com/office/drawing/2010/main" w="9525">
                   <a:solidFill>
                     <a:srgbClr val="000000"/>
                   </a:solidFill>
@@ -4428,7 +4429,7 @@
             </a:ln>
             <a:extLst>
               <a:ext uri="{91240B29-F687-4f45-9708-019B960494DF}">
-                <a14:hiddenLine xmlns:a14="http://schemas.microsoft.com/office/drawing/2010/main" xmlns="" w="9525">
+                <a14:hiddenLine xmlns="" xmlns:a14="http://schemas.microsoft.com/office/drawing/2010/main" w="9525">
                   <a:solidFill>
                     <a:srgbClr val="000000"/>
                   </a:solidFill>
@@ -4548,7 +4549,7 @@
             </a:ln>
             <a:extLst>
               <a:ext uri="{91240B29-F687-4f45-9708-019B960494DF}">
-                <a14:hiddenLine xmlns:a14="http://schemas.microsoft.com/office/drawing/2010/main" xmlns="" w="9525">
+                <a14:hiddenLine xmlns="" xmlns:a14="http://schemas.microsoft.com/office/drawing/2010/main" w="9525">
                   <a:solidFill>
                     <a:srgbClr val="000000"/>
                   </a:solidFill>
@@ -4616,7 +4617,7 @@
             </a:ln>
             <a:extLst>
               <a:ext uri="{91240B29-F687-4f45-9708-019B960494DF}">
-                <a14:hiddenLine xmlns:a14="http://schemas.microsoft.com/office/drawing/2010/main" xmlns="" w="9525">
+                <a14:hiddenLine xmlns="" xmlns:a14="http://schemas.microsoft.com/office/drawing/2010/main" w="9525">
                   <a:solidFill>
                     <a:srgbClr val="000000"/>
                   </a:solidFill>
@@ -4706,7 +4707,7 @@
             </a:ln>
             <a:extLst>
               <a:ext uri="{91240B29-F687-4f45-9708-019B960494DF}">
-                <a14:hiddenLine xmlns:a14="http://schemas.microsoft.com/office/drawing/2010/main" xmlns="" w="9525">
+                <a14:hiddenLine xmlns="" xmlns:a14="http://schemas.microsoft.com/office/drawing/2010/main" w="9525">
                   <a:solidFill>
                     <a:srgbClr val="000000"/>
                   </a:solidFill>
@@ -4846,7 +4847,7 @@
           <a:p>
             <a:fld id="{EC4347D3-4C9A-C240-8F14-750059DFEEB0}" type="datetimeFigureOut">
               <a:rPr lang="en-US" smtClean="0"/>
-              <a:t>11/7/24</a:t>
+              <a:t>11/12/24</a:t>
             </a:fld>
             <a:endParaRPr lang="en-US"/>
           </a:p>
@@ -5113,7 +5114,7 @@
           <a:p>
             <a:fld id="{EC4347D3-4C9A-C240-8F14-750059DFEEB0}" type="datetimeFigureOut">
               <a:rPr lang="en-US" smtClean="0"/>
-              <a:t>11/7/24</a:t>
+              <a:t>11/12/24</a:t>
             </a:fld>
             <a:endParaRPr lang="en-US"/>
           </a:p>
@@ -5309,7 +5310,7 @@
           <a:p>
             <a:fld id="{EC4347D3-4C9A-C240-8F14-750059DFEEB0}" type="datetimeFigureOut">
               <a:rPr lang="en-US" smtClean="0"/>
-              <a:t>11/7/24</a:t>
+              <a:t>11/12/24</a:t>
             </a:fld>
             <a:endParaRPr lang="en-US"/>
           </a:p>
@@ -5572,7 +5573,7 @@
           <a:p>
             <a:fld id="{EC4347D3-4C9A-C240-8F14-750059DFEEB0}" type="datetimeFigureOut">
               <a:rPr lang="en-US" smtClean="0"/>
-              <a:t>11/7/24</a:t>
+              <a:t>11/12/24</a:t>
             </a:fld>
             <a:endParaRPr lang="en-US"/>
           </a:p>
@@ -6006,7 +6007,7 @@
           <a:p>
             <a:fld id="{EC4347D3-4C9A-C240-8F14-750059DFEEB0}" type="datetimeFigureOut">
               <a:rPr lang="en-US" smtClean="0"/>
-              <a:t>11/7/24</a:t>
+              <a:t>11/12/24</a:t>
             </a:fld>
             <a:endParaRPr lang="en-US"/>
           </a:p>
@@ -6552,7 +6553,7 @@
           <a:p>
             <a:fld id="{EC4347D3-4C9A-C240-8F14-750059DFEEB0}" type="datetimeFigureOut">
               <a:rPr lang="en-US" smtClean="0"/>
-              <a:t>11/7/24</a:t>
+              <a:t>11/12/24</a:t>
             </a:fld>
             <a:endParaRPr lang="en-US"/>
           </a:p>
@@ -7272,7 +7273,7 @@
           <a:p>
             <a:fld id="{EC4347D3-4C9A-C240-8F14-750059DFEEB0}" type="datetimeFigureOut">
               <a:rPr lang="en-US" smtClean="0"/>
-              <a:t>11/7/24</a:t>
+              <a:t>11/12/24</a:t>
             </a:fld>
             <a:endParaRPr lang="en-US"/>
           </a:p>
@@ -7442,7 +7443,7 @@
           <a:p>
             <a:fld id="{EC4347D3-4C9A-C240-8F14-750059DFEEB0}" type="datetimeFigureOut">
               <a:rPr lang="en-US" smtClean="0"/>
-              <a:t>11/7/24</a:t>
+              <a:t>11/12/24</a:t>
             </a:fld>
             <a:endParaRPr lang="en-US"/>
           </a:p>
@@ -7622,7 +7623,7 @@
           <a:p>
             <a:fld id="{EC4347D3-4C9A-C240-8F14-750059DFEEB0}" type="datetimeFigureOut">
               <a:rPr lang="en-US" smtClean="0"/>
-              <a:t>11/7/24</a:t>
+              <a:t>11/12/24</a:t>
             </a:fld>
             <a:endParaRPr lang="en-US"/>
           </a:p>
@@ -7792,7 +7793,7 @@
           <a:p>
             <a:fld id="{EC4347D3-4C9A-C240-8F14-750059DFEEB0}" type="datetimeFigureOut">
               <a:rPr lang="en-US" smtClean="0"/>
-              <a:t>11/7/24</a:t>
+              <a:t>11/12/24</a:t>
             </a:fld>
             <a:endParaRPr lang="en-US"/>
           </a:p>
@@ -8042,7 +8043,7 @@
           <a:p>
             <a:fld id="{EC4347D3-4C9A-C240-8F14-750059DFEEB0}" type="datetimeFigureOut">
               <a:rPr lang="en-US" smtClean="0"/>
-              <a:t>11/7/24</a:t>
+              <a:t>11/12/24</a:t>
             </a:fld>
             <a:endParaRPr lang="en-US"/>
           </a:p>
@@ -8274,7 +8275,7 @@
           <a:p>
             <a:fld id="{EC4347D3-4C9A-C240-8F14-750059DFEEB0}" type="datetimeFigureOut">
               <a:rPr lang="en-US" smtClean="0"/>
-              <a:t>11/7/24</a:t>
+              <a:t>11/12/24</a:t>
             </a:fld>
             <a:endParaRPr lang="en-US"/>
           </a:p>
@@ -8660,7 +8661,7 @@
           <a:p>
             <a:fld id="{EC4347D3-4C9A-C240-8F14-750059DFEEB0}" type="datetimeFigureOut">
               <a:rPr lang="en-US" smtClean="0"/>
-              <a:t>11/7/24</a:t>
+              <a:t>11/12/24</a:t>
             </a:fld>
             <a:endParaRPr lang="en-US"/>
           </a:p>
@@ -8783,7 +8784,7 @@
           <a:p>
             <a:fld id="{EC4347D3-4C9A-C240-8F14-750059DFEEB0}" type="datetimeFigureOut">
               <a:rPr lang="en-US" smtClean="0"/>
-              <a:t>11/7/24</a:t>
+              <a:t>11/12/24</a:t>
             </a:fld>
             <a:endParaRPr lang="en-US"/>
           </a:p>
@@ -8878,7 +8879,7 @@
           <a:p>
             <a:fld id="{EC4347D3-4C9A-C240-8F14-750059DFEEB0}" type="datetimeFigureOut">
               <a:rPr lang="en-US" smtClean="0"/>
-              <a:t>11/7/24</a:t>
+              <a:t>11/12/24</a:t>
             </a:fld>
             <a:endParaRPr lang="en-US"/>
           </a:p>
@@ -9127,7 +9128,7 @@
           <a:p>
             <a:fld id="{EC4347D3-4C9A-C240-8F14-750059DFEEB0}" type="datetimeFigureOut">
               <a:rPr lang="en-US" smtClean="0"/>
-              <a:t>11/7/24</a:t>
+              <a:t>11/12/24</a:t>
             </a:fld>
             <a:endParaRPr lang="en-US"/>
           </a:p>
@@ -9412,7 +9413,7 @@
           <a:p>
             <a:fld id="{EC4347D3-4C9A-C240-8F14-750059DFEEB0}" type="datetimeFigureOut">
               <a:rPr lang="en-US" smtClean="0"/>
-              <a:t>11/7/24</a:t>
+              <a:t>11/12/24</a:t>
             </a:fld>
             <a:endParaRPr lang="en-US"/>
           </a:p>
@@ -9535,7 +9536,7 @@
           <a:noFill/>
           <a:extLst>
             <a:ext uri="{909E8E84-426E-40dd-AFC4-6F175D3DCCD1}">
-              <a14:hiddenFill xmlns:a14="http://schemas.microsoft.com/office/drawing/2010/main" xmlns="">
+              <a14:hiddenFill xmlns="" xmlns:a14="http://schemas.microsoft.com/office/drawing/2010/main">
                 <a:solidFill>
                   <a:srgbClr val="FFFFFF"/>
                 </a:solidFill>
@@ -9609,7 +9610,7 @@
               </a:ln>
               <a:extLst>
                 <a:ext uri="{91240B29-F687-4f45-9708-019B960494DF}">
-                  <a14:hiddenLine xmlns:a14="http://schemas.microsoft.com/office/drawing/2010/main" xmlns="" w="9525">
+                  <a14:hiddenLine xmlns="" xmlns:a14="http://schemas.microsoft.com/office/drawing/2010/main" w="9525">
                     <a:solidFill>
                       <a:srgbClr val="000000"/>
                     </a:solidFill>
@@ -9699,7 +9700,7 @@
               </a:ln>
               <a:extLst>
                 <a:ext uri="{91240B29-F687-4f45-9708-019B960494DF}">
-                  <a14:hiddenLine xmlns:a14="http://schemas.microsoft.com/office/drawing/2010/main" xmlns="" w="9525">
+                  <a14:hiddenLine xmlns="" xmlns:a14="http://schemas.microsoft.com/office/drawing/2010/main" w="9525">
                     <a:solidFill>
                       <a:srgbClr val="000000"/>
                     </a:solidFill>
@@ -9789,7 +9790,7 @@
               </a:ln>
               <a:extLst>
                 <a:ext uri="{91240B29-F687-4f45-9708-019B960494DF}">
-                  <a14:hiddenLine xmlns:a14="http://schemas.microsoft.com/office/drawing/2010/main" xmlns="" w="9525">
+                  <a14:hiddenLine xmlns="" xmlns:a14="http://schemas.microsoft.com/office/drawing/2010/main" w="9525">
                     <a:solidFill>
                       <a:srgbClr val="000000"/>
                     </a:solidFill>
@@ -9851,7 +9852,7 @@
               </a:ln>
               <a:extLst>
                 <a:ext uri="{91240B29-F687-4f45-9708-019B960494DF}">
-                  <a14:hiddenLine xmlns:a14="http://schemas.microsoft.com/office/drawing/2010/main" xmlns="" w="9525">
+                  <a14:hiddenLine xmlns="" xmlns:a14="http://schemas.microsoft.com/office/drawing/2010/main" w="9525">
                     <a:solidFill>
                       <a:srgbClr val="000000"/>
                     </a:solidFill>
@@ -9941,7 +9942,7 @@
               </a:ln>
               <a:extLst>
                 <a:ext uri="{91240B29-F687-4f45-9708-019B960494DF}">
-                  <a14:hiddenLine xmlns:a14="http://schemas.microsoft.com/office/drawing/2010/main" xmlns="" w="9525">
+                  <a14:hiddenLine xmlns="" xmlns:a14="http://schemas.microsoft.com/office/drawing/2010/main" w="9525">
                     <a:solidFill>
                       <a:srgbClr val="000000"/>
                     </a:solidFill>
@@ -10003,7 +10004,7 @@
               </a:ln>
               <a:extLst>
                 <a:ext uri="{91240B29-F687-4f45-9708-019B960494DF}">
-                  <a14:hiddenLine xmlns:a14="http://schemas.microsoft.com/office/drawing/2010/main" xmlns="" w="9525">
+                  <a14:hiddenLine xmlns="" xmlns:a14="http://schemas.microsoft.com/office/drawing/2010/main" w="9525">
                     <a:solidFill>
                       <a:srgbClr val="000000"/>
                     </a:solidFill>
@@ -10065,7 +10066,7 @@
               </a:ln>
               <a:extLst>
                 <a:ext uri="{91240B29-F687-4f45-9708-019B960494DF}">
-                  <a14:hiddenLine xmlns:a14="http://schemas.microsoft.com/office/drawing/2010/main" xmlns="" w="9525">
+                  <a14:hiddenLine xmlns="" xmlns:a14="http://schemas.microsoft.com/office/drawing/2010/main" w="9525">
                     <a:solidFill>
                       <a:srgbClr val="000000"/>
                     </a:solidFill>
@@ -10155,7 +10156,7 @@
               </a:ln>
               <a:extLst>
                 <a:ext uri="{91240B29-F687-4f45-9708-019B960494DF}">
-                  <a14:hiddenLine xmlns:a14="http://schemas.microsoft.com/office/drawing/2010/main" xmlns="" w="9525">
+                  <a14:hiddenLine xmlns="" xmlns:a14="http://schemas.microsoft.com/office/drawing/2010/main" w="9525">
                     <a:solidFill>
                       <a:srgbClr val="000000"/>
                     </a:solidFill>
@@ -10245,7 +10246,7 @@
               </a:ln>
               <a:extLst>
                 <a:ext uri="{91240B29-F687-4f45-9708-019B960494DF}">
-                  <a14:hiddenLine xmlns:a14="http://schemas.microsoft.com/office/drawing/2010/main" xmlns="" w="9525">
+                  <a14:hiddenLine xmlns="" xmlns:a14="http://schemas.microsoft.com/office/drawing/2010/main" w="9525">
                     <a:solidFill>
                       <a:srgbClr val="000000"/>
                     </a:solidFill>
@@ -10307,7 +10308,7 @@
               </a:ln>
               <a:extLst>
                 <a:ext uri="{91240B29-F687-4f45-9708-019B960494DF}">
-                  <a14:hiddenLine xmlns:a14="http://schemas.microsoft.com/office/drawing/2010/main" xmlns="" w="9525">
+                  <a14:hiddenLine xmlns="" xmlns:a14="http://schemas.microsoft.com/office/drawing/2010/main" w="9525">
                     <a:solidFill>
                       <a:srgbClr val="000000"/>
                     </a:solidFill>
@@ -10417,7 +10418,7 @@
               </a:ln>
               <a:extLst>
                 <a:ext uri="{91240B29-F687-4f45-9708-019B960494DF}">
-                  <a14:hiddenLine xmlns:a14="http://schemas.microsoft.com/office/drawing/2010/main" xmlns="" w="9525">
+                  <a14:hiddenLine xmlns="" xmlns:a14="http://schemas.microsoft.com/office/drawing/2010/main" w="9525">
                     <a:solidFill>
                       <a:srgbClr val="000000"/>
                     </a:solidFill>
@@ -10501,7 +10502,7 @@
               </a:ln>
               <a:extLst>
                 <a:ext uri="{91240B29-F687-4f45-9708-019B960494DF}">
-                  <a14:hiddenLine xmlns:a14="http://schemas.microsoft.com/office/drawing/2010/main" xmlns="" w="9525">
+                  <a14:hiddenLine xmlns="" xmlns:a14="http://schemas.microsoft.com/office/drawing/2010/main" w="9525">
                     <a:solidFill>
                       <a:srgbClr val="000000"/>
                     </a:solidFill>
@@ -10563,7 +10564,7 @@
               </a:ln>
               <a:extLst>
                 <a:ext uri="{91240B29-F687-4f45-9708-019B960494DF}">
-                  <a14:hiddenLine xmlns:a14="http://schemas.microsoft.com/office/drawing/2010/main" xmlns="" w="9525">
+                  <a14:hiddenLine xmlns="" xmlns:a14="http://schemas.microsoft.com/office/drawing/2010/main" w="9525">
                     <a:solidFill>
                       <a:srgbClr val="000000"/>
                     </a:solidFill>
@@ -10625,7 +10626,7 @@
               </a:ln>
               <a:extLst>
                 <a:ext uri="{91240B29-F687-4f45-9708-019B960494DF}">
-                  <a14:hiddenLine xmlns:a14="http://schemas.microsoft.com/office/drawing/2010/main" xmlns="" w="9525">
+                  <a14:hiddenLine xmlns="" xmlns:a14="http://schemas.microsoft.com/office/drawing/2010/main" w="9525">
                     <a:solidFill>
                       <a:srgbClr val="000000"/>
                     </a:solidFill>
@@ -10715,7 +10716,7 @@
               </a:ln>
               <a:extLst>
                 <a:ext uri="{91240B29-F687-4f45-9708-019B960494DF}">
-                  <a14:hiddenLine xmlns:a14="http://schemas.microsoft.com/office/drawing/2010/main" xmlns="" w="9525">
+                  <a14:hiddenLine xmlns="" xmlns:a14="http://schemas.microsoft.com/office/drawing/2010/main" w="9525">
                     <a:solidFill>
                       <a:srgbClr val="000000"/>
                     </a:solidFill>
@@ -10749,7 +10750,7 @@
               </a:ln>
               <a:extLst>
                 <a:ext uri="{91240B29-F687-4f45-9708-019B960494DF}">
-                  <a14:hiddenLine xmlns:a14="http://schemas.microsoft.com/office/drawing/2010/main" xmlns="" w="9525">
+                  <a14:hiddenLine xmlns="" xmlns:a14="http://schemas.microsoft.com/office/drawing/2010/main" w="9525">
                     <a:solidFill>
                       <a:srgbClr val="000000"/>
                     </a:solidFill>
@@ -10814,7 +10815,7 @@
               </a:ln>
               <a:extLst>
                 <a:ext uri="{91240B29-F687-4f45-9708-019B960494DF}">
-                  <a14:hiddenLine xmlns:a14="http://schemas.microsoft.com/office/drawing/2010/main" xmlns="" w="9525">
+                  <a14:hiddenLine xmlns="" xmlns:a14="http://schemas.microsoft.com/office/drawing/2010/main" w="9525">
                     <a:solidFill>
                       <a:srgbClr val="000000"/>
                     </a:solidFill>
@@ -10904,7 +10905,7 @@
               </a:ln>
               <a:extLst>
                 <a:ext uri="{91240B29-F687-4f45-9708-019B960494DF}">
-                  <a14:hiddenLine xmlns:a14="http://schemas.microsoft.com/office/drawing/2010/main" xmlns="" w="9525">
+                  <a14:hiddenLine xmlns="" xmlns:a14="http://schemas.microsoft.com/office/drawing/2010/main" w="9525">
                     <a:solidFill>
                       <a:srgbClr val="000000"/>
                     </a:solidFill>
@@ -10966,7 +10967,7 @@
               </a:ln>
               <a:extLst>
                 <a:ext uri="{91240B29-F687-4f45-9708-019B960494DF}">
-                  <a14:hiddenLine xmlns:a14="http://schemas.microsoft.com/office/drawing/2010/main" xmlns="" w="9525">
+                  <a14:hiddenLine xmlns="" xmlns:a14="http://schemas.microsoft.com/office/drawing/2010/main" w="9525">
                     <a:solidFill>
                       <a:srgbClr val="000000"/>
                     </a:solidFill>
@@ -11056,7 +11057,7 @@
               </a:ln>
               <a:extLst>
                 <a:ext uri="{91240B29-F687-4f45-9708-019B960494DF}">
-                  <a14:hiddenLine xmlns:a14="http://schemas.microsoft.com/office/drawing/2010/main" xmlns="" w="9525">
+                  <a14:hiddenLine xmlns="" xmlns:a14="http://schemas.microsoft.com/office/drawing/2010/main" w="9525">
                     <a:solidFill>
                       <a:srgbClr val="000000"/>
                     </a:solidFill>
@@ -11121,7 +11122,7 @@
               </a:ln>
               <a:extLst>
                 <a:ext uri="{91240B29-F687-4f45-9708-019B960494DF}">
-                  <a14:hiddenLine xmlns:a14="http://schemas.microsoft.com/office/drawing/2010/main" xmlns="" w="9525">
+                  <a14:hiddenLine xmlns="" xmlns:a14="http://schemas.microsoft.com/office/drawing/2010/main" w="9525">
                     <a:solidFill>
                       <a:srgbClr val="000000"/>
                     </a:solidFill>
@@ -11183,7 +11184,7 @@
               </a:ln>
               <a:extLst>
                 <a:ext uri="{91240B29-F687-4f45-9708-019B960494DF}">
-                  <a14:hiddenLine xmlns:a14="http://schemas.microsoft.com/office/drawing/2010/main" xmlns="" w="9525">
+                  <a14:hiddenLine xmlns="" xmlns:a14="http://schemas.microsoft.com/office/drawing/2010/main" w="9525">
                     <a:solidFill>
                       <a:srgbClr val="000000"/>
                     </a:solidFill>
@@ -11273,7 +11274,7 @@
               </a:ln>
               <a:extLst>
                 <a:ext uri="{91240B29-F687-4f45-9708-019B960494DF}">
-                  <a14:hiddenLine xmlns:a14="http://schemas.microsoft.com/office/drawing/2010/main" xmlns="" w="9525">
+                  <a14:hiddenLine xmlns="" xmlns:a14="http://schemas.microsoft.com/office/drawing/2010/main" w="9525">
                     <a:solidFill>
                       <a:srgbClr val="000000"/>
                     </a:solidFill>
@@ -11363,7 +11364,7 @@
               </a:ln>
               <a:extLst>
                 <a:ext uri="{91240B29-F687-4f45-9708-019B960494DF}">
-                  <a14:hiddenLine xmlns:a14="http://schemas.microsoft.com/office/drawing/2010/main" xmlns="" w="9525">
+                  <a14:hiddenLine xmlns="" xmlns:a14="http://schemas.microsoft.com/office/drawing/2010/main" w="9525">
                     <a:solidFill>
                       <a:srgbClr val="000000"/>
                     </a:solidFill>
@@ -11428,7 +11429,7 @@
               </a:ln>
               <a:extLst>
                 <a:ext uri="{91240B29-F687-4f45-9708-019B960494DF}">
-                  <a14:hiddenLine xmlns:a14="http://schemas.microsoft.com/office/drawing/2010/main" xmlns="" w="9525">
+                  <a14:hiddenLine xmlns="" xmlns:a14="http://schemas.microsoft.com/office/drawing/2010/main" w="9525">
                     <a:solidFill>
                       <a:srgbClr val="000000"/>
                     </a:solidFill>
@@ -11548,7 +11549,7 @@
               </a:ln>
               <a:extLst>
                 <a:ext uri="{91240B29-F687-4f45-9708-019B960494DF}">
-                  <a14:hiddenLine xmlns:a14="http://schemas.microsoft.com/office/drawing/2010/main" xmlns="" w="9525">
+                  <a14:hiddenLine xmlns="" xmlns:a14="http://schemas.microsoft.com/office/drawing/2010/main" w="9525">
                     <a:solidFill>
                       <a:srgbClr val="000000"/>
                     </a:solidFill>
@@ -11629,7 +11630,7 @@
               </a:ln>
               <a:extLst>
                 <a:ext uri="{91240B29-F687-4f45-9708-019B960494DF}">
-                  <a14:hiddenLine xmlns:a14="http://schemas.microsoft.com/office/drawing/2010/main" xmlns="" w="9525">
+                  <a14:hiddenLine xmlns="" xmlns:a14="http://schemas.microsoft.com/office/drawing/2010/main" w="9525">
                     <a:solidFill>
                       <a:srgbClr val="000000"/>
                     </a:solidFill>
@@ -11744,7 +11745,7 @@
               </a:ln>
               <a:extLst>
                 <a:ext uri="{91240B29-F687-4f45-9708-019B960494DF}">
-                  <a14:hiddenLine xmlns:a14="http://schemas.microsoft.com/office/drawing/2010/main" xmlns="" w="9525">
+                  <a14:hiddenLine xmlns="" xmlns:a14="http://schemas.microsoft.com/office/drawing/2010/main" w="9525">
                     <a:solidFill>
                       <a:srgbClr val="000000"/>
                     </a:solidFill>
@@ -11834,7 +11835,7 @@
               </a:ln>
               <a:extLst>
                 <a:ext uri="{91240B29-F687-4f45-9708-019B960494DF}">
-                  <a14:hiddenLine xmlns:a14="http://schemas.microsoft.com/office/drawing/2010/main" xmlns="" w="9525">
+                  <a14:hiddenLine xmlns="" xmlns:a14="http://schemas.microsoft.com/office/drawing/2010/main" w="9525">
                     <a:solidFill>
                       <a:srgbClr val="000000"/>
                     </a:solidFill>
@@ -11899,7 +11900,7 @@
               </a:ln>
               <a:extLst>
                 <a:ext uri="{91240B29-F687-4f45-9708-019B960494DF}">
-                  <a14:hiddenLine xmlns:a14="http://schemas.microsoft.com/office/drawing/2010/main" xmlns="" w="9525">
+                  <a14:hiddenLine xmlns="" xmlns:a14="http://schemas.microsoft.com/office/drawing/2010/main" w="9525">
                     <a:solidFill>
                       <a:srgbClr val="000000"/>
                     </a:solidFill>
@@ -11989,7 +11990,7 @@
               </a:ln>
               <a:extLst>
                 <a:ext uri="{91240B29-F687-4f45-9708-019B960494DF}">
-                  <a14:hiddenLine xmlns:a14="http://schemas.microsoft.com/office/drawing/2010/main" xmlns="" w="9525">
+                  <a14:hiddenLine xmlns="" xmlns:a14="http://schemas.microsoft.com/office/drawing/2010/main" w="9525">
                     <a:solidFill>
                       <a:srgbClr val="000000"/>
                     </a:solidFill>
@@ -12057,7 +12058,7 @@
               </a:ln>
               <a:extLst>
                 <a:ext uri="{91240B29-F687-4f45-9708-019B960494DF}">
-                  <a14:hiddenLine xmlns:a14="http://schemas.microsoft.com/office/drawing/2010/main" xmlns="" w="9525">
+                  <a14:hiddenLine xmlns="" xmlns:a14="http://schemas.microsoft.com/office/drawing/2010/main" w="9525">
                     <a:solidFill>
                       <a:srgbClr val="000000"/>
                     </a:solidFill>
@@ -12147,7 +12148,7 @@
               </a:ln>
               <a:extLst>
                 <a:ext uri="{91240B29-F687-4f45-9708-019B960494DF}">
-                  <a14:hiddenLine xmlns:a14="http://schemas.microsoft.com/office/drawing/2010/main" xmlns="" w="9525">
+                  <a14:hiddenLine xmlns="" xmlns:a14="http://schemas.microsoft.com/office/drawing/2010/main" w="9525">
                     <a:solidFill>
                       <a:srgbClr val="000000"/>
                     </a:solidFill>
@@ -12215,7 +12216,7 @@
               </a:ln>
               <a:extLst>
                 <a:ext uri="{91240B29-F687-4f45-9708-019B960494DF}">
-                  <a14:hiddenLine xmlns:a14="http://schemas.microsoft.com/office/drawing/2010/main" xmlns="" w="9525">
+                  <a14:hiddenLine xmlns="" xmlns:a14="http://schemas.microsoft.com/office/drawing/2010/main" w="9525">
                     <a:solidFill>
                       <a:srgbClr val="000000"/>
                     </a:solidFill>
@@ -12305,7 +12306,7 @@
               </a:ln>
               <a:extLst>
                 <a:ext uri="{91240B29-F687-4f45-9708-019B960494DF}">
-                  <a14:hiddenLine xmlns:a14="http://schemas.microsoft.com/office/drawing/2010/main" xmlns="" w="9525">
+                  <a14:hiddenLine xmlns="" xmlns:a14="http://schemas.microsoft.com/office/drawing/2010/main" w="9525">
                     <a:solidFill>
                       <a:srgbClr val="000000"/>
                     </a:solidFill>
@@ -12339,7 +12340,7 @@
               </a:ln>
               <a:extLst>
                 <a:ext uri="{91240B29-F687-4f45-9708-019B960494DF}">
-                  <a14:hiddenLine xmlns:a14="http://schemas.microsoft.com/office/drawing/2010/main" xmlns="" w="9525">
+                  <a14:hiddenLine xmlns="" xmlns:a14="http://schemas.microsoft.com/office/drawing/2010/main" w="9525">
                     <a:solidFill>
                       <a:srgbClr val="000000"/>
                     </a:solidFill>
@@ -12479,7 +12480,7 @@
           <a:p>
             <a:fld id="{EC4347D3-4C9A-C240-8F14-750059DFEEB0}" type="datetimeFigureOut">
               <a:rPr lang="en-US" smtClean="0"/>
-              <a:t>11/7/24</a:t>
+              <a:t>11/12/24</a:t>
             </a:fld>
             <a:endParaRPr lang="en-US"/>
           </a:p>
@@ -14551,6 +14552,213 @@
 </p:sld>
 </file>
 
+<file path=ppt/slides/slide18.xml><?xml version="1.0" encoding="utf-8"?>
+<p:sld xmlns:a="http://schemas.openxmlformats.org/drawingml/2006/main" xmlns:r="http://schemas.openxmlformats.org/officeDocument/2006/relationships" xmlns:p="http://schemas.openxmlformats.org/presentationml/2006/main">
+  <p:cSld>
+    <p:spTree>
+      <p:nvGrpSpPr>
+        <p:cNvPr id="1" name=""/>
+        <p:cNvGrpSpPr/>
+        <p:nvPr/>
+      </p:nvGrpSpPr>
+      <p:grpSpPr>
+        <a:xfrm>
+          <a:off x="0" y="0"/>
+          <a:ext cx="0" cy="0"/>
+          <a:chOff x="0" y="0"/>
+          <a:chExt cx="0" cy="0"/>
+        </a:xfrm>
+      </p:grpSpPr>
+      <p:sp>
+        <p:nvSpPr>
+          <p:cNvPr id="6146" name="Rectangle 2"/>
+          <p:cNvSpPr>
+            <a:spLocks noGrp="1" noChangeArrowheads="1"/>
+          </p:cNvSpPr>
+          <p:nvPr>
+            <p:ph type="title"/>
+            <p:custDataLst>
+              <p:tags r:id="rId1"/>
+            </p:custDataLst>
+          </p:nvPr>
+        </p:nvSpPr>
+        <p:spPr>
+          <a:xfrm>
+            <a:off x="1141413" y="284084"/>
+            <a:ext cx="9905998" cy="620791"/>
+          </a:xfrm>
+        </p:spPr>
+        <p:txBody>
+          <a:bodyPr/>
+          <a:lstStyle/>
+          <a:p>
+            <a:pPr algn="ctr"/>
+            <a:r>
+              <a:rPr lang="en-US" dirty="0"/>
+              <a:t>Lecture 17: Tue. Nov. 12</a:t>
+            </a:r>
+          </a:p>
+        </p:txBody>
+      </p:sp>
+      <p:sp>
+        <p:nvSpPr>
+          <p:cNvPr id="6147" name="Rectangle 3"/>
+          <p:cNvSpPr>
+            <a:spLocks noGrp="1" noChangeArrowheads="1"/>
+          </p:cNvSpPr>
+          <p:nvPr>
+            <p:ph idx="1"/>
+            <p:custDataLst>
+              <p:tags r:id="rId2"/>
+            </p:custDataLst>
+          </p:nvPr>
+        </p:nvSpPr>
+        <p:spPr>
+          <a:xfrm>
+            <a:off x="1021404" y="1024128"/>
+            <a:ext cx="10204315" cy="5312664"/>
+          </a:xfrm>
+        </p:spPr>
+        <p:txBody>
+          <a:bodyPr>
+            <a:normAutofit/>
+          </a:bodyPr>
+          <a:lstStyle/>
+          <a:p>
+            <a:r>
+              <a:rPr lang="en-US" dirty="0"/>
+              <a:t>DMT2 is </a:t>
+            </a:r>
+            <a:r>
+              <a:rPr lang="en-US" b="1" i="1" u="sng" dirty="0"/>
+              <a:t>going to be great</a:t>
+            </a:r>
+            <a:r>
+              <a:rPr lang="en-US" dirty="0"/>
+              <a:t>! Let’s learn a lot of stuff together! Keep morale high!</a:t>
+            </a:r>
+          </a:p>
+          <a:p>
+            <a:r>
+              <a:rPr lang="en-US" dirty="0"/>
+              <a:t>Welcome to November. Final stretch of lectures upcoming…</a:t>
+            </a:r>
+          </a:p>
+          <a:p>
+            <a:r>
+              <a:rPr lang="en-US" dirty="0"/>
+              <a:t>Module 3 written homework is </a:t>
+            </a:r>
+            <a:r>
+              <a:rPr lang="en-US" b="1" i="1" u="sng" dirty="0"/>
+              <a:t>is almost completely graded</a:t>
+            </a:r>
+            <a:r>
+              <a:rPr lang="en-US" dirty="0"/>
+              <a:t>.</a:t>
+            </a:r>
+          </a:p>
+          <a:p>
+            <a:r>
+              <a:rPr lang="en-US" dirty="0"/>
+              <a:t>Quiz 3 is </a:t>
+            </a:r>
+            <a:r>
+              <a:rPr lang="en-US" b="1" i="1" u="sng" dirty="0"/>
+              <a:t>graded and returned</a:t>
+            </a:r>
+            <a:r>
+              <a:rPr lang="en-US" dirty="0"/>
+              <a:t>. </a:t>
+            </a:r>
+          </a:p>
+          <a:p>
+            <a:pPr lvl="1"/>
+            <a:r>
+              <a:rPr lang="en-US" dirty="0"/>
+              <a:t>Median score was 13.5 again. Regrades open until tonight</a:t>
+            </a:r>
+          </a:p>
+          <a:p>
+            <a:r>
+              <a:rPr lang="en-US" dirty="0"/>
+              <a:t>Module 4 written homework is due </a:t>
+            </a:r>
+            <a:r>
+              <a:rPr lang="en-US" b="1" i="1" u="sng" dirty="0"/>
+              <a:t>THIS Thursday</a:t>
+            </a:r>
+            <a:r>
+              <a:rPr lang="en-US" dirty="0"/>
+              <a:t>.</a:t>
+            </a:r>
+          </a:p>
+          <a:p>
+            <a:r>
+              <a:rPr lang="en-US" dirty="0"/>
+              <a:t>Quiz 4 is </a:t>
+            </a:r>
+            <a:r>
+              <a:rPr lang="en-US" b="1" i="1" u="sng" dirty="0"/>
+              <a:t>NEXT Thursday</a:t>
+            </a:r>
+            <a:r>
+              <a:rPr lang="en-US" dirty="0"/>
+              <a:t>.</a:t>
+            </a:r>
+          </a:p>
+          <a:p>
+            <a:r>
+              <a:rPr lang="en-US" dirty="0"/>
+              <a:t>Today we will finish module 4 and begin module 5.</a:t>
+            </a:r>
+          </a:p>
+          <a:p>
+            <a:pPr lvl="1"/>
+            <a:r>
+              <a:rPr lang="en-US" dirty="0"/>
+              <a:t>We are ahead of schedule, which is good for our T-Giving Week aspirations.</a:t>
+            </a:r>
+          </a:p>
+        </p:txBody>
+      </p:sp>
+      <p:sp>
+        <p:nvSpPr>
+          <p:cNvPr id="4" name="Slide Number Placeholder 3"/>
+          <p:cNvSpPr>
+            <a:spLocks noGrp="1"/>
+          </p:cNvSpPr>
+          <p:nvPr>
+            <p:ph type="sldNum" sz="quarter" idx="12"/>
+          </p:nvPr>
+        </p:nvSpPr>
+        <p:spPr/>
+        <p:txBody>
+          <a:bodyPr/>
+          <a:lstStyle/>
+          <a:p>
+            <a:fld id="{F26D9103-0C5C-48AC-B68E-3ED2C1647047}" type="slidenum">
+              <a:rPr lang="en-US" smtClean="0"/>
+              <a:pPr/>
+              <a:t>18</a:t>
+            </a:fld>
+            <a:endParaRPr lang="en-US" dirty="0"/>
+          </a:p>
+        </p:txBody>
+      </p:sp>
+    </p:spTree>
+    <p:extLst>
+      <p:ext uri="{BB962C8B-B14F-4D97-AF65-F5344CB8AC3E}">
+        <p14:creationId xmlns:p14="http://schemas.microsoft.com/office/powerpoint/2010/main" val="1717916177"/>
+      </p:ext>
+    </p:extLst>
+  </p:cSld>
+  <p:clrMapOvr>
+    <a:masterClrMapping/>
+  </p:clrMapOvr>
+</p:sld>
+</file>
+
 <file path=ppt/slides/slide2.xml><?xml version="1.0" encoding="utf-8"?>
 <p:sld xmlns:a="http://schemas.openxmlformats.org/drawingml/2006/main" xmlns:r="http://schemas.openxmlformats.org/officeDocument/2006/relationships" xmlns:p="http://schemas.openxmlformats.org/presentationml/2006/main">
   <p:cSld>
@@ -16249,6 +16457,18 @@
 </file>
 
 <file path=ppt/tags/tag32.xml><?xml version="1.0" encoding="utf-8"?>
+<p:tagLst xmlns:a="http://schemas.openxmlformats.org/drawingml/2006/main" xmlns:r="http://schemas.openxmlformats.org/officeDocument/2006/relationships" xmlns:p="http://schemas.openxmlformats.org/presentationml/2006/main">
+  <p:tag name="_INSTRUCTOR VIEW19C14C36-AC8E-43BC-9DB6-C2AAF774C7DC|PANE__TAG" val="_"/>
+</p:tagLst>
+</file>
+
+<file path=ppt/tags/tag33.xml><?xml version="1.0" encoding="utf-8"?>
+<p:tagLst xmlns:a="http://schemas.openxmlformats.org/drawingml/2006/main" xmlns:r="http://schemas.openxmlformats.org/officeDocument/2006/relationships" xmlns:p="http://schemas.openxmlformats.org/presentationml/2006/main">
+  <p:tag name="_INSTRUCTOR VIEW19C14C36-AC8E-43BC-9DB6-C2AAF774C7DC|PANE__TAG" val="_"/>
+</p:tagLst>
+</file>
+
+<file path=ppt/tags/tag34.xml><?xml version="1.0" encoding="utf-8"?>
 <p:tagLst xmlns:a="http://schemas.openxmlformats.org/drawingml/2006/main" xmlns:r="http://schemas.openxmlformats.org/officeDocument/2006/relationships" xmlns:p="http://schemas.openxmlformats.org/presentationml/2006/main">
   <p:tag name="_INSTRUCTOR VIEW19C14C36-AC8E-43BC-9DB6-C2AAF774C7DC|PANE__TAG" val="_"/>
 </p:tagLst>

</xml_diff>

<commit_message>
announcements and small slide fixes
</commit_message>
<xml_diff>
--- a/slides/00-DailyAnnouncements.pptx
+++ b/slides/00-DailyAnnouncements.pptx
@@ -5,11 +5,12 @@
     <p:sldMasterId id="2147484006" r:id="rId1"/>
   </p:sldMasterIdLst>
   <p:notesMasterIdLst>
-    <p:notesMasterId r:id="rId4"/>
+    <p:notesMasterId r:id="rId5"/>
   </p:notesMasterIdLst>
   <p:sldIdLst>
     <p:sldId id="256" r:id="rId2"/>
     <p:sldId id="505" r:id="rId3"/>
+    <p:sldId id="506" r:id="rId4"/>
   </p:sldIdLst>
   <p:sldSz cx="12192000" cy="6858000"/>
   <p:notesSz cx="6858000" cy="9144000"/>
@@ -198,7 +199,7 @@
           <a:p>
             <a:fld id="{C5B45307-6ED4-B142-BD64-10F739779302}" type="datetimeFigureOut">
               <a:rPr lang="en-US" smtClean="0"/>
-              <a:t>1/16/25</a:t>
+              <a:t>1/21/25</a:t>
             </a:fld>
             <a:endParaRPr lang="en-US"/>
           </a:p>
@@ -606,7 +607,7 @@
           <a:noFill/>
           <a:extLst>
             <a:ext uri="{909E8E84-426E-40dd-AFC4-6F175D3DCCD1}">
-              <a14:hiddenFill xmlns="" xmlns:a14="http://schemas.microsoft.com/office/drawing/2010/main">
+              <a14:hiddenFill xmlns:a14="http://schemas.microsoft.com/office/drawing/2010/main" xmlns="">
                 <a:solidFill>
                   <a:srgbClr val="FFFFFF"/>
                 </a:solidFill>
@@ -665,7 +666,7 @@
             </a:ln>
             <a:extLst>
               <a:ext uri="{91240B29-F687-4f45-9708-019B960494DF}">
-                <a14:hiddenLine xmlns="" xmlns:a14="http://schemas.microsoft.com/office/drawing/2010/main" w="9525">
+                <a14:hiddenLine xmlns:a14="http://schemas.microsoft.com/office/drawing/2010/main" xmlns="" w="9525">
                   <a:solidFill>
                     <a:srgbClr val="000000"/>
                   </a:solidFill>
@@ -755,7 +756,7 @@
             </a:ln>
             <a:extLst>
               <a:ext uri="{91240B29-F687-4f45-9708-019B960494DF}">
-                <a14:hiddenLine xmlns="" xmlns:a14="http://schemas.microsoft.com/office/drawing/2010/main" w="9525">
+                <a14:hiddenLine xmlns:a14="http://schemas.microsoft.com/office/drawing/2010/main" xmlns="" w="9525">
                   <a:solidFill>
                     <a:srgbClr val="000000"/>
                   </a:solidFill>
@@ -845,7 +846,7 @@
             </a:ln>
             <a:extLst>
               <a:ext uri="{91240B29-F687-4f45-9708-019B960494DF}">
-                <a14:hiddenLine xmlns="" xmlns:a14="http://schemas.microsoft.com/office/drawing/2010/main" w="9525">
+                <a14:hiddenLine xmlns:a14="http://schemas.microsoft.com/office/drawing/2010/main" xmlns="" w="9525">
                   <a:solidFill>
                     <a:srgbClr val="000000"/>
                   </a:solidFill>
@@ -879,7 +880,7 @@
             </a:ln>
             <a:extLst>
               <a:ext uri="{91240B29-F687-4f45-9708-019B960494DF}">
-                <a14:hiddenLine xmlns="" xmlns:a14="http://schemas.microsoft.com/office/drawing/2010/main" w="9525">
+                <a14:hiddenLine xmlns:a14="http://schemas.microsoft.com/office/drawing/2010/main" xmlns="" w="9525">
                   <a:solidFill>
                     <a:srgbClr val="000000"/>
                   </a:solidFill>
@@ -969,7 +970,7 @@
             </a:ln>
             <a:extLst>
               <a:ext uri="{91240B29-F687-4f45-9708-019B960494DF}">
-                <a14:hiddenLine xmlns="" xmlns:a14="http://schemas.microsoft.com/office/drawing/2010/main" w="9525">
+                <a14:hiddenLine xmlns:a14="http://schemas.microsoft.com/office/drawing/2010/main" xmlns="" w="9525">
                   <a:solidFill>
                     <a:srgbClr val="000000"/>
                   </a:solidFill>
@@ -1031,7 +1032,7 @@
             </a:ln>
             <a:extLst>
               <a:ext uri="{91240B29-F687-4f45-9708-019B960494DF}">
-                <a14:hiddenLine xmlns="" xmlns:a14="http://schemas.microsoft.com/office/drawing/2010/main" w="9525">
+                <a14:hiddenLine xmlns:a14="http://schemas.microsoft.com/office/drawing/2010/main" xmlns="" w="9525">
                   <a:solidFill>
                     <a:srgbClr val="000000"/>
                   </a:solidFill>
@@ -1093,7 +1094,7 @@
             </a:ln>
             <a:extLst>
               <a:ext uri="{91240B29-F687-4f45-9708-019B960494DF}">
-                <a14:hiddenLine xmlns="" xmlns:a14="http://schemas.microsoft.com/office/drawing/2010/main" w="9525">
+                <a14:hiddenLine xmlns:a14="http://schemas.microsoft.com/office/drawing/2010/main" xmlns="" w="9525">
                   <a:solidFill>
                     <a:srgbClr val="000000"/>
                   </a:solidFill>
@@ -1183,7 +1184,7 @@
             </a:ln>
             <a:extLst>
               <a:ext uri="{91240B29-F687-4f45-9708-019B960494DF}">
-                <a14:hiddenLine xmlns="" xmlns:a14="http://schemas.microsoft.com/office/drawing/2010/main" w="9525">
+                <a14:hiddenLine xmlns:a14="http://schemas.microsoft.com/office/drawing/2010/main" xmlns="" w="9525">
                   <a:solidFill>
                     <a:srgbClr val="000000"/>
                   </a:solidFill>
@@ -1245,7 +1246,7 @@
             </a:ln>
             <a:extLst>
               <a:ext uri="{91240B29-F687-4f45-9708-019B960494DF}">
-                <a14:hiddenLine xmlns="" xmlns:a14="http://schemas.microsoft.com/office/drawing/2010/main" w="9525">
+                <a14:hiddenLine xmlns:a14="http://schemas.microsoft.com/office/drawing/2010/main" xmlns="" w="9525">
                   <a:solidFill>
                     <a:srgbClr val="000000"/>
                   </a:solidFill>
@@ -1307,7 +1308,7 @@
             </a:ln>
             <a:extLst>
               <a:ext uri="{91240B29-F687-4f45-9708-019B960494DF}">
-                <a14:hiddenLine xmlns="" xmlns:a14="http://schemas.microsoft.com/office/drawing/2010/main" w="9525">
+                <a14:hiddenLine xmlns:a14="http://schemas.microsoft.com/office/drawing/2010/main" xmlns="" w="9525">
                   <a:solidFill>
                     <a:srgbClr val="000000"/>
                   </a:solidFill>
@@ -1397,7 +1398,7 @@
             </a:ln>
             <a:extLst>
               <a:ext uri="{91240B29-F687-4f45-9708-019B960494DF}">
-                <a14:hiddenLine xmlns="" xmlns:a14="http://schemas.microsoft.com/office/drawing/2010/main" w="9525">
+                <a14:hiddenLine xmlns:a14="http://schemas.microsoft.com/office/drawing/2010/main" xmlns="" w="9525">
                   <a:solidFill>
                     <a:srgbClr val="000000"/>
                   </a:solidFill>
@@ -1487,7 +1488,7 @@
             </a:ln>
             <a:extLst>
               <a:ext uri="{91240B29-F687-4f45-9708-019B960494DF}">
-                <a14:hiddenLine xmlns="" xmlns:a14="http://schemas.microsoft.com/office/drawing/2010/main" w="9525">
+                <a14:hiddenLine xmlns:a14="http://schemas.microsoft.com/office/drawing/2010/main" xmlns="" w="9525">
                   <a:solidFill>
                     <a:srgbClr val="000000"/>
                   </a:solidFill>
@@ -1549,7 +1550,7 @@
             </a:ln>
             <a:extLst>
               <a:ext uri="{91240B29-F687-4f45-9708-019B960494DF}">
-                <a14:hiddenLine xmlns="" xmlns:a14="http://schemas.microsoft.com/office/drawing/2010/main" w="9525">
+                <a14:hiddenLine xmlns:a14="http://schemas.microsoft.com/office/drawing/2010/main" xmlns="" w="9525">
                   <a:solidFill>
                     <a:srgbClr val="000000"/>
                   </a:solidFill>
@@ -1659,7 +1660,7 @@
             </a:ln>
             <a:extLst>
               <a:ext uri="{91240B29-F687-4f45-9708-019B960494DF}">
-                <a14:hiddenLine xmlns="" xmlns:a14="http://schemas.microsoft.com/office/drawing/2010/main" w="9525">
+                <a14:hiddenLine xmlns:a14="http://schemas.microsoft.com/office/drawing/2010/main" xmlns="" w="9525">
                   <a:solidFill>
                     <a:srgbClr val="000000"/>
                   </a:solidFill>
@@ -1721,7 +1722,7 @@
             </a:ln>
             <a:extLst>
               <a:ext uri="{91240B29-F687-4f45-9708-019B960494DF}">
-                <a14:hiddenLine xmlns="" xmlns:a14="http://schemas.microsoft.com/office/drawing/2010/main" w="9525">
+                <a14:hiddenLine xmlns:a14="http://schemas.microsoft.com/office/drawing/2010/main" xmlns="" w="9525">
                   <a:solidFill>
                     <a:srgbClr val="000000"/>
                   </a:solidFill>
@@ -1811,7 +1812,7 @@
             </a:ln>
             <a:extLst>
               <a:ext uri="{91240B29-F687-4f45-9708-019B960494DF}">
-                <a14:hiddenLine xmlns="" xmlns:a14="http://schemas.microsoft.com/office/drawing/2010/main" w="9525">
+                <a14:hiddenLine xmlns:a14="http://schemas.microsoft.com/office/drawing/2010/main" xmlns="" w="9525">
                   <a:solidFill>
                     <a:srgbClr val="000000"/>
                   </a:solidFill>
@@ -1901,7 +1902,7 @@
             </a:ln>
             <a:extLst>
               <a:ext uri="{91240B29-F687-4f45-9708-019B960494DF}">
-                <a14:hiddenLine xmlns="" xmlns:a14="http://schemas.microsoft.com/office/drawing/2010/main" w="9525">
+                <a14:hiddenLine xmlns:a14="http://schemas.microsoft.com/office/drawing/2010/main" xmlns="" w="9525">
                   <a:solidFill>
                     <a:srgbClr val="000000"/>
                   </a:solidFill>
@@ -1963,7 +1964,7 @@
             </a:ln>
             <a:extLst>
               <a:ext uri="{91240B29-F687-4f45-9708-019B960494DF}">
-                <a14:hiddenLine xmlns="" xmlns:a14="http://schemas.microsoft.com/office/drawing/2010/main" w="9525">
+                <a14:hiddenLine xmlns:a14="http://schemas.microsoft.com/office/drawing/2010/main" xmlns="" w="9525">
                   <a:solidFill>
                     <a:srgbClr val="000000"/>
                   </a:solidFill>
@@ -2053,7 +2054,7 @@
             </a:ln>
             <a:extLst>
               <a:ext uri="{91240B29-F687-4f45-9708-019B960494DF}">
-                <a14:hiddenLine xmlns="" xmlns:a14="http://schemas.microsoft.com/office/drawing/2010/main" w="9525">
+                <a14:hiddenLine xmlns:a14="http://schemas.microsoft.com/office/drawing/2010/main" xmlns="" w="9525">
                   <a:solidFill>
                     <a:srgbClr val="000000"/>
                   </a:solidFill>
@@ -2143,7 +2144,7 @@
             </a:ln>
             <a:extLst>
               <a:ext uri="{91240B29-F687-4f45-9708-019B960494DF}">
-                <a14:hiddenLine xmlns="" xmlns:a14="http://schemas.microsoft.com/office/drawing/2010/main" w="9525">
+                <a14:hiddenLine xmlns:a14="http://schemas.microsoft.com/office/drawing/2010/main" xmlns="" w="9525">
                   <a:solidFill>
                     <a:srgbClr val="000000"/>
                   </a:solidFill>
@@ -2199,7 +2200,7 @@
             </a:ln>
             <a:extLst>
               <a:ext uri="{91240B29-F687-4f45-9708-019B960494DF}">
-                <a14:hiddenLine xmlns="" xmlns:a14="http://schemas.microsoft.com/office/drawing/2010/main" w="9525">
+                <a14:hiddenLine xmlns:a14="http://schemas.microsoft.com/office/drawing/2010/main" xmlns="" w="9525">
                   <a:solidFill>
                     <a:srgbClr val="000000"/>
                   </a:solidFill>
@@ -2289,7 +2290,7 @@
             </a:ln>
             <a:extLst>
               <a:ext uri="{91240B29-F687-4f45-9708-019B960494DF}">
-                <a14:hiddenLine xmlns="" xmlns:a14="http://schemas.microsoft.com/office/drawing/2010/main" w="9525">
+                <a14:hiddenLine xmlns:a14="http://schemas.microsoft.com/office/drawing/2010/main" xmlns="" w="9525">
                   <a:solidFill>
                     <a:srgbClr val="000000"/>
                   </a:solidFill>
@@ -2345,7 +2346,7 @@
             </a:ln>
             <a:extLst>
               <a:ext uri="{91240B29-F687-4f45-9708-019B960494DF}">
-                <a14:hiddenLine xmlns="" xmlns:a14="http://schemas.microsoft.com/office/drawing/2010/main" w="9525">
+                <a14:hiddenLine xmlns:a14="http://schemas.microsoft.com/office/drawing/2010/main" xmlns="" w="9525">
                   <a:solidFill>
                     <a:srgbClr val="000000"/>
                   </a:solidFill>
@@ -2435,7 +2436,7 @@
             </a:ln>
             <a:extLst>
               <a:ext uri="{91240B29-F687-4f45-9708-019B960494DF}">
-                <a14:hiddenLine xmlns="" xmlns:a14="http://schemas.microsoft.com/office/drawing/2010/main" w="9525">
+                <a14:hiddenLine xmlns:a14="http://schemas.microsoft.com/office/drawing/2010/main" xmlns="" w="9525">
                   <a:solidFill>
                     <a:srgbClr val="000000"/>
                   </a:solidFill>
@@ -2503,7 +2504,7 @@
             </a:ln>
             <a:extLst>
               <a:ext uri="{91240B29-F687-4f45-9708-019B960494DF}">
-                <a14:hiddenLine xmlns="" xmlns:a14="http://schemas.microsoft.com/office/drawing/2010/main" w="9525">
+                <a14:hiddenLine xmlns:a14="http://schemas.microsoft.com/office/drawing/2010/main" xmlns="" w="9525">
                   <a:solidFill>
                     <a:srgbClr val="000000"/>
                   </a:solidFill>
@@ -2593,7 +2594,7 @@
             </a:ln>
             <a:extLst>
               <a:ext uri="{91240B29-F687-4f45-9708-019B960494DF}">
-                <a14:hiddenLine xmlns="" xmlns:a14="http://schemas.microsoft.com/office/drawing/2010/main" w="9525">
+                <a14:hiddenLine xmlns:a14="http://schemas.microsoft.com/office/drawing/2010/main" xmlns="" w="9525">
                   <a:solidFill>
                     <a:srgbClr val="000000"/>
                   </a:solidFill>
@@ -2661,7 +2662,7 @@
             </a:ln>
             <a:extLst>
               <a:ext uri="{91240B29-F687-4f45-9708-019B960494DF}">
-                <a14:hiddenLine xmlns="" xmlns:a14="http://schemas.microsoft.com/office/drawing/2010/main" w="9525">
+                <a14:hiddenLine xmlns:a14="http://schemas.microsoft.com/office/drawing/2010/main" xmlns="" w="9525">
                   <a:solidFill>
                     <a:srgbClr val="000000"/>
                   </a:solidFill>
@@ -2751,7 +2752,7 @@
             </a:ln>
             <a:extLst>
               <a:ext uri="{91240B29-F687-4f45-9708-019B960494DF}">
-                <a14:hiddenLine xmlns="" xmlns:a14="http://schemas.microsoft.com/office/drawing/2010/main" w="9525">
+                <a14:hiddenLine xmlns:a14="http://schemas.microsoft.com/office/drawing/2010/main" xmlns="" w="9525">
                   <a:solidFill>
                     <a:srgbClr val="000000"/>
                   </a:solidFill>
@@ -2785,7 +2786,7 @@
             </a:ln>
             <a:extLst>
               <a:ext uri="{91240B29-F687-4f45-9708-019B960494DF}">
-                <a14:hiddenLine xmlns="" xmlns:a14="http://schemas.microsoft.com/office/drawing/2010/main" w="9525">
+                <a14:hiddenLine xmlns:a14="http://schemas.microsoft.com/office/drawing/2010/main" xmlns="" w="9525">
                   <a:solidFill>
                     <a:srgbClr val="000000"/>
                   </a:solidFill>
@@ -2875,7 +2876,7 @@
             </a:ln>
             <a:extLst>
               <a:ext uri="{91240B29-F687-4f45-9708-019B960494DF}">
-                <a14:hiddenLine xmlns="" xmlns:a14="http://schemas.microsoft.com/office/drawing/2010/main" w="9525">
+                <a14:hiddenLine xmlns:a14="http://schemas.microsoft.com/office/drawing/2010/main" xmlns="" w="9525">
                   <a:solidFill>
                     <a:srgbClr val="000000"/>
                   </a:solidFill>
@@ -2937,7 +2938,7 @@
             </a:ln>
             <a:extLst>
               <a:ext uri="{91240B29-F687-4f45-9708-019B960494DF}">
-                <a14:hiddenLine xmlns="" xmlns:a14="http://schemas.microsoft.com/office/drawing/2010/main" w="9525">
+                <a14:hiddenLine xmlns:a14="http://schemas.microsoft.com/office/drawing/2010/main" xmlns="" w="9525">
                   <a:solidFill>
                     <a:srgbClr val="000000"/>
                   </a:solidFill>
@@ -2999,7 +3000,7 @@
             </a:ln>
             <a:extLst>
               <a:ext uri="{91240B29-F687-4f45-9708-019B960494DF}">
-                <a14:hiddenLine xmlns="" xmlns:a14="http://schemas.microsoft.com/office/drawing/2010/main" w="9525">
+                <a14:hiddenLine xmlns:a14="http://schemas.microsoft.com/office/drawing/2010/main" xmlns="" w="9525">
                   <a:solidFill>
                     <a:srgbClr val="000000"/>
                   </a:solidFill>
@@ -3089,7 +3090,7 @@
             </a:ln>
             <a:extLst>
               <a:ext uri="{91240B29-F687-4f45-9708-019B960494DF}">
-                <a14:hiddenLine xmlns="" xmlns:a14="http://schemas.microsoft.com/office/drawing/2010/main" w="9525">
+                <a14:hiddenLine xmlns:a14="http://schemas.microsoft.com/office/drawing/2010/main" xmlns="" w="9525">
                   <a:solidFill>
                     <a:srgbClr val="000000"/>
                   </a:solidFill>
@@ -3157,7 +3158,7 @@
             </a:ln>
             <a:extLst>
               <a:ext uri="{91240B29-F687-4f45-9708-019B960494DF}">
-                <a14:hiddenLine xmlns="" xmlns:a14="http://schemas.microsoft.com/office/drawing/2010/main" w="9525">
+                <a14:hiddenLine xmlns:a14="http://schemas.microsoft.com/office/drawing/2010/main" xmlns="" w="9525">
                   <a:solidFill>
                     <a:srgbClr val="000000"/>
                   </a:solidFill>
@@ -3219,7 +3220,7 @@
             </a:ln>
             <a:extLst>
               <a:ext uri="{91240B29-F687-4f45-9708-019B960494DF}">
-                <a14:hiddenLine xmlns="" xmlns:a14="http://schemas.microsoft.com/office/drawing/2010/main" w="9525">
+                <a14:hiddenLine xmlns:a14="http://schemas.microsoft.com/office/drawing/2010/main" xmlns="" w="9525">
                   <a:solidFill>
                     <a:srgbClr val="000000"/>
                   </a:solidFill>
@@ -3309,7 +3310,7 @@
             </a:ln>
             <a:extLst>
               <a:ext uri="{91240B29-F687-4f45-9708-019B960494DF}">
-                <a14:hiddenLine xmlns="" xmlns:a14="http://schemas.microsoft.com/office/drawing/2010/main" w="9525">
+                <a14:hiddenLine xmlns:a14="http://schemas.microsoft.com/office/drawing/2010/main" xmlns="" w="9525">
                   <a:solidFill>
                     <a:srgbClr val="000000"/>
                   </a:solidFill>
@@ -3371,7 +3372,7 @@
             </a:ln>
             <a:extLst>
               <a:ext uri="{91240B29-F687-4f45-9708-019B960494DF}">
-                <a14:hiddenLine xmlns="" xmlns:a14="http://schemas.microsoft.com/office/drawing/2010/main" w="9525">
+                <a14:hiddenLine xmlns:a14="http://schemas.microsoft.com/office/drawing/2010/main" xmlns="" w="9525">
                   <a:solidFill>
                     <a:srgbClr val="000000"/>
                   </a:solidFill>
@@ -3461,7 +3462,7 @@
             </a:ln>
             <a:extLst>
               <a:ext uri="{91240B29-F687-4f45-9708-019B960494DF}">
-                <a14:hiddenLine xmlns="" xmlns:a14="http://schemas.microsoft.com/office/drawing/2010/main" w="9525">
+                <a14:hiddenLine xmlns:a14="http://schemas.microsoft.com/office/drawing/2010/main" xmlns="" w="9525">
                   <a:solidFill>
                     <a:srgbClr val="000000"/>
                   </a:solidFill>
@@ -3523,7 +3524,7 @@
             </a:ln>
             <a:extLst>
               <a:ext uri="{91240B29-F687-4f45-9708-019B960494DF}">
-                <a14:hiddenLine xmlns="" xmlns:a14="http://schemas.microsoft.com/office/drawing/2010/main" w="9525">
+                <a14:hiddenLine xmlns:a14="http://schemas.microsoft.com/office/drawing/2010/main" xmlns="" w="9525">
                   <a:solidFill>
                     <a:srgbClr val="000000"/>
                   </a:solidFill>
@@ -3613,7 +3614,7 @@
             </a:ln>
             <a:extLst>
               <a:ext uri="{91240B29-F687-4f45-9708-019B960494DF}">
-                <a14:hiddenLine xmlns="" xmlns:a14="http://schemas.microsoft.com/office/drawing/2010/main" w="9525">
+                <a14:hiddenLine xmlns:a14="http://schemas.microsoft.com/office/drawing/2010/main" xmlns="" w="9525">
                   <a:solidFill>
                     <a:srgbClr val="000000"/>
                   </a:solidFill>
@@ -3647,7 +3648,7 @@
             </a:ln>
             <a:extLst>
               <a:ext uri="{91240B29-F687-4f45-9708-019B960494DF}">
-                <a14:hiddenLine xmlns="" xmlns:a14="http://schemas.microsoft.com/office/drawing/2010/main" w="9525">
+                <a14:hiddenLine xmlns:a14="http://schemas.microsoft.com/office/drawing/2010/main" xmlns="" w="9525">
                   <a:solidFill>
                     <a:srgbClr val="000000"/>
                   </a:solidFill>
@@ -3712,7 +3713,7 @@
             </a:ln>
             <a:extLst>
               <a:ext uri="{91240B29-F687-4f45-9708-019B960494DF}">
-                <a14:hiddenLine xmlns="" xmlns:a14="http://schemas.microsoft.com/office/drawing/2010/main" w="9525">
+                <a14:hiddenLine xmlns:a14="http://schemas.microsoft.com/office/drawing/2010/main" xmlns="" w="9525">
                   <a:solidFill>
                     <a:srgbClr val="000000"/>
                   </a:solidFill>
@@ -3802,7 +3803,7 @@
             </a:ln>
             <a:extLst>
               <a:ext uri="{91240B29-F687-4f45-9708-019B960494DF}">
-                <a14:hiddenLine xmlns="" xmlns:a14="http://schemas.microsoft.com/office/drawing/2010/main" w="9525">
+                <a14:hiddenLine xmlns:a14="http://schemas.microsoft.com/office/drawing/2010/main" xmlns="" w="9525">
                   <a:solidFill>
                     <a:srgbClr val="000000"/>
                   </a:solidFill>
@@ -3864,7 +3865,7 @@
             </a:ln>
             <a:extLst>
               <a:ext uri="{91240B29-F687-4f45-9708-019B960494DF}">
-                <a14:hiddenLine xmlns="" xmlns:a14="http://schemas.microsoft.com/office/drawing/2010/main" w="9525">
+                <a14:hiddenLine xmlns:a14="http://schemas.microsoft.com/office/drawing/2010/main" xmlns="" w="9525">
                   <a:solidFill>
                     <a:srgbClr val="000000"/>
                   </a:solidFill>
@@ -3954,7 +3955,7 @@
             </a:ln>
             <a:extLst>
               <a:ext uri="{91240B29-F687-4f45-9708-019B960494DF}">
-                <a14:hiddenLine xmlns="" xmlns:a14="http://schemas.microsoft.com/office/drawing/2010/main" w="9525">
+                <a14:hiddenLine xmlns:a14="http://schemas.microsoft.com/office/drawing/2010/main" xmlns="" w="9525">
                   <a:solidFill>
                     <a:srgbClr val="000000"/>
                   </a:solidFill>
@@ -4044,7 +4045,7 @@
             </a:ln>
             <a:extLst>
               <a:ext uri="{91240B29-F687-4f45-9708-019B960494DF}">
-                <a14:hiddenLine xmlns="" xmlns:a14="http://schemas.microsoft.com/office/drawing/2010/main" w="9525">
+                <a14:hiddenLine xmlns:a14="http://schemas.microsoft.com/office/drawing/2010/main" xmlns="" w="9525">
                   <a:solidFill>
                     <a:srgbClr val="000000"/>
                   </a:solidFill>
@@ -4109,7 +4110,7 @@
             </a:ln>
             <a:extLst>
               <a:ext uri="{91240B29-F687-4f45-9708-019B960494DF}">
-                <a14:hiddenLine xmlns="" xmlns:a14="http://schemas.microsoft.com/office/drawing/2010/main" w="9525">
+                <a14:hiddenLine xmlns:a14="http://schemas.microsoft.com/office/drawing/2010/main" xmlns="" w="9525">
                   <a:solidFill>
                     <a:srgbClr val="000000"/>
                   </a:solidFill>
@@ -4171,7 +4172,7 @@
             </a:ln>
             <a:extLst>
               <a:ext uri="{91240B29-F687-4f45-9708-019B960494DF}">
-                <a14:hiddenLine xmlns="" xmlns:a14="http://schemas.microsoft.com/office/drawing/2010/main" w="9525">
+                <a14:hiddenLine xmlns:a14="http://schemas.microsoft.com/office/drawing/2010/main" xmlns="" w="9525">
                   <a:solidFill>
                     <a:srgbClr val="000000"/>
                   </a:solidFill>
@@ -4261,7 +4262,7 @@
             </a:ln>
             <a:extLst>
               <a:ext uri="{91240B29-F687-4f45-9708-019B960494DF}">
-                <a14:hiddenLine xmlns="" xmlns:a14="http://schemas.microsoft.com/office/drawing/2010/main" w="9525">
+                <a14:hiddenLine xmlns:a14="http://schemas.microsoft.com/office/drawing/2010/main" xmlns="" w="9525">
                   <a:solidFill>
                     <a:srgbClr val="000000"/>
                   </a:solidFill>
@@ -4351,7 +4352,7 @@
             </a:ln>
             <a:extLst>
               <a:ext uri="{91240B29-F687-4f45-9708-019B960494DF}">
-                <a14:hiddenLine xmlns="" xmlns:a14="http://schemas.microsoft.com/office/drawing/2010/main" w="9525">
+                <a14:hiddenLine xmlns:a14="http://schemas.microsoft.com/office/drawing/2010/main" xmlns="" w="9525">
                   <a:solidFill>
                     <a:srgbClr val="000000"/>
                   </a:solidFill>
@@ -4413,7 +4414,7 @@
             </a:ln>
             <a:extLst>
               <a:ext uri="{91240B29-F687-4f45-9708-019B960494DF}">
-                <a14:hiddenLine xmlns="" xmlns:a14="http://schemas.microsoft.com/office/drawing/2010/main" w="9525">
+                <a14:hiddenLine xmlns:a14="http://schemas.microsoft.com/office/drawing/2010/main" xmlns="" w="9525">
                   <a:solidFill>
                     <a:srgbClr val="000000"/>
                   </a:solidFill>
@@ -4533,7 +4534,7 @@
             </a:ln>
             <a:extLst>
               <a:ext uri="{91240B29-F687-4f45-9708-019B960494DF}">
-                <a14:hiddenLine xmlns="" xmlns:a14="http://schemas.microsoft.com/office/drawing/2010/main" w="9525">
+                <a14:hiddenLine xmlns:a14="http://schemas.microsoft.com/office/drawing/2010/main" xmlns="" w="9525">
                   <a:solidFill>
                     <a:srgbClr val="000000"/>
                   </a:solidFill>
@@ -4601,7 +4602,7 @@
             </a:ln>
             <a:extLst>
               <a:ext uri="{91240B29-F687-4f45-9708-019B960494DF}">
-                <a14:hiddenLine xmlns="" xmlns:a14="http://schemas.microsoft.com/office/drawing/2010/main" w="9525">
+                <a14:hiddenLine xmlns:a14="http://schemas.microsoft.com/office/drawing/2010/main" xmlns="" w="9525">
                   <a:solidFill>
                     <a:srgbClr val="000000"/>
                   </a:solidFill>
@@ -4691,7 +4692,7 @@
             </a:ln>
             <a:extLst>
               <a:ext uri="{91240B29-F687-4f45-9708-019B960494DF}">
-                <a14:hiddenLine xmlns="" xmlns:a14="http://schemas.microsoft.com/office/drawing/2010/main" w="9525">
+                <a14:hiddenLine xmlns:a14="http://schemas.microsoft.com/office/drawing/2010/main" xmlns="" w="9525">
                   <a:solidFill>
                     <a:srgbClr val="000000"/>
                   </a:solidFill>
@@ -4831,7 +4832,7 @@
           <a:p>
             <a:fld id="{EC4347D3-4C9A-C240-8F14-750059DFEEB0}" type="datetimeFigureOut">
               <a:rPr lang="en-US" smtClean="0"/>
-              <a:t>1/16/25</a:t>
+              <a:t>1/21/25</a:t>
             </a:fld>
             <a:endParaRPr lang="en-US"/>
           </a:p>
@@ -5098,7 +5099,7 @@
           <a:p>
             <a:fld id="{EC4347D3-4C9A-C240-8F14-750059DFEEB0}" type="datetimeFigureOut">
               <a:rPr lang="en-US" smtClean="0"/>
-              <a:t>1/16/25</a:t>
+              <a:t>1/21/25</a:t>
             </a:fld>
             <a:endParaRPr lang="en-US"/>
           </a:p>
@@ -5294,7 +5295,7 @@
           <a:p>
             <a:fld id="{EC4347D3-4C9A-C240-8F14-750059DFEEB0}" type="datetimeFigureOut">
               <a:rPr lang="en-US" smtClean="0"/>
-              <a:t>1/16/25</a:t>
+              <a:t>1/21/25</a:t>
             </a:fld>
             <a:endParaRPr lang="en-US"/>
           </a:p>
@@ -5557,7 +5558,7 @@
           <a:p>
             <a:fld id="{EC4347D3-4C9A-C240-8F14-750059DFEEB0}" type="datetimeFigureOut">
               <a:rPr lang="en-US" smtClean="0"/>
-              <a:t>1/16/25</a:t>
+              <a:t>1/21/25</a:t>
             </a:fld>
             <a:endParaRPr lang="en-US"/>
           </a:p>
@@ -5991,7 +5992,7 @@
           <a:p>
             <a:fld id="{EC4347D3-4C9A-C240-8F14-750059DFEEB0}" type="datetimeFigureOut">
               <a:rPr lang="en-US" smtClean="0"/>
-              <a:t>1/16/25</a:t>
+              <a:t>1/21/25</a:t>
             </a:fld>
             <a:endParaRPr lang="en-US"/>
           </a:p>
@@ -6537,7 +6538,7 @@
           <a:p>
             <a:fld id="{EC4347D3-4C9A-C240-8F14-750059DFEEB0}" type="datetimeFigureOut">
               <a:rPr lang="en-US" smtClean="0"/>
-              <a:t>1/16/25</a:t>
+              <a:t>1/21/25</a:t>
             </a:fld>
             <a:endParaRPr lang="en-US"/>
           </a:p>
@@ -7257,7 +7258,7 @@
           <a:p>
             <a:fld id="{EC4347D3-4C9A-C240-8F14-750059DFEEB0}" type="datetimeFigureOut">
               <a:rPr lang="en-US" smtClean="0"/>
-              <a:t>1/16/25</a:t>
+              <a:t>1/21/25</a:t>
             </a:fld>
             <a:endParaRPr lang="en-US"/>
           </a:p>
@@ -7427,7 +7428,7 @@
           <a:p>
             <a:fld id="{EC4347D3-4C9A-C240-8F14-750059DFEEB0}" type="datetimeFigureOut">
               <a:rPr lang="en-US" smtClean="0"/>
-              <a:t>1/16/25</a:t>
+              <a:t>1/21/25</a:t>
             </a:fld>
             <a:endParaRPr lang="en-US"/>
           </a:p>
@@ -7607,7 +7608,7 @@
           <a:p>
             <a:fld id="{EC4347D3-4C9A-C240-8F14-750059DFEEB0}" type="datetimeFigureOut">
               <a:rPr lang="en-US" smtClean="0"/>
-              <a:t>1/16/25</a:t>
+              <a:t>1/21/25</a:t>
             </a:fld>
             <a:endParaRPr lang="en-US"/>
           </a:p>
@@ -7777,7 +7778,7 @@
           <a:p>
             <a:fld id="{EC4347D3-4C9A-C240-8F14-750059DFEEB0}" type="datetimeFigureOut">
               <a:rPr lang="en-US" smtClean="0"/>
-              <a:t>1/16/25</a:t>
+              <a:t>1/21/25</a:t>
             </a:fld>
             <a:endParaRPr lang="en-US"/>
           </a:p>
@@ -8027,7 +8028,7 @@
           <a:p>
             <a:fld id="{EC4347D3-4C9A-C240-8F14-750059DFEEB0}" type="datetimeFigureOut">
               <a:rPr lang="en-US" smtClean="0"/>
-              <a:t>1/16/25</a:t>
+              <a:t>1/21/25</a:t>
             </a:fld>
             <a:endParaRPr lang="en-US"/>
           </a:p>
@@ -8259,7 +8260,7 @@
           <a:p>
             <a:fld id="{EC4347D3-4C9A-C240-8F14-750059DFEEB0}" type="datetimeFigureOut">
               <a:rPr lang="en-US" smtClean="0"/>
-              <a:t>1/16/25</a:t>
+              <a:t>1/21/25</a:t>
             </a:fld>
             <a:endParaRPr lang="en-US"/>
           </a:p>
@@ -8645,7 +8646,7 @@
           <a:p>
             <a:fld id="{EC4347D3-4C9A-C240-8F14-750059DFEEB0}" type="datetimeFigureOut">
               <a:rPr lang="en-US" smtClean="0"/>
-              <a:t>1/16/25</a:t>
+              <a:t>1/21/25</a:t>
             </a:fld>
             <a:endParaRPr lang="en-US"/>
           </a:p>
@@ -8768,7 +8769,7 @@
           <a:p>
             <a:fld id="{EC4347D3-4C9A-C240-8F14-750059DFEEB0}" type="datetimeFigureOut">
               <a:rPr lang="en-US" smtClean="0"/>
-              <a:t>1/16/25</a:t>
+              <a:t>1/21/25</a:t>
             </a:fld>
             <a:endParaRPr lang="en-US"/>
           </a:p>
@@ -8863,7 +8864,7 @@
           <a:p>
             <a:fld id="{EC4347D3-4C9A-C240-8F14-750059DFEEB0}" type="datetimeFigureOut">
               <a:rPr lang="en-US" smtClean="0"/>
-              <a:t>1/16/25</a:t>
+              <a:t>1/21/25</a:t>
             </a:fld>
             <a:endParaRPr lang="en-US"/>
           </a:p>
@@ -9112,7 +9113,7 @@
           <a:p>
             <a:fld id="{EC4347D3-4C9A-C240-8F14-750059DFEEB0}" type="datetimeFigureOut">
               <a:rPr lang="en-US" smtClean="0"/>
-              <a:t>1/16/25</a:t>
+              <a:t>1/21/25</a:t>
             </a:fld>
             <a:endParaRPr lang="en-US"/>
           </a:p>
@@ -9397,7 +9398,7 @@
           <a:p>
             <a:fld id="{EC4347D3-4C9A-C240-8F14-750059DFEEB0}" type="datetimeFigureOut">
               <a:rPr lang="en-US" smtClean="0"/>
-              <a:t>1/16/25</a:t>
+              <a:t>1/21/25</a:t>
             </a:fld>
             <a:endParaRPr lang="en-US"/>
           </a:p>
@@ -9520,7 +9521,7 @@
           <a:noFill/>
           <a:extLst>
             <a:ext uri="{909E8E84-426E-40dd-AFC4-6F175D3DCCD1}">
-              <a14:hiddenFill xmlns="" xmlns:a14="http://schemas.microsoft.com/office/drawing/2010/main">
+              <a14:hiddenFill xmlns:a14="http://schemas.microsoft.com/office/drawing/2010/main" xmlns="">
                 <a:solidFill>
                   <a:srgbClr val="FFFFFF"/>
                 </a:solidFill>
@@ -9594,7 +9595,7 @@
               </a:ln>
               <a:extLst>
                 <a:ext uri="{91240B29-F687-4f45-9708-019B960494DF}">
-                  <a14:hiddenLine xmlns="" xmlns:a14="http://schemas.microsoft.com/office/drawing/2010/main" w="9525">
+                  <a14:hiddenLine xmlns:a14="http://schemas.microsoft.com/office/drawing/2010/main" xmlns="" w="9525">
                     <a:solidFill>
                       <a:srgbClr val="000000"/>
                     </a:solidFill>
@@ -9684,7 +9685,7 @@
               </a:ln>
               <a:extLst>
                 <a:ext uri="{91240B29-F687-4f45-9708-019B960494DF}">
-                  <a14:hiddenLine xmlns="" xmlns:a14="http://schemas.microsoft.com/office/drawing/2010/main" w="9525">
+                  <a14:hiddenLine xmlns:a14="http://schemas.microsoft.com/office/drawing/2010/main" xmlns="" w="9525">
                     <a:solidFill>
                       <a:srgbClr val="000000"/>
                     </a:solidFill>
@@ -9774,7 +9775,7 @@
               </a:ln>
               <a:extLst>
                 <a:ext uri="{91240B29-F687-4f45-9708-019B960494DF}">
-                  <a14:hiddenLine xmlns="" xmlns:a14="http://schemas.microsoft.com/office/drawing/2010/main" w="9525">
+                  <a14:hiddenLine xmlns:a14="http://schemas.microsoft.com/office/drawing/2010/main" xmlns="" w="9525">
                     <a:solidFill>
                       <a:srgbClr val="000000"/>
                     </a:solidFill>
@@ -9836,7 +9837,7 @@
               </a:ln>
               <a:extLst>
                 <a:ext uri="{91240B29-F687-4f45-9708-019B960494DF}">
-                  <a14:hiddenLine xmlns="" xmlns:a14="http://schemas.microsoft.com/office/drawing/2010/main" w="9525">
+                  <a14:hiddenLine xmlns:a14="http://schemas.microsoft.com/office/drawing/2010/main" xmlns="" w="9525">
                     <a:solidFill>
                       <a:srgbClr val="000000"/>
                     </a:solidFill>
@@ -9926,7 +9927,7 @@
               </a:ln>
               <a:extLst>
                 <a:ext uri="{91240B29-F687-4f45-9708-019B960494DF}">
-                  <a14:hiddenLine xmlns="" xmlns:a14="http://schemas.microsoft.com/office/drawing/2010/main" w="9525">
+                  <a14:hiddenLine xmlns:a14="http://schemas.microsoft.com/office/drawing/2010/main" xmlns="" w="9525">
                     <a:solidFill>
                       <a:srgbClr val="000000"/>
                     </a:solidFill>
@@ -9988,7 +9989,7 @@
               </a:ln>
               <a:extLst>
                 <a:ext uri="{91240B29-F687-4f45-9708-019B960494DF}">
-                  <a14:hiddenLine xmlns="" xmlns:a14="http://schemas.microsoft.com/office/drawing/2010/main" w="9525">
+                  <a14:hiddenLine xmlns:a14="http://schemas.microsoft.com/office/drawing/2010/main" xmlns="" w="9525">
                     <a:solidFill>
                       <a:srgbClr val="000000"/>
                     </a:solidFill>
@@ -10050,7 +10051,7 @@
               </a:ln>
               <a:extLst>
                 <a:ext uri="{91240B29-F687-4f45-9708-019B960494DF}">
-                  <a14:hiddenLine xmlns="" xmlns:a14="http://schemas.microsoft.com/office/drawing/2010/main" w="9525">
+                  <a14:hiddenLine xmlns:a14="http://schemas.microsoft.com/office/drawing/2010/main" xmlns="" w="9525">
                     <a:solidFill>
                       <a:srgbClr val="000000"/>
                     </a:solidFill>
@@ -10140,7 +10141,7 @@
               </a:ln>
               <a:extLst>
                 <a:ext uri="{91240B29-F687-4f45-9708-019B960494DF}">
-                  <a14:hiddenLine xmlns="" xmlns:a14="http://schemas.microsoft.com/office/drawing/2010/main" w="9525">
+                  <a14:hiddenLine xmlns:a14="http://schemas.microsoft.com/office/drawing/2010/main" xmlns="" w="9525">
                     <a:solidFill>
                       <a:srgbClr val="000000"/>
                     </a:solidFill>
@@ -10230,7 +10231,7 @@
               </a:ln>
               <a:extLst>
                 <a:ext uri="{91240B29-F687-4f45-9708-019B960494DF}">
-                  <a14:hiddenLine xmlns="" xmlns:a14="http://schemas.microsoft.com/office/drawing/2010/main" w="9525">
+                  <a14:hiddenLine xmlns:a14="http://schemas.microsoft.com/office/drawing/2010/main" xmlns="" w="9525">
                     <a:solidFill>
                       <a:srgbClr val="000000"/>
                     </a:solidFill>
@@ -10292,7 +10293,7 @@
               </a:ln>
               <a:extLst>
                 <a:ext uri="{91240B29-F687-4f45-9708-019B960494DF}">
-                  <a14:hiddenLine xmlns="" xmlns:a14="http://schemas.microsoft.com/office/drawing/2010/main" w="9525">
+                  <a14:hiddenLine xmlns:a14="http://schemas.microsoft.com/office/drawing/2010/main" xmlns="" w="9525">
                     <a:solidFill>
                       <a:srgbClr val="000000"/>
                     </a:solidFill>
@@ -10402,7 +10403,7 @@
               </a:ln>
               <a:extLst>
                 <a:ext uri="{91240B29-F687-4f45-9708-019B960494DF}">
-                  <a14:hiddenLine xmlns="" xmlns:a14="http://schemas.microsoft.com/office/drawing/2010/main" w="9525">
+                  <a14:hiddenLine xmlns:a14="http://schemas.microsoft.com/office/drawing/2010/main" xmlns="" w="9525">
                     <a:solidFill>
                       <a:srgbClr val="000000"/>
                     </a:solidFill>
@@ -10486,7 +10487,7 @@
               </a:ln>
               <a:extLst>
                 <a:ext uri="{91240B29-F687-4f45-9708-019B960494DF}">
-                  <a14:hiddenLine xmlns="" xmlns:a14="http://schemas.microsoft.com/office/drawing/2010/main" w="9525">
+                  <a14:hiddenLine xmlns:a14="http://schemas.microsoft.com/office/drawing/2010/main" xmlns="" w="9525">
                     <a:solidFill>
                       <a:srgbClr val="000000"/>
                     </a:solidFill>
@@ -10548,7 +10549,7 @@
               </a:ln>
               <a:extLst>
                 <a:ext uri="{91240B29-F687-4f45-9708-019B960494DF}">
-                  <a14:hiddenLine xmlns="" xmlns:a14="http://schemas.microsoft.com/office/drawing/2010/main" w="9525">
+                  <a14:hiddenLine xmlns:a14="http://schemas.microsoft.com/office/drawing/2010/main" xmlns="" w="9525">
                     <a:solidFill>
                       <a:srgbClr val="000000"/>
                     </a:solidFill>
@@ -10610,7 +10611,7 @@
               </a:ln>
               <a:extLst>
                 <a:ext uri="{91240B29-F687-4f45-9708-019B960494DF}">
-                  <a14:hiddenLine xmlns="" xmlns:a14="http://schemas.microsoft.com/office/drawing/2010/main" w="9525">
+                  <a14:hiddenLine xmlns:a14="http://schemas.microsoft.com/office/drawing/2010/main" xmlns="" w="9525">
                     <a:solidFill>
                       <a:srgbClr val="000000"/>
                     </a:solidFill>
@@ -10700,7 +10701,7 @@
               </a:ln>
               <a:extLst>
                 <a:ext uri="{91240B29-F687-4f45-9708-019B960494DF}">
-                  <a14:hiddenLine xmlns="" xmlns:a14="http://schemas.microsoft.com/office/drawing/2010/main" w="9525">
+                  <a14:hiddenLine xmlns:a14="http://schemas.microsoft.com/office/drawing/2010/main" xmlns="" w="9525">
                     <a:solidFill>
                       <a:srgbClr val="000000"/>
                     </a:solidFill>
@@ -10734,7 +10735,7 @@
               </a:ln>
               <a:extLst>
                 <a:ext uri="{91240B29-F687-4f45-9708-019B960494DF}">
-                  <a14:hiddenLine xmlns="" xmlns:a14="http://schemas.microsoft.com/office/drawing/2010/main" w="9525">
+                  <a14:hiddenLine xmlns:a14="http://schemas.microsoft.com/office/drawing/2010/main" xmlns="" w="9525">
                     <a:solidFill>
                       <a:srgbClr val="000000"/>
                     </a:solidFill>
@@ -10799,7 +10800,7 @@
               </a:ln>
               <a:extLst>
                 <a:ext uri="{91240B29-F687-4f45-9708-019B960494DF}">
-                  <a14:hiddenLine xmlns="" xmlns:a14="http://schemas.microsoft.com/office/drawing/2010/main" w="9525">
+                  <a14:hiddenLine xmlns:a14="http://schemas.microsoft.com/office/drawing/2010/main" xmlns="" w="9525">
                     <a:solidFill>
                       <a:srgbClr val="000000"/>
                     </a:solidFill>
@@ -10889,7 +10890,7 @@
               </a:ln>
               <a:extLst>
                 <a:ext uri="{91240B29-F687-4f45-9708-019B960494DF}">
-                  <a14:hiddenLine xmlns="" xmlns:a14="http://schemas.microsoft.com/office/drawing/2010/main" w="9525">
+                  <a14:hiddenLine xmlns:a14="http://schemas.microsoft.com/office/drawing/2010/main" xmlns="" w="9525">
                     <a:solidFill>
                       <a:srgbClr val="000000"/>
                     </a:solidFill>
@@ -10951,7 +10952,7 @@
               </a:ln>
               <a:extLst>
                 <a:ext uri="{91240B29-F687-4f45-9708-019B960494DF}">
-                  <a14:hiddenLine xmlns="" xmlns:a14="http://schemas.microsoft.com/office/drawing/2010/main" w="9525">
+                  <a14:hiddenLine xmlns:a14="http://schemas.microsoft.com/office/drawing/2010/main" xmlns="" w="9525">
                     <a:solidFill>
                       <a:srgbClr val="000000"/>
                     </a:solidFill>
@@ -11041,7 +11042,7 @@
               </a:ln>
               <a:extLst>
                 <a:ext uri="{91240B29-F687-4f45-9708-019B960494DF}">
-                  <a14:hiddenLine xmlns="" xmlns:a14="http://schemas.microsoft.com/office/drawing/2010/main" w="9525">
+                  <a14:hiddenLine xmlns:a14="http://schemas.microsoft.com/office/drawing/2010/main" xmlns="" w="9525">
                     <a:solidFill>
                       <a:srgbClr val="000000"/>
                     </a:solidFill>
@@ -11106,7 +11107,7 @@
               </a:ln>
               <a:extLst>
                 <a:ext uri="{91240B29-F687-4f45-9708-019B960494DF}">
-                  <a14:hiddenLine xmlns="" xmlns:a14="http://schemas.microsoft.com/office/drawing/2010/main" w="9525">
+                  <a14:hiddenLine xmlns:a14="http://schemas.microsoft.com/office/drawing/2010/main" xmlns="" w="9525">
                     <a:solidFill>
                       <a:srgbClr val="000000"/>
                     </a:solidFill>
@@ -11168,7 +11169,7 @@
               </a:ln>
               <a:extLst>
                 <a:ext uri="{91240B29-F687-4f45-9708-019B960494DF}">
-                  <a14:hiddenLine xmlns="" xmlns:a14="http://schemas.microsoft.com/office/drawing/2010/main" w="9525">
+                  <a14:hiddenLine xmlns:a14="http://schemas.microsoft.com/office/drawing/2010/main" xmlns="" w="9525">
                     <a:solidFill>
                       <a:srgbClr val="000000"/>
                     </a:solidFill>
@@ -11258,7 +11259,7 @@
               </a:ln>
               <a:extLst>
                 <a:ext uri="{91240B29-F687-4f45-9708-019B960494DF}">
-                  <a14:hiddenLine xmlns="" xmlns:a14="http://schemas.microsoft.com/office/drawing/2010/main" w="9525">
+                  <a14:hiddenLine xmlns:a14="http://schemas.microsoft.com/office/drawing/2010/main" xmlns="" w="9525">
                     <a:solidFill>
                       <a:srgbClr val="000000"/>
                     </a:solidFill>
@@ -11348,7 +11349,7 @@
               </a:ln>
               <a:extLst>
                 <a:ext uri="{91240B29-F687-4f45-9708-019B960494DF}">
-                  <a14:hiddenLine xmlns="" xmlns:a14="http://schemas.microsoft.com/office/drawing/2010/main" w="9525">
+                  <a14:hiddenLine xmlns:a14="http://schemas.microsoft.com/office/drawing/2010/main" xmlns="" w="9525">
                     <a:solidFill>
                       <a:srgbClr val="000000"/>
                     </a:solidFill>
@@ -11413,7 +11414,7 @@
               </a:ln>
               <a:extLst>
                 <a:ext uri="{91240B29-F687-4f45-9708-019B960494DF}">
-                  <a14:hiddenLine xmlns="" xmlns:a14="http://schemas.microsoft.com/office/drawing/2010/main" w="9525">
+                  <a14:hiddenLine xmlns:a14="http://schemas.microsoft.com/office/drawing/2010/main" xmlns="" w="9525">
                     <a:solidFill>
                       <a:srgbClr val="000000"/>
                     </a:solidFill>
@@ -11533,7 +11534,7 @@
               </a:ln>
               <a:extLst>
                 <a:ext uri="{91240B29-F687-4f45-9708-019B960494DF}">
-                  <a14:hiddenLine xmlns="" xmlns:a14="http://schemas.microsoft.com/office/drawing/2010/main" w="9525">
+                  <a14:hiddenLine xmlns:a14="http://schemas.microsoft.com/office/drawing/2010/main" xmlns="" w="9525">
                     <a:solidFill>
                       <a:srgbClr val="000000"/>
                     </a:solidFill>
@@ -11614,7 +11615,7 @@
               </a:ln>
               <a:extLst>
                 <a:ext uri="{91240B29-F687-4f45-9708-019B960494DF}">
-                  <a14:hiddenLine xmlns="" xmlns:a14="http://schemas.microsoft.com/office/drawing/2010/main" w="9525">
+                  <a14:hiddenLine xmlns:a14="http://schemas.microsoft.com/office/drawing/2010/main" xmlns="" w="9525">
                     <a:solidFill>
                       <a:srgbClr val="000000"/>
                     </a:solidFill>
@@ -11729,7 +11730,7 @@
               </a:ln>
               <a:extLst>
                 <a:ext uri="{91240B29-F687-4f45-9708-019B960494DF}">
-                  <a14:hiddenLine xmlns="" xmlns:a14="http://schemas.microsoft.com/office/drawing/2010/main" w="9525">
+                  <a14:hiddenLine xmlns:a14="http://schemas.microsoft.com/office/drawing/2010/main" xmlns="" w="9525">
                     <a:solidFill>
                       <a:srgbClr val="000000"/>
                     </a:solidFill>
@@ -11819,7 +11820,7 @@
               </a:ln>
               <a:extLst>
                 <a:ext uri="{91240B29-F687-4f45-9708-019B960494DF}">
-                  <a14:hiddenLine xmlns="" xmlns:a14="http://schemas.microsoft.com/office/drawing/2010/main" w="9525">
+                  <a14:hiddenLine xmlns:a14="http://schemas.microsoft.com/office/drawing/2010/main" xmlns="" w="9525">
                     <a:solidFill>
                       <a:srgbClr val="000000"/>
                     </a:solidFill>
@@ -11884,7 +11885,7 @@
               </a:ln>
               <a:extLst>
                 <a:ext uri="{91240B29-F687-4f45-9708-019B960494DF}">
-                  <a14:hiddenLine xmlns="" xmlns:a14="http://schemas.microsoft.com/office/drawing/2010/main" w="9525">
+                  <a14:hiddenLine xmlns:a14="http://schemas.microsoft.com/office/drawing/2010/main" xmlns="" w="9525">
                     <a:solidFill>
                       <a:srgbClr val="000000"/>
                     </a:solidFill>
@@ -11974,7 +11975,7 @@
               </a:ln>
               <a:extLst>
                 <a:ext uri="{91240B29-F687-4f45-9708-019B960494DF}">
-                  <a14:hiddenLine xmlns="" xmlns:a14="http://schemas.microsoft.com/office/drawing/2010/main" w="9525">
+                  <a14:hiddenLine xmlns:a14="http://schemas.microsoft.com/office/drawing/2010/main" xmlns="" w="9525">
                     <a:solidFill>
                       <a:srgbClr val="000000"/>
                     </a:solidFill>
@@ -12042,7 +12043,7 @@
               </a:ln>
               <a:extLst>
                 <a:ext uri="{91240B29-F687-4f45-9708-019B960494DF}">
-                  <a14:hiddenLine xmlns="" xmlns:a14="http://schemas.microsoft.com/office/drawing/2010/main" w="9525">
+                  <a14:hiddenLine xmlns:a14="http://schemas.microsoft.com/office/drawing/2010/main" xmlns="" w="9525">
                     <a:solidFill>
                       <a:srgbClr val="000000"/>
                     </a:solidFill>
@@ -12132,7 +12133,7 @@
               </a:ln>
               <a:extLst>
                 <a:ext uri="{91240B29-F687-4f45-9708-019B960494DF}">
-                  <a14:hiddenLine xmlns="" xmlns:a14="http://schemas.microsoft.com/office/drawing/2010/main" w="9525">
+                  <a14:hiddenLine xmlns:a14="http://schemas.microsoft.com/office/drawing/2010/main" xmlns="" w="9525">
                     <a:solidFill>
                       <a:srgbClr val="000000"/>
                     </a:solidFill>
@@ -12200,7 +12201,7 @@
               </a:ln>
               <a:extLst>
                 <a:ext uri="{91240B29-F687-4f45-9708-019B960494DF}">
-                  <a14:hiddenLine xmlns="" xmlns:a14="http://schemas.microsoft.com/office/drawing/2010/main" w="9525">
+                  <a14:hiddenLine xmlns:a14="http://schemas.microsoft.com/office/drawing/2010/main" xmlns="" w="9525">
                     <a:solidFill>
                       <a:srgbClr val="000000"/>
                     </a:solidFill>
@@ -12290,7 +12291,7 @@
               </a:ln>
               <a:extLst>
                 <a:ext uri="{91240B29-F687-4f45-9708-019B960494DF}">
-                  <a14:hiddenLine xmlns="" xmlns:a14="http://schemas.microsoft.com/office/drawing/2010/main" w="9525">
+                  <a14:hiddenLine xmlns:a14="http://schemas.microsoft.com/office/drawing/2010/main" xmlns="" w="9525">
                     <a:solidFill>
                       <a:srgbClr val="000000"/>
                     </a:solidFill>
@@ -12324,7 +12325,7 @@
               </a:ln>
               <a:extLst>
                 <a:ext uri="{91240B29-F687-4f45-9708-019B960494DF}">
-                  <a14:hiddenLine xmlns="" xmlns:a14="http://schemas.microsoft.com/office/drawing/2010/main" w="9525">
+                  <a14:hiddenLine xmlns:a14="http://schemas.microsoft.com/office/drawing/2010/main" xmlns="" w="9525">
                     <a:solidFill>
                       <a:srgbClr val="000000"/>
                     </a:solidFill>
@@ -12464,7 +12465,7 @@
           <a:p>
             <a:fld id="{EC4347D3-4C9A-C240-8F14-750059DFEEB0}" type="datetimeFigureOut">
               <a:rPr lang="en-US" smtClean="0"/>
-              <a:t>1/16/25</a:t>
+              <a:t>1/21/25</a:t>
             </a:fld>
             <a:endParaRPr lang="en-US"/>
           </a:p>
@@ -13024,7 +13025,7 @@
             <a:pPr algn="ctr"/>
             <a:r>
               <a:rPr lang="en-US" dirty="0"/>
-              <a:t>Lecture 2: Thu. Aug. 29</a:t>
+              <a:t>Lecture 2: Thu. Jan. 16</a:t>
             </a:r>
           </a:p>
         </p:txBody>
@@ -13069,7 +13070,7 @@
                 <a:latin typeface="Arial" panose="020B0604020202020204" pitchFamily="34" charset="0"/>
                 <a:cs typeface="Arial" panose="020B0604020202020204" pitchFamily="34" charset="0"/>
               </a:rPr>
-              <a:t>Number of days with attendance under 50% so far: 	0</a:t>
+              <a:t>Number of days with attendance over 50% so far: 	1/1 (100%)</a:t>
             </a:r>
           </a:p>
           <a:p>
@@ -13192,6 +13193,217 @@
 </p:sld>
 </file>
 
+<file path=ppt/slides/slide3.xml><?xml version="1.0" encoding="utf-8"?>
+<p:sld xmlns:a="http://schemas.openxmlformats.org/drawingml/2006/main" xmlns:r="http://schemas.openxmlformats.org/officeDocument/2006/relationships" xmlns:p="http://schemas.openxmlformats.org/presentationml/2006/main">
+  <p:cSld>
+    <p:spTree>
+      <p:nvGrpSpPr>
+        <p:cNvPr id="1" name=""/>
+        <p:cNvGrpSpPr/>
+        <p:nvPr/>
+      </p:nvGrpSpPr>
+      <p:grpSpPr>
+        <a:xfrm>
+          <a:off x="0" y="0"/>
+          <a:ext cx="0" cy="0"/>
+          <a:chOff x="0" y="0"/>
+          <a:chExt cx="0" cy="0"/>
+        </a:xfrm>
+      </p:grpSpPr>
+      <p:sp>
+        <p:nvSpPr>
+          <p:cNvPr id="6146" name="Rectangle 2"/>
+          <p:cNvSpPr>
+            <a:spLocks noGrp="1" noChangeArrowheads="1"/>
+          </p:cNvSpPr>
+          <p:nvPr>
+            <p:ph type="title"/>
+            <p:custDataLst>
+              <p:tags r:id="rId1"/>
+            </p:custDataLst>
+          </p:nvPr>
+        </p:nvSpPr>
+        <p:spPr>
+          <a:xfrm>
+            <a:off x="1141413" y="284084"/>
+            <a:ext cx="9905998" cy="620791"/>
+          </a:xfrm>
+        </p:spPr>
+        <p:txBody>
+          <a:bodyPr/>
+          <a:lstStyle/>
+          <a:p>
+            <a:pPr algn="ctr"/>
+            <a:r>
+              <a:rPr lang="en-US" dirty="0"/>
+              <a:t>Lecture 3: Tue. Jan. 21</a:t>
+            </a:r>
+          </a:p>
+        </p:txBody>
+      </p:sp>
+      <p:sp>
+        <p:nvSpPr>
+          <p:cNvPr id="6147" name="Rectangle 3"/>
+          <p:cNvSpPr>
+            <a:spLocks noGrp="1" noChangeArrowheads="1"/>
+          </p:cNvSpPr>
+          <p:nvPr>
+            <p:ph idx="1"/>
+            <p:custDataLst>
+              <p:tags r:id="rId2"/>
+            </p:custDataLst>
+          </p:nvPr>
+        </p:nvSpPr>
+        <p:spPr>
+          <a:xfrm>
+            <a:off x="1021404" y="1123950"/>
+            <a:ext cx="10204315" cy="5149850"/>
+          </a:xfrm>
+        </p:spPr>
+        <p:txBody>
+          <a:bodyPr>
+            <a:normAutofit/>
+          </a:bodyPr>
+          <a:lstStyle/>
+          <a:p>
+            <a:r>
+              <a:rPr lang="en-US" dirty="0">
+                <a:latin typeface="Arial" panose="020B0604020202020204" pitchFamily="34" charset="0"/>
+                <a:cs typeface="Arial" panose="020B0604020202020204" pitchFamily="34" charset="0"/>
+              </a:rPr>
+              <a:t>Reminder of attendance / late submission curve policy</a:t>
+            </a:r>
+          </a:p>
+          <a:p>
+            <a:pPr lvl="1"/>
+            <a:r>
+              <a:rPr lang="en-US" dirty="0">
+                <a:latin typeface="Arial" panose="020B0604020202020204" pitchFamily="34" charset="0"/>
+                <a:cs typeface="Arial" panose="020B0604020202020204" pitchFamily="34" charset="0"/>
+              </a:rPr>
+              <a:t>Number of days with good attendance: 		2/2 (100%)</a:t>
+            </a:r>
+          </a:p>
+          <a:p>
+            <a:pPr lvl="1"/>
+            <a:r>
+              <a:rPr lang="en-US" dirty="0">
+                <a:latin typeface="Arial" panose="020B0604020202020204" pitchFamily="34" charset="0"/>
+                <a:cs typeface="Arial" panose="020B0604020202020204" pitchFamily="34" charset="0"/>
+              </a:rPr>
+              <a:t>Percent of </a:t>
+            </a:r>
+            <a:r>
+              <a:rPr lang="en-US" dirty="0" err="1">
+                <a:latin typeface="Arial" panose="020B0604020202020204" pitchFamily="34" charset="0"/>
+                <a:cs typeface="Arial" panose="020B0604020202020204" pitchFamily="34" charset="0"/>
+              </a:rPr>
+              <a:t>hw</a:t>
+            </a:r>
+            <a:r>
+              <a:rPr lang="en-US" dirty="0">
+                <a:latin typeface="Arial" panose="020B0604020202020204" pitchFamily="34" charset="0"/>
+                <a:cs typeface="Arial" panose="020B0604020202020204" pitchFamily="34" charset="0"/>
+              </a:rPr>
+              <a:t> submissions on time so far:		100%  //for now……</a:t>
+            </a:r>
+          </a:p>
+          <a:p>
+            <a:r>
+              <a:rPr lang="en-US" dirty="0">
+                <a:latin typeface="Arial" panose="020B0604020202020204" pitchFamily="34" charset="0"/>
+                <a:cs typeface="Arial" panose="020B0604020202020204" pitchFamily="34" charset="0"/>
+              </a:rPr>
+              <a:t>If you just joined the class, be sure to review the course policies!</a:t>
+            </a:r>
+          </a:p>
+          <a:p>
+            <a:pPr lvl="1"/>
+            <a:r>
+              <a:rPr lang="en-US" dirty="0">
+                <a:latin typeface="Arial" panose="020B0604020202020204" pitchFamily="34" charset="0"/>
+                <a:cs typeface="Arial" panose="020B0604020202020204" pitchFamily="34" charset="0"/>
+              </a:rPr>
+              <a:t>Any questions about course policies from last time?</a:t>
+            </a:r>
+          </a:p>
+          <a:p>
+            <a:r>
+              <a:rPr lang="en-US" dirty="0">
+                <a:latin typeface="Arial" panose="020B0604020202020204" pitchFamily="34" charset="0"/>
+                <a:cs typeface="Arial" panose="020B0604020202020204" pitchFamily="34" charset="0"/>
+              </a:rPr>
+              <a:t>No homework due quite yet, but </a:t>
+            </a:r>
+            <a:r>
+              <a:rPr lang="en-US" b="1" i="1" dirty="0">
+                <a:latin typeface="Arial" panose="020B0604020202020204" pitchFamily="34" charset="0"/>
+                <a:cs typeface="Arial" panose="020B0604020202020204" pitchFamily="34" charset="0"/>
+              </a:rPr>
+              <a:t>Homework 1 is due next Thursday.</a:t>
+            </a:r>
+            <a:r>
+              <a:rPr lang="en-US" dirty="0">
+                <a:latin typeface="Arial" panose="020B0604020202020204" pitchFamily="34" charset="0"/>
+                <a:cs typeface="Arial" panose="020B0604020202020204" pitchFamily="34" charset="0"/>
+              </a:rPr>
+              <a:t> You might want to start taking a brief look at it.</a:t>
+            </a:r>
+          </a:p>
+          <a:p>
+            <a:r>
+              <a:rPr lang="en-US" dirty="0">
+                <a:latin typeface="Arial" panose="020B0604020202020204" pitchFamily="34" charset="0"/>
+                <a:cs typeface="Arial" panose="020B0604020202020204" pitchFamily="34" charset="0"/>
+              </a:rPr>
+              <a:t>Today we continue with (and likely finish) module 1, which is a short introductory module about what theory of computation even is…</a:t>
+            </a:r>
+          </a:p>
+          <a:p>
+            <a:endParaRPr lang="en-US" dirty="0">
+              <a:latin typeface="Arial" panose="020B0604020202020204" pitchFamily="34" charset="0"/>
+              <a:cs typeface="Arial" panose="020B0604020202020204" pitchFamily="34" charset="0"/>
+            </a:endParaRPr>
+          </a:p>
+        </p:txBody>
+      </p:sp>
+      <p:sp>
+        <p:nvSpPr>
+          <p:cNvPr id="4" name="Slide Number Placeholder 3"/>
+          <p:cNvSpPr>
+            <a:spLocks noGrp="1"/>
+          </p:cNvSpPr>
+          <p:nvPr>
+            <p:ph type="sldNum" sz="quarter" idx="12"/>
+          </p:nvPr>
+        </p:nvSpPr>
+        <p:spPr/>
+        <p:txBody>
+          <a:bodyPr/>
+          <a:lstStyle/>
+          <a:p>
+            <a:fld id="{F26D9103-0C5C-48AC-B68E-3ED2C1647047}" type="slidenum">
+              <a:rPr lang="en-US" smtClean="0"/>
+              <a:pPr/>
+              <a:t>3</a:t>
+            </a:fld>
+            <a:endParaRPr lang="en-US" dirty="0"/>
+          </a:p>
+        </p:txBody>
+      </p:sp>
+    </p:spTree>
+    <p:extLst>
+      <p:ext uri="{BB962C8B-B14F-4D97-AF65-F5344CB8AC3E}">
+        <p14:creationId xmlns:p14="http://schemas.microsoft.com/office/powerpoint/2010/main" val="77249170"/>
+      </p:ext>
+    </p:extLst>
+  </p:cSld>
+  <p:clrMapOvr>
+    <a:masterClrMapping/>
+  </p:clrMapOvr>
+</p:sld>
+</file>
+
 <file path=ppt/tags/tag1.xml><?xml version="1.0" encoding="utf-8"?>
 <p:tagLst xmlns:a="http://schemas.openxmlformats.org/drawingml/2006/main" xmlns:r="http://schemas.openxmlformats.org/officeDocument/2006/relationships" xmlns:p="http://schemas.openxmlformats.org/presentationml/2006/main">
   <p:tag name="_INSTRUCTOR VIEW19C14C36-AC8E-43BC-9DB6-C2AAF774C7DC|PANE__TAG" val="_"/>
@@ -13199,6 +13411,18 @@
 </file>
 
 <file path=ppt/tags/tag2.xml><?xml version="1.0" encoding="utf-8"?>
+<p:tagLst xmlns:a="http://schemas.openxmlformats.org/drawingml/2006/main" xmlns:r="http://schemas.openxmlformats.org/officeDocument/2006/relationships" xmlns:p="http://schemas.openxmlformats.org/presentationml/2006/main">
+  <p:tag name="_INSTRUCTOR VIEW19C14C36-AC8E-43BC-9DB6-C2AAF774C7DC|PANE__TAG" val="_"/>
+</p:tagLst>
+</file>
+
+<file path=ppt/tags/tag3.xml><?xml version="1.0" encoding="utf-8"?>
+<p:tagLst xmlns:a="http://schemas.openxmlformats.org/drawingml/2006/main" xmlns:r="http://schemas.openxmlformats.org/officeDocument/2006/relationships" xmlns:p="http://schemas.openxmlformats.org/presentationml/2006/main">
+  <p:tag name="_INSTRUCTOR VIEW19C14C36-AC8E-43BC-9DB6-C2AAF774C7DC|PANE__TAG" val="_"/>
+</p:tagLst>
+</file>
+
+<file path=ppt/tags/tag4.xml><?xml version="1.0" encoding="utf-8"?>
 <p:tagLst xmlns:a="http://schemas.openxmlformats.org/drawingml/2006/main" xmlns:r="http://schemas.openxmlformats.org/officeDocument/2006/relationships" xmlns:p="http://schemas.openxmlformats.org/presentationml/2006/main">
   <p:tag name="_INSTRUCTOR VIEW19C14C36-AC8E-43BC-9DB6-C2AAF774C7DC|PANE__TAG" val="_"/>
 </p:tagLst>

</xml_diff>

<commit_message>
adding TA office hours and announcements
</commit_message>
<xml_diff>
--- a/slides/00-DailyAnnouncements.pptx
+++ b/slides/00-DailyAnnouncements.pptx
@@ -5,14 +5,15 @@
     <p:sldMasterId id="2147484006" r:id="rId1"/>
   </p:sldMasterIdLst>
   <p:notesMasterIdLst>
-    <p:notesMasterId r:id="rId7"/>
+    <p:notesMasterId r:id="rId8"/>
   </p:notesMasterIdLst>
   <p:sldIdLst>
     <p:sldId id="256" r:id="rId2"/>
     <p:sldId id="505" r:id="rId3"/>
     <p:sldId id="516" r:id="rId4"/>
     <p:sldId id="517" r:id="rId5"/>
-    <p:sldId id="515" r:id="rId6"/>
+    <p:sldId id="518" r:id="rId6"/>
+    <p:sldId id="515" r:id="rId7"/>
   </p:sldIdLst>
   <p:sldSz cx="12192000" cy="6858000"/>
   <p:notesSz cx="6858000" cy="9144000"/>
@@ -201,7 +202,7 @@
           <a:p>
             <a:fld id="{C5B45307-6ED4-B142-BD64-10F739779302}" type="datetimeFigureOut">
               <a:rPr lang="en-US" smtClean="0"/>
-              <a:t>5/22/25</a:t>
+              <a:t>5/23/25</a:t>
             </a:fld>
             <a:endParaRPr lang="en-US"/>
           </a:p>
@@ -609,7 +610,7 @@
           <a:noFill/>
           <a:extLst>
             <a:ext uri="{909E8E84-426E-40dd-AFC4-6F175D3DCCD1}">
-              <a14:hiddenFill xmlns="" xmlns:a14="http://schemas.microsoft.com/office/drawing/2010/main">
+              <a14:hiddenFill xmlns:a14="http://schemas.microsoft.com/office/drawing/2010/main" xmlns="">
                 <a:solidFill>
                   <a:srgbClr val="FFFFFF"/>
                 </a:solidFill>
@@ -668,7 +669,7 @@
             </a:ln>
             <a:extLst>
               <a:ext uri="{91240B29-F687-4f45-9708-019B960494DF}">
-                <a14:hiddenLine xmlns="" xmlns:a14="http://schemas.microsoft.com/office/drawing/2010/main" w="9525">
+                <a14:hiddenLine xmlns:a14="http://schemas.microsoft.com/office/drawing/2010/main" xmlns="" w="9525">
                   <a:solidFill>
                     <a:srgbClr val="000000"/>
                   </a:solidFill>
@@ -758,7 +759,7 @@
             </a:ln>
             <a:extLst>
               <a:ext uri="{91240B29-F687-4f45-9708-019B960494DF}">
-                <a14:hiddenLine xmlns="" xmlns:a14="http://schemas.microsoft.com/office/drawing/2010/main" w="9525">
+                <a14:hiddenLine xmlns:a14="http://schemas.microsoft.com/office/drawing/2010/main" xmlns="" w="9525">
                   <a:solidFill>
                     <a:srgbClr val="000000"/>
                   </a:solidFill>
@@ -848,7 +849,7 @@
             </a:ln>
             <a:extLst>
               <a:ext uri="{91240B29-F687-4f45-9708-019B960494DF}">
-                <a14:hiddenLine xmlns="" xmlns:a14="http://schemas.microsoft.com/office/drawing/2010/main" w="9525">
+                <a14:hiddenLine xmlns:a14="http://schemas.microsoft.com/office/drawing/2010/main" xmlns="" w="9525">
                   <a:solidFill>
                     <a:srgbClr val="000000"/>
                   </a:solidFill>
@@ -882,7 +883,7 @@
             </a:ln>
             <a:extLst>
               <a:ext uri="{91240B29-F687-4f45-9708-019B960494DF}">
-                <a14:hiddenLine xmlns="" xmlns:a14="http://schemas.microsoft.com/office/drawing/2010/main" w="9525">
+                <a14:hiddenLine xmlns:a14="http://schemas.microsoft.com/office/drawing/2010/main" xmlns="" w="9525">
                   <a:solidFill>
                     <a:srgbClr val="000000"/>
                   </a:solidFill>
@@ -972,7 +973,7 @@
             </a:ln>
             <a:extLst>
               <a:ext uri="{91240B29-F687-4f45-9708-019B960494DF}">
-                <a14:hiddenLine xmlns="" xmlns:a14="http://schemas.microsoft.com/office/drawing/2010/main" w="9525">
+                <a14:hiddenLine xmlns:a14="http://schemas.microsoft.com/office/drawing/2010/main" xmlns="" w="9525">
                   <a:solidFill>
                     <a:srgbClr val="000000"/>
                   </a:solidFill>
@@ -1034,7 +1035,7 @@
             </a:ln>
             <a:extLst>
               <a:ext uri="{91240B29-F687-4f45-9708-019B960494DF}">
-                <a14:hiddenLine xmlns="" xmlns:a14="http://schemas.microsoft.com/office/drawing/2010/main" w="9525">
+                <a14:hiddenLine xmlns:a14="http://schemas.microsoft.com/office/drawing/2010/main" xmlns="" w="9525">
                   <a:solidFill>
                     <a:srgbClr val="000000"/>
                   </a:solidFill>
@@ -1096,7 +1097,7 @@
             </a:ln>
             <a:extLst>
               <a:ext uri="{91240B29-F687-4f45-9708-019B960494DF}">
-                <a14:hiddenLine xmlns="" xmlns:a14="http://schemas.microsoft.com/office/drawing/2010/main" w="9525">
+                <a14:hiddenLine xmlns:a14="http://schemas.microsoft.com/office/drawing/2010/main" xmlns="" w="9525">
                   <a:solidFill>
                     <a:srgbClr val="000000"/>
                   </a:solidFill>
@@ -1186,7 +1187,7 @@
             </a:ln>
             <a:extLst>
               <a:ext uri="{91240B29-F687-4f45-9708-019B960494DF}">
-                <a14:hiddenLine xmlns="" xmlns:a14="http://schemas.microsoft.com/office/drawing/2010/main" w="9525">
+                <a14:hiddenLine xmlns:a14="http://schemas.microsoft.com/office/drawing/2010/main" xmlns="" w="9525">
                   <a:solidFill>
                     <a:srgbClr val="000000"/>
                   </a:solidFill>
@@ -1248,7 +1249,7 @@
             </a:ln>
             <a:extLst>
               <a:ext uri="{91240B29-F687-4f45-9708-019B960494DF}">
-                <a14:hiddenLine xmlns="" xmlns:a14="http://schemas.microsoft.com/office/drawing/2010/main" w="9525">
+                <a14:hiddenLine xmlns:a14="http://schemas.microsoft.com/office/drawing/2010/main" xmlns="" w="9525">
                   <a:solidFill>
                     <a:srgbClr val="000000"/>
                   </a:solidFill>
@@ -1310,7 +1311,7 @@
             </a:ln>
             <a:extLst>
               <a:ext uri="{91240B29-F687-4f45-9708-019B960494DF}">
-                <a14:hiddenLine xmlns="" xmlns:a14="http://schemas.microsoft.com/office/drawing/2010/main" w="9525">
+                <a14:hiddenLine xmlns:a14="http://schemas.microsoft.com/office/drawing/2010/main" xmlns="" w="9525">
                   <a:solidFill>
                     <a:srgbClr val="000000"/>
                   </a:solidFill>
@@ -1400,7 +1401,7 @@
             </a:ln>
             <a:extLst>
               <a:ext uri="{91240B29-F687-4f45-9708-019B960494DF}">
-                <a14:hiddenLine xmlns="" xmlns:a14="http://schemas.microsoft.com/office/drawing/2010/main" w="9525">
+                <a14:hiddenLine xmlns:a14="http://schemas.microsoft.com/office/drawing/2010/main" xmlns="" w="9525">
                   <a:solidFill>
                     <a:srgbClr val="000000"/>
                   </a:solidFill>
@@ -1490,7 +1491,7 @@
             </a:ln>
             <a:extLst>
               <a:ext uri="{91240B29-F687-4f45-9708-019B960494DF}">
-                <a14:hiddenLine xmlns="" xmlns:a14="http://schemas.microsoft.com/office/drawing/2010/main" w="9525">
+                <a14:hiddenLine xmlns:a14="http://schemas.microsoft.com/office/drawing/2010/main" xmlns="" w="9525">
                   <a:solidFill>
                     <a:srgbClr val="000000"/>
                   </a:solidFill>
@@ -1552,7 +1553,7 @@
             </a:ln>
             <a:extLst>
               <a:ext uri="{91240B29-F687-4f45-9708-019B960494DF}">
-                <a14:hiddenLine xmlns="" xmlns:a14="http://schemas.microsoft.com/office/drawing/2010/main" w="9525">
+                <a14:hiddenLine xmlns:a14="http://schemas.microsoft.com/office/drawing/2010/main" xmlns="" w="9525">
                   <a:solidFill>
                     <a:srgbClr val="000000"/>
                   </a:solidFill>
@@ -1662,7 +1663,7 @@
             </a:ln>
             <a:extLst>
               <a:ext uri="{91240B29-F687-4f45-9708-019B960494DF}">
-                <a14:hiddenLine xmlns="" xmlns:a14="http://schemas.microsoft.com/office/drawing/2010/main" w="9525">
+                <a14:hiddenLine xmlns:a14="http://schemas.microsoft.com/office/drawing/2010/main" xmlns="" w="9525">
                   <a:solidFill>
                     <a:srgbClr val="000000"/>
                   </a:solidFill>
@@ -1724,7 +1725,7 @@
             </a:ln>
             <a:extLst>
               <a:ext uri="{91240B29-F687-4f45-9708-019B960494DF}">
-                <a14:hiddenLine xmlns="" xmlns:a14="http://schemas.microsoft.com/office/drawing/2010/main" w="9525">
+                <a14:hiddenLine xmlns:a14="http://schemas.microsoft.com/office/drawing/2010/main" xmlns="" w="9525">
                   <a:solidFill>
                     <a:srgbClr val="000000"/>
                   </a:solidFill>
@@ -1814,7 +1815,7 @@
             </a:ln>
             <a:extLst>
               <a:ext uri="{91240B29-F687-4f45-9708-019B960494DF}">
-                <a14:hiddenLine xmlns="" xmlns:a14="http://schemas.microsoft.com/office/drawing/2010/main" w="9525">
+                <a14:hiddenLine xmlns:a14="http://schemas.microsoft.com/office/drawing/2010/main" xmlns="" w="9525">
                   <a:solidFill>
                     <a:srgbClr val="000000"/>
                   </a:solidFill>
@@ -1904,7 +1905,7 @@
             </a:ln>
             <a:extLst>
               <a:ext uri="{91240B29-F687-4f45-9708-019B960494DF}">
-                <a14:hiddenLine xmlns="" xmlns:a14="http://schemas.microsoft.com/office/drawing/2010/main" w="9525">
+                <a14:hiddenLine xmlns:a14="http://schemas.microsoft.com/office/drawing/2010/main" xmlns="" w="9525">
                   <a:solidFill>
                     <a:srgbClr val="000000"/>
                   </a:solidFill>
@@ -1966,7 +1967,7 @@
             </a:ln>
             <a:extLst>
               <a:ext uri="{91240B29-F687-4f45-9708-019B960494DF}">
-                <a14:hiddenLine xmlns="" xmlns:a14="http://schemas.microsoft.com/office/drawing/2010/main" w="9525">
+                <a14:hiddenLine xmlns:a14="http://schemas.microsoft.com/office/drawing/2010/main" xmlns="" w="9525">
                   <a:solidFill>
                     <a:srgbClr val="000000"/>
                   </a:solidFill>
@@ -2056,7 +2057,7 @@
             </a:ln>
             <a:extLst>
               <a:ext uri="{91240B29-F687-4f45-9708-019B960494DF}">
-                <a14:hiddenLine xmlns="" xmlns:a14="http://schemas.microsoft.com/office/drawing/2010/main" w="9525">
+                <a14:hiddenLine xmlns:a14="http://schemas.microsoft.com/office/drawing/2010/main" xmlns="" w="9525">
                   <a:solidFill>
                     <a:srgbClr val="000000"/>
                   </a:solidFill>
@@ -2146,7 +2147,7 @@
             </a:ln>
             <a:extLst>
               <a:ext uri="{91240B29-F687-4f45-9708-019B960494DF}">
-                <a14:hiddenLine xmlns="" xmlns:a14="http://schemas.microsoft.com/office/drawing/2010/main" w="9525">
+                <a14:hiddenLine xmlns:a14="http://schemas.microsoft.com/office/drawing/2010/main" xmlns="" w="9525">
                   <a:solidFill>
                     <a:srgbClr val="000000"/>
                   </a:solidFill>
@@ -2202,7 +2203,7 @@
             </a:ln>
             <a:extLst>
               <a:ext uri="{91240B29-F687-4f45-9708-019B960494DF}">
-                <a14:hiddenLine xmlns="" xmlns:a14="http://schemas.microsoft.com/office/drawing/2010/main" w="9525">
+                <a14:hiddenLine xmlns:a14="http://schemas.microsoft.com/office/drawing/2010/main" xmlns="" w="9525">
                   <a:solidFill>
                     <a:srgbClr val="000000"/>
                   </a:solidFill>
@@ -2292,7 +2293,7 @@
             </a:ln>
             <a:extLst>
               <a:ext uri="{91240B29-F687-4f45-9708-019B960494DF}">
-                <a14:hiddenLine xmlns="" xmlns:a14="http://schemas.microsoft.com/office/drawing/2010/main" w="9525">
+                <a14:hiddenLine xmlns:a14="http://schemas.microsoft.com/office/drawing/2010/main" xmlns="" w="9525">
                   <a:solidFill>
                     <a:srgbClr val="000000"/>
                   </a:solidFill>
@@ -2348,7 +2349,7 @@
             </a:ln>
             <a:extLst>
               <a:ext uri="{91240B29-F687-4f45-9708-019B960494DF}">
-                <a14:hiddenLine xmlns="" xmlns:a14="http://schemas.microsoft.com/office/drawing/2010/main" w="9525">
+                <a14:hiddenLine xmlns:a14="http://schemas.microsoft.com/office/drawing/2010/main" xmlns="" w="9525">
                   <a:solidFill>
                     <a:srgbClr val="000000"/>
                   </a:solidFill>
@@ -2438,7 +2439,7 @@
             </a:ln>
             <a:extLst>
               <a:ext uri="{91240B29-F687-4f45-9708-019B960494DF}">
-                <a14:hiddenLine xmlns="" xmlns:a14="http://schemas.microsoft.com/office/drawing/2010/main" w="9525">
+                <a14:hiddenLine xmlns:a14="http://schemas.microsoft.com/office/drawing/2010/main" xmlns="" w="9525">
                   <a:solidFill>
                     <a:srgbClr val="000000"/>
                   </a:solidFill>
@@ -2506,7 +2507,7 @@
             </a:ln>
             <a:extLst>
               <a:ext uri="{91240B29-F687-4f45-9708-019B960494DF}">
-                <a14:hiddenLine xmlns="" xmlns:a14="http://schemas.microsoft.com/office/drawing/2010/main" w="9525">
+                <a14:hiddenLine xmlns:a14="http://schemas.microsoft.com/office/drawing/2010/main" xmlns="" w="9525">
                   <a:solidFill>
                     <a:srgbClr val="000000"/>
                   </a:solidFill>
@@ -2596,7 +2597,7 @@
             </a:ln>
             <a:extLst>
               <a:ext uri="{91240B29-F687-4f45-9708-019B960494DF}">
-                <a14:hiddenLine xmlns="" xmlns:a14="http://schemas.microsoft.com/office/drawing/2010/main" w="9525">
+                <a14:hiddenLine xmlns:a14="http://schemas.microsoft.com/office/drawing/2010/main" xmlns="" w="9525">
                   <a:solidFill>
                     <a:srgbClr val="000000"/>
                   </a:solidFill>
@@ -2664,7 +2665,7 @@
             </a:ln>
             <a:extLst>
               <a:ext uri="{91240B29-F687-4f45-9708-019B960494DF}">
-                <a14:hiddenLine xmlns="" xmlns:a14="http://schemas.microsoft.com/office/drawing/2010/main" w="9525">
+                <a14:hiddenLine xmlns:a14="http://schemas.microsoft.com/office/drawing/2010/main" xmlns="" w="9525">
                   <a:solidFill>
                     <a:srgbClr val="000000"/>
                   </a:solidFill>
@@ -2754,7 +2755,7 @@
             </a:ln>
             <a:extLst>
               <a:ext uri="{91240B29-F687-4f45-9708-019B960494DF}">
-                <a14:hiddenLine xmlns="" xmlns:a14="http://schemas.microsoft.com/office/drawing/2010/main" w="9525">
+                <a14:hiddenLine xmlns:a14="http://schemas.microsoft.com/office/drawing/2010/main" xmlns="" w="9525">
                   <a:solidFill>
                     <a:srgbClr val="000000"/>
                   </a:solidFill>
@@ -2788,7 +2789,7 @@
             </a:ln>
             <a:extLst>
               <a:ext uri="{91240B29-F687-4f45-9708-019B960494DF}">
-                <a14:hiddenLine xmlns="" xmlns:a14="http://schemas.microsoft.com/office/drawing/2010/main" w="9525">
+                <a14:hiddenLine xmlns:a14="http://schemas.microsoft.com/office/drawing/2010/main" xmlns="" w="9525">
                   <a:solidFill>
                     <a:srgbClr val="000000"/>
                   </a:solidFill>
@@ -2878,7 +2879,7 @@
             </a:ln>
             <a:extLst>
               <a:ext uri="{91240B29-F687-4f45-9708-019B960494DF}">
-                <a14:hiddenLine xmlns="" xmlns:a14="http://schemas.microsoft.com/office/drawing/2010/main" w="9525">
+                <a14:hiddenLine xmlns:a14="http://schemas.microsoft.com/office/drawing/2010/main" xmlns="" w="9525">
                   <a:solidFill>
                     <a:srgbClr val="000000"/>
                   </a:solidFill>
@@ -2940,7 +2941,7 @@
             </a:ln>
             <a:extLst>
               <a:ext uri="{91240B29-F687-4f45-9708-019B960494DF}">
-                <a14:hiddenLine xmlns="" xmlns:a14="http://schemas.microsoft.com/office/drawing/2010/main" w="9525">
+                <a14:hiddenLine xmlns:a14="http://schemas.microsoft.com/office/drawing/2010/main" xmlns="" w="9525">
                   <a:solidFill>
                     <a:srgbClr val="000000"/>
                   </a:solidFill>
@@ -3002,7 +3003,7 @@
             </a:ln>
             <a:extLst>
               <a:ext uri="{91240B29-F687-4f45-9708-019B960494DF}">
-                <a14:hiddenLine xmlns="" xmlns:a14="http://schemas.microsoft.com/office/drawing/2010/main" w="9525">
+                <a14:hiddenLine xmlns:a14="http://schemas.microsoft.com/office/drawing/2010/main" xmlns="" w="9525">
                   <a:solidFill>
                     <a:srgbClr val="000000"/>
                   </a:solidFill>
@@ -3092,7 +3093,7 @@
             </a:ln>
             <a:extLst>
               <a:ext uri="{91240B29-F687-4f45-9708-019B960494DF}">
-                <a14:hiddenLine xmlns="" xmlns:a14="http://schemas.microsoft.com/office/drawing/2010/main" w="9525">
+                <a14:hiddenLine xmlns:a14="http://schemas.microsoft.com/office/drawing/2010/main" xmlns="" w="9525">
                   <a:solidFill>
                     <a:srgbClr val="000000"/>
                   </a:solidFill>
@@ -3160,7 +3161,7 @@
             </a:ln>
             <a:extLst>
               <a:ext uri="{91240B29-F687-4f45-9708-019B960494DF}">
-                <a14:hiddenLine xmlns="" xmlns:a14="http://schemas.microsoft.com/office/drawing/2010/main" w="9525">
+                <a14:hiddenLine xmlns:a14="http://schemas.microsoft.com/office/drawing/2010/main" xmlns="" w="9525">
                   <a:solidFill>
                     <a:srgbClr val="000000"/>
                   </a:solidFill>
@@ -3222,7 +3223,7 @@
             </a:ln>
             <a:extLst>
               <a:ext uri="{91240B29-F687-4f45-9708-019B960494DF}">
-                <a14:hiddenLine xmlns="" xmlns:a14="http://schemas.microsoft.com/office/drawing/2010/main" w="9525">
+                <a14:hiddenLine xmlns:a14="http://schemas.microsoft.com/office/drawing/2010/main" xmlns="" w="9525">
                   <a:solidFill>
                     <a:srgbClr val="000000"/>
                   </a:solidFill>
@@ -3312,7 +3313,7 @@
             </a:ln>
             <a:extLst>
               <a:ext uri="{91240B29-F687-4f45-9708-019B960494DF}">
-                <a14:hiddenLine xmlns="" xmlns:a14="http://schemas.microsoft.com/office/drawing/2010/main" w="9525">
+                <a14:hiddenLine xmlns:a14="http://schemas.microsoft.com/office/drawing/2010/main" xmlns="" w="9525">
                   <a:solidFill>
                     <a:srgbClr val="000000"/>
                   </a:solidFill>
@@ -3374,7 +3375,7 @@
             </a:ln>
             <a:extLst>
               <a:ext uri="{91240B29-F687-4f45-9708-019B960494DF}">
-                <a14:hiddenLine xmlns="" xmlns:a14="http://schemas.microsoft.com/office/drawing/2010/main" w="9525">
+                <a14:hiddenLine xmlns:a14="http://schemas.microsoft.com/office/drawing/2010/main" xmlns="" w="9525">
                   <a:solidFill>
                     <a:srgbClr val="000000"/>
                   </a:solidFill>
@@ -3464,7 +3465,7 @@
             </a:ln>
             <a:extLst>
               <a:ext uri="{91240B29-F687-4f45-9708-019B960494DF}">
-                <a14:hiddenLine xmlns="" xmlns:a14="http://schemas.microsoft.com/office/drawing/2010/main" w="9525">
+                <a14:hiddenLine xmlns:a14="http://schemas.microsoft.com/office/drawing/2010/main" xmlns="" w="9525">
                   <a:solidFill>
                     <a:srgbClr val="000000"/>
                   </a:solidFill>
@@ -3526,7 +3527,7 @@
             </a:ln>
             <a:extLst>
               <a:ext uri="{91240B29-F687-4f45-9708-019B960494DF}">
-                <a14:hiddenLine xmlns="" xmlns:a14="http://schemas.microsoft.com/office/drawing/2010/main" w="9525">
+                <a14:hiddenLine xmlns:a14="http://schemas.microsoft.com/office/drawing/2010/main" xmlns="" w="9525">
                   <a:solidFill>
                     <a:srgbClr val="000000"/>
                   </a:solidFill>
@@ -3616,7 +3617,7 @@
             </a:ln>
             <a:extLst>
               <a:ext uri="{91240B29-F687-4f45-9708-019B960494DF}">
-                <a14:hiddenLine xmlns="" xmlns:a14="http://schemas.microsoft.com/office/drawing/2010/main" w="9525">
+                <a14:hiddenLine xmlns:a14="http://schemas.microsoft.com/office/drawing/2010/main" xmlns="" w="9525">
                   <a:solidFill>
                     <a:srgbClr val="000000"/>
                   </a:solidFill>
@@ -3650,7 +3651,7 @@
             </a:ln>
             <a:extLst>
               <a:ext uri="{91240B29-F687-4f45-9708-019B960494DF}">
-                <a14:hiddenLine xmlns="" xmlns:a14="http://schemas.microsoft.com/office/drawing/2010/main" w="9525">
+                <a14:hiddenLine xmlns:a14="http://schemas.microsoft.com/office/drawing/2010/main" xmlns="" w="9525">
                   <a:solidFill>
                     <a:srgbClr val="000000"/>
                   </a:solidFill>
@@ -3715,7 +3716,7 @@
             </a:ln>
             <a:extLst>
               <a:ext uri="{91240B29-F687-4f45-9708-019B960494DF}">
-                <a14:hiddenLine xmlns="" xmlns:a14="http://schemas.microsoft.com/office/drawing/2010/main" w="9525">
+                <a14:hiddenLine xmlns:a14="http://schemas.microsoft.com/office/drawing/2010/main" xmlns="" w="9525">
                   <a:solidFill>
                     <a:srgbClr val="000000"/>
                   </a:solidFill>
@@ -3805,7 +3806,7 @@
             </a:ln>
             <a:extLst>
               <a:ext uri="{91240B29-F687-4f45-9708-019B960494DF}">
-                <a14:hiddenLine xmlns="" xmlns:a14="http://schemas.microsoft.com/office/drawing/2010/main" w="9525">
+                <a14:hiddenLine xmlns:a14="http://schemas.microsoft.com/office/drawing/2010/main" xmlns="" w="9525">
                   <a:solidFill>
                     <a:srgbClr val="000000"/>
                   </a:solidFill>
@@ -3867,7 +3868,7 @@
             </a:ln>
             <a:extLst>
               <a:ext uri="{91240B29-F687-4f45-9708-019B960494DF}">
-                <a14:hiddenLine xmlns="" xmlns:a14="http://schemas.microsoft.com/office/drawing/2010/main" w="9525">
+                <a14:hiddenLine xmlns:a14="http://schemas.microsoft.com/office/drawing/2010/main" xmlns="" w="9525">
                   <a:solidFill>
                     <a:srgbClr val="000000"/>
                   </a:solidFill>
@@ -3957,7 +3958,7 @@
             </a:ln>
             <a:extLst>
               <a:ext uri="{91240B29-F687-4f45-9708-019B960494DF}">
-                <a14:hiddenLine xmlns="" xmlns:a14="http://schemas.microsoft.com/office/drawing/2010/main" w="9525">
+                <a14:hiddenLine xmlns:a14="http://schemas.microsoft.com/office/drawing/2010/main" xmlns="" w="9525">
                   <a:solidFill>
                     <a:srgbClr val="000000"/>
                   </a:solidFill>
@@ -4047,7 +4048,7 @@
             </a:ln>
             <a:extLst>
               <a:ext uri="{91240B29-F687-4f45-9708-019B960494DF}">
-                <a14:hiddenLine xmlns="" xmlns:a14="http://schemas.microsoft.com/office/drawing/2010/main" w="9525">
+                <a14:hiddenLine xmlns:a14="http://schemas.microsoft.com/office/drawing/2010/main" xmlns="" w="9525">
                   <a:solidFill>
                     <a:srgbClr val="000000"/>
                   </a:solidFill>
@@ -4112,7 +4113,7 @@
             </a:ln>
             <a:extLst>
               <a:ext uri="{91240B29-F687-4f45-9708-019B960494DF}">
-                <a14:hiddenLine xmlns="" xmlns:a14="http://schemas.microsoft.com/office/drawing/2010/main" w="9525">
+                <a14:hiddenLine xmlns:a14="http://schemas.microsoft.com/office/drawing/2010/main" xmlns="" w="9525">
                   <a:solidFill>
                     <a:srgbClr val="000000"/>
                   </a:solidFill>
@@ -4174,7 +4175,7 @@
             </a:ln>
             <a:extLst>
               <a:ext uri="{91240B29-F687-4f45-9708-019B960494DF}">
-                <a14:hiddenLine xmlns="" xmlns:a14="http://schemas.microsoft.com/office/drawing/2010/main" w="9525">
+                <a14:hiddenLine xmlns:a14="http://schemas.microsoft.com/office/drawing/2010/main" xmlns="" w="9525">
                   <a:solidFill>
                     <a:srgbClr val="000000"/>
                   </a:solidFill>
@@ -4264,7 +4265,7 @@
             </a:ln>
             <a:extLst>
               <a:ext uri="{91240B29-F687-4f45-9708-019B960494DF}">
-                <a14:hiddenLine xmlns="" xmlns:a14="http://schemas.microsoft.com/office/drawing/2010/main" w="9525">
+                <a14:hiddenLine xmlns:a14="http://schemas.microsoft.com/office/drawing/2010/main" xmlns="" w="9525">
                   <a:solidFill>
                     <a:srgbClr val="000000"/>
                   </a:solidFill>
@@ -4354,7 +4355,7 @@
             </a:ln>
             <a:extLst>
               <a:ext uri="{91240B29-F687-4f45-9708-019B960494DF}">
-                <a14:hiddenLine xmlns="" xmlns:a14="http://schemas.microsoft.com/office/drawing/2010/main" w="9525">
+                <a14:hiddenLine xmlns:a14="http://schemas.microsoft.com/office/drawing/2010/main" xmlns="" w="9525">
                   <a:solidFill>
                     <a:srgbClr val="000000"/>
                   </a:solidFill>
@@ -4416,7 +4417,7 @@
             </a:ln>
             <a:extLst>
               <a:ext uri="{91240B29-F687-4f45-9708-019B960494DF}">
-                <a14:hiddenLine xmlns="" xmlns:a14="http://schemas.microsoft.com/office/drawing/2010/main" w="9525">
+                <a14:hiddenLine xmlns:a14="http://schemas.microsoft.com/office/drawing/2010/main" xmlns="" w="9525">
                   <a:solidFill>
                     <a:srgbClr val="000000"/>
                   </a:solidFill>
@@ -4536,7 +4537,7 @@
             </a:ln>
             <a:extLst>
               <a:ext uri="{91240B29-F687-4f45-9708-019B960494DF}">
-                <a14:hiddenLine xmlns="" xmlns:a14="http://schemas.microsoft.com/office/drawing/2010/main" w="9525">
+                <a14:hiddenLine xmlns:a14="http://schemas.microsoft.com/office/drawing/2010/main" xmlns="" w="9525">
                   <a:solidFill>
                     <a:srgbClr val="000000"/>
                   </a:solidFill>
@@ -4604,7 +4605,7 @@
             </a:ln>
             <a:extLst>
               <a:ext uri="{91240B29-F687-4f45-9708-019B960494DF}">
-                <a14:hiddenLine xmlns="" xmlns:a14="http://schemas.microsoft.com/office/drawing/2010/main" w="9525">
+                <a14:hiddenLine xmlns:a14="http://schemas.microsoft.com/office/drawing/2010/main" xmlns="" w="9525">
                   <a:solidFill>
                     <a:srgbClr val="000000"/>
                   </a:solidFill>
@@ -4694,7 +4695,7 @@
             </a:ln>
             <a:extLst>
               <a:ext uri="{91240B29-F687-4f45-9708-019B960494DF}">
-                <a14:hiddenLine xmlns="" xmlns:a14="http://schemas.microsoft.com/office/drawing/2010/main" w="9525">
+                <a14:hiddenLine xmlns:a14="http://schemas.microsoft.com/office/drawing/2010/main" xmlns="" w="9525">
                   <a:solidFill>
                     <a:srgbClr val="000000"/>
                   </a:solidFill>
@@ -4834,7 +4835,7 @@
           <a:p>
             <a:fld id="{EC4347D3-4C9A-C240-8F14-750059DFEEB0}" type="datetimeFigureOut">
               <a:rPr lang="en-US" smtClean="0"/>
-              <a:t>5/22/25</a:t>
+              <a:t>5/23/25</a:t>
             </a:fld>
             <a:endParaRPr lang="en-US"/>
           </a:p>
@@ -5101,7 +5102,7 @@
           <a:p>
             <a:fld id="{EC4347D3-4C9A-C240-8F14-750059DFEEB0}" type="datetimeFigureOut">
               <a:rPr lang="en-US" smtClean="0"/>
-              <a:t>5/22/25</a:t>
+              <a:t>5/23/25</a:t>
             </a:fld>
             <a:endParaRPr lang="en-US"/>
           </a:p>
@@ -5297,7 +5298,7 @@
           <a:p>
             <a:fld id="{EC4347D3-4C9A-C240-8F14-750059DFEEB0}" type="datetimeFigureOut">
               <a:rPr lang="en-US" smtClean="0"/>
-              <a:t>5/22/25</a:t>
+              <a:t>5/23/25</a:t>
             </a:fld>
             <a:endParaRPr lang="en-US"/>
           </a:p>
@@ -5560,7 +5561,7 @@
           <a:p>
             <a:fld id="{EC4347D3-4C9A-C240-8F14-750059DFEEB0}" type="datetimeFigureOut">
               <a:rPr lang="en-US" smtClean="0"/>
-              <a:t>5/22/25</a:t>
+              <a:t>5/23/25</a:t>
             </a:fld>
             <a:endParaRPr lang="en-US"/>
           </a:p>
@@ -5994,7 +5995,7 @@
           <a:p>
             <a:fld id="{EC4347D3-4C9A-C240-8F14-750059DFEEB0}" type="datetimeFigureOut">
               <a:rPr lang="en-US" smtClean="0"/>
-              <a:t>5/22/25</a:t>
+              <a:t>5/23/25</a:t>
             </a:fld>
             <a:endParaRPr lang="en-US"/>
           </a:p>
@@ -6540,7 +6541,7 @@
           <a:p>
             <a:fld id="{EC4347D3-4C9A-C240-8F14-750059DFEEB0}" type="datetimeFigureOut">
               <a:rPr lang="en-US" smtClean="0"/>
-              <a:t>5/22/25</a:t>
+              <a:t>5/23/25</a:t>
             </a:fld>
             <a:endParaRPr lang="en-US"/>
           </a:p>
@@ -7260,7 +7261,7 @@
           <a:p>
             <a:fld id="{EC4347D3-4C9A-C240-8F14-750059DFEEB0}" type="datetimeFigureOut">
               <a:rPr lang="en-US" smtClean="0"/>
-              <a:t>5/22/25</a:t>
+              <a:t>5/23/25</a:t>
             </a:fld>
             <a:endParaRPr lang="en-US"/>
           </a:p>
@@ -7430,7 +7431,7 @@
           <a:p>
             <a:fld id="{EC4347D3-4C9A-C240-8F14-750059DFEEB0}" type="datetimeFigureOut">
               <a:rPr lang="en-US" smtClean="0"/>
-              <a:t>5/22/25</a:t>
+              <a:t>5/23/25</a:t>
             </a:fld>
             <a:endParaRPr lang="en-US"/>
           </a:p>
@@ -7610,7 +7611,7 @@
           <a:p>
             <a:fld id="{EC4347D3-4C9A-C240-8F14-750059DFEEB0}" type="datetimeFigureOut">
               <a:rPr lang="en-US" smtClean="0"/>
-              <a:t>5/22/25</a:t>
+              <a:t>5/23/25</a:t>
             </a:fld>
             <a:endParaRPr lang="en-US"/>
           </a:p>
@@ -7780,7 +7781,7 @@
           <a:p>
             <a:fld id="{EC4347D3-4C9A-C240-8F14-750059DFEEB0}" type="datetimeFigureOut">
               <a:rPr lang="en-US" smtClean="0"/>
-              <a:t>5/22/25</a:t>
+              <a:t>5/23/25</a:t>
             </a:fld>
             <a:endParaRPr lang="en-US"/>
           </a:p>
@@ -8030,7 +8031,7 @@
           <a:p>
             <a:fld id="{EC4347D3-4C9A-C240-8F14-750059DFEEB0}" type="datetimeFigureOut">
               <a:rPr lang="en-US" smtClean="0"/>
-              <a:t>5/22/25</a:t>
+              <a:t>5/23/25</a:t>
             </a:fld>
             <a:endParaRPr lang="en-US"/>
           </a:p>
@@ -8262,7 +8263,7 @@
           <a:p>
             <a:fld id="{EC4347D3-4C9A-C240-8F14-750059DFEEB0}" type="datetimeFigureOut">
               <a:rPr lang="en-US" smtClean="0"/>
-              <a:t>5/22/25</a:t>
+              <a:t>5/23/25</a:t>
             </a:fld>
             <a:endParaRPr lang="en-US"/>
           </a:p>
@@ -8648,7 +8649,7 @@
           <a:p>
             <a:fld id="{EC4347D3-4C9A-C240-8F14-750059DFEEB0}" type="datetimeFigureOut">
               <a:rPr lang="en-US" smtClean="0"/>
-              <a:t>5/22/25</a:t>
+              <a:t>5/23/25</a:t>
             </a:fld>
             <a:endParaRPr lang="en-US"/>
           </a:p>
@@ -8771,7 +8772,7 @@
           <a:p>
             <a:fld id="{EC4347D3-4C9A-C240-8F14-750059DFEEB0}" type="datetimeFigureOut">
               <a:rPr lang="en-US" smtClean="0"/>
-              <a:t>5/22/25</a:t>
+              <a:t>5/23/25</a:t>
             </a:fld>
             <a:endParaRPr lang="en-US"/>
           </a:p>
@@ -8866,7 +8867,7 @@
           <a:p>
             <a:fld id="{EC4347D3-4C9A-C240-8F14-750059DFEEB0}" type="datetimeFigureOut">
               <a:rPr lang="en-US" smtClean="0"/>
-              <a:t>5/22/25</a:t>
+              <a:t>5/23/25</a:t>
             </a:fld>
             <a:endParaRPr lang="en-US"/>
           </a:p>
@@ -9115,7 +9116,7 @@
           <a:p>
             <a:fld id="{EC4347D3-4C9A-C240-8F14-750059DFEEB0}" type="datetimeFigureOut">
               <a:rPr lang="en-US" smtClean="0"/>
-              <a:t>5/22/25</a:t>
+              <a:t>5/23/25</a:t>
             </a:fld>
             <a:endParaRPr lang="en-US"/>
           </a:p>
@@ -9400,7 +9401,7 @@
           <a:p>
             <a:fld id="{EC4347D3-4C9A-C240-8F14-750059DFEEB0}" type="datetimeFigureOut">
               <a:rPr lang="en-US" smtClean="0"/>
-              <a:t>5/22/25</a:t>
+              <a:t>5/23/25</a:t>
             </a:fld>
             <a:endParaRPr lang="en-US"/>
           </a:p>
@@ -9523,7 +9524,7 @@
           <a:noFill/>
           <a:extLst>
             <a:ext uri="{909E8E84-426E-40dd-AFC4-6F175D3DCCD1}">
-              <a14:hiddenFill xmlns="" xmlns:a14="http://schemas.microsoft.com/office/drawing/2010/main">
+              <a14:hiddenFill xmlns:a14="http://schemas.microsoft.com/office/drawing/2010/main" xmlns="">
                 <a:solidFill>
                   <a:srgbClr val="FFFFFF"/>
                 </a:solidFill>
@@ -9597,7 +9598,7 @@
               </a:ln>
               <a:extLst>
                 <a:ext uri="{91240B29-F687-4f45-9708-019B960494DF}">
-                  <a14:hiddenLine xmlns="" xmlns:a14="http://schemas.microsoft.com/office/drawing/2010/main" w="9525">
+                  <a14:hiddenLine xmlns:a14="http://schemas.microsoft.com/office/drawing/2010/main" xmlns="" w="9525">
                     <a:solidFill>
                       <a:srgbClr val="000000"/>
                     </a:solidFill>
@@ -9687,7 +9688,7 @@
               </a:ln>
               <a:extLst>
                 <a:ext uri="{91240B29-F687-4f45-9708-019B960494DF}">
-                  <a14:hiddenLine xmlns="" xmlns:a14="http://schemas.microsoft.com/office/drawing/2010/main" w="9525">
+                  <a14:hiddenLine xmlns:a14="http://schemas.microsoft.com/office/drawing/2010/main" xmlns="" w="9525">
                     <a:solidFill>
                       <a:srgbClr val="000000"/>
                     </a:solidFill>
@@ -9777,7 +9778,7 @@
               </a:ln>
               <a:extLst>
                 <a:ext uri="{91240B29-F687-4f45-9708-019B960494DF}">
-                  <a14:hiddenLine xmlns="" xmlns:a14="http://schemas.microsoft.com/office/drawing/2010/main" w="9525">
+                  <a14:hiddenLine xmlns:a14="http://schemas.microsoft.com/office/drawing/2010/main" xmlns="" w="9525">
                     <a:solidFill>
                       <a:srgbClr val="000000"/>
                     </a:solidFill>
@@ -9839,7 +9840,7 @@
               </a:ln>
               <a:extLst>
                 <a:ext uri="{91240B29-F687-4f45-9708-019B960494DF}">
-                  <a14:hiddenLine xmlns="" xmlns:a14="http://schemas.microsoft.com/office/drawing/2010/main" w="9525">
+                  <a14:hiddenLine xmlns:a14="http://schemas.microsoft.com/office/drawing/2010/main" xmlns="" w="9525">
                     <a:solidFill>
                       <a:srgbClr val="000000"/>
                     </a:solidFill>
@@ -9929,7 +9930,7 @@
               </a:ln>
               <a:extLst>
                 <a:ext uri="{91240B29-F687-4f45-9708-019B960494DF}">
-                  <a14:hiddenLine xmlns="" xmlns:a14="http://schemas.microsoft.com/office/drawing/2010/main" w="9525">
+                  <a14:hiddenLine xmlns:a14="http://schemas.microsoft.com/office/drawing/2010/main" xmlns="" w="9525">
                     <a:solidFill>
                       <a:srgbClr val="000000"/>
                     </a:solidFill>
@@ -9991,7 +9992,7 @@
               </a:ln>
               <a:extLst>
                 <a:ext uri="{91240B29-F687-4f45-9708-019B960494DF}">
-                  <a14:hiddenLine xmlns="" xmlns:a14="http://schemas.microsoft.com/office/drawing/2010/main" w="9525">
+                  <a14:hiddenLine xmlns:a14="http://schemas.microsoft.com/office/drawing/2010/main" xmlns="" w="9525">
                     <a:solidFill>
                       <a:srgbClr val="000000"/>
                     </a:solidFill>
@@ -10053,7 +10054,7 @@
               </a:ln>
               <a:extLst>
                 <a:ext uri="{91240B29-F687-4f45-9708-019B960494DF}">
-                  <a14:hiddenLine xmlns="" xmlns:a14="http://schemas.microsoft.com/office/drawing/2010/main" w="9525">
+                  <a14:hiddenLine xmlns:a14="http://schemas.microsoft.com/office/drawing/2010/main" xmlns="" w="9525">
                     <a:solidFill>
                       <a:srgbClr val="000000"/>
                     </a:solidFill>
@@ -10143,7 +10144,7 @@
               </a:ln>
               <a:extLst>
                 <a:ext uri="{91240B29-F687-4f45-9708-019B960494DF}">
-                  <a14:hiddenLine xmlns="" xmlns:a14="http://schemas.microsoft.com/office/drawing/2010/main" w="9525">
+                  <a14:hiddenLine xmlns:a14="http://schemas.microsoft.com/office/drawing/2010/main" xmlns="" w="9525">
                     <a:solidFill>
                       <a:srgbClr val="000000"/>
                     </a:solidFill>
@@ -10233,7 +10234,7 @@
               </a:ln>
               <a:extLst>
                 <a:ext uri="{91240B29-F687-4f45-9708-019B960494DF}">
-                  <a14:hiddenLine xmlns="" xmlns:a14="http://schemas.microsoft.com/office/drawing/2010/main" w="9525">
+                  <a14:hiddenLine xmlns:a14="http://schemas.microsoft.com/office/drawing/2010/main" xmlns="" w="9525">
                     <a:solidFill>
                       <a:srgbClr val="000000"/>
                     </a:solidFill>
@@ -10295,7 +10296,7 @@
               </a:ln>
               <a:extLst>
                 <a:ext uri="{91240B29-F687-4f45-9708-019B960494DF}">
-                  <a14:hiddenLine xmlns="" xmlns:a14="http://schemas.microsoft.com/office/drawing/2010/main" w="9525">
+                  <a14:hiddenLine xmlns:a14="http://schemas.microsoft.com/office/drawing/2010/main" xmlns="" w="9525">
                     <a:solidFill>
                       <a:srgbClr val="000000"/>
                     </a:solidFill>
@@ -10405,7 +10406,7 @@
               </a:ln>
               <a:extLst>
                 <a:ext uri="{91240B29-F687-4f45-9708-019B960494DF}">
-                  <a14:hiddenLine xmlns="" xmlns:a14="http://schemas.microsoft.com/office/drawing/2010/main" w="9525">
+                  <a14:hiddenLine xmlns:a14="http://schemas.microsoft.com/office/drawing/2010/main" xmlns="" w="9525">
                     <a:solidFill>
                       <a:srgbClr val="000000"/>
                     </a:solidFill>
@@ -10489,7 +10490,7 @@
               </a:ln>
               <a:extLst>
                 <a:ext uri="{91240B29-F687-4f45-9708-019B960494DF}">
-                  <a14:hiddenLine xmlns="" xmlns:a14="http://schemas.microsoft.com/office/drawing/2010/main" w="9525">
+                  <a14:hiddenLine xmlns:a14="http://schemas.microsoft.com/office/drawing/2010/main" xmlns="" w="9525">
                     <a:solidFill>
                       <a:srgbClr val="000000"/>
                     </a:solidFill>
@@ -10551,7 +10552,7 @@
               </a:ln>
               <a:extLst>
                 <a:ext uri="{91240B29-F687-4f45-9708-019B960494DF}">
-                  <a14:hiddenLine xmlns="" xmlns:a14="http://schemas.microsoft.com/office/drawing/2010/main" w="9525">
+                  <a14:hiddenLine xmlns:a14="http://schemas.microsoft.com/office/drawing/2010/main" xmlns="" w="9525">
                     <a:solidFill>
                       <a:srgbClr val="000000"/>
                     </a:solidFill>
@@ -10613,7 +10614,7 @@
               </a:ln>
               <a:extLst>
                 <a:ext uri="{91240B29-F687-4f45-9708-019B960494DF}">
-                  <a14:hiddenLine xmlns="" xmlns:a14="http://schemas.microsoft.com/office/drawing/2010/main" w="9525">
+                  <a14:hiddenLine xmlns:a14="http://schemas.microsoft.com/office/drawing/2010/main" xmlns="" w="9525">
                     <a:solidFill>
                       <a:srgbClr val="000000"/>
                     </a:solidFill>
@@ -10703,7 +10704,7 @@
               </a:ln>
               <a:extLst>
                 <a:ext uri="{91240B29-F687-4f45-9708-019B960494DF}">
-                  <a14:hiddenLine xmlns="" xmlns:a14="http://schemas.microsoft.com/office/drawing/2010/main" w="9525">
+                  <a14:hiddenLine xmlns:a14="http://schemas.microsoft.com/office/drawing/2010/main" xmlns="" w="9525">
                     <a:solidFill>
                       <a:srgbClr val="000000"/>
                     </a:solidFill>
@@ -10737,7 +10738,7 @@
               </a:ln>
               <a:extLst>
                 <a:ext uri="{91240B29-F687-4f45-9708-019B960494DF}">
-                  <a14:hiddenLine xmlns="" xmlns:a14="http://schemas.microsoft.com/office/drawing/2010/main" w="9525">
+                  <a14:hiddenLine xmlns:a14="http://schemas.microsoft.com/office/drawing/2010/main" xmlns="" w="9525">
                     <a:solidFill>
                       <a:srgbClr val="000000"/>
                     </a:solidFill>
@@ -10802,7 +10803,7 @@
               </a:ln>
               <a:extLst>
                 <a:ext uri="{91240B29-F687-4f45-9708-019B960494DF}">
-                  <a14:hiddenLine xmlns="" xmlns:a14="http://schemas.microsoft.com/office/drawing/2010/main" w="9525">
+                  <a14:hiddenLine xmlns:a14="http://schemas.microsoft.com/office/drawing/2010/main" xmlns="" w="9525">
                     <a:solidFill>
                       <a:srgbClr val="000000"/>
                     </a:solidFill>
@@ -10892,7 +10893,7 @@
               </a:ln>
               <a:extLst>
                 <a:ext uri="{91240B29-F687-4f45-9708-019B960494DF}">
-                  <a14:hiddenLine xmlns="" xmlns:a14="http://schemas.microsoft.com/office/drawing/2010/main" w="9525">
+                  <a14:hiddenLine xmlns:a14="http://schemas.microsoft.com/office/drawing/2010/main" xmlns="" w="9525">
                     <a:solidFill>
                       <a:srgbClr val="000000"/>
                     </a:solidFill>
@@ -10954,7 +10955,7 @@
               </a:ln>
               <a:extLst>
                 <a:ext uri="{91240B29-F687-4f45-9708-019B960494DF}">
-                  <a14:hiddenLine xmlns="" xmlns:a14="http://schemas.microsoft.com/office/drawing/2010/main" w="9525">
+                  <a14:hiddenLine xmlns:a14="http://schemas.microsoft.com/office/drawing/2010/main" xmlns="" w="9525">
                     <a:solidFill>
                       <a:srgbClr val="000000"/>
                     </a:solidFill>
@@ -11044,7 +11045,7 @@
               </a:ln>
               <a:extLst>
                 <a:ext uri="{91240B29-F687-4f45-9708-019B960494DF}">
-                  <a14:hiddenLine xmlns="" xmlns:a14="http://schemas.microsoft.com/office/drawing/2010/main" w="9525">
+                  <a14:hiddenLine xmlns:a14="http://schemas.microsoft.com/office/drawing/2010/main" xmlns="" w="9525">
                     <a:solidFill>
                       <a:srgbClr val="000000"/>
                     </a:solidFill>
@@ -11109,7 +11110,7 @@
               </a:ln>
               <a:extLst>
                 <a:ext uri="{91240B29-F687-4f45-9708-019B960494DF}">
-                  <a14:hiddenLine xmlns="" xmlns:a14="http://schemas.microsoft.com/office/drawing/2010/main" w="9525">
+                  <a14:hiddenLine xmlns:a14="http://schemas.microsoft.com/office/drawing/2010/main" xmlns="" w="9525">
                     <a:solidFill>
                       <a:srgbClr val="000000"/>
                     </a:solidFill>
@@ -11171,7 +11172,7 @@
               </a:ln>
               <a:extLst>
                 <a:ext uri="{91240B29-F687-4f45-9708-019B960494DF}">
-                  <a14:hiddenLine xmlns="" xmlns:a14="http://schemas.microsoft.com/office/drawing/2010/main" w="9525">
+                  <a14:hiddenLine xmlns:a14="http://schemas.microsoft.com/office/drawing/2010/main" xmlns="" w="9525">
                     <a:solidFill>
                       <a:srgbClr val="000000"/>
                     </a:solidFill>
@@ -11261,7 +11262,7 @@
               </a:ln>
               <a:extLst>
                 <a:ext uri="{91240B29-F687-4f45-9708-019B960494DF}">
-                  <a14:hiddenLine xmlns="" xmlns:a14="http://schemas.microsoft.com/office/drawing/2010/main" w="9525">
+                  <a14:hiddenLine xmlns:a14="http://schemas.microsoft.com/office/drawing/2010/main" xmlns="" w="9525">
                     <a:solidFill>
                       <a:srgbClr val="000000"/>
                     </a:solidFill>
@@ -11351,7 +11352,7 @@
               </a:ln>
               <a:extLst>
                 <a:ext uri="{91240B29-F687-4f45-9708-019B960494DF}">
-                  <a14:hiddenLine xmlns="" xmlns:a14="http://schemas.microsoft.com/office/drawing/2010/main" w="9525">
+                  <a14:hiddenLine xmlns:a14="http://schemas.microsoft.com/office/drawing/2010/main" xmlns="" w="9525">
                     <a:solidFill>
                       <a:srgbClr val="000000"/>
                     </a:solidFill>
@@ -11416,7 +11417,7 @@
               </a:ln>
               <a:extLst>
                 <a:ext uri="{91240B29-F687-4f45-9708-019B960494DF}">
-                  <a14:hiddenLine xmlns="" xmlns:a14="http://schemas.microsoft.com/office/drawing/2010/main" w="9525">
+                  <a14:hiddenLine xmlns:a14="http://schemas.microsoft.com/office/drawing/2010/main" xmlns="" w="9525">
                     <a:solidFill>
                       <a:srgbClr val="000000"/>
                     </a:solidFill>
@@ -11536,7 +11537,7 @@
               </a:ln>
               <a:extLst>
                 <a:ext uri="{91240B29-F687-4f45-9708-019B960494DF}">
-                  <a14:hiddenLine xmlns="" xmlns:a14="http://schemas.microsoft.com/office/drawing/2010/main" w="9525">
+                  <a14:hiddenLine xmlns:a14="http://schemas.microsoft.com/office/drawing/2010/main" xmlns="" w="9525">
                     <a:solidFill>
                       <a:srgbClr val="000000"/>
                     </a:solidFill>
@@ -11617,7 +11618,7 @@
               </a:ln>
               <a:extLst>
                 <a:ext uri="{91240B29-F687-4f45-9708-019B960494DF}">
-                  <a14:hiddenLine xmlns="" xmlns:a14="http://schemas.microsoft.com/office/drawing/2010/main" w="9525">
+                  <a14:hiddenLine xmlns:a14="http://schemas.microsoft.com/office/drawing/2010/main" xmlns="" w="9525">
                     <a:solidFill>
                       <a:srgbClr val="000000"/>
                     </a:solidFill>
@@ -11732,7 +11733,7 @@
               </a:ln>
               <a:extLst>
                 <a:ext uri="{91240B29-F687-4f45-9708-019B960494DF}">
-                  <a14:hiddenLine xmlns="" xmlns:a14="http://schemas.microsoft.com/office/drawing/2010/main" w="9525">
+                  <a14:hiddenLine xmlns:a14="http://schemas.microsoft.com/office/drawing/2010/main" xmlns="" w="9525">
                     <a:solidFill>
                       <a:srgbClr val="000000"/>
                     </a:solidFill>
@@ -11822,7 +11823,7 @@
               </a:ln>
               <a:extLst>
                 <a:ext uri="{91240B29-F687-4f45-9708-019B960494DF}">
-                  <a14:hiddenLine xmlns="" xmlns:a14="http://schemas.microsoft.com/office/drawing/2010/main" w="9525">
+                  <a14:hiddenLine xmlns:a14="http://schemas.microsoft.com/office/drawing/2010/main" xmlns="" w="9525">
                     <a:solidFill>
                       <a:srgbClr val="000000"/>
                     </a:solidFill>
@@ -11887,7 +11888,7 @@
               </a:ln>
               <a:extLst>
                 <a:ext uri="{91240B29-F687-4f45-9708-019B960494DF}">
-                  <a14:hiddenLine xmlns="" xmlns:a14="http://schemas.microsoft.com/office/drawing/2010/main" w="9525">
+                  <a14:hiddenLine xmlns:a14="http://schemas.microsoft.com/office/drawing/2010/main" xmlns="" w="9525">
                     <a:solidFill>
                       <a:srgbClr val="000000"/>
                     </a:solidFill>
@@ -11977,7 +11978,7 @@
               </a:ln>
               <a:extLst>
                 <a:ext uri="{91240B29-F687-4f45-9708-019B960494DF}">
-                  <a14:hiddenLine xmlns="" xmlns:a14="http://schemas.microsoft.com/office/drawing/2010/main" w="9525">
+                  <a14:hiddenLine xmlns:a14="http://schemas.microsoft.com/office/drawing/2010/main" xmlns="" w="9525">
                     <a:solidFill>
                       <a:srgbClr val="000000"/>
                     </a:solidFill>
@@ -12045,7 +12046,7 @@
               </a:ln>
               <a:extLst>
                 <a:ext uri="{91240B29-F687-4f45-9708-019B960494DF}">
-                  <a14:hiddenLine xmlns="" xmlns:a14="http://schemas.microsoft.com/office/drawing/2010/main" w="9525">
+                  <a14:hiddenLine xmlns:a14="http://schemas.microsoft.com/office/drawing/2010/main" xmlns="" w="9525">
                     <a:solidFill>
                       <a:srgbClr val="000000"/>
                     </a:solidFill>
@@ -12135,7 +12136,7 @@
               </a:ln>
               <a:extLst>
                 <a:ext uri="{91240B29-F687-4f45-9708-019B960494DF}">
-                  <a14:hiddenLine xmlns="" xmlns:a14="http://schemas.microsoft.com/office/drawing/2010/main" w="9525">
+                  <a14:hiddenLine xmlns:a14="http://schemas.microsoft.com/office/drawing/2010/main" xmlns="" w="9525">
                     <a:solidFill>
                       <a:srgbClr val="000000"/>
                     </a:solidFill>
@@ -12203,7 +12204,7 @@
               </a:ln>
               <a:extLst>
                 <a:ext uri="{91240B29-F687-4f45-9708-019B960494DF}">
-                  <a14:hiddenLine xmlns="" xmlns:a14="http://schemas.microsoft.com/office/drawing/2010/main" w="9525">
+                  <a14:hiddenLine xmlns:a14="http://schemas.microsoft.com/office/drawing/2010/main" xmlns="" w="9525">
                     <a:solidFill>
                       <a:srgbClr val="000000"/>
                     </a:solidFill>
@@ -12293,7 +12294,7 @@
               </a:ln>
               <a:extLst>
                 <a:ext uri="{91240B29-F687-4f45-9708-019B960494DF}">
-                  <a14:hiddenLine xmlns="" xmlns:a14="http://schemas.microsoft.com/office/drawing/2010/main" w="9525">
+                  <a14:hiddenLine xmlns:a14="http://schemas.microsoft.com/office/drawing/2010/main" xmlns="" w="9525">
                     <a:solidFill>
                       <a:srgbClr val="000000"/>
                     </a:solidFill>
@@ -12327,7 +12328,7 @@
               </a:ln>
               <a:extLst>
                 <a:ext uri="{91240B29-F687-4f45-9708-019B960494DF}">
-                  <a14:hiddenLine xmlns="" xmlns:a14="http://schemas.microsoft.com/office/drawing/2010/main" w="9525">
+                  <a14:hiddenLine xmlns:a14="http://schemas.microsoft.com/office/drawing/2010/main" xmlns="" w="9525">
                     <a:solidFill>
                       <a:srgbClr val="000000"/>
                     </a:solidFill>
@@ -12467,7 +12468,7 @@
           <a:p>
             <a:fld id="{EC4347D3-4C9A-C240-8F14-750059DFEEB0}" type="datetimeFigureOut">
               <a:rPr lang="en-US" smtClean="0"/>
-              <a:t>5/22/25</a:t>
+              <a:t>5/23/25</a:t>
             </a:fld>
             <a:endParaRPr lang="en-US"/>
           </a:p>
@@ -13653,6 +13654,260 @@
 </file>
 
 <file path=ppt/slides/slide5.xml><?xml version="1.0" encoding="utf-8"?>
+<p:sld xmlns:a="http://schemas.openxmlformats.org/drawingml/2006/main" xmlns:r="http://schemas.openxmlformats.org/officeDocument/2006/relationships" xmlns:p="http://schemas.openxmlformats.org/presentationml/2006/main">
+  <p:cSld>
+    <p:spTree>
+      <p:nvGrpSpPr>
+        <p:cNvPr id="1" name=""/>
+        <p:cNvGrpSpPr/>
+        <p:nvPr/>
+      </p:nvGrpSpPr>
+      <p:grpSpPr>
+        <a:xfrm>
+          <a:off x="0" y="0"/>
+          <a:ext cx="0" cy="0"/>
+          <a:chOff x="0" y="0"/>
+          <a:chExt cx="0" cy="0"/>
+        </a:xfrm>
+      </p:grpSpPr>
+      <p:sp>
+        <p:nvSpPr>
+          <p:cNvPr id="6146" name="Rectangle 2"/>
+          <p:cNvSpPr>
+            <a:spLocks noGrp="1" noChangeArrowheads="1"/>
+          </p:cNvSpPr>
+          <p:nvPr>
+            <p:ph type="title"/>
+            <p:custDataLst>
+              <p:tags r:id="rId1"/>
+            </p:custDataLst>
+          </p:nvPr>
+        </p:nvSpPr>
+        <p:spPr>
+          <a:xfrm>
+            <a:off x="1141413" y="284084"/>
+            <a:ext cx="9905998" cy="620791"/>
+          </a:xfrm>
+        </p:spPr>
+        <p:txBody>
+          <a:bodyPr/>
+          <a:lstStyle/>
+          <a:p>
+            <a:pPr algn="ctr"/>
+            <a:r>
+              <a:rPr lang="en-US" dirty="0"/>
+              <a:t>Week 1, Day 5: Fri, May 23</a:t>
+            </a:r>
+          </a:p>
+        </p:txBody>
+      </p:sp>
+      <p:sp>
+        <p:nvSpPr>
+          <p:cNvPr id="6147" name="Rectangle 3"/>
+          <p:cNvSpPr>
+            <a:spLocks noGrp="1" noChangeArrowheads="1"/>
+          </p:cNvSpPr>
+          <p:nvPr>
+            <p:ph idx="1"/>
+            <p:custDataLst>
+              <p:tags r:id="rId2"/>
+            </p:custDataLst>
+          </p:nvPr>
+        </p:nvSpPr>
+        <p:spPr>
+          <a:xfrm>
+            <a:off x="838986" y="1123950"/>
+            <a:ext cx="10727703" cy="5305130"/>
+          </a:xfrm>
+        </p:spPr>
+        <p:txBody>
+          <a:bodyPr>
+            <a:normAutofit fontScale="85000" lnSpcReduction="10000"/>
+          </a:bodyPr>
+          <a:lstStyle/>
+          <a:p>
+            <a:r>
+              <a:rPr lang="en-US" dirty="0">
+                <a:latin typeface="Arial" panose="020B0604020202020204" pitchFamily="34" charset="0"/>
+                <a:cs typeface="Arial" panose="020B0604020202020204" pitchFamily="34" charset="0"/>
+              </a:rPr>
+              <a:t>First homework was due yesterday</a:t>
+            </a:r>
+          </a:p>
+          <a:p>
+            <a:pPr lvl="1"/>
+            <a:r>
+              <a:rPr lang="en-US" dirty="0">
+                <a:latin typeface="Arial" panose="020B0604020202020204" pitchFamily="34" charset="0"/>
+                <a:cs typeface="Arial" panose="020B0604020202020204" pitchFamily="34" charset="0"/>
+              </a:rPr>
+              <a:t>Free extension to Sunday evening. </a:t>
+            </a:r>
+          </a:p>
+          <a:p>
+            <a:r>
+              <a:rPr lang="en-US" dirty="0">
+                <a:latin typeface="Arial" panose="020B0604020202020204" pitchFamily="34" charset="0"/>
+                <a:cs typeface="Arial" panose="020B0604020202020204" pitchFamily="34" charset="0"/>
+              </a:rPr>
+              <a:t>Programming assignment is due next Monday (with extension as usual)</a:t>
+            </a:r>
+          </a:p>
+          <a:p>
+            <a:pPr lvl="1"/>
+            <a:r>
+              <a:rPr lang="en-US" dirty="0">
+                <a:latin typeface="Arial" panose="020B0604020202020204" pitchFamily="34" charset="0"/>
+                <a:cs typeface="Arial" panose="020B0604020202020204" pitchFamily="34" charset="0"/>
+              </a:rPr>
+              <a:t>You are able to fully complete it after yesterday’s lecture</a:t>
+            </a:r>
+          </a:p>
+          <a:p>
+            <a:r>
+              <a:rPr lang="en-US" dirty="0">
+                <a:latin typeface="Arial" panose="020B0604020202020204" pitchFamily="34" charset="0"/>
+                <a:cs typeface="Arial" panose="020B0604020202020204" pitchFamily="34" charset="0"/>
+              </a:rPr>
+              <a:t>Remember that attendance is required and NO laptop / phones!</a:t>
+            </a:r>
+          </a:p>
+          <a:p>
+            <a:pPr lvl="1"/>
+            <a:r>
+              <a:rPr lang="en-US" dirty="0">
+                <a:latin typeface="Arial" panose="020B0604020202020204" pitchFamily="34" charset="0"/>
+                <a:cs typeface="Arial" panose="020B0604020202020204" pitchFamily="34" charset="0"/>
+              </a:rPr>
+              <a:t>I will continue taking attendance every day</a:t>
+            </a:r>
+          </a:p>
+          <a:p>
+            <a:r>
+              <a:rPr lang="en-US" dirty="0">
+                <a:latin typeface="Arial" panose="020B0604020202020204" pitchFamily="34" charset="0"/>
+                <a:cs typeface="Arial" panose="020B0604020202020204" pitchFamily="34" charset="0"/>
+              </a:rPr>
+              <a:t>Don’t forget that there is no class next Monday</a:t>
+            </a:r>
+          </a:p>
+          <a:p>
+            <a:r>
+              <a:rPr lang="en-US" dirty="0">
+                <a:latin typeface="Arial" panose="020B0604020202020204" pitchFamily="34" charset="0"/>
+                <a:cs typeface="Arial" panose="020B0604020202020204" pitchFamily="34" charset="0"/>
+              </a:rPr>
+              <a:t>Next week’s schedule (looking ahead):</a:t>
+            </a:r>
+          </a:p>
+          <a:p>
+            <a:pPr lvl="1"/>
+            <a:r>
+              <a:rPr lang="en-US" dirty="0">
+                <a:latin typeface="Arial" panose="020B0604020202020204" pitchFamily="34" charset="0"/>
+                <a:cs typeface="Arial" panose="020B0604020202020204" pitchFamily="34" charset="0"/>
+              </a:rPr>
+              <a:t>Lecture will focus on module 3</a:t>
+            </a:r>
+          </a:p>
+          <a:p>
+            <a:pPr lvl="1"/>
+            <a:r>
+              <a:rPr lang="en-US" dirty="0">
+                <a:latin typeface="Arial" panose="020B0604020202020204" pitchFamily="34" charset="0"/>
+                <a:cs typeface="Arial" panose="020B0604020202020204" pitchFamily="34" charset="0"/>
+              </a:rPr>
+              <a:t>Two </a:t>
+            </a:r>
+            <a:r>
+              <a:rPr lang="en-US" dirty="0" err="1">
+                <a:latin typeface="Arial" panose="020B0604020202020204" pitchFamily="34" charset="0"/>
+                <a:cs typeface="Arial" panose="020B0604020202020204" pitchFamily="34" charset="0"/>
+              </a:rPr>
+              <a:t>homeworks</a:t>
+            </a:r>
+            <a:r>
+              <a:rPr lang="en-US" dirty="0">
+                <a:latin typeface="Arial" panose="020B0604020202020204" pitchFamily="34" charset="0"/>
+                <a:cs typeface="Arial" panose="020B0604020202020204" pitchFamily="34" charset="0"/>
+              </a:rPr>
+              <a:t> (mod 2 programming due Monday, mod 2 problem set due Wednesday)</a:t>
+            </a:r>
+          </a:p>
+          <a:p>
+            <a:pPr lvl="1"/>
+            <a:r>
+              <a:rPr lang="en-US" dirty="0">
+                <a:latin typeface="Arial" panose="020B0604020202020204" pitchFamily="34" charset="0"/>
+                <a:cs typeface="Arial" panose="020B0604020202020204" pitchFamily="34" charset="0"/>
+              </a:rPr>
+              <a:t>First exam (on Friday)</a:t>
+            </a:r>
+          </a:p>
+          <a:p>
+            <a:r>
+              <a:rPr lang="en-US" dirty="0">
+                <a:latin typeface="Arial" panose="020B0604020202020204" pitchFamily="34" charset="0"/>
+                <a:cs typeface="Arial" panose="020B0604020202020204" pitchFamily="34" charset="0"/>
+              </a:rPr>
+              <a:t>No exams this week…</a:t>
+            </a:r>
+          </a:p>
+          <a:p>
+            <a:r>
+              <a:rPr lang="en-US" dirty="0">
+                <a:latin typeface="Arial" panose="020B0604020202020204" pitchFamily="34" charset="0"/>
+                <a:cs typeface="Arial" panose="020B0604020202020204" pitchFamily="34" charset="0"/>
+              </a:rPr>
+              <a:t>Today we will finish module 2</a:t>
+            </a:r>
+          </a:p>
+          <a:p>
+            <a:endParaRPr lang="en-US" dirty="0">
+              <a:latin typeface="Arial" panose="020B0604020202020204" pitchFamily="34" charset="0"/>
+              <a:cs typeface="Arial" panose="020B0604020202020204" pitchFamily="34" charset="0"/>
+            </a:endParaRPr>
+          </a:p>
+        </p:txBody>
+      </p:sp>
+      <p:sp>
+        <p:nvSpPr>
+          <p:cNvPr id="4" name="Slide Number Placeholder 3"/>
+          <p:cNvSpPr>
+            <a:spLocks noGrp="1"/>
+          </p:cNvSpPr>
+          <p:nvPr>
+            <p:ph type="sldNum" sz="quarter" idx="12"/>
+          </p:nvPr>
+        </p:nvSpPr>
+        <p:spPr/>
+        <p:txBody>
+          <a:bodyPr/>
+          <a:lstStyle/>
+          <a:p>
+            <a:fld id="{F26D9103-0C5C-48AC-B68E-3ED2C1647047}" type="slidenum">
+              <a:rPr lang="en-US" smtClean="0"/>
+              <a:pPr/>
+              <a:t>5</a:t>
+            </a:fld>
+            <a:endParaRPr lang="en-US" dirty="0"/>
+          </a:p>
+        </p:txBody>
+      </p:sp>
+    </p:spTree>
+    <p:extLst>
+      <p:ext uri="{BB962C8B-B14F-4D97-AF65-F5344CB8AC3E}">
+        <p14:creationId xmlns:p14="http://schemas.microsoft.com/office/powerpoint/2010/main" val="2955001558"/>
+      </p:ext>
+    </p:extLst>
+  </p:cSld>
+  <p:clrMapOvr>
+    <a:masterClrMapping/>
+  </p:clrMapOvr>
+</p:sld>
+</file>
+
+<file path=ppt/slides/slide6.xml><?xml version="1.0" encoding="utf-8"?>
 <p:sld xmlns:a="http://schemas.openxmlformats.org/drawingml/2006/main" xmlns:r="http://schemas.openxmlformats.org/officeDocument/2006/relationships" xmlns:p="http://schemas.openxmlformats.org/presentationml/2006/main">
   <p:cSld>
     <p:spTree>
@@ -15037,6 +15292,18 @@
 </p:tagLst>
 </file>
 
+<file path=ppt/tags/tag11.xml><?xml version="1.0" encoding="utf-8"?>
+<p:tagLst xmlns:a="http://schemas.openxmlformats.org/drawingml/2006/main" xmlns:r="http://schemas.openxmlformats.org/officeDocument/2006/relationships" xmlns:p="http://schemas.openxmlformats.org/presentationml/2006/main">
+  <p:tag name="_INSTRUCTOR VIEW19C14C36-AC8E-43BC-9DB6-C2AAF774C7DC|PANE__TAG" val="_"/>
+</p:tagLst>
+</file>
+
+<file path=ppt/tags/tag12.xml><?xml version="1.0" encoding="utf-8"?>
+<p:tagLst xmlns:a="http://schemas.openxmlformats.org/drawingml/2006/main" xmlns:r="http://schemas.openxmlformats.org/officeDocument/2006/relationships" xmlns:p="http://schemas.openxmlformats.org/presentationml/2006/main">
+  <p:tag name="_INSTRUCTOR VIEW19C14C36-AC8E-43BC-9DB6-C2AAF774C7DC|PANE__TAG" val="_"/>
+</p:tagLst>
+</file>
+
 <file path=ppt/tags/tag2.xml><?xml version="1.0" encoding="utf-8"?>
 <p:tagLst xmlns:a="http://schemas.openxmlformats.org/drawingml/2006/main" xmlns:r="http://schemas.openxmlformats.org/officeDocument/2006/relationships" xmlns:p="http://schemas.openxmlformats.org/presentationml/2006/main">
   <p:tag name="_INSTRUCTOR VIEW19C14C36-AC8E-43BC-9DB6-C2AAF774C7DC|PANE__TAG" val="_"/>

</xml_diff>

<commit_message>
updaing dates on hw
</commit_message>
<xml_diff>
--- a/slides/00-DailyAnnouncements.pptx
+++ b/slides/00-DailyAnnouncements.pptx
@@ -5,13 +5,14 @@
     <p:sldMasterId id="2147484006" r:id="rId1"/>
   </p:sldMasterIdLst>
   <p:notesMasterIdLst>
-    <p:notesMasterId r:id="rId6"/>
+    <p:notesMasterId r:id="rId7"/>
   </p:notesMasterIdLst>
   <p:sldIdLst>
     <p:sldId id="256" r:id="rId2"/>
     <p:sldId id="505" r:id="rId3"/>
     <p:sldId id="516" r:id="rId4"/>
-    <p:sldId id="515" r:id="rId5"/>
+    <p:sldId id="517" r:id="rId5"/>
+    <p:sldId id="515" r:id="rId6"/>
   </p:sldIdLst>
   <p:sldSz cx="12192000" cy="6858000"/>
   <p:notesSz cx="6858000" cy="9144000"/>
@@ -200,7 +201,7 @@
           <a:p>
             <a:fld id="{C5B45307-6ED4-B142-BD64-10F739779302}" type="datetimeFigureOut">
               <a:rPr lang="en-US" smtClean="0"/>
-              <a:t>9/4/25</a:t>
+              <a:t>9/5/25</a:t>
             </a:fld>
             <a:endParaRPr lang="en-US"/>
           </a:p>
@@ -4833,7 +4834,7 @@
           <a:p>
             <a:fld id="{4313F670-7F9A-774D-B73D-573401E44297}" type="datetime1">
               <a:rPr lang="en-US" smtClean="0"/>
-              <a:t>9/4/25</a:t>
+              <a:t>9/5/25</a:t>
             </a:fld>
             <a:endParaRPr lang="en-US"/>
           </a:p>
@@ -5100,7 +5101,7 @@
           <a:p>
             <a:fld id="{446F9669-A8A7-2D40-9D01-B35FC337AA30}" type="datetime1">
               <a:rPr lang="en-US" smtClean="0"/>
-              <a:t>9/4/25</a:t>
+              <a:t>9/5/25</a:t>
             </a:fld>
             <a:endParaRPr lang="en-US"/>
           </a:p>
@@ -5296,7 +5297,7 @@
           <a:p>
             <a:fld id="{FA76CF18-F41B-6B48-B3E5-599E9795C2C3}" type="datetime1">
               <a:rPr lang="en-US" smtClean="0"/>
-              <a:t>9/4/25</a:t>
+              <a:t>9/5/25</a:t>
             </a:fld>
             <a:endParaRPr lang="en-US"/>
           </a:p>
@@ -5559,7 +5560,7 @@
           <a:p>
             <a:fld id="{B9654854-6457-164F-A077-6B3035079B82}" type="datetime1">
               <a:rPr lang="en-US" smtClean="0"/>
-              <a:t>9/4/25</a:t>
+              <a:t>9/5/25</a:t>
             </a:fld>
             <a:endParaRPr lang="en-US"/>
           </a:p>
@@ -5993,7 +5994,7 @@
           <a:p>
             <a:fld id="{CE3DBFD7-E611-8C40-AC73-0C29FF63F0CD}" type="datetime1">
               <a:rPr lang="en-US" smtClean="0"/>
-              <a:t>9/4/25</a:t>
+              <a:t>9/5/25</a:t>
             </a:fld>
             <a:endParaRPr lang="en-US"/>
           </a:p>
@@ -6539,7 +6540,7 @@
           <a:p>
             <a:fld id="{C8B63B06-0493-2840-9F37-30C9412BBF17}" type="datetime1">
               <a:rPr lang="en-US" smtClean="0"/>
-              <a:t>9/4/25</a:t>
+              <a:t>9/5/25</a:t>
             </a:fld>
             <a:endParaRPr lang="en-US"/>
           </a:p>
@@ -7259,7 +7260,7 @@
           <a:p>
             <a:fld id="{72B5C0FA-8C46-E84D-B6D7-B673F2CA0A0E}" type="datetime1">
               <a:rPr lang="en-US" smtClean="0"/>
-              <a:t>9/4/25</a:t>
+              <a:t>9/5/25</a:t>
             </a:fld>
             <a:endParaRPr lang="en-US"/>
           </a:p>
@@ -7429,7 +7430,7 @@
           <a:p>
             <a:fld id="{60B9CDE1-97B4-BF46-B69C-B86855B18820}" type="datetime1">
               <a:rPr lang="en-US" smtClean="0"/>
-              <a:t>9/4/25</a:t>
+              <a:t>9/5/25</a:t>
             </a:fld>
             <a:endParaRPr lang="en-US"/>
           </a:p>
@@ -7609,7 +7610,7 @@
           <a:p>
             <a:fld id="{BE51D3A4-F9E5-FD49-AA87-B395F50451DC}" type="datetime1">
               <a:rPr lang="en-US" smtClean="0"/>
-              <a:t>9/4/25</a:t>
+              <a:t>9/5/25</a:t>
             </a:fld>
             <a:endParaRPr lang="en-US"/>
           </a:p>
@@ -7779,7 +7780,7 @@
           <a:p>
             <a:fld id="{880DFB37-B0AE-9449-85EC-14F9C83B6084}" type="datetime1">
               <a:rPr lang="en-US" smtClean="0"/>
-              <a:t>9/4/25</a:t>
+              <a:t>9/5/25</a:t>
             </a:fld>
             <a:endParaRPr lang="en-US"/>
           </a:p>
@@ -8029,7 +8030,7 @@
           <a:p>
             <a:fld id="{C939124A-616E-6944-A21A-1839F5DBE7BB}" type="datetime1">
               <a:rPr lang="en-US" smtClean="0"/>
-              <a:t>9/4/25</a:t>
+              <a:t>9/5/25</a:t>
             </a:fld>
             <a:endParaRPr lang="en-US"/>
           </a:p>
@@ -8261,7 +8262,7 @@
           <a:p>
             <a:fld id="{C6E9A026-D48C-FD43-8676-CD625DD5D84B}" type="datetime1">
               <a:rPr lang="en-US" smtClean="0"/>
-              <a:t>9/4/25</a:t>
+              <a:t>9/5/25</a:t>
             </a:fld>
             <a:endParaRPr lang="en-US"/>
           </a:p>
@@ -8647,7 +8648,7 @@
           <a:p>
             <a:fld id="{EA35111E-23A3-1440-99A3-C4C665908E3D}" type="datetime1">
               <a:rPr lang="en-US" smtClean="0"/>
-              <a:t>9/4/25</a:t>
+              <a:t>9/5/25</a:t>
             </a:fld>
             <a:endParaRPr lang="en-US"/>
           </a:p>
@@ -8770,7 +8771,7 @@
           <a:p>
             <a:fld id="{249983B9-88EF-D74B-BA6D-6A3BF17C2B38}" type="datetime1">
               <a:rPr lang="en-US" smtClean="0"/>
-              <a:t>9/4/25</a:t>
+              <a:t>9/5/25</a:t>
             </a:fld>
             <a:endParaRPr lang="en-US"/>
           </a:p>
@@ -8865,7 +8866,7 @@
           <a:p>
             <a:fld id="{E2A00AEF-B4EC-084A-8DB8-A225C7981CBB}" type="datetime1">
               <a:rPr lang="en-US" smtClean="0"/>
-              <a:t>9/4/25</a:t>
+              <a:t>9/5/25</a:t>
             </a:fld>
             <a:endParaRPr lang="en-US"/>
           </a:p>
@@ -9114,7 +9115,7 @@
           <a:p>
             <a:fld id="{97860299-21CD-A94A-A7B0-44E787F8D42C}" type="datetime1">
               <a:rPr lang="en-US" smtClean="0"/>
-              <a:t>9/4/25</a:t>
+              <a:t>9/5/25</a:t>
             </a:fld>
             <a:endParaRPr lang="en-US"/>
           </a:p>
@@ -9399,7 +9400,7 @@
           <a:p>
             <a:fld id="{3DFD19CF-4E62-D246-BA61-7B528271315F}" type="datetime1">
               <a:rPr lang="en-US" smtClean="0"/>
-              <a:t>9/4/25</a:t>
+              <a:t>9/5/25</a:t>
             </a:fld>
             <a:endParaRPr lang="en-US"/>
           </a:p>
@@ -12466,7 +12467,7 @@
           <a:p>
             <a:fld id="{92FF8978-FE14-CC4A-93A6-934EB06543C0}" type="datetime1">
               <a:rPr lang="en-US" smtClean="0"/>
-              <a:t>9/4/25</a:t>
+              <a:t>9/5/25</a:t>
             </a:fld>
             <a:endParaRPr lang="en-US"/>
           </a:p>
@@ -13357,6 +13358,205 @@
   <p:cSld>
     <p:spTree>
       <p:nvGrpSpPr>
+        <p:cNvPr id="1" name="">
+          <a:extLst>
+            <a:ext uri="{FF2B5EF4-FFF2-40B4-BE49-F238E27FC236}">
+              <a16:creationId xmlns:a16="http://schemas.microsoft.com/office/drawing/2014/main" id="{1DD20B1A-BFF3-A32F-3B9C-B80933BA47E6}"/>
+            </a:ext>
+          </a:extLst>
+        </p:cNvPr>
+        <p:cNvGrpSpPr/>
+        <p:nvPr/>
+      </p:nvGrpSpPr>
+      <p:grpSpPr>
+        <a:xfrm>
+          <a:off x="0" y="0"/>
+          <a:ext cx="0" cy="0"/>
+          <a:chOff x="0" y="0"/>
+          <a:chExt cx="0" cy="0"/>
+        </a:xfrm>
+      </p:grpSpPr>
+      <p:sp>
+        <p:nvSpPr>
+          <p:cNvPr id="6146" name="Rectangle 2">
+            <a:extLst>
+              <a:ext uri="{FF2B5EF4-FFF2-40B4-BE49-F238E27FC236}">
+                <a16:creationId xmlns:a16="http://schemas.microsoft.com/office/drawing/2014/main" id="{25A34AA6-4298-337A-326D-724E5336D348}"/>
+              </a:ext>
+            </a:extLst>
+          </p:cNvPr>
+          <p:cNvSpPr>
+            <a:spLocks noGrp="1" noChangeArrowheads="1"/>
+          </p:cNvSpPr>
+          <p:nvPr>
+            <p:ph type="title"/>
+            <p:custDataLst>
+              <p:tags r:id="rId1"/>
+            </p:custDataLst>
+          </p:nvPr>
+        </p:nvSpPr>
+        <p:spPr>
+          <a:xfrm>
+            <a:off x="1141413" y="284084"/>
+            <a:ext cx="9905998" cy="620791"/>
+          </a:xfrm>
+        </p:spPr>
+        <p:txBody>
+          <a:bodyPr/>
+          <a:lstStyle/>
+          <a:p>
+            <a:pPr algn="ctr"/>
+            <a:r>
+              <a:rPr lang="en-US" dirty="0"/>
+              <a:t>Lecture 5: Tuesday, Sep 9</a:t>
+            </a:r>
+          </a:p>
+        </p:txBody>
+      </p:sp>
+      <p:sp>
+        <p:nvSpPr>
+          <p:cNvPr id="6147" name="Rectangle 3">
+            <a:extLst>
+              <a:ext uri="{FF2B5EF4-FFF2-40B4-BE49-F238E27FC236}">
+                <a16:creationId xmlns:a16="http://schemas.microsoft.com/office/drawing/2014/main" id="{96A7F3C2-3852-79DE-DAF1-6BC608BE8C59}"/>
+              </a:ext>
+            </a:extLst>
+          </p:cNvPr>
+          <p:cNvSpPr>
+            <a:spLocks noGrp="1" noChangeArrowheads="1"/>
+          </p:cNvSpPr>
+          <p:nvPr>
+            <p:ph idx="1"/>
+            <p:custDataLst>
+              <p:tags r:id="rId2"/>
+            </p:custDataLst>
+          </p:nvPr>
+        </p:nvSpPr>
+        <p:spPr>
+          <a:xfrm>
+            <a:off x="1294151" y="1098548"/>
+            <a:ext cx="9905998" cy="5387311"/>
+          </a:xfrm>
+        </p:spPr>
+        <p:txBody>
+          <a:bodyPr>
+            <a:normAutofit fontScale="92500" lnSpcReduction="10000"/>
+          </a:bodyPr>
+          <a:lstStyle/>
+          <a:p>
+            <a:r>
+              <a:rPr lang="en-US" dirty="0">
+                <a:latin typeface="Arial" panose="020B0604020202020204" pitchFamily="34" charset="0"/>
+                <a:cs typeface="Arial" panose="020B0604020202020204" pitchFamily="34" charset="0"/>
+              </a:rPr>
+              <a:t>First homework is due NEXT Thursday evening at midnight</a:t>
+            </a:r>
+          </a:p>
+          <a:p>
+            <a:pPr lvl="1"/>
+            <a:r>
+              <a:rPr lang="en-US" dirty="0">
+                <a:latin typeface="Arial" panose="020B0604020202020204" pitchFamily="34" charset="0"/>
+                <a:cs typeface="Arial" panose="020B0604020202020204" pitchFamily="34" charset="0"/>
+              </a:rPr>
+              <a:t>You have plenty of time, but you might want to glance at it</a:t>
+            </a:r>
+          </a:p>
+          <a:p>
+            <a:r>
+              <a:rPr lang="en-US" dirty="0">
+                <a:latin typeface="Arial" panose="020B0604020202020204" pitchFamily="34" charset="0"/>
+                <a:cs typeface="Arial" panose="020B0604020202020204" pitchFamily="34" charset="0"/>
+              </a:rPr>
+              <a:t>Please remember that I am asking for NO laptop / phones!</a:t>
+            </a:r>
+          </a:p>
+          <a:p>
+            <a:pPr lvl="1"/>
+            <a:r>
+              <a:rPr lang="en-US" dirty="0">
+                <a:latin typeface="Arial" panose="020B0604020202020204" pitchFamily="34" charset="0"/>
+                <a:cs typeface="Arial" panose="020B0604020202020204" pitchFamily="34" charset="0"/>
+              </a:rPr>
+              <a:t>This makes the learning environment better for everybody. I appreciate it!</a:t>
+            </a:r>
+          </a:p>
+          <a:p>
+            <a:r>
+              <a:rPr lang="en-US" dirty="0">
+                <a:latin typeface="Arial" panose="020B0604020202020204" pitchFamily="34" charset="0"/>
+                <a:cs typeface="Arial" panose="020B0604020202020204" pitchFamily="34" charset="0"/>
+              </a:rPr>
+              <a:t>Discussion Section: Chase will be holding every week</a:t>
+            </a:r>
+          </a:p>
+          <a:p>
+            <a:pPr lvl="1"/>
+            <a:r>
+              <a:rPr lang="en-US" dirty="0">
+                <a:latin typeface="Arial" panose="020B0604020202020204" pitchFamily="34" charset="0"/>
+                <a:cs typeface="Arial" panose="020B0604020202020204" pitchFamily="34" charset="0"/>
+              </a:rPr>
+              <a:t>Wednesday 4-5pm in Rice 110</a:t>
+            </a:r>
+          </a:p>
+          <a:p>
+            <a:r>
+              <a:rPr lang="en-US" dirty="0">
+                <a:latin typeface="Arial" panose="020B0604020202020204" pitchFamily="34" charset="0"/>
+                <a:cs typeface="Arial" panose="020B0604020202020204" pitchFamily="34" charset="0"/>
+              </a:rPr>
+              <a:t>Lecture recordings are on Panopto</a:t>
+            </a:r>
+          </a:p>
+          <a:p>
+            <a:pPr lvl="1"/>
+            <a:r>
+              <a:rPr lang="en-US" dirty="0">
+                <a:latin typeface="Arial" panose="020B0604020202020204" pitchFamily="34" charset="0"/>
+                <a:cs typeface="Arial" panose="020B0604020202020204" pitchFamily="34" charset="0"/>
+              </a:rPr>
+              <a:t>There are folders for Floryan and Pettit (little hard to find but they are there)</a:t>
+            </a:r>
+          </a:p>
+          <a:p>
+            <a:r>
+              <a:rPr lang="en-US" dirty="0">
+                <a:latin typeface="Arial" panose="020B0604020202020204" pitchFamily="34" charset="0"/>
+                <a:cs typeface="Arial" panose="020B0604020202020204" pitchFamily="34" charset="0"/>
+              </a:rPr>
+              <a:t>TA office hours start NEXT week. Schedule is finalized (or close to) on website. Check it out!</a:t>
+            </a:r>
+          </a:p>
+          <a:p>
+            <a:r>
+              <a:rPr lang="en-US" dirty="0">
+                <a:latin typeface="Arial" panose="020B0604020202020204" pitchFamily="34" charset="0"/>
+                <a:cs typeface="Arial" panose="020B0604020202020204" pitchFamily="34" charset="0"/>
+              </a:rPr>
+              <a:t>Today we will finish module 1 and probably begin module 2 (where the REAL class begins)</a:t>
+            </a:r>
+          </a:p>
+        </p:txBody>
+      </p:sp>
+    </p:spTree>
+    <p:extLst>
+      <p:ext uri="{BB962C8B-B14F-4D97-AF65-F5344CB8AC3E}">
+        <p14:creationId xmlns:p14="http://schemas.microsoft.com/office/powerpoint/2010/main" val="290670527"/>
+      </p:ext>
+    </p:extLst>
+  </p:cSld>
+  <p:clrMapOvr>
+    <a:masterClrMapping/>
+  </p:clrMapOvr>
+</p:sld>
+</file>
+
+<file path=ppt/slides/slide5.xml><?xml version="1.0" encoding="utf-8"?>
+<p:sld xmlns:a="http://schemas.openxmlformats.org/drawingml/2006/main" xmlns:r="http://schemas.openxmlformats.org/officeDocument/2006/relationships" xmlns:p="http://schemas.openxmlformats.org/presentationml/2006/main">
+  <p:cSld>
+    <p:spTree>
+      <p:nvGrpSpPr>
         <p:cNvPr id="1" name=""/>
         <p:cNvGrpSpPr/>
         <p:nvPr/>
@@ -13415,7 +13615,7 @@
         </p:nvSpPr>
         <p:spPr>
           <a:xfrm>
-            <a:off x="1129082" y="1455136"/>
+            <a:off x="1129082" y="1040465"/>
             <a:ext cx="1995777" cy="733064"/>
           </a:xfrm>
         </p:spPr>
@@ -13425,7 +13625,7 @@
           </a:bodyPr>
           <a:lstStyle/>
           <a:p>
-            <a:pPr marL="0" indent="0">
+            <a:pPr marL="0" indent="0" algn="ctr">
               <a:buNone/>
             </a:pPr>
             <a:r>
@@ -13433,7 +13633,14 @@
                 <a:latin typeface="Arial" panose="020B0604020202020204" pitchFamily="34" charset="0"/>
                 <a:cs typeface="Arial" panose="020B0604020202020204" pitchFamily="34" charset="0"/>
               </a:rPr>
-              <a:t>Attendance</a:t>
+              <a:t>9:30 </a:t>
+            </a:r>
+            <a:r>
+              <a:rPr lang="en-US" b="1" i="1" u="sng" dirty="0" err="1">
+                <a:latin typeface="Arial" panose="020B0604020202020204" pitchFamily="34" charset="0"/>
+                <a:cs typeface="Arial" panose="020B0604020202020204" pitchFamily="34" charset="0"/>
+              </a:rPr>
+              <a:t>Att</a:t>
             </a:r>
             <a:r>
               <a:rPr lang="en-US" dirty="0">
@@ -13686,13 +13893,13 @@
           <p:nvPr>
             <p:extLst>
               <p:ext uri="{D42A27DB-BD31-4B8C-83A1-F6EECF244321}">
-                <p14:modId xmlns:p14="http://schemas.microsoft.com/office/powerpoint/2010/main" val="1612391260"/>
+                <p14:modId xmlns:p14="http://schemas.microsoft.com/office/powerpoint/2010/main" val="2046209007"/>
               </p:ext>
             </p:extLst>
           </p:nvPr>
         </p:nvGraphicFramePr>
         <p:xfrm>
-          <a:off x="3053295" y="1379730"/>
+          <a:off x="3053295" y="965059"/>
           <a:ext cx="3291843" cy="741680"/>
         </p:xfrm>
         <a:graphic>
@@ -13782,7 +13989,7 @@
                       <a:pPr algn="ctr"/>
                       <a:r>
                         <a:rPr lang="en-US" i="0" dirty="0"/>
-                        <a:t>3</a:t>
+                        <a:t>4</a:t>
                       </a:r>
                     </a:p>
                   </a:txBody>
@@ -13796,7 +14003,7 @@
                       <a:pPr algn="ctr"/>
                       <a:r>
                         <a:rPr lang="en-US" i="0" dirty="0"/>
-                        <a:t>3</a:t>
+                        <a:t>4</a:t>
                       </a:r>
                     </a:p>
                   </a:txBody>
@@ -14732,6 +14939,394 @@
           </a:graphicData>
         </a:graphic>
       </p:graphicFrame>
+      <p:sp>
+        <p:nvSpPr>
+          <p:cNvPr id="4" name="Rectangle 3">
+            <a:extLst>
+              <a:ext uri="{FF2B5EF4-FFF2-40B4-BE49-F238E27FC236}">
+                <a16:creationId xmlns:a16="http://schemas.microsoft.com/office/drawing/2014/main" id="{F261EF31-6054-E2A5-1B38-CE7F8FAA8C64}"/>
+              </a:ext>
+            </a:extLst>
+          </p:cNvPr>
+          <p:cNvSpPr txBox="1">
+            <a:spLocks noChangeArrowheads="1"/>
+          </p:cNvSpPr>
+          <p:nvPr>
+            <p:custDataLst>
+              <p:tags r:id="rId5"/>
+            </p:custDataLst>
+          </p:nvPr>
+        </p:nvSpPr>
+        <p:spPr>
+          <a:xfrm>
+            <a:off x="1129082" y="1979295"/>
+            <a:ext cx="1995777" cy="733064"/>
+          </a:xfrm>
+          <a:prstGeom prst="rect">
+            <a:avLst/>
+          </a:prstGeom>
+        </p:spPr>
+        <p:txBody>
+          <a:bodyPr vert="horz" lIns="91440" tIns="45720" rIns="91440" bIns="45720" rtlCol="0">
+            <a:normAutofit/>
+          </a:bodyPr>
+          <a:lstStyle>
+            <a:lvl1pPr marL="228600" indent="-228600" algn="l" defTabSz="914400" rtl="0" eaLnBrk="1" latinLnBrk="0" hangingPunct="1">
+              <a:lnSpc>
+                <a:spcPct val="120000"/>
+              </a:lnSpc>
+              <a:spcBef>
+                <a:spcPts val="1000"/>
+              </a:spcBef>
+              <a:buSzPct val="125000"/>
+              <a:buFont typeface="Arial" panose="020B0604020202020204" pitchFamily="34" charset="0"/>
+              <a:buChar char="•"/>
+              <a:defRPr sz="2400" kern="1200">
+                <a:solidFill>
+                  <a:schemeClr val="tx1"/>
+                </a:solidFill>
+                <a:latin typeface="+mn-lt"/>
+                <a:ea typeface="+mn-ea"/>
+                <a:cs typeface="+mn-cs"/>
+              </a:defRPr>
+            </a:lvl1pPr>
+            <a:lvl2pPr marL="685800" indent="-228600" algn="l" defTabSz="914400" rtl="0" eaLnBrk="1" latinLnBrk="0" hangingPunct="1">
+              <a:lnSpc>
+                <a:spcPct val="120000"/>
+              </a:lnSpc>
+              <a:spcBef>
+                <a:spcPts val="500"/>
+              </a:spcBef>
+              <a:buSzPct val="125000"/>
+              <a:buFont typeface="Arial" panose="020B0604020202020204" pitchFamily="34" charset="0"/>
+              <a:buChar char="•"/>
+              <a:defRPr sz="2000" kern="1200">
+                <a:solidFill>
+                  <a:schemeClr val="tx1"/>
+                </a:solidFill>
+                <a:latin typeface="+mn-lt"/>
+                <a:ea typeface="+mn-ea"/>
+                <a:cs typeface="+mn-cs"/>
+              </a:defRPr>
+            </a:lvl2pPr>
+            <a:lvl3pPr marL="1143000" indent="-228600" algn="l" defTabSz="914400" rtl="0" eaLnBrk="1" latinLnBrk="0" hangingPunct="1">
+              <a:lnSpc>
+                <a:spcPct val="120000"/>
+              </a:lnSpc>
+              <a:spcBef>
+                <a:spcPts val="500"/>
+              </a:spcBef>
+              <a:buSzPct val="125000"/>
+              <a:buFont typeface="Arial" panose="020B0604020202020204" pitchFamily="34" charset="0"/>
+              <a:buChar char="•"/>
+              <a:defRPr sz="1800" kern="1200">
+                <a:solidFill>
+                  <a:schemeClr val="tx1"/>
+                </a:solidFill>
+                <a:latin typeface="+mn-lt"/>
+                <a:ea typeface="+mn-ea"/>
+                <a:cs typeface="+mn-cs"/>
+              </a:defRPr>
+            </a:lvl3pPr>
+            <a:lvl4pPr marL="1600200" indent="-228600" algn="l" defTabSz="914400" rtl="0" eaLnBrk="1" latinLnBrk="0" hangingPunct="1">
+              <a:lnSpc>
+                <a:spcPct val="120000"/>
+              </a:lnSpc>
+              <a:spcBef>
+                <a:spcPts val="500"/>
+              </a:spcBef>
+              <a:buSzPct val="125000"/>
+              <a:buFont typeface="Arial" panose="020B0604020202020204" pitchFamily="34" charset="0"/>
+              <a:buChar char="•"/>
+              <a:defRPr sz="1600" kern="1200">
+                <a:solidFill>
+                  <a:schemeClr val="tx1"/>
+                </a:solidFill>
+                <a:latin typeface="+mn-lt"/>
+                <a:ea typeface="+mn-ea"/>
+                <a:cs typeface="+mn-cs"/>
+              </a:defRPr>
+            </a:lvl4pPr>
+            <a:lvl5pPr marL="2057400" indent="-228600" algn="l" defTabSz="914400" rtl="0" eaLnBrk="1" latinLnBrk="0" hangingPunct="1">
+              <a:lnSpc>
+                <a:spcPct val="120000"/>
+              </a:lnSpc>
+              <a:spcBef>
+                <a:spcPts val="500"/>
+              </a:spcBef>
+              <a:buSzPct val="125000"/>
+              <a:buFont typeface="Arial" panose="020B0604020202020204" pitchFamily="34" charset="0"/>
+              <a:buChar char="•"/>
+              <a:defRPr sz="1600" kern="1200">
+                <a:solidFill>
+                  <a:schemeClr val="tx1"/>
+                </a:solidFill>
+                <a:latin typeface="+mn-lt"/>
+                <a:ea typeface="+mn-ea"/>
+                <a:cs typeface="+mn-cs"/>
+              </a:defRPr>
+            </a:lvl5pPr>
+            <a:lvl6pPr marL="2514600" indent="-228600" algn="l" defTabSz="914400" rtl="0" eaLnBrk="1" latinLnBrk="0" hangingPunct="1">
+              <a:lnSpc>
+                <a:spcPct val="120000"/>
+              </a:lnSpc>
+              <a:spcBef>
+                <a:spcPts val="500"/>
+              </a:spcBef>
+              <a:buSzPct val="125000"/>
+              <a:buFont typeface="Arial" panose="020B0604020202020204" pitchFamily="34" charset="0"/>
+              <a:buChar char="•"/>
+              <a:defRPr sz="1400" kern="1200">
+                <a:solidFill>
+                  <a:schemeClr val="tx1"/>
+                </a:solidFill>
+                <a:latin typeface="+mn-lt"/>
+                <a:ea typeface="+mn-ea"/>
+                <a:cs typeface="+mn-cs"/>
+              </a:defRPr>
+            </a:lvl6pPr>
+            <a:lvl7pPr marL="2971800" indent="-228600" algn="l" defTabSz="914400" rtl="0" eaLnBrk="1" latinLnBrk="0" hangingPunct="1">
+              <a:lnSpc>
+                <a:spcPct val="120000"/>
+              </a:lnSpc>
+              <a:spcBef>
+                <a:spcPts val="500"/>
+              </a:spcBef>
+              <a:buSzPct val="125000"/>
+              <a:buFont typeface="Arial" panose="020B0604020202020204" pitchFamily="34" charset="0"/>
+              <a:buChar char="•"/>
+              <a:defRPr sz="1400" kern="1200">
+                <a:solidFill>
+                  <a:schemeClr val="tx1"/>
+                </a:solidFill>
+                <a:latin typeface="+mn-lt"/>
+                <a:ea typeface="+mn-ea"/>
+                <a:cs typeface="+mn-cs"/>
+              </a:defRPr>
+            </a:lvl7pPr>
+            <a:lvl8pPr marL="3429000" indent="-228600" algn="l" defTabSz="914400" rtl="0" eaLnBrk="1" latinLnBrk="0" hangingPunct="1">
+              <a:lnSpc>
+                <a:spcPct val="120000"/>
+              </a:lnSpc>
+              <a:spcBef>
+                <a:spcPts val="500"/>
+              </a:spcBef>
+              <a:buSzPct val="125000"/>
+              <a:buFont typeface="Arial" panose="020B0604020202020204" pitchFamily="34" charset="0"/>
+              <a:buChar char="•"/>
+              <a:defRPr sz="1400" kern="1200">
+                <a:solidFill>
+                  <a:schemeClr val="tx1"/>
+                </a:solidFill>
+                <a:latin typeface="+mn-lt"/>
+                <a:ea typeface="+mn-ea"/>
+                <a:cs typeface="+mn-cs"/>
+              </a:defRPr>
+            </a:lvl8pPr>
+            <a:lvl9pPr marL="3886200" indent="-228600" algn="l" defTabSz="914400" rtl="0" eaLnBrk="1" latinLnBrk="0" hangingPunct="1">
+              <a:lnSpc>
+                <a:spcPct val="120000"/>
+              </a:lnSpc>
+              <a:spcBef>
+                <a:spcPts val="500"/>
+              </a:spcBef>
+              <a:buSzPct val="125000"/>
+              <a:buFont typeface="Arial" panose="020B0604020202020204" pitchFamily="34" charset="0"/>
+              <a:buChar char="•"/>
+              <a:defRPr sz="1400" kern="1200">
+                <a:solidFill>
+                  <a:schemeClr val="tx1"/>
+                </a:solidFill>
+                <a:latin typeface="+mn-lt"/>
+                <a:ea typeface="+mn-ea"/>
+                <a:cs typeface="+mn-cs"/>
+              </a:defRPr>
+            </a:lvl9pPr>
+          </a:lstStyle>
+          <a:p>
+            <a:pPr marL="0" indent="0" algn="ctr">
+              <a:buFont typeface="Arial" panose="020B0604020202020204" pitchFamily="34" charset="0"/>
+              <a:buNone/>
+            </a:pPr>
+            <a:r>
+              <a:rPr lang="en-US" b="1" i="1" u="sng" dirty="0">
+                <a:latin typeface="Arial" panose="020B0604020202020204" pitchFamily="34" charset="0"/>
+                <a:cs typeface="Arial" panose="020B0604020202020204" pitchFamily="34" charset="0"/>
+              </a:rPr>
+              <a:t>3:30 </a:t>
+            </a:r>
+            <a:r>
+              <a:rPr lang="en-US" b="1" i="1" u="sng" dirty="0" err="1">
+                <a:latin typeface="Arial" panose="020B0604020202020204" pitchFamily="34" charset="0"/>
+                <a:cs typeface="Arial" panose="020B0604020202020204" pitchFamily="34" charset="0"/>
+              </a:rPr>
+              <a:t>Att</a:t>
+            </a:r>
+            <a:r>
+              <a:rPr lang="en-US" dirty="0">
+                <a:latin typeface="Arial" panose="020B0604020202020204" pitchFamily="34" charset="0"/>
+                <a:cs typeface="Arial" panose="020B0604020202020204" pitchFamily="34" charset="0"/>
+              </a:rPr>
+              <a:t>:</a:t>
+            </a:r>
+          </a:p>
+        </p:txBody>
+      </p:sp>
+      <p:graphicFrame>
+        <p:nvGraphicFramePr>
+          <p:cNvPr id="6" name="Table 5">
+            <a:extLst>
+              <a:ext uri="{FF2B5EF4-FFF2-40B4-BE49-F238E27FC236}">
+                <a16:creationId xmlns:a16="http://schemas.microsoft.com/office/drawing/2014/main" id="{60053670-A7F1-B4AB-DDE6-53F76EEC6864}"/>
+              </a:ext>
+            </a:extLst>
+          </p:cNvPr>
+          <p:cNvGraphicFramePr>
+            <a:graphicFrameLocks noGrp="1"/>
+          </p:cNvGraphicFramePr>
+          <p:nvPr>
+            <p:extLst>
+              <p:ext uri="{D42A27DB-BD31-4B8C-83A1-F6EECF244321}">
+                <p14:modId xmlns:p14="http://schemas.microsoft.com/office/powerpoint/2010/main" val="281973204"/>
+              </p:ext>
+            </p:extLst>
+          </p:nvPr>
+        </p:nvGraphicFramePr>
+        <p:xfrm>
+          <a:off x="3053295" y="1903889"/>
+          <a:ext cx="3291843" cy="741680"/>
+        </p:xfrm>
+        <a:graphic>
+          <a:graphicData uri="http://schemas.openxmlformats.org/drawingml/2006/table">
+            <a:tbl>
+              <a:tblPr firstRow="1" bandRow="1">
+                <a:tableStyleId>{5C22544A-7EE6-4342-B048-85BDC9FD1C3A}</a:tableStyleId>
+              </a:tblPr>
+              <a:tblGrid>
+                <a:gridCol w="1574358">
+                  <a:extLst>
+                    <a:ext uri="{9D8B030D-6E8A-4147-A177-3AD203B41FA5}">
+                      <a16:colId xmlns:a16="http://schemas.microsoft.com/office/drawing/2014/main" val="659906099"/>
+                    </a:ext>
+                  </a:extLst>
+                </a:gridCol>
+                <a:gridCol w="787180">
+                  <a:extLst>
+                    <a:ext uri="{9D8B030D-6E8A-4147-A177-3AD203B41FA5}">
+                      <a16:colId xmlns:a16="http://schemas.microsoft.com/office/drawing/2014/main" val="2842208557"/>
+                    </a:ext>
+                  </a:extLst>
+                </a:gridCol>
+                <a:gridCol w="930305">
+                  <a:extLst>
+                    <a:ext uri="{9D8B030D-6E8A-4147-A177-3AD203B41FA5}">
+                      <a16:colId xmlns:a16="http://schemas.microsoft.com/office/drawing/2014/main" val="2881465603"/>
+                    </a:ext>
+                  </a:extLst>
+                </a:gridCol>
+              </a:tblGrid>
+              <a:tr h="370840">
+                <a:tc>
+                  <a:txBody>
+                    <a:bodyPr/>
+                    <a:lstStyle/>
+                    <a:p>
+                      <a:pPr algn="ctr"/>
+                      <a:r>
+                        <a:rPr lang="en-US" b="1" i="0" u="none" dirty="0"/>
+                        <a:t>Above 50 %</a:t>
+                      </a:r>
+                    </a:p>
+                  </a:txBody>
+                  <a:tcPr/>
+                </a:tc>
+                <a:tc>
+                  <a:txBody>
+                    <a:bodyPr/>
+                    <a:lstStyle/>
+                    <a:p>
+                      <a:pPr algn="ctr"/>
+                      <a:r>
+                        <a:rPr lang="en-US" b="1" i="0" u="none" dirty="0"/>
+                        <a:t>Total</a:t>
+                      </a:r>
+                    </a:p>
+                  </a:txBody>
+                  <a:tcPr/>
+                </a:tc>
+                <a:tc>
+                  <a:txBody>
+                    <a:bodyPr/>
+                    <a:lstStyle/>
+                    <a:p>
+                      <a:pPr algn="ctr"/>
+                      <a:r>
+                        <a:rPr lang="en-US" b="1" i="0" u="none" dirty="0"/>
+                        <a:t>%</a:t>
+                      </a:r>
+                    </a:p>
+                  </a:txBody>
+                  <a:tcPr/>
+                </a:tc>
+                <a:extLst>
+                  <a:ext uri="{0D108BD9-81ED-4DB2-BD59-A6C34878D82A}">
+                    <a16:rowId xmlns:a16="http://schemas.microsoft.com/office/drawing/2014/main" val="386381463"/>
+                  </a:ext>
+                </a:extLst>
+              </a:tr>
+              <a:tr h="370840">
+                <a:tc>
+                  <a:txBody>
+                    <a:bodyPr/>
+                    <a:lstStyle/>
+                    <a:p>
+                      <a:pPr algn="ctr"/>
+                      <a:r>
+                        <a:rPr lang="en-US" i="0" dirty="0"/>
+                        <a:t>4</a:t>
+                      </a:r>
+                    </a:p>
+                  </a:txBody>
+                  <a:tcPr/>
+                </a:tc>
+                <a:tc>
+                  <a:txBody>
+                    <a:bodyPr/>
+                    <a:lstStyle/>
+                    <a:p>
+                      <a:pPr algn="ctr"/>
+                      <a:r>
+                        <a:rPr lang="en-US" i="0" dirty="0"/>
+                        <a:t>4</a:t>
+                      </a:r>
+                    </a:p>
+                  </a:txBody>
+                  <a:tcPr/>
+                </a:tc>
+                <a:tc>
+                  <a:txBody>
+                    <a:bodyPr/>
+                    <a:lstStyle/>
+                    <a:p>
+                      <a:pPr algn="ctr"/>
+                      <a:r>
+                        <a:rPr lang="en-US" b="1" i="0" dirty="0"/>
+                        <a:t>100%</a:t>
+                      </a:r>
+                    </a:p>
+                  </a:txBody>
+                  <a:tcPr/>
+                </a:tc>
+                <a:extLst>
+                  <a:ext uri="{0D108BD9-81ED-4DB2-BD59-A6C34878D82A}">
+                    <a16:rowId xmlns:a16="http://schemas.microsoft.com/office/drawing/2014/main" val="3437585930"/>
+                  </a:ext>
+                </a:extLst>
+              </a:tr>
+            </a:tbl>
+          </a:graphicData>
+        </a:graphic>
+      </p:graphicFrame>
     </p:spTree>
     <p:extLst>
       <p:ext uri="{BB962C8B-B14F-4D97-AF65-F5344CB8AC3E}">
@@ -14746,6 +15341,18 @@
 </file>
 
 <file path=ppt/tags/tag1.xml><?xml version="1.0" encoding="utf-8"?>
+<p:tagLst xmlns:a="http://schemas.openxmlformats.org/drawingml/2006/main" xmlns:r="http://schemas.openxmlformats.org/officeDocument/2006/relationships" xmlns:p="http://schemas.openxmlformats.org/presentationml/2006/main">
+  <p:tag name="_INSTRUCTOR VIEW19C14C36-AC8E-43BC-9DB6-C2AAF774C7DC|PANE__TAG" val="_"/>
+</p:tagLst>
+</file>
+
+<file path=ppt/tags/tag10.xml><?xml version="1.0" encoding="utf-8"?>
+<p:tagLst xmlns:a="http://schemas.openxmlformats.org/drawingml/2006/main" xmlns:r="http://schemas.openxmlformats.org/officeDocument/2006/relationships" xmlns:p="http://schemas.openxmlformats.org/presentationml/2006/main">
+  <p:tag name="_INSTRUCTOR VIEW19C14C36-AC8E-43BC-9DB6-C2AAF774C7DC|PANE__TAG" val="_"/>
+</p:tagLst>
+</file>
+
+<file path=ppt/tags/tag11.xml><?xml version="1.0" encoding="utf-8"?>
 <p:tagLst xmlns:a="http://schemas.openxmlformats.org/drawingml/2006/main" xmlns:r="http://schemas.openxmlformats.org/officeDocument/2006/relationships" xmlns:p="http://schemas.openxmlformats.org/presentationml/2006/main">
   <p:tag name="_INSTRUCTOR VIEW19C14C36-AC8E-43BC-9DB6-C2AAF774C7DC|PANE__TAG" val="_"/>
 </p:tagLst>
@@ -14788,6 +15395,12 @@
 </file>
 
 <file path=ppt/tags/tag8.xml><?xml version="1.0" encoding="utf-8"?>
+<p:tagLst xmlns:a="http://schemas.openxmlformats.org/drawingml/2006/main" xmlns:r="http://schemas.openxmlformats.org/officeDocument/2006/relationships" xmlns:p="http://schemas.openxmlformats.org/presentationml/2006/main">
+  <p:tag name="_INSTRUCTOR VIEW19C14C36-AC8E-43BC-9DB6-C2AAF774C7DC|PANE__TAG" val="_"/>
+</p:tagLst>
+</file>
+
+<file path=ppt/tags/tag9.xml><?xml version="1.0" encoding="utf-8"?>
 <p:tagLst xmlns:a="http://schemas.openxmlformats.org/drawingml/2006/main" xmlns:r="http://schemas.openxmlformats.org/officeDocument/2006/relationships" xmlns:p="http://schemas.openxmlformats.org/presentationml/2006/main">
   <p:tag name="_INSTRUCTOR VIEW19C14C36-AC8E-43BC-9DB6-C2AAF774C7DC|PANE__TAG" val="_"/>
 </p:tagLst>

</xml_diff>

<commit_message>
accouncements and slide fixes
</commit_message>
<xml_diff>
--- a/slides/00-DailyAnnouncements.pptx
+++ b/slides/00-DailyAnnouncements.pptx
@@ -5,7 +5,7 @@
     <p:sldMasterId id="2147484006" r:id="rId1"/>
   </p:sldMasterIdLst>
   <p:notesMasterIdLst>
-    <p:notesMasterId r:id="rId14"/>
+    <p:notesMasterId r:id="rId15"/>
   </p:notesMasterIdLst>
   <p:sldIdLst>
     <p:sldId id="256" r:id="rId2"/>
@@ -19,7 +19,8 @@
     <p:sldId id="522" r:id="rId10"/>
     <p:sldId id="523" r:id="rId11"/>
     <p:sldId id="524" r:id="rId12"/>
-    <p:sldId id="515" r:id="rId13"/>
+    <p:sldId id="525" r:id="rId13"/>
+    <p:sldId id="515" r:id="rId14"/>
   </p:sldIdLst>
   <p:sldSz cx="12192000" cy="6858000"/>
   <p:notesSz cx="6858000" cy="9144000"/>
@@ -208,7 +209,7 @@
           <a:p>
             <a:fld id="{C5B45307-6ED4-B142-BD64-10F739779302}" type="datetimeFigureOut">
               <a:rPr lang="en-US" smtClean="0"/>
-              <a:t>10/7/25</a:t>
+              <a:t>10/16/25</a:t>
             </a:fld>
             <a:endParaRPr lang="en-US"/>
           </a:p>
@@ -4841,7 +4842,7 @@
           <a:p>
             <a:fld id="{4313F670-7F9A-774D-B73D-573401E44297}" type="datetime1">
               <a:rPr lang="en-US" smtClean="0"/>
-              <a:t>10/7/25</a:t>
+              <a:t>10/16/25</a:t>
             </a:fld>
             <a:endParaRPr lang="en-US"/>
           </a:p>
@@ -5108,7 +5109,7 @@
           <a:p>
             <a:fld id="{446F9669-A8A7-2D40-9D01-B35FC337AA30}" type="datetime1">
               <a:rPr lang="en-US" smtClean="0"/>
-              <a:t>10/7/25</a:t>
+              <a:t>10/16/25</a:t>
             </a:fld>
             <a:endParaRPr lang="en-US"/>
           </a:p>
@@ -5304,7 +5305,7 @@
           <a:p>
             <a:fld id="{FA76CF18-F41B-6B48-B3E5-599E9795C2C3}" type="datetime1">
               <a:rPr lang="en-US" smtClean="0"/>
-              <a:t>10/7/25</a:t>
+              <a:t>10/16/25</a:t>
             </a:fld>
             <a:endParaRPr lang="en-US"/>
           </a:p>
@@ -5567,7 +5568,7 @@
           <a:p>
             <a:fld id="{B9654854-6457-164F-A077-6B3035079B82}" type="datetime1">
               <a:rPr lang="en-US" smtClean="0"/>
-              <a:t>10/7/25</a:t>
+              <a:t>10/16/25</a:t>
             </a:fld>
             <a:endParaRPr lang="en-US"/>
           </a:p>
@@ -6001,7 +6002,7 @@
           <a:p>
             <a:fld id="{CE3DBFD7-E611-8C40-AC73-0C29FF63F0CD}" type="datetime1">
               <a:rPr lang="en-US" smtClean="0"/>
-              <a:t>10/7/25</a:t>
+              <a:t>10/16/25</a:t>
             </a:fld>
             <a:endParaRPr lang="en-US"/>
           </a:p>
@@ -6547,7 +6548,7 @@
           <a:p>
             <a:fld id="{C8B63B06-0493-2840-9F37-30C9412BBF17}" type="datetime1">
               <a:rPr lang="en-US" smtClean="0"/>
-              <a:t>10/7/25</a:t>
+              <a:t>10/16/25</a:t>
             </a:fld>
             <a:endParaRPr lang="en-US"/>
           </a:p>
@@ -7267,7 +7268,7 @@
           <a:p>
             <a:fld id="{72B5C0FA-8C46-E84D-B6D7-B673F2CA0A0E}" type="datetime1">
               <a:rPr lang="en-US" smtClean="0"/>
-              <a:t>10/7/25</a:t>
+              <a:t>10/16/25</a:t>
             </a:fld>
             <a:endParaRPr lang="en-US"/>
           </a:p>
@@ -7437,7 +7438,7 @@
           <a:p>
             <a:fld id="{60B9CDE1-97B4-BF46-B69C-B86855B18820}" type="datetime1">
               <a:rPr lang="en-US" smtClean="0"/>
-              <a:t>10/7/25</a:t>
+              <a:t>10/16/25</a:t>
             </a:fld>
             <a:endParaRPr lang="en-US"/>
           </a:p>
@@ -7617,7 +7618,7 @@
           <a:p>
             <a:fld id="{BE51D3A4-F9E5-FD49-AA87-B395F50451DC}" type="datetime1">
               <a:rPr lang="en-US" smtClean="0"/>
-              <a:t>10/7/25</a:t>
+              <a:t>10/16/25</a:t>
             </a:fld>
             <a:endParaRPr lang="en-US"/>
           </a:p>
@@ -7787,7 +7788,7 @@
           <a:p>
             <a:fld id="{880DFB37-B0AE-9449-85EC-14F9C83B6084}" type="datetime1">
               <a:rPr lang="en-US" smtClean="0"/>
-              <a:t>10/7/25</a:t>
+              <a:t>10/16/25</a:t>
             </a:fld>
             <a:endParaRPr lang="en-US"/>
           </a:p>
@@ -8037,7 +8038,7 @@
           <a:p>
             <a:fld id="{C939124A-616E-6944-A21A-1839F5DBE7BB}" type="datetime1">
               <a:rPr lang="en-US" smtClean="0"/>
-              <a:t>10/7/25</a:t>
+              <a:t>10/16/25</a:t>
             </a:fld>
             <a:endParaRPr lang="en-US"/>
           </a:p>
@@ -8269,7 +8270,7 @@
           <a:p>
             <a:fld id="{C6E9A026-D48C-FD43-8676-CD625DD5D84B}" type="datetime1">
               <a:rPr lang="en-US" smtClean="0"/>
-              <a:t>10/7/25</a:t>
+              <a:t>10/16/25</a:t>
             </a:fld>
             <a:endParaRPr lang="en-US"/>
           </a:p>
@@ -8655,7 +8656,7 @@
           <a:p>
             <a:fld id="{EA35111E-23A3-1440-99A3-C4C665908E3D}" type="datetime1">
               <a:rPr lang="en-US" smtClean="0"/>
-              <a:t>10/7/25</a:t>
+              <a:t>10/16/25</a:t>
             </a:fld>
             <a:endParaRPr lang="en-US"/>
           </a:p>
@@ -8778,7 +8779,7 @@
           <a:p>
             <a:fld id="{249983B9-88EF-D74B-BA6D-6A3BF17C2B38}" type="datetime1">
               <a:rPr lang="en-US" smtClean="0"/>
-              <a:t>10/7/25</a:t>
+              <a:t>10/16/25</a:t>
             </a:fld>
             <a:endParaRPr lang="en-US"/>
           </a:p>
@@ -8873,7 +8874,7 @@
           <a:p>
             <a:fld id="{E2A00AEF-B4EC-084A-8DB8-A225C7981CBB}" type="datetime1">
               <a:rPr lang="en-US" smtClean="0"/>
-              <a:t>10/7/25</a:t>
+              <a:t>10/16/25</a:t>
             </a:fld>
             <a:endParaRPr lang="en-US"/>
           </a:p>
@@ -9122,7 +9123,7 @@
           <a:p>
             <a:fld id="{97860299-21CD-A94A-A7B0-44E787F8D42C}" type="datetime1">
               <a:rPr lang="en-US" smtClean="0"/>
-              <a:t>10/7/25</a:t>
+              <a:t>10/16/25</a:t>
             </a:fld>
             <a:endParaRPr lang="en-US"/>
           </a:p>
@@ -9407,7 +9408,7 @@
           <a:p>
             <a:fld id="{3DFD19CF-4E62-D246-BA61-7B528271315F}" type="datetime1">
               <a:rPr lang="en-US" smtClean="0"/>
-              <a:t>10/7/25</a:t>
+              <a:t>10/16/25</a:t>
             </a:fld>
             <a:endParaRPr lang="en-US"/>
           </a:p>
@@ -12474,7 +12475,7 @@
           <a:p>
             <a:fld id="{92FF8978-FE14-CC4A-93A6-934EB06543C0}" type="datetime1">
               <a:rPr lang="en-US" smtClean="0"/>
-              <a:t>10/7/25</a:t>
+              <a:t>10/16/25</a:t>
             </a:fld>
             <a:endParaRPr lang="en-US"/>
           </a:p>
@@ -13498,6 +13499,256 @@
   <p:cSld>
     <p:spTree>
       <p:nvGrpSpPr>
+        <p:cNvPr id="1" name="">
+          <a:extLst>
+            <a:ext uri="{FF2B5EF4-FFF2-40B4-BE49-F238E27FC236}">
+              <a16:creationId xmlns:a16="http://schemas.microsoft.com/office/drawing/2014/main" id="{AECF61F1-ED65-C1C6-12A3-A7CF1C4953A9}"/>
+            </a:ext>
+          </a:extLst>
+        </p:cNvPr>
+        <p:cNvGrpSpPr/>
+        <p:nvPr/>
+      </p:nvGrpSpPr>
+      <p:grpSpPr>
+        <a:xfrm>
+          <a:off x="0" y="0"/>
+          <a:ext cx="0" cy="0"/>
+          <a:chOff x="0" y="0"/>
+          <a:chExt cx="0" cy="0"/>
+        </a:xfrm>
+      </p:grpSpPr>
+      <p:sp>
+        <p:nvSpPr>
+          <p:cNvPr id="6146" name="Rectangle 2">
+            <a:extLst>
+              <a:ext uri="{FF2B5EF4-FFF2-40B4-BE49-F238E27FC236}">
+                <a16:creationId xmlns:a16="http://schemas.microsoft.com/office/drawing/2014/main" id="{02F0AA3A-89C2-E6C4-B0BF-4188D0DA06C9}"/>
+              </a:ext>
+            </a:extLst>
+          </p:cNvPr>
+          <p:cNvSpPr>
+            <a:spLocks noGrp="1" noChangeArrowheads="1"/>
+          </p:cNvSpPr>
+          <p:nvPr>
+            <p:ph type="title"/>
+            <p:custDataLst>
+              <p:tags r:id="rId1"/>
+            </p:custDataLst>
+          </p:nvPr>
+        </p:nvSpPr>
+        <p:spPr>
+          <a:xfrm>
+            <a:off x="1141413" y="284084"/>
+            <a:ext cx="9905998" cy="620791"/>
+          </a:xfrm>
+        </p:spPr>
+        <p:txBody>
+          <a:bodyPr/>
+          <a:lstStyle/>
+          <a:p>
+            <a:pPr algn="ctr"/>
+            <a:r>
+              <a:rPr lang="en-US" dirty="0"/>
+              <a:t>Lecture 13: </a:t>
+            </a:r>
+            <a:r>
+              <a:rPr lang="en-US" dirty="0" err="1"/>
+              <a:t>THursday</a:t>
+            </a:r>
+            <a:r>
+              <a:rPr lang="en-US" dirty="0"/>
+              <a:t>, Oct 16</a:t>
+            </a:r>
+          </a:p>
+        </p:txBody>
+      </p:sp>
+      <p:sp>
+        <p:nvSpPr>
+          <p:cNvPr id="6147" name="Rectangle 3">
+            <a:extLst>
+              <a:ext uri="{FF2B5EF4-FFF2-40B4-BE49-F238E27FC236}">
+                <a16:creationId xmlns:a16="http://schemas.microsoft.com/office/drawing/2014/main" id="{7D4D5F4B-0536-401B-BC7E-2DD7E5A2FC81}"/>
+              </a:ext>
+            </a:extLst>
+          </p:cNvPr>
+          <p:cNvSpPr>
+            <a:spLocks noGrp="1" noChangeArrowheads="1"/>
+          </p:cNvSpPr>
+          <p:nvPr>
+            <p:ph idx="1"/>
+            <p:custDataLst>
+              <p:tags r:id="rId2"/>
+            </p:custDataLst>
+          </p:nvPr>
+        </p:nvSpPr>
+        <p:spPr>
+          <a:xfrm>
+            <a:off x="1294151" y="1098548"/>
+            <a:ext cx="9905998" cy="5387311"/>
+          </a:xfrm>
+        </p:spPr>
+        <p:txBody>
+          <a:bodyPr>
+            <a:normAutofit fontScale="92500" lnSpcReduction="20000"/>
+          </a:bodyPr>
+          <a:lstStyle/>
+          <a:p>
+            <a:r>
+              <a:rPr lang="en-US" dirty="0">
+                <a:latin typeface="Arial" panose="020B0604020202020204" pitchFamily="34" charset="0"/>
+                <a:cs typeface="Arial" panose="020B0604020202020204" pitchFamily="34" charset="0"/>
+              </a:rPr>
+              <a:t>Second homework has been returned (if on time)</a:t>
+            </a:r>
+          </a:p>
+          <a:p>
+            <a:pPr lvl="1"/>
+            <a:r>
+              <a:rPr lang="en-US" dirty="0">
+                <a:latin typeface="Arial" panose="020B0604020202020204" pitchFamily="34" charset="0"/>
+                <a:cs typeface="Arial" panose="020B0604020202020204" pitchFamily="34" charset="0"/>
+              </a:rPr>
+              <a:t>If late, we are working through it now.</a:t>
+            </a:r>
+          </a:p>
+          <a:p>
+            <a:r>
+              <a:rPr lang="en-US" dirty="0">
+                <a:latin typeface="Arial" panose="020B0604020202020204" pitchFamily="34" charset="0"/>
+                <a:cs typeface="Arial" panose="020B0604020202020204" pitchFamily="34" charset="0"/>
+              </a:rPr>
+              <a:t>You took quiz 2 – It will be graded tonight</a:t>
+            </a:r>
+          </a:p>
+          <a:p>
+            <a:r>
+              <a:rPr lang="en-US" dirty="0">
+                <a:latin typeface="Arial" panose="020B0604020202020204" pitchFamily="34" charset="0"/>
+                <a:cs typeface="Arial" panose="020B0604020202020204" pitchFamily="34" charset="0"/>
+              </a:rPr>
+              <a:t>Programming assignment is due tonight</a:t>
+            </a:r>
+          </a:p>
+          <a:p>
+            <a:pPr lvl="1"/>
+            <a:r>
+              <a:rPr lang="en-US" dirty="0">
+                <a:latin typeface="Arial" panose="020B0604020202020204" pitchFamily="34" charset="0"/>
+                <a:cs typeface="Arial" panose="020B0604020202020204" pitchFamily="34" charset="0"/>
+              </a:rPr>
+              <a:t>Try to finish it on time please. </a:t>
+            </a:r>
+          </a:p>
+          <a:p>
+            <a:r>
+              <a:rPr lang="en-US" dirty="0">
+                <a:latin typeface="Arial" panose="020B0604020202020204" pitchFamily="34" charset="0"/>
+                <a:cs typeface="Arial" panose="020B0604020202020204" pitchFamily="34" charset="0"/>
+              </a:rPr>
+              <a:t>Please remember that I am asking for NO laptop / phones!</a:t>
+            </a:r>
+          </a:p>
+          <a:p>
+            <a:pPr lvl="1"/>
+            <a:r>
+              <a:rPr lang="en-US" dirty="0">
+                <a:latin typeface="Arial" panose="020B0604020202020204" pitchFamily="34" charset="0"/>
+                <a:cs typeface="Arial" panose="020B0604020202020204" pitchFamily="34" charset="0"/>
+              </a:rPr>
+              <a:t>This makes the learning environment better for everybody. I appreciate it!</a:t>
+            </a:r>
+          </a:p>
+          <a:p>
+            <a:r>
+              <a:rPr lang="en-US" dirty="0">
+                <a:latin typeface="Arial" panose="020B0604020202020204" pitchFamily="34" charset="0"/>
+                <a:cs typeface="Arial" panose="020B0604020202020204" pitchFamily="34" charset="0"/>
+              </a:rPr>
+              <a:t>Discussion Section: Chase will be holding every week</a:t>
+            </a:r>
+          </a:p>
+          <a:p>
+            <a:pPr lvl="1"/>
+            <a:r>
+              <a:rPr lang="en-US" dirty="0">
+                <a:latin typeface="Arial" panose="020B0604020202020204" pitchFamily="34" charset="0"/>
+                <a:cs typeface="Arial" panose="020B0604020202020204" pitchFamily="34" charset="0"/>
+              </a:rPr>
+              <a:t>Wednesday 4-5pm in Rice 110</a:t>
+            </a:r>
+          </a:p>
+          <a:p>
+            <a:pPr lvl="1"/>
+            <a:r>
+              <a:rPr lang="en-US" dirty="0">
+                <a:latin typeface="Arial" panose="020B0604020202020204" pitchFamily="34" charset="0"/>
+                <a:cs typeface="Arial" panose="020B0604020202020204" pitchFamily="34" charset="0"/>
+              </a:rPr>
+              <a:t>Will be in </a:t>
+            </a:r>
+            <a:r>
+              <a:rPr lang="en-US" b="1" dirty="0">
+                <a:latin typeface="Arial" panose="020B0604020202020204" pitchFamily="34" charset="0"/>
+                <a:cs typeface="Arial" panose="020B0604020202020204" pitchFamily="34" charset="0"/>
+              </a:rPr>
+              <a:t>THN E316 </a:t>
+            </a:r>
+            <a:r>
+              <a:rPr lang="en-US" dirty="0">
+                <a:latin typeface="Arial" panose="020B0604020202020204" pitchFamily="34" charset="0"/>
+                <a:cs typeface="Arial" panose="020B0604020202020204" pitchFamily="34" charset="0"/>
+              </a:rPr>
+              <a:t>on quiz weeks since attendance is higher</a:t>
+            </a:r>
+          </a:p>
+          <a:p>
+            <a:r>
+              <a:rPr lang="en-US" dirty="0">
+                <a:latin typeface="Arial" panose="020B0604020202020204" pitchFamily="34" charset="0"/>
+                <a:cs typeface="Arial" panose="020B0604020202020204" pitchFamily="34" charset="0"/>
+              </a:rPr>
+              <a:t>Lecture recordings are on Panopto</a:t>
+            </a:r>
+          </a:p>
+          <a:p>
+            <a:pPr lvl="1"/>
+            <a:r>
+              <a:rPr lang="en-US" dirty="0">
+                <a:latin typeface="Arial" panose="020B0604020202020204" pitchFamily="34" charset="0"/>
+                <a:cs typeface="Arial" panose="020B0604020202020204" pitchFamily="34" charset="0"/>
+              </a:rPr>
+              <a:t>There are folders for Floryan and Pettit (little hard to find but they are there)</a:t>
+            </a:r>
+          </a:p>
+          <a:p>
+            <a:r>
+              <a:rPr lang="en-US" dirty="0">
+                <a:latin typeface="Arial" panose="020B0604020202020204" pitchFamily="34" charset="0"/>
+                <a:cs typeface="Arial" panose="020B0604020202020204" pitchFamily="34" charset="0"/>
+              </a:rPr>
+              <a:t>Today we continue with module 3</a:t>
+            </a:r>
+          </a:p>
+        </p:txBody>
+      </p:sp>
+    </p:spTree>
+    <p:extLst>
+      <p:ext uri="{BB962C8B-B14F-4D97-AF65-F5344CB8AC3E}">
+        <p14:creationId xmlns:p14="http://schemas.microsoft.com/office/powerpoint/2010/main" val="841879372"/>
+      </p:ext>
+    </p:extLst>
+  </p:cSld>
+  <p:clrMapOvr>
+    <a:masterClrMapping/>
+  </p:clrMapOvr>
+</p:sld>
+</file>
+
+<file path=ppt/slides/slide13.xml><?xml version="1.0" encoding="utf-8"?>
+<p:sld xmlns:a="http://schemas.openxmlformats.org/drawingml/2006/main" xmlns:r="http://schemas.openxmlformats.org/officeDocument/2006/relationships" xmlns:p="http://schemas.openxmlformats.org/presentationml/2006/main">
+  <p:cSld>
+    <p:spTree>
+      <p:nvGrpSpPr>
         <p:cNvPr id="1" name=""/>
         <p:cNvGrpSpPr/>
         <p:nvPr/>
@@ -13834,7 +14085,7 @@
           <p:nvPr>
             <p:extLst>
               <p:ext uri="{D42A27DB-BD31-4B8C-83A1-F6EECF244321}">
-                <p14:modId xmlns:p14="http://schemas.microsoft.com/office/powerpoint/2010/main" val="3833020786"/>
+                <p14:modId xmlns:p14="http://schemas.microsoft.com/office/powerpoint/2010/main" val="1657989659"/>
               </p:ext>
             </p:extLst>
           </p:nvPr>
@@ -13944,7 +14195,7 @@
                       <a:pPr algn="ctr"/>
                       <a:r>
                         <a:rPr lang="en-US" i="0" dirty="0"/>
-                        <a:t>12</a:t>
+                        <a:t>13</a:t>
                       </a:r>
                     </a:p>
                   </a:txBody>
@@ -13958,7 +14209,7 @@
                       <a:pPr algn="ctr"/>
                       <a:r>
                         <a:rPr lang="en-US" b="1" i="0" dirty="0"/>
-                        <a:t>100%</a:t>
+                        <a:t>92%</a:t>
                       </a:r>
                     </a:p>
                   </a:txBody>
@@ -13989,7 +14240,7 @@
           <p:nvPr>
             <p:extLst>
               <p:ext uri="{D42A27DB-BD31-4B8C-83A1-F6EECF244321}">
-                <p14:modId xmlns:p14="http://schemas.microsoft.com/office/powerpoint/2010/main" val="1423240415"/>
+                <p14:modId xmlns:p14="http://schemas.microsoft.com/office/powerpoint/2010/main" val="3400321850"/>
               </p:ext>
             </p:extLst>
           </p:nvPr>
@@ -14187,7 +14438,7 @@
                       <a:pPr algn="ctr"/>
                       <a:r>
                         <a:rPr lang="en-US" dirty="0"/>
-                        <a:t>--</a:t>
+                        <a:t>97</a:t>
                       </a:r>
                     </a:p>
                   </a:txBody>
@@ -14201,7 +14452,7 @@
                       <a:pPr algn="ctr"/>
                       <a:r>
                         <a:rPr lang="en-US" dirty="0"/>
-                        <a:t>--</a:t>
+                        <a:t>202</a:t>
                       </a:r>
                     </a:p>
                   </a:txBody>
@@ -14215,7 +14466,7 @@
                       <a:pPr algn="ctr"/>
                       <a:r>
                         <a:rPr lang="en-US" b="0" i="0" dirty="0"/>
-                        <a:t>--</a:t>
+                        <a:t>48.0</a:t>
                       </a:r>
                       <a:r>
                         <a:rPr lang="en-US" b="0" dirty="0"/>
@@ -14740,7 +14991,7 @@
           <p:nvPr>
             <p:extLst>
               <p:ext uri="{D42A27DB-BD31-4B8C-83A1-F6EECF244321}">
-                <p14:modId xmlns:p14="http://schemas.microsoft.com/office/powerpoint/2010/main" val="2748844224"/>
+                <p14:modId xmlns:p14="http://schemas.microsoft.com/office/powerpoint/2010/main" val="3603365845"/>
               </p:ext>
             </p:extLst>
           </p:nvPr>
@@ -14836,7 +15087,7 @@
                       <a:pPr algn="ctr"/>
                       <a:r>
                         <a:rPr lang="en-US" i="0" dirty="0"/>
-                        <a:t>5</a:t>
+                        <a:t>6</a:t>
                       </a:r>
                     </a:p>
                   </a:txBody>
@@ -14850,7 +15101,7 @@
                       <a:pPr algn="ctr"/>
                       <a:r>
                         <a:rPr lang="en-US" i="0" dirty="0"/>
-                        <a:t>5</a:t>
+                        <a:t>6</a:t>
                       </a:r>
                     </a:p>
                   </a:txBody>
@@ -15128,7 +15379,7 @@
           <p:nvPr>
             <p:extLst>
               <p:ext uri="{D42A27DB-BD31-4B8C-83A1-F6EECF244321}">
-                <p14:modId xmlns:p14="http://schemas.microsoft.com/office/powerpoint/2010/main" val="4121355706"/>
+                <p14:modId xmlns:p14="http://schemas.microsoft.com/office/powerpoint/2010/main" val="2493232555"/>
               </p:ext>
             </p:extLst>
           </p:nvPr>
@@ -15238,7 +15489,7 @@
                       <a:pPr algn="ctr"/>
                       <a:r>
                         <a:rPr lang="en-US" i="0" dirty="0"/>
-                        <a:t>6</a:t>
+                        <a:t>13</a:t>
                       </a:r>
                     </a:p>
                   </a:txBody>
@@ -15252,7 +15503,7 @@
                       <a:pPr algn="ctr"/>
                       <a:r>
                         <a:rPr lang="en-US" b="1" i="0" dirty="0"/>
-                        <a:t>67%</a:t>
+                        <a:t>31%</a:t>
                       </a:r>
                     </a:p>
                   </a:txBody>
@@ -17307,6 +17558,18 @@
 </file>
 
 <file path=ppt/tags/tag25.xml><?xml version="1.0" encoding="utf-8"?>
+<p:tagLst xmlns:a="http://schemas.openxmlformats.org/drawingml/2006/main" xmlns:r="http://schemas.openxmlformats.org/officeDocument/2006/relationships" xmlns:p="http://schemas.openxmlformats.org/presentationml/2006/main">
+  <p:tag name="_INSTRUCTOR VIEW19C14C36-AC8E-43BC-9DB6-C2AAF774C7DC|PANE__TAG" val="_"/>
+</p:tagLst>
+</file>
+
+<file path=ppt/tags/tag26.xml><?xml version="1.0" encoding="utf-8"?>
+<p:tagLst xmlns:a="http://schemas.openxmlformats.org/drawingml/2006/main" xmlns:r="http://schemas.openxmlformats.org/officeDocument/2006/relationships" xmlns:p="http://schemas.openxmlformats.org/presentationml/2006/main">
+  <p:tag name="_INSTRUCTOR VIEW19C14C36-AC8E-43BC-9DB6-C2AAF774C7DC|PANE__TAG" val="_"/>
+</p:tagLst>
+</file>
+
+<file path=ppt/tags/tag27.xml><?xml version="1.0" encoding="utf-8"?>
 <p:tagLst xmlns:a="http://schemas.openxmlformats.org/drawingml/2006/main" xmlns:r="http://schemas.openxmlformats.org/officeDocument/2006/relationships" xmlns:p="http://schemas.openxmlformats.org/presentationml/2006/main">
   <p:tag name="_INSTRUCTOR VIEW19C14C36-AC8E-43BC-9DB6-C2AAF774C7DC|PANE__TAG" val="_"/>
 </p:tagLst>

</xml_diff>